<commit_message>
mis modificaciones a la presentacion
</commit_message>
<xml_diff>
--- a/Documentacion/Informe Preliminar/Presentacion Informe Preliminar.pptx
+++ b/Documentacion/Informe Preliminar/Presentacion Informe Preliminar.pptx
@@ -874,7 +874,7 @@
 <dgm:dataModel xmlns:dgm="http://schemas.openxmlformats.org/drawingml/2006/diagram" xmlns:a="http://schemas.openxmlformats.org/drawingml/2006/main">
   <dgm:ptLst>
     <dgm:pt modelId="{C3818049-3B0A-41F2-A7EE-480ECF181171}" type="doc">
-      <dgm:prSet loTypeId="urn:microsoft.com/office/officeart/2005/8/layout/orgChart1" loCatId="hierarchy" qsTypeId="urn:microsoft.com/office/officeart/2005/8/quickstyle/simple3" qsCatId="simple" csTypeId="urn:microsoft.com/office/officeart/2005/8/colors/accent1_2" csCatId="accent1" phldr="1"/>
+      <dgm:prSet loTypeId="urn:microsoft.com/office/officeart/2005/8/layout/orgChart1" loCatId="hierarchy" qsTypeId="urn:microsoft.com/office/officeart/2005/8/quickstyle/simple4" qsCatId="simple" csTypeId="urn:microsoft.com/office/officeart/2005/8/colors/accent1_2" csCatId="accent1" phldr="1"/>
       <dgm:spPr/>
       <dgm:t>
         <a:bodyPr/>
@@ -885,32 +885,31 @@
       </dgm:t>
     </dgm:pt>
     <dgm:pt modelId="{F27F8D6F-03A5-429D-BDD0-702BFC21B6F0}">
-      <dgm:prSet phldrT="[Texto]">
-        <dgm:style>
-          <a:lnRef idx="1">
-            <a:schemeClr val="accent3"/>
-          </a:lnRef>
-          <a:fillRef idx="2">
-            <a:schemeClr val="accent3"/>
-          </a:fillRef>
-          <a:effectRef idx="1">
-            <a:schemeClr val="accent3"/>
-          </a:effectRef>
-          <a:fontRef idx="minor">
-            <a:schemeClr val="dk1"/>
-          </a:fontRef>
-        </dgm:style>
-      </dgm:prSet>
-      <dgm:spPr/>
+      <dgm:prSet phldrT="[Texto]" custT="1"/>
+      <dgm:spPr>
+        <a:solidFill>
+          <a:srgbClr val="94CC16">
+            <a:alpha val="73000"/>
+          </a:srgbClr>
+        </a:solidFill>
+      </dgm:spPr>
       <dgm:t>
         <a:bodyPr/>
         <a:lstStyle/>
         <a:p>
           <a:r>
-            <a:rPr lang="en-US"/>
+            <a:rPr lang="en-US" sz="2000" b="1" dirty="0" err="1" smtClean="0">
+              <a:solidFill>
+                <a:schemeClr val="tx1"/>
+              </a:solidFill>
+            </a:rPr>
             <a:t>Presidencia</a:t>
           </a:r>
-          <a:endParaRPr lang="es-AR"/>
+          <a:endParaRPr lang="es-AR" sz="2000" b="1" dirty="0">
+            <a:solidFill>
+              <a:schemeClr val="tx1"/>
+            </a:solidFill>
+          </a:endParaRPr>
         </a:p>
       </dgm:t>
     </dgm:pt>
@@ -937,52 +936,44 @@
       </dgm:t>
     </dgm:pt>
     <dgm:pt modelId="{69404F52-DC68-4464-8C95-4A4EC5C3D511}">
-      <dgm:prSet phldrT="[Texto]">
-        <dgm:style>
-          <a:lnRef idx="1">
-            <a:schemeClr val="accent3"/>
-          </a:lnRef>
-          <a:fillRef idx="2">
-            <a:schemeClr val="accent3"/>
-          </a:fillRef>
-          <a:effectRef idx="1">
-            <a:schemeClr val="accent3"/>
-          </a:effectRef>
-          <a:fontRef idx="minor">
-            <a:schemeClr val="dk1"/>
-          </a:fontRef>
-        </dgm:style>
-      </dgm:prSet>
-      <dgm:spPr/>
+      <dgm:prSet phldrT="[Texto]" custT="1"/>
+      <dgm:spPr>
+        <a:solidFill>
+          <a:srgbClr val="94CC16">
+            <a:alpha val="73000"/>
+          </a:srgbClr>
+        </a:solidFill>
+      </dgm:spPr>
       <dgm:t>
         <a:bodyPr/>
         <a:lstStyle/>
         <a:p>
           <a:r>
-            <a:rPr lang="en-US"/>
-            <a:t>Supervision de Proyectos</a:t>
+            <a:rPr lang="en-US" sz="1400" b="1" dirty="0">
+              <a:solidFill>
+                <a:schemeClr val="tx1"/>
+              </a:solidFill>
+            </a:rPr>
+            <a:t>Supervision de </a:t>
           </a:r>
-          <a:endParaRPr lang="es-AR"/>
+          <a:r>
+            <a:rPr lang="en-US" sz="1400" b="1" dirty="0" err="1">
+              <a:solidFill>
+                <a:schemeClr val="tx1"/>
+              </a:solidFill>
+            </a:rPr>
+            <a:t>Proyectos</a:t>
+          </a:r>
+          <a:endParaRPr lang="es-AR" sz="1400" b="1" dirty="0">
+            <a:solidFill>
+              <a:schemeClr val="tx1"/>
+            </a:solidFill>
+          </a:endParaRPr>
         </a:p>
       </dgm:t>
     </dgm:pt>
     <dgm:pt modelId="{CF7F02CB-0026-4C85-A83C-2611CA0EC12E}" type="parTrans" cxnId="{F40F547F-E985-47E4-852C-13CE91AFC67B}">
-      <dgm:prSet>
-        <dgm:style>
-          <a:lnRef idx="1">
-            <a:schemeClr val="accent3"/>
-          </a:lnRef>
-          <a:fillRef idx="2">
-            <a:schemeClr val="accent3"/>
-          </a:fillRef>
-          <a:effectRef idx="1">
-            <a:schemeClr val="accent3"/>
-          </a:effectRef>
-          <a:fontRef idx="minor">
-            <a:schemeClr val="dk1"/>
-          </a:fontRef>
-        </dgm:style>
-      </dgm:prSet>
+      <dgm:prSet/>
       <dgm:spPr/>
       <dgm:t>
         <a:bodyPr/>
@@ -1004,52 +995,44 @@
       </dgm:t>
     </dgm:pt>
     <dgm:pt modelId="{C0EDF659-C35B-4EB3-A65D-2CEFAA43999B}">
-      <dgm:prSet phldrT="[Texto]">
-        <dgm:style>
-          <a:lnRef idx="1">
-            <a:schemeClr val="accent3"/>
-          </a:lnRef>
-          <a:fillRef idx="2">
-            <a:schemeClr val="accent3"/>
-          </a:fillRef>
-          <a:effectRef idx="1">
-            <a:schemeClr val="accent3"/>
-          </a:effectRef>
-          <a:fontRef idx="minor">
-            <a:schemeClr val="dk1"/>
-          </a:fontRef>
-        </dgm:style>
-      </dgm:prSet>
-      <dgm:spPr/>
+      <dgm:prSet phldrT="[Texto]" custT="1"/>
+      <dgm:spPr>
+        <a:solidFill>
+          <a:srgbClr val="94CC16">
+            <a:alpha val="73000"/>
+          </a:srgbClr>
+        </a:solidFill>
+      </dgm:spPr>
       <dgm:t>
         <a:bodyPr/>
         <a:lstStyle/>
         <a:p>
           <a:r>
-            <a:rPr lang="en-US"/>
-            <a:t>Administración General</a:t>
+            <a:rPr lang="en-US" sz="1400" b="1" dirty="0" err="1">
+              <a:solidFill>
+                <a:schemeClr val="tx1"/>
+              </a:solidFill>
+            </a:rPr>
+            <a:t>Administración</a:t>
           </a:r>
-          <a:endParaRPr lang="es-AR"/>
+          <a:r>
+            <a:rPr lang="en-US" sz="1400" b="1" dirty="0">
+              <a:solidFill>
+                <a:schemeClr val="tx1"/>
+              </a:solidFill>
+            </a:rPr>
+            <a:t> General</a:t>
+          </a:r>
+          <a:endParaRPr lang="es-AR" sz="1400" b="1" dirty="0">
+            <a:solidFill>
+              <a:schemeClr val="tx1"/>
+            </a:solidFill>
+          </a:endParaRPr>
         </a:p>
       </dgm:t>
     </dgm:pt>
     <dgm:pt modelId="{38912AFE-3D78-4266-8E99-4582EAA11DAA}" type="parTrans" cxnId="{AFBFF8F3-B1CC-4B54-A79E-E1B294E0D0BF}">
-      <dgm:prSet>
-        <dgm:style>
-          <a:lnRef idx="1">
-            <a:schemeClr val="accent3"/>
-          </a:lnRef>
-          <a:fillRef idx="2">
-            <a:schemeClr val="accent3"/>
-          </a:fillRef>
-          <a:effectRef idx="1">
-            <a:schemeClr val="accent3"/>
-          </a:effectRef>
-          <a:fontRef idx="minor">
-            <a:schemeClr val="dk1"/>
-          </a:fontRef>
-        </dgm:style>
-      </dgm:prSet>
+      <dgm:prSet/>
       <dgm:spPr/>
       <dgm:t>
         <a:bodyPr/>
@@ -1071,52 +1054,52 @@
       </dgm:t>
     </dgm:pt>
     <dgm:pt modelId="{CAE025A5-AD7E-47EC-9189-B4F6923CFB39}">
-      <dgm:prSet phldrT="[Texto]">
-        <dgm:style>
-          <a:lnRef idx="1">
-            <a:schemeClr val="accent3"/>
-          </a:lnRef>
-          <a:fillRef idx="2">
-            <a:schemeClr val="accent3"/>
-          </a:fillRef>
-          <a:effectRef idx="1">
-            <a:schemeClr val="accent3"/>
-          </a:effectRef>
-          <a:fontRef idx="minor">
-            <a:schemeClr val="dk1"/>
-          </a:fontRef>
-        </dgm:style>
-      </dgm:prSet>
-      <dgm:spPr/>
+      <dgm:prSet phldrT="[Texto]" custT="1"/>
+      <dgm:spPr>
+        <a:solidFill>
+          <a:srgbClr val="94CC16">
+            <a:alpha val="73000"/>
+          </a:srgbClr>
+        </a:solidFill>
+      </dgm:spPr>
       <dgm:t>
         <a:bodyPr/>
         <a:lstStyle/>
         <a:p>
           <a:r>
-            <a:rPr lang="en-US"/>
-            <a:t>Seguridad e Higiene</a:t>
+            <a:rPr lang="en-US" sz="1400" b="1" dirty="0" err="1">
+              <a:solidFill>
+                <a:schemeClr val="tx1"/>
+              </a:solidFill>
+            </a:rPr>
+            <a:t>Seguridad</a:t>
           </a:r>
-          <a:endParaRPr lang="es-AR"/>
+          <a:r>
+            <a:rPr lang="en-US" sz="1400" b="1" dirty="0">
+              <a:solidFill>
+                <a:schemeClr val="tx1"/>
+              </a:solidFill>
+            </a:rPr>
+            <a:t> e </a:t>
+          </a:r>
+          <a:r>
+            <a:rPr lang="en-US" sz="1400" b="1" dirty="0" err="1">
+              <a:solidFill>
+                <a:schemeClr val="tx1"/>
+              </a:solidFill>
+            </a:rPr>
+            <a:t>Higiene</a:t>
+          </a:r>
+          <a:endParaRPr lang="es-AR" sz="1400" b="1" dirty="0">
+            <a:solidFill>
+              <a:schemeClr val="tx1"/>
+            </a:solidFill>
+          </a:endParaRPr>
         </a:p>
       </dgm:t>
     </dgm:pt>
     <dgm:pt modelId="{36C0A925-CF92-4A8D-8547-F5135586AA1D}" type="parTrans" cxnId="{956F72A0-5E7A-4BBE-918C-DF48B42F7F88}">
-      <dgm:prSet>
-        <dgm:style>
-          <a:lnRef idx="1">
-            <a:schemeClr val="accent3"/>
-          </a:lnRef>
-          <a:fillRef idx="2">
-            <a:schemeClr val="accent3"/>
-          </a:fillRef>
-          <a:effectRef idx="1">
-            <a:schemeClr val="accent3"/>
-          </a:effectRef>
-          <a:fontRef idx="minor">
-            <a:schemeClr val="dk1"/>
-          </a:fontRef>
-        </dgm:style>
-      </dgm:prSet>
+      <dgm:prSet/>
       <dgm:spPr/>
       <dgm:t>
         <a:bodyPr/>
@@ -1138,52 +1121,59 @@
       </dgm:t>
     </dgm:pt>
     <dgm:pt modelId="{AB74DD02-BF3F-45B5-8025-7F7CC2B7F0AF}">
-      <dgm:prSet>
-        <dgm:style>
-          <a:lnRef idx="1">
-            <a:schemeClr val="accent3"/>
-          </a:lnRef>
-          <a:fillRef idx="2">
-            <a:schemeClr val="accent3"/>
-          </a:fillRef>
-          <a:effectRef idx="1">
-            <a:schemeClr val="accent3"/>
-          </a:effectRef>
-          <a:fontRef idx="minor">
-            <a:schemeClr val="dk1"/>
-          </a:fontRef>
-        </dgm:style>
-      </dgm:prSet>
-      <dgm:spPr/>
+      <dgm:prSet custT="1"/>
+      <dgm:spPr>
+        <a:solidFill>
+          <a:srgbClr val="94CC16">
+            <a:alpha val="73000"/>
+          </a:srgbClr>
+        </a:solidFill>
+        <a:ln>
+          <a:solidFill>
+            <a:schemeClr val="bg2">
+              <a:lumMod val="50000"/>
+            </a:schemeClr>
+          </a:solidFill>
+        </a:ln>
+      </dgm:spPr>
       <dgm:t>
         <a:bodyPr/>
         <a:lstStyle/>
         <a:p>
           <a:r>
-            <a:rPr lang="en-US"/>
-            <a:t>Administración de Proyectos</a:t>
+            <a:rPr lang="en-US" sz="1400" b="1" dirty="0" err="1">
+              <a:solidFill>
+                <a:schemeClr val="tx1"/>
+              </a:solidFill>
+            </a:rPr>
+            <a:t>Administración</a:t>
           </a:r>
-          <a:endParaRPr lang="es-AR"/>
+          <a:r>
+            <a:rPr lang="en-US" sz="1400" b="1" dirty="0">
+              <a:solidFill>
+                <a:schemeClr val="tx1"/>
+              </a:solidFill>
+            </a:rPr>
+            <a:t> de </a:t>
+          </a:r>
+          <a:r>
+            <a:rPr lang="en-US" sz="1400" b="1" dirty="0" err="1">
+              <a:solidFill>
+                <a:schemeClr val="tx1"/>
+              </a:solidFill>
+            </a:rPr>
+            <a:t>Proyectos</a:t>
+          </a:r>
+          <a:endParaRPr lang="es-AR" sz="1400" b="1" dirty="0">
+            <a:solidFill>
+              <a:schemeClr val="tx1"/>
+            </a:solidFill>
+          </a:endParaRPr>
         </a:p>
       </dgm:t>
     </dgm:pt>
     <dgm:pt modelId="{0C5A7F20-7BF1-4D54-8603-B4C57EB9E51E}" type="parTrans" cxnId="{7C9266A4-58E6-4781-B381-E3B5BC31D902}">
-      <dgm:prSet>
-        <dgm:style>
-          <a:lnRef idx="1">
-            <a:schemeClr val="accent3"/>
-          </a:lnRef>
-          <a:fillRef idx="2">
-            <a:schemeClr val="accent3"/>
-          </a:fillRef>
-          <a:effectRef idx="1">
-            <a:schemeClr val="accent3"/>
-          </a:effectRef>
-          <a:fontRef idx="minor">
-            <a:schemeClr val="dk1"/>
-          </a:fontRef>
-        </dgm:style>
-      </dgm:prSet>
+      <dgm:prSet/>
       <dgm:spPr/>
       <dgm:t>
         <a:bodyPr/>
@@ -1205,51 +1195,31 @@
       </dgm:t>
     </dgm:pt>
     <dgm:pt modelId="{8782F143-7EBE-4652-BCB6-342F97295F78}">
-      <dgm:prSet>
-        <dgm:style>
-          <a:lnRef idx="1">
-            <a:schemeClr val="accent3"/>
-          </a:lnRef>
-          <a:fillRef idx="2">
-            <a:schemeClr val="accent3"/>
-          </a:fillRef>
-          <a:effectRef idx="1">
-            <a:schemeClr val="accent3"/>
-          </a:effectRef>
-          <a:fontRef idx="minor">
-            <a:schemeClr val="dk1"/>
-          </a:fontRef>
-        </dgm:style>
-      </dgm:prSet>
-      <dgm:spPr/>
+      <dgm:prSet custT="1"/>
+      <dgm:spPr>
+        <a:solidFill>
+          <a:srgbClr val="94CC16">
+            <a:alpha val="73000"/>
+          </a:srgbClr>
+        </a:solidFill>
+      </dgm:spPr>
       <dgm:t>
         <a:bodyPr/>
         <a:lstStyle/>
         <a:p>
           <a:r>
-            <a:rPr lang="es-AR" dirty="0"/>
+            <a:rPr lang="es-AR" sz="1400" b="1" dirty="0">
+              <a:solidFill>
+                <a:schemeClr val="tx1"/>
+              </a:solidFill>
+            </a:rPr>
             <a:t>Cuadrillas</a:t>
           </a:r>
         </a:p>
       </dgm:t>
     </dgm:pt>
     <dgm:pt modelId="{6CCD5503-01E5-4C86-8EFC-5F017D508467}" type="parTrans" cxnId="{DABFC9D0-8C39-473E-A1C2-ECB16C3483D9}">
-      <dgm:prSet>
-        <dgm:style>
-          <a:lnRef idx="1">
-            <a:schemeClr val="accent3"/>
-          </a:lnRef>
-          <a:fillRef idx="2">
-            <a:schemeClr val="accent3"/>
-          </a:fillRef>
-          <a:effectRef idx="1">
-            <a:schemeClr val="accent3"/>
-          </a:effectRef>
-          <a:fontRef idx="minor">
-            <a:schemeClr val="dk1"/>
-          </a:fontRef>
-        </dgm:style>
-      </dgm:prSet>
+      <dgm:prSet/>
       <dgm:spPr/>
       <dgm:t>
         <a:bodyPr/>
@@ -1297,10 +1267,24 @@
         </dgm:presLayoutVars>
       </dgm:prSet>
       <dgm:spPr/>
+      <dgm:t>
+        <a:bodyPr/>
+        <a:lstStyle/>
+        <a:p>
+          <a:endParaRPr lang="es-AR"/>
+        </a:p>
+      </dgm:t>
     </dgm:pt>
     <dgm:pt modelId="{1F67BD07-D585-4BD6-88EA-D8E5F5FF308F}" type="pres">
       <dgm:prSet presAssocID="{F27F8D6F-03A5-429D-BDD0-702BFC21B6F0}" presName="rootComposite1" presStyleCnt="0"/>
       <dgm:spPr/>
+      <dgm:t>
+        <a:bodyPr/>
+        <a:lstStyle/>
+        <a:p>
+          <a:endParaRPr lang="es-AR"/>
+        </a:p>
+      </dgm:t>
     </dgm:pt>
     <dgm:pt modelId="{F21B52D0-B08C-497F-8319-56B5DA6523B6}" type="pres">
       <dgm:prSet presAssocID="{F27F8D6F-03A5-429D-BDD0-702BFC21B6F0}" presName="rootText1" presStyleLbl="node0" presStyleIdx="0" presStyleCnt="1" custLinFactNeighborX="783" custLinFactNeighborY="11258">
@@ -1331,6 +1315,13 @@
     <dgm:pt modelId="{CF57312A-95DE-40CE-91AF-7EE78282CD63}" type="pres">
       <dgm:prSet presAssocID="{F27F8D6F-03A5-429D-BDD0-702BFC21B6F0}" presName="hierChild2" presStyleCnt="0"/>
       <dgm:spPr/>
+      <dgm:t>
+        <a:bodyPr/>
+        <a:lstStyle/>
+        <a:p>
+          <a:endParaRPr lang="es-AR"/>
+        </a:p>
+      </dgm:t>
     </dgm:pt>
     <dgm:pt modelId="{8EBBDB76-DF10-4764-B8B8-496AD4C5615C}" type="pres">
       <dgm:prSet presAssocID="{CF7F02CB-0026-4C85-A83C-2611CA0EC12E}" presName="Name37" presStyleLbl="parChTrans1D2" presStyleIdx="0" presStyleCnt="3"/>
@@ -1350,10 +1341,24 @@
         </dgm:presLayoutVars>
       </dgm:prSet>
       <dgm:spPr/>
+      <dgm:t>
+        <a:bodyPr/>
+        <a:lstStyle/>
+        <a:p>
+          <a:endParaRPr lang="es-AR"/>
+        </a:p>
+      </dgm:t>
     </dgm:pt>
     <dgm:pt modelId="{D124B1AA-7060-4AB5-8487-49BA48E66E83}" type="pres">
       <dgm:prSet presAssocID="{69404F52-DC68-4464-8C95-4A4EC5C3D511}" presName="rootComposite" presStyleCnt="0"/>
       <dgm:spPr/>
+      <dgm:t>
+        <a:bodyPr/>
+        <a:lstStyle/>
+        <a:p>
+          <a:endParaRPr lang="es-AR"/>
+        </a:p>
+      </dgm:t>
     </dgm:pt>
     <dgm:pt modelId="{EF27B91A-A527-4B5D-8953-3DEFA4CD70BE}" type="pres">
       <dgm:prSet presAssocID="{69404F52-DC68-4464-8C95-4A4EC5C3D511}" presName="rootText" presStyleLbl="node2" presStyleIdx="0" presStyleCnt="3" custLinFactNeighborX="783" custLinFactNeighborY="11258">
@@ -1384,6 +1389,13 @@
     <dgm:pt modelId="{A398DAD7-91CB-4C69-9C87-5854557C5295}" type="pres">
       <dgm:prSet presAssocID="{69404F52-DC68-4464-8C95-4A4EC5C3D511}" presName="hierChild4" presStyleCnt="0"/>
       <dgm:spPr/>
+      <dgm:t>
+        <a:bodyPr/>
+        <a:lstStyle/>
+        <a:p>
+          <a:endParaRPr lang="es-AR"/>
+        </a:p>
+      </dgm:t>
     </dgm:pt>
     <dgm:pt modelId="{09519A4A-757A-4FD3-B530-30AAEFBECC94}" type="pres">
       <dgm:prSet presAssocID="{0C5A7F20-7BF1-4D54-8603-B4C57EB9E51E}" presName="Name37" presStyleLbl="parChTrans1D3" presStyleIdx="0" presStyleCnt="1"/>
@@ -1403,10 +1415,24 @@
         </dgm:presLayoutVars>
       </dgm:prSet>
       <dgm:spPr/>
+      <dgm:t>
+        <a:bodyPr/>
+        <a:lstStyle/>
+        <a:p>
+          <a:endParaRPr lang="es-AR"/>
+        </a:p>
+      </dgm:t>
     </dgm:pt>
     <dgm:pt modelId="{B35ECC57-01FC-47F4-9E0E-EF40FFE87727}" type="pres">
       <dgm:prSet presAssocID="{AB74DD02-BF3F-45B5-8025-7F7CC2B7F0AF}" presName="rootComposite" presStyleCnt="0"/>
       <dgm:spPr/>
+      <dgm:t>
+        <a:bodyPr/>
+        <a:lstStyle/>
+        <a:p>
+          <a:endParaRPr lang="es-AR"/>
+        </a:p>
+      </dgm:t>
     </dgm:pt>
     <dgm:pt modelId="{76382964-F0B9-4801-AD29-234D5C4EB29C}" type="pres">
       <dgm:prSet presAssocID="{AB74DD02-BF3F-45B5-8025-7F7CC2B7F0AF}" presName="rootText" presStyleLbl="node3" presStyleIdx="0" presStyleCnt="1" custLinFactNeighborX="783" custLinFactNeighborY="11258">
@@ -1437,6 +1463,13 @@
     <dgm:pt modelId="{4900D1E9-D0F0-41BD-9F1A-AD635EB77A1B}" type="pres">
       <dgm:prSet presAssocID="{AB74DD02-BF3F-45B5-8025-7F7CC2B7F0AF}" presName="hierChild4" presStyleCnt="0"/>
       <dgm:spPr/>
+      <dgm:t>
+        <a:bodyPr/>
+        <a:lstStyle/>
+        <a:p>
+          <a:endParaRPr lang="es-AR"/>
+        </a:p>
+      </dgm:t>
     </dgm:pt>
     <dgm:pt modelId="{7333BF06-7B1A-47D2-83B9-64258DCEE59E}" type="pres">
       <dgm:prSet presAssocID="{6CCD5503-01E5-4C86-8EFC-5F017D508467}" presName="Name37" presStyleLbl="parChTrans1D4" presStyleIdx="0" presStyleCnt="1"/>
@@ -1456,13 +1489,27 @@
         </dgm:presLayoutVars>
       </dgm:prSet>
       <dgm:spPr/>
+      <dgm:t>
+        <a:bodyPr/>
+        <a:lstStyle/>
+        <a:p>
+          <a:endParaRPr lang="es-AR"/>
+        </a:p>
+      </dgm:t>
     </dgm:pt>
     <dgm:pt modelId="{E85B6231-2009-4608-BF6D-BCF7CFF0912E}" type="pres">
       <dgm:prSet presAssocID="{8782F143-7EBE-4652-BCB6-342F97295F78}" presName="rootComposite" presStyleCnt="0"/>
       <dgm:spPr/>
+      <dgm:t>
+        <a:bodyPr/>
+        <a:lstStyle/>
+        <a:p>
+          <a:endParaRPr lang="es-AR"/>
+        </a:p>
+      </dgm:t>
     </dgm:pt>
     <dgm:pt modelId="{C999530D-970C-4F19-A91A-981537024566}" type="pres">
-      <dgm:prSet presAssocID="{8782F143-7EBE-4652-BCB6-342F97295F78}" presName="rootText" presStyleLbl="node4" presStyleIdx="0" presStyleCnt="1" custLinFactNeighborX="-1" custLinFactNeighborY="-7549">
+      <dgm:prSet presAssocID="{8782F143-7EBE-4652-BCB6-342F97295F78}" presName="rootText" presStyleLbl="node4" presStyleIdx="0" presStyleCnt="1" custLinFactNeighborX="14469" custLinFactNeighborY="-5163">
         <dgm:presLayoutVars>
           <dgm:chPref val="3"/>
         </dgm:presLayoutVars>
@@ -1490,18 +1537,46 @@
     <dgm:pt modelId="{5B187E3E-3FCB-4BCE-8228-40007FF99A05}" type="pres">
       <dgm:prSet presAssocID="{8782F143-7EBE-4652-BCB6-342F97295F78}" presName="hierChild4" presStyleCnt="0"/>
       <dgm:spPr/>
+      <dgm:t>
+        <a:bodyPr/>
+        <a:lstStyle/>
+        <a:p>
+          <a:endParaRPr lang="es-AR"/>
+        </a:p>
+      </dgm:t>
     </dgm:pt>
     <dgm:pt modelId="{B67726A3-32FF-499C-B84E-DC1A0BDA5E9F}" type="pres">
       <dgm:prSet presAssocID="{8782F143-7EBE-4652-BCB6-342F97295F78}" presName="hierChild5" presStyleCnt="0"/>
       <dgm:spPr/>
+      <dgm:t>
+        <a:bodyPr/>
+        <a:lstStyle/>
+        <a:p>
+          <a:endParaRPr lang="es-AR"/>
+        </a:p>
+      </dgm:t>
     </dgm:pt>
     <dgm:pt modelId="{60A8B198-4EE5-48F8-A92B-234DD4B34998}" type="pres">
       <dgm:prSet presAssocID="{AB74DD02-BF3F-45B5-8025-7F7CC2B7F0AF}" presName="hierChild5" presStyleCnt="0"/>
       <dgm:spPr/>
+      <dgm:t>
+        <a:bodyPr/>
+        <a:lstStyle/>
+        <a:p>
+          <a:endParaRPr lang="es-AR"/>
+        </a:p>
+      </dgm:t>
     </dgm:pt>
     <dgm:pt modelId="{4F20D86C-E07D-47F2-AA93-7D81393505D2}" type="pres">
       <dgm:prSet presAssocID="{69404F52-DC68-4464-8C95-4A4EC5C3D511}" presName="hierChild5" presStyleCnt="0"/>
       <dgm:spPr/>
+      <dgm:t>
+        <a:bodyPr/>
+        <a:lstStyle/>
+        <a:p>
+          <a:endParaRPr lang="es-AR"/>
+        </a:p>
+      </dgm:t>
     </dgm:pt>
     <dgm:pt modelId="{FC06127A-3788-446A-9EF8-244F2B7D169B}" type="pres">
       <dgm:prSet presAssocID="{38912AFE-3D78-4266-8E99-4582EAA11DAA}" presName="Name37" presStyleLbl="parChTrans1D2" presStyleIdx="1" presStyleCnt="3"/>
@@ -1521,10 +1596,24 @@
         </dgm:presLayoutVars>
       </dgm:prSet>
       <dgm:spPr/>
+      <dgm:t>
+        <a:bodyPr/>
+        <a:lstStyle/>
+        <a:p>
+          <a:endParaRPr lang="es-AR"/>
+        </a:p>
+      </dgm:t>
     </dgm:pt>
     <dgm:pt modelId="{646A8AC7-6D5C-47D6-813D-85CD79F8E46C}" type="pres">
       <dgm:prSet presAssocID="{C0EDF659-C35B-4EB3-A65D-2CEFAA43999B}" presName="rootComposite" presStyleCnt="0"/>
       <dgm:spPr/>
+      <dgm:t>
+        <a:bodyPr/>
+        <a:lstStyle/>
+        <a:p>
+          <a:endParaRPr lang="es-AR"/>
+        </a:p>
+      </dgm:t>
     </dgm:pt>
     <dgm:pt modelId="{D70C0BDD-DBCA-4018-8B04-41A27590CEAD}" type="pres">
       <dgm:prSet presAssocID="{C0EDF659-C35B-4EB3-A65D-2CEFAA43999B}" presName="rootText" presStyleLbl="node2" presStyleIdx="1" presStyleCnt="3" custLinFactNeighborX="783" custLinFactNeighborY="11258">
@@ -1555,10 +1644,24 @@
     <dgm:pt modelId="{00FB1847-B63F-4016-A04C-A5B5782F58CE}" type="pres">
       <dgm:prSet presAssocID="{C0EDF659-C35B-4EB3-A65D-2CEFAA43999B}" presName="hierChild4" presStyleCnt="0"/>
       <dgm:spPr/>
+      <dgm:t>
+        <a:bodyPr/>
+        <a:lstStyle/>
+        <a:p>
+          <a:endParaRPr lang="es-AR"/>
+        </a:p>
+      </dgm:t>
     </dgm:pt>
     <dgm:pt modelId="{ADAD0B2D-EB01-43C5-BA7F-39B9DDD94586}" type="pres">
       <dgm:prSet presAssocID="{C0EDF659-C35B-4EB3-A65D-2CEFAA43999B}" presName="hierChild5" presStyleCnt="0"/>
       <dgm:spPr/>
+      <dgm:t>
+        <a:bodyPr/>
+        <a:lstStyle/>
+        <a:p>
+          <a:endParaRPr lang="es-AR"/>
+        </a:p>
+      </dgm:t>
     </dgm:pt>
     <dgm:pt modelId="{025B54D6-F427-427E-8DF7-D864235487AD}" type="pres">
       <dgm:prSet presAssocID="{36C0A925-CF92-4A8D-8547-F5135586AA1D}" presName="Name37" presStyleLbl="parChTrans1D2" presStyleIdx="2" presStyleCnt="3"/>
@@ -1578,10 +1681,24 @@
         </dgm:presLayoutVars>
       </dgm:prSet>
       <dgm:spPr/>
+      <dgm:t>
+        <a:bodyPr/>
+        <a:lstStyle/>
+        <a:p>
+          <a:endParaRPr lang="es-AR"/>
+        </a:p>
+      </dgm:t>
     </dgm:pt>
     <dgm:pt modelId="{5300D6CE-4FEB-4304-ADA4-734DC9D238D3}" type="pres">
       <dgm:prSet presAssocID="{CAE025A5-AD7E-47EC-9189-B4F6923CFB39}" presName="rootComposite" presStyleCnt="0"/>
       <dgm:spPr/>
+      <dgm:t>
+        <a:bodyPr/>
+        <a:lstStyle/>
+        <a:p>
+          <a:endParaRPr lang="es-AR"/>
+        </a:p>
+      </dgm:t>
     </dgm:pt>
     <dgm:pt modelId="{2872F071-CCEC-4734-8E72-CEF275144F2A}" type="pres">
       <dgm:prSet presAssocID="{CAE025A5-AD7E-47EC-9189-B4F6923CFB39}" presName="rootText" presStyleLbl="node2" presStyleIdx="2" presStyleCnt="3" custLinFactNeighborX="783" custLinFactNeighborY="11258">
@@ -1612,41 +1729,62 @@
     <dgm:pt modelId="{74F88A2B-CCFD-460B-AD38-F1B8B802CC57}" type="pres">
       <dgm:prSet presAssocID="{CAE025A5-AD7E-47EC-9189-B4F6923CFB39}" presName="hierChild4" presStyleCnt="0"/>
       <dgm:spPr/>
+      <dgm:t>
+        <a:bodyPr/>
+        <a:lstStyle/>
+        <a:p>
+          <a:endParaRPr lang="es-AR"/>
+        </a:p>
+      </dgm:t>
     </dgm:pt>
     <dgm:pt modelId="{4F4270FA-95BF-4232-803B-519195B6F45F}" type="pres">
       <dgm:prSet presAssocID="{CAE025A5-AD7E-47EC-9189-B4F6923CFB39}" presName="hierChild5" presStyleCnt="0"/>
       <dgm:spPr/>
+      <dgm:t>
+        <a:bodyPr/>
+        <a:lstStyle/>
+        <a:p>
+          <a:endParaRPr lang="es-AR"/>
+        </a:p>
+      </dgm:t>
     </dgm:pt>
     <dgm:pt modelId="{C4B5E448-36E9-4FC1-A1D6-DF0F20115C0B}" type="pres">
       <dgm:prSet presAssocID="{F27F8D6F-03A5-429D-BDD0-702BFC21B6F0}" presName="hierChild3" presStyleCnt="0"/>
       <dgm:spPr/>
+      <dgm:t>
+        <a:bodyPr/>
+        <a:lstStyle/>
+        <a:p>
+          <a:endParaRPr lang="es-AR"/>
+        </a:p>
+      </dgm:t>
     </dgm:pt>
   </dgm:ptLst>
   <dgm:cxnLst>
+    <dgm:cxn modelId="{A77E3C6E-5F2F-414C-9520-0D9237D04246}" type="presOf" srcId="{0C5A7F20-7BF1-4D54-8603-B4C57EB9E51E}" destId="{09519A4A-757A-4FD3-B530-30AAEFBECC94}" srcOrd="0" destOrd="0" presId="urn:microsoft.com/office/officeart/2005/8/layout/orgChart1"/>
+    <dgm:cxn modelId="{8922B835-3F81-4578-8943-F5FFBC66CE93}" type="presOf" srcId="{C3818049-3B0A-41F2-A7EE-480ECF181171}" destId="{7DF29361-70E6-4A90-8106-66BD992952A3}" srcOrd="0" destOrd="0" presId="urn:microsoft.com/office/officeart/2005/8/layout/orgChart1"/>
+    <dgm:cxn modelId="{50F1A73B-D6FF-4C56-A307-90292B87962A}" type="presOf" srcId="{C0EDF659-C35B-4EB3-A65D-2CEFAA43999B}" destId="{D70C0BDD-DBCA-4018-8B04-41A27590CEAD}" srcOrd="0" destOrd="0" presId="urn:microsoft.com/office/officeart/2005/8/layout/orgChart1"/>
+    <dgm:cxn modelId="{F40F547F-E985-47E4-852C-13CE91AFC67B}" srcId="{F27F8D6F-03A5-429D-BDD0-702BFC21B6F0}" destId="{69404F52-DC68-4464-8C95-4A4EC5C3D511}" srcOrd="0" destOrd="0" parTransId="{CF7F02CB-0026-4C85-A83C-2611CA0EC12E}" sibTransId="{35B2B94B-D59C-4D2C-AA6B-EC3193330074}"/>
     <dgm:cxn modelId="{9E07DF77-6C35-4821-9DE7-4AE2BB570D24}" type="presOf" srcId="{8782F143-7EBE-4652-BCB6-342F97295F78}" destId="{C999530D-970C-4F19-A91A-981537024566}" srcOrd="0" destOrd="0" presId="urn:microsoft.com/office/officeart/2005/8/layout/orgChart1"/>
-    <dgm:cxn modelId="{B115F0C3-E1DC-458B-B51B-579BC729549E}" type="presOf" srcId="{38912AFE-3D78-4266-8E99-4582EAA11DAA}" destId="{FC06127A-3788-446A-9EF8-244F2B7D169B}" srcOrd="0" destOrd="0" presId="urn:microsoft.com/office/officeart/2005/8/layout/orgChart1"/>
-    <dgm:cxn modelId="{50F1A73B-D6FF-4C56-A307-90292B87962A}" type="presOf" srcId="{C0EDF659-C35B-4EB3-A65D-2CEFAA43999B}" destId="{D70C0BDD-DBCA-4018-8B04-41A27590CEAD}" srcOrd="0" destOrd="0" presId="urn:microsoft.com/office/officeart/2005/8/layout/orgChart1"/>
+    <dgm:cxn modelId="{DABFC9D0-8C39-473E-A1C2-ECB16C3483D9}" srcId="{AB74DD02-BF3F-45B5-8025-7F7CC2B7F0AF}" destId="{8782F143-7EBE-4652-BCB6-342F97295F78}" srcOrd="0" destOrd="0" parTransId="{6CCD5503-01E5-4C86-8EFC-5F017D508467}" sibTransId="{4E4F6724-DE3A-4CE7-9F89-6CC7FEF6FC19}"/>
+    <dgm:cxn modelId="{2FBB91A6-8630-4576-832A-197FF1249D34}" type="presOf" srcId="{69404F52-DC68-4464-8C95-4A4EC5C3D511}" destId="{4972E06E-0D8D-46A7-810C-DCF2E5A67FD3}" srcOrd="1" destOrd="0" presId="urn:microsoft.com/office/officeart/2005/8/layout/orgChart1"/>
+    <dgm:cxn modelId="{956F72A0-5E7A-4BBE-918C-DF48B42F7F88}" srcId="{F27F8D6F-03A5-429D-BDD0-702BFC21B6F0}" destId="{CAE025A5-AD7E-47EC-9189-B4F6923CFB39}" srcOrd="2" destOrd="0" parTransId="{36C0A925-CF92-4A8D-8547-F5135586AA1D}" sibTransId="{3C63452D-48B4-43C0-A4CD-DBFD585BFD18}"/>
     <dgm:cxn modelId="{A633D16F-A4C8-49D0-9518-C450A40641D7}" type="presOf" srcId="{CAE025A5-AD7E-47EC-9189-B4F6923CFB39}" destId="{2872F071-CCEC-4734-8E72-CEF275144F2A}" srcOrd="0" destOrd="0" presId="urn:microsoft.com/office/officeart/2005/8/layout/orgChart1"/>
-    <dgm:cxn modelId="{12BA031F-FF7F-4D8C-A5B8-6868AFAB5D64}" type="presOf" srcId="{CF7F02CB-0026-4C85-A83C-2611CA0EC12E}" destId="{8EBBDB76-DF10-4764-B8B8-496AD4C5615C}" srcOrd="0" destOrd="0" presId="urn:microsoft.com/office/officeart/2005/8/layout/orgChart1"/>
-    <dgm:cxn modelId="{F9299C4E-4D09-4206-A4D3-1862212D3301}" type="presOf" srcId="{C0EDF659-C35B-4EB3-A65D-2CEFAA43999B}" destId="{F572DEBC-670A-44EF-A3E4-3094B1E9B62C}" srcOrd="1" destOrd="0" presId="urn:microsoft.com/office/officeart/2005/8/layout/orgChart1"/>
-    <dgm:cxn modelId="{DABFC9D0-8C39-473E-A1C2-ECB16C3483D9}" srcId="{AB74DD02-BF3F-45B5-8025-7F7CC2B7F0AF}" destId="{8782F143-7EBE-4652-BCB6-342F97295F78}" srcOrd="0" destOrd="0" parTransId="{6CCD5503-01E5-4C86-8EFC-5F017D508467}" sibTransId="{4E4F6724-DE3A-4CE7-9F89-6CC7FEF6FC19}"/>
-    <dgm:cxn modelId="{74172C81-A83A-4C0F-8A14-7400105BA931}" type="presOf" srcId="{AB74DD02-BF3F-45B5-8025-7F7CC2B7F0AF}" destId="{1495ABB2-EE30-4D6B-960C-2AE8B28A3DEE}" srcOrd="1" destOrd="0" presId="urn:microsoft.com/office/officeart/2005/8/layout/orgChart1"/>
-    <dgm:cxn modelId="{AFBFF8F3-B1CC-4B54-A79E-E1B294E0D0BF}" srcId="{F27F8D6F-03A5-429D-BDD0-702BFC21B6F0}" destId="{C0EDF659-C35B-4EB3-A65D-2CEFAA43999B}" srcOrd="1" destOrd="0" parTransId="{38912AFE-3D78-4266-8E99-4582EAA11DAA}" sibTransId="{05C533E2-BAD5-478F-A5EF-73E5B154A010}"/>
-    <dgm:cxn modelId="{76FF6951-B899-4984-97BF-78ABA4449E40}" type="presOf" srcId="{6CCD5503-01E5-4C86-8EFC-5F017D508467}" destId="{7333BF06-7B1A-47D2-83B9-64258DCEE59E}" srcOrd="0" destOrd="0" presId="urn:microsoft.com/office/officeart/2005/8/layout/orgChart1"/>
-    <dgm:cxn modelId="{956F72A0-5E7A-4BBE-918C-DF48B42F7F88}" srcId="{F27F8D6F-03A5-429D-BDD0-702BFC21B6F0}" destId="{CAE025A5-AD7E-47EC-9189-B4F6923CFB39}" srcOrd="2" destOrd="0" parTransId="{36C0A925-CF92-4A8D-8547-F5135586AA1D}" sibTransId="{3C63452D-48B4-43C0-A4CD-DBFD585BFD18}"/>
-    <dgm:cxn modelId="{A77E3C6E-5F2F-414C-9520-0D9237D04246}" type="presOf" srcId="{0C5A7F20-7BF1-4D54-8603-B4C57EB9E51E}" destId="{09519A4A-757A-4FD3-B530-30AAEFBECC94}" srcOrd="0" destOrd="0" presId="urn:microsoft.com/office/officeart/2005/8/layout/orgChart1"/>
-    <dgm:cxn modelId="{7C9266A4-58E6-4781-B381-E3B5BC31D902}" srcId="{69404F52-DC68-4464-8C95-4A4EC5C3D511}" destId="{AB74DD02-BF3F-45B5-8025-7F7CC2B7F0AF}" srcOrd="0" destOrd="0" parTransId="{0C5A7F20-7BF1-4D54-8603-B4C57EB9E51E}" sibTransId="{4DD56927-21C8-4BA9-8A88-EC2F6591D693}"/>
-    <dgm:cxn modelId="{74A7C8EA-52F1-4CBF-961C-62C6C5B9A3FB}" type="presOf" srcId="{F27F8D6F-03A5-429D-BDD0-702BFC21B6F0}" destId="{F21B52D0-B08C-497F-8319-56B5DA6523B6}" srcOrd="0" destOrd="0" presId="urn:microsoft.com/office/officeart/2005/8/layout/orgChart1"/>
     <dgm:cxn modelId="{53CC8146-27BE-4BD7-B9AE-68FE497BE313}" type="presOf" srcId="{CAE025A5-AD7E-47EC-9189-B4F6923CFB39}" destId="{A98355B4-6B0E-4D38-B738-06A1B5352B25}" srcOrd="1" destOrd="0" presId="urn:microsoft.com/office/officeart/2005/8/layout/orgChart1"/>
-    <dgm:cxn modelId="{8922B835-3F81-4578-8943-F5FFBC66CE93}" type="presOf" srcId="{C3818049-3B0A-41F2-A7EE-480ECF181171}" destId="{7DF29361-70E6-4A90-8106-66BD992952A3}" srcOrd="0" destOrd="0" presId="urn:microsoft.com/office/officeart/2005/8/layout/orgChart1"/>
-    <dgm:cxn modelId="{95E2746A-BE37-4489-B043-94B131AC748B}" type="presOf" srcId="{F27F8D6F-03A5-429D-BDD0-702BFC21B6F0}" destId="{96070D5D-19E7-4653-BC65-20D6D6EAE9DE}" srcOrd="1" destOrd="0" presId="urn:microsoft.com/office/officeart/2005/8/layout/orgChart1"/>
-    <dgm:cxn modelId="{2FBB91A6-8630-4576-832A-197FF1249D34}" type="presOf" srcId="{69404F52-DC68-4464-8C95-4A4EC5C3D511}" destId="{4972E06E-0D8D-46A7-810C-DCF2E5A67FD3}" srcOrd="1" destOrd="0" presId="urn:microsoft.com/office/officeart/2005/8/layout/orgChart1"/>
+    <dgm:cxn modelId="{494E18AC-0DF3-4E11-984A-C3757D6E03CF}" type="presOf" srcId="{8782F143-7EBE-4652-BCB6-342F97295F78}" destId="{15615975-D7C1-4DD7-92D8-7DA4D4FB6EB9}" srcOrd="1" destOrd="0" presId="urn:microsoft.com/office/officeart/2005/8/layout/orgChart1"/>
     <dgm:cxn modelId="{001EA8ED-4AF4-43DC-B851-53863A910DCE}" type="presOf" srcId="{36C0A925-CF92-4A8D-8547-F5135586AA1D}" destId="{025B54D6-F427-427E-8DF7-D864235487AD}" srcOrd="0" destOrd="0" presId="urn:microsoft.com/office/officeart/2005/8/layout/orgChart1"/>
     <dgm:cxn modelId="{D01CEB95-7818-4453-83F3-BCE47E725498}" srcId="{C3818049-3B0A-41F2-A7EE-480ECF181171}" destId="{F27F8D6F-03A5-429D-BDD0-702BFC21B6F0}" srcOrd="0" destOrd="0" parTransId="{56E089E7-06E2-47BB-AEAB-E6273550B405}" sibTransId="{B7D05675-1749-4578-B10C-6368DD663956}"/>
-    <dgm:cxn modelId="{F40F547F-E985-47E4-852C-13CE91AFC67B}" srcId="{F27F8D6F-03A5-429D-BDD0-702BFC21B6F0}" destId="{69404F52-DC68-4464-8C95-4A4EC5C3D511}" srcOrd="0" destOrd="0" parTransId="{CF7F02CB-0026-4C85-A83C-2611CA0EC12E}" sibTransId="{35B2B94B-D59C-4D2C-AA6B-EC3193330074}"/>
+    <dgm:cxn modelId="{AFBFF8F3-B1CC-4B54-A79E-E1B294E0D0BF}" srcId="{F27F8D6F-03A5-429D-BDD0-702BFC21B6F0}" destId="{C0EDF659-C35B-4EB3-A65D-2CEFAA43999B}" srcOrd="1" destOrd="0" parTransId="{38912AFE-3D78-4266-8E99-4582EAA11DAA}" sibTransId="{05C533E2-BAD5-478F-A5EF-73E5B154A010}"/>
+    <dgm:cxn modelId="{95E2746A-BE37-4489-B043-94B131AC748B}" type="presOf" srcId="{F27F8D6F-03A5-429D-BDD0-702BFC21B6F0}" destId="{96070D5D-19E7-4653-BC65-20D6D6EAE9DE}" srcOrd="1" destOrd="0" presId="urn:microsoft.com/office/officeart/2005/8/layout/orgChart1"/>
+    <dgm:cxn modelId="{331928DD-BFB5-46BB-A3C0-FCB62A6D8CAA}" type="presOf" srcId="{AB74DD02-BF3F-45B5-8025-7F7CC2B7F0AF}" destId="{76382964-F0B9-4801-AD29-234D5C4EB29C}" srcOrd="0" destOrd="0" presId="urn:microsoft.com/office/officeart/2005/8/layout/orgChart1"/>
+    <dgm:cxn modelId="{76FF6951-B899-4984-97BF-78ABA4449E40}" type="presOf" srcId="{6CCD5503-01E5-4C86-8EFC-5F017D508467}" destId="{7333BF06-7B1A-47D2-83B9-64258DCEE59E}" srcOrd="0" destOrd="0" presId="urn:microsoft.com/office/officeart/2005/8/layout/orgChart1"/>
+    <dgm:cxn modelId="{74A7C8EA-52F1-4CBF-961C-62C6C5B9A3FB}" type="presOf" srcId="{F27F8D6F-03A5-429D-BDD0-702BFC21B6F0}" destId="{F21B52D0-B08C-497F-8319-56B5DA6523B6}" srcOrd="0" destOrd="0" presId="urn:microsoft.com/office/officeart/2005/8/layout/orgChart1"/>
+    <dgm:cxn modelId="{F9299C4E-4D09-4206-A4D3-1862212D3301}" type="presOf" srcId="{C0EDF659-C35B-4EB3-A65D-2CEFAA43999B}" destId="{F572DEBC-670A-44EF-A3E4-3094B1E9B62C}" srcOrd="1" destOrd="0" presId="urn:microsoft.com/office/officeart/2005/8/layout/orgChart1"/>
+    <dgm:cxn modelId="{74172C81-A83A-4C0F-8A14-7400105BA931}" type="presOf" srcId="{AB74DD02-BF3F-45B5-8025-7F7CC2B7F0AF}" destId="{1495ABB2-EE30-4D6B-960C-2AE8B28A3DEE}" srcOrd="1" destOrd="0" presId="urn:microsoft.com/office/officeart/2005/8/layout/orgChart1"/>
+    <dgm:cxn modelId="{B115F0C3-E1DC-458B-B51B-579BC729549E}" type="presOf" srcId="{38912AFE-3D78-4266-8E99-4582EAA11DAA}" destId="{FC06127A-3788-446A-9EF8-244F2B7D169B}" srcOrd="0" destOrd="0" presId="urn:microsoft.com/office/officeart/2005/8/layout/orgChart1"/>
+    <dgm:cxn modelId="{7C9266A4-58E6-4781-B381-E3B5BC31D902}" srcId="{69404F52-DC68-4464-8C95-4A4EC5C3D511}" destId="{AB74DD02-BF3F-45B5-8025-7F7CC2B7F0AF}" srcOrd="0" destOrd="0" parTransId="{0C5A7F20-7BF1-4D54-8603-B4C57EB9E51E}" sibTransId="{4DD56927-21C8-4BA9-8A88-EC2F6591D693}"/>
+    <dgm:cxn modelId="{12BA031F-FF7F-4D8C-A5B8-6868AFAB5D64}" type="presOf" srcId="{CF7F02CB-0026-4C85-A83C-2611CA0EC12E}" destId="{8EBBDB76-DF10-4764-B8B8-496AD4C5615C}" srcOrd="0" destOrd="0" presId="urn:microsoft.com/office/officeart/2005/8/layout/orgChart1"/>
     <dgm:cxn modelId="{A8905A9F-8981-4BCD-A582-4F4C0DD6068C}" type="presOf" srcId="{69404F52-DC68-4464-8C95-4A4EC5C3D511}" destId="{EF27B91A-A527-4B5D-8953-3DEFA4CD70BE}" srcOrd="0" destOrd="0" presId="urn:microsoft.com/office/officeart/2005/8/layout/orgChart1"/>
-    <dgm:cxn modelId="{331928DD-BFB5-46BB-A3C0-FCB62A6D8CAA}" type="presOf" srcId="{AB74DD02-BF3F-45B5-8025-7F7CC2B7F0AF}" destId="{76382964-F0B9-4801-AD29-234D5C4EB29C}" srcOrd="0" destOrd="0" presId="urn:microsoft.com/office/officeart/2005/8/layout/orgChart1"/>
-    <dgm:cxn modelId="{494E18AC-0DF3-4E11-984A-C3757D6E03CF}" type="presOf" srcId="{8782F143-7EBE-4652-BCB6-342F97295F78}" destId="{15615975-D7C1-4DD7-92D8-7DA4D4FB6EB9}" srcOrd="1" destOrd="0" presId="urn:microsoft.com/office/officeart/2005/8/layout/orgChart1"/>
     <dgm:cxn modelId="{C58BDBD0-5A03-4216-8E13-AD60799CD80E}" type="presParOf" srcId="{7DF29361-70E6-4A90-8106-66BD992952A3}" destId="{092F7640-4E97-435E-A273-04AB9B209B41}" srcOrd="0" destOrd="0" presId="urn:microsoft.com/office/officeart/2005/8/layout/orgChart1"/>
     <dgm:cxn modelId="{C86AC3D0-236B-4146-ADD7-108FD5805AFC}" type="presParOf" srcId="{092F7640-4E97-435E-A273-04AB9B209B41}" destId="{1F67BD07-D585-4BD6-88EA-D8E5F5FF308F}" srcOrd="0" destOrd="0" presId="urn:microsoft.com/office/officeart/2005/8/layout/orgChart1"/>
     <dgm:cxn modelId="{56CEF3C8-E3EB-412A-B81D-88A08857D347}" type="presParOf" srcId="{1F67BD07-D585-4BD6-88EA-D8E5F5FF308F}" destId="{F21B52D0-B08C-497F-8319-56B5DA6523B6}" srcOrd="0" destOrd="0" presId="urn:microsoft.com/office/officeart/2005/8/layout/orgChart1"/>
@@ -1689,11 +1827,23 @@
     <dgm:cxn modelId="{F9A0B7C9-77D8-4111-944B-F1E693CAE1E1}" type="presParOf" srcId="{C7A4CB24-34AC-416C-93FA-66FA04B4DCA8}" destId="{4F4270FA-95BF-4232-803B-519195B6F45F}" srcOrd="2" destOrd="0" presId="urn:microsoft.com/office/officeart/2005/8/layout/orgChart1"/>
     <dgm:cxn modelId="{402DC299-8CA2-4F44-B180-78A3FB4B9CB6}" type="presParOf" srcId="{092F7640-4E97-435E-A273-04AB9B209B41}" destId="{C4B5E448-36E9-4FC1-A1D6-DF0F20115C0B}" srcOrd="2" destOrd="0" presId="urn:microsoft.com/office/officeart/2005/8/layout/orgChart1"/>
   </dgm:cxnLst>
-  <dgm:bg/>
-  <dgm:whole/>
+  <dgm:bg>
+    <a:effectLst>
+      <a:outerShdw blurRad="50800" dist="38100" dir="13500000" algn="br" rotWithShape="0">
+        <a:prstClr val="black">
+          <a:alpha val="40000"/>
+        </a:prstClr>
+      </a:outerShdw>
+    </a:effectLst>
+  </dgm:bg>
+  <dgm:whole>
+    <a:ln cmpd="sng">
+      <a:prstDash val="solid"/>
+    </a:ln>
+  </dgm:whole>
   <dgm:extLst>
     <a:ext uri="http://schemas.microsoft.com/office/drawing/2008/diagram">
-      <dsp:dataModelExt xmlns:dsp="http://schemas.microsoft.com/office/drawing/2008/diagram" relId="rId6" minVer="http://schemas.openxmlformats.org/drawingml/2006/diagram"/>
+      <dsp:dataModelExt xmlns:dsp="http://schemas.microsoft.com/office/drawing/2008/diagram" xmlns="" relId="rId6" minVer="http://schemas.openxmlformats.org/drawingml/2006/diagram"/>
     </a:ext>
   </dgm:extLst>
 </dgm:dataModel>
@@ -3697,11 +3847,11 @@
 </file>
 
 <file path=ppt/diagrams/quickStyle1.xml><?xml version="1.0" encoding="utf-8"?>
-<dgm:styleDef xmlns:dgm="http://schemas.openxmlformats.org/drawingml/2006/diagram" xmlns:a="http://schemas.openxmlformats.org/drawingml/2006/main" uniqueId="urn:microsoft.com/office/officeart/2005/8/quickstyle/simple3">
+<dgm:styleDef xmlns:dgm="http://schemas.openxmlformats.org/drawingml/2006/diagram" xmlns:a="http://schemas.openxmlformats.org/drawingml/2006/main" uniqueId="urn:microsoft.com/office/officeart/2005/8/quickstyle/simple4">
   <dgm:title val=""/>
   <dgm:desc val=""/>
   <dgm:catLst>
-    <dgm:cat type="simple" pri="10300"/>
+    <dgm:cat type="simple" pri="10400"/>
   </dgm:catLst>
   <dgm:scene3d>
     <a:camera prst="orthographicFront"/>
@@ -3710,65 +3860,59 @@
   <dgm:styleLbl name="node0">
     <dgm:scene3d>
       <a:camera prst="orthographicFront"/>
-      <a:lightRig rig="flat" dir="t"/>
+      <a:lightRig rig="threePt" dir="t"/>
     </dgm:scene3d>
-    <dgm:sp3d prstMaterial="dkEdge">
-      <a:bevelT w="8200" h="38100"/>
-    </dgm:sp3d>
+    <dgm:sp3d/>
     <dgm:txPr/>
     <dgm:style>
       <a:lnRef idx="0">
         <a:scrgbClr r="0" g="0" b="0"/>
       </a:lnRef>
-      <a:fillRef idx="2">
+      <a:fillRef idx="3">
         <a:scrgbClr r="0" g="0" b="0"/>
       </a:fillRef>
-      <a:effectRef idx="1">
+      <a:effectRef idx="2">
         <a:scrgbClr r="0" g="0" b="0"/>
       </a:effectRef>
       <a:fontRef idx="minor">
-        <a:schemeClr val="dk1"/>
+        <a:schemeClr val="lt1"/>
       </a:fontRef>
     </dgm:style>
   </dgm:styleLbl>
   <dgm:styleLbl name="lnNode1">
     <dgm:scene3d>
       <a:camera prst="orthographicFront"/>
-      <a:lightRig rig="flat" dir="t"/>
+      <a:lightRig rig="threePt" dir="t"/>
     </dgm:scene3d>
-    <dgm:sp3d prstMaterial="dkEdge">
-      <a:bevelT w="8200" h="38100"/>
-    </dgm:sp3d>
+    <dgm:sp3d/>
     <dgm:txPr/>
     <dgm:style>
       <a:lnRef idx="1">
         <a:scrgbClr r="0" g="0" b="0"/>
       </a:lnRef>
-      <a:fillRef idx="2">
+      <a:fillRef idx="3">
         <a:scrgbClr r="0" g="0" b="0"/>
       </a:fillRef>
-      <a:effectRef idx="0">
+      <a:effectRef idx="2">
         <a:scrgbClr r="0" g="0" b="0"/>
       </a:effectRef>
       <a:fontRef idx="minor">
-        <a:schemeClr val="dk1"/>
+        <a:schemeClr val="lt1"/>
       </a:fontRef>
     </dgm:style>
   </dgm:styleLbl>
   <dgm:styleLbl name="vennNode1">
     <dgm:scene3d>
       <a:camera prst="orthographicFront"/>
-      <a:lightRig rig="flat" dir="t"/>
+      <a:lightRig rig="threePt" dir="t"/>
     </dgm:scene3d>
-    <dgm:sp3d prstMaterial="dkEdge">
-      <a:bevelT w="8200" h="38100"/>
-    </dgm:sp3d>
+    <dgm:sp3d/>
     <dgm:txPr/>
     <dgm:style>
       <a:lnRef idx="0">
         <a:scrgbClr r="0" g="0" b="0"/>
       </a:lnRef>
-      <a:fillRef idx="2">
+      <a:fillRef idx="3">
         <a:scrgbClr r="0" g="0" b="0"/>
       </a:fillRef>
       <a:effectRef idx="0">
@@ -3790,110 +3934,102 @@
       <a:lnRef idx="1">
         <a:scrgbClr r="0" g="0" b="0"/>
       </a:lnRef>
-      <a:fillRef idx="2">
+      <a:fillRef idx="3">
         <a:scrgbClr r="0" g="0" b="0"/>
       </a:fillRef>
-      <a:effectRef idx="1">
+      <a:effectRef idx="2">
         <a:scrgbClr r="0" g="0" b="0"/>
       </a:effectRef>
       <a:fontRef idx="minor">
-        <a:schemeClr val="dk1"/>
+        <a:schemeClr val="lt1"/>
       </a:fontRef>
     </dgm:style>
   </dgm:styleLbl>
   <dgm:styleLbl name="node1">
     <dgm:scene3d>
       <a:camera prst="orthographicFront"/>
-      <a:lightRig rig="flat" dir="t"/>
+      <a:lightRig rig="threePt" dir="t"/>
     </dgm:scene3d>
-    <dgm:sp3d prstMaterial="dkEdge">
-      <a:bevelT w="8200" h="38100"/>
-    </dgm:sp3d>
+    <dgm:sp3d/>
     <dgm:txPr/>
     <dgm:style>
       <a:lnRef idx="0">
         <a:scrgbClr r="0" g="0" b="0"/>
       </a:lnRef>
-      <a:fillRef idx="2">
+      <a:fillRef idx="3">
         <a:scrgbClr r="0" g="0" b="0"/>
       </a:fillRef>
-      <a:effectRef idx="1">
+      <a:effectRef idx="2">
         <a:scrgbClr r="0" g="0" b="0"/>
       </a:effectRef>
       <a:fontRef idx="minor">
-        <a:schemeClr val="dk1"/>
+        <a:schemeClr val="lt1"/>
       </a:fontRef>
     </dgm:style>
   </dgm:styleLbl>
   <dgm:styleLbl name="node2">
     <dgm:scene3d>
       <a:camera prst="orthographicFront"/>
-      <a:lightRig rig="flat" dir="t"/>
+      <a:lightRig rig="threePt" dir="t"/>
     </dgm:scene3d>
-    <dgm:sp3d prstMaterial="dkEdge">
-      <a:bevelT w="8200" h="38100"/>
-    </dgm:sp3d>
+    <dgm:sp3d/>
     <dgm:txPr/>
     <dgm:style>
       <a:lnRef idx="0">
         <a:scrgbClr r="0" g="0" b="0"/>
       </a:lnRef>
-      <a:fillRef idx="2">
+      <a:fillRef idx="3">
         <a:scrgbClr r="0" g="0" b="0"/>
       </a:fillRef>
-      <a:effectRef idx="1">
+      <a:effectRef idx="2">
         <a:scrgbClr r="0" g="0" b="0"/>
       </a:effectRef>
       <a:fontRef idx="minor">
-        <a:schemeClr val="dk1"/>
+        <a:schemeClr val="lt1"/>
       </a:fontRef>
     </dgm:style>
   </dgm:styleLbl>
   <dgm:styleLbl name="node3">
     <dgm:scene3d>
       <a:camera prst="orthographicFront"/>
-      <a:lightRig rig="flat" dir="t"/>
+      <a:lightRig rig="threePt" dir="t"/>
     </dgm:scene3d>
-    <dgm:sp3d prstMaterial="dkEdge">
-      <a:bevelT w="8200" h="38100"/>
-    </dgm:sp3d>
+    <dgm:sp3d/>
     <dgm:txPr/>
     <dgm:style>
       <a:lnRef idx="0">
         <a:scrgbClr r="0" g="0" b="0"/>
       </a:lnRef>
-      <a:fillRef idx="2">
+      <a:fillRef idx="3">
         <a:scrgbClr r="0" g="0" b="0"/>
       </a:fillRef>
-      <a:effectRef idx="1">
+      <a:effectRef idx="2">
         <a:scrgbClr r="0" g="0" b="0"/>
       </a:effectRef>
       <a:fontRef idx="minor">
-        <a:schemeClr val="dk1"/>
+        <a:schemeClr val="lt1"/>
       </a:fontRef>
     </dgm:style>
   </dgm:styleLbl>
   <dgm:styleLbl name="node4">
     <dgm:scene3d>
       <a:camera prst="orthographicFront"/>
-      <a:lightRig rig="flat" dir="t"/>
+      <a:lightRig rig="threePt" dir="t"/>
     </dgm:scene3d>
-    <dgm:sp3d prstMaterial="dkEdge">
-      <a:bevelT w="8200" h="38100"/>
-    </dgm:sp3d>
+    <dgm:sp3d/>
     <dgm:txPr/>
     <dgm:style>
       <a:lnRef idx="0">
         <a:scrgbClr r="0" g="0" b="0"/>
       </a:lnRef>
-      <a:fillRef idx="2">
+      <a:fillRef idx="3">
         <a:scrgbClr r="0" g="0" b="0"/>
       </a:fillRef>
-      <a:effectRef idx="1">
+      <a:effectRef idx="2">
         <a:scrgbClr r="0" g="0" b="0"/>
       </a:effectRef>
       <a:fontRef idx="minor">
-        <a:schemeClr val="dk1"/>
+        <a:schemeClr val="lt1"/>
       </a:fontRef>
     </dgm:style>
   </dgm:styleLbl>
@@ -3905,13 +4041,13 @@
     <dgm:sp3d/>
     <dgm:txPr/>
     <dgm:style>
-      <a:lnRef idx="1">
+      <a:lnRef idx="0">
         <a:scrgbClr r="0" g="0" b="0"/>
       </a:lnRef>
       <a:fillRef idx="1">
         <a:scrgbClr r="0" g="0" b="0"/>
       </a:fillRef>
-      <a:effectRef idx="1">
+      <a:effectRef idx="2">
         <a:scrgbClr r="0" g="0" b="0"/>
       </a:effectRef>
       <a:fontRef idx="minor"/>
@@ -3925,13 +4061,13 @@
     <dgm:sp3d/>
     <dgm:txPr/>
     <dgm:style>
-      <a:lnRef idx="1">
+      <a:lnRef idx="0">
         <a:scrgbClr r="0" g="0" b="0"/>
       </a:lnRef>
       <a:fillRef idx="1">
         <a:scrgbClr r="0" g="0" b="0"/>
       </a:fillRef>
-      <a:effectRef idx="1">
+      <a:effectRef idx="2">
         <a:scrgbClr r="0" g="0" b="0"/>
       </a:effectRef>
       <a:fontRef idx="minor"/>
@@ -3945,13 +4081,13 @@
     <dgm:sp3d/>
     <dgm:txPr/>
     <dgm:style>
-      <a:lnRef idx="1">
+      <a:lnRef idx="0">
         <a:scrgbClr r="0" g="0" b="0"/>
       </a:lnRef>
       <a:fillRef idx="1">
         <a:scrgbClr r="0" g="0" b="0"/>
       </a:fillRef>
-      <a:effectRef idx="1">
+      <a:effectRef idx="2">
         <a:scrgbClr r="0" g="0" b="0"/>
       </a:effectRef>
       <a:fontRef idx="minor"/>
@@ -3968,14 +4104,14 @@
       <a:lnRef idx="0">
         <a:scrgbClr r="0" g="0" b="0"/>
       </a:lnRef>
-      <a:fillRef idx="2">
+      <a:fillRef idx="3">
         <a:scrgbClr r="0" g="0" b="0"/>
       </a:fillRef>
-      <a:effectRef idx="1">
+      <a:effectRef idx="2">
         <a:scrgbClr r="0" g="0" b="0"/>
       </a:effectRef>
       <a:fontRef idx="minor">
-        <a:schemeClr val="dk1"/>
+        <a:schemeClr val="lt1"/>
       </a:fontRef>
     </dgm:style>
   </dgm:styleLbl>
@@ -3990,14 +4126,14 @@
       <a:lnRef idx="0">
         <a:scrgbClr r="0" g="0" b="0"/>
       </a:lnRef>
-      <a:fillRef idx="2">
+      <a:fillRef idx="3">
         <a:scrgbClr r="0" g="0" b="0"/>
       </a:fillRef>
-      <a:effectRef idx="1">
+      <a:effectRef idx="2">
         <a:scrgbClr r="0" g="0" b="0"/>
       </a:effectRef>
       <a:fontRef idx="minor">
-        <a:schemeClr val="dk1"/>
+        <a:schemeClr val="lt1"/>
       </a:fontRef>
     </dgm:style>
   </dgm:styleLbl>
@@ -4012,14 +4148,14 @@
       <a:lnRef idx="0">
         <a:scrgbClr r="0" g="0" b="0"/>
       </a:lnRef>
-      <a:fillRef idx="2">
+      <a:fillRef idx="3">
         <a:scrgbClr r="0" g="0" b="0"/>
       </a:fillRef>
-      <a:effectRef idx="1">
+      <a:effectRef idx="2">
         <a:scrgbClr r="0" g="0" b="0"/>
       </a:effectRef>
       <a:fontRef idx="minor">
-        <a:schemeClr val="dk1"/>
+        <a:schemeClr val="lt1"/>
       </a:fontRef>
     </dgm:style>
   </dgm:styleLbl>
@@ -4051,10 +4187,10 @@
     <dgm:sp3d/>
     <dgm:txPr/>
     <dgm:style>
-      <a:lnRef idx="1">
+      <a:lnRef idx="2">
         <a:scrgbClr r="0" g="0" b="0"/>
       </a:lnRef>
-      <a:fillRef idx="2">
+      <a:fillRef idx="1">
         <a:scrgbClr r="0" g="0" b="0"/>
       </a:fillRef>
       <a:effectRef idx="1">
@@ -4066,120 +4202,110 @@
   <dgm:styleLbl name="asst0">
     <dgm:scene3d>
       <a:camera prst="orthographicFront"/>
-      <a:lightRig rig="flat" dir="t"/>
+      <a:lightRig rig="threePt" dir="t"/>
     </dgm:scene3d>
-    <dgm:sp3d prstMaterial="dkEdge">
-      <a:bevelT w="8200" h="38100"/>
-    </dgm:sp3d>
+    <dgm:sp3d/>
     <dgm:txPr/>
     <dgm:style>
       <a:lnRef idx="0">
         <a:scrgbClr r="0" g="0" b="0"/>
       </a:lnRef>
-      <a:fillRef idx="2">
+      <a:fillRef idx="3">
         <a:scrgbClr r="0" g="0" b="0"/>
       </a:fillRef>
-      <a:effectRef idx="1">
+      <a:effectRef idx="2">
         <a:scrgbClr r="0" g="0" b="0"/>
       </a:effectRef>
       <a:fontRef idx="minor">
-        <a:schemeClr val="dk1"/>
+        <a:schemeClr val="lt1"/>
       </a:fontRef>
     </dgm:style>
   </dgm:styleLbl>
   <dgm:styleLbl name="asst1">
     <dgm:scene3d>
       <a:camera prst="orthographicFront"/>
-      <a:lightRig rig="flat" dir="t"/>
+      <a:lightRig rig="threePt" dir="t"/>
     </dgm:scene3d>
-    <dgm:sp3d prstMaterial="dkEdge">
-      <a:bevelT w="8200" h="38100"/>
-    </dgm:sp3d>
+    <dgm:sp3d/>
     <dgm:txPr/>
     <dgm:style>
       <a:lnRef idx="0">
         <a:scrgbClr r="0" g="0" b="0"/>
       </a:lnRef>
-      <a:fillRef idx="2">
+      <a:fillRef idx="3">
         <a:scrgbClr r="0" g="0" b="0"/>
       </a:fillRef>
-      <a:effectRef idx="1">
+      <a:effectRef idx="2">
         <a:scrgbClr r="0" g="0" b="0"/>
       </a:effectRef>
       <a:fontRef idx="minor">
-        <a:schemeClr val="dk1"/>
+        <a:schemeClr val="lt1"/>
       </a:fontRef>
     </dgm:style>
   </dgm:styleLbl>
   <dgm:styleLbl name="asst2">
     <dgm:scene3d>
       <a:camera prst="orthographicFront"/>
-      <a:lightRig rig="flat" dir="t"/>
+      <a:lightRig rig="threePt" dir="t"/>
     </dgm:scene3d>
-    <dgm:sp3d prstMaterial="dkEdge">
-      <a:bevelT w="8200" h="38100"/>
-    </dgm:sp3d>
+    <dgm:sp3d/>
     <dgm:txPr/>
     <dgm:style>
       <a:lnRef idx="0">
         <a:scrgbClr r="0" g="0" b="0"/>
       </a:lnRef>
-      <a:fillRef idx="2">
+      <a:fillRef idx="3">
         <a:scrgbClr r="0" g="0" b="0"/>
       </a:fillRef>
-      <a:effectRef idx="1">
+      <a:effectRef idx="2">
         <a:scrgbClr r="0" g="0" b="0"/>
       </a:effectRef>
       <a:fontRef idx="minor">
-        <a:schemeClr val="dk1"/>
+        <a:schemeClr val="lt1"/>
       </a:fontRef>
     </dgm:style>
   </dgm:styleLbl>
   <dgm:styleLbl name="asst3">
     <dgm:scene3d>
       <a:camera prst="orthographicFront"/>
-      <a:lightRig rig="flat" dir="t"/>
+      <a:lightRig rig="threePt" dir="t"/>
     </dgm:scene3d>
-    <dgm:sp3d prstMaterial="dkEdge">
-      <a:bevelT w="8200" h="38100"/>
-    </dgm:sp3d>
+    <dgm:sp3d/>
     <dgm:txPr/>
     <dgm:style>
       <a:lnRef idx="0">
         <a:scrgbClr r="0" g="0" b="0"/>
       </a:lnRef>
-      <a:fillRef idx="2">
+      <a:fillRef idx="3">
         <a:scrgbClr r="0" g="0" b="0"/>
       </a:fillRef>
-      <a:effectRef idx="1">
+      <a:effectRef idx="2">
         <a:scrgbClr r="0" g="0" b="0"/>
       </a:effectRef>
       <a:fontRef idx="minor">
-        <a:schemeClr val="dk1"/>
+        <a:schemeClr val="lt1"/>
       </a:fontRef>
     </dgm:style>
   </dgm:styleLbl>
   <dgm:styleLbl name="asst4">
     <dgm:scene3d>
       <a:camera prst="orthographicFront"/>
-      <a:lightRig rig="flat" dir="t"/>
+      <a:lightRig rig="threePt" dir="t"/>
     </dgm:scene3d>
-    <dgm:sp3d prstMaterial="dkEdge">
-      <a:bevelT w="8200" h="38100"/>
-    </dgm:sp3d>
+    <dgm:sp3d/>
     <dgm:txPr/>
     <dgm:style>
       <a:lnRef idx="0">
         <a:scrgbClr r="0" g="0" b="0"/>
       </a:lnRef>
-      <a:fillRef idx="2">
+      <a:fillRef idx="3">
         <a:scrgbClr r="0" g="0" b="0"/>
       </a:fillRef>
-      <a:effectRef idx="1">
+      <a:effectRef idx="2">
         <a:scrgbClr r="0" g="0" b="0"/>
       </a:effectRef>
       <a:fontRef idx="minor">
-        <a:schemeClr val="dk1"/>
+        <a:schemeClr val="lt1"/>
       </a:fontRef>
     </dgm:style>
   </dgm:styleLbl>
@@ -4191,17 +4317,17 @@
     <dgm:sp3d/>
     <dgm:txPr/>
     <dgm:style>
-      <a:lnRef idx="1">
+      <a:lnRef idx="0">
         <a:scrgbClr r="0" g="0" b="0"/>
       </a:lnRef>
-      <a:fillRef idx="2">
+      <a:fillRef idx="3">
         <a:scrgbClr r="0" g="0" b="0"/>
       </a:fillRef>
-      <a:effectRef idx="1">
+      <a:effectRef idx="2">
         <a:scrgbClr r="0" g="0" b="0"/>
       </a:effectRef>
       <a:fontRef idx="minor">
-        <a:schemeClr val="dk1"/>
+        <a:schemeClr val="lt1"/>
       </a:fontRef>
     </dgm:style>
   </dgm:styleLbl>
@@ -4213,17 +4339,17 @@
     <dgm:sp3d/>
     <dgm:txPr/>
     <dgm:style>
-      <a:lnRef idx="1">
+      <a:lnRef idx="0">
         <a:scrgbClr r="0" g="0" b="0"/>
       </a:lnRef>
-      <a:fillRef idx="2">
+      <a:fillRef idx="3">
         <a:scrgbClr r="0" g="0" b="0"/>
       </a:fillRef>
-      <a:effectRef idx="1">
+      <a:effectRef idx="2">
         <a:scrgbClr r="0" g="0" b="0"/>
       </a:effectRef>
       <a:fontRef idx="minor">
-        <a:schemeClr val="dk1"/>
+        <a:schemeClr val="lt1"/>
       </a:fontRef>
     </dgm:style>
   </dgm:styleLbl>
@@ -4238,14 +4364,14 @@
       <a:lnRef idx="1">
         <a:scrgbClr r="0" g="0" b="0"/>
       </a:lnRef>
-      <a:fillRef idx="2">
+      <a:fillRef idx="3">
         <a:scrgbClr r="0" g="0" b="0"/>
       </a:fillRef>
-      <a:effectRef idx="1">
+      <a:effectRef idx="2">
         <a:scrgbClr r="0" g="0" b="0"/>
       </a:effectRef>
       <a:fontRef idx="minor">
-        <a:schemeClr val="dk1"/>
+        <a:schemeClr val="lt1"/>
       </a:fontRef>
     </dgm:style>
   </dgm:styleLbl>
@@ -4260,14 +4386,14 @@
       <a:lnRef idx="1">
         <a:scrgbClr r="0" g="0" b="0"/>
       </a:lnRef>
-      <a:fillRef idx="2">
+      <a:fillRef idx="3">
         <a:scrgbClr r="0" g="0" b="0"/>
       </a:fillRef>
-      <a:effectRef idx="1">
+      <a:effectRef idx="2">
         <a:scrgbClr r="0" g="0" b="0"/>
       </a:effectRef>
       <a:fontRef idx="minor">
-        <a:schemeClr val="dk1"/>
+        <a:schemeClr val="lt1"/>
       </a:fontRef>
     </dgm:style>
   </dgm:styleLbl>
@@ -4279,7 +4405,7 @@
     <dgm:sp3d/>
     <dgm:txPr/>
     <dgm:style>
-      <a:lnRef idx="2">
+      <a:lnRef idx="1">
         <a:scrgbClr r="0" g="0" b="0"/>
       </a:lnRef>
       <a:fillRef idx="0">
@@ -4299,7 +4425,7 @@
     <dgm:sp3d/>
     <dgm:txPr/>
     <dgm:style>
-      <a:lnRef idx="2">
+      <a:lnRef idx="1">
         <a:scrgbClr r="0" g="0" b="0"/>
       </a:lnRef>
       <a:fillRef idx="0">
@@ -4319,7 +4445,7 @@
     <dgm:sp3d/>
     <dgm:txPr/>
     <dgm:style>
-      <a:lnRef idx="2">
+      <a:lnRef idx="1">
         <a:scrgbClr r="0" g="0" b="0"/>
       </a:lnRef>
       <a:fillRef idx="0">
@@ -4339,7 +4465,7 @@
     <dgm:sp3d/>
     <dgm:txPr/>
     <dgm:style>
-      <a:lnRef idx="2">
+      <a:lnRef idx="1">
         <a:scrgbClr r="0" g="0" b="0"/>
       </a:lnRef>
       <a:fillRef idx="0">
@@ -4462,7 +4588,7 @@
       <a:lnRef idx="1">
         <a:scrgbClr r="0" g="0" b="0"/>
       </a:lnRef>
-      <a:fillRef idx="2">
+      <a:fillRef idx="1">
         <a:scrgbClr r="0" g="0" b="0"/>
       </a:fillRef>
       <a:effectRef idx="0">
@@ -4665,7 +4791,7 @@
       <a:fillRef idx="1">
         <a:scrgbClr r="0" g="0" b="0"/>
       </a:fillRef>
-      <a:effectRef idx="1">
+      <a:effectRef idx="2">
         <a:scrgbClr r="0" g="0" b="0"/>
       </a:effectRef>
       <a:fontRef idx="minor"/>
@@ -4685,7 +4811,7 @@
       <a:fillRef idx="1">
         <a:scrgbClr r="0" g="0" b="0"/>
       </a:fillRef>
-      <a:effectRef idx="1">
+      <a:effectRef idx="2">
         <a:scrgbClr r="0" g="0" b="0"/>
       </a:effectRef>
       <a:fontRef idx="minor"/>
@@ -4714,20 +4840,18 @@
   <dgm:styleLbl name="fgShp">
     <dgm:scene3d>
       <a:camera prst="orthographicFront"/>
-      <a:lightRig rig="flat" dir="t"/>
+      <a:lightRig rig="threePt" dir="t"/>
     </dgm:scene3d>
-    <dgm:sp3d prstMaterial="dkEdge">
-      <a:bevelT w="8200" h="38100"/>
-    </dgm:sp3d>
+    <dgm:sp3d/>
     <dgm:txPr/>
     <dgm:style>
-      <a:lnRef idx="1">
+      <a:lnRef idx="0">
         <a:scrgbClr r="0" g="0" b="0"/>
       </a:lnRef>
-      <a:fillRef idx="2">
+      <a:fillRef idx="3">
         <a:scrgbClr r="0" g="0" b="0"/>
       </a:fillRef>
-      <a:effectRef idx="1">
+      <a:effectRef idx="2">
         <a:scrgbClr r="0" g="0" b="0"/>
       </a:effectRef>
       <a:fontRef idx="minor"/>
@@ -7513,7 +7637,8 @@
           <a:p>
             <a:fld id="{46F4E5E0-CC8A-4447-8D98-8F21A5814697}" type="datetimeFigureOut">
               <a:rPr lang="en-US" smtClean="0"/>
-              <a:t>5/12/2012</a:t>
+              <a:pPr/>
+              <a:t>5/14/2012</a:t>
             </a:fld>
             <a:endParaRPr lang="en-US"/>
           </a:p>
@@ -7629,7 +7754,8 @@
           <a:p>
             <a:fld id="{DCCC8732-F178-4423-B0C1-D52A699E8877}" type="slidenum">
               <a:rPr lang="en-US" smtClean="0"/>
-              <a:t>‹#›</a:t>
+              <a:pPr/>
+              <a:t>‹Nº›</a:t>
             </a:fld>
             <a:endParaRPr lang="en-US"/>
           </a:p>
@@ -7798,7 +7924,8 @@
           <a:p>
             <a:fld id="{46F4E5E0-CC8A-4447-8D98-8F21A5814697}" type="datetimeFigureOut">
               <a:rPr lang="en-US" smtClean="0"/>
-              <a:t>5/12/2012</a:t>
+              <a:pPr/>
+              <a:t>5/14/2012</a:t>
             </a:fld>
             <a:endParaRPr lang="en-US"/>
           </a:p>
@@ -7840,7 +7967,8 @@
           <a:p>
             <a:fld id="{DCCC8732-F178-4423-B0C1-D52A699E8877}" type="slidenum">
               <a:rPr lang="en-US" smtClean="0"/>
-              <a:t>‹#›</a:t>
+              <a:pPr/>
+              <a:t>‹Nº›</a:t>
             </a:fld>
             <a:endParaRPr lang="en-US"/>
           </a:p>
@@ -7973,7 +8101,8 @@
           <a:p>
             <a:fld id="{46F4E5E0-CC8A-4447-8D98-8F21A5814697}" type="datetimeFigureOut">
               <a:rPr lang="en-US" smtClean="0"/>
-              <a:t>5/12/2012</a:t>
+              <a:pPr/>
+              <a:t>5/14/2012</a:t>
             </a:fld>
             <a:endParaRPr lang="en-US"/>
           </a:p>
@@ -8015,7 +8144,8 @@
           <a:p>
             <a:fld id="{DCCC8732-F178-4423-B0C1-D52A699E8877}" type="slidenum">
               <a:rPr lang="en-US" smtClean="0"/>
-              <a:t>‹#›</a:t>
+              <a:pPr/>
+              <a:t>‹Nº›</a:t>
             </a:fld>
             <a:endParaRPr lang="en-US"/>
           </a:p>
@@ -8138,7 +8268,8 @@
           <a:p>
             <a:fld id="{46F4E5E0-CC8A-4447-8D98-8F21A5814697}" type="datetimeFigureOut">
               <a:rPr lang="en-US" smtClean="0"/>
-              <a:t>5/12/2012</a:t>
+              <a:pPr/>
+              <a:t>5/14/2012</a:t>
             </a:fld>
             <a:endParaRPr lang="en-US"/>
           </a:p>
@@ -8180,7 +8311,8 @@
           <a:p>
             <a:fld id="{DCCC8732-F178-4423-B0C1-D52A699E8877}" type="slidenum">
               <a:rPr lang="en-US" smtClean="0"/>
-              <a:t>‹#›</a:t>
+              <a:pPr/>
+              <a:t>‹Nº›</a:t>
             </a:fld>
             <a:endParaRPr lang="en-US"/>
           </a:p>
@@ -8379,7 +8511,8 @@
           <a:p>
             <a:fld id="{46F4E5E0-CC8A-4447-8D98-8F21A5814697}" type="datetimeFigureOut">
               <a:rPr lang="en-US" smtClean="0"/>
-              <a:t>5/12/2012</a:t>
+              <a:pPr/>
+              <a:t>5/14/2012</a:t>
             </a:fld>
             <a:endParaRPr lang="en-US"/>
           </a:p>
@@ -8421,7 +8554,8 @@
           <a:p>
             <a:fld id="{DCCC8732-F178-4423-B0C1-D52A699E8877}" type="slidenum">
               <a:rPr lang="en-US" smtClean="0"/>
-              <a:t>‹#›</a:t>
+              <a:pPr/>
+              <a:t>‹Nº›</a:t>
             </a:fld>
             <a:endParaRPr lang="en-US"/>
           </a:p>
@@ -8492,7 +8626,8 @@
           <a:p>
             <a:fld id="{46F4E5E0-CC8A-4447-8D98-8F21A5814697}" type="datetimeFigureOut">
               <a:rPr lang="en-US" smtClean="0"/>
-              <a:t>5/12/2012</a:t>
+              <a:pPr/>
+              <a:t>5/14/2012</a:t>
             </a:fld>
             <a:endParaRPr lang="en-US"/>
           </a:p>
@@ -8534,7 +8669,8 @@
           <a:p>
             <a:fld id="{DCCC8732-F178-4423-B0C1-D52A699E8877}" type="slidenum">
               <a:rPr lang="en-US" smtClean="0"/>
-              <a:t>‹#›</a:t>
+              <a:pPr/>
+              <a:t>‹Nº›</a:t>
             </a:fld>
             <a:endParaRPr lang="en-US"/>
           </a:p>
@@ -9031,7 +9167,8 @@
           <a:p>
             <a:fld id="{46F4E5E0-CC8A-4447-8D98-8F21A5814697}" type="datetimeFigureOut">
               <a:rPr lang="en-US" smtClean="0"/>
-              <a:t>5/12/2012</a:t>
+              <a:pPr/>
+              <a:t>5/14/2012</a:t>
             </a:fld>
             <a:endParaRPr lang="en-US"/>
           </a:p>
@@ -9073,7 +9210,8 @@
           <a:p>
             <a:fld id="{DCCC8732-F178-4423-B0C1-D52A699E8877}" type="slidenum">
               <a:rPr lang="en-US" smtClean="0"/>
-              <a:t>‹#›</a:t>
+              <a:pPr/>
+              <a:t>‹Nº›</a:t>
             </a:fld>
             <a:endParaRPr lang="en-US"/>
           </a:p>
@@ -9144,7 +9282,8 @@
           <a:p>
             <a:fld id="{46F4E5E0-CC8A-4447-8D98-8F21A5814697}" type="datetimeFigureOut">
               <a:rPr lang="en-US" smtClean="0"/>
-              <a:t>5/12/2012</a:t>
+              <a:pPr/>
+              <a:t>5/14/2012</a:t>
             </a:fld>
             <a:endParaRPr lang="en-US"/>
           </a:p>
@@ -9186,7 +9325,8 @@
           <a:p>
             <a:fld id="{DCCC8732-F178-4423-B0C1-D52A699E8877}" type="slidenum">
               <a:rPr lang="en-US" smtClean="0"/>
-              <a:t>‹#›</a:t>
+              <a:pPr/>
+              <a:t>‹Nº›</a:t>
             </a:fld>
             <a:endParaRPr lang="en-US"/>
           </a:p>
@@ -9234,7 +9374,8 @@
           <a:p>
             <a:fld id="{46F4E5E0-CC8A-4447-8D98-8F21A5814697}" type="datetimeFigureOut">
               <a:rPr lang="en-US" smtClean="0"/>
-              <a:t>5/12/2012</a:t>
+              <a:pPr/>
+              <a:t>5/14/2012</a:t>
             </a:fld>
             <a:endParaRPr lang="en-US"/>
           </a:p>
@@ -9276,7 +9417,8 @@
           <a:p>
             <a:fld id="{DCCC8732-F178-4423-B0C1-D52A699E8877}" type="slidenum">
               <a:rPr lang="en-US" smtClean="0"/>
-              <a:t>‹#›</a:t>
+              <a:pPr/>
+              <a:t>‹Nº›</a:t>
             </a:fld>
             <a:endParaRPr lang="en-US"/>
           </a:p>
@@ -11885,7 +12027,8 @@
           <a:p>
             <a:fld id="{46F4E5E0-CC8A-4447-8D98-8F21A5814697}" type="datetimeFigureOut">
               <a:rPr lang="en-US" smtClean="0"/>
-              <a:t>5/12/2012</a:t>
+              <a:pPr/>
+              <a:t>5/14/2012</a:t>
             </a:fld>
             <a:endParaRPr lang="en-US"/>
           </a:p>
@@ -11908,7 +12051,8 @@
           <a:p>
             <a:fld id="{DCCC8732-F178-4423-B0C1-D52A699E8877}" type="slidenum">
               <a:rPr lang="en-US" smtClean="0"/>
-              <a:t>‹#›</a:t>
+              <a:pPr/>
+              <a:t>‹Nº›</a:t>
             </a:fld>
             <a:endParaRPr lang="en-US"/>
           </a:p>
@@ -15097,7 +15241,8 @@
           <a:p>
             <a:fld id="{46F4E5E0-CC8A-4447-8D98-8F21A5814697}" type="datetimeFigureOut">
               <a:rPr lang="en-US" smtClean="0"/>
-              <a:t>5/12/2012</a:t>
+              <a:pPr/>
+              <a:t>5/14/2012</a:t>
             </a:fld>
             <a:endParaRPr lang="en-US"/>
           </a:p>
@@ -15146,7 +15291,8 @@
           <a:p>
             <a:fld id="{DCCC8732-F178-4423-B0C1-D52A699E8877}" type="slidenum">
               <a:rPr lang="en-US" smtClean="0"/>
-              <a:t>‹#›</a:t>
+              <a:pPr/>
+              <a:t>‹Nº›</a:t>
             </a:fld>
             <a:endParaRPr lang="en-US"/>
           </a:p>
@@ -17919,7 +18065,8 @@
           <a:p>
             <a:fld id="{46F4E5E0-CC8A-4447-8D98-8F21A5814697}" type="datetimeFigureOut">
               <a:rPr lang="en-US" smtClean="0"/>
-              <a:t>5/12/2012</a:t>
+              <a:pPr/>
+              <a:t>5/14/2012</a:t>
             </a:fld>
             <a:endParaRPr lang="en-US"/>
           </a:p>
@@ -17993,7 +18140,8 @@
           <a:p>
             <a:fld id="{DCCC8732-F178-4423-B0C1-D52A699E8877}" type="slidenum">
               <a:rPr lang="en-US" smtClean="0"/>
-              <a:t>‹#›</a:t>
+              <a:pPr/>
+              <a:t>‹Nº›</a:t>
             </a:fld>
             <a:endParaRPr lang="en-US"/>
           </a:p>
@@ -18549,7 +18697,7 @@
           <a:noFill/>
           <a:extLst>
             <a:ext uri="{909E8E84-426E-40DD-AFC4-6F175D3DCCD1}">
-              <a14:hiddenFill xmlns:a14="http://schemas.microsoft.com/office/drawing/2010/main">
+              <a14:hiddenFill xmlns:a14="http://schemas.microsoft.com/office/drawing/2010/main" xmlns="">
                 <a:solidFill>
                   <a:srgbClr val="FFFFFF"/>
                 </a:solidFill>
@@ -18581,7 +18729,7 @@
           <a:blip r:embed="rId2">
             <a:extLst>
               <a:ext uri="{28A0092B-C50C-407E-A947-70E740481C1C}">
-                <a14:useLocalDpi xmlns:a14="http://schemas.microsoft.com/office/drawing/2010/main" val="0"/>
+                <a14:useLocalDpi xmlns:a14="http://schemas.microsoft.com/office/drawing/2010/main" xmlns="" val="0"/>
               </a:ext>
             </a:extLst>
           </a:blip>
@@ -18601,7 +18749,7 @@
           <a:noFill/>
           <a:extLst>
             <a:ext uri="{909E8E84-426E-40DD-AFC4-6F175D3DCCD1}">
-              <a14:hiddenFill xmlns:a14="http://schemas.microsoft.com/office/drawing/2010/main">
+              <a14:hiddenFill xmlns:a14="http://schemas.microsoft.com/office/drawing/2010/main" xmlns="">
                 <a:solidFill>
                   <a:srgbClr val="FFFFFF"/>
                 </a:solidFill>
@@ -18613,7 +18761,7 @@
     </p:spTree>
     <p:extLst>
       <p:ext uri="{BB962C8B-B14F-4D97-AF65-F5344CB8AC3E}">
-        <p14:creationId xmlns:p14="http://schemas.microsoft.com/office/powerpoint/2010/main" val="140638401"/>
+        <p14:creationId xmlns:p14="http://schemas.microsoft.com/office/powerpoint/2010/main" xmlns="" val="140638401"/>
       </p:ext>
     </p:extLst>
   </p:cSld>
@@ -18693,7 +18841,7 @@
     </p:spTree>
     <p:extLst>
       <p:ext uri="{BB962C8B-B14F-4D97-AF65-F5344CB8AC3E}">
-        <p14:creationId xmlns:p14="http://schemas.microsoft.com/office/powerpoint/2010/main" val="2023804496"/>
+        <p14:creationId xmlns:p14="http://schemas.microsoft.com/office/powerpoint/2010/main" xmlns="" val="2023804496"/>
       </p:ext>
     </p:extLst>
   </p:cSld>
@@ -18815,7 +18963,7 @@
     </p:spTree>
     <p:extLst>
       <p:ext uri="{BB962C8B-B14F-4D97-AF65-F5344CB8AC3E}">
-        <p14:creationId xmlns:p14="http://schemas.microsoft.com/office/powerpoint/2010/main" val="2666013015"/>
+        <p14:creationId xmlns:p14="http://schemas.microsoft.com/office/powerpoint/2010/main" xmlns="" val="2666013015"/>
       </p:ext>
     </p:extLst>
   </p:cSld>
@@ -18902,7 +19050,7 @@
     </p:spTree>
     <p:extLst>
       <p:ext uri="{BB962C8B-B14F-4D97-AF65-F5344CB8AC3E}">
-        <p14:creationId xmlns:p14="http://schemas.microsoft.com/office/powerpoint/2010/main" val="3693362975"/>
+        <p14:creationId xmlns:p14="http://schemas.microsoft.com/office/powerpoint/2010/main" xmlns="" val="3693362975"/>
       </p:ext>
     </p:extLst>
   </p:cSld>
@@ -18989,7 +19137,7 @@
     </p:spTree>
     <p:extLst>
       <p:ext uri="{BB962C8B-B14F-4D97-AF65-F5344CB8AC3E}">
-        <p14:creationId xmlns:p14="http://schemas.microsoft.com/office/powerpoint/2010/main" val="3693362975"/>
+        <p14:creationId xmlns:p14="http://schemas.microsoft.com/office/powerpoint/2010/main" xmlns="" val="3693362975"/>
       </p:ext>
     </p:extLst>
   </p:cSld>
@@ -19076,7 +19224,7 @@
     </p:spTree>
     <p:extLst>
       <p:ext uri="{BB962C8B-B14F-4D97-AF65-F5344CB8AC3E}">
-        <p14:creationId xmlns:p14="http://schemas.microsoft.com/office/powerpoint/2010/main" val="3693362975"/>
+        <p14:creationId xmlns:p14="http://schemas.microsoft.com/office/powerpoint/2010/main" xmlns="" val="3693362975"/>
       </p:ext>
     </p:extLst>
   </p:cSld>
@@ -19166,7 +19314,7 @@
     </p:spTree>
     <p:extLst>
       <p:ext uri="{BB962C8B-B14F-4D97-AF65-F5344CB8AC3E}">
-        <p14:creationId xmlns:p14="http://schemas.microsoft.com/office/powerpoint/2010/main" val="1251326373"/>
+        <p14:creationId xmlns:p14="http://schemas.microsoft.com/office/powerpoint/2010/main" xmlns="" val="1251326373"/>
       </p:ext>
     </p:extLst>
   </p:cSld>
@@ -19246,7 +19394,7 @@
     </p:spTree>
     <p:extLst>
       <p:ext uri="{BB962C8B-B14F-4D97-AF65-F5344CB8AC3E}">
-        <p14:creationId xmlns:p14="http://schemas.microsoft.com/office/powerpoint/2010/main" val="2273561369"/>
+        <p14:creationId xmlns:p14="http://schemas.microsoft.com/office/powerpoint/2010/main" xmlns="" val="2273561369"/>
       </p:ext>
     </p:extLst>
   </p:cSld>
@@ -19316,7 +19464,7 @@
           <a:blip r:embed="rId2">
             <a:extLst>
               <a:ext uri="{28A0092B-C50C-407E-A947-70E740481C1C}">
-                <a14:useLocalDpi xmlns:a14="http://schemas.microsoft.com/office/drawing/2010/main" val="0"/>
+                <a14:useLocalDpi xmlns:a14="http://schemas.microsoft.com/office/drawing/2010/main" xmlns="" val="0"/>
               </a:ext>
             </a:extLst>
           </a:blip>
@@ -19340,14 +19488,14 @@
           <a:effectLst/>
           <a:extLst>
             <a:ext uri="{909E8E84-426E-40DD-AFC4-6F175D3DCCD1}">
-              <a14:hiddenFill xmlns:a14="http://schemas.microsoft.com/office/drawing/2010/main">
+              <a14:hiddenFill xmlns:a14="http://schemas.microsoft.com/office/drawing/2010/main" xmlns="">
                 <a:solidFill>
                   <a:schemeClr val="accent1"/>
                 </a:solidFill>
               </a14:hiddenFill>
             </a:ext>
             <a:ext uri="{91240B29-F687-4F45-9708-019B960494DF}">
-              <a14:hiddenLine xmlns:a14="http://schemas.microsoft.com/office/drawing/2010/main" w="9525">
+              <a14:hiddenLine xmlns:a14="http://schemas.microsoft.com/office/drawing/2010/main" xmlns="" w="9525">
                 <a:solidFill>
                   <a:schemeClr val="tx1"/>
                 </a:solidFill>
@@ -19357,7 +19505,7 @@
               </a14:hiddenLine>
             </a:ext>
             <a:ext uri="{AF507438-7753-43E0-B8FC-AC1667EBCBE1}">
-              <a14:hiddenEffects xmlns:a14="http://schemas.microsoft.com/office/drawing/2010/main">
+              <a14:hiddenEffects xmlns:a14="http://schemas.microsoft.com/office/drawing/2010/main" xmlns="">
                 <a:effectLst>
                   <a:outerShdw dist="35921" dir="2700000" algn="ctr" rotWithShape="0">
                     <a:schemeClr val="bg2"/>
@@ -19371,7 +19519,7 @@
     </p:spTree>
     <p:extLst>
       <p:ext uri="{BB962C8B-B14F-4D97-AF65-F5344CB8AC3E}">
-        <p14:creationId xmlns:p14="http://schemas.microsoft.com/office/powerpoint/2010/main" val="1450032067"/>
+        <p14:creationId xmlns:p14="http://schemas.microsoft.com/office/powerpoint/2010/main" xmlns="" val="1450032067"/>
       </p:ext>
     </p:extLst>
   </p:cSld>
@@ -19415,9 +19563,16 @@
             <p:ph type="title"/>
           </p:nvPr>
         </p:nvSpPr>
-        <p:spPr/>
+        <p:spPr>
+          <a:xfrm>
+            <a:off x="1071538" y="357166"/>
+            <a:ext cx="7024744" cy="1143008"/>
+          </a:xfrm>
+        </p:spPr>
         <p:txBody>
-          <a:bodyPr/>
+          <a:bodyPr>
+            <a:normAutofit/>
+          </a:bodyPr>
           <a:lstStyle/>
           <a:p>
             <a:pPr algn="ctr"/>
@@ -19426,16 +19581,12 @@
               <a:t>Grupo </a:t>
             </a:r>
             <a:r>
-              <a:rPr lang="es-AR" dirty="0" err="1"/>
-              <a:t>N</a:t>
-            </a:r>
-            <a:r>
-              <a:rPr lang="es-AR" dirty="0" err="1" smtClean="0"/>
-              <a:t>ro</a:t>
+              <a:rPr lang="es-AR" dirty="0" smtClean="0"/>
+              <a:t>Nro. </a:t>
             </a:r>
             <a:r>
               <a:rPr lang="es-AR" dirty="0" smtClean="0"/>
-              <a:t> 3</a:t>
+              <a:t>3</a:t>
             </a:r>
             <a:endParaRPr lang="en-US" dirty="0"/>
           </a:p>
@@ -19451,74 +19602,304 @@
             <p:ph idx="1"/>
           </p:nvPr>
         </p:nvSpPr>
-        <p:spPr/>
+        <p:spPr>
+          <a:xfrm>
+            <a:off x="1071538" y="2571744"/>
+            <a:ext cx="6777317" cy="3508977"/>
+          </a:xfrm>
+        </p:spPr>
         <p:txBody>
           <a:bodyPr>
-            <a:normAutofit fontScale="92500" lnSpcReduction="10000"/>
+            <a:normAutofit fontScale="70000" lnSpcReduction="20000"/>
           </a:bodyPr>
           <a:lstStyle/>
           <a:p>
             <a:r>
-              <a:rPr lang="es-AR" dirty="0"/>
+              <a:rPr lang="es-AR" dirty="0">
+                <a:solidFill>
+                  <a:schemeClr val="tx1"/>
+                </a:solidFill>
+              </a:rPr>
               <a:t>Carlos </a:t>
             </a:r>
             <a:r>
-              <a:rPr lang="es-AR" dirty="0" err="1"/>
+              <a:rPr lang="es-AR" dirty="0" err="1">
+                <a:solidFill>
+                  <a:schemeClr val="tx1"/>
+                </a:solidFill>
+              </a:rPr>
               <a:t>Trepat</a:t>
             </a:r>
             <a:r>
-              <a:rPr lang="es-AR" dirty="0"/>
+              <a:rPr lang="es-AR" dirty="0">
+                <a:solidFill>
+                  <a:schemeClr val="tx1"/>
+                </a:solidFill>
+              </a:rPr>
               <a:t> </a:t>
             </a:r>
-            <a:endParaRPr lang="es-AR" dirty="0" smtClean="0"/>
+            <a:endParaRPr lang="es-AR" dirty="0" smtClean="0">
+              <a:solidFill>
+                <a:schemeClr val="tx1"/>
+              </a:solidFill>
+            </a:endParaRPr>
           </a:p>
           <a:p>
-            <a:endParaRPr lang="es-AR" dirty="0" smtClean="0"/>
+            <a:endParaRPr lang="es-AR" dirty="0" smtClean="0">
+              <a:solidFill>
+                <a:schemeClr val="tx1"/>
+              </a:solidFill>
+            </a:endParaRPr>
           </a:p>
           <a:p>
             <a:r>
-              <a:rPr lang="es-AR" dirty="0" err="1" smtClean="0"/>
+              <a:rPr lang="es-AR" dirty="0" err="1" smtClean="0">
+                <a:solidFill>
+                  <a:schemeClr val="tx1"/>
+                </a:solidFill>
+              </a:rPr>
               <a:t>Demian</a:t>
             </a:r>
             <a:r>
-              <a:rPr lang="es-AR" dirty="0" smtClean="0"/>
+              <a:rPr lang="es-AR" dirty="0" smtClean="0">
+                <a:solidFill>
+                  <a:schemeClr val="tx1"/>
+                </a:solidFill>
+              </a:rPr>
               <a:t> </a:t>
             </a:r>
             <a:r>
-              <a:rPr lang="es-AR" dirty="0" err="1" smtClean="0"/>
+              <a:rPr lang="es-AR" dirty="0" err="1" smtClean="0">
+                <a:solidFill>
+                  <a:schemeClr val="tx1"/>
+                </a:solidFill>
+              </a:rPr>
               <a:t>Odasso</a:t>
             </a:r>
-            <a:endParaRPr lang="es-AR" dirty="0" smtClean="0"/>
+            <a:r>
+              <a:rPr lang="es-AR" dirty="0" smtClean="0">
+                <a:solidFill>
+                  <a:schemeClr val="tx1"/>
+                </a:solidFill>
+              </a:rPr>
+              <a:t>: </a:t>
+            </a:r>
+            <a:r>
+              <a:rPr lang="es-AR" dirty="0" smtClean="0">
+                <a:solidFill>
+                  <a:schemeClr val="tx1"/>
+                </a:solidFill>
+              </a:rPr>
+              <a:t>Desarrollador </a:t>
+            </a:r>
+            <a:r>
+              <a:rPr lang="es-AR" dirty="0" err="1" smtClean="0">
+                <a:solidFill>
+                  <a:schemeClr val="tx1"/>
+                </a:solidFill>
+              </a:rPr>
+              <a:t>senior</a:t>
+            </a:r>
+            <a:r>
+              <a:rPr lang="es-AR" dirty="0" smtClean="0">
+                <a:solidFill>
+                  <a:schemeClr val="tx1"/>
+                </a:solidFill>
+              </a:rPr>
+              <a:t> para aplicaciones móviles y analista funcional en </a:t>
+            </a:r>
+            <a:r>
+              <a:rPr lang="es-AR" dirty="0" err="1" smtClean="0">
+                <a:solidFill>
+                  <a:schemeClr val="tx1"/>
+                </a:solidFill>
+              </a:rPr>
+              <a:t>Blacktobacco</a:t>
+            </a:r>
+            <a:r>
+              <a:rPr lang="es-AR" dirty="0" smtClean="0">
+                <a:solidFill>
+                  <a:schemeClr val="tx1"/>
+                </a:solidFill>
+              </a:rPr>
+              <a:t> </a:t>
+            </a:r>
+            <a:r>
+              <a:rPr lang="es-AR" dirty="0" err="1" smtClean="0">
+                <a:solidFill>
+                  <a:schemeClr val="tx1"/>
+                </a:solidFill>
+              </a:rPr>
+              <a:t>Lab</a:t>
+            </a:r>
+            <a:endParaRPr lang="es-AR" dirty="0" smtClean="0">
+              <a:solidFill>
+                <a:schemeClr val="tx1"/>
+              </a:solidFill>
+            </a:endParaRPr>
           </a:p>
           <a:p>
-            <a:endParaRPr lang="es-AR" dirty="0" smtClean="0"/>
+            <a:endParaRPr lang="es-AR" dirty="0" smtClean="0">
+              <a:solidFill>
+                <a:schemeClr val="tx1"/>
+              </a:solidFill>
+            </a:endParaRPr>
           </a:p>
           <a:p>
             <a:r>
-              <a:rPr lang="es-AR" dirty="0"/>
+              <a:rPr lang="es-AR" dirty="0">
+                <a:solidFill>
+                  <a:schemeClr val="tx1"/>
+                </a:solidFill>
+              </a:rPr>
               <a:t>Mariano </a:t>
             </a:r>
             <a:r>
-              <a:rPr lang="es-AR" dirty="0" err="1" smtClean="0"/>
+              <a:rPr lang="es-AR" dirty="0" err="1" smtClean="0">
+                <a:solidFill>
+                  <a:schemeClr val="tx1"/>
+                </a:solidFill>
+              </a:rPr>
               <a:t>Gava</a:t>
             </a:r>
-            <a:endParaRPr lang="es-AR" dirty="0" smtClean="0"/>
+            <a:r>
+              <a:rPr lang="es-AR" dirty="0" smtClean="0">
+                <a:solidFill>
+                  <a:schemeClr val="tx1"/>
+                </a:solidFill>
+              </a:rPr>
+              <a:t>: Agente de asistencia </a:t>
+            </a:r>
+            <a:r>
+              <a:rPr lang="es-AR" dirty="0" err="1" smtClean="0">
+                <a:solidFill>
+                  <a:schemeClr val="tx1"/>
+                </a:solidFill>
+              </a:rPr>
+              <a:t>tecnica</a:t>
+            </a:r>
+            <a:r>
+              <a:rPr lang="es-AR" dirty="0" smtClean="0">
+                <a:solidFill>
+                  <a:schemeClr val="tx1"/>
+                </a:solidFill>
+              </a:rPr>
+              <a:t> para Pymes en Jazztel (empresa española de telecomunicaciones).</a:t>
+            </a:r>
+            <a:endParaRPr lang="es-AR" dirty="0" smtClean="0">
+              <a:solidFill>
+                <a:schemeClr val="tx1"/>
+              </a:solidFill>
+            </a:endParaRPr>
           </a:p>
           <a:p>
-            <a:endParaRPr lang="es-AR" dirty="0" smtClean="0"/>
+            <a:endParaRPr lang="es-AR" dirty="0" smtClean="0">
+              <a:solidFill>
+                <a:schemeClr val="tx1"/>
+              </a:solidFill>
+            </a:endParaRPr>
           </a:p>
           <a:p>
             <a:r>
-              <a:rPr lang="es-AR" dirty="0" smtClean="0"/>
-              <a:t>Pablo Tissera</a:t>
+              <a:rPr lang="es-AR" dirty="0" smtClean="0">
+                <a:solidFill>
+                  <a:schemeClr val="tx1"/>
+                </a:solidFill>
+              </a:rPr>
+              <a:t>Pablo </a:t>
             </a:r>
+            <a:r>
+              <a:rPr lang="es-AR" dirty="0" err="1" smtClean="0">
+                <a:solidFill>
+                  <a:schemeClr val="tx1"/>
+                </a:solidFill>
+              </a:rPr>
+              <a:t>Tissera</a:t>
+            </a:r>
+            <a:r>
+              <a:rPr lang="es-AR" dirty="0" smtClean="0">
+                <a:solidFill>
+                  <a:schemeClr val="tx1"/>
+                </a:solidFill>
+              </a:rPr>
+              <a:t>: </a:t>
+            </a:r>
+            <a:r>
+              <a:rPr lang="es-AR" dirty="0" smtClean="0">
+                <a:solidFill>
+                  <a:schemeClr val="tx1"/>
+                </a:solidFill>
+              </a:rPr>
+              <a:t>Desarrollador java </a:t>
+            </a:r>
+            <a:r>
+              <a:rPr lang="es-AR" dirty="0" err="1" smtClean="0">
+                <a:solidFill>
+                  <a:schemeClr val="tx1"/>
+                </a:solidFill>
+              </a:rPr>
+              <a:t>senior</a:t>
+            </a:r>
+            <a:r>
+              <a:rPr lang="es-AR" dirty="0" smtClean="0">
+                <a:solidFill>
+                  <a:schemeClr val="tx1"/>
+                </a:solidFill>
+              </a:rPr>
+              <a:t> con mas de 7 años de experiencia en distintas empresas: H+A, </a:t>
+            </a:r>
+            <a:r>
+              <a:rPr lang="es-AR" dirty="0" err="1" smtClean="0">
+                <a:solidFill>
+                  <a:schemeClr val="tx1"/>
+                </a:solidFill>
+              </a:rPr>
+              <a:t>Accenture</a:t>
+            </a:r>
+            <a:r>
+              <a:rPr lang="es-AR" dirty="0" smtClean="0">
+                <a:solidFill>
+                  <a:schemeClr val="tx1"/>
+                </a:solidFill>
+              </a:rPr>
+              <a:t>, Coca-Cola, EDS y </a:t>
+            </a:r>
+            <a:r>
+              <a:rPr lang="es-AR" dirty="0" err="1" smtClean="0">
+                <a:solidFill>
+                  <a:schemeClr val="tx1"/>
+                </a:solidFill>
+              </a:rPr>
+              <a:t>Hewllet</a:t>
+            </a:r>
+            <a:r>
+              <a:rPr lang="es-AR" dirty="0" smtClean="0">
+                <a:solidFill>
+                  <a:schemeClr val="tx1"/>
+                </a:solidFill>
+              </a:rPr>
+              <a:t> Packard</a:t>
+            </a:r>
+            <a:endParaRPr lang="es-AR" dirty="0" smtClean="0">
+              <a:solidFill>
+                <a:schemeClr val="tx1"/>
+              </a:solidFill>
+            </a:endParaRPr>
           </a:p>
           <a:p>
-            <a:endParaRPr lang="es-AR" dirty="0" smtClean="0"/>
+            <a:endParaRPr lang="es-AR" dirty="0" smtClean="0">
+              <a:solidFill>
+                <a:schemeClr val="tx1"/>
+              </a:solidFill>
+            </a:endParaRPr>
           </a:p>
           <a:p>
             <a:r>
-              <a:rPr lang="es-AR" dirty="0"/>
+              <a:rPr lang="es-AR" dirty="0">
+                <a:solidFill>
+                  <a:schemeClr val="tx1"/>
+                </a:solidFill>
+              </a:rPr>
               <a:t>Sergio Brizuela</a:t>
             </a:r>
           </a:p>
@@ -19527,10 +19908,49 @@
           </a:p>
         </p:txBody>
       </p:sp>
+      <p:sp>
+        <p:nvSpPr>
+          <p:cNvPr id="4" name="3 CuadroTexto"/>
+          <p:cNvSpPr txBox="1"/>
+          <p:nvPr/>
+        </p:nvSpPr>
+        <p:spPr>
+          <a:xfrm>
+            <a:off x="1214414" y="1571612"/>
+            <a:ext cx="6929486" cy="769441"/>
+          </a:xfrm>
+          <a:prstGeom prst="rect">
+            <a:avLst/>
+          </a:prstGeom>
+          <a:noFill/>
+        </p:spPr>
+        <p:txBody>
+          <a:bodyPr wrap="square" rtlCol="0">
+            <a:spAutoFit/>
+          </a:bodyPr>
+          <a:lstStyle/>
+          <a:p>
+            <a:pPr algn="ctr"/>
+            <a:r>
+              <a:rPr lang="es-AR" sz="2000" b="1" dirty="0" smtClean="0"/>
+              <a:t>Gestión de instalación y mantenimiento de antenas de </a:t>
+            </a:r>
+            <a:r>
+              <a:rPr lang="es-AR" sz="2000" b="1" dirty="0" smtClean="0"/>
+              <a:t>telecomunicaciones: </a:t>
+            </a:r>
+            <a:r>
+              <a:rPr lang="es-AR" sz="2400" b="1" dirty="0" smtClean="0"/>
+              <a:t>COMING SA</a:t>
+            </a:r>
+            <a:endParaRPr lang="es-AR" sz="2400" b="1" dirty="0"/>
+          </a:p>
+        </p:txBody>
+      </p:sp>
     </p:spTree>
     <p:extLst>
       <p:ext uri="{BB962C8B-B14F-4D97-AF65-F5344CB8AC3E}">
-        <p14:creationId xmlns:p14="http://schemas.microsoft.com/office/powerpoint/2010/main" val="119432886"/>
+        <p14:creationId xmlns:p14="http://schemas.microsoft.com/office/powerpoint/2010/main" xmlns="" val="119432886"/>
       </p:ext>
     </p:extLst>
   </p:cSld>
@@ -19574,17 +19994,22 @@
             <p:ph type="title"/>
           </p:nvPr>
         </p:nvSpPr>
-        <p:spPr/>
+        <p:spPr>
+          <a:xfrm>
+            <a:off x="1142976" y="285728"/>
+            <a:ext cx="7024744" cy="1428760"/>
+          </a:xfrm>
+        </p:spPr>
         <p:txBody>
           <a:bodyPr/>
           <a:lstStyle/>
           <a:p>
             <a:pPr algn="ctr"/>
             <a:r>
-              <a:rPr lang="es-AR" dirty="0" smtClean="0"/>
+              <a:rPr lang="es-AR" sz="4400" dirty="0" smtClean="0"/>
               <a:t>Introducción</a:t>
             </a:r>
-            <a:endParaRPr lang="en-US" dirty="0"/>
+            <a:endParaRPr lang="en-US" sz="4400" dirty="0"/>
           </a:p>
         </p:txBody>
       </p:sp>
@@ -19686,7 +20111,7 @@
     </p:spTree>
     <p:extLst>
       <p:ext uri="{BB962C8B-B14F-4D97-AF65-F5344CB8AC3E}">
-        <p14:creationId xmlns:p14="http://schemas.microsoft.com/office/powerpoint/2010/main" val="3537553483"/>
+        <p14:creationId xmlns:p14="http://schemas.microsoft.com/office/powerpoint/2010/main" xmlns="" val="3537553483"/>
       </p:ext>
     </p:extLst>
   </p:cSld>
@@ -19730,7 +20155,12 @@
             <p:ph type="title"/>
           </p:nvPr>
         </p:nvSpPr>
-        <p:spPr/>
+        <p:spPr>
+          <a:xfrm>
+            <a:off x="1071538" y="928670"/>
+            <a:ext cx="7024744" cy="1143000"/>
+          </a:xfrm>
+        </p:spPr>
         <p:txBody>
           <a:bodyPr>
             <a:normAutofit fontScale="90000"/>
@@ -19832,7 +20262,7 @@
     </p:spTree>
     <p:extLst>
       <p:ext uri="{BB962C8B-B14F-4D97-AF65-F5344CB8AC3E}">
-        <p14:creationId xmlns:p14="http://schemas.microsoft.com/office/powerpoint/2010/main" val="2857880001"/>
+        <p14:creationId xmlns:p14="http://schemas.microsoft.com/office/powerpoint/2010/main" xmlns="" val="2857880001"/>
       </p:ext>
     </p:extLst>
   </p:cSld>
@@ -19876,7 +20306,12 @@
             <p:ph type="title"/>
           </p:nvPr>
         </p:nvSpPr>
-        <p:spPr/>
+        <p:spPr>
+          <a:xfrm>
+            <a:off x="1071538" y="785794"/>
+            <a:ext cx="7024744" cy="1143000"/>
+          </a:xfrm>
+        </p:spPr>
         <p:txBody>
           <a:bodyPr>
             <a:normAutofit fontScale="90000"/>
@@ -19929,7 +20364,7 @@
     </p:spTree>
     <p:extLst>
       <p:ext uri="{BB962C8B-B14F-4D97-AF65-F5344CB8AC3E}">
-        <p14:creationId xmlns:p14="http://schemas.microsoft.com/office/powerpoint/2010/main" val="2421466572"/>
+        <p14:creationId xmlns:p14="http://schemas.microsoft.com/office/powerpoint/2010/main" xmlns="" val="2421466572"/>
       </p:ext>
     </p:extLst>
   </p:cSld>
@@ -20014,7 +20449,7 @@
         </p:nvSpPr>
         <p:spPr>
           <a:xfrm>
-            <a:off x="1043608" y="1700808"/>
+            <a:off x="1071538" y="1500174"/>
             <a:ext cx="6777317" cy="3508977"/>
           </a:xfrm>
         </p:spPr>
@@ -20022,12 +20457,12 @@
           <a:bodyPr/>
           <a:lstStyle/>
           <a:p>
-            <a:pPr marL="114300" indent="0" algn="ctr">
+            <a:pPr marL="114300" indent="0">
               <a:buNone/>
             </a:pPr>
             <a:r>
               <a:rPr lang="es-ES" sz="3200" dirty="0" smtClean="0"/>
-              <a:t>Organigrama</a:t>
+              <a:t>Organigrama:</a:t>
             </a:r>
             <a:endParaRPr lang="en-US" dirty="0"/>
           </a:p>
@@ -20040,14 +20475,14 @@
           <p:nvPr>
             <p:extLst>
               <p:ext uri="{D42A27DB-BD31-4B8C-83A1-F6EECF244321}">
-                <p14:modId xmlns:p14="http://schemas.microsoft.com/office/powerpoint/2010/main" val="899372415"/>
+                <p14:modId xmlns:p14="http://schemas.microsoft.com/office/powerpoint/2010/main" xmlns="" val="899372415"/>
               </p:ext>
             </p:extLst>
           </p:nvPr>
         </p:nvGraphicFramePr>
         <p:xfrm>
-          <a:off x="1691680" y="2420888"/>
-          <a:ext cx="5486400" cy="3200400"/>
+          <a:off x="1357290" y="2071678"/>
+          <a:ext cx="6286544" cy="4071966"/>
         </p:xfrm>
         <a:graphic>
           <a:graphicData uri="http://schemas.openxmlformats.org/drawingml/2006/diagram">
@@ -20058,7 +20493,7 @@
     </p:spTree>
     <p:extLst>
       <p:ext uri="{BB962C8B-B14F-4D97-AF65-F5344CB8AC3E}">
-        <p14:creationId xmlns:p14="http://schemas.microsoft.com/office/powerpoint/2010/main" val="1218708985"/>
+        <p14:creationId xmlns:p14="http://schemas.microsoft.com/office/powerpoint/2010/main" xmlns="" val="1218708985"/>
       </p:ext>
     </p:extLst>
   </p:cSld>
@@ -20160,7 +20595,7 @@
     </p:spTree>
     <p:extLst>
       <p:ext uri="{BB962C8B-B14F-4D97-AF65-F5344CB8AC3E}">
-        <p14:creationId xmlns:p14="http://schemas.microsoft.com/office/powerpoint/2010/main" val="1218708985"/>
+        <p14:creationId xmlns:p14="http://schemas.microsoft.com/office/powerpoint/2010/main" xmlns="" val="1218708985"/>
       </p:ext>
     </p:extLst>
   </p:cSld>
@@ -20259,7 +20694,7 @@
     </p:spTree>
     <p:extLst>
       <p:ext uri="{BB962C8B-B14F-4D97-AF65-F5344CB8AC3E}">
-        <p14:creationId xmlns:p14="http://schemas.microsoft.com/office/powerpoint/2010/main" val="1218708985"/>
+        <p14:creationId xmlns:p14="http://schemas.microsoft.com/office/powerpoint/2010/main" xmlns="" val="1218708985"/>
       </p:ext>
     </p:extLst>
   </p:cSld>
@@ -20339,7 +20774,7 @@
     </p:spTree>
     <p:extLst>
       <p:ext uri="{BB962C8B-B14F-4D97-AF65-F5344CB8AC3E}">
-        <p14:creationId xmlns:p14="http://schemas.microsoft.com/office/powerpoint/2010/main" val="2262476767"/>
+        <p14:creationId xmlns:p14="http://schemas.microsoft.com/office/powerpoint/2010/main" xmlns="" val="2262476767"/>
       </p:ext>
     </p:extLst>
   </p:cSld>

</xml_diff>

<commit_message>
le cambie un par de cocitas :)
</commit_message>
<xml_diff>
--- a/Documentacion/Informe Preliminar/Presentacion Informe Preliminar.pptx
+++ b/Documentacion/Informe Preliminar/Presentacion Informe Preliminar.pptx
@@ -1761,30 +1761,30 @@
     </dgm:pt>
   </dgm:ptLst>
   <dgm:cxnLst>
+    <dgm:cxn modelId="{9E07DF77-6C35-4821-9DE7-4AE2BB570D24}" type="presOf" srcId="{8782F143-7EBE-4652-BCB6-342F97295F78}" destId="{C999530D-970C-4F19-A91A-981537024566}" srcOrd="0" destOrd="0" presId="urn:microsoft.com/office/officeart/2005/8/layout/orgChart1"/>
+    <dgm:cxn modelId="{B115F0C3-E1DC-458B-B51B-579BC729549E}" type="presOf" srcId="{38912AFE-3D78-4266-8E99-4582EAA11DAA}" destId="{FC06127A-3788-446A-9EF8-244F2B7D169B}" srcOrd="0" destOrd="0" presId="urn:microsoft.com/office/officeart/2005/8/layout/orgChart1"/>
+    <dgm:cxn modelId="{50F1A73B-D6FF-4C56-A307-90292B87962A}" type="presOf" srcId="{C0EDF659-C35B-4EB3-A65D-2CEFAA43999B}" destId="{D70C0BDD-DBCA-4018-8B04-41A27590CEAD}" srcOrd="0" destOrd="0" presId="urn:microsoft.com/office/officeart/2005/8/layout/orgChart1"/>
+    <dgm:cxn modelId="{A633D16F-A4C8-49D0-9518-C450A40641D7}" type="presOf" srcId="{CAE025A5-AD7E-47EC-9189-B4F6923CFB39}" destId="{2872F071-CCEC-4734-8E72-CEF275144F2A}" srcOrd="0" destOrd="0" presId="urn:microsoft.com/office/officeart/2005/8/layout/orgChart1"/>
+    <dgm:cxn modelId="{12BA031F-FF7F-4D8C-A5B8-6868AFAB5D64}" type="presOf" srcId="{CF7F02CB-0026-4C85-A83C-2611CA0EC12E}" destId="{8EBBDB76-DF10-4764-B8B8-496AD4C5615C}" srcOrd="0" destOrd="0" presId="urn:microsoft.com/office/officeart/2005/8/layout/orgChart1"/>
+    <dgm:cxn modelId="{F9299C4E-4D09-4206-A4D3-1862212D3301}" type="presOf" srcId="{C0EDF659-C35B-4EB3-A65D-2CEFAA43999B}" destId="{F572DEBC-670A-44EF-A3E4-3094B1E9B62C}" srcOrd="1" destOrd="0" presId="urn:microsoft.com/office/officeart/2005/8/layout/orgChart1"/>
+    <dgm:cxn modelId="{DABFC9D0-8C39-473E-A1C2-ECB16C3483D9}" srcId="{AB74DD02-BF3F-45B5-8025-7F7CC2B7F0AF}" destId="{8782F143-7EBE-4652-BCB6-342F97295F78}" srcOrd="0" destOrd="0" parTransId="{6CCD5503-01E5-4C86-8EFC-5F017D508467}" sibTransId="{4E4F6724-DE3A-4CE7-9F89-6CC7FEF6FC19}"/>
+    <dgm:cxn modelId="{74172C81-A83A-4C0F-8A14-7400105BA931}" type="presOf" srcId="{AB74DD02-BF3F-45B5-8025-7F7CC2B7F0AF}" destId="{1495ABB2-EE30-4D6B-960C-2AE8B28A3DEE}" srcOrd="1" destOrd="0" presId="urn:microsoft.com/office/officeart/2005/8/layout/orgChart1"/>
+    <dgm:cxn modelId="{AFBFF8F3-B1CC-4B54-A79E-E1B294E0D0BF}" srcId="{F27F8D6F-03A5-429D-BDD0-702BFC21B6F0}" destId="{C0EDF659-C35B-4EB3-A65D-2CEFAA43999B}" srcOrd="1" destOrd="0" parTransId="{38912AFE-3D78-4266-8E99-4582EAA11DAA}" sibTransId="{05C533E2-BAD5-478F-A5EF-73E5B154A010}"/>
+    <dgm:cxn modelId="{76FF6951-B899-4984-97BF-78ABA4449E40}" type="presOf" srcId="{6CCD5503-01E5-4C86-8EFC-5F017D508467}" destId="{7333BF06-7B1A-47D2-83B9-64258DCEE59E}" srcOrd="0" destOrd="0" presId="urn:microsoft.com/office/officeart/2005/8/layout/orgChart1"/>
+    <dgm:cxn modelId="{956F72A0-5E7A-4BBE-918C-DF48B42F7F88}" srcId="{F27F8D6F-03A5-429D-BDD0-702BFC21B6F0}" destId="{CAE025A5-AD7E-47EC-9189-B4F6923CFB39}" srcOrd="2" destOrd="0" parTransId="{36C0A925-CF92-4A8D-8547-F5135586AA1D}" sibTransId="{3C63452D-48B4-43C0-A4CD-DBFD585BFD18}"/>
     <dgm:cxn modelId="{A77E3C6E-5F2F-414C-9520-0D9237D04246}" type="presOf" srcId="{0C5A7F20-7BF1-4D54-8603-B4C57EB9E51E}" destId="{09519A4A-757A-4FD3-B530-30AAEFBECC94}" srcOrd="0" destOrd="0" presId="urn:microsoft.com/office/officeart/2005/8/layout/orgChart1"/>
+    <dgm:cxn modelId="{7C9266A4-58E6-4781-B381-E3B5BC31D902}" srcId="{69404F52-DC68-4464-8C95-4A4EC5C3D511}" destId="{AB74DD02-BF3F-45B5-8025-7F7CC2B7F0AF}" srcOrd="0" destOrd="0" parTransId="{0C5A7F20-7BF1-4D54-8603-B4C57EB9E51E}" sibTransId="{4DD56927-21C8-4BA9-8A88-EC2F6591D693}"/>
+    <dgm:cxn modelId="{74A7C8EA-52F1-4CBF-961C-62C6C5B9A3FB}" type="presOf" srcId="{F27F8D6F-03A5-429D-BDD0-702BFC21B6F0}" destId="{F21B52D0-B08C-497F-8319-56B5DA6523B6}" srcOrd="0" destOrd="0" presId="urn:microsoft.com/office/officeart/2005/8/layout/orgChart1"/>
+    <dgm:cxn modelId="{53CC8146-27BE-4BD7-B9AE-68FE497BE313}" type="presOf" srcId="{CAE025A5-AD7E-47EC-9189-B4F6923CFB39}" destId="{A98355B4-6B0E-4D38-B738-06A1B5352B25}" srcOrd="1" destOrd="0" presId="urn:microsoft.com/office/officeart/2005/8/layout/orgChart1"/>
     <dgm:cxn modelId="{8922B835-3F81-4578-8943-F5FFBC66CE93}" type="presOf" srcId="{C3818049-3B0A-41F2-A7EE-480ECF181171}" destId="{7DF29361-70E6-4A90-8106-66BD992952A3}" srcOrd="0" destOrd="0" presId="urn:microsoft.com/office/officeart/2005/8/layout/orgChart1"/>
-    <dgm:cxn modelId="{50F1A73B-D6FF-4C56-A307-90292B87962A}" type="presOf" srcId="{C0EDF659-C35B-4EB3-A65D-2CEFAA43999B}" destId="{D70C0BDD-DBCA-4018-8B04-41A27590CEAD}" srcOrd="0" destOrd="0" presId="urn:microsoft.com/office/officeart/2005/8/layout/orgChart1"/>
-    <dgm:cxn modelId="{F40F547F-E985-47E4-852C-13CE91AFC67B}" srcId="{F27F8D6F-03A5-429D-BDD0-702BFC21B6F0}" destId="{69404F52-DC68-4464-8C95-4A4EC5C3D511}" srcOrd="0" destOrd="0" parTransId="{CF7F02CB-0026-4C85-A83C-2611CA0EC12E}" sibTransId="{35B2B94B-D59C-4D2C-AA6B-EC3193330074}"/>
-    <dgm:cxn modelId="{9E07DF77-6C35-4821-9DE7-4AE2BB570D24}" type="presOf" srcId="{8782F143-7EBE-4652-BCB6-342F97295F78}" destId="{C999530D-970C-4F19-A91A-981537024566}" srcOrd="0" destOrd="0" presId="urn:microsoft.com/office/officeart/2005/8/layout/orgChart1"/>
-    <dgm:cxn modelId="{DABFC9D0-8C39-473E-A1C2-ECB16C3483D9}" srcId="{AB74DD02-BF3F-45B5-8025-7F7CC2B7F0AF}" destId="{8782F143-7EBE-4652-BCB6-342F97295F78}" srcOrd="0" destOrd="0" parTransId="{6CCD5503-01E5-4C86-8EFC-5F017D508467}" sibTransId="{4E4F6724-DE3A-4CE7-9F89-6CC7FEF6FC19}"/>
+    <dgm:cxn modelId="{95E2746A-BE37-4489-B043-94B131AC748B}" type="presOf" srcId="{F27F8D6F-03A5-429D-BDD0-702BFC21B6F0}" destId="{96070D5D-19E7-4653-BC65-20D6D6EAE9DE}" srcOrd="1" destOrd="0" presId="urn:microsoft.com/office/officeart/2005/8/layout/orgChart1"/>
     <dgm:cxn modelId="{2FBB91A6-8630-4576-832A-197FF1249D34}" type="presOf" srcId="{69404F52-DC68-4464-8C95-4A4EC5C3D511}" destId="{4972E06E-0D8D-46A7-810C-DCF2E5A67FD3}" srcOrd="1" destOrd="0" presId="urn:microsoft.com/office/officeart/2005/8/layout/orgChart1"/>
-    <dgm:cxn modelId="{956F72A0-5E7A-4BBE-918C-DF48B42F7F88}" srcId="{F27F8D6F-03A5-429D-BDD0-702BFC21B6F0}" destId="{CAE025A5-AD7E-47EC-9189-B4F6923CFB39}" srcOrd="2" destOrd="0" parTransId="{36C0A925-CF92-4A8D-8547-F5135586AA1D}" sibTransId="{3C63452D-48B4-43C0-A4CD-DBFD585BFD18}"/>
-    <dgm:cxn modelId="{A633D16F-A4C8-49D0-9518-C450A40641D7}" type="presOf" srcId="{CAE025A5-AD7E-47EC-9189-B4F6923CFB39}" destId="{2872F071-CCEC-4734-8E72-CEF275144F2A}" srcOrd="0" destOrd="0" presId="urn:microsoft.com/office/officeart/2005/8/layout/orgChart1"/>
-    <dgm:cxn modelId="{53CC8146-27BE-4BD7-B9AE-68FE497BE313}" type="presOf" srcId="{CAE025A5-AD7E-47EC-9189-B4F6923CFB39}" destId="{A98355B4-6B0E-4D38-B738-06A1B5352B25}" srcOrd="1" destOrd="0" presId="urn:microsoft.com/office/officeart/2005/8/layout/orgChart1"/>
-    <dgm:cxn modelId="{494E18AC-0DF3-4E11-984A-C3757D6E03CF}" type="presOf" srcId="{8782F143-7EBE-4652-BCB6-342F97295F78}" destId="{15615975-D7C1-4DD7-92D8-7DA4D4FB6EB9}" srcOrd="1" destOrd="0" presId="urn:microsoft.com/office/officeart/2005/8/layout/orgChart1"/>
     <dgm:cxn modelId="{001EA8ED-4AF4-43DC-B851-53863A910DCE}" type="presOf" srcId="{36C0A925-CF92-4A8D-8547-F5135586AA1D}" destId="{025B54D6-F427-427E-8DF7-D864235487AD}" srcOrd="0" destOrd="0" presId="urn:microsoft.com/office/officeart/2005/8/layout/orgChart1"/>
     <dgm:cxn modelId="{D01CEB95-7818-4453-83F3-BCE47E725498}" srcId="{C3818049-3B0A-41F2-A7EE-480ECF181171}" destId="{F27F8D6F-03A5-429D-BDD0-702BFC21B6F0}" srcOrd="0" destOrd="0" parTransId="{56E089E7-06E2-47BB-AEAB-E6273550B405}" sibTransId="{B7D05675-1749-4578-B10C-6368DD663956}"/>
-    <dgm:cxn modelId="{AFBFF8F3-B1CC-4B54-A79E-E1B294E0D0BF}" srcId="{F27F8D6F-03A5-429D-BDD0-702BFC21B6F0}" destId="{C0EDF659-C35B-4EB3-A65D-2CEFAA43999B}" srcOrd="1" destOrd="0" parTransId="{38912AFE-3D78-4266-8E99-4582EAA11DAA}" sibTransId="{05C533E2-BAD5-478F-A5EF-73E5B154A010}"/>
-    <dgm:cxn modelId="{95E2746A-BE37-4489-B043-94B131AC748B}" type="presOf" srcId="{F27F8D6F-03A5-429D-BDD0-702BFC21B6F0}" destId="{96070D5D-19E7-4653-BC65-20D6D6EAE9DE}" srcOrd="1" destOrd="0" presId="urn:microsoft.com/office/officeart/2005/8/layout/orgChart1"/>
+    <dgm:cxn modelId="{F40F547F-E985-47E4-852C-13CE91AFC67B}" srcId="{F27F8D6F-03A5-429D-BDD0-702BFC21B6F0}" destId="{69404F52-DC68-4464-8C95-4A4EC5C3D511}" srcOrd="0" destOrd="0" parTransId="{CF7F02CB-0026-4C85-A83C-2611CA0EC12E}" sibTransId="{35B2B94B-D59C-4D2C-AA6B-EC3193330074}"/>
+    <dgm:cxn modelId="{A8905A9F-8981-4BCD-A582-4F4C0DD6068C}" type="presOf" srcId="{69404F52-DC68-4464-8C95-4A4EC5C3D511}" destId="{EF27B91A-A527-4B5D-8953-3DEFA4CD70BE}" srcOrd="0" destOrd="0" presId="urn:microsoft.com/office/officeart/2005/8/layout/orgChart1"/>
     <dgm:cxn modelId="{331928DD-BFB5-46BB-A3C0-FCB62A6D8CAA}" type="presOf" srcId="{AB74DD02-BF3F-45B5-8025-7F7CC2B7F0AF}" destId="{76382964-F0B9-4801-AD29-234D5C4EB29C}" srcOrd="0" destOrd="0" presId="urn:microsoft.com/office/officeart/2005/8/layout/orgChart1"/>
-    <dgm:cxn modelId="{76FF6951-B899-4984-97BF-78ABA4449E40}" type="presOf" srcId="{6CCD5503-01E5-4C86-8EFC-5F017D508467}" destId="{7333BF06-7B1A-47D2-83B9-64258DCEE59E}" srcOrd="0" destOrd="0" presId="urn:microsoft.com/office/officeart/2005/8/layout/orgChart1"/>
-    <dgm:cxn modelId="{74A7C8EA-52F1-4CBF-961C-62C6C5B9A3FB}" type="presOf" srcId="{F27F8D6F-03A5-429D-BDD0-702BFC21B6F0}" destId="{F21B52D0-B08C-497F-8319-56B5DA6523B6}" srcOrd="0" destOrd="0" presId="urn:microsoft.com/office/officeart/2005/8/layout/orgChart1"/>
-    <dgm:cxn modelId="{F9299C4E-4D09-4206-A4D3-1862212D3301}" type="presOf" srcId="{C0EDF659-C35B-4EB3-A65D-2CEFAA43999B}" destId="{F572DEBC-670A-44EF-A3E4-3094B1E9B62C}" srcOrd="1" destOrd="0" presId="urn:microsoft.com/office/officeart/2005/8/layout/orgChart1"/>
-    <dgm:cxn modelId="{74172C81-A83A-4C0F-8A14-7400105BA931}" type="presOf" srcId="{AB74DD02-BF3F-45B5-8025-7F7CC2B7F0AF}" destId="{1495ABB2-EE30-4D6B-960C-2AE8B28A3DEE}" srcOrd="1" destOrd="0" presId="urn:microsoft.com/office/officeart/2005/8/layout/orgChart1"/>
-    <dgm:cxn modelId="{B115F0C3-E1DC-458B-B51B-579BC729549E}" type="presOf" srcId="{38912AFE-3D78-4266-8E99-4582EAA11DAA}" destId="{FC06127A-3788-446A-9EF8-244F2B7D169B}" srcOrd="0" destOrd="0" presId="urn:microsoft.com/office/officeart/2005/8/layout/orgChart1"/>
-    <dgm:cxn modelId="{7C9266A4-58E6-4781-B381-E3B5BC31D902}" srcId="{69404F52-DC68-4464-8C95-4A4EC5C3D511}" destId="{AB74DD02-BF3F-45B5-8025-7F7CC2B7F0AF}" srcOrd="0" destOrd="0" parTransId="{0C5A7F20-7BF1-4D54-8603-B4C57EB9E51E}" sibTransId="{4DD56927-21C8-4BA9-8A88-EC2F6591D693}"/>
-    <dgm:cxn modelId="{12BA031F-FF7F-4D8C-A5B8-6868AFAB5D64}" type="presOf" srcId="{CF7F02CB-0026-4C85-A83C-2611CA0EC12E}" destId="{8EBBDB76-DF10-4764-B8B8-496AD4C5615C}" srcOrd="0" destOrd="0" presId="urn:microsoft.com/office/officeart/2005/8/layout/orgChart1"/>
-    <dgm:cxn modelId="{A8905A9F-8981-4BCD-A582-4F4C0DD6068C}" type="presOf" srcId="{69404F52-DC68-4464-8C95-4A4EC5C3D511}" destId="{EF27B91A-A527-4B5D-8953-3DEFA4CD70BE}" srcOrd="0" destOrd="0" presId="urn:microsoft.com/office/officeart/2005/8/layout/orgChart1"/>
+    <dgm:cxn modelId="{494E18AC-0DF3-4E11-984A-C3757D6E03CF}" type="presOf" srcId="{8782F143-7EBE-4652-BCB6-342F97295F78}" destId="{15615975-D7C1-4DD7-92D8-7DA4D4FB6EB9}" srcOrd="1" destOrd="0" presId="urn:microsoft.com/office/officeart/2005/8/layout/orgChart1"/>
     <dgm:cxn modelId="{C58BDBD0-5A03-4216-8E13-AD60799CD80E}" type="presParOf" srcId="{7DF29361-70E6-4A90-8106-66BD992952A3}" destId="{092F7640-4E97-435E-A273-04AB9B209B41}" srcOrd="0" destOrd="0" presId="urn:microsoft.com/office/officeart/2005/8/layout/orgChart1"/>
     <dgm:cxn modelId="{C86AC3D0-236B-4146-ADD7-108FD5805AFC}" type="presParOf" srcId="{092F7640-4E97-435E-A273-04AB9B209B41}" destId="{1F67BD07-D585-4BD6-88EA-D8E5F5FF308F}" srcOrd="0" destOrd="0" presId="urn:microsoft.com/office/officeart/2005/8/layout/orgChart1"/>
     <dgm:cxn modelId="{56CEF3C8-E3EB-412A-B81D-88A08857D347}" type="presParOf" srcId="{1F67BD07-D585-4BD6-88EA-D8E5F5FF308F}" destId="{F21B52D0-B08C-497F-8319-56B5DA6523B6}" srcOrd="0" destOrd="0" presId="urn:microsoft.com/office/officeart/2005/8/layout/orgChart1"/>
@@ -1843,7 +1843,7 @@
   </dgm:whole>
   <dgm:extLst>
     <a:ext uri="http://schemas.microsoft.com/office/drawing/2008/diagram">
-      <dsp:dataModelExt xmlns:dsp="http://schemas.microsoft.com/office/drawing/2008/diagram" xmlns="" relId="rId6" minVer="http://schemas.openxmlformats.org/drawingml/2006/diagram"/>
+      <dsp:dataModelExt xmlns:dsp="http://schemas.microsoft.com/office/drawing/2008/diagram" relId="rId6" minVer="http://schemas.openxmlformats.org/drawingml/2006/diagram"/>
     </a:ext>
   </dgm:extLst>
 </dgm:dataModel>
@@ -1864,8 +1864,8 @@
       </dsp:nvSpPr>
       <dsp:spPr>
         <a:xfrm>
-          <a:off x="2752717" y="677947"/>
-          <a:ext cx="1470819" cy="255266"/>
+          <a:off x="3155394" y="861325"/>
+          <a:ext cx="1873358" cy="325128"/>
         </a:xfrm>
         <a:custGeom>
           <a:avLst/>
@@ -1879,13 +1879,13 @@
                 <a:pt x="0" y="0"/>
               </a:moveTo>
               <a:lnTo>
-                <a:pt x="0" y="127633"/>
+                <a:pt x="0" y="162564"/>
               </a:lnTo>
               <a:lnTo>
-                <a:pt x="1470819" y="127633"/>
+                <a:pt x="1873358" y="162564"/>
               </a:lnTo>
               <a:lnTo>
-                <a:pt x="1470819" y="255266"/>
+                <a:pt x="1873358" y="325128"/>
               </a:lnTo>
             </a:path>
           </a:pathLst>
@@ -1893,7 +1893,13 @@
         <a:noFill/>
         <a:ln w="9525" cap="flat" cmpd="sng" algn="ctr">
           <a:solidFill>
-            <a:schemeClr val="accent3"/>
+            <a:schemeClr val="accent1">
+              <a:shade val="60000"/>
+              <a:hueOff val="0"/>
+              <a:satOff val="0"/>
+              <a:lumOff val="0"/>
+              <a:alphaOff val="0"/>
+            </a:schemeClr>
           </a:solidFill>
           <a:prstDash val="solid"/>
         </a:ln>
@@ -1901,17 +1907,15 @@
       </dsp:spPr>
       <dsp:style>
         <a:lnRef idx="1">
-          <a:schemeClr val="accent3"/>
+          <a:scrgbClr r="0" g="0" b="0"/>
         </a:lnRef>
-        <a:fillRef idx="2">
-          <a:schemeClr val="accent3"/>
+        <a:fillRef idx="0">
+          <a:scrgbClr r="0" g="0" b="0"/>
         </a:fillRef>
-        <a:effectRef idx="1">
-          <a:schemeClr val="accent3"/>
+        <a:effectRef idx="0">
+          <a:scrgbClr r="0" g="0" b="0"/>
         </a:effectRef>
-        <a:fontRef idx="minor">
-          <a:schemeClr val="dk1"/>
-        </a:fontRef>
+        <a:fontRef idx="minor"/>
       </dsp:style>
     </dsp:sp>
     <dsp:sp modelId="{FC06127A-3788-446A-9EF8-244F2B7D169B}">
@@ -1921,8 +1925,8 @@
       </dsp:nvSpPr>
       <dsp:spPr>
         <a:xfrm>
-          <a:off x="2706997" y="677947"/>
-          <a:ext cx="91440" cy="255266"/>
+          <a:off x="3109674" y="861325"/>
+          <a:ext cx="91440" cy="325128"/>
         </a:xfrm>
         <a:custGeom>
           <a:avLst/>
@@ -1936,7 +1940,7 @@
                 <a:pt x="45720" y="0"/>
               </a:moveTo>
               <a:lnTo>
-                <a:pt x="45720" y="255266"/>
+                <a:pt x="45720" y="325128"/>
               </a:lnTo>
             </a:path>
           </a:pathLst>
@@ -1944,7 +1948,13 @@
         <a:noFill/>
         <a:ln w="9525" cap="flat" cmpd="sng" algn="ctr">
           <a:solidFill>
-            <a:schemeClr val="accent3"/>
+            <a:schemeClr val="accent1">
+              <a:shade val="60000"/>
+              <a:hueOff val="0"/>
+              <a:satOff val="0"/>
+              <a:lumOff val="0"/>
+              <a:alphaOff val="0"/>
+            </a:schemeClr>
           </a:solidFill>
           <a:prstDash val="solid"/>
         </a:ln>
@@ -1952,17 +1962,15 @@
       </dsp:spPr>
       <dsp:style>
         <a:lnRef idx="1">
-          <a:schemeClr val="accent3"/>
+          <a:scrgbClr r="0" g="0" b="0"/>
         </a:lnRef>
-        <a:fillRef idx="2">
-          <a:schemeClr val="accent3"/>
+        <a:fillRef idx="0">
+          <a:scrgbClr r="0" g="0" b="0"/>
         </a:fillRef>
-        <a:effectRef idx="1">
-          <a:schemeClr val="accent3"/>
+        <a:effectRef idx="0">
+          <a:scrgbClr r="0" g="0" b="0"/>
         </a:effectRef>
-        <a:fontRef idx="minor">
-          <a:schemeClr val="dk1"/>
-        </a:fontRef>
+        <a:fontRef idx="minor"/>
       </dsp:style>
     </dsp:sp>
     <dsp:sp modelId="{7333BF06-7B1A-47D2-83B9-64258DCEE59E}">
@@ -1972,8 +1980,8 @@
       </dsp:nvSpPr>
       <dsp:spPr>
         <a:xfrm>
-          <a:off x="795676" y="2404033"/>
-          <a:ext cx="172803" cy="444850"/>
+          <a:off x="662743" y="3059812"/>
+          <a:ext cx="444125" cy="585068"/>
         </a:xfrm>
         <a:custGeom>
           <a:avLst/>
@@ -1987,10 +1995,10 @@
                 <a:pt x="0" y="0"/>
               </a:moveTo>
               <a:lnTo>
-                <a:pt x="0" y="444850"/>
+                <a:pt x="0" y="585068"/>
               </a:lnTo>
               <a:lnTo>
-                <a:pt x="172803" y="444850"/>
+                <a:pt x="444125" y="585068"/>
               </a:lnTo>
             </a:path>
           </a:pathLst>
@@ -1998,7 +2006,13 @@
         <a:noFill/>
         <a:ln w="9525" cap="flat" cmpd="sng" algn="ctr">
           <a:solidFill>
-            <a:schemeClr val="accent3"/>
+            <a:schemeClr val="accent1">
+              <a:shade val="80000"/>
+              <a:hueOff val="0"/>
+              <a:satOff val="0"/>
+              <a:lumOff val="0"/>
+              <a:alphaOff val="0"/>
+            </a:schemeClr>
           </a:solidFill>
           <a:prstDash val="solid"/>
         </a:ln>
@@ -2006,17 +2020,15 @@
       </dsp:spPr>
       <dsp:style>
         <a:lnRef idx="1">
-          <a:schemeClr val="accent3"/>
+          <a:scrgbClr r="0" g="0" b="0"/>
         </a:lnRef>
-        <a:fillRef idx="2">
-          <a:schemeClr val="accent3"/>
+        <a:fillRef idx="0">
+          <a:scrgbClr r="0" g="0" b="0"/>
         </a:fillRef>
-        <a:effectRef idx="1">
-          <a:schemeClr val="accent3"/>
+        <a:effectRef idx="0">
+          <a:scrgbClr r="0" g="0" b="0"/>
         </a:effectRef>
-        <a:fontRef idx="minor">
-          <a:schemeClr val="dk1"/>
-        </a:fontRef>
+        <a:fontRef idx="minor"/>
       </dsp:style>
     </dsp:sp>
     <dsp:sp modelId="{09519A4A-757A-4FD3-B530-30AAEFBECC94}">
@@ -2026,8 +2038,8 @@
       </dsp:nvSpPr>
       <dsp:spPr>
         <a:xfrm>
-          <a:off x="1236177" y="1540990"/>
-          <a:ext cx="91440" cy="255266"/>
+          <a:off x="1236315" y="1960568"/>
+          <a:ext cx="91440" cy="325128"/>
         </a:xfrm>
         <a:custGeom>
           <a:avLst/>
@@ -2041,7 +2053,7 @@
                 <a:pt x="45720" y="0"/>
               </a:moveTo>
               <a:lnTo>
-                <a:pt x="45720" y="255266"/>
+                <a:pt x="45720" y="325128"/>
               </a:lnTo>
             </a:path>
           </a:pathLst>
@@ -2049,7 +2061,13 @@
         <a:noFill/>
         <a:ln w="9525" cap="flat" cmpd="sng" algn="ctr">
           <a:solidFill>
-            <a:schemeClr val="accent3"/>
+            <a:schemeClr val="accent1">
+              <a:shade val="80000"/>
+              <a:hueOff val="0"/>
+              <a:satOff val="0"/>
+              <a:lumOff val="0"/>
+              <a:alphaOff val="0"/>
+            </a:schemeClr>
           </a:solidFill>
           <a:prstDash val="solid"/>
         </a:ln>
@@ -2057,17 +2075,15 @@
       </dsp:spPr>
       <dsp:style>
         <a:lnRef idx="1">
-          <a:schemeClr val="accent3"/>
+          <a:scrgbClr r="0" g="0" b="0"/>
         </a:lnRef>
-        <a:fillRef idx="2">
-          <a:schemeClr val="accent3"/>
+        <a:fillRef idx="0">
+          <a:scrgbClr r="0" g="0" b="0"/>
         </a:fillRef>
-        <a:effectRef idx="1">
-          <a:schemeClr val="accent3"/>
+        <a:effectRef idx="0">
+          <a:scrgbClr r="0" g="0" b="0"/>
         </a:effectRef>
-        <a:fontRef idx="minor">
-          <a:schemeClr val="dk1"/>
-        </a:fontRef>
+        <a:fontRef idx="minor"/>
       </dsp:style>
     </dsp:sp>
     <dsp:sp modelId="{8EBBDB76-DF10-4764-B8B8-496AD4C5615C}">
@@ -2077,8 +2093,8 @@
       </dsp:nvSpPr>
       <dsp:spPr>
         <a:xfrm>
-          <a:off x="1281897" y="677947"/>
-          <a:ext cx="1470819" cy="255266"/>
+          <a:off x="1282035" y="861325"/>
+          <a:ext cx="1873358" cy="325128"/>
         </a:xfrm>
         <a:custGeom>
           <a:avLst/>
@@ -2089,16 +2105,16 @@
           <a:pathLst>
             <a:path>
               <a:moveTo>
-                <a:pt x="1470819" y="0"/>
+                <a:pt x="1873358" y="0"/>
               </a:moveTo>
               <a:lnTo>
-                <a:pt x="1470819" y="127633"/>
+                <a:pt x="1873358" y="162564"/>
               </a:lnTo>
               <a:lnTo>
-                <a:pt x="0" y="127633"/>
+                <a:pt x="0" y="162564"/>
               </a:lnTo>
               <a:lnTo>
-                <a:pt x="0" y="255266"/>
+                <a:pt x="0" y="325128"/>
               </a:lnTo>
             </a:path>
           </a:pathLst>
@@ -2106,7 +2122,13 @@
         <a:noFill/>
         <a:ln w="9525" cap="flat" cmpd="sng" algn="ctr">
           <a:solidFill>
-            <a:schemeClr val="accent3"/>
+            <a:schemeClr val="accent1">
+              <a:shade val="60000"/>
+              <a:hueOff val="0"/>
+              <a:satOff val="0"/>
+              <a:lumOff val="0"/>
+              <a:alphaOff val="0"/>
+            </a:schemeClr>
           </a:solidFill>
           <a:prstDash val="solid"/>
         </a:ln>
@@ -2114,17 +2136,15 @@
       </dsp:spPr>
       <dsp:style>
         <a:lnRef idx="1">
-          <a:schemeClr val="accent3"/>
+          <a:scrgbClr r="0" g="0" b="0"/>
         </a:lnRef>
-        <a:fillRef idx="2">
-          <a:schemeClr val="accent3"/>
+        <a:fillRef idx="0">
+          <a:scrgbClr r="0" g="0" b="0"/>
         </a:fillRef>
-        <a:effectRef idx="1">
-          <a:schemeClr val="accent3"/>
+        <a:effectRef idx="0">
+          <a:scrgbClr r="0" g="0" b="0"/>
         </a:effectRef>
-        <a:fontRef idx="minor">
-          <a:schemeClr val="dk1"/>
-        </a:fontRef>
+        <a:fontRef idx="minor"/>
       </dsp:style>
     </dsp:sp>
     <dsp:sp modelId="{F21B52D0-B08C-497F-8319-56B5DA6523B6}">
@@ -2134,63 +2154,142 @@
       </dsp:nvSpPr>
       <dsp:spPr>
         <a:xfrm>
-          <a:off x="2144940" y="70170"/>
-          <a:ext cx="1215553" cy="607776"/>
+          <a:off x="2381279" y="87210"/>
+          <a:ext cx="1548230" cy="774115"/>
         </a:xfrm>
         <a:prstGeom prst="rect">
           <a:avLst/>
         </a:prstGeom>
-        <a:gradFill rotWithShape="1">
-          <a:gsLst>
-            <a:gs pos="0">
-              <a:schemeClr val="accent3">
-                <a:tint val="20000"/>
-                <a:satMod val="180000"/>
-                <a:lumMod val="98000"/>
-              </a:schemeClr>
-            </a:gs>
-            <a:gs pos="40000">
-              <a:schemeClr val="accent3">
-                <a:tint val="30000"/>
-                <a:satMod val="260000"/>
-                <a:lumMod val="84000"/>
-              </a:schemeClr>
-            </a:gs>
-            <a:gs pos="100000">
-              <a:schemeClr val="accent3">
-                <a:tint val="100000"/>
-                <a:satMod val="110000"/>
-                <a:lumMod val="100000"/>
-              </a:schemeClr>
-            </a:gs>
-          </a:gsLst>
-          <a:lin ang="5040000" scaled="1"/>
-        </a:gradFill>
-        <a:ln w="9525" cap="flat" cmpd="sng" algn="ctr">
-          <a:solidFill>
-            <a:schemeClr val="accent3"/>
-          </a:solidFill>
-          <a:prstDash val="solid"/>
+        <a:solidFill>
+          <a:srgbClr val="94CC16">
+            <a:alpha val="73000"/>
+          </a:srgbClr>
+        </a:solidFill>
+        <a:ln>
+          <a:noFill/>
         </a:ln>
-        <a:effectLst/>
+        <a:effectLst>
+          <a:outerShdw blurRad="50800" dist="25400" dir="5400000" rotWithShape="0">
+            <a:srgbClr val="000000">
+              <a:alpha val="28000"/>
+            </a:srgbClr>
+          </a:outerShdw>
+        </a:effectLst>
         <a:scene3d>
-          <a:camera prst="orthographicFront"/>
-          <a:lightRig rig="flat" dir="t"/>
+          <a:camera prst="orthographicFront">
+            <a:rot lat="0" lon="0" rev="0"/>
+          </a:camera>
+          <a:lightRig rig="threePt" dir="tl">
+            <a:rot lat="0" lon="0" rev="20400000"/>
+          </a:lightRig>
         </a:scene3d>
-        <a:sp3d/>
+        <a:sp3d>
+          <a:bevelT w="50800" h="12700" prst="softRound"/>
+        </a:sp3d>
       </dsp:spPr>
       <dsp:style>
-        <a:lnRef idx="1">
-          <a:schemeClr val="accent3"/>
+        <a:lnRef idx="0">
+          <a:scrgbClr r="0" g="0" b="0"/>
         </a:lnRef>
-        <a:fillRef idx="2">
-          <a:schemeClr val="accent3"/>
+        <a:fillRef idx="3">
+          <a:scrgbClr r="0" g="0" b="0"/>
         </a:fillRef>
-        <a:effectRef idx="1">
-          <a:schemeClr val="accent3"/>
+        <a:effectRef idx="2">
+          <a:scrgbClr r="0" g="0" b="0"/>
         </a:effectRef>
         <a:fontRef idx="minor">
-          <a:schemeClr val="dk1"/>
+          <a:schemeClr val="lt1"/>
+        </a:fontRef>
+      </dsp:style>
+      <dsp:txBody>
+        <a:bodyPr spcFirstLastPara="0" vert="horz" wrap="square" lIns="12700" tIns="12700" rIns="12700" bIns="12700" numCol="1" spcCol="1270" anchor="ctr" anchorCtr="0">
+          <a:noAutofit/>
+        </a:bodyPr>
+        <a:lstStyle/>
+        <a:p>
+          <a:pPr lvl="0" algn="ctr" defTabSz="889000">
+            <a:lnSpc>
+              <a:spcPct val="90000"/>
+            </a:lnSpc>
+            <a:spcBef>
+              <a:spcPct val="0"/>
+            </a:spcBef>
+            <a:spcAft>
+              <a:spcPct val="35000"/>
+            </a:spcAft>
+          </a:pPr>
+          <a:r>
+            <a:rPr lang="en-US" sz="2000" b="1" kern="1200" dirty="0" err="1" smtClean="0">
+              <a:solidFill>
+                <a:schemeClr val="tx1"/>
+              </a:solidFill>
+            </a:rPr>
+            <a:t>Presidencia</a:t>
+          </a:r>
+          <a:endParaRPr lang="es-AR" sz="2000" b="1" kern="1200" dirty="0">
+            <a:solidFill>
+              <a:schemeClr val="tx1"/>
+            </a:solidFill>
+          </a:endParaRPr>
+        </a:p>
+      </dsp:txBody>
+      <dsp:txXfrm>
+        <a:off x="2381279" y="87210"/>
+        <a:ext cx="1548230" cy="774115"/>
+      </dsp:txXfrm>
+    </dsp:sp>
+    <dsp:sp modelId="{EF27B91A-A527-4B5D-8953-3DEFA4CD70BE}">
+      <dsp:nvSpPr>
+        <dsp:cNvPr id="0" name=""/>
+        <dsp:cNvSpPr/>
+      </dsp:nvSpPr>
+      <dsp:spPr>
+        <a:xfrm>
+          <a:off x="507920" y="1186453"/>
+          <a:ext cx="1548230" cy="774115"/>
+        </a:xfrm>
+        <a:prstGeom prst="rect">
+          <a:avLst/>
+        </a:prstGeom>
+        <a:solidFill>
+          <a:srgbClr val="94CC16">
+            <a:alpha val="73000"/>
+          </a:srgbClr>
+        </a:solidFill>
+        <a:ln>
+          <a:noFill/>
+        </a:ln>
+        <a:effectLst>
+          <a:outerShdw blurRad="50800" dist="25400" dir="5400000" rotWithShape="0">
+            <a:srgbClr val="000000">
+              <a:alpha val="28000"/>
+            </a:srgbClr>
+          </a:outerShdw>
+        </a:effectLst>
+        <a:scene3d>
+          <a:camera prst="orthographicFront">
+            <a:rot lat="0" lon="0" rev="0"/>
+          </a:camera>
+          <a:lightRig rig="threePt" dir="tl">
+            <a:rot lat="0" lon="0" rev="20400000"/>
+          </a:lightRig>
+        </a:scene3d>
+        <a:sp3d>
+          <a:bevelT w="50800" h="12700" prst="softRound"/>
+        </a:sp3d>
+      </dsp:spPr>
+      <dsp:style>
+        <a:lnRef idx="0">
+          <a:scrgbClr r="0" g="0" b="0"/>
+        </a:lnRef>
+        <a:fillRef idx="3">
+          <a:scrgbClr r="0" g="0" b="0"/>
+        </a:fillRef>
+        <a:effectRef idx="2">
+          <a:scrgbClr r="0" g="0" b="0"/>
+        </a:effectRef>
+        <a:fontRef idx="minor">
+          <a:schemeClr val="lt1"/>
         </a:fontRef>
       </dsp:style>
       <dsp:txBody>
@@ -2211,81 +2310,89 @@
             </a:spcAft>
           </a:pPr>
           <a:r>
-            <a:rPr lang="en-US" sz="1400" kern="1200"/>
-            <a:t>Presidencia</a:t>
+            <a:rPr lang="en-US" sz="1400" b="1" kern="1200" dirty="0">
+              <a:solidFill>
+                <a:schemeClr val="tx1"/>
+              </a:solidFill>
+            </a:rPr>
+            <a:t>Supervision de </a:t>
           </a:r>
-          <a:endParaRPr lang="es-AR" sz="1400" kern="1200"/>
+          <a:r>
+            <a:rPr lang="en-US" sz="1400" b="1" kern="1200" dirty="0" err="1">
+              <a:solidFill>
+                <a:schemeClr val="tx1"/>
+              </a:solidFill>
+            </a:rPr>
+            <a:t>Proyectos</a:t>
+          </a:r>
+          <a:endParaRPr lang="es-AR" sz="1400" b="1" kern="1200" dirty="0">
+            <a:solidFill>
+              <a:schemeClr val="tx1"/>
+            </a:solidFill>
+          </a:endParaRPr>
         </a:p>
       </dsp:txBody>
       <dsp:txXfrm>
-        <a:off x="2144940" y="70170"/>
-        <a:ext cx="1215553" cy="607776"/>
+        <a:off x="507920" y="1186453"/>
+        <a:ext cx="1548230" cy="774115"/>
       </dsp:txXfrm>
     </dsp:sp>
-    <dsp:sp modelId="{EF27B91A-A527-4B5D-8953-3DEFA4CD70BE}">
+    <dsp:sp modelId="{76382964-F0B9-4801-AD29-234D5C4EB29C}">
       <dsp:nvSpPr>
         <dsp:cNvPr id="0" name=""/>
         <dsp:cNvSpPr/>
       </dsp:nvSpPr>
       <dsp:spPr>
         <a:xfrm>
-          <a:off x="674120" y="933213"/>
-          <a:ext cx="1215553" cy="607776"/>
+          <a:off x="507920" y="2285697"/>
+          <a:ext cx="1548230" cy="774115"/>
         </a:xfrm>
         <a:prstGeom prst="rect">
           <a:avLst/>
         </a:prstGeom>
-        <a:gradFill rotWithShape="1">
-          <a:gsLst>
-            <a:gs pos="0">
-              <a:schemeClr val="accent3">
-                <a:tint val="20000"/>
-                <a:satMod val="180000"/>
-                <a:lumMod val="98000"/>
-              </a:schemeClr>
-            </a:gs>
-            <a:gs pos="40000">
-              <a:schemeClr val="accent3">
-                <a:tint val="30000"/>
-                <a:satMod val="260000"/>
-                <a:lumMod val="84000"/>
-              </a:schemeClr>
-            </a:gs>
-            <a:gs pos="100000">
-              <a:schemeClr val="accent3">
-                <a:tint val="100000"/>
-                <a:satMod val="110000"/>
-                <a:lumMod val="100000"/>
-              </a:schemeClr>
-            </a:gs>
-          </a:gsLst>
-          <a:lin ang="5040000" scaled="1"/>
-        </a:gradFill>
-        <a:ln w="9525" cap="flat" cmpd="sng" algn="ctr">
+        <a:solidFill>
+          <a:srgbClr val="94CC16">
+            <a:alpha val="73000"/>
+          </a:srgbClr>
+        </a:solidFill>
+        <a:ln>
           <a:solidFill>
-            <a:schemeClr val="accent3"/>
+            <a:schemeClr val="bg2">
+              <a:lumMod val="50000"/>
+            </a:schemeClr>
           </a:solidFill>
-          <a:prstDash val="solid"/>
         </a:ln>
-        <a:effectLst/>
+        <a:effectLst>
+          <a:outerShdw blurRad="50800" dist="25400" dir="5400000" rotWithShape="0">
+            <a:srgbClr val="000000">
+              <a:alpha val="28000"/>
+            </a:srgbClr>
+          </a:outerShdw>
+        </a:effectLst>
         <a:scene3d>
-          <a:camera prst="orthographicFront"/>
-          <a:lightRig rig="flat" dir="t"/>
+          <a:camera prst="orthographicFront">
+            <a:rot lat="0" lon="0" rev="0"/>
+          </a:camera>
+          <a:lightRig rig="threePt" dir="tl">
+            <a:rot lat="0" lon="0" rev="20400000"/>
+          </a:lightRig>
         </a:scene3d>
-        <a:sp3d/>
+        <a:sp3d>
+          <a:bevelT w="50800" h="12700" prst="softRound"/>
+        </a:sp3d>
       </dsp:spPr>
       <dsp:style>
-        <a:lnRef idx="1">
-          <a:schemeClr val="accent3"/>
+        <a:lnRef idx="0">
+          <a:scrgbClr r="0" g="0" b="0"/>
         </a:lnRef>
-        <a:fillRef idx="2">
-          <a:schemeClr val="accent3"/>
+        <a:fillRef idx="3">
+          <a:scrgbClr r="0" g="0" b="0"/>
         </a:fillRef>
-        <a:effectRef idx="1">
-          <a:schemeClr val="accent3"/>
+        <a:effectRef idx="2">
+          <a:scrgbClr r="0" g="0" b="0"/>
         </a:effectRef>
         <a:fontRef idx="minor">
-          <a:schemeClr val="dk1"/>
+          <a:schemeClr val="lt1"/>
         </a:fontRef>
       </dsp:style>
       <dsp:txBody>
@@ -2306,81 +2413,93 @@
             </a:spcAft>
           </a:pPr>
           <a:r>
-            <a:rPr lang="en-US" sz="1400" kern="1200"/>
-            <a:t>Supervision de Proyectos</a:t>
+            <a:rPr lang="en-US" sz="1400" b="1" kern="1200" dirty="0" err="1">
+              <a:solidFill>
+                <a:schemeClr val="tx1"/>
+              </a:solidFill>
+            </a:rPr>
+            <a:t>Administración</a:t>
           </a:r>
-          <a:endParaRPr lang="es-AR" sz="1400" kern="1200"/>
+          <a:r>
+            <a:rPr lang="en-US" sz="1400" b="1" kern="1200" dirty="0">
+              <a:solidFill>
+                <a:schemeClr val="tx1"/>
+              </a:solidFill>
+            </a:rPr>
+            <a:t> de </a:t>
+          </a:r>
+          <a:r>
+            <a:rPr lang="en-US" sz="1400" b="1" kern="1200" dirty="0" err="1">
+              <a:solidFill>
+                <a:schemeClr val="tx1"/>
+              </a:solidFill>
+            </a:rPr>
+            <a:t>Proyectos</a:t>
+          </a:r>
+          <a:endParaRPr lang="es-AR" sz="1400" b="1" kern="1200" dirty="0">
+            <a:solidFill>
+              <a:schemeClr val="tx1"/>
+            </a:solidFill>
+          </a:endParaRPr>
         </a:p>
       </dsp:txBody>
       <dsp:txXfrm>
-        <a:off x="674120" y="933213"/>
-        <a:ext cx="1215553" cy="607776"/>
+        <a:off x="507920" y="2285697"/>
+        <a:ext cx="1548230" cy="774115"/>
       </dsp:txXfrm>
     </dsp:sp>
-    <dsp:sp modelId="{76382964-F0B9-4801-AD29-234D5C4EB29C}">
+    <dsp:sp modelId="{C999530D-970C-4F19-A91A-981537024566}">
       <dsp:nvSpPr>
         <dsp:cNvPr id="0" name=""/>
         <dsp:cNvSpPr/>
       </dsp:nvSpPr>
       <dsp:spPr>
         <a:xfrm>
-          <a:off x="674120" y="1796256"/>
-          <a:ext cx="1215553" cy="607776"/>
+          <a:off x="1106869" y="3257823"/>
+          <a:ext cx="1548230" cy="774115"/>
         </a:xfrm>
         <a:prstGeom prst="rect">
           <a:avLst/>
         </a:prstGeom>
-        <a:gradFill rotWithShape="1">
-          <a:gsLst>
-            <a:gs pos="0">
-              <a:schemeClr val="accent3">
-                <a:tint val="20000"/>
-                <a:satMod val="180000"/>
-                <a:lumMod val="98000"/>
-              </a:schemeClr>
-            </a:gs>
-            <a:gs pos="40000">
-              <a:schemeClr val="accent3">
-                <a:tint val="30000"/>
-                <a:satMod val="260000"/>
-                <a:lumMod val="84000"/>
-              </a:schemeClr>
-            </a:gs>
-            <a:gs pos="100000">
-              <a:schemeClr val="accent3">
-                <a:tint val="100000"/>
-                <a:satMod val="110000"/>
-                <a:lumMod val="100000"/>
-              </a:schemeClr>
-            </a:gs>
-          </a:gsLst>
-          <a:lin ang="5040000" scaled="1"/>
-        </a:gradFill>
-        <a:ln w="9525" cap="flat" cmpd="sng" algn="ctr">
-          <a:solidFill>
-            <a:schemeClr val="accent3"/>
-          </a:solidFill>
-          <a:prstDash val="solid"/>
+        <a:solidFill>
+          <a:srgbClr val="94CC16">
+            <a:alpha val="73000"/>
+          </a:srgbClr>
+        </a:solidFill>
+        <a:ln>
+          <a:noFill/>
         </a:ln>
-        <a:effectLst/>
+        <a:effectLst>
+          <a:outerShdw blurRad="50800" dist="25400" dir="5400000" rotWithShape="0">
+            <a:srgbClr val="000000">
+              <a:alpha val="28000"/>
+            </a:srgbClr>
+          </a:outerShdw>
+        </a:effectLst>
         <a:scene3d>
-          <a:camera prst="orthographicFront"/>
-          <a:lightRig rig="flat" dir="t"/>
+          <a:camera prst="orthographicFront">
+            <a:rot lat="0" lon="0" rev="0"/>
+          </a:camera>
+          <a:lightRig rig="threePt" dir="tl">
+            <a:rot lat="0" lon="0" rev="20400000"/>
+          </a:lightRig>
         </a:scene3d>
-        <a:sp3d/>
+        <a:sp3d>
+          <a:bevelT w="50800" h="12700" prst="softRound"/>
+        </a:sp3d>
       </dsp:spPr>
       <dsp:style>
-        <a:lnRef idx="1">
-          <a:schemeClr val="accent3"/>
+        <a:lnRef idx="0">
+          <a:scrgbClr r="0" g="0" b="0"/>
         </a:lnRef>
-        <a:fillRef idx="2">
-          <a:schemeClr val="accent3"/>
+        <a:fillRef idx="3">
+          <a:scrgbClr r="0" g="0" b="0"/>
         </a:fillRef>
-        <a:effectRef idx="1">
-          <a:schemeClr val="accent3"/>
+        <a:effectRef idx="2">
+          <a:scrgbClr r="0" g="0" b="0"/>
         </a:effectRef>
         <a:fontRef idx="minor">
-          <a:schemeClr val="dk1"/>
+          <a:schemeClr val="lt1"/>
         </a:fontRef>
       </dsp:style>
       <dsp:txBody>
@@ -2401,81 +2520,72 @@
             </a:spcAft>
           </a:pPr>
           <a:r>
-            <a:rPr lang="en-US" sz="1400" kern="1200"/>
-            <a:t>Administración de Proyectos</a:t>
+            <a:rPr lang="es-AR" sz="1400" b="1" kern="1200" dirty="0">
+              <a:solidFill>
+                <a:schemeClr val="tx1"/>
+              </a:solidFill>
+            </a:rPr>
+            <a:t>Cuadrillas</a:t>
           </a:r>
-          <a:endParaRPr lang="es-AR" sz="1400" kern="1200"/>
         </a:p>
       </dsp:txBody>
       <dsp:txXfrm>
-        <a:off x="674120" y="1796256"/>
-        <a:ext cx="1215553" cy="607776"/>
+        <a:off x="1106869" y="3257823"/>
+        <a:ext cx="1548230" cy="774115"/>
       </dsp:txXfrm>
     </dsp:sp>
-    <dsp:sp modelId="{C999530D-970C-4F19-A91A-981537024566}">
+    <dsp:sp modelId="{D70C0BDD-DBCA-4018-8B04-41A27590CEAD}">
       <dsp:nvSpPr>
         <dsp:cNvPr id="0" name=""/>
         <dsp:cNvSpPr/>
       </dsp:nvSpPr>
       <dsp:spPr>
         <a:xfrm>
-          <a:off x="968479" y="2544995"/>
-          <a:ext cx="1215553" cy="607776"/>
+          <a:off x="2381279" y="1186453"/>
+          <a:ext cx="1548230" cy="774115"/>
         </a:xfrm>
         <a:prstGeom prst="rect">
           <a:avLst/>
         </a:prstGeom>
-        <a:gradFill rotWithShape="1">
-          <a:gsLst>
-            <a:gs pos="0">
-              <a:schemeClr val="accent3">
-                <a:tint val="20000"/>
-                <a:satMod val="180000"/>
-                <a:lumMod val="98000"/>
-              </a:schemeClr>
-            </a:gs>
-            <a:gs pos="40000">
-              <a:schemeClr val="accent3">
-                <a:tint val="30000"/>
-                <a:satMod val="260000"/>
-                <a:lumMod val="84000"/>
-              </a:schemeClr>
-            </a:gs>
-            <a:gs pos="100000">
-              <a:schemeClr val="accent3">
-                <a:tint val="100000"/>
-                <a:satMod val="110000"/>
-                <a:lumMod val="100000"/>
-              </a:schemeClr>
-            </a:gs>
-          </a:gsLst>
-          <a:lin ang="5040000" scaled="1"/>
-        </a:gradFill>
-        <a:ln w="9525" cap="flat" cmpd="sng" algn="ctr">
-          <a:solidFill>
-            <a:schemeClr val="accent3"/>
-          </a:solidFill>
-          <a:prstDash val="solid"/>
+        <a:solidFill>
+          <a:srgbClr val="94CC16">
+            <a:alpha val="73000"/>
+          </a:srgbClr>
+        </a:solidFill>
+        <a:ln>
+          <a:noFill/>
         </a:ln>
-        <a:effectLst/>
+        <a:effectLst>
+          <a:outerShdw blurRad="50800" dist="25400" dir="5400000" rotWithShape="0">
+            <a:srgbClr val="000000">
+              <a:alpha val="28000"/>
+            </a:srgbClr>
+          </a:outerShdw>
+        </a:effectLst>
         <a:scene3d>
-          <a:camera prst="orthographicFront"/>
-          <a:lightRig rig="flat" dir="t"/>
+          <a:camera prst="orthographicFront">
+            <a:rot lat="0" lon="0" rev="0"/>
+          </a:camera>
+          <a:lightRig rig="threePt" dir="tl">
+            <a:rot lat="0" lon="0" rev="20400000"/>
+          </a:lightRig>
         </a:scene3d>
-        <a:sp3d/>
+        <a:sp3d>
+          <a:bevelT w="50800" h="12700" prst="softRound"/>
+        </a:sp3d>
       </dsp:spPr>
       <dsp:style>
-        <a:lnRef idx="1">
-          <a:schemeClr val="accent3"/>
+        <a:lnRef idx="0">
+          <a:scrgbClr r="0" g="0" b="0"/>
         </a:lnRef>
-        <a:fillRef idx="2">
-          <a:schemeClr val="accent3"/>
+        <a:fillRef idx="3">
+          <a:scrgbClr r="0" g="0" b="0"/>
         </a:fillRef>
-        <a:effectRef idx="1">
-          <a:schemeClr val="accent3"/>
+        <a:effectRef idx="2">
+          <a:scrgbClr r="0" g="0" b="0"/>
         </a:effectRef>
         <a:fontRef idx="minor">
-          <a:schemeClr val="dk1"/>
+          <a:schemeClr val="lt1"/>
         </a:fontRef>
       </dsp:style>
       <dsp:txBody>
@@ -2496,80 +2606,85 @@
             </a:spcAft>
           </a:pPr>
           <a:r>
-            <a:rPr lang="es-AR" sz="1400" kern="1200" dirty="0"/>
-            <a:t>Cuadrillas</a:t>
+            <a:rPr lang="en-US" sz="1400" b="1" kern="1200" dirty="0" err="1">
+              <a:solidFill>
+                <a:schemeClr val="tx1"/>
+              </a:solidFill>
+            </a:rPr>
+            <a:t>Administración</a:t>
           </a:r>
+          <a:r>
+            <a:rPr lang="en-US" sz="1400" b="1" kern="1200" dirty="0">
+              <a:solidFill>
+                <a:schemeClr val="tx1"/>
+              </a:solidFill>
+            </a:rPr>
+            <a:t> General</a:t>
+          </a:r>
+          <a:endParaRPr lang="es-AR" sz="1400" b="1" kern="1200" dirty="0">
+            <a:solidFill>
+              <a:schemeClr val="tx1"/>
+            </a:solidFill>
+          </a:endParaRPr>
         </a:p>
       </dsp:txBody>
       <dsp:txXfrm>
-        <a:off x="968479" y="2544995"/>
-        <a:ext cx="1215553" cy="607776"/>
+        <a:off x="2381279" y="1186453"/>
+        <a:ext cx="1548230" cy="774115"/>
       </dsp:txXfrm>
     </dsp:sp>
-    <dsp:sp modelId="{D70C0BDD-DBCA-4018-8B04-41A27590CEAD}">
+    <dsp:sp modelId="{2872F071-CCEC-4734-8E72-CEF275144F2A}">
       <dsp:nvSpPr>
         <dsp:cNvPr id="0" name=""/>
         <dsp:cNvSpPr/>
       </dsp:nvSpPr>
       <dsp:spPr>
         <a:xfrm>
-          <a:off x="2144940" y="933213"/>
-          <a:ext cx="1215553" cy="607776"/>
+          <a:off x="4254638" y="1186453"/>
+          <a:ext cx="1548230" cy="774115"/>
         </a:xfrm>
         <a:prstGeom prst="rect">
           <a:avLst/>
         </a:prstGeom>
-        <a:gradFill rotWithShape="1">
-          <a:gsLst>
-            <a:gs pos="0">
-              <a:schemeClr val="accent3">
-                <a:tint val="20000"/>
-                <a:satMod val="180000"/>
-                <a:lumMod val="98000"/>
-              </a:schemeClr>
-            </a:gs>
-            <a:gs pos="40000">
-              <a:schemeClr val="accent3">
-                <a:tint val="30000"/>
-                <a:satMod val="260000"/>
-                <a:lumMod val="84000"/>
-              </a:schemeClr>
-            </a:gs>
-            <a:gs pos="100000">
-              <a:schemeClr val="accent3">
-                <a:tint val="100000"/>
-                <a:satMod val="110000"/>
-                <a:lumMod val="100000"/>
-              </a:schemeClr>
-            </a:gs>
-          </a:gsLst>
-          <a:lin ang="5040000" scaled="1"/>
-        </a:gradFill>
-        <a:ln w="9525" cap="flat" cmpd="sng" algn="ctr">
-          <a:solidFill>
-            <a:schemeClr val="accent3"/>
-          </a:solidFill>
-          <a:prstDash val="solid"/>
+        <a:solidFill>
+          <a:srgbClr val="94CC16">
+            <a:alpha val="73000"/>
+          </a:srgbClr>
+        </a:solidFill>
+        <a:ln>
+          <a:noFill/>
         </a:ln>
-        <a:effectLst/>
+        <a:effectLst>
+          <a:outerShdw blurRad="50800" dist="25400" dir="5400000" rotWithShape="0">
+            <a:srgbClr val="000000">
+              <a:alpha val="28000"/>
+            </a:srgbClr>
+          </a:outerShdw>
+        </a:effectLst>
         <a:scene3d>
-          <a:camera prst="orthographicFront"/>
-          <a:lightRig rig="flat" dir="t"/>
+          <a:camera prst="orthographicFront">
+            <a:rot lat="0" lon="0" rev="0"/>
+          </a:camera>
+          <a:lightRig rig="threePt" dir="tl">
+            <a:rot lat="0" lon="0" rev="20400000"/>
+          </a:lightRig>
         </a:scene3d>
-        <a:sp3d/>
+        <a:sp3d>
+          <a:bevelT w="50800" h="12700" prst="softRound"/>
+        </a:sp3d>
       </dsp:spPr>
       <dsp:style>
-        <a:lnRef idx="1">
-          <a:schemeClr val="accent3"/>
+        <a:lnRef idx="0">
+          <a:scrgbClr r="0" g="0" b="0"/>
         </a:lnRef>
-        <a:fillRef idx="2">
-          <a:schemeClr val="accent3"/>
+        <a:fillRef idx="3">
+          <a:scrgbClr r="0" g="0" b="0"/>
         </a:fillRef>
-        <a:effectRef idx="1">
-          <a:schemeClr val="accent3"/>
+        <a:effectRef idx="2">
+          <a:scrgbClr r="0" g="0" b="0"/>
         </a:effectRef>
         <a:fontRef idx="minor">
-          <a:schemeClr val="dk1"/>
+          <a:schemeClr val="lt1"/>
         </a:fontRef>
       </dsp:style>
       <dsp:txBody>
@@ -2590,110 +2705,39 @@
             </a:spcAft>
           </a:pPr>
           <a:r>
-            <a:rPr lang="en-US" sz="1400" kern="1200"/>
-            <a:t>Administración General</a:t>
+            <a:rPr lang="en-US" sz="1400" b="1" kern="1200" dirty="0" err="1">
+              <a:solidFill>
+                <a:schemeClr val="tx1"/>
+              </a:solidFill>
+            </a:rPr>
+            <a:t>Seguridad</a:t>
           </a:r>
-          <a:endParaRPr lang="es-AR" sz="1400" kern="1200"/>
+          <a:r>
+            <a:rPr lang="en-US" sz="1400" b="1" kern="1200" dirty="0">
+              <a:solidFill>
+                <a:schemeClr val="tx1"/>
+              </a:solidFill>
+            </a:rPr>
+            <a:t> e </a:t>
+          </a:r>
+          <a:r>
+            <a:rPr lang="en-US" sz="1400" b="1" kern="1200" dirty="0" err="1">
+              <a:solidFill>
+                <a:schemeClr val="tx1"/>
+              </a:solidFill>
+            </a:rPr>
+            <a:t>Higiene</a:t>
+          </a:r>
+          <a:endParaRPr lang="es-AR" sz="1400" b="1" kern="1200" dirty="0">
+            <a:solidFill>
+              <a:schemeClr val="tx1"/>
+            </a:solidFill>
+          </a:endParaRPr>
         </a:p>
       </dsp:txBody>
       <dsp:txXfrm>
-        <a:off x="2144940" y="933213"/>
-        <a:ext cx="1215553" cy="607776"/>
-      </dsp:txXfrm>
-    </dsp:sp>
-    <dsp:sp modelId="{2872F071-CCEC-4734-8E72-CEF275144F2A}">
-      <dsp:nvSpPr>
-        <dsp:cNvPr id="0" name=""/>
-        <dsp:cNvSpPr/>
-      </dsp:nvSpPr>
-      <dsp:spPr>
-        <a:xfrm>
-          <a:off x="3615760" y="933213"/>
-          <a:ext cx="1215553" cy="607776"/>
-        </a:xfrm>
-        <a:prstGeom prst="rect">
-          <a:avLst/>
-        </a:prstGeom>
-        <a:gradFill rotWithShape="1">
-          <a:gsLst>
-            <a:gs pos="0">
-              <a:schemeClr val="accent3">
-                <a:tint val="20000"/>
-                <a:satMod val="180000"/>
-                <a:lumMod val="98000"/>
-              </a:schemeClr>
-            </a:gs>
-            <a:gs pos="40000">
-              <a:schemeClr val="accent3">
-                <a:tint val="30000"/>
-                <a:satMod val="260000"/>
-                <a:lumMod val="84000"/>
-              </a:schemeClr>
-            </a:gs>
-            <a:gs pos="100000">
-              <a:schemeClr val="accent3">
-                <a:tint val="100000"/>
-                <a:satMod val="110000"/>
-                <a:lumMod val="100000"/>
-              </a:schemeClr>
-            </a:gs>
-          </a:gsLst>
-          <a:lin ang="5040000" scaled="1"/>
-        </a:gradFill>
-        <a:ln w="9525" cap="flat" cmpd="sng" algn="ctr">
-          <a:solidFill>
-            <a:schemeClr val="accent3"/>
-          </a:solidFill>
-          <a:prstDash val="solid"/>
-        </a:ln>
-        <a:effectLst/>
-        <a:scene3d>
-          <a:camera prst="orthographicFront"/>
-          <a:lightRig rig="flat" dir="t"/>
-        </a:scene3d>
-        <a:sp3d/>
-      </dsp:spPr>
-      <dsp:style>
-        <a:lnRef idx="1">
-          <a:schemeClr val="accent3"/>
-        </a:lnRef>
-        <a:fillRef idx="2">
-          <a:schemeClr val="accent3"/>
-        </a:fillRef>
-        <a:effectRef idx="1">
-          <a:schemeClr val="accent3"/>
-        </a:effectRef>
-        <a:fontRef idx="minor">
-          <a:schemeClr val="dk1"/>
-        </a:fontRef>
-      </dsp:style>
-      <dsp:txBody>
-        <a:bodyPr spcFirstLastPara="0" vert="horz" wrap="square" lIns="8890" tIns="8890" rIns="8890" bIns="8890" numCol="1" spcCol="1270" anchor="ctr" anchorCtr="0">
-          <a:noAutofit/>
-        </a:bodyPr>
-        <a:lstStyle/>
-        <a:p>
-          <a:pPr lvl="0" algn="ctr" defTabSz="622300">
-            <a:lnSpc>
-              <a:spcPct val="90000"/>
-            </a:lnSpc>
-            <a:spcBef>
-              <a:spcPct val="0"/>
-            </a:spcBef>
-            <a:spcAft>
-              <a:spcPct val="35000"/>
-            </a:spcAft>
-          </a:pPr>
-          <a:r>
-            <a:rPr lang="en-US" sz="1400" kern="1200"/>
-            <a:t>Seguridad e Higiene</a:t>
-          </a:r>
-          <a:endParaRPr lang="es-AR" sz="1400" kern="1200"/>
-        </a:p>
-      </dsp:txBody>
-      <dsp:txXfrm>
-        <a:off x="3615760" y="933213"/>
-        <a:ext cx="1215553" cy="607776"/>
+        <a:off x="4254638" y="1186453"/>
+        <a:ext cx="1548230" cy="774115"/>
       </dsp:txXfrm>
     </dsp:sp>
   </dsp:spTree>
@@ -7755,7 +7799,7 @@
             <a:fld id="{DCCC8732-F178-4423-B0C1-D52A699E8877}" type="slidenum">
               <a:rPr lang="en-US" smtClean="0"/>
               <a:pPr/>
-              <a:t>‹Nº›</a:t>
+              <a:t>‹#›</a:t>
             </a:fld>
             <a:endParaRPr lang="en-US"/>
           </a:p>
@@ -7968,7 +8012,7 @@
             <a:fld id="{DCCC8732-F178-4423-B0C1-D52A699E8877}" type="slidenum">
               <a:rPr lang="en-US" smtClean="0"/>
               <a:pPr/>
-              <a:t>‹Nº›</a:t>
+              <a:t>‹#›</a:t>
             </a:fld>
             <a:endParaRPr lang="en-US"/>
           </a:p>
@@ -8145,7 +8189,7 @@
             <a:fld id="{DCCC8732-F178-4423-B0C1-D52A699E8877}" type="slidenum">
               <a:rPr lang="en-US" smtClean="0"/>
               <a:pPr/>
-              <a:t>‹Nº›</a:t>
+              <a:t>‹#›</a:t>
             </a:fld>
             <a:endParaRPr lang="en-US"/>
           </a:p>
@@ -8312,7 +8356,7 @@
             <a:fld id="{DCCC8732-F178-4423-B0C1-D52A699E8877}" type="slidenum">
               <a:rPr lang="en-US" smtClean="0"/>
               <a:pPr/>
-              <a:t>‹Nº›</a:t>
+              <a:t>‹#›</a:t>
             </a:fld>
             <a:endParaRPr lang="en-US"/>
           </a:p>
@@ -8555,7 +8599,7 @@
             <a:fld id="{DCCC8732-F178-4423-B0C1-D52A699E8877}" type="slidenum">
               <a:rPr lang="en-US" smtClean="0"/>
               <a:pPr/>
-              <a:t>‹Nº›</a:t>
+              <a:t>‹#›</a:t>
             </a:fld>
             <a:endParaRPr lang="en-US"/>
           </a:p>
@@ -8670,7 +8714,7 @@
             <a:fld id="{DCCC8732-F178-4423-B0C1-D52A699E8877}" type="slidenum">
               <a:rPr lang="en-US" smtClean="0"/>
               <a:pPr/>
-              <a:t>‹Nº›</a:t>
+              <a:t>‹#›</a:t>
             </a:fld>
             <a:endParaRPr lang="en-US"/>
           </a:p>
@@ -9211,7 +9255,7 @@
             <a:fld id="{DCCC8732-F178-4423-B0C1-D52A699E8877}" type="slidenum">
               <a:rPr lang="en-US" smtClean="0"/>
               <a:pPr/>
-              <a:t>‹Nº›</a:t>
+              <a:t>‹#›</a:t>
             </a:fld>
             <a:endParaRPr lang="en-US"/>
           </a:p>
@@ -9326,7 +9370,7 @@
             <a:fld id="{DCCC8732-F178-4423-B0C1-D52A699E8877}" type="slidenum">
               <a:rPr lang="en-US" smtClean="0"/>
               <a:pPr/>
-              <a:t>‹Nº›</a:t>
+              <a:t>‹#›</a:t>
             </a:fld>
             <a:endParaRPr lang="en-US"/>
           </a:p>
@@ -9418,7 +9462,7 @@
             <a:fld id="{DCCC8732-F178-4423-B0C1-D52A699E8877}" type="slidenum">
               <a:rPr lang="en-US" smtClean="0"/>
               <a:pPr/>
-              <a:t>‹Nº›</a:t>
+              <a:t>‹#›</a:t>
             </a:fld>
             <a:endParaRPr lang="en-US"/>
           </a:p>
@@ -12052,7 +12096,7 @@
             <a:fld id="{DCCC8732-F178-4423-B0C1-D52A699E8877}" type="slidenum">
               <a:rPr lang="en-US" smtClean="0"/>
               <a:pPr/>
-              <a:t>‹Nº›</a:t>
+              <a:t>‹#›</a:t>
             </a:fld>
             <a:endParaRPr lang="en-US"/>
           </a:p>
@@ -15292,7 +15336,7 @@
             <a:fld id="{DCCC8732-F178-4423-B0C1-D52A699E8877}" type="slidenum">
               <a:rPr lang="en-US" smtClean="0"/>
               <a:pPr/>
-              <a:t>‹Nº›</a:t>
+              <a:t>‹#›</a:t>
             </a:fld>
             <a:endParaRPr lang="en-US"/>
           </a:p>
@@ -18141,7 +18185,7 @@
             <a:fld id="{DCCC8732-F178-4423-B0C1-D52A699E8877}" type="slidenum">
               <a:rPr lang="en-US" smtClean="0"/>
               <a:pPr/>
-              <a:t>‹Nº›</a:t>
+              <a:t>‹#›</a:t>
             </a:fld>
             <a:endParaRPr lang="en-US"/>
           </a:p>
@@ -18576,19 +18620,23 @@
         </p:nvSpPr>
         <p:spPr>
           <a:xfrm>
-            <a:off x="4644008" y="620688"/>
-            <a:ext cx="3509432" cy="1368152"/>
+            <a:off x="4644008" y="404664"/>
+            <a:ext cx="3509432" cy="1584176"/>
           </a:xfrm>
         </p:spPr>
         <p:txBody>
           <a:bodyPr>
-            <a:normAutofit lnSpcReduction="10000"/>
+            <a:normAutofit fontScale="77500" lnSpcReduction="20000"/>
           </a:bodyPr>
           <a:lstStyle/>
           <a:p>
-            <a:pPr algn="ctr"/>
+            <a:pPr algn="ctr">
+              <a:lnSpc>
+                <a:spcPct val="120000"/>
+              </a:lnSpc>
+            </a:pPr>
             <a:r>
-              <a:rPr lang="es-AR" sz="2800" b="1" dirty="0" smtClean="0">
+              <a:rPr lang="es-AR" sz="3900" b="1" dirty="0" smtClean="0">
                 <a:solidFill>
                   <a:schemeClr val="bg2"/>
                 </a:solidFill>
@@ -18596,14 +18644,14 @@
               <a:t>Cátedra </a:t>
             </a:r>
             <a:r>
-              <a:rPr lang="es-AR" sz="2800" b="1" dirty="0">
+              <a:rPr lang="es-AR" sz="3900" b="1" dirty="0">
                 <a:solidFill>
                   <a:schemeClr val="bg2"/>
                 </a:solidFill>
               </a:rPr>
               <a:t>de Habilitación Profesional</a:t>
             </a:r>
-            <a:endParaRPr lang="en-US" sz="2800" b="1" dirty="0">
+            <a:endParaRPr lang="en-US" sz="3900" b="1" dirty="0">
               <a:solidFill>
                 <a:schemeClr val="bg2"/>
               </a:solidFill>
@@ -18697,7 +18745,7 @@
           <a:noFill/>
           <a:extLst>
             <a:ext uri="{909E8E84-426E-40DD-AFC4-6F175D3DCCD1}">
-              <a14:hiddenFill xmlns:a14="http://schemas.microsoft.com/office/drawing/2010/main" xmlns="">
+              <a14:hiddenFill xmlns:a14="http://schemas.microsoft.com/office/drawing/2010/main">
                 <a:solidFill>
                   <a:srgbClr val="FFFFFF"/>
                 </a:solidFill>
@@ -18719,7 +18767,7 @@
       </p:sp>
       <p:pic>
         <p:nvPicPr>
-          <p:cNvPr id="1034" name="Picture 10" descr="http://img.emol.com/2011/04/01/File_20114114852.jpg"/>
+          <p:cNvPr id="1028" name="Picture 4" descr="1208185285896971921coredump_Glassy_WiFi_symbol.svg.hi-300x300"/>
           <p:cNvPicPr>
             <a:picLocks noChangeAspect="1" noChangeArrowheads="1"/>
           </p:cNvPicPr>
@@ -18729,7 +18777,7 @@
           <a:blip r:embed="rId2">
             <a:extLst>
               <a:ext uri="{28A0092B-C50C-407E-A947-70E740481C1C}">
-                <a14:useLocalDpi xmlns:a14="http://schemas.microsoft.com/office/drawing/2010/main" xmlns="" val="0"/>
+                <a14:useLocalDpi xmlns:a14="http://schemas.microsoft.com/office/drawing/2010/main" val="0"/>
               </a:ext>
             </a:extLst>
           </a:blip>
@@ -18740,8 +18788,8 @@
         </p:blipFill>
         <p:spPr bwMode="auto">
           <a:xfrm>
-            <a:off x="4860032" y="2492896"/>
-            <a:ext cx="3122712" cy="3549484"/>
+            <a:off x="5004048" y="2708920"/>
+            <a:ext cx="2857500" cy="2857500"/>
           </a:xfrm>
           <a:prstGeom prst="rect">
             <a:avLst/>
@@ -18749,7 +18797,7 @@
           <a:noFill/>
           <a:extLst>
             <a:ext uri="{909E8E84-426E-40DD-AFC4-6F175D3DCCD1}">
-              <a14:hiddenFill xmlns:a14="http://schemas.microsoft.com/office/drawing/2010/main" xmlns="">
+              <a14:hiddenFill xmlns:a14="http://schemas.microsoft.com/office/drawing/2010/main">
                 <a:solidFill>
                   <a:srgbClr val="FFFFFF"/>
                 </a:solidFill>
@@ -18761,7 +18809,7 @@
     </p:spTree>
     <p:extLst>
       <p:ext uri="{BB962C8B-B14F-4D97-AF65-F5344CB8AC3E}">
-        <p14:creationId xmlns:p14="http://schemas.microsoft.com/office/powerpoint/2010/main" xmlns="" val="140638401"/>
+        <p14:creationId xmlns:p14="http://schemas.microsoft.com/office/powerpoint/2010/main" val="140638401"/>
       </p:ext>
     </p:extLst>
   </p:cSld>
@@ -18838,10 +18886,51 @@
           </a:p>
         </p:txBody>
       </p:sp>
+      <p:pic>
+        <p:nvPicPr>
+          <p:cNvPr id="4" name="Picture 3" descr="1208185285896971921coredump_Glassy_WiFi_symbol.svg.hi-300x300"/>
+          <p:cNvPicPr>
+            <a:picLocks noChangeAspect="1" noChangeArrowheads="1"/>
+          </p:cNvPicPr>
+          <p:nvPr/>
+        </p:nvPicPr>
+        <p:blipFill>
+          <a:blip r:embed="rId2" cstate="print">
+            <a:extLst>
+              <a:ext uri="{28A0092B-C50C-407E-A947-70E740481C1C}">
+                <a14:useLocalDpi xmlns:a14="http://schemas.microsoft.com/office/drawing/2010/main" val="0"/>
+              </a:ext>
+            </a:extLst>
+          </a:blip>
+          <a:srcRect/>
+          <a:stretch>
+            <a:fillRect/>
+          </a:stretch>
+        </p:blipFill>
+        <p:spPr bwMode="auto">
+          <a:xfrm>
+            <a:off x="6982701" y="5689"/>
+            <a:ext cx="553244" cy="553244"/>
+          </a:xfrm>
+          <a:prstGeom prst="rect">
+            <a:avLst/>
+          </a:prstGeom>
+          <a:noFill/>
+          <a:extLst>
+            <a:ext uri="{909E8E84-426E-40DD-AFC4-6F175D3DCCD1}">
+              <a14:hiddenFill xmlns:a14="http://schemas.microsoft.com/office/drawing/2010/main">
+                <a:solidFill>
+                  <a:srgbClr val="FFFFFF"/>
+                </a:solidFill>
+              </a14:hiddenFill>
+            </a:ext>
+          </a:extLst>
+        </p:spPr>
+      </p:pic>
     </p:spTree>
     <p:extLst>
       <p:ext uri="{BB962C8B-B14F-4D97-AF65-F5344CB8AC3E}">
-        <p14:creationId xmlns:p14="http://schemas.microsoft.com/office/powerpoint/2010/main" xmlns="" val="2023804496"/>
+        <p14:creationId xmlns:p14="http://schemas.microsoft.com/office/powerpoint/2010/main" val="2023804496"/>
       </p:ext>
     </p:extLst>
   </p:cSld>
@@ -18960,10 +19049,51 @@
           </a:p>
         </p:txBody>
       </p:sp>
+      <p:pic>
+        <p:nvPicPr>
+          <p:cNvPr id="4" name="Picture 3" descr="1208185285896971921coredump_Glassy_WiFi_symbol.svg.hi-300x300"/>
+          <p:cNvPicPr>
+            <a:picLocks noChangeAspect="1" noChangeArrowheads="1"/>
+          </p:cNvPicPr>
+          <p:nvPr/>
+        </p:nvPicPr>
+        <p:blipFill>
+          <a:blip r:embed="rId2" cstate="print">
+            <a:extLst>
+              <a:ext uri="{28A0092B-C50C-407E-A947-70E740481C1C}">
+                <a14:useLocalDpi xmlns:a14="http://schemas.microsoft.com/office/drawing/2010/main" val="0"/>
+              </a:ext>
+            </a:extLst>
+          </a:blip>
+          <a:srcRect/>
+          <a:stretch>
+            <a:fillRect/>
+          </a:stretch>
+        </p:blipFill>
+        <p:spPr bwMode="auto">
+          <a:xfrm>
+            <a:off x="6982701" y="5689"/>
+            <a:ext cx="553244" cy="553244"/>
+          </a:xfrm>
+          <a:prstGeom prst="rect">
+            <a:avLst/>
+          </a:prstGeom>
+          <a:noFill/>
+          <a:extLst>
+            <a:ext uri="{909E8E84-426E-40DD-AFC4-6F175D3DCCD1}">
+              <a14:hiddenFill xmlns:a14="http://schemas.microsoft.com/office/drawing/2010/main">
+                <a:solidFill>
+                  <a:srgbClr val="FFFFFF"/>
+                </a:solidFill>
+              </a14:hiddenFill>
+            </a:ext>
+          </a:extLst>
+        </p:spPr>
+      </p:pic>
     </p:spTree>
     <p:extLst>
       <p:ext uri="{BB962C8B-B14F-4D97-AF65-F5344CB8AC3E}">
-        <p14:creationId xmlns:p14="http://schemas.microsoft.com/office/powerpoint/2010/main" xmlns="" val="2666013015"/>
+        <p14:creationId xmlns:p14="http://schemas.microsoft.com/office/powerpoint/2010/main" val="2666013015"/>
       </p:ext>
     </p:extLst>
   </p:cSld>
@@ -19047,10 +19177,51 @@
           </a:p>
         </p:txBody>
       </p:sp>
+      <p:pic>
+        <p:nvPicPr>
+          <p:cNvPr id="4" name="Picture 3" descr="1208185285896971921coredump_Glassy_WiFi_symbol.svg.hi-300x300"/>
+          <p:cNvPicPr>
+            <a:picLocks noChangeAspect="1" noChangeArrowheads="1"/>
+          </p:cNvPicPr>
+          <p:nvPr/>
+        </p:nvPicPr>
+        <p:blipFill>
+          <a:blip r:embed="rId2" cstate="print">
+            <a:extLst>
+              <a:ext uri="{28A0092B-C50C-407E-A947-70E740481C1C}">
+                <a14:useLocalDpi xmlns:a14="http://schemas.microsoft.com/office/drawing/2010/main" val="0"/>
+              </a:ext>
+            </a:extLst>
+          </a:blip>
+          <a:srcRect/>
+          <a:stretch>
+            <a:fillRect/>
+          </a:stretch>
+        </p:blipFill>
+        <p:spPr bwMode="auto">
+          <a:xfrm>
+            <a:off x="6982701" y="5689"/>
+            <a:ext cx="553244" cy="553244"/>
+          </a:xfrm>
+          <a:prstGeom prst="rect">
+            <a:avLst/>
+          </a:prstGeom>
+          <a:noFill/>
+          <a:extLst>
+            <a:ext uri="{909E8E84-426E-40DD-AFC4-6F175D3DCCD1}">
+              <a14:hiddenFill xmlns:a14="http://schemas.microsoft.com/office/drawing/2010/main">
+                <a:solidFill>
+                  <a:srgbClr val="FFFFFF"/>
+                </a:solidFill>
+              </a14:hiddenFill>
+            </a:ext>
+          </a:extLst>
+        </p:spPr>
+      </p:pic>
     </p:spTree>
     <p:extLst>
       <p:ext uri="{BB962C8B-B14F-4D97-AF65-F5344CB8AC3E}">
-        <p14:creationId xmlns:p14="http://schemas.microsoft.com/office/powerpoint/2010/main" xmlns="" val="3693362975"/>
+        <p14:creationId xmlns:p14="http://schemas.microsoft.com/office/powerpoint/2010/main" val="3693362975"/>
       </p:ext>
     </p:extLst>
   </p:cSld>
@@ -19134,10 +19305,51 @@
           </a:p>
         </p:txBody>
       </p:sp>
+      <p:pic>
+        <p:nvPicPr>
+          <p:cNvPr id="4" name="Picture 3" descr="1208185285896971921coredump_Glassy_WiFi_symbol.svg.hi-300x300"/>
+          <p:cNvPicPr>
+            <a:picLocks noChangeAspect="1" noChangeArrowheads="1"/>
+          </p:cNvPicPr>
+          <p:nvPr/>
+        </p:nvPicPr>
+        <p:blipFill>
+          <a:blip r:embed="rId2" cstate="print">
+            <a:extLst>
+              <a:ext uri="{28A0092B-C50C-407E-A947-70E740481C1C}">
+                <a14:useLocalDpi xmlns:a14="http://schemas.microsoft.com/office/drawing/2010/main" val="0"/>
+              </a:ext>
+            </a:extLst>
+          </a:blip>
+          <a:srcRect/>
+          <a:stretch>
+            <a:fillRect/>
+          </a:stretch>
+        </p:blipFill>
+        <p:spPr bwMode="auto">
+          <a:xfrm>
+            <a:off x="6982701" y="5689"/>
+            <a:ext cx="553244" cy="553244"/>
+          </a:xfrm>
+          <a:prstGeom prst="rect">
+            <a:avLst/>
+          </a:prstGeom>
+          <a:noFill/>
+          <a:extLst>
+            <a:ext uri="{909E8E84-426E-40DD-AFC4-6F175D3DCCD1}">
+              <a14:hiddenFill xmlns:a14="http://schemas.microsoft.com/office/drawing/2010/main">
+                <a:solidFill>
+                  <a:srgbClr val="FFFFFF"/>
+                </a:solidFill>
+              </a14:hiddenFill>
+            </a:ext>
+          </a:extLst>
+        </p:spPr>
+      </p:pic>
     </p:spTree>
     <p:extLst>
       <p:ext uri="{BB962C8B-B14F-4D97-AF65-F5344CB8AC3E}">
-        <p14:creationId xmlns:p14="http://schemas.microsoft.com/office/powerpoint/2010/main" xmlns="" val="3693362975"/>
+        <p14:creationId xmlns:p14="http://schemas.microsoft.com/office/powerpoint/2010/main" val="3693362975"/>
       </p:ext>
     </p:extLst>
   </p:cSld>
@@ -19221,10 +19433,51 @@
           </a:p>
         </p:txBody>
       </p:sp>
+      <p:pic>
+        <p:nvPicPr>
+          <p:cNvPr id="4" name="Picture 3" descr="1208185285896971921coredump_Glassy_WiFi_symbol.svg.hi-300x300"/>
+          <p:cNvPicPr>
+            <a:picLocks noChangeAspect="1" noChangeArrowheads="1"/>
+          </p:cNvPicPr>
+          <p:nvPr/>
+        </p:nvPicPr>
+        <p:blipFill>
+          <a:blip r:embed="rId2" cstate="print">
+            <a:extLst>
+              <a:ext uri="{28A0092B-C50C-407E-A947-70E740481C1C}">
+                <a14:useLocalDpi xmlns:a14="http://schemas.microsoft.com/office/drawing/2010/main" val="0"/>
+              </a:ext>
+            </a:extLst>
+          </a:blip>
+          <a:srcRect/>
+          <a:stretch>
+            <a:fillRect/>
+          </a:stretch>
+        </p:blipFill>
+        <p:spPr bwMode="auto">
+          <a:xfrm>
+            <a:off x="6982701" y="5689"/>
+            <a:ext cx="553244" cy="553244"/>
+          </a:xfrm>
+          <a:prstGeom prst="rect">
+            <a:avLst/>
+          </a:prstGeom>
+          <a:noFill/>
+          <a:extLst>
+            <a:ext uri="{909E8E84-426E-40DD-AFC4-6F175D3DCCD1}">
+              <a14:hiddenFill xmlns:a14="http://schemas.microsoft.com/office/drawing/2010/main">
+                <a:solidFill>
+                  <a:srgbClr val="FFFFFF"/>
+                </a:solidFill>
+              </a14:hiddenFill>
+            </a:ext>
+          </a:extLst>
+        </p:spPr>
+      </p:pic>
     </p:spTree>
     <p:extLst>
       <p:ext uri="{BB962C8B-B14F-4D97-AF65-F5344CB8AC3E}">
-        <p14:creationId xmlns:p14="http://schemas.microsoft.com/office/powerpoint/2010/main" xmlns="" val="3693362975"/>
+        <p14:creationId xmlns:p14="http://schemas.microsoft.com/office/powerpoint/2010/main" val="3693362975"/>
       </p:ext>
     </p:extLst>
   </p:cSld>
@@ -19311,10 +19564,51 @@
           </a:p>
         </p:txBody>
       </p:sp>
+      <p:pic>
+        <p:nvPicPr>
+          <p:cNvPr id="4" name="Picture 3" descr="1208185285896971921coredump_Glassy_WiFi_symbol.svg.hi-300x300"/>
+          <p:cNvPicPr>
+            <a:picLocks noChangeAspect="1" noChangeArrowheads="1"/>
+          </p:cNvPicPr>
+          <p:nvPr/>
+        </p:nvPicPr>
+        <p:blipFill>
+          <a:blip r:embed="rId2" cstate="print">
+            <a:extLst>
+              <a:ext uri="{28A0092B-C50C-407E-A947-70E740481C1C}">
+                <a14:useLocalDpi xmlns:a14="http://schemas.microsoft.com/office/drawing/2010/main" val="0"/>
+              </a:ext>
+            </a:extLst>
+          </a:blip>
+          <a:srcRect/>
+          <a:stretch>
+            <a:fillRect/>
+          </a:stretch>
+        </p:blipFill>
+        <p:spPr bwMode="auto">
+          <a:xfrm>
+            <a:off x="6982701" y="5689"/>
+            <a:ext cx="553244" cy="553244"/>
+          </a:xfrm>
+          <a:prstGeom prst="rect">
+            <a:avLst/>
+          </a:prstGeom>
+          <a:noFill/>
+          <a:extLst>
+            <a:ext uri="{909E8E84-426E-40DD-AFC4-6F175D3DCCD1}">
+              <a14:hiddenFill xmlns:a14="http://schemas.microsoft.com/office/drawing/2010/main">
+                <a:solidFill>
+                  <a:srgbClr val="FFFFFF"/>
+                </a:solidFill>
+              </a14:hiddenFill>
+            </a:ext>
+          </a:extLst>
+        </p:spPr>
+      </p:pic>
     </p:spTree>
     <p:extLst>
       <p:ext uri="{BB962C8B-B14F-4D97-AF65-F5344CB8AC3E}">
-        <p14:creationId xmlns:p14="http://schemas.microsoft.com/office/powerpoint/2010/main" xmlns="" val="1251326373"/>
+        <p14:creationId xmlns:p14="http://schemas.microsoft.com/office/powerpoint/2010/main" val="1251326373"/>
       </p:ext>
     </p:extLst>
   </p:cSld>
@@ -19391,10 +19685,51 @@
           </a:p>
         </p:txBody>
       </p:sp>
+      <p:pic>
+        <p:nvPicPr>
+          <p:cNvPr id="4" name="Picture 3" descr="1208185285896971921coredump_Glassy_WiFi_symbol.svg.hi-300x300"/>
+          <p:cNvPicPr>
+            <a:picLocks noChangeAspect="1" noChangeArrowheads="1"/>
+          </p:cNvPicPr>
+          <p:nvPr/>
+        </p:nvPicPr>
+        <p:blipFill>
+          <a:blip r:embed="rId2" cstate="print">
+            <a:extLst>
+              <a:ext uri="{28A0092B-C50C-407E-A947-70E740481C1C}">
+                <a14:useLocalDpi xmlns:a14="http://schemas.microsoft.com/office/drawing/2010/main" val="0"/>
+              </a:ext>
+            </a:extLst>
+          </a:blip>
+          <a:srcRect/>
+          <a:stretch>
+            <a:fillRect/>
+          </a:stretch>
+        </p:blipFill>
+        <p:spPr bwMode="auto">
+          <a:xfrm>
+            <a:off x="6982701" y="5689"/>
+            <a:ext cx="553244" cy="553244"/>
+          </a:xfrm>
+          <a:prstGeom prst="rect">
+            <a:avLst/>
+          </a:prstGeom>
+          <a:noFill/>
+          <a:extLst>
+            <a:ext uri="{909E8E84-426E-40DD-AFC4-6F175D3DCCD1}">
+              <a14:hiddenFill xmlns:a14="http://schemas.microsoft.com/office/drawing/2010/main">
+                <a:solidFill>
+                  <a:srgbClr val="FFFFFF"/>
+                </a:solidFill>
+              </a14:hiddenFill>
+            </a:ext>
+          </a:extLst>
+        </p:spPr>
+      </p:pic>
     </p:spTree>
     <p:extLst>
       <p:ext uri="{BB962C8B-B14F-4D97-AF65-F5344CB8AC3E}">
-        <p14:creationId xmlns:p14="http://schemas.microsoft.com/office/powerpoint/2010/main" xmlns="" val="2273561369"/>
+        <p14:creationId xmlns:p14="http://schemas.microsoft.com/office/powerpoint/2010/main" val="2273561369"/>
       </p:ext>
     </p:extLst>
   </p:cSld>
@@ -19464,7 +19799,7 @@
           <a:blip r:embed="rId2">
             <a:extLst>
               <a:ext uri="{28A0092B-C50C-407E-A947-70E740481C1C}">
-                <a14:useLocalDpi xmlns:a14="http://schemas.microsoft.com/office/drawing/2010/main" xmlns="" val="0"/>
+                <a14:useLocalDpi xmlns:a14="http://schemas.microsoft.com/office/drawing/2010/main" val="0"/>
               </a:ext>
             </a:extLst>
           </a:blip>
@@ -19488,14 +19823,14 @@
           <a:effectLst/>
           <a:extLst>
             <a:ext uri="{909E8E84-426E-40DD-AFC4-6F175D3DCCD1}">
-              <a14:hiddenFill xmlns:a14="http://schemas.microsoft.com/office/drawing/2010/main" xmlns="">
+              <a14:hiddenFill xmlns:a14="http://schemas.microsoft.com/office/drawing/2010/main">
                 <a:solidFill>
                   <a:schemeClr val="accent1"/>
                 </a:solidFill>
               </a14:hiddenFill>
             </a:ext>
             <a:ext uri="{91240B29-F687-4F45-9708-019B960494DF}">
-              <a14:hiddenLine xmlns:a14="http://schemas.microsoft.com/office/drawing/2010/main" xmlns="" w="9525">
+              <a14:hiddenLine xmlns:a14="http://schemas.microsoft.com/office/drawing/2010/main" w="9525">
                 <a:solidFill>
                   <a:schemeClr val="tx1"/>
                 </a:solidFill>
@@ -19505,7 +19840,7 @@
               </a14:hiddenLine>
             </a:ext>
             <a:ext uri="{AF507438-7753-43E0-B8FC-AC1667EBCBE1}">
-              <a14:hiddenEffects xmlns:a14="http://schemas.microsoft.com/office/drawing/2010/main" xmlns="">
+              <a14:hiddenEffects xmlns:a14="http://schemas.microsoft.com/office/drawing/2010/main">
                 <a:effectLst>
                   <a:outerShdw dist="35921" dir="2700000" algn="ctr" rotWithShape="0">
                     <a:schemeClr val="bg2"/>
@@ -19516,10 +19851,51 @@
           </a:extLst>
         </p:spPr>
       </p:pic>
+      <p:pic>
+        <p:nvPicPr>
+          <p:cNvPr id="4" name="Picture 3" descr="1208185285896971921coredump_Glassy_WiFi_symbol.svg.hi-300x300"/>
+          <p:cNvPicPr>
+            <a:picLocks noChangeAspect="1" noChangeArrowheads="1"/>
+          </p:cNvPicPr>
+          <p:nvPr/>
+        </p:nvPicPr>
+        <p:blipFill>
+          <a:blip r:embed="rId3" cstate="print">
+            <a:extLst>
+              <a:ext uri="{28A0092B-C50C-407E-A947-70E740481C1C}">
+                <a14:useLocalDpi xmlns:a14="http://schemas.microsoft.com/office/drawing/2010/main" val="0"/>
+              </a:ext>
+            </a:extLst>
+          </a:blip>
+          <a:srcRect/>
+          <a:stretch>
+            <a:fillRect/>
+          </a:stretch>
+        </p:blipFill>
+        <p:spPr bwMode="auto">
+          <a:xfrm>
+            <a:off x="6982701" y="5689"/>
+            <a:ext cx="553244" cy="553244"/>
+          </a:xfrm>
+          <a:prstGeom prst="rect">
+            <a:avLst/>
+          </a:prstGeom>
+          <a:noFill/>
+          <a:extLst>
+            <a:ext uri="{909E8E84-426E-40DD-AFC4-6F175D3DCCD1}">
+              <a14:hiddenFill xmlns:a14="http://schemas.microsoft.com/office/drawing/2010/main">
+                <a:solidFill>
+                  <a:srgbClr val="FFFFFF"/>
+                </a:solidFill>
+              </a14:hiddenFill>
+            </a:ext>
+          </a:extLst>
+        </p:spPr>
+      </p:pic>
     </p:spTree>
     <p:extLst>
       <p:ext uri="{BB962C8B-B14F-4D97-AF65-F5344CB8AC3E}">
-        <p14:creationId xmlns:p14="http://schemas.microsoft.com/office/powerpoint/2010/main" xmlns="" val="1450032067"/>
+        <p14:creationId xmlns:p14="http://schemas.microsoft.com/office/powerpoint/2010/main" val="1450032067"/>
       </p:ext>
     </p:extLst>
   </p:cSld>
@@ -19578,15 +19954,7 @@
             <a:pPr algn="ctr"/>
             <a:r>
               <a:rPr lang="es-AR" dirty="0" smtClean="0"/>
-              <a:t>Grupo </a:t>
-            </a:r>
-            <a:r>
-              <a:rPr lang="es-AR" dirty="0" smtClean="0"/>
-              <a:t>Nro. </a:t>
-            </a:r>
-            <a:r>
-              <a:rPr lang="es-AR" dirty="0" smtClean="0"/>
-              <a:t>3</a:t>
+              <a:t>Grupo Nro. 3</a:t>
             </a:r>
             <a:endParaRPr lang="en-US" dirty="0"/>
           </a:p>
@@ -19615,7 +19983,7 @@
           <a:lstStyle/>
           <a:p>
             <a:r>
-              <a:rPr lang="es-AR" dirty="0">
+              <a:rPr lang="es-AR" b="1" dirty="0">
                 <a:solidFill>
                   <a:schemeClr val="tx1"/>
                 </a:solidFill>
@@ -19623,7 +19991,7 @@
               <a:t>Carlos </a:t>
             </a:r>
             <a:r>
-              <a:rPr lang="es-AR" dirty="0" err="1">
+              <a:rPr lang="es-AR" b="1" dirty="0" err="1">
                 <a:solidFill>
                   <a:schemeClr val="tx1"/>
                 </a:solidFill>
@@ -19631,14 +19999,14 @@
               <a:t>Trepat</a:t>
             </a:r>
             <a:r>
-              <a:rPr lang="es-AR" dirty="0">
+              <a:rPr lang="es-AR" b="1" dirty="0">
                 <a:solidFill>
                   <a:schemeClr val="tx1"/>
                 </a:solidFill>
               </a:rPr>
               <a:t> </a:t>
             </a:r>
-            <a:endParaRPr lang="es-AR" dirty="0" smtClean="0">
+            <a:endParaRPr lang="es-AR" b="1" dirty="0" smtClean="0">
               <a:solidFill>
                 <a:schemeClr val="tx1"/>
               </a:solidFill>
@@ -19653,7 +20021,7 @@
           </a:p>
           <a:p>
             <a:r>
-              <a:rPr lang="es-AR" dirty="0" err="1" smtClean="0">
+              <a:rPr lang="es-AR" b="1" dirty="0" err="1" smtClean="0">
                 <a:solidFill>
                   <a:schemeClr val="tx1"/>
                 </a:solidFill>
@@ -19661,7 +20029,7 @@
               <a:t>Demian</a:t>
             </a:r>
             <a:r>
-              <a:rPr lang="es-AR" dirty="0" smtClean="0">
+              <a:rPr lang="es-AR" b="1" dirty="0" smtClean="0">
                 <a:solidFill>
                   <a:schemeClr val="tx1"/>
                 </a:solidFill>
@@ -19669,7 +20037,7 @@
               <a:t> </a:t>
             </a:r>
             <a:r>
-              <a:rPr lang="es-AR" dirty="0" err="1" smtClean="0">
+              <a:rPr lang="es-AR" b="1" dirty="0" err="1" smtClean="0">
                 <a:solidFill>
                   <a:schemeClr val="tx1"/>
                 </a:solidFill>
@@ -19682,15 +20050,7 @@
                   <a:schemeClr val="tx1"/>
                 </a:solidFill>
               </a:rPr>
-              <a:t>: </a:t>
-            </a:r>
-            <a:r>
-              <a:rPr lang="es-AR" dirty="0" smtClean="0">
-                <a:solidFill>
-                  <a:schemeClr val="tx1"/>
-                </a:solidFill>
-              </a:rPr>
-              <a:t>Desarrollador </a:t>
+              <a:t>: Desarrollador </a:t>
             </a:r>
             <a:r>
               <a:rPr lang="es-AR" dirty="0" err="1" smtClean="0">
@@ -19747,7 +20107,7 @@
           </a:p>
           <a:p>
             <a:r>
-              <a:rPr lang="es-AR" dirty="0">
+              <a:rPr lang="es-AR" b="1" dirty="0">
                 <a:solidFill>
                   <a:schemeClr val="tx1"/>
                 </a:solidFill>
@@ -19755,7 +20115,7 @@
               <a:t>Mariano </a:t>
             </a:r>
             <a:r>
-              <a:rPr lang="es-AR" dirty="0" err="1" smtClean="0">
+              <a:rPr lang="es-AR" b="1" dirty="0" err="1" smtClean="0">
                 <a:solidFill>
                   <a:schemeClr val="tx1"/>
                 </a:solidFill>
@@ -19786,11 +20146,6 @@
               </a:rPr>
               <a:t> para Pymes en Jazztel (empresa española de telecomunicaciones).</a:t>
             </a:r>
-            <a:endParaRPr lang="es-AR" dirty="0" smtClean="0">
-              <a:solidFill>
-                <a:schemeClr val="tx1"/>
-              </a:solidFill>
-            </a:endParaRPr>
           </a:p>
           <a:p>
             <a:endParaRPr lang="es-AR" dirty="0" smtClean="0">
@@ -19801,7 +20156,7 @@
           </a:p>
           <a:p>
             <a:r>
-              <a:rPr lang="es-AR" dirty="0" smtClean="0">
+              <a:rPr lang="es-AR" b="1" dirty="0" smtClean="0">
                 <a:solidFill>
                   <a:schemeClr val="tx1"/>
                 </a:solidFill>
@@ -19809,7 +20164,7 @@
               <a:t>Pablo </a:t>
             </a:r>
             <a:r>
-              <a:rPr lang="es-AR" dirty="0" err="1" smtClean="0">
+              <a:rPr lang="es-AR" b="1" dirty="0" err="1" smtClean="0">
                 <a:solidFill>
                   <a:schemeClr val="tx1"/>
                 </a:solidFill>
@@ -19822,15 +20177,7 @@
                   <a:schemeClr val="tx1"/>
                 </a:solidFill>
               </a:rPr>
-              <a:t>: </a:t>
-            </a:r>
-            <a:r>
-              <a:rPr lang="es-AR" dirty="0" smtClean="0">
-                <a:solidFill>
-                  <a:schemeClr val="tx1"/>
-                </a:solidFill>
-              </a:rPr>
-              <a:t>Desarrollador java </a:t>
+              <a:t>: Desarrollador java </a:t>
             </a:r>
             <a:r>
               <a:rPr lang="es-AR" dirty="0" err="1" smtClean="0">
@@ -19880,11 +20227,6 @@
               </a:rPr>
               <a:t> Packard</a:t>
             </a:r>
-            <a:endParaRPr lang="es-AR" dirty="0" smtClean="0">
-              <a:solidFill>
-                <a:schemeClr val="tx1"/>
-              </a:solidFill>
-            </a:endParaRPr>
           </a:p>
           <a:p>
             <a:endParaRPr lang="es-AR" dirty="0" smtClean="0">
@@ -19895,7 +20237,7 @@
           </a:p>
           <a:p>
             <a:r>
-              <a:rPr lang="es-AR" dirty="0">
+              <a:rPr lang="es-AR" b="1" dirty="0">
                 <a:solidFill>
                   <a:schemeClr val="tx1"/>
                 </a:solidFill>
@@ -19933,11 +20275,7 @@
             <a:pPr algn="ctr"/>
             <a:r>
               <a:rPr lang="es-AR" sz="2000" b="1" dirty="0" smtClean="0"/>
-              <a:t>Gestión de instalación y mantenimiento de antenas de </a:t>
-            </a:r>
-            <a:r>
-              <a:rPr lang="es-AR" sz="2000" b="1" dirty="0" smtClean="0"/>
-              <a:t>telecomunicaciones: </a:t>
+              <a:t>Gestión de instalación y mantenimiento de antenas de telecomunicaciones: </a:t>
             </a:r>
             <a:r>
               <a:rPr lang="es-AR" sz="2400" b="1" dirty="0" smtClean="0"/>
@@ -19947,10 +20285,51 @@
           </a:p>
         </p:txBody>
       </p:sp>
+      <p:pic>
+        <p:nvPicPr>
+          <p:cNvPr id="5" name="Picture 4" descr="1208185285896971921coredump_Glassy_WiFi_symbol.svg.hi-300x300"/>
+          <p:cNvPicPr>
+            <a:picLocks noChangeAspect="1" noChangeArrowheads="1"/>
+          </p:cNvPicPr>
+          <p:nvPr/>
+        </p:nvPicPr>
+        <p:blipFill>
+          <a:blip r:embed="rId2" cstate="print">
+            <a:extLst>
+              <a:ext uri="{28A0092B-C50C-407E-A947-70E740481C1C}">
+                <a14:useLocalDpi xmlns:a14="http://schemas.microsoft.com/office/drawing/2010/main" val="0"/>
+              </a:ext>
+            </a:extLst>
+          </a:blip>
+          <a:srcRect/>
+          <a:stretch>
+            <a:fillRect/>
+          </a:stretch>
+        </p:blipFill>
+        <p:spPr bwMode="auto">
+          <a:xfrm>
+            <a:off x="6982701" y="5689"/>
+            <a:ext cx="553244" cy="553244"/>
+          </a:xfrm>
+          <a:prstGeom prst="rect">
+            <a:avLst/>
+          </a:prstGeom>
+          <a:noFill/>
+          <a:extLst>
+            <a:ext uri="{909E8E84-426E-40DD-AFC4-6F175D3DCCD1}">
+              <a14:hiddenFill xmlns:a14="http://schemas.microsoft.com/office/drawing/2010/main">
+                <a:solidFill>
+                  <a:srgbClr val="FFFFFF"/>
+                </a:solidFill>
+              </a14:hiddenFill>
+            </a:ext>
+          </a:extLst>
+        </p:spPr>
+      </p:pic>
     </p:spTree>
     <p:extLst>
       <p:ext uri="{BB962C8B-B14F-4D97-AF65-F5344CB8AC3E}">
-        <p14:creationId xmlns:p14="http://schemas.microsoft.com/office/powerpoint/2010/main" xmlns="" val="119432886"/>
+        <p14:creationId xmlns:p14="http://schemas.microsoft.com/office/powerpoint/2010/main" val="119432886"/>
       </p:ext>
     </p:extLst>
   </p:cSld>
@@ -20108,10 +20487,51 @@
           </a:p>
         </p:txBody>
       </p:sp>
+      <p:pic>
+        <p:nvPicPr>
+          <p:cNvPr id="4" name="Picture 3" descr="1208185285896971921coredump_Glassy_WiFi_symbol.svg.hi-300x300"/>
+          <p:cNvPicPr>
+            <a:picLocks noChangeAspect="1" noChangeArrowheads="1"/>
+          </p:cNvPicPr>
+          <p:nvPr/>
+        </p:nvPicPr>
+        <p:blipFill>
+          <a:blip r:embed="rId2" cstate="print">
+            <a:extLst>
+              <a:ext uri="{28A0092B-C50C-407E-A947-70E740481C1C}">
+                <a14:useLocalDpi xmlns:a14="http://schemas.microsoft.com/office/drawing/2010/main" val="0"/>
+              </a:ext>
+            </a:extLst>
+          </a:blip>
+          <a:srcRect/>
+          <a:stretch>
+            <a:fillRect/>
+          </a:stretch>
+        </p:blipFill>
+        <p:spPr bwMode="auto">
+          <a:xfrm>
+            <a:off x="6982701" y="5689"/>
+            <a:ext cx="553244" cy="553244"/>
+          </a:xfrm>
+          <a:prstGeom prst="rect">
+            <a:avLst/>
+          </a:prstGeom>
+          <a:noFill/>
+          <a:extLst>
+            <a:ext uri="{909E8E84-426E-40DD-AFC4-6F175D3DCCD1}">
+              <a14:hiddenFill xmlns:a14="http://schemas.microsoft.com/office/drawing/2010/main">
+                <a:solidFill>
+                  <a:srgbClr val="FFFFFF"/>
+                </a:solidFill>
+              </a14:hiddenFill>
+            </a:ext>
+          </a:extLst>
+        </p:spPr>
+      </p:pic>
     </p:spTree>
     <p:extLst>
       <p:ext uri="{BB962C8B-B14F-4D97-AF65-F5344CB8AC3E}">
-        <p14:creationId xmlns:p14="http://schemas.microsoft.com/office/powerpoint/2010/main" xmlns="" val="3537553483"/>
+        <p14:creationId xmlns:p14="http://schemas.microsoft.com/office/powerpoint/2010/main" val="3537553483"/>
       </p:ext>
     </p:extLst>
   </p:cSld>
@@ -20259,10 +20679,51 @@
           </a:p>
         </p:txBody>
       </p:sp>
+      <p:pic>
+        <p:nvPicPr>
+          <p:cNvPr id="4" name="Picture 3" descr="1208185285896971921coredump_Glassy_WiFi_symbol.svg.hi-300x300"/>
+          <p:cNvPicPr>
+            <a:picLocks noChangeAspect="1" noChangeArrowheads="1"/>
+          </p:cNvPicPr>
+          <p:nvPr/>
+        </p:nvPicPr>
+        <p:blipFill>
+          <a:blip r:embed="rId2" cstate="print">
+            <a:extLst>
+              <a:ext uri="{28A0092B-C50C-407E-A947-70E740481C1C}">
+                <a14:useLocalDpi xmlns:a14="http://schemas.microsoft.com/office/drawing/2010/main" val="0"/>
+              </a:ext>
+            </a:extLst>
+          </a:blip>
+          <a:srcRect/>
+          <a:stretch>
+            <a:fillRect/>
+          </a:stretch>
+        </p:blipFill>
+        <p:spPr bwMode="auto">
+          <a:xfrm>
+            <a:off x="6982701" y="5689"/>
+            <a:ext cx="553244" cy="553244"/>
+          </a:xfrm>
+          <a:prstGeom prst="rect">
+            <a:avLst/>
+          </a:prstGeom>
+          <a:noFill/>
+          <a:extLst>
+            <a:ext uri="{909E8E84-426E-40DD-AFC4-6F175D3DCCD1}">
+              <a14:hiddenFill xmlns:a14="http://schemas.microsoft.com/office/drawing/2010/main">
+                <a:solidFill>
+                  <a:srgbClr val="FFFFFF"/>
+                </a:solidFill>
+              </a14:hiddenFill>
+            </a:ext>
+          </a:extLst>
+        </p:spPr>
+      </p:pic>
     </p:spTree>
     <p:extLst>
       <p:ext uri="{BB962C8B-B14F-4D97-AF65-F5344CB8AC3E}">
-        <p14:creationId xmlns:p14="http://schemas.microsoft.com/office/powerpoint/2010/main" xmlns="" val="2857880001"/>
+        <p14:creationId xmlns:p14="http://schemas.microsoft.com/office/powerpoint/2010/main" val="2857880001"/>
       </p:ext>
     </p:extLst>
   </p:cSld>
@@ -20361,10 +20822,51 @@
           </a:p>
         </p:txBody>
       </p:sp>
+      <p:pic>
+        <p:nvPicPr>
+          <p:cNvPr id="4" name="Picture 3" descr="1208185285896971921coredump_Glassy_WiFi_symbol.svg.hi-300x300"/>
+          <p:cNvPicPr>
+            <a:picLocks noChangeAspect="1" noChangeArrowheads="1"/>
+          </p:cNvPicPr>
+          <p:nvPr/>
+        </p:nvPicPr>
+        <p:blipFill>
+          <a:blip r:embed="rId2" cstate="print">
+            <a:extLst>
+              <a:ext uri="{28A0092B-C50C-407E-A947-70E740481C1C}">
+                <a14:useLocalDpi xmlns:a14="http://schemas.microsoft.com/office/drawing/2010/main" val="0"/>
+              </a:ext>
+            </a:extLst>
+          </a:blip>
+          <a:srcRect/>
+          <a:stretch>
+            <a:fillRect/>
+          </a:stretch>
+        </p:blipFill>
+        <p:spPr bwMode="auto">
+          <a:xfrm>
+            <a:off x="6982701" y="5689"/>
+            <a:ext cx="553244" cy="553244"/>
+          </a:xfrm>
+          <a:prstGeom prst="rect">
+            <a:avLst/>
+          </a:prstGeom>
+          <a:noFill/>
+          <a:extLst>
+            <a:ext uri="{909E8E84-426E-40DD-AFC4-6F175D3DCCD1}">
+              <a14:hiddenFill xmlns:a14="http://schemas.microsoft.com/office/drawing/2010/main">
+                <a:solidFill>
+                  <a:srgbClr val="FFFFFF"/>
+                </a:solidFill>
+              </a14:hiddenFill>
+            </a:ext>
+          </a:extLst>
+        </p:spPr>
+      </p:pic>
     </p:spTree>
     <p:extLst>
       <p:ext uri="{BB962C8B-B14F-4D97-AF65-F5344CB8AC3E}">
-        <p14:creationId xmlns:p14="http://schemas.microsoft.com/office/powerpoint/2010/main" xmlns="" val="2421466572"/>
+        <p14:creationId xmlns:p14="http://schemas.microsoft.com/office/powerpoint/2010/main" val="2421466572"/>
       </p:ext>
     </p:extLst>
   </p:cSld>
@@ -20475,7 +20977,7 @@
           <p:nvPr>
             <p:extLst>
               <p:ext uri="{D42A27DB-BD31-4B8C-83A1-F6EECF244321}">
-                <p14:modId xmlns:p14="http://schemas.microsoft.com/office/powerpoint/2010/main" xmlns="" val="899372415"/>
+                <p14:modId xmlns:p14="http://schemas.microsoft.com/office/powerpoint/2010/main" val="899372415"/>
               </p:ext>
             </p:extLst>
           </p:nvPr>
@@ -20490,10 +20992,51 @@
           </a:graphicData>
         </a:graphic>
       </p:graphicFrame>
+      <p:pic>
+        <p:nvPicPr>
+          <p:cNvPr id="6" name="Picture 5" descr="1208185285896971921coredump_Glassy_WiFi_symbol.svg.hi-300x300"/>
+          <p:cNvPicPr>
+            <a:picLocks noChangeAspect="1" noChangeArrowheads="1"/>
+          </p:cNvPicPr>
+          <p:nvPr/>
+        </p:nvPicPr>
+        <p:blipFill>
+          <a:blip r:embed="rId7" cstate="print">
+            <a:extLst>
+              <a:ext uri="{28A0092B-C50C-407E-A947-70E740481C1C}">
+                <a14:useLocalDpi xmlns:a14="http://schemas.microsoft.com/office/drawing/2010/main" val="0"/>
+              </a:ext>
+            </a:extLst>
+          </a:blip>
+          <a:srcRect/>
+          <a:stretch>
+            <a:fillRect/>
+          </a:stretch>
+        </p:blipFill>
+        <p:spPr bwMode="auto">
+          <a:xfrm>
+            <a:off x="6982701" y="5689"/>
+            <a:ext cx="553244" cy="553244"/>
+          </a:xfrm>
+          <a:prstGeom prst="rect">
+            <a:avLst/>
+          </a:prstGeom>
+          <a:noFill/>
+          <a:extLst>
+            <a:ext uri="{909E8E84-426E-40DD-AFC4-6F175D3DCCD1}">
+              <a14:hiddenFill xmlns:a14="http://schemas.microsoft.com/office/drawing/2010/main">
+                <a:solidFill>
+                  <a:srgbClr val="FFFFFF"/>
+                </a:solidFill>
+              </a14:hiddenFill>
+            </a:ext>
+          </a:extLst>
+        </p:spPr>
+      </p:pic>
     </p:spTree>
     <p:extLst>
       <p:ext uri="{BB962C8B-B14F-4D97-AF65-F5344CB8AC3E}">
-        <p14:creationId xmlns:p14="http://schemas.microsoft.com/office/powerpoint/2010/main" xmlns="" val="1218708985"/>
+        <p14:creationId xmlns:p14="http://schemas.microsoft.com/office/powerpoint/2010/main" val="1218708985"/>
       </p:ext>
     </p:extLst>
   </p:cSld>
@@ -20592,10 +21135,51 @@
           </a:p>
         </p:txBody>
       </p:sp>
+      <p:pic>
+        <p:nvPicPr>
+          <p:cNvPr id="4" name="Picture 3" descr="1208185285896971921coredump_Glassy_WiFi_symbol.svg.hi-300x300"/>
+          <p:cNvPicPr>
+            <a:picLocks noChangeAspect="1" noChangeArrowheads="1"/>
+          </p:cNvPicPr>
+          <p:nvPr/>
+        </p:nvPicPr>
+        <p:blipFill>
+          <a:blip r:embed="rId2" cstate="print">
+            <a:extLst>
+              <a:ext uri="{28A0092B-C50C-407E-A947-70E740481C1C}">
+                <a14:useLocalDpi xmlns:a14="http://schemas.microsoft.com/office/drawing/2010/main" val="0"/>
+              </a:ext>
+            </a:extLst>
+          </a:blip>
+          <a:srcRect/>
+          <a:stretch>
+            <a:fillRect/>
+          </a:stretch>
+        </p:blipFill>
+        <p:spPr bwMode="auto">
+          <a:xfrm>
+            <a:off x="6982701" y="5689"/>
+            <a:ext cx="553244" cy="553244"/>
+          </a:xfrm>
+          <a:prstGeom prst="rect">
+            <a:avLst/>
+          </a:prstGeom>
+          <a:noFill/>
+          <a:extLst>
+            <a:ext uri="{909E8E84-426E-40DD-AFC4-6F175D3DCCD1}">
+              <a14:hiddenFill xmlns:a14="http://schemas.microsoft.com/office/drawing/2010/main">
+                <a:solidFill>
+                  <a:srgbClr val="FFFFFF"/>
+                </a:solidFill>
+              </a14:hiddenFill>
+            </a:ext>
+          </a:extLst>
+        </p:spPr>
+      </p:pic>
     </p:spTree>
     <p:extLst>
       <p:ext uri="{BB962C8B-B14F-4D97-AF65-F5344CB8AC3E}">
-        <p14:creationId xmlns:p14="http://schemas.microsoft.com/office/powerpoint/2010/main" xmlns="" val="1218708985"/>
+        <p14:creationId xmlns:p14="http://schemas.microsoft.com/office/powerpoint/2010/main" val="1218708985"/>
       </p:ext>
     </p:extLst>
   </p:cSld>
@@ -20691,10 +21275,51 @@
           </a:p>
         </p:txBody>
       </p:sp>
+      <p:pic>
+        <p:nvPicPr>
+          <p:cNvPr id="4" name="Picture 3" descr="1208185285896971921coredump_Glassy_WiFi_symbol.svg.hi-300x300"/>
+          <p:cNvPicPr>
+            <a:picLocks noChangeAspect="1" noChangeArrowheads="1"/>
+          </p:cNvPicPr>
+          <p:nvPr/>
+        </p:nvPicPr>
+        <p:blipFill>
+          <a:blip r:embed="rId2" cstate="print">
+            <a:extLst>
+              <a:ext uri="{28A0092B-C50C-407E-A947-70E740481C1C}">
+                <a14:useLocalDpi xmlns:a14="http://schemas.microsoft.com/office/drawing/2010/main" val="0"/>
+              </a:ext>
+            </a:extLst>
+          </a:blip>
+          <a:srcRect/>
+          <a:stretch>
+            <a:fillRect/>
+          </a:stretch>
+        </p:blipFill>
+        <p:spPr bwMode="auto">
+          <a:xfrm>
+            <a:off x="6982701" y="5689"/>
+            <a:ext cx="553244" cy="553244"/>
+          </a:xfrm>
+          <a:prstGeom prst="rect">
+            <a:avLst/>
+          </a:prstGeom>
+          <a:noFill/>
+          <a:extLst>
+            <a:ext uri="{909E8E84-426E-40DD-AFC4-6F175D3DCCD1}">
+              <a14:hiddenFill xmlns:a14="http://schemas.microsoft.com/office/drawing/2010/main">
+                <a:solidFill>
+                  <a:srgbClr val="FFFFFF"/>
+                </a:solidFill>
+              </a14:hiddenFill>
+            </a:ext>
+          </a:extLst>
+        </p:spPr>
+      </p:pic>
     </p:spTree>
     <p:extLst>
       <p:ext uri="{BB962C8B-B14F-4D97-AF65-F5344CB8AC3E}">
-        <p14:creationId xmlns:p14="http://schemas.microsoft.com/office/powerpoint/2010/main" xmlns="" val="1218708985"/>
+        <p14:creationId xmlns:p14="http://schemas.microsoft.com/office/powerpoint/2010/main" val="1218708985"/>
       </p:ext>
     </p:extLst>
   </p:cSld>
@@ -20771,10 +21396,51 @@
           </a:p>
         </p:txBody>
       </p:sp>
+      <p:pic>
+        <p:nvPicPr>
+          <p:cNvPr id="4" name="Picture 3" descr="1208185285896971921coredump_Glassy_WiFi_symbol.svg.hi-300x300"/>
+          <p:cNvPicPr>
+            <a:picLocks noChangeAspect="1" noChangeArrowheads="1"/>
+          </p:cNvPicPr>
+          <p:nvPr/>
+        </p:nvPicPr>
+        <p:blipFill>
+          <a:blip r:embed="rId2" cstate="print">
+            <a:extLst>
+              <a:ext uri="{28A0092B-C50C-407E-A947-70E740481C1C}">
+                <a14:useLocalDpi xmlns:a14="http://schemas.microsoft.com/office/drawing/2010/main" val="0"/>
+              </a:ext>
+            </a:extLst>
+          </a:blip>
+          <a:srcRect/>
+          <a:stretch>
+            <a:fillRect/>
+          </a:stretch>
+        </p:blipFill>
+        <p:spPr bwMode="auto">
+          <a:xfrm>
+            <a:off x="6982701" y="5689"/>
+            <a:ext cx="553244" cy="553244"/>
+          </a:xfrm>
+          <a:prstGeom prst="rect">
+            <a:avLst/>
+          </a:prstGeom>
+          <a:noFill/>
+          <a:extLst>
+            <a:ext uri="{909E8E84-426E-40DD-AFC4-6F175D3DCCD1}">
+              <a14:hiddenFill xmlns:a14="http://schemas.microsoft.com/office/drawing/2010/main">
+                <a:solidFill>
+                  <a:srgbClr val="FFFFFF"/>
+                </a:solidFill>
+              </a14:hiddenFill>
+            </a:ext>
+          </a:extLst>
+        </p:spPr>
+      </p:pic>
     </p:spTree>
     <p:extLst>
       <p:ext uri="{BB962C8B-B14F-4D97-AF65-F5344CB8AC3E}">
-        <p14:creationId xmlns:p14="http://schemas.microsoft.com/office/powerpoint/2010/main" xmlns="" val="2262476767"/>
+        <p14:creationId xmlns:p14="http://schemas.microsoft.com/office/powerpoint/2010/main" val="2262476767"/>
       </p:ext>
     </p:extLst>
   </p:cSld>

</xml_diff>

<commit_message>
agrege a la presentacion lo hecho por Mariano
</commit_message>
<xml_diff>
--- a/Documentacion/Informe Preliminar/Presentacion Informe Preliminar.pptx
+++ b/Documentacion/Informe Preliminar/Presentacion Informe Preliminar.pptx
@@ -10,18 +10,19 @@
     <p:sldId id="258" r:id="rId4"/>
     <p:sldId id="259" r:id="rId5"/>
     <p:sldId id="260" r:id="rId6"/>
-    <p:sldId id="265" r:id="rId7"/>
-    <p:sldId id="264" r:id="rId8"/>
-    <p:sldId id="266" r:id="rId9"/>
-    <p:sldId id="262" r:id="rId10"/>
-    <p:sldId id="263" r:id="rId11"/>
-    <p:sldId id="267" r:id="rId12"/>
-    <p:sldId id="271" r:id="rId13"/>
-    <p:sldId id="272" r:id="rId14"/>
-    <p:sldId id="273" r:id="rId15"/>
-    <p:sldId id="268" r:id="rId16"/>
-    <p:sldId id="269" r:id="rId17"/>
-    <p:sldId id="270" r:id="rId18"/>
+    <p:sldId id="274" r:id="rId7"/>
+    <p:sldId id="265" r:id="rId8"/>
+    <p:sldId id="264" r:id="rId9"/>
+    <p:sldId id="266" r:id="rId10"/>
+    <p:sldId id="262" r:id="rId11"/>
+    <p:sldId id="263" r:id="rId12"/>
+    <p:sldId id="267" r:id="rId13"/>
+    <p:sldId id="271" r:id="rId14"/>
+    <p:sldId id="272" r:id="rId15"/>
+    <p:sldId id="273" r:id="rId16"/>
+    <p:sldId id="268" r:id="rId17"/>
+    <p:sldId id="269" r:id="rId18"/>
+    <p:sldId id="270" r:id="rId19"/>
   </p:sldIdLst>
   <p:sldSz cx="9144000" cy="6858000" type="screen4x3"/>
   <p:notesSz cx="6858000" cy="9144000"/>
@@ -18860,6 +18861,127 @@
           <a:p>
             <a:pPr algn="ctr"/>
             <a:r>
+              <a:rPr lang="es-AR" dirty="0" smtClean="0"/>
+              <a:t>Diagnostico</a:t>
+            </a:r>
+            <a:endParaRPr lang="es-AR" dirty="0"/>
+          </a:p>
+        </p:txBody>
+      </p:sp>
+      <p:sp>
+        <p:nvSpPr>
+          <p:cNvPr id="3" name="Content Placeholder 2"/>
+          <p:cNvSpPr>
+            <a:spLocks noGrp="1"/>
+          </p:cNvSpPr>
+          <p:nvPr>
+            <p:ph idx="1"/>
+          </p:nvPr>
+        </p:nvSpPr>
+        <p:spPr/>
+        <p:txBody>
+          <a:bodyPr/>
+          <a:lstStyle/>
+          <a:p>
+            <a:endParaRPr lang="en-US" dirty="0"/>
+          </a:p>
+        </p:txBody>
+      </p:sp>
+      <p:pic>
+        <p:nvPicPr>
+          <p:cNvPr id="4" name="Picture 3" descr="1208185285896971921coredump_Glassy_WiFi_symbol.svg.hi-300x300"/>
+          <p:cNvPicPr>
+            <a:picLocks noChangeAspect="1" noChangeArrowheads="1"/>
+          </p:cNvPicPr>
+          <p:nvPr/>
+        </p:nvPicPr>
+        <p:blipFill>
+          <a:blip r:embed="rId2" cstate="print">
+            <a:extLst>
+              <a:ext uri="{28A0092B-C50C-407E-A947-70E740481C1C}">
+                <a14:useLocalDpi xmlns:a14="http://schemas.microsoft.com/office/drawing/2010/main" val="0"/>
+              </a:ext>
+            </a:extLst>
+          </a:blip>
+          <a:srcRect/>
+          <a:stretch>
+            <a:fillRect/>
+          </a:stretch>
+        </p:blipFill>
+        <p:spPr bwMode="auto">
+          <a:xfrm>
+            <a:off x="6982701" y="5689"/>
+            <a:ext cx="553244" cy="553244"/>
+          </a:xfrm>
+          <a:prstGeom prst="rect">
+            <a:avLst/>
+          </a:prstGeom>
+          <a:noFill/>
+          <a:extLst>
+            <a:ext uri="{909E8E84-426E-40DD-AFC4-6F175D3DCCD1}">
+              <a14:hiddenFill xmlns:a14="http://schemas.microsoft.com/office/drawing/2010/main">
+                <a:solidFill>
+                  <a:srgbClr val="FFFFFF"/>
+                </a:solidFill>
+              </a14:hiddenFill>
+            </a:ext>
+          </a:extLst>
+        </p:spPr>
+      </p:pic>
+    </p:spTree>
+    <p:extLst>
+      <p:ext uri="{BB962C8B-B14F-4D97-AF65-F5344CB8AC3E}">
+        <p14:creationId xmlns:p14="http://schemas.microsoft.com/office/powerpoint/2010/main" val="2262476767"/>
+      </p:ext>
+    </p:extLst>
+  </p:cSld>
+  <p:clrMapOvr>
+    <a:masterClrMapping/>
+  </p:clrMapOvr>
+  <p:timing>
+    <p:tnLst>
+      <p:par>
+        <p:cTn id="1" dur="indefinite" restart="never" nodeType="tmRoot"/>
+      </p:par>
+    </p:tnLst>
+  </p:timing>
+</p:sld>
+</file>
+
+<file path=ppt/slides/slide11.xml><?xml version="1.0" encoding="utf-8"?>
+<p:sld xmlns:a="http://schemas.openxmlformats.org/drawingml/2006/main" xmlns:r="http://schemas.openxmlformats.org/officeDocument/2006/relationships" xmlns:p="http://schemas.openxmlformats.org/presentationml/2006/main">
+  <p:cSld>
+    <p:spTree>
+      <p:nvGrpSpPr>
+        <p:cNvPr id="1" name=""/>
+        <p:cNvGrpSpPr/>
+        <p:nvPr/>
+      </p:nvGrpSpPr>
+      <p:grpSpPr>
+        <a:xfrm>
+          <a:off x="0" y="0"/>
+          <a:ext cx="0" cy="0"/>
+          <a:chOff x="0" y="0"/>
+          <a:chExt cx="0" cy="0"/>
+        </a:xfrm>
+      </p:grpSpPr>
+      <p:sp>
+        <p:nvSpPr>
+          <p:cNvPr id="2" name="Title 1"/>
+          <p:cNvSpPr>
+            <a:spLocks noGrp="1"/>
+          </p:cNvSpPr>
+          <p:nvPr>
+            <p:ph type="title"/>
+          </p:nvPr>
+        </p:nvSpPr>
+        <p:spPr/>
+        <p:txBody>
+          <a:bodyPr/>
+          <a:lstStyle/>
+          <a:p>
+            <a:pPr algn="ctr"/>
+            <a:r>
               <a:rPr lang="en-US" dirty="0" err="1"/>
               <a:t>Propuesta</a:t>
             </a:r>
@@ -18947,7 +19069,7 @@
 </p:sld>
 </file>
 
-<file path=ppt/slides/slide11.xml><?xml version="1.0" encoding="utf-8"?>
+<file path=ppt/slides/slide12.xml><?xml version="1.0" encoding="utf-8"?>
 <p:sld xmlns:a="http://schemas.openxmlformats.org/drawingml/2006/main" xmlns:r="http://schemas.openxmlformats.org/officeDocument/2006/relationships" xmlns:p="http://schemas.openxmlformats.org/presentationml/2006/main">
   <p:cSld>
     <p:spTree>
@@ -19110,7 +19232,7 @@
 </p:sld>
 </file>
 
-<file path=ppt/slides/slide12.xml><?xml version="1.0" encoding="utf-8"?>
+<file path=ppt/slides/slide13.xml><?xml version="1.0" encoding="utf-8"?>
 <p:sld xmlns:a="http://schemas.openxmlformats.org/drawingml/2006/main" xmlns:r="http://schemas.openxmlformats.org/officeDocument/2006/relationships" xmlns:p="http://schemas.openxmlformats.org/presentationml/2006/main">
   <p:cSld>
     <p:spTree>
@@ -19238,7 +19360,7 @@
 </p:sld>
 </file>
 
-<file path=ppt/slides/slide13.xml><?xml version="1.0" encoding="utf-8"?>
+<file path=ppt/slides/slide14.xml><?xml version="1.0" encoding="utf-8"?>
 <p:sld xmlns:a="http://schemas.openxmlformats.org/drawingml/2006/main" xmlns:r="http://schemas.openxmlformats.org/officeDocument/2006/relationships" xmlns:p="http://schemas.openxmlformats.org/presentationml/2006/main">
   <p:cSld>
     <p:spTree>
@@ -19366,7 +19488,7 @@
 </p:sld>
 </file>
 
-<file path=ppt/slides/slide14.xml><?xml version="1.0" encoding="utf-8"?>
+<file path=ppt/slides/slide15.xml><?xml version="1.0" encoding="utf-8"?>
 <p:sld xmlns:a="http://schemas.openxmlformats.org/drawingml/2006/main" xmlns:r="http://schemas.openxmlformats.org/officeDocument/2006/relationships" xmlns:p="http://schemas.openxmlformats.org/presentationml/2006/main">
   <p:cSld>
     <p:spTree>
@@ -19494,7 +19616,7 @@
 </p:sld>
 </file>
 
-<file path=ppt/slides/slide15.xml><?xml version="1.0" encoding="utf-8"?>
+<file path=ppt/slides/slide16.xml><?xml version="1.0" encoding="utf-8"?>
 <p:sld xmlns:a="http://schemas.openxmlformats.org/drawingml/2006/main" xmlns:r="http://schemas.openxmlformats.org/officeDocument/2006/relationships" xmlns:p="http://schemas.openxmlformats.org/presentationml/2006/main">
   <p:cSld>
     <p:spTree>
@@ -19625,7 +19747,7 @@
 </p:sld>
 </file>
 
-<file path=ppt/slides/slide16.xml><?xml version="1.0" encoding="utf-8"?>
+<file path=ppt/slides/slide17.xml><?xml version="1.0" encoding="utf-8"?>
 <p:sld xmlns:a="http://schemas.openxmlformats.org/drawingml/2006/main" xmlns:r="http://schemas.openxmlformats.org/officeDocument/2006/relationships" xmlns:p="http://schemas.openxmlformats.org/presentationml/2006/main">
   <p:cSld>
     <p:spTree>
@@ -19746,7 +19868,7 @@
 </p:sld>
 </file>
 
-<file path=ppt/slides/slide17.xml><?xml version="1.0" encoding="utf-8"?>
+<file path=ppt/slides/slide18.xml><?xml version="1.0" encoding="utf-8"?>
 <p:sld xmlns:a="http://schemas.openxmlformats.org/drawingml/2006/main" xmlns:r="http://schemas.openxmlformats.org/officeDocument/2006/relationships" xmlns:p="http://schemas.openxmlformats.org/presentationml/2006/main">
   <p:cSld>
     <p:spTree>
@@ -20796,9 +20918,50 @@
           </a:p>
         </p:txBody>
       </p:sp>
+      <p:pic>
+        <p:nvPicPr>
+          <p:cNvPr id="4" name="Picture 3" descr="1208185285896971921coredump_Glassy_WiFi_symbol.svg.hi-300x300"/>
+          <p:cNvPicPr>
+            <a:picLocks noChangeAspect="1" noChangeArrowheads="1"/>
+          </p:cNvPicPr>
+          <p:nvPr/>
+        </p:nvPicPr>
+        <p:blipFill>
+          <a:blip r:embed="rId2" cstate="print">
+            <a:extLst>
+              <a:ext uri="{28A0092B-C50C-407E-A947-70E740481C1C}">
+                <a14:useLocalDpi xmlns:a14="http://schemas.microsoft.com/office/drawing/2010/main" val="0"/>
+              </a:ext>
+            </a:extLst>
+          </a:blip>
+          <a:srcRect/>
+          <a:stretch>
+            <a:fillRect/>
+          </a:stretch>
+        </p:blipFill>
+        <p:spPr bwMode="auto">
+          <a:xfrm>
+            <a:off x="6982701" y="5689"/>
+            <a:ext cx="553244" cy="553244"/>
+          </a:xfrm>
+          <a:prstGeom prst="rect">
+            <a:avLst/>
+          </a:prstGeom>
+          <a:noFill/>
+          <a:extLst>
+            <a:ext uri="{909E8E84-426E-40DD-AFC4-6F175D3DCCD1}">
+              <a14:hiddenFill xmlns:a14="http://schemas.microsoft.com/office/drawing/2010/main">
+                <a:solidFill>
+                  <a:srgbClr val="FFFFFF"/>
+                </a:solidFill>
+              </a14:hiddenFill>
+            </a:ext>
+          </a:extLst>
+        </p:spPr>
+      </p:pic>
       <p:sp>
         <p:nvSpPr>
-          <p:cNvPr id="3" name="Content Placeholder 2"/>
+          <p:cNvPr id="7" name="Content Placeholder 2"/>
           <p:cNvSpPr>
             <a:spLocks noGrp="1"/>
           </p:cNvSpPr>
@@ -20806,17 +20969,309 @@
             <p:ph idx="1"/>
           </p:nvPr>
         </p:nvSpPr>
-        <p:spPr/>
+        <p:spPr>
+          <a:prstGeom prst="rect">
+            <a:avLst/>
+          </a:prstGeom>
+        </p:spPr>
         <p:txBody>
-          <a:bodyPr/>
-          <a:lstStyle/>
+          <a:bodyPr vert="horz" lIns="91440" tIns="45720" rIns="91440" bIns="45720" rtlCol="0">
+            <a:normAutofit/>
+          </a:bodyPr>
+          <a:lstStyle>
+            <a:lvl1pPr marL="342900" indent="-274320" algn="l" defTabSz="914400" rtl="0" eaLnBrk="1" latinLnBrk="0" hangingPunct="1">
+              <a:spcBef>
+                <a:spcPct val="20000"/>
+              </a:spcBef>
+              <a:buClr>
+                <a:schemeClr val="accent1"/>
+              </a:buClr>
+              <a:buSzPct val="76000"/>
+              <a:buFont typeface="Wingdings 2" pitchFamily="18" charset="2"/>
+              <a:buChar char=""/>
+              <a:defRPr sz="2400" kern="1200">
+                <a:solidFill>
+                  <a:schemeClr val="tx2"/>
+                </a:solidFill>
+                <a:latin typeface="+mn-lt"/>
+                <a:ea typeface="+mn-ea"/>
+                <a:cs typeface="+mn-cs"/>
+              </a:defRPr>
+            </a:lvl1pPr>
+            <a:lvl2pPr marL="640080" indent="-274320" algn="l" defTabSz="914400" rtl="0" eaLnBrk="1" latinLnBrk="0" hangingPunct="1">
+              <a:spcBef>
+                <a:spcPct val="20000"/>
+              </a:spcBef>
+              <a:buClr>
+                <a:schemeClr val="accent1"/>
+              </a:buClr>
+              <a:buSzPct val="76000"/>
+              <a:buFont typeface="Wingdings 2" pitchFamily="18" charset="2"/>
+              <a:buChar char=""/>
+              <a:defRPr sz="2200" kern="1200">
+                <a:solidFill>
+                  <a:schemeClr val="tx2"/>
+                </a:solidFill>
+                <a:latin typeface="+mn-lt"/>
+                <a:ea typeface="+mn-ea"/>
+                <a:cs typeface="+mn-cs"/>
+              </a:defRPr>
+            </a:lvl2pPr>
+            <a:lvl3pPr marL="914400" indent="-228600" algn="l" defTabSz="914400" rtl="0" eaLnBrk="1" latinLnBrk="0" hangingPunct="1">
+              <a:spcBef>
+                <a:spcPct val="20000"/>
+              </a:spcBef>
+              <a:buClr>
+                <a:schemeClr val="accent1"/>
+              </a:buClr>
+              <a:buSzPct val="76000"/>
+              <a:buFont typeface="Wingdings 2" pitchFamily="18" charset="2"/>
+              <a:buChar char=""/>
+              <a:defRPr sz="2000" kern="1200">
+                <a:solidFill>
+                  <a:schemeClr val="tx2"/>
+                </a:solidFill>
+                <a:latin typeface="+mn-lt"/>
+                <a:ea typeface="+mn-ea"/>
+                <a:cs typeface="+mn-cs"/>
+              </a:defRPr>
+            </a:lvl3pPr>
+            <a:lvl4pPr marL="1124712" indent="-228600" algn="l" defTabSz="914400" rtl="0" eaLnBrk="1" latinLnBrk="0" hangingPunct="1">
+              <a:spcBef>
+                <a:spcPct val="20000"/>
+              </a:spcBef>
+              <a:buClr>
+                <a:schemeClr val="accent1"/>
+              </a:buClr>
+              <a:buSzPct val="76000"/>
+              <a:buFont typeface="Wingdings 2" pitchFamily="18" charset="2"/>
+              <a:buChar char=""/>
+              <a:defRPr sz="1800" kern="1200">
+                <a:solidFill>
+                  <a:schemeClr val="tx2"/>
+                </a:solidFill>
+                <a:latin typeface="+mn-lt"/>
+                <a:ea typeface="+mn-ea"/>
+                <a:cs typeface="+mn-cs"/>
+              </a:defRPr>
+            </a:lvl4pPr>
+            <a:lvl5pPr marL="1325880" indent="-228600" algn="l" defTabSz="914400" rtl="0" eaLnBrk="1" latinLnBrk="0" hangingPunct="1">
+              <a:spcBef>
+                <a:spcPct val="20000"/>
+              </a:spcBef>
+              <a:buClr>
+                <a:schemeClr val="accent1"/>
+              </a:buClr>
+              <a:buSzPct val="76000"/>
+              <a:buFont typeface="Wingdings 2" pitchFamily="18" charset="2"/>
+              <a:buChar char=""/>
+              <a:defRPr sz="1600" kern="1200" baseline="0">
+                <a:solidFill>
+                  <a:schemeClr val="tx2"/>
+                </a:solidFill>
+                <a:latin typeface="+mn-lt"/>
+                <a:ea typeface="+mn-ea"/>
+                <a:cs typeface="+mn-cs"/>
+              </a:defRPr>
+            </a:lvl5pPr>
+            <a:lvl6pPr marL="1517904" indent="-228600" algn="l" defTabSz="914400" rtl="0" eaLnBrk="1" latinLnBrk="0" hangingPunct="1">
+              <a:spcBef>
+                <a:spcPct val="20000"/>
+              </a:spcBef>
+              <a:buClr>
+                <a:schemeClr val="accent1"/>
+              </a:buClr>
+              <a:buSzPct val="76000"/>
+              <a:buFont typeface="Wingdings 2" pitchFamily="18" charset="2"/>
+              <a:buChar char=""/>
+              <a:defRPr sz="1400" kern="1200">
+                <a:solidFill>
+                  <a:schemeClr val="tx2"/>
+                </a:solidFill>
+                <a:latin typeface="+mn-lt"/>
+                <a:ea typeface="+mn-ea"/>
+                <a:cs typeface="+mn-cs"/>
+              </a:defRPr>
+            </a:lvl6pPr>
+            <a:lvl7pPr marL="1719072" indent="-228600" algn="l" defTabSz="914400" rtl="0" eaLnBrk="1" latinLnBrk="0" hangingPunct="1">
+              <a:spcBef>
+                <a:spcPct val="20000"/>
+              </a:spcBef>
+              <a:buClr>
+                <a:schemeClr val="accent1"/>
+              </a:buClr>
+              <a:buSzPct val="76000"/>
+              <a:buFont typeface="Wingdings 2" pitchFamily="18" charset="2"/>
+              <a:buChar char=""/>
+              <a:defRPr sz="1400" kern="1200">
+                <a:solidFill>
+                  <a:schemeClr val="tx2"/>
+                </a:solidFill>
+                <a:latin typeface="+mn-lt"/>
+                <a:ea typeface="+mn-ea"/>
+                <a:cs typeface="+mn-cs"/>
+              </a:defRPr>
+            </a:lvl7pPr>
+            <a:lvl8pPr marL="1920240" indent="-228600" algn="l" defTabSz="914400" rtl="0" eaLnBrk="1" latinLnBrk="0" hangingPunct="1">
+              <a:spcBef>
+                <a:spcPct val="20000"/>
+              </a:spcBef>
+              <a:buClr>
+                <a:schemeClr val="accent1"/>
+              </a:buClr>
+              <a:buSzPct val="76000"/>
+              <a:buFont typeface="Wingdings 2" pitchFamily="18" charset="2"/>
+              <a:buChar char=""/>
+              <a:defRPr sz="1400" kern="1200">
+                <a:solidFill>
+                  <a:schemeClr val="tx2"/>
+                </a:solidFill>
+                <a:latin typeface="+mn-lt"/>
+                <a:ea typeface="+mn-ea"/>
+                <a:cs typeface="+mn-cs"/>
+              </a:defRPr>
+            </a:lvl8pPr>
+            <a:lvl9pPr marL="2121408" indent="-228600" algn="l" defTabSz="914400" rtl="0" eaLnBrk="1" latinLnBrk="0" hangingPunct="1">
+              <a:spcBef>
+                <a:spcPct val="20000"/>
+              </a:spcBef>
+              <a:buClr>
+                <a:schemeClr val="accent1"/>
+              </a:buClr>
+              <a:buSzPct val="76000"/>
+              <a:buFont typeface="Wingdings 2" pitchFamily="18" charset="2"/>
+              <a:buChar char=""/>
+              <a:defRPr sz="1400" kern="1200">
+                <a:solidFill>
+                  <a:schemeClr val="tx2"/>
+                </a:solidFill>
+                <a:latin typeface="+mn-lt"/>
+                <a:ea typeface="+mn-ea"/>
+                <a:cs typeface="+mn-cs"/>
+              </a:defRPr>
+            </a:lvl9pPr>
+          </a:lstStyle>
           <a:p>
             <a:pPr marL="114300" indent="0" algn="ctr">
               <a:buNone/>
             </a:pPr>
             <a:r>
-              <a:rPr lang="es-ES" sz="3200" dirty="0"/>
-              <a:t>Introducción</a:t>
+              <a:rPr lang="es-ES" sz="3200" dirty="0" smtClean="0"/>
+              <a:t>Introducción 1/2:</a:t>
+            </a:r>
+            <a:endParaRPr lang="es-ES" sz="3200" dirty="0" smtClean="0"/>
+          </a:p>
+          <a:p>
+            <a:pPr marL="114300" indent="0" algn="ctr">
+              <a:buNone/>
+            </a:pPr>
+            <a:endParaRPr lang="es-ES" sz="3200" dirty="0" smtClean="0"/>
+          </a:p>
+          <a:p>
+            <a:r>
+              <a:rPr lang="es-AR" sz="1800" dirty="0" smtClean="0"/>
+              <a:t>Es una empresa de soluciones en ingeniería y telecomunicaciones.</a:t>
+            </a:r>
+            <a:endParaRPr lang="es-ES" sz="1800" dirty="0" smtClean="0"/>
+          </a:p>
+          <a:p>
+            <a:r>
+              <a:rPr lang="es-AR" sz="1800" dirty="0" smtClean="0"/>
+              <a:t>especializado en telecomunicaciones para celulares.</a:t>
+            </a:r>
+            <a:endParaRPr lang="es-ES" sz="1800" dirty="0" smtClean="0"/>
+          </a:p>
+          <a:p>
+            <a:r>
+              <a:rPr lang="es-AR" sz="1800" dirty="0" err="1" smtClean="0"/>
+              <a:t>Coming</a:t>
+            </a:r>
+            <a:r>
+              <a:rPr lang="es-AR" sz="1800" dirty="0" smtClean="0"/>
+              <a:t> S.A. surgió en 1987.</a:t>
+            </a:r>
+            <a:endParaRPr lang="es-ES" sz="1800" dirty="0" smtClean="0"/>
+          </a:p>
+          <a:p>
+            <a:r>
+              <a:rPr lang="es-AR" sz="1800" dirty="0" smtClean="0"/>
+              <a:t>en 1995 ya incursionaron en telefonía.</a:t>
+            </a:r>
+            <a:endParaRPr lang="en-US" dirty="0"/>
+          </a:p>
+        </p:txBody>
+      </p:sp>
+    </p:spTree>
+    <p:extLst>
+      <p:ext uri="{BB962C8B-B14F-4D97-AF65-F5344CB8AC3E}">
+        <p14:creationId xmlns:p14="http://schemas.microsoft.com/office/powerpoint/2010/main" val="2421466572"/>
+      </p:ext>
+    </p:extLst>
+  </p:cSld>
+  <p:clrMapOvr>
+    <a:masterClrMapping/>
+  </p:clrMapOvr>
+  <p:timing>
+    <p:tnLst>
+      <p:par>
+        <p:cTn id="1" dur="indefinite" restart="never" nodeType="tmRoot"/>
+      </p:par>
+    </p:tnLst>
+  </p:timing>
+</p:sld>
+</file>
+
+<file path=ppt/slides/slide6.xml><?xml version="1.0" encoding="utf-8"?>
+<p:sld xmlns:a="http://schemas.openxmlformats.org/drawingml/2006/main" xmlns:r="http://schemas.openxmlformats.org/officeDocument/2006/relationships" xmlns:p="http://schemas.openxmlformats.org/presentationml/2006/main">
+  <p:cSld>
+    <p:spTree>
+      <p:nvGrpSpPr>
+        <p:cNvPr id="1" name=""/>
+        <p:cNvGrpSpPr/>
+        <p:nvPr/>
+      </p:nvGrpSpPr>
+      <p:grpSpPr>
+        <a:xfrm>
+          <a:off x="0" y="0"/>
+          <a:ext cx="0" cy="0"/>
+          <a:chOff x="0" y="0"/>
+          <a:chExt cx="0" cy="0"/>
+        </a:xfrm>
+      </p:grpSpPr>
+      <p:sp>
+        <p:nvSpPr>
+          <p:cNvPr id="2" name="Title 1"/>
+          <p:cNvSpPr>
+            <a:spLocks noGrp="1"/>
+          </p:cNvSpPr>
+          <p:nvPr>
+            <p:ph type="title"/>
+          </p:nvPr>
+        </p:nvSpPr>
+        <p:spPr>
+          <a:xfrm>
+            <a:off x="1071538" y="785794"/>
+            <a:ext cx="7024744" cy="1143000"/>
+          </a:xfrm>
+        </p:spPr>
+        <p:txBody>
+          <a:bodyPr>
+            <a:normAutofit fontScale="90000"/>
+          </a:bodyPr>
+          <a:lstStyle/>
+          <a:p>
+            <a:pPr algn="ctr"/>
+            <a:r>
+              <a:rPr lang="es-AR" dirty="0"/>
+              <a:t>Presentación</a:t>
+            </a:r>
+            <a:r>
+              <a:rPr lang="en-US" dirty="0"/>
+              <a:t> de la </a:t>
+            </a:r>
+            <a:r>
+              <a:rPr lang="es-AR" dirty="0"/>
+              <a:t>empresa</a:t>
             </a:r>
             <a:endParaRPr lang="en-US" dirty="0"/>
           </a:p>
@@ -20863,10 +21318,257 @@
           </a:extLst>
         </p:spPr>
       </p:pic>
+      <p:sp>
+        <p:nvSpPr>
+          <p:cNvPr id="7" name="Content Placeholder 2"/>
+          <p:cNvSpPr>
+            <a:spLocks noGrp="1"/>
+          </p:cNvSpPr>
+          <p:nvPr>
+            <p:ph idx="1"/>
+          </p:nvPr>
+        </p:nvSpPr>
+        <p:spPr>
+          <a:xfrm>
+            <a:off x="1043492" y="2323653"/>
+            <a:ext cx="6777317" cy="1105348"/>
+          </a:xfrm>
+          <a:prstGeom prst="rect">
+            <a:avLst/>
+          </a:prstGeom>
+        </p:spPr>
+        <p:txBody>
+          <a:bodyPr vert="horz" lIns="91440" tIns="45720" rIns="91440" bIns="45720" rtlCol="0">
+            <a:normAutofit/>
+          </a:bodyPr>
+          <a:lstStyle>
+            <a:lvl1pPr marL="342900" indent="-274320" algn="l" defTabSz="914400" rtl="0" eaLnBrk="1" latinLnBrk="0" hangingPunct="1">
+              <a:spcBef>
+                <a:spcPct val="20000"/>
+              </a:spcBef>
+              <a:buClr>
+                <a:schemeClr val="accent1"/>
+              </a:buClr>
+              <a:buSzPct val="76000"/>
+              <a:buFont typeface="Wingdings 2" pitchFamily="18" charset="2"/>
+              <a:buChar char=""/>
+              <a:defRPr sz="2400" kern="1200">
+                <a:solidFill>
+                  <a:schemeClr val="tx2"/>
+                </a:solidFill>
+                <a:latin typeface="+mn-lt"/>
+                <a:ea typeface="+mn-ea"/>
+                <a:cs typeface="+mn-cs"/>
+              </a:defRPr>
+            </a:lvl1pPr>
+            <a:lvl2pPr marL="640080" indent="-274320" algn="l" defTabSz="914400" rtl="0" eaLnBrk="1" latinLnBrk="0" hangingPunct="1">
+              <a:spcBef>
+                <a:spcPct val="20000"/>
+              </a:spcBef>
+              <a:buClr>
+                <a:schemeClr val="accent1"/>
+              </a:buClr>
+              <a:buSzPct val="76000"/>
+              <a:buFont typeface="Wingdings 2" pitchFamily="18" charset="2"/>
+              <a:buChar char=""/>
+              <a:defRPr sz="2200" kern="1200">
+                <a:solidFill>
+                  <a:schemeClr val="tx2"/>
+                </a:solidFill>
+                <a:latin typeface="+mn-lt"/>
+                <a:ea typeface="+mn-ea"/>
+                <a:cs typeface="+mn-cs"/>
+              </a:defRPr>
+            </a:lvl2pPr>
+            <a:lvl3pPr marL="914400" indent="-228600" algn="l" defTabSz="914400" rtl="0" eaLnBrk="1" latinLnBrk="0" hangingPunct="1">
+              <a:spcBef>
+                <a:spcPct val="20000"/>
+              </a:spcBef>
+              <a:buClr>
+                <a:schemeClr val="accent1"/>
+              </a:buClr>
+              <a:buSzPct val="76000"/>
+              <a:buFont typeface="Wingdings 2" pitchFamily="18" charset="2"/>
+              <a:buChar char=""/>
+              <a:defRPr sz="2000" kern="1200">
+                <a:solidFill>
+                  <a:schemeClr val="tx2"/>
+                </a:solidFill>
+                <a:latin typeface="+mn-lt"/>
+                <a:ea typeface="+mn-ea"/>
+                <a:cs typeface="+mn-cs"/>
+              </a:defRPr>
+            </a:lvl3pPr>
+            <a:lvl4pPr marL="1124712" indent="-228600" algn="l" defTabSz="914400" rtl="0" eaLnBrk="1" latinLnBrk="0" hangingPunct="1">
+              <a:spcBef>
+                <a:spcPct val="20000"/>
+              </a:spcBef>
+              <a:buClr>
+                <a:schemeClr val="accent1"/>
+              </a:buClr>
+              <a:buSzPct val="76000"/>
+              <a:buFont typeface="Wingdings 2" pitchFamily="18" charset="2"/>
+              <a:buChar char=""/>
+              <a:defRPr sz="1800" kern="1200">
+                <a:solidFill>
+                  <a:schemeClr val="tx2"/>
+                </a:solidFill>
+                <a:latin typeface="+mn-lt"/>
+                <a:ea typeface="+mn-ea"/>
+                <a:cs typeface="+mn-cs"/>
+              </a:defRPr>
+            </a:lvl4pPr>
+            <a:lvl5pPr marL="1325880" indent="-228600" algn="l" defTabSz="914400" rtl="0" eaLnBrk="1" latinLnBrk="0" hangingPunct="1">
+              <a:spcBef>
+                <a:spcPct val="20000"/>
+              </a:spcBef>
+              <a:buClr>
+                <a:schemeClr val="accent1"/>
+              </a:buClr>
+              <a:buSzPct val="76000"/>
+              <a:buFont typeface="Wingdings 2" pitchFamily="18" charset="2"/>
+              <a:buChar char=""/>
+              <a:defRPr sz="1600" kern="1200" baseline="0">
+                <a:solidFill>
+                  <a:schemeClr val="tx2"/>
+                </a:solidFill>
+                <a:latin typeface="+mn-lt"/>
+                <a:ea typeface="+mn-ea"/>
+                <a:cs typeface="+mn-cs"/>
+              </a:defRPr>
+            </a:lvl5pPr>
+            <a:lvl6pPr marL="1517904" indent="-228600" algn="l" defTabSz="914400" rtl="0" eaLnBrk="1" latinLnBrk="0" hangingPunct="1">
+              <a:spcBef>
+                <a:spcPct val="20000"/>
+              </a:spcBef>
+              <a:buClr>
+                <a:schemeClr val="accent1"/>
+              </a:buClr>
+              <a:buSzPct val="76000"/>
+              <a:buFont typeface="Wingdings 2" pitchFamily="18" charset="2"/>
+              <a:buChar char=""/>
+              <a:defRPr sz="1400" kern="1200">
+                <a:solidFill>
+                  <a:schemeClr val="tx2"/>
+                </a:solidFill>
+                <a:latin typeface="+mn-lt"/>
+                <a:ea typeface="+mn-ea"/>
+                <a:cs typeface="+mn-cs"/>
+              </a:defRPr>
+            </a:lvl6pPr>
+            <a:lvl7pPr marL="1719072" indent="-228600" algn="l" defTabSz="914400" rtl="0" eaLnBrk="1" latinLnBrk="0" hangingPunct="1">
+              <a:spcBef>
+                <a:spcPct val="20000"/>
+              </a:spcBef>
+              <a:buClr>
+                <a:schemeClr val="accent1"/>
+              </a:buClr>
+              <a:buSzPct val="76000"/>
+              <a:buFont typeface="Wingdings 2" pitchFamily="18" charset="2"/>
+              <a:buChar char=""/>
+              <a:defRPr sz="1400" kern="1200">
+                <a:solidFill>
+                  <a:schemeClr val="tx2"/>
+                </a:solidFill>
+                <a:latin typeface="+mn-lt"/>
+                <a:ea typeface="+mn-ea"/>
+                <a:cs typeface="+mn-cs"/>
+              </a:defRPr>
+            </a:lvl7pPr>
+            <a:lvl8pPr marL="1920240" indent="-228600" algn="l" defTabSz="914400" rtl="0" eaLnBrk="1" latinLnBrk="0" hangingPunct="1">
+              <a:spcBef>
+                <a:spcPct val="20000"/>
+              </a:spcBef>
+              <a:buClr>
+                <a:schemeClr val="accent1"/>
+              </a:buClr>
+              <a:buSzPct val="76000"/>
+              <a:buFont typeface="Wingdings 2" pitchFamily="18" charset="2"/>
+              <a:buChar char=""/>
+              <a:defRPr sz="1400" kern="1200">
+                <a:solidFill>
+                  <a:schemeClr val="tx2"/>
+                </a:solidFill>
+                <a:latin typeface="+mn-lt"/>
+                <a:ea typeface="+mn-ea"/>
+                <a:cs typeface="+mn-cs"/>
+              </a:defRPr>
+            </a:lvl8pPr>
+            <a:lvl9pPr marL="2121408" indent="-228600" algn="l" defTabSz="914400" rtl="0" eaLnBrk="1" latinLnBrk="0" hangingPunct="1">
+              <a:spcBef>
+                <a:spcPct val="20000"/>
+              </a:spcBef>
+              <a:buClr>
+                <a:schemeClr val="accent1"/>
+              </a:buClr>
+              <a:buSzPct val="76000"/>
+              <a:buFont typeface="Wingdings 2" pitchFamily="18" charset="2"/>
+              <a:buChar char=""/>
+              <a:defRPr sz="1400" kern="1200">
+                <a:solidFill>
+                  <a:schemeClr val="tx2"/>
+                </a:solidFill>
+                <a:latin typeface="+mn-lt"/>
+                <a:ea typeface="+mn-ea"/>
+                <a:cs typeface="+mn-cs"/>
+              </a:defRPr>
+            </a:lvl9pPr>
+          </a:lstStyle>
+          <a:p>
+            <a:pPr marL="114300" indent="0" algn="ctr">
+              <a:buNone/>
+            </a:pPr>
+            <a:r>
+              <a:rPr lang="es-ES" sz="3200" dirty="0" smtClean="0"/>
+              <a:t>Introducción 2/2:</a:t>
+            </a:r>
+            <a:endParaRPr lang="es-ES" sz="3200" dirty="0" smtClean="0"/>
+          </a:p>
+          <a:p>
+            <a:pPr marL="114300" indent="0" algn="ctr">
+              <a:buNone/>
+            </a:pPr>
+            <a:endParaRPr lang="es-ES" sz="3200" dirty="0" smtClean="0"/>
+          </a:p>
+        </p:txBody>
+      </p:sp>
+      <p:pic>
+        <p:nvPicPr>
+          <p:cNvPr id="6" name="Picture 5"/>
+          <p:cNvPicPr>
+            <a:picLocks noChangeAspect="1" noChangeArrowheads="1"/>
+          </p:cNvPicPr>
+          <p:nvPr/>
+        </p:nvPicPr>
+        <p:blipFill>
+          <a:blip r:embed="rId3"/>
+          <a:srcRect/>
+          <a:stretch>
+            <a:fillRect/>
+          </a:stretch>
+        </p:blipFill>
+        <p:spPr bwMode="auto">
+          <a:xfrm>
+            <a:off x="1547664" y="3212976"/>
+            <a:ext cx="5849366" cy="2773926"/>
+          </a:xfrm>
+          <a:prstGeom prst="rect">
+            <a:avLst/>
+          </a:prstGeom>
+          <a:noFill/>
+          <a:ln w="9525">
+            <a:noFill/>
+            <a:miter lim="800000"/>
+            <a:headEnd/>
+            <a:tailEnd/>
+          </a:ln>
+          <a:effectLst/>
+        </p:spPr>
+      </p:pic>
     </p:spTree>
     <p:extLst>
       <p:ext uri="{BB962C8B-B14F-4D97-AF65-F5344CB8AC3E}">
-        <p14:creationId xmlns:p14="http://schemas.microsoft.com/office/powerpoint/2010/main" val="2421466572"/>
+        <p14:creationId xmlns:p14="http://schemas.microsoft.com/office/powerpoint/2010/main" val="419306505"/>
       </p:ext>
     </p:extLst>
   </p:cSld>
@@ -20883,7 +21585,7 @@
 </p:sld>
 </file>
 
-<file path=ppt/slides/slide6.xml><?xml version="1.0" encoding="utf-8"?>
+<file path=ppt/slides/slide7.xml><?xml version="1.0" encoding="utf-8"?>
 <p:sld xmlns:a="http://schemas.openxmlformats.org/drawingml/2006/main" xmlns:r="http://schemas.openxmlformats.org/officeDocument/2006/relationships" xmlns:p="http://schemas.openxmlformats.org/presentationml/2006/main">
   <p:cSld>
     <p:spTree>
@@ -21053,7 +21755,7 @@
 </p:sld>
 </file>
 
-<file path=ppt/slides/slide7.xml><?xml version="1.0" encoding="utf-8"?>
+<file path=ppt/slides/slide8.xml><?xml version="1.0" encoding="utf-8"?>
 <p:sld xmlns:a="http://schemas.openxmlformats.org/drawingml/2006/main" xmlns:r="http://schemas.openxmlformats.org/officeDocument/2006/relationships" xmlns:p="http://schemas.openxmlformats.org/presentationml/2006/main">
   <p:cSld>
     <p:spTree>
@@ -21196,7 +21898,7 @@
 </p:sld>
 </file>
 
-<file path=ppt/slides/slide8.xml><?xml version="1.0" encoding="utf-8"?>
+<file path=ppt/slides/slide9.xml><?xml version="1.0" encoding="utf-8"?>
 <p:sld xmlns:a="http://schemas.openxmlformats.org/drawingml/2006/main" xmlns:r="http://schemas.openxmlformats.org/officeDocument/2006/relationships" xmlns:p="http://schemas.openxmlformats.org/presentationml/2006/main">
   <p:cSld>
     <p:spTree>
@@ -21320,127 +22022,6 @@
     <p:extLst>
       <p:ext uri="{BB962C8B-B14F-4D97-AF65-F5344CB8AC3E}">
         <p14:creationId xmlns:p14="http://schemas.microsoft.com/office/powerpoint/2010/main" val="1218708985"/>
-      </p:ext>
-    </p:extLst>
-  </p:cSld>
-  <p:clrMapOvr>
-    <a:masterClrMapping/>
-  </p:clrMapOvr>
-  <p:timing>
-    <p:tnLst>
-      <p:par>
-        <p:cTn id="1" dur="indefinite" restart="never" nodeType="tmRoot"/>
-      </p:par>
-    </p:tnLst>
-  </p:timing>
-</p:sld>
-</file>
-
-<file path=ppt/slides/slide9.xml><?xml version="1.0" encoding="utf-8"?>
-<p:sld xmlns:a="http://schemas.openxmlformats.org/drawingml/2006/main" xmlns:r="http://schemas.openxmlformats.org/officeDocument/2006/relationships" xmlns:p="http://schemas.openxmlformats.org/presentationml/2006/main">
-  <p:cSld>
-    <p:spTree>
-      <p:nvGrpSpPr>
-        <p:cNvPr id="1" name=""/>
-        <p:cNvGrpSpPr/>
-        <p:nvPr/>
-      </p:nvGrpSpPr>
-      <p:grpSpPr>
-        <a:xfrm>
-          <a:off x="0" y="0"/>
-          <a:ext cx="0" cy="0"/>
-          <a:chOff x="0" y="0"/>
-          <a:chExt cx="0" cy="0"/>
-        </a:xfrm>
-      </p:grpSpPr>
-      <p:sp>
-        <p:nvSpPr>
-          <p:cNvPr id="2" name="Title 1"/>
-          <p:cNvSpPr>
-            <a:spLocks noGrp="1"/>
-          </p:cNvSpPr>
-          <p:nvPr>
-            <p:ph type="title"/>
-          </p:nvPr>
-        </p:nvSpPr>
-        <p:spPr/>
-        <p:txBody>
-          <a:bodyPr/>
-          <a:lstStyle/>
-          <a:p>
-            <a:pPr algn="ctr"/>
-            <a:r>
-              <a:rPr lang="es-AR" dirty="0" smtClean="0"/>
-              <a:t>Diagnostico</a:t>
-            </a:r>
-            <a:endParaRPr lang="es-AR" dirty="0"/>
-          </a:p>
-        </p:txBody>
-      </p:sp>
-      <p:sp>
-        <p:nvSpPr>
-          <p:cNvPr id="3" name="Content Placeholder 2"/>
-          <p:cNvSpPr>
-            <a:spLocks noGrp="1"/>
-          </p:cNvSpPr>
-          <p:nvPr>
-            <p:ph idx="1"/>
-          </p:nvPr>
-        </p:nvSpPr>
-        <p:spPr/>
-        <p:txBody>
-          <a:bodyPr/>
-          <a:lstStyle/>
-          <a:p>
-            <a:endParaRPr lang="en-US" dirty="0"/>
-          </a:p>
-        </p:txBody>
-      </p:sp>
-      <p:pic>
-        <p:nvPicPr>
-          <p:cNvPr id="4" name="Picture 3" descr="1208185285896971921coredump_Glassy_WiFi_symbol.svg.hi-300x300"/>
-          <p:cNvPicPr>
-            <a:picLocks noChangeAspect="1" noChangeArrowheads="1"/>
-          </p:cNvPicPr>
-          <p:nvPr/>
-        </p:nvPicPr>
-        <p:blipFill>
-          <a:blip r:embed="rId2" cstate="print">
-            <a:extLst>
-              <a:ext uri="{28A0092B-C50C-407E-A947-70E740481C1C}">
-                <a14:useLocalDpi xmlns:a14="http://schemas.microsoft.com/office/drawing/2010/main" val="0"/>
-              </a:ext>
-            </a:extLst>
-          </a:blip>
-          <a:srcRect/>
-          <a:stretch>
-            <a:fillRect/>
-          </a:stretch>
-        </p:blipFill>
-        <p:spPr bwMode="auto">
-          <a:xfrm>
-            <a:off x="6982701" y="5689"/>
-            <a:ext cx="553244" cy="553244"/>
-          </a:xfrm>
-          <a:prstGeom prst="rect">
-            <a:avLst/>
-          </a:prstGeom>
-          <a:noFill/>
-          <a:extLst>
-            <a:ext uri="{909E8E84-426E-40DD-AFC4-6F175D3DCCD1}">
-              <a14:hiddenFill xmlns:a14="http://schemas.microsoft.com/office/drawing/2010/main">
-                <a:solidFill>
-                  <a:srgbClr val="FFFFFF"/>
-                </a:solidFill>
-              </a14:hiddenFill>
-            </a:ext>
-          </a:extLst>
-        </p:spPr>
-      </p:pic>
-    </p:spTree>
-    <p:extLst>
-      <p:ext uri="{BB962C8B-B14F-4D97-AF65-F5344CB8AC3E}">
-        <p14:creationId xmlns:p14="http://schemas.microsoft.com/office/powerpoint/2010/main" val="2262476767"/>
       </p:ext>
     </p:extLst>
   </p:cSld>

</xml_diff>

<commit_message>
mayusculas en algunas oraciones
</commit_message>
<xml_diff>
--- a/Documentacion/Informe Preliminar/Presentacion Informe Preliminar.pptx
+++ b/Documentacion/Informe Preliminar/Presentacion Informe Preliminar.pptx
@@ -2512,30 +2512,30 @@
     </dgm:pt>
   </dgm:ptLst>
   <dgm:cxnLst>
+    <dgm:cxn modelId="{9E07DF77-6C35-4821-9DE7-4AE2BB570D24}" type="presOf" srcId="{8782F143-7EBE-4652-BCB6-342F97295F78}" destId="{C999530D-970C-4F19-A91A-981537024566}" srcOrd="0" destOrd="0" presId="urn:microsoft.com/office/officeart/2005/8/layout/orgChart1"/>
+    <dgm:cxn modelId="{B115F0C3-E1DC-458B-B51B-579BC729549E}" type="presOf" srcId="{38912AFE-3D78-4266-8E99-4582EAA11DAA}" destId="{FC06127A-3788-446A-9EF8-244F2B7D169B}" srcOrd="0" destOrd="0" presId="urn:microsoft.com/office/officeart/2005/8/layout/orgChart1"/>
+    <dgm:cxn modelId="{50F1A73B-D6FF-4C56-A307-90292B87962A}" type="presOf" srcId="{C0EDF659-C35B-4EB3-A65D-2CEFAA43999B}" destId="{D70C0BDD-DBCA-4018-8B04-41A27590CEAD}" srcOrd="0" destOrd="0" presId="urn:microsoft.com/office/officeart/2005/8/layout/orgChart1"/>
+    <dgm:cxn modelId="{A633D16F-A4C8-49D0-9518-C450A40641D7}" type="presOf" srcId="{CAE025A5-AD7E-47EC-9189-B4F6923CFB39}" destId="{2872F071-CCEC-4734-8E72-CEF275144F2A}" srcOrd="0" destOrd="0" presId="urn:microsoft.com/office/officeart/2005/8/layout/orgChart1"/>
+    <dgm:cxn modelId="{12BA031F-FF7F-4D8C-A5B8-6868AFAB5D64}" type="presOf" srcId="{CF7F02CB-0026-4C85-A83C-2611CA0EC12E}" destId="{8EBBDB76-DF10-4764-B8B8-496AD4C5615C}" srcOrd="0" destOrd="0" presId="urn:microsoft.com/office/officeart/2005/8/layout/orgChart1"/>
+    <dgm:cxn modelId="{F9299C4E-4D09-4206-A4D3-1862212D3301}" type="presOf" srcId="{C0EDF659-C35B-4EB3-A65D-2CEFAA43999B}" destId="{F572DEBC-670A-44EF-A3E4-3094B1E9B62C}" srcOrd="1" destOrd="0" presId="urn:microsoft.com/office/officeart/2005/8/layout/orgChart1"/>
+    <dgm:cxn modelId="{DABFC9D0-8C39-473E-A1C2-ECB16C3483D9}" srcId="{AB74DD02-BF3F-45B5-8025-7F7CC2B7F0AF}" destId="{8782F143-7EBE-4652-BCB6-342F97295F78}" srcOrd="0" destOrd="0" parTransId="{6CCD5503-01E5-4C86-8EFC-5F017D508467}" sibTransId="{4E4F6724-DE3A-4CE7-9F89-6CC7FEF6FC19}"/>
+    <dgm:cxn modelId="{74172C81-A83A-4C0F-8A14-7400105BA931}" type="presOf" srcId="{AB74DD02-BF3F-45B5-8025-7F7CC2B7F0AF}" destId="{1495ABB2-EE30-4D6B-960C-2AE8B28A3DEE}" srcOrd="1" destOrd="0" presId="urn:microsoft.com/office/officeart/2005/8/layout/orgChart1"/>
+    <dgm:cxn modelId="{AFBFF8F3-B1CC-4B54-A79E-E1B294E0D0BF}" srcId="{F27F8D6F-03A5-429D-BDD0-702BFC21B6F0}" destId="{C0EDF659-C35B-4EB3-A65D-2CEFAA43999B}" srcOrd="1" destOrd="0" parTransId="{38912AFE-3D78-4266-8E99-4582EAA11DAA}" sibTransId="{05C533E2-BAD5-478F-A5EF-73E5B154A010}"/>
+    <dgm:cxn modelId="{76FF6951-B899-4984-97BF-78ABA4449E40}" type="presOf" srcId="{6CCD5503-01E5-4C86-8EFC-5F017D508467}" destId="{7333BF06-7B1A-47D2-83B9-64258DCEE59E}" srcOrd="0" destOrd="0" presId="urn:microsoft.com/office/officeart/2005/8/layout/orgChart1"/>
+    <dgm:cxn modelId="{956F72A0-5E7A-4BBE-918C-DF48B42F7F88}" srcId="{F27F8D6F-03A5-429D-BDD0-702BFC21B6F0}" destId="{CAE025A5-AD7E-47EC-9189-B4F6923CFB39}" srcOrd="2" destOrd="0" parTransId="{36C0A925-CF92-4A8D-8547-F5135586AA1D}" sibTransId="{3C63452D-48B4-43C0-A4CD-DBFD585BFD18}"/>
     <dgm:cxn modelId="{A77E3C6E-5F2F-414C-9520-0D9237D04246}" type="presOf" srcId="{0C5A7F20-7BF1-4D54-8603-B4C57EB9E51E}" destId="{09519A4A-757A-4FD3-B530-30AAEFBECC94}" srcOrd="0" destOrd="0" presId="urn:microsoft.com/office/officeart/2005/8/layout/orgChart1"/>
+    <dgm:cxn modelId="{7C9266A4-58E6-4781-B381-E3B5BC31D902}" srcId="{69404F52-DC68-4464-8C95-4A4EC5C3D511}" destId="{AB74DD02-BF3F-45B5-8025-7F7CC2B7F0AF}" srcOrd="0" destOrd="0" parTransId="{0C5A7F20-7BF1-4D54-8603-B4C57EB9E51E}" sibTransId="{4DD56927-21C8-4BA9-8A88-EC2F6591D693}"/>
+    <dgm:cxn modelId="{74A7C8EA-52F1-4CBF-961C-62C6C5B9A3FB}" type="presOf" srcId="{F27F8D6F-03A5-429D-BDD0-702BFC21B6F0}" destId="{F21B52D0-B08C-497F-8319-56B5DA6523B6}" srcOrd="0" destOrd="0" presId="urn:microsoft.com/office/officeart/2005/8/layout/orgChart1"/>
+    <dgm:cxn modelId="{53CC8146-27BE-4BD7-B9AE-68FE497BE313}" type="presOf" srcId="{CAE025A5-AD7E-47EC-9189-B4F6923CFB39}" destId="{A98355B4-6B0E-4D38-B738-06A1B5352B25}" srcOrd="1" destOrd="0" presId="urn:microsoft.com/office/officeart/2005/8/layout/orgChart1"/>
     <dgm:cxn modelId="{8922B835-3F81-4578-8943-F5FFBC66CE93}" type="presOf" srcId="{C3818049-3B0A-41F2-A7EE-480ECF181171}" destId="{7DF29361-70E6-4A90-8106-66BD992952A3}" srcOrd="0" destOrd="0" presId="urn:microsoft.com/office/officeart/2005/8/layout/orgChart1"/>
-    <dgm:cxn modelId="{50F1A73B-D6FF-4C56-A307-90292B87962A}" type="presOf" srcId="{C0EDF659-C35B-4EB3-A65D-2CEFAA43999B}" destId="{D70C0BDD-DBCA-4018-8B04-41A27590CEAD}" srcOrd="0" destOrd="0" presId="urn:microsoft.com/office/officeart/2005/8/layout/orgChart1"/>
-    <dgm:cxn modelId="{F40F547F-E985-47E4-852C-13CE91AFC67B}" srcId="{F27F8D6F-03A5-429D-BDD0-702BFC21B6F0}" destId="{69404F52-DC68-4464-8C95-4A4EC5C3D511}" srcOrd="0" destOrd="0" parTransId="{CF7F02CB-0026-4C85-A83C-2611CA0EC12E}" sibTransId="{35B2B94B-D59C-4D2C-AA6B-EC3193330074}"/>
-    <dgm:cxn modelId="{9E07DF77-6C35-4821-9DE7-4AE2BB570D24}" type="presOf" srcId="{8782F143-7EBE-4652-BCB6-342F97295F78}" destId="{C999530D-970C-4F19-A91A-981537024566}" srcOrd="0" destOrd="0" presId="urn:microsoft.com/office/officeart/2005/8/layout/orgChart1"/>
-    <dgm:cxn modelId="{DABFC9D0-8C39-473E-A1C2-ECB16C3483D9}" srcId="{AB74DD02-BF3F-45B5-8025-7F7CC2B7F0AF}" destId="{8782F143-7EBE-4652-BCB6-342F97295F78}" srcOrd="0" destOrd="0" parTransId="{6CCD5503-01E5-4C86-8EFC-5F017D508467}" sibTransId="{4E4F6724-DE3A-4CE7-9F89-6CC7FEF6FC19}"/>
+    <dgm:cxn modelId="{95E2746A-BE37-4489-B043-94B131AC748B}" type="presOf" srcId="{F27F8D6F-03A5-429D-BDD0-702BFC21B6F0}" destId="{96070D5D-19E7-4653-BC65-20D6D6EAE9DE}" srcOrd="1" destOrd="0" presId="urn:microsoft.com/office/officeart/2005/8/layout/orgChart1"/>
     <dgm:cxn modelId="{2FBB91A6-8630-4576-832A-197FF1249D34}" type="presOf" srcId="{69404F52-DC68-4464-8C95-4A4EC5C3D511}" destId="{4972E06E-0D8D-46A7-810C-DCF2E5A67FD3}" srcOrd="1" destOrd="0" presId="urn:microsoft.com/office/officeart/2005/8/layout/orgChart1"/>
-    <dgm:cxn modelId="{956F72A0-5E7A-4BBE-918C-DF48B42F7F88}" srcId="{F27F8D6F-03A5-429D-BDD0-702BFC21B6F0}" destId="{CAE025A5-AD7E-47EC-9189-B4F6923CFB39}" srcOrd="2" destOrd="0" parTransId="{36C0A925-CF92-4A8D-8547-F5135586AA1D}" sibTransId="{3C63452D-48B4-43C0-A4CD-DBFD585BFD18}"/>
-    <dgm:cxn modelId="{A633D16F-A4C8-49D0-9518-C450A40641D7}" type="presOf" srcId="{CAE025A5-AD7E-47EC-9189-B4F6923CFB39}" destId="{2872F071-CCEC-4734-8E72-CEF275144F2A}" srcOrd="0" destOrd="0" presId="urn:microsoft.com/office/officeart/2005/8/layout/orgChart1"/>
-    <dgm:cxn modelId="{53CC8146-27BE-4BD7-B9AE-68FE497BE313}" type="presOf" srcId="{CAE025A5-AD7E-47EC-9189-B4F6923CFB39}" destId="{A98355B4-6B0E-4D38-B738-06A1B5352B25}" srcOrd="1" destOrd="0" presId="urn:microsoft.com/office/officeart/2005/8/layout/orgChart1"/>
-    <dgm:cxn modelId="{494E18AC-0DF3-4E11-984A-C3757D6E03CF}" type="presOf" srcId="{8782F143-7EBE-4652-BCB6-342F97295F78}" destId="{15615975-D7C1-4DD7-92D8-7DA4D4FB6EB9}" srcOrd="1" destOrd="0" presId="urn:microsoft.com/office/officeart/2005/8/layout/orgChart1"/>
     <dgm:cxn modelId="{001EA8ED-4AF4-43DC-B851-53863A910DCE}" type="presOf" srcId="{36C0A925-CF92-4A8D-8547-F5135586AA1D}" destId="{025B54D6-F427-427E-8DF7-D864235487AD}" srcOrd="0" destOrd="0" presId="urn:microsoft.com/office/officeart/2005/8/layout/orgChart1"/>
     <dgm:cxn modelId="{D01CEB95-7818-4453-83F3-BCE47E725498}" srcId="{C3818049-3B0A-41F2-A7EE-480ECF181171}" destId="{F27F8D6F-03A5-429D-BDD0-702BFC21B6F0}" srcOrd="0" destOrd="0" parTransId="{56E089E7-06E2-47BB-AEAB-E6273550B405}" sibTransId="{B7D05675-1749-4578-B10C-6368DD663956}"/>
-    <dgm:cxn modelId="{AFBFF8F3-B1CC-4B54-A79E-E1B294E0D0BF}" srcId="{F27F8D6F-03A5-429D-BDD0-702BFC21B6F0}" destId="{C0EDF659-C35B-4EB3-A65D-2CEFAA43999B}" srcOrd="1" destOrd="0" parTransId="{38912AFE-3D78-4266-8E99-4582EAA11DAA}" sibTransId="{05C533E2-BAD5-478F-A5EF-73E5B154A010}"/>
-    <dgm:cxn modelId="{95E2746A-BE37-4489-B043-94B131AC748B}" type="presOf" srcId="{F27F8D6F-03A5-429D-BDD0-702BFC21B6F0}" destId="{96070D5D-19E7-4653-BC65-20D6D6EAE9DE}" srcOrd="1" destOrd="0" presId="urn:microsoft.com/office/officeart/2005/8/layout/orgChart1"/>
+    <dgm:cxn modelId="{F40F547F-E985-47E4-852C-13CE91AFC67B}" srcId="{F27F8D6F-03A5-429D-BDD0-702BFC21B6F0}" destId="{69404F52-DC68-4464-8C95-4A4EC5C3D511}" srcOrd="0" destOrd="0" parTransId="{CF7F02CB-0026-4C85-A83C-2611CA0EC12E}" sibTransId="{35B2B94B-D59C-4D2C-AA6B-EC3193330074}"/>
+    <dgm:cxn modelId="{A8905A9F-8981-4BCD-A582-4F4C0DD6068C}" type="presOf" srcId="{69404F52-DC68-4464-8C95-4A4EC5C3D511}" destId="{EF27B91A-A527-4B5D-8953-3DEFA4CD70BE}" srcOrd="0" destOrd="0" presId="urn:microsoft.com/office/officeart/2005/8/layout/orgChart1"/>
     <dgm:cxn modelId="{331928DD-BFB5-46BB-A3C0-FCB62A6D8CAA}" type="presOf" srcId="{AB74DD02-BF3F-45B5-8025-7F7CC2B7F0AF}" destId="{76382964-F0B9-4801-AD29-234D5C4EB29C}" srcOrd="0" destOrd="0" presId="urn:microsoft.com/office/officeart/2005/8/layout/orgChart1"/>
-    <dgm:cxn modelId="{76FF6951-B899-4984-97BF-78ABA4449E40}" type="presOf" srcId="{6CCD5503-01E5-4C86-8EFC-5F017D508467}" destId="{7333BF06-7B1A-47D2-83B9-64258DCEE59E}" srcOrd="0" destOrd="0" presId="urn:microsoft.com/office/officeart/2005/8/layout/orgChart1"/>
-    <dgm:cxn modelId="{74A7C8EA-52F1-4CBF-961C-62C6C5B9A3FB}" type="presOf" srcId="{F27F8D6F-03A5-429D-BDD0-702BFC21B6F0}" destId="{F21B52D0-B08C-497F-8319-56B5DA6523B6}" srcOrd="0" destOrd="0" presId="urn:microsoft.com/office/officeart/2005/8/layout/orgChart1"/>
-    <dgm:cxn modelId="{F9299C4E-4D09-4206-A4D3-1862212D3301}" type="presOf" srcId="{C0EDF659-C35B-4EB3-A65D-2CEFAA43999B}" destId="{F572DEBC-670A-44EF-A3E4-3094B1E9B62C}" srcOrd="1" destOrd="0" presId="urn:microsoft.com/office/officeart/2005/8/layout/orgChart1"/>
-    <dgm:cxn modelId="{74172C81-A83A-4C0F-8A14-7400105BA931}" type="presOf" srcId="{AB74DD02-BF3F-45B5-8025-7F7CC2B7F0AF}" destId="{1495ABB2-EE30-4D6B-960C-2AE8B28A3DEE}" srcOrd="1" destOrd="0" presId="urn:microsoft.com/office/officeart/2005/8/layout/orgChart1"/>
-    <dgm:cxn modelId="{B115F0C3-E1DC-458B-B51B-579BC729549E}" type="presOf" srcId="{38912AFE-3D78-4266-8E99-4582EAA11DAA}" destId="{FC06127A-3788-446A-9EF8-244F2B7D169B}" srcOrd="0" destOrd="0" presId="urn:microsoft.com/office/officeart/2005/8/layout/orgChart1"/>
-    <dgm:cxn modelId="{7C9266A4-58E6-4781-B381-E3B5BC31D902}" srcId="{69404F52-DC68-4464-8C95-4A4EC5C3D511}" destId="{AB74DD02-BF3F-45B5-8025-7F7CC2B7F0AF}" srcOrd="0" destOrd="0" parTransId="{0C5A7F20-7BF1-4D54-8603-B4C57EB9E51E}" sibTransId="{4DD56927-21C8-4BA9-8A88-EC2F6591D693}"/>
-    <dgm:cxn modelId="{12BA031F-FF7F-4D8C-A5B8-6868AFAB5D64}" type="presOf" srcId="{CF7F02CB-0026-4C85-A83C-2611CA0EC12E}" destId="{8EBBDB76-DF10-4764-B8B8-496AD4C5615C}" srcOrd="0" destOrd="0" presId="urn:microsoft.com/office/officeart/2005/8/layout/orgChart1"/>
-    <dgm:cxn modelId="{A8905A9F-8981-4BCD-A582-4F4C0DD6068C}" type="presOf" srcId="{69404F52-DC68-4464-8C95-4A4EC5C3D511}" destId="{EF27B91A-A527-4B5D-8953-3DEFA4CD70BE}" srcOrd="0" destOrd="0" presId="urn:microsoft.com/office/officeart/2005/8/layout/orgChart1"/>
+    <dgm:cxn modelId="{494E18AC-0DF3-4E11-984A-C3757D6E03CF}" type="presOf" srcId="{8782F143-7EBE-4652-BCB6-342F97295F78}" destId="{15615975-D7C1-4DD7-92D8-7DA4D4FB6EB9}" srcOrd="1" destOrd="0" presId="urn:microsoft.com/office/officeart/2005/8/layout/orgChart1"/>
     <dgm:cxn modelId="{C58BDBD0-5A03-4216-8E13-AD60799CD80E}" type="presParOf" srcId="{7DF29361-70E6-4A90-8106-66BD992952A3}" destId="{092F7640-4E97-435E-A273-04AB9B209B41}" srcOrd="0" destOrd="0" presId="urn:microsoft.com/office/officeart/2005/8/layout/orgChart1"/>
     <dgm:cxn modelId="{C86AC3D0-236B-4146-ADD7-108FD5805AFC}" type="presParOf" srcId="{092F7640-4E97-435E-A273-04AB9B209B41}" destId="{1F67BD07-D585-4BD6-88EA-D8E5F5FF308F}" srcOrd="0" destOrd="0" presId="urn:microsoft.com/office/officeart/2005/8/layout/orgChart1"/>
     <dgm:cxn modelId="{56CEF3C8-E3EB-412A-B81D-88A08857D347}" type="presParOf" srcId="{1F67BD07-D585-4BD6-88EA-D8E5F5FF308F}" destId="{F21B52D0-B08C-497F-8319-56B5DA6523B6}" srcOrd="0" destOrd="0" presId="urn:microsoft.com/office/officeart/2005/8/layout/orgChart1"/>
@@ -2594,7 +2594,7 @@
   </dgm:whole>
   <dgm:extLst>
     <a:ext uri="http://schemas.microsoft.com/office/drawing/2008/diagram">
-      <dsp:dataModelExt xmlns:dsp="http://schemas.microsoft.com/office/drawing/2008/diagram" xmlns="" relId="rId6" minVer="http://schemas.openxmlformats.org/drawingml/2006/diagram"/>
+      <dsp:dataModelExt xmlns:dsp="http://schemas.microsoft.com/office/drawing/2008/diagram" relId="rId6" minVer="http://schemas.openxmlformats.org/drawingml/2006/diagram"/>
     </a:ext>
   </dgm:extLst>
 </dgm:dataModel>
@@ -3202,37 +3202,37 @@
     </dgm:pt>
   </dgm:ptLst>
   <dgm:cxnLst>
+    <dgm:cxn modelId="{7D7F0BCF-ABA1-4DBF-B3C5-15A7E0D923F4}" type="presOf" srcId="{290EE53D-C453-435B-9D9E-35269E34EC5B}" destId="{0111F070-09B0-44AB-B420-56677F7966B9}" srcOrd="0" destOrd="0" presId="urn:microsoft.com/office/officeart/2005/8/layout/process5"/>
+    <dgm:cxn modelId="{88A368DC-5564-421A-BCB5-0AB6A2938590}" srcId="{C5363DF5-6055-4341-AD2B-9AA1A5B2F2B6}" destId="{42C6E17D-9679-4665-A315-91DE7DAD26B5}" srcOrd="5" destOrd="0" parTransId="{63E5E51D-9A58-46C8-9961-B064B21B680D}" sibTransId="{151151C1-35B6-4928-93D9-A9E226FC3783}"/>
+    <dgm:cxn modelId="{E59F82B5-DB2C-41E5-BB6E-D12FBAC3F51F}" type="presOf" srcId="{5AD11288-4E84-44AA-B404-EB28CA0256B4}" destId="{285D4231-58A7-4A8D-B065-3B5550752B5D}" srcOrd="0" destOrd="0" presId="urn:microsoft.com/office/officeart/2005/8/layout/process5"/>
+    <dgm:cxn modelId="{05937470-3CB7-49A5-89CE-21B727B572F8}" type="presOf" srcId="{290EE53D-C453-435B-9D9E-35269E34EC5B}" destId="{BF7D1F94-0055-474F-9755-6BA87ECBBB1A}" srcOrd="1" destOrd="0" presId="urn:microsoft.com/office/officeart/2005/8/layout/process5"/>
+    <dgm:cxn modelId="{860BFC70-5F8C-441B-9691-200F29BD8ED8}" type="presOf" srcId="{7D3F80E0-CDF6-49F5-BA06-F236A20E0C28}" destId="{7E657264-A28E-4EF5-897C-D8923C3F1A88}" srcOrd="1" destOrd="0" presId="urn:microsoft.com/office/officeart/2005/8/layout/process5"/>
+    <dgm:cxn modelId="{A502A20D-F1EB-431E-AD40-CA36DEF08E0E}" type="presOf" srcId="{C5363DF5-6055-4341-AD2B-9AA1A5B2F2B6}" destId="{5057AD14-38F6-458F-BAE1-3D333085630D}" srcOrd="0" destOrd="0" presId="urn:microsoft.com/office/officeart/2005/8/layout/process5"/>
+    <dgm:cxn modelId="{ED919DF5-B530-4B9D-B669-63482591B9D0}" srcId="{C5363DF5-6055-4341-AD2B-9AA1A5B2F2B6}" destId="{FD28C269-B148-4BDF-8AA4-4265F453A4E5}" srcOrd="2" destOrd="0" parTransId="{A521F114-8F47-4106-AB42-7DFF4864FF6D}" sibTransId="{290EE53D-C453-435B-9D9E-35269E34EC5B}"/>
+    <dgm:cxn modelId="{E4FF3CD0-E13E-4C8D-9C42-223CB655ED80}" srcId="{C5363DF5-6055-4341-AD2B-9AA1A5B2F2B6}" destId="{5AD11288-4E84-44AA-B404-EB28CA0256B4}" srcOrd="1" destOrd="0" parTransId="{1C010112-D662-45AF-A61C-C16AB2207D26}" sibTransId="{DC494F16-C076-4743-9478-0048494E6317}"/>
+    <dgm:cxn modelId="{2A3CA525-208B-4A1A-B7ED-D5A49E347EF6}" type="presOf" srcId="{DC494F16-C076-4743-9478-0048494E6317}" destId="{D4CA0173-9572-4B1A-8AFB-17DFCEBDF9FA}" srcOrd="1" destOrd="0" presId="urn:microsoft.com/office/officeart/2005/8/layout/process5"/>
+    <dgm:cxn modelId="{28064953-9125-49C8-B804-E1E4F79D28A7}" type="presOf" srcId="{E9E5433C-AB76-4158-AD3E-4E6FF0739C9A}" destId="{A503A6AB-5932-4271-9DC4-2F91AC48216E}" srcOrd="1" destOrd="0" presId="urn:microsoft.com/office/officeart/2005/8/layout/process5"/>
+    <dgm:cxn modelId="{C60D99F0-0E80-4B18-B2D3-8E105EFFAA44}" type="presOf" srcId="{151151C1-35B6-4928-93D9-A9E226FC3783}" destId="{C4945E92-62A5-4028-985B-044CB1801FC6}" srcOrd="0" destOrd="0" presId="urn:microsoft.com/office/officeart/2005/8/layout/process5"/>
+    <dgm:cxn modelId="{EBCDC872-9CB2-4AD8-8AC3-B565509254F8}" type="presOf" srcId="{DC494F16-C076-4743-9478-0048494E6317}" destId="{58B57261-0747-48FE-A1A6-719C2514B016}" srcOrd="0" destOrd="0" presId="urn:microsoft.com/office/officeart/2005/8/layout/process5"/>
+    <dgm:cxn modelId="{55CEACDA-C87D-4B6A-8F5B-07FFF927FF72}" srcId="{C5363DF5-6055-4341-AD2B-9AA1A5B2F2B6}" destId="{E79D1DFF-E910-4421-825E-128D8A492C5B}" srcOrd="0" destOrd="0" parTransId="{0D3A1E75-1205-4EE5-BDDE-1B56F0B76A54}" sibTransId="{E9E5433C-AB76-4158-AD3E-4E6FF0739C9A}"/>
+    <dgm:cxn modelId="{CF93599B-A2E3-4CE5-89C9-ABB88A38816F}" type="presOf" srcId="{E79D1DFF-E910-4421-825E-128D8A492C5B}" destId="{88D90226-35C4-409B-95DB-A53D0DBCA776}" srcOrd="0" destOrd="0" presId="urn:microsoft.com/office/officeart/2005/8/layout/process5"/>
+    <dgm:cxn modelId="{8D89F04E-21C6-4A52-AFF6-F12F5A84113D}" type="presOf" srcId="{FC563921-9404-4619-A143-ED8300475E42}" destId="{2641E811-5A6F-428C-B1C8-8F281D6685B6}" srcOrd="0" destOrd="0" presId="urn:microsoft.com/office/officeart/2005/8/layout/process5"/>
+    <dgm:cxn modelId="{66BB6AD7-505B-4C7D-AACD-F7033737FDDA}" type="presOf" srcId="{08643A8E-A99F-4328-86CB-72387C37FCCD}" destId="{950A0EE2-E9AF-413D-B3AB-B2BE9BF30743}" srcOrd="0" destOrd="0" presId="urn:microsoft.com/office/officeart/2005/8/layout/process5"/>
+    <dgm:cxn modelId="{E64572BC-E3D8-4EE9-A36C-9FEE388C46C8}" srcId="{C5363DF5-6055-4341-AD2B-9AA1A5B2F2B6}" destId="{08643A8E-A99F-4328-86CB-72387C37FCCD}" srcOrd="7" destOrd="0" parTransId="{22AE4520-5BB0-4AD7-81CB-AAAAE42F67EB}" sibTransId="{E0D53043-E2DC-4A8A-8F1B-39B3ED9DB1F4}"/>
+    <dgm:cxn modelId="{54463964-CFD9-457B-B656-90D905AAD59A}" type="presOf" srcId="{151151C1-35B6-4928-93D9-A9E226FC3783}" destId="{C373AA40-5458-4D11-9658-166058BF29C1}" srcOrd="1" destOrd="0" presId="urn:microsoft.com/office/officeart/2005/8/layout/process5"/>
+    <dgm:cxn modelId="{3B391A99-36E1-4702-B58D-6F2001C5C2F3}" type="presOf" srcId="{42C6E17D-9679-4665-A315-91DE7DAD26B5}" destId="{E18B533A-C6D3-4CCA-A75B-075F2FE99905}" srcOrd="0" destOrd="0" presId="urn:microsoft.com/office/officeart/2005/8/layout/process5"/>
+    <dgm:cxn modelId="{9E74D380-3B35-4267-936B-D81FEB2C6B66}" srcId="{C5363DF5-6055-4341-AD2B-9AA1A5B2F2B6}" destId="{350A8695-B415-4BA8-ABA1-3CE0F3D29D85}" srcOrd="4" destOrd="0" parTransId="{AD6B1243-BC53-411C-B0B0-45FBE92DE253}" sibTransId="{FC563921-9404-4619-A143-ED8300475E42}"/>
+    <dgm:cxn modelId="{2AAD030A-A5C9-4868-889B-7CA6545C0AEF}" type="presOf" srcId="{BC4C3A05-55FB-4488-9F3E-C2C37915CBBF}" destId="{69574F30-2D61-4E9B-9957-68812FAD3007}" srcOrd="0" destOrd="0" presId="urn:microsoft.com/office/officeart/2005/8/layout/process5"/>
+    <dgm:cxn modelId="{6F53D212-720E-4CD5-A491-25276D53F53B}" type="presOf" srcId="{6B43E6E7-D469-4928-92E6-C29E8570A94F}" destId="{AFD192A2-D8A4-47D8-8F28-39CABE712FB2}" srcOrd="1" destOrd="0" presId="urn:microsoft.com/office/officeart/2005/8/layout/process5"/>
+    <dgm:cxn modelId="{F9008E11-01C9-4D85-AB85-B00A481F666F}" type="presOf" srcId="{7D3F80E0-CDF6-49F5-BA06-F236A20E0C28}" destId="{EEB151B0-951F-4102-A9AB-025AADD2ACCB}" srcOrd="0" destOrd="0" presId="urn:microsoft.com/office/officeart/2005/8/layout/process5"/>
+    <dgm:cxn modelId="{2746D4AF-FD7E-47DD-A1BD-3A6025B02755}" srcId="{C5363DF5-6055-4341-AD2B-9AA1A5B2F2B6}" destId="{2F902911-805E-4BB2-A59F-8B478EFD9F21}" srcOrd="6" destOrd="0" parTransId="{CF8EB303-0390-429E-899E-7CA14E20420B}" sibTransId="{7D3F80E0-CDF6-49F5-BA06-F236A20E0C28}"/>
+    <dgm:cxn modelId="{3D9E3008-6276-4D30-9707-617B42A8B17B}" type="presOf" srcId="{FC563921-9404-4619-A143-ED8300475E42}" destId="{950832D6-0485-482B-BCCD-CB57C5D37C96}" srcOrd="1" destOrd="0" presId="urn:microsoft.com/office/officeart/2005/8/layout/process5"/>
+    <dgm:cxn modelId="{9E529A8B-1CF4-4D31-B8EE-9BC10CD21B6B}" type="presOf" srcId="{6B43E6E7-D469-4928-92E6-C29E8570A94F}" destId="{DC791235-75B4-4861-821D-75CBE75BCAF7}" srcOrd="0" destOrd="0" presId="urn:microsoft.com/office/officeart/2005/8/layout/process5"/>
+    <dgm:cxn modelId="{84B1D75C-15D9-424D-B9B9-44660DD4CF54}" type="presOf" srcId="{350A8695-B415-4BA8-ABA1-3CE0F3D29D85}" destId="{1D053020-6255-4EC1-B48E-D263909F37E0}" srcOrd="0" destOrd="0" presId="urn:microsoft.com/office/officeart/2005/8/layout/process5"/>
+    <dgm:cxn modelId="{5754C11A-289D-4ED2-9331-1EC80F2164FB}" type="presOf" srcId="{2F902911-805E-4BB2-A59F-8B478EFD9F21}" destId="{269AD2C7-2C78-48F1-9B02-4BA8B897BB5C}" srcOrd="0" destOrd="0" presId="urn:microsoft.com/office/officeart/2005/8/layout/process5"/>
+    <dgm:cxn modelId="{28429E7C-EF63-4BFD-8E07-1C3518A04993}" type="presOf" srcId="{E9E5433C-AB76-4158-AD3E-4E6FF0739C9A}" destId="{E55E39E1-8F7F-45DE-9CA6-BD910E1D29B1}" srcOrd="0" destOrd="0" presId="urn:microsoft.com/office/officeart/2005/8/layout/process5"/>
     <dgm:cxn modelId="{7D6C0E35-4489-4170-BC51-04C4AB4E892A}" type="presOf" srcId="{FD28C269-B148-4BDF-8AA4-4265F453A4E5}" destId="{96EA98A3-ED5C-4801-BB75-774A6066E9D1}" srcOrd="0" destOrd="0" presId="urn:microsoft.com/office/officeart/2005/8/layout/process5"/>
-    <dgm:cxn modelId="{ED919DF5-B530-4B9D-B669-63482591B9D0}" srcId="{C5363DF5-6055-4341-AD2B-9AA1A5B2F2B6}" destId="{FD28C269-B148-4BDF-8AA4-4265F453A4E5}" srcOrd="2" destOrd="0" parTransId="{A521F114-8F47-4106-AB42-7DFF4864FF6D}" sibTransId="{290EE53D-C453-435B-9D9E-35269E34EC5B}"/>
-    <dgm:cxn modelId="{55CEACDA-C87D-4B6A-8F5B-07FFF927FF72}" srcId="{C5363DF5-6055-4341-AD2B-9AA1A5B2F2B6}" destId="{E79D1DFF-E910-4421-825E-128D8A492C5B}" srcOrd="0" destOrd="0" parTransId="{0D3A1E75-1205-4EE5-BDDE-1B56F0B76A54}" sibTransId="{E9E5433C-AB76-4158-AD3E-4E6FF0739C9A}"/>
-    <dgm:cxn modelId="{6F53D212-720E-4CD5-A491-25276D53F53B}" type="presOf" srcId="{6B43E6E7-D469-4928-92E6-C29E8570A94F}" destId="{AFD192A2-D8A4-47D8-8F28-39CABE712FB2}" srcOrd="1" destOrd="0" presId="urn:microsoft.com/office/officeart/2005/8/layout/process5"/>
-    <dgm:cxn modelId="{E64572BC-E3D8-4EE9-A36C-9FEE388C46C8}" srcId="{C5363DF5-6055-4341-AD2B-9AA1A5B2F2B6}" destId="{08643A8E-A99F-4328-86CB-72387C37FCCD}" srcOrd="7" destOrd="0" parTransId="{22AE4520-5BB0-4AD7-81CB-AAAAE42F67EB}" sibTransId="{E0D53043-E2DC-4A8A-8F1B-39B3ED9DB1F4}"/>
-    <dgm:cxn modelId="{F9008E11-01C9-4D85-AB85-B00A481F666F}" type="presOf" srcId="{7D3F80E0-CDF6-49F5-BA06-F236A20E0C28}" destId="{EEB151B0-951F-4102-A9AB-025AADD2ACCB}" srcOrd="0" destOrd="0" presId="urn:microsoft.com/office/officeart/2005/8/layout/process5"/>
-    <dgm:cxn modelId="{8D89F04E-21C6-4A52-AFF6-F12F5A84113D}" type="presOf" srcId="{FC563921-9404-4619-A143-ED8300475E42}" destId="{2641E811-5A6F-428C-B1C8-8F281D6685B6}" srcOrd="0" destOrd="0" presId="urn:microsoft.com/office/officeart/2005/8/layout/process5"/>
-    <dgm:cxn modelId="{CF93599B-A2E3-4CE5-89C9-ABB88A38816F}" type="presOf" srcId="{E79D1DFF-E910-4421-825E-128D8A492C5B}" destId="{88D90226-35C4-409B-95DB-A53D0DBCA776}" srcOrd="0" destOrd="0" presId="urn:microsoft.com/office/officeart/2005/8/layout/process5"/>
-    <dgm:cxn modelId="{9E529A8B-1CF4-4D31-B8EE-9BC10CD21B6B}" type="presOf" srcId="{6B43E6E7-D469-4928-92E6-C29E8570A94F}" destId="{DC791235-75B4-4861-821D-75CBE75BCAF7}" srcOrd="0" destOrd="0" presId="urn:microsoft.com/office/officeart/2005/8/layout/process5"/>
-    <dgm:cxn modelId="{2A3CA525-208B-4A1A-B7ED-D5A49E347EF6}" type="presOf" srcId="{DC494F16-C076-4743-9478-0048494E6317}" destId="{D4CA0173-9572-4B1A-8AFB-17DFCEBDF9FA}" srcOrd="1" destOrd="0" presId="urn:microsoft.com/office/officeart/2005/8/layout/process5"/>
     <dgm:cxn modelId="{77EC8013-A972-4A3A-A5E4-D83A577E19D3}" srcId="{C5363DF5-6055-4341-AD2B-9AA1A5B2F2B6}" destId="{BC4C3A05-55FB-4488-9F3E-C2C37915CBBF}" srcOrd="3" destOrd="0" parTransId="{399F6AEA-505D-46BE-B019-ED11F891940F}" sibTransId="{6B43E6E7-D469-4928-92E6-C29E8570A94F}"/>
-    <dgm:cxn modelId="{860BFC70-5F8C-441B-9691-200F29BD8ED8}" type="presOf" srcId="{7D3F80E0-CDF6-49F5-BA06-F236A20E0C28}" destId="{7E657264-A28E-4EF5-897C-D8923C3F1A88}" srcOrd="1" destOrd="0" presId="urn:microsoft.com/office/officeart/2005/8/layout/process5"/>
-    <dgm:cxn modelId="{7D7F0BCF-ABA1-4DBF-B3C5-15A7E0D923F4}" type="presOf" srcId="{290EE53D-C453-435B-9D9E-35269E34EC5B}" destId="{0111F070-09B0-44AB-B420-56677F7966B9}" srcOrd="0" destOrd="0" presId="urn:microsoft.com/office/officeart/2005/8/layout/process5"/>
-    <dgm:cxn modelId="{54463964-CFD9-457B-B656-90D905AAD59A}" type="presOf" srcId="{151151C1-35B6-4928-93D9-A9E226FC3783}" destId="{C373AA40-5458-4D11-9658-166058BF29C1}" srcOrd="1" destOrd="0" presId="urn:microsoft.com/office/officeart/2005/8/layout/process5"/>
-    <dgm:cxn modelId="{C60D99F0-0E80-4B18-B2D3-8E105EFFAA44}" type="presOf" srcId="{151151C1-35B6-4928-93D9-A9E226FC3783}" destId="{C4945E92-62A5-4028-985B-044CB1801FC6}" srcOrd="0" destOrd="0" presId="urn:microsoft.com/office/officeart/2005/8/layout/process5"/>
-    <dgm:cxn modelId="{2746D4AF-FD7E-47DD-A1BD-3A6025B02755}" srcId="{C5363DF5-6055-4341-AD2B-9AA1A5B2F2B6}" destId="{2F902911-805E-4BB2-A59F-8B478EFD9F21}" srcOrd="6" destOrd="0" parTransId="{CF8EB303-0390-429E-899E-7CA14E20420B}" sibTransId="{7D3F80E0-CDF6-49F5-BA06-F236A20E0C28}"/>
-    <dgm:cxn modelId="{28064953-9125-49C8-B804-E1E4F79D28A7}" type="presOf" srcId="{E9E5433C-AB76-4158-AD3E-4E6FF0739C9A}" destId="{A503A6AB-5932-4271-9DC4-2F91AC48216E}" srcOrd="1" destOrd="0" presId="urn:microsoft.com/office/officeart/2005/8/layout/process5"/>
-    <dgm:cxn modelId="{A502A20D-F1EB-431E-AD40-CA36DEF08E0E}" type="presOf" srcId="{C5363DF5-6055-4341-AD2B-9AA1A5B2F2B6}" destId="{5057AD14-38F6-458F-BAE1-3D333085630D}" srcOrd="0" destOrd="0" presId="urn:microsoft.com/office/officeart/2005/8/layout/process5"/>
-    <dgm:cxn modelId="{88A368DC-5564-421A-BCB5-0AB6A2938590}" srcId="{C5363DF5-6055-4341-AD2B-9AA1A5B2F2B6}" destId="{42C6E17D-9679-4665-A315-91DE7DAD26B5}" srcOrd="5" destOrd="0" parTransId="{63E5E51D-9A58-46C8-9961-B064B21B680D}" sibTransId="{151151C1-35B6-4928-93D9-A9E226FC3783}"/>
-    <dgm:cxn modelId="{84B1D75C-15D9-424D-B9B9-44660DD4CF54}" type="presOf" srcId="{350A8695-B415-4BA8-ABA1-3CE0F3D29D85}" destId="{1D053020-6255-4EC1-B48E-D263909F37E0}" srcOrd="0" destOrd="0" presId="urn:microsoft.com/office/officeart/2005/8/layout/process5"/>
-    <dgm:cxn modelId="{3D9E3008-6276-4D30-9707-617B42A8B17B}" type="presOf" srcId="{FC563921-9404-4619-A143-ED8300475E42}" destId="{950832D6-0485-482B-BCCD-CB57C5D37C96}" srcOrd="1" destOrd="0" presId="urn:microsoft.com/office/officeart/2005/8/layout/process5"/>
-    <dgm:cxn modelId="{05937470-3CB7-49A5-89CE-21B727B572F8}" type="presOf" srcId="{290EE53D-C453-435B-9D9E-35269E34EC5B}" destId="{BF7D1F94-0055-474F-9755-6BA87ECBBB1A}" srcOrd="1" destOrd="0" presId="urn:microsoft.com/office/officeart/2005/8/layout/process5"/>
-    <dgm:cxn modelId="{3B391A99-36E1-4702-B58D-6F2001C5C2F3}" type="presOf" srcId="{42C6E17D-9679-4665-A315-91DE7DAD26B5}" destId="{E18B533A-C6D3-4CCA-A75B-075F2FE99905}" srcOrd="0" destOrd="0" presId="urn:microsoft.com/office/officeart/2005/8/layout/process5"/>
-    <dgm:cxn modelId="{28429E7C-EF63-4BFD-8E07-1C3518A04993}" type="presOf" srcId="{E9E5433C-AB76-4158-AD3E-4E6FF0739C9A}" destId="{E55E39E1-8F7F-45DE-9CA6-BD910E1D29B1}" srcOrd="0" destOrd="0" presId="urn:microsoft.com/office/officeart/2005/8/layout/process5"/>
-    <dgm:cxn modelId="{9E74D380-3B35-4267-936B-D81FEB2C6B66}" srcId="{C5363DF5-6055-4341-AD2B-9AA1A5B2F2B6}" destId="{350A8695-B415-4BA8-ABA1-3CE0F3D29D85}" srcOrd="4" destOrd="0" parTransId="{AD6B1243-BC53-411C-B0B0-45FBE92DE253}" sibTransId="{FC563921-9404-4619-A143-ED8300475E42}"/>
-    <dgm:cxn modelId="{66BB6AD7-505B-4C7D-AACD-F7033737FDDA}" type="presOf" srcId="{08643A8E-A99F-4328-86CB-72387C37FCCD}" destId="{950A0EE2-E9AF-413D-B3AB-B2BE9BF30743}" srcOrd="0" destOrd="0" presId="urn:microsoft.com/office/officeart/2005/8/layout/process5"/>
-    <dgm:cxn modelId="{E4FF3CD0-E13E-4C8D-9C42-223CB655ED80}" srcId="{C5363DF5-6055-4341-AD2B-9AA1A5B2F2B6}" destId="{5AD11288-4E84-44AA-B404-EB28CA0256B4}" srcOrd="1" destOrd="0" parTransId="{1C010112-D662-45AF-A61C-C16AB2207D26}" sibTransId="{DC494F16-C076-4743-9478-0048494E6317}"/>
-    <dgm:cxn modelId="{E59F82B5-DB2C-41E5-BB6E-D12FBAC3F51F}" type="presOf" srcId="{5AD11288-4E84-44AA-B404-EB28CA0256B4}" destId="{285D4231-58A7-4A8D-B065-3B5550752B5D}" srcOrd="0" destOrd="0" presId="urn:microsoft.com/office/officeart/2005/8/layout/process5"/>
-    <dgm:cxn modelId="{EBCDC872-9CB2-4AD8-8AC3-B565509254F8}" type="presOf" srcId="{DC494F16-C076-4743-9478-0048494E6317}" destId="{58B57261-0747-48FE-A1A6-719C2514B016}" srcOrd="0" destOrd="0" presId="urn:microsoft.com/office/officeart/2005/8/layout/process5"/>
-    <dgm:cxn modelId="{5754C11A-289D-4ED2-9331-1EC80F2164FB}" type="presOf" srcId="{2F902911-805E-4BB2-A59F-8B478EFD9F21}" destId="{269AD2C7-2C78-48F1-9B02-4BA8B897BB5C}" srcOrd="0" destOrd="0" presId="urn:microsoft.com/office/officeart/2005/8/layout/process5"/>
-    <dgm:cxn modelId="{2AAD030A-A5C9-4868-889B-7CA6545C0AEF}" type="presOf" srcId="{BC4C3A05-55FB-4488-9F3E-C2C37915CBBF}" destId="{69574F30-2D61-4E9B-9957-68812FAD3007}" srcOrd="0" destOrd="0" presId="urn:microsoft.com/office/officeart/2005/8/layout/process5"/>
     <dgm:cxn modelId="{87364431-F6E5-41A3-8F1F-9C1AF65D9337}" type="presParOf" srcId="{5057AD14-38F6-458F-BAE1-3D333085630D}" destId="{88D90226-35C4-409B-95DB-A53D0DBCA776}" srcOrd="0" destOrd="0" presId="urn:microsoft.com/office/officeart/2005/8/layout/process5"/>
     <dgm:cxn modelId="{6B9A194B-6820-4674-9176-7B1EB2BE619F}" type="presParOf" srcId="{5057AD14-38F6-458F-BAE1-3D333085630D}" destId="{E55E39E1-8F7F-45DE-9CA6-BD910E1D29B1}" srcOrd="1" destOrd="0" presId="urn:microsoft.com/office/officeart/2005/8/layout/process5"/>
     <dgm:cxn modelId="{24FB8438-D275-4182-8923-E44CFBB6DA53}" type="presParOf" srcId="{E55E39E1-8F7F-45DE-9CA6-BD910E1D29B1}" destId="{A503A6AB-5932-4271-9DC4-2F91AC48216E}" srcOrd="0" destOrd="0" presId="urn:microsoft.com/office/officeart/2005/8/layout/process5"/>
@@ -3260,32 +3260,2486 @@
   <dgm:whole/>
   <dgm:extLst>
     <a:ext uri="http://schemas.microsoft.com/office/drawing/2008/diagram">
-      <dsp:dataModelExt xmlns:dsp="http://schemas.microsoft.com/office/drawing/2008/diagram" xmlns="" relId="rId8" minVer="http://schemas.openxmlformats.org/drawingml/2006/diagram"/>
+      <dsp:dataModelExt xmlns:dsp="http://schemas.microsoft.com/office/drawing/2008/diagram" relId="rId8" minVer="http://schemas.openxmlformats.org/drawingml/2006/diagram"/>
     </a:ext>
   </dgm:extLst>
 </dgm:dataModel>
 </file>
 
 <file path=ppt/diagrams/drawing1.xml><?xml version="1.0" encoding="utf-8"?>
-<dsp:drawing xmlns:dgm="http://schemas.openxmlformats.org/drawingml/2006/diagram" xmlns:a="http://schemas.openxmlformats.org/drawingml/2006/main" xmlns:dsp="http://schemas.microsoft.com/office/drawing/2008/diagram">
+<dsp:drawing xmlns:dgm="http://schemas.openxmlformats.org/drawingml/2006/diagram" xmlns:dsp="http://schemas.microsoft.com/office/drawing/2008/diagram" xmlns:a="http://schemas.openxmlformats.org/drawingml/2006/main">
   <dsp:spTree>
     <dsp:nvGrpSpPr>
       <dsp:cNvPr id="0" name=""/>
       <dsp:cNvGrpSpPr/>
     </dsp:nvGrpSpPr>
     <dsp:grpSpPr/>
+    <dsp:sp modelId="{025B54D6-F427-427E-8DF7-D864235487AD}">
+      <dsp:nvSpPr>
+        <dsp:cNvPr id="0" name=""/>
+        <dsp:cNvSpPr/>
+      </dsp:nvSpPr>
+      <dsp:spPr>
+        <a:xfrm>
+          <a:off x="3155394" y="861325"/>
+          <a:ext cx="1873358" cy="325128"/>
+        </a:xfrm>
+        <a:custGeom>
+          <a:avLst/>
+          <a:gdLst/>
+          <a:ahLst/>
+          <a:cxnLst/>
+          <a:rect l="0" t="0" r="0" b="0"/>
+          <a:pathLst>
+            <a:path>
+              <a:moveTo>
+                <a:pt x="0" y="0"/>
+              </a:moveTo>
+              <a:lnTo>
+                <a:pt x="0" y="162564"/>
+              </a:lnTo>
+              <a:lnTo>
+                <a:pt x="1873358" y="162564"/>
+              </a:lnTo>
+              <a:lnTo>
+                <a:pt x="1873358" y="325128"/>
+              </a:lnTo>
+            </a:path>
+          </a:pathLst>
+        </a:custGeom>
+        <a:noFill/>
+        <a:ln w="9525" cap="flat" cmpd="sng" algn="ctr">
+          <a:solidFill>
+            <a:schemeClr val="accent1">
+              <a:shade val="60000"/>
+              <a:hueOff val="0"/>
+              <a:satOff val="0"/>
+              <a:lumOff val="0"/>
+              <a:alphaOff val="0"/>
+            </a:schemeClr>
+          </a:solidFill>
+          <a:prstDash val="solid"/>
+        </a:ln>
+        <a:effectLst/>
+      </dsp:spPr>
+      <dsp:style>
+        <a:lnRef idx="1">
+          <a:scrgbClr r="0" g="0" b="0"/>
+        </a:lnRef>
+        <a:fillRef idx="0">
+          <a:scrgbClr r="0" g="0" b="0"/>
+        </a:fillRef>
+        <a:effectRef idx="0">
+          <a:scrgbClr r="0" g="0" b="0"/>
+        </a:effectRef>
+        <a:fontRef idx="minor"/>
+      </dsp:style>
+    </dsp:sp>
+    <dsp:sp modelId="{FC06127A-3788-446A-9EF8-244F2B7D169B}">
+      <dsp:nvSpPr>
+        <dsp:cNvPr id="0" name=""/>
+        <dsp:cNvSpPr/>
+      </dsp:nvSpPr>
+      <dsp:spPr>
+        <a:xfrm>
+          <a:off x="3109674" y="861325"/>
+          <a:ext cx="91440" cy="325128"/>
+        </a:xfrm>
+        <a:custGeom>
+          <a:avLst/>
+          <a:gdLst/>
+          <a:ahLst/>
+          <a:cxnLst/>
+          <a:rect l="0" t="0" r="0" b="0"/>
+          <a:pathLst>
+            <a:path>
+              <a:moveTo>
+                <a:pt x="45720" y="0"/>
+              </a:moveTo>
+              <a:lnTo>
+                <a:pt x="45720" y="325128"/>
+              </a:lnTo>
+            </a:path>
+          </a:pathLst>
+        </a:custGeom>
+        <a:noFill/>
+        <a:ln w="9525" cap="flat" cmpd="sng" algn="ctr">
+          <a:solidFill>
+            <a:schemeClr val="accent1">
+              <a:shade val="60000"/>
+              <a:hueOff val="0"/>
+              <a:satOff val="0"/>
+              <a:lumOff val="0"/>
+              <a:alphaOff val="0"/>
+            </a:schemeClr>
+          </a:solidFill>
+          <a:prstDash val="solid"/>
+        </a:ln>
+        <a:effectLst/>
+      </dsp:spPr>
+      <dsp:style>
+        <a:lnRef idx="1">
+          <a:scrgbClr r="0" g="0" b="0"/>
+        </a:lnRef>
+        <a:fillRef idx="0">
+          <a:scrgbClr r="0" g="0" b="0"/>
+        </a:fillRef>
+        <a:effectRef idx="0">
+          <a:scrgbClr r="0" g="0" b="0"/>
+        </a:effectRef>
+        <a:fontRef idx="minor"/>
+      </dsp:style>
+    </dsp:sp>
+    <dsp:sp modelId="{7333BF06-7B1A-47D2-83B9-64258DCEE59E}">
+      <dsp:nvSpPr>
+        <dsp:cNvPr id="0" name=""/>
+        <dsp:cNvSpPr/>
+      </dsp:nvSpPr>
+      <dsp:spPr>
+        <a:xfrm>
+          <a:off x="662743" y="3059812"/>
+          <a:ext cx="444125" cy="585068"/>
+        </a:xfrm>
+        <a:custGeom>
+          <a:avLst/>
+          <a:gdLst/>
+          <a:ahLst/>
+          <a:cxnLst/>
+          <a:rect l="0" t="0" r="0" b="0"/>
+          <a:pathLst>
+            <a:path>
+              <a:moveTo>
+                <a:pt x="0" y="0"/>
+              </a:moveTo>
+              <a:lnTo>
+                <a:pt x="0" y="585068"/>
+              </a:lnTo>
+              <a:lnTo>
+                <a:pt x="444125" y="585068"/>
+              </a:lnTo>
+            </a:path>
+          </a:pathLst>
+        </a:custGeom>
+        <a:noFill/>
+        <a:ln w="9525" cap="flat" cmpd="sng" algn="ctr">
+          <a:solidFill>
+            <a:schemeClr val="accent1">
+              <a:shade val="80000"/>
+              <a:hueOff val="0"/>
+              <a:satOff val="0"/>
+              <a:lumOff val="0"/>
+              <a:alphaOff val="0"/>
+            </a:schemeClr>
+          </a:solidFill>
+          <a:prstDash val="solid"/>
+        </a:ln>
+        <a:effectLst/>
+      </dsp:spPr>
+      <dsp:style>
+        <a:lnRef idx="1">
+          <a:scrgbClr r="0" g="0" b="0"/>
+        </a:lnRef>
+        <a:fillRef idx="0">
+          <a:scrgbClr r="0" g="0" b="0"/>
+        </a:fillRef>
+        <a:effectRef idx="0">
+          <a:scrgbClr r="0" g="0" b="0"/>
+        </a:effectRef>
+        <a:fontRef idx="minor"/>
+      </dsp:style>
+    </dsp:sp>
+    <dsp:sp modelId="{09519A4A-757A-4FD3-B530-30AAEFBECC94}">
+      <dsp:nvSpPr>
+        <dsp:cNvPr id="0" name=""/>
+        <dsp:cNvSpPr/>
+      </dsp:nvSpPr>
+      <dsp:spPr>
+        <a:xfrm>
+          <a:off x="1236315" y="1960568"/>
+          <a:ext cx="91440" cy="325128"/>
+        </a:xfrm>
+        <a:custGeom>
+          <a:avLst/>
+          <a:gdLst/>
+          <a:ahLst/>
+          <a:cxnLst/>
+          <a:rect l="0" t="0" r="0" b="0"/>
+          <a:pathLst>
+            <a:path>
+              <a:moveTo>
+                <a:pt x="45720" y="0"/>
+              </a:moveTo>
+              <a:lnTo>
+                <a:pt x="45720" y="325128"/>
+              </a:lnTo>
+            </a:path>
+          </a:pathLst>
+        </a:custGeom>
+        <a:noFill/>
+        <a:ln w="9525" cap="flat" cmpd="sng" algn="ctr">
+          <a:solidFill>
+            <a:schemeClr val="accent1">
+              <a:shade val="80000"/>
+              <a:hueOff val="0"/>
+              <a:satOff val="0"/>
+              <a:lumOff val="0"/>
+              <a:alphaOff val="0"/>
+            </a:schemeClr>
+          </a:solidFill>
+          <a:prstDash val="solid"/>
+        </a:ln>
+        <a:effectLst/>
+      </dsp:spPr>
+      <dsp:style>
+        <a:lnRef idx="1">
+          <a:scrgbClr r="0" g="0" b="0"/>
+        </a:lnRef>
+        <a:fillRef idx="0">
+          <a:scrgbClr r="0" g="0" b="0"/>
+        </a:fillRef>
+        <a:effectRef idx="0">
+          <a:scrgbClr r="0" g="0" b="0"/>
+        </a:effectRef>
+        <a:fontRef idx="minor"/>
+      </dsp:style>
+    </dsp:sp>
+    <dsp:sp modelId="{8EBBDB76-DF10-4764-B8B8-496AD4C5615C}">
+      <dsp:nvSpPr>
+        <dsp:cNvPr id="0" name=""/>
+        <dsp:cNvSpPr/>
+      </dsp:nvSpPr>
+      <dsp:spPr>
+        <a:xfrm>
+          <a:off x="1282035" y="861325"/>
+          <a:ext cx="1873358" cy="325128"/>
+        </a:xfrm>
+        <a:custGeom>
+          <a:avLst/>
+          <a:gdLst/>
+          <a:ahLst/>
+          <a:cxnLst/>
+          <a:rect l="0" t="0" r="0" b="0"/>
+          <a:pathLst>
+            <a:path>
+              <a:moveTo>
+                <a:pt x="1873358" y="0"/>
+              </a:moveTo>
+              <a:lnTo>
+                <a:pt x="1873358" y="162564"/>
+              </a:lnTo>
+              <a:lnTo>
+                <a:pt x="0" y="162564"/>
+              </a:lnTo>
+              <a:lnTo>
+                <a:pt x="0" y="325128"/>
+              </a:lnTo>
+            </a:path>
+          </a:pathLst>
+        </a:custGeom>
+        <a:noFill/>
+        <a:ln w="9525" cap="flat" cmpd="sng" algn="ctr">
+          <a:solidFill>
+            <a:schemeClr val="accent1">
+              <a:shade val="60000"/>
+              <a:hueOff val="0"/>
+              <a:satOff val="0"/>
+              <a:lumOff val="0"/>
+              <a:alphaOff val="0"/>
+            </a:schemeClr>
+          </a:solidFill>
+          <a:prstDash val="solid"/>
+        </a:ln>
+        <a:effectLst/>
+      </dsp:spPr>
+      <dsp:style>
+        <a:lnRef idx="1">
+          <a:scrgbClr r="0" g="0" b="0"/>
+        </a:lnRef>
+        <a:fillRef idx="0">
+          <a:scrgbClr r="0" g="0" b="0"/>
+        </a:fillRef>
+        <a:effectRef idx="0">
+          <a:scrgbClr r="0" g="0" b="0"/>
+        </a:effectRef>
+        <a:fontRef idx="minor"/>
+      </dsp:style>
+    </dsp:sp>
+    <dsp:sp modelId="{F21B52D0-B08C-497F-8319-56B5DA6523B6}">
+      <dsp:nvSpPr>
+        <dsp:cNvPr id="0" name=""/>
+        <dsp:cNvSpPr/>
+      </dsp:nvSpPr>
+      <dsp:spPr>
+        <a:xfrm>
+          <a:off x="2381279" y="87210"/>
+          <a:ext cx="1548230" cy="774115"/>
+        </a:xfrm>
+        <a:prstGeom prst="rect">
+          <a:avLst/>
+        </a:prstGeom>
+        <a:solidFill>
+          <a:srgbClr val="94CC16">
+            <a:alpha val="73000"/>
+          </a:srgbClr>
+        </a:solidFill>
+        <a:ln>
+          <a:noFill/>
+        </a:ln>
+        <a:effectLst>
+          <a:outerShdw blurRad="50800" dist="25400" dir="5400000" rotWithShape="0">
+            <a:srgbClr val="000000">
+              <a:alpha val="28000"/>
+            </a:srgbClr>
+          </a:outerShdw>
+        </a:effectLst>
+        <a:scene3d>
+          <a:camera prst="orthographicFront">
+            <a:rot lat="0" lon="0" rev="0"/>
+          </a:camera>
+          <a:lightRig rig="threePt" dir="tl">
+            <a:rot lat="0" lon="0" rev="20400000"/>
+          </a:lightRig>
+        </a:scene3d>
+        <a:sp3d>
+          <a:bevelT w="50800" h="12700" prst="softRound"/>
+        </a:sp3d>
+      </dsp:spPr>
+      <dsp:style>
+        <a:lnRef idx="0">
+          <a:scrgbClr r="0" g="0" b="0"/>
+        </a:lnRef>
+        <a:fillRef idx="3">
+          <a:scrgbClr r="0" g="0" b="0"/>
+        </a:fillRef>
+        <a:effectRef idx="2">
+          <a:scrgbClr r="0" g="0" b="0"/>
+        </a:effectRef>
+        <a:fontRef idx="minor">
+          <a:schemeClr val="lt1"/>
+        </a:fontRef>
+      </dsp:style>
+      <dsp:txBody>
+        <a:bodyPr spcFirstLastPara="0" vert="horz" wrap="square" lIns="12700" tIns="12700" rIns="12700" bIns="12700" numCol="1" spcCol="1270" anchor="ctr" anchorCtr="0">
+          <a:noAutofit/>
+        </a:bodyPr>
+        <a:lstStyle/>
+        <a:p>
+          <a:pPr lvl="0" algn="ctr" defTabSz="889000">
+            <a:lnSpc>
+              <a:spcPct val="90000"/>
+            </a:lnSpc>
+            <a:spcBef>
+              <a:spcPct val="0"/>
+            </a:spcBef>
+            <a:spcAft>
+              <a:spcPct val="35000"/>
+            </a:spcAft>
+          </a:pPr>
+          <a:r>
+            <a:rPr lang="en-US" sz="2000" b="1" kern="1200" dirty="0" err="1" smtClean="0">
+              <a:solidFill>
+                <a:schemeClr val="tx1"/>
+              </a:solidFill>
+            </a:rPr>
+            <a:t>Presidencia</a:t>
+          </a:r>
+          <a:endParaRPr lang="es-AR" sz="2000" b="1" kern="1200" dirty="0">
+            <a:solidFill>
+              <a:schemeClr val="tx1"/>
+            </a:solidFill>
+          </a:endParaRPr>
+        </a:p>
+      </dsp:txBody>
+      <dsp:txXfrm>
+        <a:off x="2381279" y="87210"/>
+        <a:ext cx="1548230" cy="774115"/>
+      </dsp:txXfrm>
+    </dsp:sp>
+    <dsp:sp modelId="{EF27B91A-A527-4B5D-8953-3DEFA4CD70BE}">
+      <dsp:nvSpPr>
+        <dsp:cNvPr id="0" name=""/>
+        <dsp:cNvSpPr/>
+      </dsp:nvSpPr>
+      <dsp:spPr>
+        <a:xfrm>
+          <a:off x="507920" y="1186453"/>
+          <a:ext cx="1548230" cy="774115"/>
+        </a:xfrm>
+        <a:prstGeom prst="rect">
+          <a:avLst/>
+        </a:prstGeom>
+        <a:solidFill>
+          <a:srgbClr val="94CC16">
+            <a:alpha val="73000"/>
+          </a:srgbClr>
+        </a:solidFill>
+        <a:ln>
+          <a:noFill/>
+        </a:ln>
+        <a:effectLst>
+          <a:outerShdw blurRad="50800" dist="25400" dir="5400000" rotWithShape="0">
+            <a:srgbClr val="000000">
+              <a:alpha val="28000"/>
+            </a:srgbClr>
+          </a:outerShdw>
+        </a:effectLst>
+        <a:scene3d>
+          <a:camera prst="orthographicFront">
+            <a:rot lat="0" lon="0" rev="0"/>
+          </a:camera>
+          <a:lightRig rig="threePt" dir="tl">
+            <a:rot lat="0" lon="0" rev="20400000"/>
+          </a:lightRig>
+        </a:scene3d>
+        <a:sp3d>
+          <a:bevelT w="50800" h="12700" prst="softRound"/>
+        </a:sp3d>
+      </dsp:spPr>
+      <dsp:style>
+        <a:lnRef idx="0">
+          <a:scrgbClr r="0" g="0" b="0"/>
+        </a:lnRef>
+        <a:fillRef idx="3">
+          <a:scrgbClr r="0" g="0" b="0"/>
+        </a:fillRef>
+        <a:effectRef idx="2">
+          <a:scrgbClr r="0" g="0" b="0"/>
+        </a:effectRef>
+        <a:fontRef idx="minor">
+          <a:schemeClr val="lt1"/>
+        </a:fontRef>
+      </dsp:style>
+      <dsp:txBody>
+        <a:bodyPr spcFirstLastPara="0" vert="horz" wrap="square" lIns="8890" tIns="8890" rIns="8890" bIns="8890" numCol="1" spcCol="1270" anchor="ctr" anchorCtr="0">
+          <a:noAutofit/>
+        </a:bodyPr>
+        <a:lstStyle/>
+        <a:p>
+          <a:pPr lvl="0" algn="ctr" defTabSz="622300">
+            <a:lnSpc>
+              <a:spcPct val="90000"/>
+            </a:lnSpc>
+            <a:spcBef>
+              <a:spcPct val="0"/>
+            </a:spcBef>
+            <a:spcAft>
+              <a:spcPct val="35000"/>
+            </a:spcAft>
+          </a:pPr>
+          <a:r>
+            <a:rPr lang="en-US" sz="1400" b="1" kern="1200" dirty="0">
+              <a:solidFill>
+                <a:schemeClr val="tx1"/>
+              </a:solidFill>
+            </a:rPr>
+            <a:t>Supervision de </a:t>
+          </a:r>
+          <a:r>
+            <a:rPr lang="en-US" sz="1400" b="1" kern="1200" dirty="0" err="1">
+              <a:solidFill>
+                <a:schemeClr val="tx1"/>
+              </a:solidFill>
+            </a:rPr>
+            <a:t>Proyectos</a:t>
+          </a:r>
+          <a:endParaRPr lang="es-AR" sz="1400" b="1" kern="1200" dirty="0">
+            <a:solidFill>
+              <a:schemeClr val="tx1"/>
+            </a:solidFill>
+          </a:endParaRPr>
+        </a:p>
+      </dsp:txBody>
+      <dsp:txXfrm>
+        <a:off x="507920" y="1186453"/>
+        <a:ext cx="1548230" cy="774115"/>
+      </dsp:txXfrm>
+    </dsp:sp>
+    <dsp:sp modelId="{76382964-F0B9-4801-AD29-234D5C4EB29C}">
+      <dsp:nvSpPr>
+        <dsp:cNvPr id="0" name=""/>
+        <dsp:cNvSpPr/>
+      </dsp:nvSpPr>
+      <dsp:spPr>
+        <a:xfrm>
+          <a:off x="507920" y="2285697"/>
+          <a:ext cx="1548230" cy="774115"/>
+        </a:xfrm>
+        <a:prstGeom prst="rect">
+          <a:avLst/>
+        </a:prstGeom>
+        <a:solidFill>
+          <a:srgbClr val="94CC16">
+            <a:alpha val="73000"/>
+          </a:srgbClr>
+        </a:solidFill>
+        <a:ln>
+          <a:solidFill>
+            <a:schemeClr val="bg2">
+              <a:lumMod val="50000"/>
+            </a:schemeClr>
+          </a:solidFill>
+        </a:ln>
+        <a:effectLst>
+          <a:outerShdw blurRad="50800" dist="25400" dir="5400000" rotWithShape="0">
+            <a:srgbClr val="000000">
+              <a:alpha val="28000"/>
+            </a:srgbClr>
+          </a:outerShdw>
+        </a:effectLst>
+        <a:scene3d>
+          <a:camera prst="orthographicFront">
+            <a:rot lat="0" lon="0" rev="0"/>
+          </a:camera>
+          <a:lightRig rig="threePt" dir="tl">
+            <a:rot lat="0" lon="0" rev="20400000"/>
+          </a:lightRig>
+        </a:scene3d>
+        <a:sp3d>
+          <a:bevelT w="50800" h="12700" prst="softRound"/>
+        </a:sp3d>
+      </dsp:spPr>
+      <dsp:style>
+        <a:lnRef idx="0">
+          <a:scrgbClr r="0" g="0" b="0"/>
+        </a:lnRef>
+        <a:fillRef idx="3">
+          <a:scrgbClr r="0" g="0" b="0"/>
+        </a:fillRef>
+        <a:effectRef idx="2">
+          <a:scrgbClr r="0" g="0" b="0"/>
+        </a:effectRef>
+        <a:fontRef idx="minor">
+          <a:schemeClr val="lt1"/>
+        </a:fontRef>
+      </dsp:style>
+      <dsp:txBody>
+        <a:bodyPr spcFirstLastPara="0" vert="horz" wrap="square" lIns="8890" tIns="8890" rIns="8890" bIns="8890" numCol="1" spcCol="1270" anchor="ctr" anchorCtr="0">
+          <a:noAutofit/>
+        </a:bodyPr>
+        <a:lstStyle/>
+        <a:p>
+          <a:pPr lvl="0" algn="ctr" defTabSz="622300">
+            <a:lnSpc>
+              <a:spcPct val="90000"/>
+            </a:lnSpc>
+            <a:spcBef>
+              <a:spcPct val="0"/>
+            </a:spcBef>
+            <a:spcAft>
+              <a:spcPct val="35000"/>
+            </a:spcAft>
+          </a:pPr>
+          <a:r>
+            <a:rPr lang="en-US" sz="1400" b="1" kern="1200" dirty="0" err="1">
+              <a:solidFill>
+                <a:schemeClr val="tx1"/>
+              </a:solidFill>
+            </a:rPr>
+            <a:t>Administración</a:t>
+          </a:r>
+          <a:r>
+            <a:rPr lang="en-US" sz="1400" b="1" kern="1200" dirty="0">
+              <a:solidFill>
+                <a:schemeClr val="tx1"/>
+              </a:solidFill>
+            </a:rPr>
+            <a:t> de </a:t>
+          </a:r>
+          <a:r>
+            <a:rPr lang="en-US" sz="1400" b="1" kern="1200" dirty="0" err="1">
+              <a:solidFill>
+                <a:schemeClr val="tx1"/>
+              </a:solidFill>
+            </a:rPr>
+            <a:t>Proyectos</a:t>
+          </a:r>
+          <a:endParaRPr lang="es-AR" sz="1400" b="1" kern="1200" dirty="0">
+            <a:solidFill>
+              <a:schemeClr val="tx1"/>
+            </a:solidFill>
+          </a:endParaRPr>
+        </a:p>
+      </dsp:txBody>
+      <dsp:txXfrm>
+        <a:off x="507920" y="2285697"/>
+        <a:ext cx="1548230" cy="774115"/>
+      </dsp:txXfrm>
+    </dsp:sp>
+    <dsp:sp modelId="{C999530D-970C-4F19-A91A-981537024566}">
+      <dsp:nvSpPr>
+        <dsp:cNvPr id="0" name=""/>
+        <dsp:cNvSpPr/>
+      </dsp:nvSpPr>
+      <dsp:spPr>
+        <a:xfrm>
+          <a:off x="1106869" y="3257823"/>
+          <a:ext cx="1548230" cy="774115"/>
+        </a:xfrm>
+        <a:prstGeom prst="rect">
+          <a:avLst/>
+        </a:prstGeom>
+        <a:solidFill>
+          <a:srgbClr val="94CC16">
+            <a:alpha val="73000"/>
+          </a:srgbClr>
+        </a:solidFill>
+        <a:ln>
+          <a:noFill/>
+        </a:ln>
+        <a:effectLst>
+          <a:outerShdw blurRad="50800" dist="25400" dir="5400000" rotWithShape="0">
+            <a:srgbClr val="000000">
+              <a:alpha val="28000"/>
+            </a:srgbClr>
+          </a:outerShdw>
+        </a:effectLst>
+        <a:scene3d>
+          <a:camera prst="orthographicFront">
+            <a:rot lat="0" lon="0" rev="0"/>
+          </a:camera>
+          <a:lightRig rig="threePt" dir="tl">
+            <a:rot lat="0" lon="0" rev="20400000"/>
+          </a:lightRig>
+        </a:scene3d>
+        <a:sp3d>
+          <a:bevelT w="50800" h="12700" prst="softRound"/>
+        </a:sp3d>
+      </dsp:spPr>
+      <dsp:style>
+        <a:lnRef idx="0">
+          <a:scrgbClr r="0" g="0" b="0"/>
+        </a:lnRef>
+        <a:fillRef idx="3">
+          <a:scrgbClr r="0" g="0" b="0"/>
+        </a:fillRef>
+        <a:effectRef idx="2">
+          <a:scrgbClr r="0" g="0" b="0"/>
+        </a:effectRef>
+        <a:fontRef idx="minor">
+          <a:schemeClr val="lt1"/>
+        </a:fontRef>
+      </dsp:style>
+      <dsp:txBody>
+        <a:bodyPr spcFirstLastPara="0" vert="horz" wrap="square" lIns="8890" tIns="8890" rIns="8890" bIns="8890" numCol="1" spcCol="1270" anchor="ctr" anchorCtr="0">
+          <a:noAutofit/>
+        </a:bodyPr>
+        <a:lstStyle/>
+        <a:p>
+          <a:pPr lvl="0" algn="ctr" defTabSz="622300">
+            <a:lnSpc>
+              <a:spcPct val="90000"/>
+            </a:lnSpc>
+            <a:spcBef>
+              <a:spcPct val="0"/>
+            </a:spcBef>
+            <a:spcAft>
+              <a:spcPct val="35000"/>
+            </a:spcAft>
+          </a:pPr>
+          <a:r>
+            <a:rPr lang="es-AR" sz="1400" b="1" kern="1200" dirty="0">
+              <a:solidFill>
+                <a:schemeClr val="tx1"/>
+              </a:solidFill>
+            </a:rPr>
+            <a:t>Cuadrillas</a:t>
+          </a:r>
+        </a:p>
+      </dsp:txBody>
+      <dsp:txXfrm>
+        <a:off x="1106869" y="3257823"/>
+        <a:ext cx="1548230" cy="774115"/>
+      </dsp:txXfrm>
+    </dsp:sp>
+    <dsp:sp modelId="{D70C0BDD-DBCA-4018-8B04-41A27590CEAD}">
+      <dsp:nvSpPr>
+        <dsp:cNvPr id="0" name=""/>
+        <dsp:cNvSpPr/>
+      </dsp:nvSpPr>
+      <dsp:spPr>
+        <a:xfrm>
+          <a:off x="2381279" y="1186453"/>
+          <a:ext cx="1548230" cy="774115"/>
+        </a:xfrm>
+        <a:prstGeom prst="rect">
+          <a:avLst/>
+        </a:prstGeom>
+        <a:solidFill>
+          <a:srgbClr val="94CC16">
+            <a:alpha val="73000"/>
+          </a:srgbClr>
+        </a:solidFill>
+        <a:ln>
+          <a:noFill/>
+        </a:ln>
+        <a:effectLst>
+          <a:outerShdw blurRad="50800" dist="25400" dir="5400000" rotWithShape="0">
+            <a:srgbClr val="000000">
+              <a:alpha val="28000"/>
+            </a:srgbClr>
+          </a:outerShdw>
+        </a:effectLst>
+        <a:scene3d>
+          <a:camera prst="orthographicFront">
+            <a:rot lat="0" lon="0" rev="0"/>
+          </a:camera>
+          <a:lightRig rig="threePt" dir="tl">
+            <a:rot lat="0" lon="0" rev="20400000"/>
+          </a:lightRig>
+        </a:scene3d>
+        <a:sp3d>
+          <a:bevelT w="50800" h="12700" prst="softRound"/>
+        </a:sp3d>
+      </dsp:spPr>
+      <dsp:style>
+        <a:lnRef idx="0">
+          <a:scrgbClr r="0" g="0" b="0"/>
+        </a:lnRef>
+        <a:fillRef idx="3">
+          <a:scrgbClr r="0" g="0" b="0"/>
+        </a:fillRef>
+        <a:effectRef idx="2">
+          <a:scrgbClr r="0" g="0" b="0"/>
+        </a:effectRef>
+        <a:fontRef idx="minor">
+          <a:schemeClr val="lt1"/>
+        </a:fontRef>
+      </dsp:style>
+      <dsp:txBody>
+        <a:bodyPr spcFirstLastPara="0" vert="horz" wrap="square" lIns="8890" tIns="8890" rIns="8890" bIns="8890" numCol="1" spcCol="1270" anchor="ctr" anchorCtr="0">
+          <a:noAutofit/>
+        </a:bodyPr>
+        <a:lstStyle/>
+        <a:p>
+          <a:pPr lvl="0" algn="ctr" defTabSz="622300">
+            <a:lnSpc>
+              <a:spcPct val="90000"/>
+            </a:lnSpc>
+            <a:spcBef>
+              <a:spcPct val="0"/>
+            </a:spcBef>
+            <a:spcAft>
+              <a:spcPct val="35000"/>
+            </a:spcAft>
+          </a:pPr>
+          <a:r>
+            <a:rPr lang="en-US" sz="1400" b="1" kern="1200" dirty="0" err="1">
+              <a:solidFill>
+                <a:schemeClr val="tx1"/>
+              </a:solidFill>
+            </a:rPr>
+            <a:t>Administración</a:t>
+          </a:r>
+          <a:r>
+            <a:rPr lang="en-US" sz="1400" b="1" kern="1200" dirty="0">
+              <a:solidFill>
+                <a:schemeClr val="tx1"/>
+              </a:solidFill>
+            </a:rPr>
+            <a:t> General</a:t>
+          </a:r>
+          <a:endParaRPr lang="es-AR" sz="1400" b="1" kern="1200" dirty="0">
+            <a:solidFill>
+              <a:schemeClr val="tx1"/>
+            </a:solidFill>
+          </a:endParaRPr>
+        </a:p>
+      </dsp:txBody>
+      <dsp:txXfrm>
+        <a:off x="2381279" y="1186453"/>
+        <a:ext cx="1548230" cy="774115"/>
+      </dsp:txXfrm>
+    </dsp:sp>
+    <dsp:sp modelId="{2872F071-CCEC-4734-8E72-CEF275144F2A}">
+      <dsp:nvSpPr>
+        <dsp:cNvPr id="0" name=""/>
+        <dsp:cNvSpPr/>
+      </dsp:nvSpPr>
+      <dsp:spPr>
+        <a:xfrm>
+          <a:off x="4254638" y="1186453"/>
+          <a:ext cx="1548230" cy="774115"/>
+        </a:xfrm>
+        <a:prstGeom prst="rect">
+          <a:avLst/>
+        </a:prstGeom>
+        <a:solidFill>
+          <a:srgbClr val="94CC16">
+            <a:alpha val="73000"/>
+          </a:srgbClr>
+        </a:solidFill>
+        <a:ln>
+          <a:noFill/>
+        </a:ln>
+        <a:effectLst>
+          <a:outerShdw blurRad="50800" dist="25400" dir="5400000" rotWithShape="0">
+            <a:srgbClr val="000000">
+              <a:alpha val="28000"/>
+            </a:srgbClr>
+          </a:outerShdw>
+        </a:effectLst>
+        <a:scene3d>
+          <a:camera prst="orthographicFront">
+            <a:rot lat="0" lon="0" rev="0"/>
+          </a:camera>
+          <a:lightRig rig="threePt" dir="tl">
+            <a:rot lat="0" lon="0" rev="20400000"/>
+          </a:lightRig>
+        </a:scene3d>
+        <a:sp3d>
+          <a:bevelT w="50800" h="12700" prst="softRound"/>
+        </a:sp3d>
+      </dsp:spPr>
+      <dsp:style>
+        <a:lnRef idx="0">
+          <a:scrgbClr r="0" g="0" b="0"/>
+        </a:lnRef>
+        <a:fillRef idx="3">
+          <a:scrgbClr r="0" g="0" b="0"/>
+        </a:fillRef>
+        <a:effectRef idx="2">
+          <a:scrgbClr r="0" g="0" b="0"/>
+        </a:effectRef>
+        <a:fontRef idx="minor">
+          <a:schemeClr val="lt1"/>
+        </a:fontRef>
+      </dsp:style>
+      <dsp:txBody>
+        <a:bodyPr spcFirstLastPara="0" vert="horz" wrap="square" lIns="8890" tIns="8890" rIns="8890" bIns="8890" numCol="1" spcCol="1270" anchor="ctr" anchorCtr="0">
+          <a:noAutofit/>
+        </a:bodyPr>
+        <a:lstStyle/>
+        <a:p>
+          <a:pPr lvl="0" algn="ctr" defTabSz="622300">
+            <a:lnSpc>
+              <a:spcPct val="90000"/>
+            </a:lnSpc>
+            <a:spcBef>
+              <a:spcPct val="0"/>
+            </a:spcBef>
+            <a:spcAft>
+              <a:spcPct val="35000"/>
+            </a:spcAft>
+          </a:pPr>
+          <a:r>
+            <a:rPr lang="en-US" sz="1400" b="1" kern="1200" dirty="0" err="1">
+              <a:solidFill>
+                <a:schemeClr val="tx1"/>
+              </a:solidFill>
+            </a:rPr>
+            <a:t>Seguridad</a:t>
+          </a:r>
+          <a:r>
+            <a:rPr lang="en-US" sz="1400" b="1" kern="1200" dirty="0">
+              <a:solidFill>
+                <a:schemeClr val="tx1"/>
+              </a:solidFill>
+            </a:rPr>
+            <a:t> e </a:t>
+          </a:r>
+          <a:r>
+            <a:rPr lang="en-US" sz="1400" b="1" kern="1200" dirty="0" err="1">
+              <a:solidFill>
+                <a:schemeClr val="tx1"/>
+              </a:solidFill>
+            </a:rPr>
+            <a:t>Higiene</a:t>
+          </a:r>
+          <a:endParaRPr lang="es-AR" sz="1400" b="1" kern="1200" dirty="0">
+            <a:solidFill>
+              <a:schemeClr val="tx1"/>
+            </a:solidFill>
+          </a:endParaRPr>
+        </a:p>
+      </dsp:txBody>
+      <dsp:txXfrm>
+        <a:off x="4254638" y="1186453"/>
+        <a:ext cx="1548230" cy="774115"/>
+      </dsp:txXfrm>
+    </dsp:sp>
   </dsp:spTree>
 </dsp:drawing>
 </file>
 
 <file path=ppt/diagrams/drawing2.xml><?xml version="1.0" encoding="utf-8"?>
-<dsp:drawing xmlns:dgm="http://schemas.openxmlformats.org/drawingml/2006/diagram" xmlns:a="http://schemas.openxmlformats.org/drawingml/2006/main" xmlns:dsp="http://schemas.microsoft.com/office/drawing/2008/diagram">
+<dsp:drawing xmlns:dgm="http://schemas.openxmlformats.org/drawingml/2006/diagram" xmlns:dsp="http://schemas.microsoft.com/office/drawing/2008/diagram" xmlns:a="http://schemas.openxmlformats.org/drawingml/2006/main">
   <dsp:spTree>
     <dsp:nvGrpSpPr>
       <dsp:cNvPr id="0" name=""/>
       <dsp:cNvGrpSpPr/>
     </dsp:nvGrpSpPr>
     <dsp:grpSpPr/>
+    <dsp:sp modelId="{88D90226-35C4-409B-95DB-A53D0DBCA776}">
+      <dsp:nvSpPr>
+        <dsp:cNvPr id="0" name=""/>
+        <dsp:cNvSpPr/>
+      </dsp:nvSpPr>
+      <dsp:spPr>
+        <a:xfrm>
+          <a:off x="3512" y="263345"/>
+          <a:ext cx="1535742" cy="921445"/>
+        </a:xfrm>
+        <a:prstGeom prst="roundRect">
+          <a:avLst>
+            <a:gd name="adj" fmla="val 10000"/>
+          </a:avLst>
+        </a:prstGeom>
+        <a:gradFill rotWithShape="0">
+          <a:gsLst>
+            <a:gs pos="0">
+              <a:schemeClr val="accent6">
+                <a:hueOff val="0"/>
+                <a:satOff val="0"/>
+                <a:lumOff val="0"/>
+                <a:alphaOff val="0"/>
+                <a:tint val="20000"/>
+                <a:satMod val="180000"/>
+                <a:lumMod val="98000"/>
+              </a:schemeClr>
+            </a:gs>
+            <a:gs pos="40000">
+              <a:schemeClr val="accent6">
+                <a:hueOff val="0"/>
+                <a:satOff val="0"/>
+                <a:lumOff val="0"/>
+                <a:alphaOff val="0"/>
+                <a:tint val="30000"/>
+                <a:satMod val="260000"/>
+                <a:lumMod val="84000"/>
+              </a:schemeClr>
+            </a:gs>
+            <a:gs pos="100000">
+              <a:schemeClr val="accent6">
+                <a:hueOff val="0"/>
+                <a:satOff val="0"/>
+                <a:lumOff val="0"/>
+                <a:alphaOff val="0"/>
+                <a:tint val="100000"/>
+                <a:satMod val="110000"/>
+                <a:lumMod val="100000"/>
+              </a:schemeClr>
+            </a:gs>
+          </a:gsLst>
+          <a:lin ang="5040000" scaled="1"/>
+        </a:gradFill>
+        <a:ln>
+          <a:noFill/>
+        </a:ln>
+        <a:effectLst/>
+        <a:scene3d>
+          <a:camera prst="orthographicFront"/>
+          <a:lightRig rig="flat" dir="t"/>
+        </a:scene3d>
+        <a:sp3d prstMaterial="dkEdge">
+          <a:bevelT w="8200" h="38100"/>
+        </a:sp3d>
+      </dsp:spPr>
+      <dsp:style>
+        <a:lnRef idx="0">
+          <a:scrgbClr r="0" g="0" b="0"/>
+        </a:lnRef>
+        <a:fillRef idx="2">
+          <a:scrgbClr r="0" g="0" b="0"/>
+        </a:fillRef>
+        <a:effectRef idx="1">
+          <a:scrgbClr r="0" g="0" b="0"/>
+        </a:effectRef>
+        <a:fontRef idx="minor">
+          <a:schemeClr val="dk1"/>
+        </a:fontRef>
+      </dsp:style>
+      <dsp:txBody>
+        <a:bodyPr spcFirstLastPara="0" vert="horz" wrap="square" lIns="57150" tIns="57150" rIns="57150" bIns="57150" numCol="1" spcCol="1270" anchor="ctr" anchorCtr="0">
+          <a:noAutofit/>
+        </a:bodyPr>
+        <a:lstStyle/>
+        <a:p>
+          <a:pPr lvl="0" algn="ctr" defTabSz="666750">
+            <a:lnSpc>
+              <a:spcPct val="90000"/>
+            </a:lnSpc>
+            <a:spcBef>
+              <a:spcPct val="0"/>
+            </a:spcBef>
+            <a:spcAft>
+              <a:spcPct val="35000"/>
+            </a:spcAft>
+          </a:pPr>
+          <a:r>
+            <a:rPr lang="es-AR" sz="1500" kern="1200" dirty="0" smtClean="0"/>
+            <a:t>Licitación</a:t>
+          </a:r>
+          <a:endParaRPr lang="es-AR" sz="1500" kern="1200" dirty="0"/>
+        </a:p>
+      </dsp:txBody>
+      <dsp:txXfrm>
+        <a:off x="30500" y="290333"/>
+        <a:ext cx="1481766" cy="867469"/>
+      </dsp:txXfrm>
+    </dsp:sp>
+    <dsp:sp modelId="{E55E39E1-8F7F-45DE-9CA6-BD910E1D29B1}">
+      <dsp:nvSpPr>
+        <dsp:cNvPr id="0" name=""/>
+        <dsp:cNvSpPr/>
+      </dsp:nvSpPr>
+      <dsp:spPr>
+        <a:xfrm>
+          <a:off x="1674400" y="533636"/>
+          <a:ext cx="325577" cy="380864"/>
+        </a:xfrm>
+        <a:prstGeom prst="rightArrow">
+          <a:avLst>
+            <a:gd name="adj1" fmla="val 60000"/>
+            <a:gd name="adj2" fmla="val 50000"/>
+          </a:avLst>
+        </a:prstGeom>
+        <a:gradFill rotWithShape="0">
+          <a:gsLst>
+            <a:gs pos="0">
+              <a:schemeClr val="accent6">
+                <a:tint val="60000"/>
+                <a:hueOff val="0"/>
+                <a:satOff val="0"/>
+                <a:lumOff val="0"/>
+                <a:alphaOff val="0"/>
+                <a:tint val="20000"/>
+                <a:satMod val="180000"/>
+                <a:lumMod val="98000"/>
+              </a:schemeClr>
+            </a:gs>
+            <a:gs pos="40000">
+              <a:schemeClr val="accent6">
+                <a:tint val="60000"/>
+                <a:hueOff val="0"/>
+                <a:satOff val="0"/>
+                <a:lumOff val="0"/>
+                <a:alphaOff val="0"/>
+                <a:tint val="30000"/>
+                <a:satMod val="260000"/>
+                <a:lumMod val="84000"/>
+              </a:schemeClr>
+            </a:gs>
+            <a:gs pos="100000">
+              <a:schemeClr val="accent6">
+                <a:tint val="60000"/>
+                <a:hueOff val="0"/>
+                <a:satOff val="0"/>
+                <a:lumOff val="0"/>
+                <a:alphaOff val="0"/>
+                <a:tint val="100000"/>
+                <a:satMod val="110000"/>
+                <a:lumMod val="100000"/>
+              </a:schemeClr>
+            </a:gs>
+          </a:gsLst>
+          <a:lin ang="5040000" scaled="1"/>
+        </a:gradFill>
+        <a:ln>
+          <a:noFill/>
+        </a:ln>
+        <a:effectLst/>
+      </dsp:spPr>
+      <dsp:style>
+        <a:lnRef idx="0">
+          <a:scrgbClr r="0" g="0" b="0"/>
+        </a:lnRef>
+        <a:fillRef idx="2">
+          <a:scrgbClr r="0" g="0" b="0"/>
+        </a:fillRef>
+        <a:effectRef idx="1">
+          <a:scrgbClr r="0" g="0" b="0"/>
+        </a:effectRef>
+        <a:fontRef idx="minor">
+          <a:schemeClr val="dk1"/>
+        </a:fontRef>
+      </dsp:style>
+      <dsp:txBody>
+        <a:bodyPr spcFirstLastPara="0" vert="horz" wrap="square" lIns="0" tIns="0" rIns="0" bIns="0" numCol="1" spcCol="1270" anchor="ctr" anchorCtr="0">
+          <a:noAutofit/>
+        </a:bodyPr>
+        <a:lstStyle/>
+        <a:p>
+          <a:pPr lvl="0" algn="ctr" defTabSz="533400">
+            <a:lnSpc>
+              <a:spcPct val="90000"/>
+            </a:lnSpc>
+            <a:spcBef>
+              <a:spcPct val="0"/>
+            </a:spcBef>
+            <a:spcAft>
+              <a:spcPct val="35000"/>
+            </a:spcAft>
+          </a:pPr>
+          <a:endParaRPr lang="es-AR" sz="1200" kern="1200"/>
+        </a:p>
+      </dsp:txBody>
+      <dsp:txXfrm>
+        <a:off x="1674400" y="609809"/>
+        <a:ext cx="227904" cy="228518"/>
+      </dsp:txXfrm>
+    </dsp:sp>
+    <dsp:sp modelId="{285D4231-58A7-4A8D-B065-3B5550752B5D}">
+      <dsp:nvSpPr>
+        <dsp:cNvPr id="0" name=""/>
+        <dsp:cNvSpPr/>
+      </dsp:nvSpPr>
+      <dsp:spPr>
+        <a:xfrm>
+          <a:off x="2153552" y="263345"/>
+          <a:ext cx="1535742" cy="921445"/>
+        </a:xfrm>
+        <a:prstGeom prst="roundRect">
+          <a:avLst>
+            <a:gd name="adj" fmla="val 10000"/>
+          </a:avLst>
+        </a:prstGeom>
+        <a:gradFill rotWithShape="0">
+          <a:gsLst>
+            <a:gs pos="0">
+              <a:schemeClr val="accent6">
+                <a:hueOff val="0"/>
+                <a:satOff val="0"/>
+                <a:lumOff val="0"/>
+                <a:alphaOff val="0"/>
+                <a:tint val="20000"/>
+                <a:satMod val="180000"/>
+                <a:lumMod val="98000"/>
+              </a:schemeClr>
+            </a:gs>
+            <a:gs pos="40000">
+              <a:schemeClr val="accent6">
+                <a:hueOff val="0"/>
+                <a:satOff val="0"/>
+                <a:lumOff val="0"/>
+                <a:alphaOff val="0"/>
+                <a:tint val="30000"/>
+                <a:satMod val="260000"/>
+                <a:lumMod val="84000"/>
+              </a:schemeClr>
+            </a:gs>
+            <a:gs pos="100000">
+              <a:schemeClr val="accent6">
+                <a:hueOff val="0"/>
+                <a:satOff val="0"/>
+                <a:lumOff val="0"/>
+                <a:alphaOff val="0"/>
+                <a:tint val="100000"/>
+                <a:satMod val="110000"/>
+                <a:lumMod val="100000"/>
+              </a:schemeClr>
+            </a:gs>
+          </a:gsLst>
+          <a:lin ang="5040000" scaled="1"/>
+        </a:gradFill>
+        <a:ln>
+          <a:noFill/>
+        </a:ln>
+        <a:effectLst/>
+        <a:scene3d>
+          <a:camera prst="orthographicFront"/>
+          <a:lightRig rig="flat" dir="t"/>
+        </a:scene3d>
+        <a:sp3d prstMaterial="dkEdge">
+          <a:bevelT w="8200" h="38100"/>
+        </a:sp3d>
+      </dsp:spPr>
+      <dsp:style>
+        <a:lnRef idx="0">
+          <a:scrgbClr r="0" g="0" b="0"/>
+        </a:lnRef>
+        <a:fillRef idx="2">
+          <a:scrgbClr r="0" g="0" b="0"/>
+        </a:fillRef>
+        <a:effectRef idx="1">
+          <a:scrgbClr r="0" g="0" b="0"/>
+        </a:effectRef>
+        <a:fontRef idx="minor">
+          <a:schemeClr val="dk1"/>
+        </a:fontRef>
+      </dsp:style>
+      <dsp:txBody>
+        <a:bodyPr spcFirstLastPara="0" vert="horz" wrap="square" lIns="57150" tIns="57150" rIns="57150" bIns="57150" numCol="1" spcCol="1270" anchor="ctr" anchorCtr="0">
+          <a:noAutofit/>
+        </a:bodyPr>
+        <a:lstStyle/>
+        <a:p>
+          <a:pPr lvl="0" algn="ctr" defTabSz="666750">
+            <a:lnSpc>
+              <a:spcPct val="90000"/>
+            </a:lnSpc>
+            <a:spcBef>
+              <a:spcPct val="0"/>
+            </a:spcBef>
+            <a:spcAft>
+              <a:spcPct val="35000"/>
+            </a:spcAft>
+          </a:pPr>
+          <a:r>
+            <a:rPr lang="es-AR" sz="1500" kern="1200" dirty="0" smtClean="0"/>
+            <a:t>Solicitud de trabajo</a:t>
+          </a:r>
+          <a:endParaRPr lang="es-AR" sz="1500" kern="1200" dirty="0"/>
+        </a:p>
+      </dsp:txBody>
+      <dsp:txXfrm>
+        <a:off x="2180540" y="290333"/>
+        <a:ext cx="1481766" cy="867469"/>
+      </dsp:txXfrm>
+    </dsp:sp>
+    <dsp:sp modelId="{58B57261-0747-48FE-A1A6-719C2514B016}">
+      <dsp:nvSpPr>
+        <dsp:cNvPr id="0" name=""/>
+        <dsp:cNvSpPr/>
+      </dsp:nvSpPr>
+      <dsp:spPr>
+        <a:xfrm>
+          <a:off x="3824440" y="533636"/>
+          <a:ext cx="325577" cy="380864"/>
+        </a:xfrm>
+        <a:prstGeom prst="rightArrow">
+          <a:avLst>
+            <a:gd name="adj1" fmla="val 60000"/>
+            <a:gd name="adj2" fmla="val 50000"/>
+          </a:avLst>
+        </a:prstGeom>
+        <a:gradFill rotWithShape="0">
+          <a:gsLst>
+            <a:gs pos="0">
+              <a:schemeClr val="accent6">
+                <a:tint val="60000"/>
+                <a:hueOff val="0"/>
+                <a:satOff val="0"/>
+                <a:lumOff val="0"/>
+                <a:alphaOff val="0"/>
+                <a:tint val="20000"/>
+                <a:satMod val="180000"/>
+                <a:lumMod val="98000"/>
+              </a:schemeClr>
+            </a:gs>
+            <a:gs pos="40000">
+              <a:schemeClr val="accent6">
+                <a:tint val="60000"/>
+                <a:hueOff val="0"/>
+                <a:satOff val="0"/>
+                <a:lumOff val="0"/>
+                <a:alphaOff val="0"/>
+                <a:tint val="30000"/>
+                <a:satMod val="260000"/>
+                <a:lumMod val="84000"/>
+              </a:schemeClr>
+            </a:gs>
+            <a:gs pos="100000">
+              <a:schemeClr val="accent6">
+                <a:tint val="60000"/>
+                <a:hueOff val="0"/>
+                <a:satOff val="0"/>
+                <a:lumOff val="0"/>
+                <a:alphaOff val="0"/>
+                <a:tint val="100000"/>
+                <a:satMod val="110000"/>
+                <a:lumMod val="100000"/>
+              </a:schemeClr>
+            </a:gs>
+          </a:gsLst>
+          <a:lin ang="5040000" scaled="1"/>
+        </a:gradFill>
+        <a:ln>
+          <a:noFill/>
+        </a:ln>
+        <a:effectLst/>
+      </dsp:spPr>
+      <dsp:style>
+        <a:lnRef idx="0">
+          <a:scrgbClr r="0" g="0" b="0"/>
+        </a:lnRef>
+        <a:fillRef idx="2">
+          <a:scrgbClr r="0" g="0" b="0"/>
+        </a:fillRef>
+        <a:effectRef idx="1">
+          <a:scrgbClr r="0" g="0" b="0"/>
+        </a:effectRef>
+        <a:fontRef idx="minor">
+          <a:schemeClr val="dk1"/>
+        </a:fontRef>
+      </dsp:style>
+      <dsp:txBody>
+        <a:bodyPr spcFirstLastPara="0" vert="horz" wrap="square" lIns="0" tIns="0" rIns="0" bIns="0" numCol="1" spcCol="1270" anchor="ctr" anchorCtr="0">
+          <a:noAutofit/>
+        </a:bodyPr>
+        <a:lstStyle/>
+        <a:p>
+          <a:pPr lvl="0" algn="ctr" defTabSz="533400">
+            <a:lnSpc>
+              <a:spcPct val="90000"/>
+            </a:lnSpc>
+            <a:spcBef>
+              <a:spcPct val="0"/>
+            </a:spcBef>
+            <a:spcAft>
+              <a:spcPct val="35000"/>
+            </a:spcAft>
+          </a:pPr>
+          <a:endParaRPr lang="es-AR" sz="1200" kern="1200"/>
+        </a:p>
+      </dsp:txBody>
+      <dsp:txXfrm>
+        <a:off x="3824440" y="609809"/>
+        <a:ext cx="227904" cy="228518"/>
+      </dsp:txXfrm>
+    </dsp:sp>
+    <dsp:sp modelId="{96EA98A3-ED5C-4801-BB75-774A6066E9D1}">
+      <dsp:nvSpPr>
+        <dsp:cNvPr id="0" name=""/>
+        <dsp:cNvSpPr/>
+      </dsp:nvSpPr>
+      <dsp:spPr>
+        <a:xfrm>
+          <a:off x="4303592" y="263345"/>
+          <a:ext cx="1535742" cy="921445"/>
+        </a:xfrm>
+        <a:prstGeom prst="roundRect">
+          <a:avLst>
+            <a:gd name="adj" fmla="val 10000"/>
+          </a:avLst>
+        </a:prstGeom>
+        <a:gradFill rotWithShape="0">
+          <a:gsLst>
+            <a:gs pos="0">
+              <a:schemeClr val="accent6">
+                <a:hueOff val="0"/>
+                <a:satOff val="0"/>
+                <a:lumOff val="0"/>
+                <a:alphaOff val="0"/>
+                <a:tint val="20000"/>
+                <a:satMod val="180000"/>
+                <a:lumMod val="98000"/>
+              </a:schemeClr>
+            </a:gs>
+            <a:gs pos="40000">
+              <a:schemeClr val="accent6">
+                <a:hueOff val="0"/>
+                <a:satOff val="0"/>
+                <a:lumOff val="0"/>
+                <a:alphaOff val="0"/>
+                <a:tint val="30000"/>
+                <a:satMod val="260000"/>
+                <a:lumMod val="84000"/>
+              </a:schemeClr>
+            </a:gs>
+            <a:gs pos="100000">
+              <a:schemeClr val="accent6">
+                <a:hueOff val="0"/>
+                <a:satOff val="0"/>
+                <a:lumOff val="0"/>
+                <a:alphaOff val="0"/>
+                <a:tint val="100000"/>
+                <a:satMod val="110000"/>
+                <a:lumMod val="100000"/>
+              </a:schemeClr>
+            </a:gs>
+          </a:gsLst>
+          <a:lin ang="5040000" scaled="1"/>
+        </a:gradFill>
+        <a:ln>
+          <a:noFill/>
+        </a:ln>
+        <a:effectLst/>
+        <a:scene3d>
+          <a:camera prst="orthographicFront"/>
+          <a:lightRig rig="flat" dir="t"/>
+        </a:scene3d>
+        <a:sp3d prstMaterial="dkEdge">
+          <a:bevelT w="8200" h="38100"/>
+        </a:sp3d>
+      </dsp:spPr>
+      <dsp:style>
+        <a:lnRef idx="0">
+          <a:scrgbClr r="0" g="0" b="0"/>
+        </a:lnRef>
+        <a:fillRef idx="2">
+          <a:scrgbClr r="0" g="0" b="0"/>
+        </a:fillRef>
+        <a:effectRef idx="1">
+          <a:scrgbClr r="0" g="0" b="0"/>
+        </a:effectRef>
+        <a:fontRef idx="minor">
+          <a:schemeClr val="dk1"/>
+        </a:fontRef>
+      </dsp:style>
+      <dsp:txBody>
+        <a:bodyPr spcFirstLastPara="0" vert="horz" wrap="square" lIns="57150" tIns="57150" rIns="57150" bIns="57150" numCol="1" spcCol="1270" anchor="ctr" anchorCtr="0">
+          <a:noAutofit/>
+        </a:bodyPr>
+        <a:lstStyle/>
+        <a:p>
+          <a:pPr lvl="0" algn="ctr" defTabSz="666750">
+            <a:lnSpc>
+              <a:spcPct val="90000"/>
+            </a:lnSpc>
+            <a:spcBef>
+              <a:spcPct val="0"/>
+            </a:spcBef>
+            <a:spcAft>
+              <a:spcPct val="35000"/>
+            </a:spcAft>
+          </a:pPr>
+          <a:r>
+            <a:rPr lang="es-AR" sz="1500" kern="1200" dirty="0" smtClean="0"/>
+            <a:t>PO (Orden de compra)</a:t>
+          </a:r>
+          <a:endParaRPr lang="es-AR" sz="1500" kern="1200" dirty="0"/>
+        </a:p>
+      </dsp:txBody>
+      <dsp:txXfrm>
+        <a:off x="4330580" y="290333"/>
+        <a:ext cx="1481766" cy="867469"/>
+      </dsp:txXfrm>
+    </dsp:sp>
+    <dsp:sp modelId="{0111F070-09B0-44AB-B420-56677F7966B9}">
+      <dsp:nvSpPr>
+        <dsp:cNvPr id="0" name=""/>
+        <dsp:cNvSpPr/>
+      </dsp:nvSpPr>
+      <dsp:spPr>
+        <a:xfrm>
+          <a:off x="5974480" y="533636"/>
+          <a:ext cx="325577" cy="380864"/>
+        </a:xfrm>
+        <a:prstGeom prst="rightArrow">
+          <a:avLst>
+            <a:gd name="adj1" fmla="val 60000"/>
+            <a:gd name="adj2" fmla="val 50000"/>
+          </a:avLst>
+        </a:prstGeom>
+        <a:gradFill rotWithShape="0">
+          <a:gsLst>
+            <a:gs pos="0">
+              <a:schemeClr val="accent6">
+                <a:tint val="60000"/>
+                <a:hueOff val="0"/>
+                <a:satOff val="0"/>
+                <a:lumOff val="0"/>
+                <a:alphaOff val="0"/>
+                <a:tint val="20000"/>
+                <a:satMod val="180000"/>
+                <a:lumMod val="98000"/>
+              </a:schemeClr>
+            </a:gs>
+            <a:gs pos="40000">
+              <a:schemeClr val="accent6">
+                <a:tint val="60000"/>
+                <a:hueOff val="0"/>
+                <a:satOff val="0"/>
+                <a:lumOff val="0"/>
+                <a:alphaOff val="0"/>
+                <a:tint val="30000"/>
+                <a:satMod val="260000"/>
+                <a:lumMod val="84000"/>
+              </a:schemeClr>
+            </a:gs>
+            <a:gs pos="100000">
+              <a:schemeClr val="accent6">
+                <a:tint val="60000"/>
+                <a:hueOff val="0"/>
+                <a:satOff val="0"/>
+                <a:lumOff val="0"/>
+                <a:alphaOff val="0"/>
+                <a:tint val="100000"/>
+                <a:satMod val="110000"/>
+                <a:lumMod val="100000"/>
+              </a:schemeClr>
+            </a:gs>
+          </a:gsLst>
+          <a:lin ang="5040000" scaled="1"/>
+        </a:gradFill>
+        <a:ln>
+          <a:noFill/>
+        </a:ln>
+        <a:effectLst/>
+      </dsp:spPr>
+      <dsp:style>
+        <a:lnRef idx="0">
+          <a:scrgbClr r="0" g="0" b="0"/>
+        </a:lnRef>
+        <a:fillRef idx="2">
+          <a:scrgbClr r="0" g="0" b="0"/>
+        </a:fillRef>
+        <a:effectRef idx="1">
+          <a:scrgbClr r="0" g="0" b="0"/>
+        </a:effectRef>
+        <a:fontRef idx="minor">
+          <a:schemeClr val="dk1"/>
+        </a:fontRef>
+      </dsp:style>
+      <dsp:txBody>
+        <a:bodyPr spcFirstLastPara="0" vert="horz" wrap="square" lIns="0" tIns="0" rIns="0" bIns="0" numCol="1" spcCol="1270" anchor="ctr" anchorCtr="0">
+          <a:noAutofit/>
+        </a:bodyPr>
+        <a:lstStyle/>
+        <a:p>
+          <a:pPr lvl="0" algn="ctr" defTabSz="533400">
+            <a:lnSpc>
+              <a:spcPct val="90000"/>
+            </a:lnSpc>
+            <a:spcBef>
+              <a:spcPct val="0"/>
+            </a:spcBef>
+            <a:spcAft>
+              <a:spcPct val="35000"/>
+            </a:spcAft>
+          </a:pPr>
+          <a:endParaRPr lang="es-AR" sz="1200" kern="1200"/>
+        </a:p>
+      </dsp:txBody>
+      <dsp:txXfrm>
+        <a:off x="5974480" y="609809"/>
+        <a:ext cx="227904" cy="228518"/>
+      </dsp:txXfrm>
+    </dsp:sp>
+    <dsp:sp modelId="{69574F30-2D61-4E9B-9957-68812FAD3007}">
+      <dsp:nvSpPr>
+        <dsp:cNvPr id="0" name=""/>
+        <dsp:cNvSpPr/>
+      </dsp:nvSpPr>
+      <dsp:spPr>
+        <a:xfrm>
+          <a:off x="6453632" y="263345"/>
+          <a:ext cx="1535742" cy="921445"/>
+        </a:xfrm>
+        <a:prstGeom prst="roundRect">
+          <a:avLst>
+            <a:gd name="adj" fmla="val 10000"/>
+          </a:avLst>
+        </a:prstGeom>
+        <a:gradFill rotWithShape="0">
+          <a:gsLst>
+            <a:gs pos="0">
+              <a:schemeClr val="accent6">
+                <a:hueOff val="0"/>
+                <a:satOff val="0"/>
+                <a:lumOff val="0"/>
+                <a:alphaOff val="0"/>
+                <a:tint val="20000"/>
+                <a:satMod val="180000"/>
+                <a:lumMod val="98000"/>
+              </a:schemeClr>
+            </a:gs>
+            <a:gs pos="40000">
+              <a:schemeClr val="accent6">
+                <a:hueOff val="0"/>
+                <a:satOff val="0"/>
+                <a:lumOff val="0"/>
+                <a:alphaOff val="0"/>
+                <a:tint val="30000"/>
+                <a:satMod val="260000"/>
+                <a:lumMod val="84000"/>
+              </a:schemeClr>
+            </a:gs>
+            <a:gs pos="100000">
+              <a:schemeClr val="accent6">
+                <a:hueOff val="0"/>
+                <a:satOff val="0"/>
+                <a:lumOff val="0"/>
+                <a:alphaOff val="0"/>
+                <a:tint val="100000"/>
+                <a:satMod val="110000"/>
+                <a:lumMod val="100000"/>
+              </a:schemeClr>
+            </a:gs>
+          </a:gsLst>
+          <a:lin ang="5040000" scaled="1"/>
+        </a:gradFill>
+        <a:ln>
+          <a:noFill/>
+        </a:ln>
+        <a:effectLst/>
+        <a:scene3d>
+          <a:camera prst="orthographicFront"/>
+          <a:lightRig rig="flat" dir="t"/>
+        </a:scene3d>
+        <a:sp3d prstMaterial="dkEdge">
+          <a:bevelT w="8200" h="38100"/>
+        </a:sp3d>
+      </dsp:spPr>
+      <dsp:style>
+        <a:lnRef idx="0">
+          <a:scrgbClr r="0" g="0" b="0"/>
+        </a:lnRef>
+        <a:fillRef idx="2">
+          <a:scrgbClr r="0" g="0" b="0"/>
+        </a:fillRef>
+        <a:effectRef idx="1">
+          <a:scrgbClr r="0" g="0" b="0"/>
+        </a:effectRef>
+        <a:fontRef idx="minor">
+          <a:schemeClr val="dk1"/>
+        </a:fontRef>
+      </dsp:style>
+      <dsp:txBody>
+        <a:bodyPr spcFirstLastPara="0" vert="horz" wrap="square" lIns="57150" tIns="57150" rIns="57150" bIns="57150" numCol="1" spcCol="1270" anchor="ctr" anchorCtr="0">
+          <a:noAutofit/>
+        </a:bodyPr>
+        <a:lstStyle/>
+        <a:p>
+          <a:pPr lvl="0" algn="ctr" defTabSz="666750">
+            <a:lnSpc>
+              <a:spcPct val="90000"/>
+            </a:lnSpc>
+            <a:spcBef>
+              <a:spcPct val="0"/>
+            </a:spcBef>
+            <a:spcAft>
+              <a:spcPct val="35000"/>
+            </a:spcAft>
+          </a:pPr>
+          <a:r>
+            <a:rPr lang="es-AR" sz="1500" kern="1200" dirty="0" smtClean="0"/>
+            <a:t>Documento de Ingeniería</a:t>
+          </a:r>
+          <a:endParaRPr lang="es-AR" sz="1500" kern="1200" dirty="0"/>
+        </a:p>
+      </dsp:txBody>
+      <dsp:txXfrm>
+        <a:off x="6480620" y="290333"/>
+        <a:ext cx="1481766" cy="867469"/>
+      </dsp:txXfrm>
+    </dsp:sp>
+    <dsp:sp modelId="{DC791235-75B4-4861-821D-75CBE75BCAF7}">
+      <dsp:nvSpPr>
+        <dsp:cNvPr id="0" name=""/>
+        <dsp:cNvSpPr/>
+      </dsp:nvSpPr>
+      <dsp:spPr>
+        <a:xfrm rot="5400000">
+          <a:off x="7058715" y="1292293"/>
+          <a:ext cx="325577" cy="380864"/>
+        </a:xfrm>
+        <a:prstGeom prst="rightArrow">
+          <a:avLst>
+            <a:gd name="adj1" fmla="val 60000"/>
+            <a:gd name="adj2" fmla="val 50000"/>
+          </a:avLst>
+        </a:prstGeom>
+        <a:gradFill rotWithShape="0">
+          <a:gsLst>
+            <a:gs pos="0">
+              <a:schemeClr val="accent6">
+                <a:tint val="60000"/>
+                <a:hueOff val="0"/>
+                <a:satOff val="0"/>
+                <a:lumOff val="0"/>
+                <a:alphaOff val="0"/>
+                <a:tint val="20000"/>
+                <a:satMod val="180000"/>
+                <a:lumMod val="98000"/>
+              </a:schemeClr>
+            </a:gs>
+            <a:gs pos="40000">
+              <a:schemeClr val="accent6">
+                <a:tint val="60000"/>
+                <a:hueOff val="0"/>
+                <a:satOff val="0"/>
+                <a:lumOff val="0"/>
+                <a:alphaOff val="0"/>
+                <a:tint val="30000"/>
+                <a:satMod val="260000"/>
+                <a:lumMod val="84000"/>
+              </a:schemeClr>
+            </a:gs>
+            <a:gs pos="100000">
+              <a:schemeClr val="accent6">
+                <a:tint val="60000"/>
+                <a:hueOff val="0"/>
+                <a:satOff val="0"/>
+                <a:lumOff val="0"/>
+                <a:alphaOff val="0"/>
+                <a:tint val="100000"/>
+                <a:satMod val="110000"/>
+                <a:lumMod val="100000"/>
+              </a:schemeClr>
+            </a:gs>
+          </a:gsLst>
+          <a:lin ang="5040000" scaled="1"/>
+        </a:gradFill>
+        <a:ln>
+          <a:noFill/>
+        </a:ln>
+        <a:effectLst/>
+      </dsp:spPr>
+      <dsp:style>
+        <a:lnRef idx="0">
+          <a:scrgbClr r="0" g="0" b="0"/>
+        </a:lnRef>
+        <a:fillRef idx="2">
+          <a:scrgbClr r="0" g="0" b="0"/>
+        </a:fillRef>
+        <a:effectRef idx="1">
+          <a:scrgbClr r="0" g="0" b="0"/>
+        </a:effectRef>
+        <a:fontRef idx="minor">
+          <a:schemeClr val="dk1"/>
+        </a:fontRef>
+      </dsp:style>
+      <dsp:txBody>
+        <a:bodyPr spcFirstLastPara="0" vert="horz" wrap="square" lIns="0" tIns="0" rIns="0" bIns="0" numCol="1" spcCol="1270" anchor="ctr" anchorCtr="0">
+          <a:noAutofit/>
+        </a:bodyPr>
+        <a:lstStyle/>
+        <a:p>
+          <a:pPr lvl="0" algn="ctr" defTabSz="533400">
+            <a:lnSpc>
+              <a:spcPct val="90000"/>
+            </a:lnSpc>
+            <a:spcBef>
+              <a:spcPct val="0"/>
+            </a:spcBef>
+            <a:spcAft>
+              <a:spcPct val="35000"/>
+            </a:spcAft>
+          </a:pPr>
+          <a:endParaRPr lang="es-AR" sz="1200" kern="1200"/>
+        </a:p>
+      </dsp:txBody>
+      <dsp:txXfrm rot="-5400000">
+        <a:off x="7107245" y="1319937"/>
+        <a:ext cx="228518" cy="227904"/>
+      </dsp:txXfrm>
+    </dsp:sp>
+    <dsp:sp modelId="{1D053020-6255-4EC1-B48E-D263909F37E0}">
+      <dsp:nvSpPr>
+        <dsp:cNvPr id="0" name=""/>
+        <dsp:cNvSpPr/>
+      </dsp:nvSpPr>
+      <dsp:spPr>
+        <a:xfrm>
+          <a:off x="6453632" y="1799088"/>
+          <a:ext cx="1535742" cy="921445"/>
+        </a:xfrm>
+        <a:prstGeom prst="roundRect">
+          <a:avLst>
+            <a:gd name="adj" fmla="val 10000"/>
+          </a:avLst>
+        </a:prstGeom>
+        <a:gradFill rotWithShape="0">
+          <a:gsLst>
+            <a:gs pos="0">
+              <a:schemeClr val="accent6">
+                <a:hueOff val="0"/>
+                <a:satOff val="0"/>
+                <a:lumOff val="0"/>
+                <a:alphaOff val="0"/>
+                <a:tint val="20000"/>
+                <a:satMod val="180000"/>
+                <a:lumMod val="98000"/>
+              </a:schemeClr>
+            </a:gs>
+            <a:gs pos="40000">
+              <a:schemeClr val="accent6">
+                <a:hueOff val="0"/>
+                <a:satOff val="0"/>
+                <a:lumOff val="0"/>
+                <a:alphaOff val="0"/>
+                <a:tint val="30000"/>
+                <a:satMod val="260000"/>
+                <a:lumMod val="84000"/>
+              </a:schemeClr>
+            </a:gs>
+            <a:gs pos="100000">
+              <a:schemeClr val="accent6">
+                <a:hueOff val="0"/>
+                <a:satOff val="0"/>
+                <a:lumOff val="0"/>
+                <a:alphaOff val="0"/>
+                <a:tint val="100000"/>
+                <a:satMod val="110000"/>
+                <a:lumMod val="100000"/>
+              </a:schemeClr>
+            </a:gs>
+          </a:gsLst>
+          <a:lin ang="5040000" scaled="1"/>
+        </a:gradFill>
+        <a:ln>
+          <a:noFill/>
+        </a:ln>
+        <a:effectLst/>
+        <a:scene3d>
+          <a:camera prst="orthographicFront"/>
+          <a:lightRig rig="flat" dir="t"/>
+        </a:scene3d>
+        <a:sp3d prstMaterial="dkEdge">
+          <a:bevelT w="8200" h="38100"/>
+        </a:sp3d>
+      </dsp:spPr>
+      <dsp:style>
+        <a:lnRef idx="0">
+          <a:scrgbClr r="0" g="0" b="0"/>
+        </a:lnRef>
+        <a:fillRef idx="2">
+          <a:scrgbClr r="0" g="0" b="0"/>
+        </a:fillRef>
+        <a:effectRef idx="1">
+          <a:scrgbClr r="0" g="0" b="0"/>
+        </a:effectRef>
+        <a:fontRef idx="minor">
+          <a:schemeClr val="dk1"/>
+        </a:fontRef>
+      </dsp:style>
+      <dsp:txBody>
+        <a:bodyPr spcFirstLastPara="0" vert="horz" wrap="square" lIns="57150" tIns="57150" rIns="57150" bIns="57150" numCol="1" spcCol="1270" anchor="ctr" anchorCtr="0">
+          <a:noAutofit/>
+        </a:bodyPr>
+        <a:lstStyle/>
+        <a:p>
+          <a:pPr lvl="0" algn="ctr" defTabSz="666750">
+            <a:lnSpc>
+              <a:spcPct val="90000"/>
+            </a:lnSpc>
+            <a:spcBef>
+              <a:spcPct val="0"/>
+            </a:spcBef>
+            <a:spcAft>
+              <a:spcPct val="35000"/>
+            </a:spcAft>
+          </a:pPr>
+          <a:r>
+            <a:rPr lang="es-AR" sz="1500" kern="1200" dirty="0" smtClean="0"/>
+            <a:t>Asignación de trabajo Cuadrilla</a:t>
+          </a:r>
+          <a:endParaRPr lang="es-AR" sz="1500" kern="1200" dirty="0"/>
+        </a:p>
+      </dsp:txBody>
+      <dsp:txXfrm>
+        <a:off x="6480620" y="1826076"/>
+        <a:ext cx="1481766" cy="867469"/>
+      </dsp:txXfrm>
+    </dsp:sp>
+    <dsp:sp modelId="{2641E811-5A6F-428C-B1C8-8F281D6685B6}">
+      <dsp:nvSpPr>
+        <dsp:cNvPr id="0" name=""/>
+        <dsp:cNvSpPr/>
+      </dsp:nvSpPr>
+      <dsp:spPr>
+        <a:xfrm rot="10800000">
+          <a:off x="5992909" y="2069379"/>
+          <a:ext cx="325577" cy="380864"/>
+        </a:xfrm>
+        <a:prstGeom prst="rightArrow">
+          <a:avLst>
+            <a:gd name="adj1" fmla="val 60000"/>
+            <a:gd name="adj2" fmla="val 50000"/>
+          </a:avLst>
+        </a:prstGeom>
+        <a:gradFill rotWithShape="0">
+          <a:gsLst>
+            <a:gs pos="0">
+              <a:schemeClr val="accent6">
+                <a:tint val="60000"/>
+                <a:hueOff val="0"/>
+                <a:satOff val="0"/>
+                <a:lumOff val="0"/>
+                <a:alphaOff val="0"/>
+                <a:tint val="20000"/>
+                <a:satMod val="180000"/>
+                <a:lumMod val="98000"/>
+              </a:schemeClr>
+            </a:gs>
+            <a:gs pos="40000">
+              <a:schemeClr val="accent6">
+                <a:tint val="60000"/>
+                <a:hueOff val="0"/>
+                <a:satOff val="0"/>
+                <a:lumOff val="0"/>
+                <a:alphaOff val="0"/>
+                <a:tint val="30000"/>
+                <a:satMod val="260000"/>
+                <a:lumMod val="84000"/>
+              </a:schemeClr>
+            </a:gs>
+            <a:gs pos="100000">
+              <a:schemeClr val="accent6">
+                <a:tint val="60000"/>
+                <a:hueOff val="0"/>
+                <a:satOff val="0"/>
+                <a:lumOff val="0"/>
+                <a:alphaOff val="0"/>
+                <a:tint val="100000"/>
+                <a:satMod val="110000"/>
+                <a:lumMod val="100000"/>
+              </a:schemeClr>
+            </a:gs>
+          </a:gsLst>
+          <a:lin ang="5040000" scaled="1"/>
+        </a:gradFill>
+        <a:ln>
+          <a:noFill/>
+        </a:ln>
+        <a:effectLst/>
+      </dsp:spPr>
+      <dsp:style>
+        <a:lnRef idx="0">
+          <a:scrgbClr r="0" g="0" b="0"/>
+        </a:lnRef>
+        <a:fillRef idx="2">
+          <a:scrgbClr r="0" g="0" b="0"/>
+        </a:fillRef>
+        <a:effectRef idx="1">
+          <a:scrgbClr r="0" g="0" b="0"/>
+        </a:effectRef>
+        <a:fontRef idx="minor">
+          <a:schemeClr val="dk1"/>
+        </a:fontRef>
+      </dsp:style>
+      <dsp:txBody>
+        <a:bodyPr spcFirstLastPara="0" vert="horz" wrap="square" lIns="0" tIns="0" rIns="0" bIns="0" numCol="1" spcCol="1270" anchor="ctr" anchorCtr="0">
+          <a:noAutofit/>
+        </a:bodyPr>
+        <a:lstStyle/>
+        <a:p>
+          <a:pPr lvl="0" algn="ctr" defTabSz="533400">
+            <a:lnSpc>
+              <a:spcPct val="90000"/>
+            </a:lnSpc>
+            <a:spcBef>
+              <a:spcPct val="0"/>
+            </a:spcBef>
+            <a:spcAft>
+              <a:spcPct val="35000"/>
+            </a:spcAft>
+          </a:pPr>
+          <a:endParaRPr lang="es-AR" sz="1200" kern="1200"/>
+        </a:p>
+      </dsp:txBody>
+      <dsp:txXfrm rot="10800000">
+        <a:off x="6090582" y="2145552"/>
+        <a:ext cx="227904" cy="228518"/>
+      </dsp:txXfrm>
+    </dsp:sp>
+    <dsp:sp modelId="{E18B533A-C6D3-4CCA-A75B-075F2FE99905}">
+      <dsp:nvSpPr>
+        <dsp:cNvPr id="0" name=""/>
+        <dsp:cNvSpPr/>
+      </dsp:nvSpPr>
+      <dsp:spPr>
+        <a:xfrm>
+          <a:off x="4303592" y="1799088"/>
+          <a:ext cx="1535742" cy="921445"/>
+        </a:xfrm>
+        <a:prstGeom prst="roundRect">
+          <a:avLst>
+            <a:gd name="adj" fmla="val 10000"/>
+          </a:avLst>
+        </a:prstGeom>
+        <a:gradFill rotWithShape="0">
+          <a:gsLst>
+            <a:gs pos="0">
+              <a:schemeClr val="accent6">
+                <a:hueOff val="0"/>
+                <a:satOff val="0"/>
+                <a:lumOff val="0"/>
+                <a:alphaOff val="0"/>
+                <a:tint val="20000"/>
+                <a:satMod val="180000"/>
+                <a:lumMod val="98000"/>
+              </a:schemeClr>
+            </a:gs>
+            <a:gs pos="40000">
+              <a:schemeClr val="accent6">
+                <a:hueOff val="0"/>
+                <a:satOff val="0"/>
+                <a:lumOff val="0"/>
+                <a:alphaOff val="0"/>
+                <a:tint val="30000"/>
+                <a:satMod val="260000"/>
+                <a:lumMod val="84000"/>
+              </a:schemeClr>
+            </a:gs>
+            <a:gs pos="100000">
+              <a:schemeClr val="accent6">
+                <a:hueOff val="0"/>
+                <a:satOff val="0"/>
+                <a:lumOff val="0"/>
+                <a:alphaOff val="0"/>
+                <a:tint val="100000"/>
+                <a:satMod val="110000"/>
+                <a:lumMod val="100000"/>
+              </a:schemeClr>
+            </a:gs>
+          </a:gsLst>
+          <a:lin ang="5040000" scaled="1"/>
+        </a:gradFill>
+        <a:ln>
+          <a:noFill/>
+        </a:ln>
+        <a:effectLst/>
+        <a:scene3d>
+          <a:camera prst="orthographicFront"/>
+          <a:lightRig rig="flat" dir="t"/>
+        </a:scene3d>
+        <a:sp3d prstMaterial="dkEdge">
+          <a:bevelT w="8200" h="38100"/>
+        </a:sp3d>
+      </dsp:spPr>
+      <dsp:style>
+        <a:lnRef idx="0">
+          <a:scrgbClr r="0" g="0" b="0"/>
+        </a:lnRef>
+        <a:fillRef idx="2">
+          <a:scrgbClr r="0" g="0" b="0"/>
+        </a:fillRef>
+        <a:effectRef idx="1">
+          <a:scrgbClr r="0" g="0" b="0"/>
+        </a:effectRef>
+        <a:fontRef idx="minor">
+          <a:schemeClr val="dk1"/>
+        </a:fontRef>
+      </dsp:style>
+      <dsp:txBody>
+        <a:bodyPr spcFirstLastPara="0" vert="horz" wrap="square" lIns="57150" tIns="57150" rIns="57150" bIns="57150" numCol="1" spcCol="1270" anchor="ctr" anchorCtr="0">
+          <a:noAutofit/>
+        </a:bodyPr>
+        <a:lstStyle/>
+        <a:p>
+          <a:pPr lvl="0" algn="ctr" defTabSz="666750">
+            <a:lnSpc>
+              <a:spcPct val="90000"/>
+            </a:lnSpc>
+            <a:spcBef>
+              <a:spcPct val="0"/>
+            </a:spcBef>
+            <a:spcAft>
+              <a:spcPct val="35000"/>
+            </a:spcAft>
+          </a:pPr>
+          <a:r>
+            <a:rPr lang="es-AR" sz="1500" kern="1200" dirty="0" smtClean="0"/>
+            <a:t>Trabajo en sitio</a:t>
+          </a:r>
+          <a:endParaRPr lang="es-AR" sz="1500" kern="1200" dirty="0"/>
+        </a:p>
+      </dsp:txBody>
+      <dsp:txXfrm>
+        <a:off x="4330580" y="1826076"/>
+        <a:ext cx="1481766" cy="867469"/>
+      </dsp:txXfrm>
+    </dsp:sp>
+    <dsp:sp modelId="{C4945E92-62A5-4028-985B-044CB1801FC6}">
+      <dsp:nvSpPr>
+        <dsp:cNvPr id="0" name=""/>
+        <dsp:cNvSpPr/>
+      </dsp:nvSpPr>
+      <dsp:spPr>
+        <a:xfrm rot="10800000">
+          <a:off x="3842869" y="2069379"/>
+          <a:ext cx="325577" cy="380864"/>
+        </a:xfrm>
+        <a:prstGeom prst="rightArrow">
+          <a:avLst>
+            <a:gd name="adj1" fmla="val 60000"/>
+            <a:gd name="adj2" fmla="val 50000"/>
+          </a:avLst>
+        </a:prstGeom>
+        <a:gradFill rotWithShape="0">
+          <a:gsLst>
+            <a:gs pos="0">
+              <a:schemeClr val="accent6">
+                <a:tint val="60000"/>
+                <a:hueOff val="0"/>
+                <a:satOff val="0"/>
+                <a:lumOff val="0"/>
+                <a:alphaOff val="0"/>
+                <a:tint val="20000"/>
+                <a:satMod val="180000"/>
+                <a:lumMod val="98000"/>
+              </a:schemeClr>
+            </a:gs>
+            <a:gs pos="40000">
+              <a:schemeClr val="accent6">
+                <a:tint val="60000"/>
+                <a:hueOff val="0"/>
+                <a:satOff val="0"/>
+                <a:lumOff val="0"/>
+                <a:alphaOff val="0"/>
+                <a:tint val="30000"/>
+                <a:satMod val="260000"/>
+                <a:lumMod val="84000"/>
+              </a:schemeClr>
+            </a:gs>
+            <a:gs pos="100000">
+              <a:schemeClr val="accent6">
+                <a:tint val="60000"/>
+                <a:hueOff val="0"/>
+                <a:satOff val="0"/>
+                <a:lumOff val="0"/>
+                <a:alphaOff val="0"/>
+                <a:tint val="100000"/>
+                <a:satMod val="110000"/>
+                <a:lumMod val="100000"/>
+              </a:schemeClr>
+            </a:gs>
+          </a:gsLst>
+          <a:lin ang="5040000" scaled="1"/>
+        </a:gradFill>
+        <a:ln>
+          <a:noFill/>
+        </a:ln>
+        <a:effectLst/>
+      </dsp:spPr>
+      <dsp:style>
+        <a:lnRef idx="0">
+          <a:scrgbClr r="0" g="0" b="0"/>
+        </a:lnRef>
+        <a:fillRef idx="2">
+          <a:scrgbClr r="0" g="0" b="0"/>
+        </a:fillRef>
+        <a:effectRef idx="1">
+          <a:scrgbClr r="0" g="0" b="0"/>
+        </a:effectRef>
+        <a:fontRef idx="minor">
+          <a:schemeClr val="dk1"/>
+        </a:fontRef>
+      </dsp:style>
+      <dsp:txBody>
+        <a:bodyPr spcFirstLastPara="0" vert="horz" wrap="square" lIns="0" tIns="0" rIns="0" bIns="0" numCol="1" spcCol="1270" anchor="ctr" anchorCtr="0">
+          <a:noAutofit/>
+        </a:bodyPr>
+        <a:lstStyle/>
+        <a:p>
+          <a:pPr lvl="0" algn="ctr" defTabSz="533400">
+            <a:lnSpc>
+              <a:spcPct val="90000"/>
+            </a:lnSpc>
+            <a:spcBef>
+              <a:spcPct val="0"/>
+            </a:spcBef>
+            <a:spcAft>
+              <a:spcPct val="35000"/>
+            </a:spcAft>
+          </a:pPr>
+          <a:endParaRPr lang="es-AR" sz="1200" kern="1200"/>
+        </a:p>
+      </dsp:txBody>
+      <dsp:txXfrm rot="10800000">
+        <a:off x="3940542" y="2145552"/>
+        <a:ext cx="227904" cy="228518"/>
+      </dsp:txXfrm>
+    </dsp:sp>
+    <dsp:sp modelId="{269AD2C7-2C78-48F1-9B02-4BA8B897BB5C}">
+      <dsp:nvSpPr>
+        <dsp:cNvPr id="0" name=""/>
+        <dsp:cNvSpPr/>
+      </dsp:nvSpPr>
+      <dsp:spPr>
+        <a:xfrm>
+          <a:off x="2153552" y="1799088"/>
+          <a:ext cx="1535742" cy="921445"/>
+        </a:xfrm>
+        <a:prstGeom prst="roundRect">
+          <a:avLst>
+            <a:gd name="adj" fmla="val 10000"/>
+          </a:avLst>
+        </a:prstGeom>
+        <a:gradFill rotWithShape="0">
+          <a:gsLst>
+            <a:gs pos="0">
+              <a:schemeClr val="accent6">
+                <a:hueOff val="0"/>
+                <a:satOff val="0"/>
+                <a:lumOff val="0"/>
+                <a:alphaOff val="0"/>
+                <a:tint val="20000"/>
+                <a:satMod val="180000"/>
+                <a:lumMod val="98000"/>
+              </a:schemeClr>
+            </a:gs>
+            <a:gs pos="40000">
+              <a:schemeClr val="accent6">
+                <a:hueOff val="0"/>
+                <a:satOff val="0"/>
+                <a:lumOff val="0"/>
+                <a:alphaOff val="0"/>
+                <a:tint val="30000"/>
+                <a:satMod val="260000"/>
+                <a:lumMod val="84000"/>
+              </a:schemeClr>
+            </a:gs>
+            <a:gs pos="100000">
+              <a:schemeClr val="accent6">
+                <a:hueOff val="0"/>
+                <a:satOff val="0"/>
+                <a:lumOff val="0"/>
+                <a:alphaOff val="0"/>
+                <a:tint val="100000"/>
+                <a:satMod val="110000"/>
+                <a:lumMod val="100000"/>
+              </a:schemeClr>
+            </a:gs>
+          </a:gsLst>
+          <a:lin ang="5040000" scaled="1"/>
+        </a:gradFill>
+        <a:ln>
+          <a:noFill/>
+        </a:ln>
+        <a:effectLst/>
+        <a:scene3d>
+          <a:camera prst="orthographicFront"/>
+          <a:lightRig rig="flat" dir="t"/>
+        </a:scene3d>
+        <a:sp3d prstMaterial="dkEdge">
+          <a:bevelT w="8200" h="38100"/>
+        </a:sp3d>
+      </dsp:spPr>
+      <dsp:style>
+        <a:lnRef idx="0">
+          <a:scrgbClr r="0" g="0" b="0"/>
+        </a:lnRef>
+        <a:fillRef idx="2">
+          <a:scrgbClr r="0" g="0" b="0"/>
+        </a:fillRef>
+        <a:effectRef idx="1">
+          <a:scrgbClr r="0" g="0" b="0"/>
+        </a:effectRef>
+        <a:fontRef idx="minor">
+          <a:schemeClr val="dk1"/>
+        </a:fontRef>
+      </dsp:style>
+      <dsp:txBody>
+        <a:bodyPr spcFirstLastPara="0" vert="horz" wrap="square" lIns="57150" tIns="57150" rIns="57150" bIns="57150" numCol="1" spcCol="1270" anchor="ctr" anchorCtr="0">
+          <a:noAutofit/>
+        </a:bodyPr>
+        <a:lstStyle/>
+        <a:p>
+          <a:pPr lvl="0" algn="ctr" defTabSz="666750">
+            <a:lnSpc>
+              <a:spcPct val="90000"/>
+            </a:lnSpc>
+            <a:spcBef>
+              <a:spcPct val="0"/>
+            </a:spcBef>
+            <a:spcAft>
+              <a:spcPct val="35000"/>
+            </a:spcAft>
+          </a:pPr>
+          <a:r>
+            <a:rPr lang="es-AR" sz="1500" kern="1200" dirty="0" smtClean="0"/>
+            <a:t>Relevamiento tareas realizadas.</a:t>
+          </a:r>
+          <a:endParaRPr lang="es-AR" sz="1500" kern="1200" dirty="0"/>
+        </a:p>
+      </dsp:txBody>
+      <dsp:txXfrm>
+        <a:off x="2180540" y="1826076"/>
+        <a:ext cx="1481766" cy="867469"/>
+      </dsp:txXfrm>
+    </dsp:sp>
+    <dsp:sp modelId="{EEB151B0-951F-4102-A9AB-025AADD2ACCB}">
+      <dsp:nvSpPr>
+        <dsp:cNvPr id="0" name=""/>
+        <dsp:cNvSpPr/>
+      </dsp:nvSpPr>
+      <dsp:spPr>
+        <a:xfrm rot="10800000">
+          <a:off x="1692829" y="2069379"/>
+          <a:ext cx="325577" cy="380864"/>
+        </a:xfrm>
+        <a:prstGeom prst="rightArrow">
+          <a:avLst>
+            <a:gd name="adj1" fmla="val 60000"/>
+            <a:gd name="adj2" fmla="val 50000"/>
+          </a:avLst>
+        </a:prstGeom>
+        <a:gradFill rotWithShape="0">
+          <a:gsLst>
+            <a:gs pos="0">
+              <a:schemeClr val="accent6">
+                <a:tint val="60000"/>
+                <a:hueOff val="0"/>
+                <a:satOff val="0"/>
+                <a:lumOff val="0"/>
+                <a:alphaOff val="0"/>
+                <a:tint val="20000"/>
+                <a:satMod val="180000"/>
+                <a:lumMod val="98000"/>
+              </a:schemeClr>
+            </a:gs>
+            <a:gs pos="40000">
+              <a:schemeClr val="accent6">
+                <a:tint val="60000"/>
+                <a:hueOff val="0"/>
+                <a:satOff val="0"/>
+                <a:lumOff val="0"/>
+                <a:alphaOff val="0"/>
+                <a:tint val="30000"/>
+                <a:satMod val="260000"/>
+                <a:lumMod val="84000"/>
+              </a:schemeClr>
+            </a:gs>
+            <a:gs pos="100000">
+              <a:schemeClr val="accent6">
+                <a:tint val="60000"/>
+                <a:hueOff val="0"/>
+                <a:satOff val="0"/>
+                <a:lumOff val="0"/>
+                <a:alphaOff val="0"/>
+                <a:tint val="100000"/>
+                <a:satMod val="110000"/>
+                <a:lumMod val="100000"/>
+              </a:schemeClr>
+            </a:gs>
+          </a:gsLst>
+          <a:lin ang="5040000" scaled="1"/>
+        </a:gradFill>
+        <a:ln>
+          <a:noFill/>
+        </a:ln>
+        <a:effectLst/>
+      </dsp:spPr>
+      <dsp:style>
+        <a:lnRef idx="0">
+          <a:scrgbClr r="0" g="0" b="0"/>
+        </a:lnRef>
+        <a:fillRef idx="2">
+          <a:scrgbClr r="0" g="0" b="0"/>
+        </a:fillRef>
+        <a:effectRef idx="1">
+          <a:scrgbClr r="0" g="0" b="0"/>
+        </a:effectRef>
+        <a:fontRef idx="minor">
+          <a:schemeClr val="dk1"/>
+        </a:fontRef>
+      </dsp:style>
+      <dsp:txBody>
+        <a:bodyPr spcFirstLastPara="0" vert="horz" wrap="square" lIns="0" tIns="0" rIns="0" bIns="0" numCol="1" spcCol="1270" anchor="ctr" anchorCtr="0">
+          <a:noAutofit/>
+        </a:bodyPr>
+        <a:lstStyle/>
+        <a:p>
+          <a:pPr lvl="0" algn="ctr" defTabSz="533400">
+            <a:lnSpc>
+              <a:spcPct val="90000"/>
+            </a:lnSpc>
+            <a:spcBef>
+              <a:spcPct val="0"/>
+            </a:spcBef>
+            <a:spcAft>
+              <a:spcPct val="35000"/>
+            </a:spcAft>
+          </a:pPr>
+          <a:endParaRPr lang="es-AR" sz="1200" kern="1200"/>
+        </a:p>
+      </dsp:txBody>
+      <dsp:txXfrm rot="10800000">
+        <a:off x="1790502" y="2145552"/>
+        <a:ext cx="227904" cy="228518"/>
+      </dsp:txXfrm>
+    </dsp:sp>
+    <dsp:sp modelId="{950A0EE2-E9AF-413D-B3AB-B2BE9BF30743}">
+      <dsp:nvSpPr>
+        <dsp:cNvPr id="0" name=""/>
+        <dsp:cNvSpPr/>
+      </dsp:nvSpPr>
+      <dsp:spPr>
+        <a:xfrm>
+          <a:off x="3512" y="1799088"/>
+          <a:ext cx="1535742" cy="921445"/>
+        </a:xfrm>
+        <a:prstGeom prst="roundRect">
+          <a:avLst>
+            <a:gd name="adj" fmla="val 10000"/>
+          </a:avLst>
+        </a:prstGeom>
+        <a:gradFill rotWithShape="0">
+          <a:gsLst>
+            <a:gs pos="0">
+              <a:schemeClr val="accent6">
+                <a:hueOff val="0"/>
+                <a:satOff val="0"/>
+                <a:lumOff val="0"/>
+                <a:alphaOff val="0"/>
+                <a:tint val="20000"/>
+                <a:satMod val="180000"/>
+                <a:lumMod val="98000"/>
+              </a:schemeClr>
+            </a:gs>
+            <a:gs pos="40000">
+              <a:schemeClr val="accent6">
+                <a:hueOff val="0"/>
+                <a:satOff val="0"/>
+                <a:lumOff val="0"/>
+                <a:alphaOff val="0"/>
+                <a:tint val="30000"/>
+                <a:satMod val="260000"/>
+                <a:lumMod val="84000"/>
+              </a:schemeClr>
+            </a:gs>
+            <a:gs pos="100000">
+              <a:schemeClr val="accent6">
+                <a:hueOff val="0"/>
+                <a:satOff val="0"/>
+                <a:lumOff val="0"/>
+                <a:alphaOff val="0"/>
+                <a:tint val="100000"/>
+                <a:satMod val="110000"/>
+                <a:lumMod val="100000"/>
+              </a:schemeClr>
+            </a:gs>
+          </a:gsLst>
+          <a:lin ang="5040000" scaled="1"/>
+        </a:gradFill>
+        <a:ln>
+          <a:noFill/>
+        </a:ln>
+        <a:effectLst/>
+        <a:scene3d>
+          <a:camera prst="orthographicFront"/>
+          <a:lightRig rig="flat" dir="t"/>
+        </a:scene3d>
+        <a:sp3d prstMaterial="dkEdge">
+          <a:bevelT w="8200" h="38100"/>
+        </a:sp3d>
+      </dsp:spPr>
+      <dsp:style>
+        <a:lnRef idx="0">
+          <a:scrgbClr r="0" g="0" b="0"/>
+        </a:lnRef>
+        <a:fillRef idx="2">
+          <a:scrgbClr r="0" g="0" b="0"/>
+        </a:fillRef>
+        <a:effectRef idx="1">
+          <a:scrgbClr r="0" g="0" b="0"/>
+        </a:effectRef>
+        <a:fontRef idx="minor">
+          <a:schemeClr val="dk1"/>
+        </a:fontRef>
+      </dsp:style>
+      <dsp:txBody>
+        <a:bodyPr spcFirstLastPara="0" vert="horz" wrap="square" lIns="57150" tIns="57150" rIns="57150" bIns="57150" numCol="1" spcCol="1270" anchor="ctr" anchorCtr="0">
+          <a:noAutofit/>
+        </a:bodyPr>
+        <a:lstStyle/>
+        <a:p>
+          <a:pPr lvl="0" algn="ctr" defTabSz="666750">
+            <a:lnSpc>
+              <a:spcPct val="90000"/>
+            </a:lnSpc>
+            <a:spcBef>
+              <a:spcPct val="0"/>
+            </a:spcBef>
+            <a:spcAft>
+              <a:spcPct val="35000"/>
+            </a:spcAft>
+          </a:pPr>
+          <a:r>
+            <a:rPr lang="es-AR" sz="1500" kern="1200" dirty="0" smtClean="0"/>
+            <a:t> Generación de CAO (Conforme de Obra).</a:t>
+          </a:r>
+          <a:endParaRPr lang="es-AR" sz="1500" kern="1200" dirty="0"/>
+        </a:p>
+      </dsp:txBody>
+      <dsp:txXfrm>
+        <a:off x="30500" y="1826076"/>
+        <a:ext cx="1481766" cy="867469"/>
+      </dsp:txXfrm>
+    </dsp:sp>
   </dsp:spTree>
 </dsp:drawing>
 </file>
@@ -6944,7 +9398,7 @@
             <a:fld id="{673BB177-0FC6-4C22-B343-101DA27743F5}" type="slidenum">
               <a:rPr lang="en-US" smtClean="0"/>
               <a:pPr/>
-              <a:t>‹Nº›</a:t>
+              <a:t>‹#›</a:t>
             </a:fld>
             <a:endParaRPr lang="en-US"/>
           </a:p>
@@ -6953,7 +9407,7 @@
     </p:spTree>
     <p:extLst>
       <p:ext uri="{BB962C8B-B14F-4D97-AF65-F5344CB8AC3E}">
-        <p14:creationId xmlns:p14="http://schemas.microsoft.com/office/powerpoint/2010/main" xmlns="" val="1341522809"/>
+        <p14:creationId xmlns:p14="http://schemas.microsoft.com/office/powerpoint/2010/main" val="1341522809"/>
       </p:ext>
     </p:extLst>
   </p:cSld>
@@ -7306,7 +9760,7 @@
     </p:spTree>
     <p:extLst>
       <p:ext uri="{BB962C8B-B14F-4D97-AF65-F5344CB8AC3E}">
-        <p14:creationId xmlns:p14="http://schemas.microsoft.com/office/powerpoint/2010/main" xmlns="" val="1344049021"/>
+        <p14:creationId xmlns:p14="http://schemas.microsoft.com/office/powerpoint/2010/main" val="1344049021"/>
       </p:ext>
     </p:extLst>
   </p:cSld>
@@ -10191,7 +12645,7 @@
             <a:fld id="{DCCC8732-F178-4423-B0C1-D52A699E8877}" type="slidenum">
               <a:rPr lang="en-US" smtClean="0"/>
               <a:pPr/>
-              <a:t>‹Nº›</a:t>
+              <a:t>‹#›</a:t>
             </a:fld>
             <a:endParaRPr lang="en-US"/>
           </a:p>
@@ -10404,7 +12858,7 @@
             <a:fld id="{DCCC8732-F178-4423-B0C1-D52A699E8877}" type="slidenum">
               <a:rPr lang="en-US" smtClean="0"/>
               <a:pPr/>
-              <a:t>‹Nº›</a:t>
+              <a:t>‹#›</a:t>
             </a:fld>
             <a:endParaRPr lang="en-US"/>
           </a:p>
@@ -10581,7 +13035,7 @@
             <a:fld id="{DCCC8732-F178-4423-B0C1-D52A699E8877}" type="slidenum">
               <a:rPr lang="en-US" smtClean="0"/>
               <a:pPr/>
-              <a:t>‹Nº›</a:t>
+              <a:t>‹#›</a:t>
             </a:fld>
             <a:endParaRPr lang="en-US"/>
           </a:p>
@@ -10748,7 +13202,7 @@
             <a:fld id="{DCCC8732-F178-4423-B0C1-D52A699E8877}" type="slidenum">
               <a:rPr lang="en-US" smtClean="0"/>
               <a:pPr/>
-              <a:t>‹Nº›</a:t>
+              <a:t>‹#›</a:t>
             </a:fld>
             <a:endParaRPr lang="en-US"/>
           </a:p>
@@ -10991,7 +13445,7 @@
             <a:fld id="{DCCC8732-F178-4423-B0C1-D52A699E8877}" type="slidenum">
               <a:rPr lang="en-US" smtClean="0"/>
               <a:pPr/>
-              <a:t>‹Nº›</a:t>
+              <a:t>‹#›</a:t>
             </a:fld>
             <a:endParaRPr lang="en-US"/>
           </a:p>
@@ -11106,7 +13560,7 @@
             <a:fld id="{DCCC8732-F178-4423-B0C1-D52A699E8877}" type="slidenum">
               <a:rPr lang="en-US" smtClean="0"/>
               <a:pPr/>
-              <a:t>‹Nº›</a:t>
+              <a:t>‹#›</a:t>
             </a:fld>
             <a:endParaRPr lang="en-US"/>
           </a:p>
@@ -11647,7 +14101,7 @@
             <a:fld id="{DCCC8732-F178-4423-B0C1-D52A699E8877}" type="slidenum">
               <a:rPr lang="en-US" smtClean="0"/>
               <a:pPr/>
-              <a:t>‹Nº›</a:t>
+              <a:t>‹#›</a:t>
             </a:fld>
             <a:endParaRPr lang="en-US"/>
           </a:p>
@@ -11762,7 +14216,7 @@
             <a:fld id="{DCCC8732-F178-4423-B0C1-D52A699E8877}" type="slidenum">
               <a:rPr lang="en-US" smtClean="0"/>
               <a:pPr/>
-              <a:t>‹Nº›</a:t>
+              <a:t>‹#›</a:t>
             </a:fld>
             <a:endParaRPr lang="en-US"/>
           </a:p>
@@ -11854,7 +14308,7 @@
             <a:fld id="{DCCC8732-F178-4423-B0C1-D52A699E8877}" type="slidenum">
               <a:rPr lang="en-US" smtClean="0"/>
               <a:pPr/>
-              <a:t>‹Nº›</a:t>
+              <a:t>‹#›</a:t>
             </a:fld>
             <a:endParaRPr lang="en-US"/>
           </a:p>
@@ -14488,7 +16942,7 @@
             <a:fld id="{DCCC8732-F178-4423-B0C1-D52A699E8877}" type="slidenum">
               <a:rPr lang="en-US" smtClean="0"/>
               <a:pPr/>
-              <a:t>‹Nº›</a:t>
+              <a:t>‹#›</a:t>
             </a:fld>
             <a:endParaRPr lang="en-US"/>
           </a:p>
@@ -17728,7 +20182,7 @@
             <a:fld id="{DCCC8732-F178-4423-B0C1-D52A699E8877}" type="slidenum">
               <a:rPr lang="en-US" smtClean="0"/>
               <a:pPr/>
-              <a:t>‹Nº›</a:t>
+              <a:t>‹#›</a:t>
             </a:fld>
             <a:endParaRPr lang="en-US"/>
           </a:p>
@@ -20577,7 +23031,7 @@
             <a:fld id="{DCCC8732-F178-4423-B0C1-D52A699E8877}" type="slidenum">
               <a:rPr lang="en-US" smtClean="0"/>
               <a:pPr/>
-              <a:t>‹Nº›</a:t>
+              <a:t>‹#›</a:t>
             </a:fld>
             <a:endParaRPr lang="en-US"/>
           </a:p>
@@ -21137,7 +23591,7 @@
           <a:noFill/>
           <a:extLst>
             <a:ext uri="{909E8E84-426E-40DD-AFC4-6F175D3DCCD1}">
-              <a14:hiddenFill xmlns:a14="http://schemas.microsoft.com/office/drawing/2010/main" xmlns="">
+              <a14:hiddenFill xmlns:a14="http://schemas.microsoft.com/office/drawing/2010/main">
                 <a:solidFill>
                   <a:srgbClr val="FFFFFF"/>
                 </a:solidFill>
@@ -21169,7 +23623,7 @@
           <a:blip r:embed="rId2" cstate="print">
             <a:extLst>
               <a:ext uri="{28A0092B-C50C-407E-A947-70E740481C1C}">
-                <a14:useLocalDpi xmlns:a14="http://schemas.microsoft.com/office/drawing/2010/main" xmlns="" val="0"/>
+                <a14:useLocalDpi xmlns:a14="http://schemas.microsoft.com/office/drawing/2010/main" val="0"/>
               </a:ext>
             </a:extLst>
           </a:blip>
@@ -21189,7 +23643,7 @@
           <a:noFill/>
           <a:extLst>
             <a:ext uri="{909E8E84-426E-40DD-AFC4-6F175D3DCCD1}">
-              <a14:hiddenFill xmlns:a14="http://schemas.microsoft.com/office/drawing/2010/main" xmlns="">
+              <a14:hiddenFill xmlns:a14="http://schemas.microsoft.com/office/drawing/2010/main">
                 <a:solidFill>
                   <a:srgbClr val="FFFFFF"/>
                 </a:solidFill>
@@ -21210,7 +23664,7 @@
           <a:blip r:embed="rId3" cstate="print">
             <a:extLst>
               <a:ext uri="{28A0092B-C50C-407E-A947-70E740481C1C}">
-                <a14:useLocalDpi xmlns:a14="http://schemas.microsoft.com/office/drawing/2010/main" xmlns="" val="0"/>
+                <a14:useLocalDpi xmlns:a14="http://schemas.microsoft.com/office/drawing/2010/main" val="0"/>
               </a:ext>
             </a:extLst>
           </a:blip>
@@ -21230,7 +23684,7 @@
           <a:noFill/>
           <a:extLst>
             <a:ext uri="{909E8E84-426E-40DD-AFC4-6F175D3DCCD1}">
-              <a14:hiddenFill xmlns:a14="http://schemas.microsoft.com/office/drawing/2010/main" xmlns="">
+              <a14:hiddenFill xmlns:a14="http://schemas.microsoft.com/office/drawing/2010/main">
                 <a:solidFill>
                   <a:srgbClr val="FFFFFF"/>
                 </a:solidFill>
@@ -21242,7 +23696,7 @@
     </p:spTree>
     <p:extLst>
       <p:ext uri="{BB962C8B-B14F-4D97-AF65-F5344CB8AC3E}">
-        <p14:creationId xmlns:p14="http://schemas.microsoft.com/office/powerpoint/2010/main" xmlns="" val="140638401"/>
+        <p14:creationId xmlns:p14="http://schemas.microsoft.com/office/powerpoint/2010/main" val="140638401"/>
       </p:ext>
     </p:extLst>
   </p:cSld>
@@ -21391,7 +23845,7 @@
           <a:blip r:embed="rId2" cstate="print">
             <a:extLst>
               <a:ext uri="{28A0092B-C50C-407E-A947-70E740481C1C}">
-                <a14:useLocalDpi xmlns:a14="http://schemas.microsoft.com/office/drawing/2010/main" xmlns="" val="0"/>
+                <a14:useLocalDpi xmlns:a14="http://schemas.microsoft.com/office/drawing/2010/main" val="0"/>
               </a:ext>
             </a:extLst>
           </a:blip>
@@ -21411,7 +23865,7 @@
           <a:noFill/>
           <a:extLst>
             <a:ext uri="{909E8E84-426E-40DD-AFC4-6F175D3DCCD1}">
-              <a14:hiddenFill xmlns:a14="http://schemas.microsoft.com/office/drawing/2010/main" xmlns="">
+              <a14:hiddenFill xmlns:a14="http://schemas.microsoft.com/office/drawing/2010/main">
                 <a:solidFill>
                   <a:srgbClr val="FFFFFF"/>
                 </a:solidFill>
@@ -21432,7 +23886,7 @@
           <a:blip r:embed="rId3" cstate="print">
             <a:extLst>
               <a:ext uri="{28A0092B-C50C-407E-A947-70E740481C1C}">
-                <a14:useLocalDpi xmlns:a14="http://schemas.microsoft.com/office/drawing/2010/main" xmlns="" val="0"/>
+                <a14:useLocalDpi xmlns:a14="http://schemas.microsoft.com/office/drawing/2010/main" val="0"/>
               </a:ext>
             </a:extLst>
           </a:blip>
@@ -21452,7 +23906,7 @@
           <a:noFill/>
           <a:extLst>
             <a:ext uri="{909E8E84-426E-40DD-AFC4-6F175D3DCCD1}">
-              <a14:hiddenFill xmlns:a14="http://schemas.microsoft.com/office/drawing/2010/main" xmlns="">
+              <a14:hiddenFill xmlns:a14="http://schemas.microsoft.com/office/drawing/2010/main">
                 <a:solidFill>
                   <a:srgbClr val="FFFFFF"/>
                 </a:solidFill>
@@ -21464,7 +23918,7 @@
     </p:spTree>
     <p:extLst>
       <p:ext uri="{BB962C8B-B14F-4D97-AF65-F5344CB8AC3E}">
-        <p14:creationId xmlns:p14="http://schemas.microsoft.com/office/powerpoint/2010/main" xmlns="" val="2262476767"/>
+        <p14:creationId xmlns:p14="http://schemas.microsoft.com/office/powerpoint/2010/main" val="2262476767"/>
       </p:ext>
     </p:extLst>
   </p:cSld>
@@ -21606,7 +24060,7 @@
           <a:blip r:embed="rId2" cstate="print">
             <a:extLst>
               <a:ext uri="{28A0092B-C50C-407E-A947-70E740481C1C}">
-                <a14:useLocalDpi xmlns:a14="http://schemas.microsoft.com/office/drawing/2010/main" xmlns="" val="0"/>
+                <a14:useLocalDpi xmlns:a14="http://schemas.microsoft.com/office/drawing/2010/main" val="0"/>
               </a:ext>
             </a:extLst>
           </a:blip>
@@ -21626,7 +24080,7 @@
           <a:noFill/>
           <a:extLst>
             <a:ext uri="{909E8E84-426E-40DD-AFC4-6F175D3DCCD1}">
-              <a14:hiddenFill xmlns:a14="http://schemas.microsoft.com/office/drawing/2010/main" xmlns="">
+              <a14:hiddenFill xmlns:a14="http://schemas.microsoft.com/office/drawing/2010/main">
                 <a:solidFill>
                   <a:srgbClr val="FFFFFF"/>
                 </a:solidFill>
@@ -21647,7 +24101,7 @@
           <a:blip r:embed="rId3" cstate="print">
             <a:extLst>
               <a:ext uri="{28A0092B-C50C-407E-A947-70E740481C1C}">
-                <a14:useLocalDpi xmlns:a14="http://schemas.microsoft.com/office/drawing/2010/main" xmlns="" val="0"/>
+                <a14:useLocalDpi xmlns:a14="http://schemas.microsoft.com/office/drawing/2010/main" val="0"/>
               </a:ext>
             </a:extLst>
           </a:blip>
@@ -21667,7 +24121,7 @@
           <a:noFill/>
           <a:extLst>
             <a:ext uri="{909E8E84-426E-40DD-AFC4-6F175D3DCCD1}">
-              <a14:hiddenFill xmlns:a14="http://schemas.microsoft.com/office/drawing/2010/main" xmlns="">
+              <a14:hiddenFill xmlns:a14="http://schemas.microsoft.com/office/drawing/2010/main">
                 <a:solidFill>
                   <a:srgbClr val="FFFFFF"/>
                 </a:solidFill>
@@ -21679,7 +24133,7 @@
     </p:spTree>
     <p:extLst>
       <p:ext uri="{BB962C8B-B14F-4D97-AF65-F5344CB8AC3E}">
-        <p14:creationId xmlns:p14="http://schemas.microsoft.com/office/powerpoint/2010/main" xmlns="" val="2023804496"/>
+        <p14:creationId xmlns:p14="http://schemas.microsoft.com/office/powerpoint/2010/main" val="2023804496"/>
       </p:ext>
     </p:extLst>
   </p:cSld>
@@ -21813,7 +24267,7 @@
           <a:blip r:embed="rId2" cstate="print">
             <a:extLst>
               <a:ext uri="{28A0092B-C50C-407E-A947-70E740481C1C}">
-                <a14:useLocalDpi xmlns:a14="http://schemas.microsoft.com/office/drawing/2010/main" xmlns="" val="0"/>
+                <a14:useLocalDpi xmlns:a14="http://schemas.microsoft.com/office/drawing/2010/main" val="0"/>
               </a:ext>
             </a:extLst>
           </a:blip>
@@ -21833,7 +24287,7 @@
           <a:noFill/>
           <a:extLst>
             <a:ext uri="{909E8E84-426E-40DD-AFC4-6F175D3DCCD1}">
-              <a14:hiddenFill xmlns:a14="http://schemas.microsoft.com/office/drawing/2010/main" xmlns="">
+              <a14:hiddenFill xmlns:a14="http://schemas.microsoft.com/office/drawing/2010/main">
                 <a:solidFill>
                   <a:srgbClr val="FFFFFF"/>
                 </a:solidFill>
@@ -21854,7 +24308,7 @@
           <a:blip r:embed="rId3" cstate="print">
             <a:extLst>
               <a:ext uri="{28A0092B-C50C-407E-A947-70E740481C1C}">
-                <a14:useLocalDpi xmlns:a14="http://schemas.microsoft.com/office/drawing/2010/main" xmlns="" val="0"/>
+                <a14:useLocalDpi xmlns:a14="http://schemas.microsoft.com/office/drawing/2010/main" val="0"/>
               </a:ext>
             </a:extLst>
           </a:blip>
@@ -21874,7 +24328,7 @@
           <a:noFill/>
           <a:extLst>
             <a:ext uri="{909E8E84-426E-40DD-AFC4-6F175D3DCCD1}">
-              <a14:hiddenFill xmlns:a14="http://schemas.microsoft.com/office/drawing/2010/main" xmlns="">
+              <a14:hiddenFill xmlns:a14="http://schemas.microsoft.com/office/drawing/2010/main">
                 <a:solidFill>
                   <a:srgbClr val="FFFFFF"/>
                 </a:solidFill>
@@ -21886,7 +24340,7 @@
     </p:spTree>
     <p:extLst>
       <p:ext uri="{BB962C8B-B14F-4D97-AF65-F5344CB8AC3E}">
-        <p14:creationId xmlns:p14="http://schemas.microsoft.com/office/powerpoint/2010/main" xmlns="" val="2666013015"/>
+        <p14:creationId xmlns:p14="http://schemas.microsoft.com/office/powerpoint/2010/main" val="2666013015"/>
       </p:ext>
     </p:extLst>
   </p:cSld>
@@ -21985,7 +24439,7 @@
           <a:blip r:embed="rId2" cstate="print">
             <a:extLst>
               <a:ext uri="{28A0092B-C50C-407E-A947-70E740481C1C}">
-                <a14:useLocalDpi xmlns:a14="http://schemas.microsoft.com/office/drawing/2010/main" xmlns="" val="0"/>
+                <a14:useLocalDpi xmlns:a14="http://schemas.microsoft.com/office/drawing/2010/main" val="0"/>
               </a:ext>
             </a:extLst>
           </a:blip>
@@ -22005,7 +24459,7 @@
           <a:noFill/>
           <a:extLst>
             <a:ext uri="{909E8E84-426E-40DD-AFC4-6F175D3DCCD1}">
-              <a14:hiddenFill xmlns:a14="http://schemas.microsoft.com/office/drawing/2010/main" xmlns="">
+              <a14:hiddenFill xmlns:a14="http://schemas.microsoft.com/office/drawing/2010/main">
                 <a:solidFill>
                   <a:srgbClr val="FFFFFF"/>
                 </a:solidFill>
@@ -22026,7 +24480,7 @@
           <a:blip r:embed="rId3" cstate="print">
             <a:extLst>
               <a:ext uri="{28A0092B-C50C-407E-A947-70E740481C1C}">
-                <a14:useLocalDpi xmlns:a14="http://schemas.microsoft.com/office/drawing/2010/main" xmlns="" val="0"/>
+                <a14:useLocalDpi xmlns:a14="http://schemas.microsoft.com/office/drawing/2010/main" val="0"/>
               </a:ext>
             </a:extLst>
           </a:blip>
@@ -22046,7 +24500,7 @@
           <a:noFill/>
           <a:extLst>
             <a:ext uri="{909E8E84-426E-40DD-AFC4-6F175D3DCCD1}">
-              <a14:hiddenFill xmlns:a14="http://schemas.microsoft.com/office/drawing/2010/main" xmlns="">
+              <a14:hiddenFill xmlns:a14="http://schemas.microsoft.com/office/drawing/2010/main">
                 <a:solidFill>
                   <a:srgbClr val="FFFFFF"/>
                 </a:solidFill>
@@ -22058,7 +24512,7 @@
     </p:spTree>
     <p:extLst>
       <p:ext uri="{BB962C8B-B14F-4D97-AF65-F5344CB8AC3E}">
-        <p14:creationId xmlns:p14="http://schemas.microsoft.com/office/powerpoint/2010/main" xmlns="" val="3693362975"/>
+        <p14:creationId xmlns:p14="http://schemas.microsoft.com/office/powerpoint/2010/main" val="3693362975"/>
       </p:ext>
     </p:extLst>
   </p:cSld>
@@ -22157,7 +24611,7 @@
           <a:blip r:embed="rId2" cstate="print">
             <a:extLst>
               <a:ext uri="{28A0092B-C50C-407E-A947-70E740481C1C}">
-                <a14:useLocalDpi xmlns:a14="http://schemas.microsoft.com/office/drawing/2010/main" xmlns="" val="0"/>
+                <a14:useLocalDpi xmlns:a14="http://schemas.microsoft.com/office/drawing/2010/main" val="0"/>
               </a:ext>
             </a:extLst>
           </a:blip>
@@ -22177,7 +24631,7 @@
           <a:noFill/>
           <a:extLst>
             <a:ext uri="{909E8E84-426E-40DD-AFC4-6F175D3DCCD1}">
-              <a14:hiddenFill xmlns:a14="http://schemas.microsoft.com/office/drawing/2010/main" xmlns="">
+              <a14:hiddenFill xmlns:a14="http://schemas.microsoft.com/office/drawing/2010/main">
                 <a:solidFill>
                   <a:srgbClr val="FFFFFF"/>
                 </a:solidFill>
@@ -22198,7 +24652,7 @@
           <a:blip r:embed="rId3" cstate="print">
             <a:extLst>
               <a:ext uri="{28A0092B-C50C-407E-A947-70E740481C1C}">
-                <a14:useLocalDpi xmlns:a14="http://schemas.microsoft.com/office/drawing/2010/main" xmlns="" val="0"/>
+                <a14:useLocalDpi xmlns:a14="http://schemas.microsoft.com/office/drawing/2010/main" val="0"/>
               </a:ext>
             </a:extLst>
           </a:blip>
@@ -22218,7 +24672,7 @@
           <a:noFill/>
           <a:extLst>
             <a:ext uri="{909E8E84-426E-40DD-AFC4-6F175D3DCCD1}">
-              <a14:hiddenFill xmlns:a14="http://schemas.microsoft.com/office/drawing/2010/main" xmlns="">
+              <a14:hiddenFill xmlns:a14="http://schemas.microsoft.com/office/drawing/2010/main">
                 <a:solidFill>
                   <a:srgbClr val="FFFFFF"/>
                 </a:solidFill>
@@ -22230,7 +24684,7 @@
     </p:spTree>
     <p:extLst>
       <p:ext uri="{BB962C8B-B14F-4D97-AF65-F5344CB8AC3E}">
-        <p14:creationId xmlns:p14="http://schemas.microsoft.com/office/powerpoint/2010/main" xmlns="" val="3693362975"/>
+        <p14:creationId xmlns:p14="http://schemas.microsoft.com/office/powerpoint/2010/main" val="3693362975"/>
       </p:ext>
     </p:extLst>
   </p:cSld>
@@ -22329,7 +24783,7 @@
           <a:blip r:embed="rId2" cstate="print">
             <a:extLst>
               <a:ext uri="{28A0092B-C50C-407E-A947-70E740481C1C}">
-                <a14:useLocalDpi xmlns:a14="http://schemas.microsoft.com/office/drawing/2010/main" xmlns="" val="0"/>
+                <a14:useLocalDpi xmlns:a14="http://schemas.microsoft.com/office/drawing/2010/main" val="0"/>
               </a:ext>
             </a:extLst>
           </a:blip>
@@ -22349,7 +24803,7 @@
           <a:noFill/>
           <a:extLst>
             <a:ext uri="{909E8E84-426E-40DD-AFC4-6F175D3DCCD1}">
-              <a14:hiddenFill xmlns:a14="http://schemas.microsoft.com/office/drawing/2010/main" xmlns="">
+              <a14:hiddenFill xmlns:a14="http://schemas.microsoft.com/office/drawing/2010/main">
                 <a:solidFill>
                   <a:srgbClr val="FFFFFF"/>
                 </a:solidFill>
@@ -22370,7 +24824,7 @@
           <a:blip r:embed="rId3" cstate="print">
             <a:extLst>
               <a:ext uri="{28A0092B-C50C-407E-A947-70E740481C1C}">
-                <a14:useLocalDpi xmlns:a14="http://schemas.microsoft.com/office/drawing/2010/main" xmlns="" val="0"/>
+                <a14:useLocalDpi xmlns:a14="http://schemas.microsoft.com/office/drawing/2010/main" val="0"/>
               </a:ext>
             </a:extLst>
           </a:blip>
@@ -22390,7 +24844,7 @@
           <a:noFill/>
           <a:extLst>
             <a:ext uri="{909E8E84-426E-40DD-AFC4-6F175D3DCCD1}">
-              <a14:hiddenFill xmlns:a14="http://schemas.microsoft.com/office/drawing/2010/main" xmlns="">
+              <a14:hiddenFill xmlns:a14="http://schemas.microsoft.com/office/drawing/2010/main">
                 <a:solidFill>
                   <a:srgbClr val="FFFFFF"/>
                 </a:solidFill>
@@ -22402,7 +24856,7 @@
     </p:spTree>
     <p:extLst>
       <p:ext uri="{BB962C8B-B14F-4D97-AF65-F5344CB8AC3E}">
-        <p14:creationId xmlns:p14="http://schemas.microsoft.com/office/powerpoint/2010/main" xmlns="" val="3693362975"/>
+        <p14:creationId xmlns:p14="http://schemas.microsoft.com/office/powerpoint/2010/main" val="3693362975"/>
       </p:ext>
     </p:extLst>
   </p:cSld>
@@ -22504,7 +24958,7 @@
           <a:blip r:embed="rId2" cstate="print">
             <a:extLst>
               <a:ext uri="{28A0092B-C50C-407E-A947-70E740481C1C}">
-                <a14:useLocalDpi xmlns:a14="http://schemas.microsoft.com/office/drawing/2010/main" xmlns="" val="0"/>
+                <a14:useLocalDpi xmlns:a14="http://schemas.microsoft.com/office/drawing/2010/main" val="0"/>
               </a:ext>
             </a:extLst>
           </a:blip>
@@ -22524,7 +24978,7 @@
           <a:noFill/>
           <a:extLst>
             <a:ext uri="{909E8E84-426E-40DD-AFC4-6F175D3DCCD1}">
-              <a14:hiddenFill xmlns:a14="http://schemas.microsoft.com/office/drawing/2010/main" xmlns="">
+              <a14:hiddenFill xmlns:a14="http://schemas.microsoft.com/office/drawing/2010/main">
                 <a:solidFill>
                   <a:srgbClr val="FFFFFF"/>
                 </a:solidFill>
@@ -22545,7 +24999,7 @@
           <a:blip r:embed="rId3" cstate="print">
             <a:extLst>
               <a:ext uri="{28A0092B-C50C-407E-A947-70E740481C1C}">
-                <a14:useLocalDpi xmlns:a14="http://schemas.microsoft.com/office/drawing/2010/main" xmlns="" val="0"/>
+                <a14:useLocalDpi xmlns:a14="http://schemas.microsoft.com/office/drawing/2010/main" val="0"/>
               </a:ext>
             </a:extLst>
           </a:blip>
@@ -22565,7 +25019,7 @@
           <a:noFill/>
           <a:extLst>
             <a:ext uri="{909E8E84-426E-40DD-AFC4-6F175D3DCCD1}">
-              <a14:hiddenFill xmlns:a14="http://schemas.microsoft.com/office/drawing/2010/main" xmlns="">
+              <a14:hiddenFill xmlns:a14="http://schemas.microsoft.com/office/drawing/2010/main">
                 <a:solidFill>
                   <a:srgbClr val="FFFFFF"/>
                 </a:solidFill>
@@ -22577,7 +25031,7 @@
     </p:spTree>
     <p:extLst>
       <p:ext uri="{BB962C8B-B14F-4D97-AF65-F5344CB8AC3E}">
-        <p14:creationId xmlns:p14="http://schemas.microsoft.com/office/powerpoint/2010/main" xmlns="" val="1251326373"/>
+        <p14:creationId xmlns:p14="http://schemas.microsoft.com/office/powerpoint/2010/main" val="1251326373"/>
       </p:ext>
     </p:extLst>
   </p:cSld>
@@ -22693,7 +25147,7 @@
           <a:blip r:embed="rId2" cstate="print">
             <a:extLst>
               <a:ext uri="{28A0092B-C50C-407E-A947-70E740481C1C}">
-                <a14:useLocalDpi xmlns:a14="http://schemas.microsoft.com/office/drawing/2010/main" xmlns="" val="0"/>
+                <a14:useLocalDpi xmlns:a14="http://schemas.microsoft.com/office/drawing/2010/main" val="0"/>
               </a:ext>
             </a:extLst>
           </a:blip>
@@ -22713,7 +25167,7 @@
           <a:noFill/>
           <a:extLst>
             <a:ext uri="{909E8E84-426E-40DD-AFC4-6F175D3DCCD1}">
-              <a14:hiddenFill xmlns:a14="http://schemas.microsoft.com/office/drawing/2010/main" xmlns="">
+              <a14:hiddenFill xmlns:a14="http://schemas.microsoft.com/office/drawing/2010/main">
                 <a:solidFill>
                   <a:srgbClr val="FFFFFF"/>
                 </a:solidFill>
@@ -22734,7 +25188,7 @@
           <a:blip r:embed="rId3" cstate="print">
             <a:extLst>
               <a:ext uri="{28A0092B-C50C-407E-A947-70E740481C1C}">
-                <a14:useLocalDpi xmlns:a14="http://schemas.microsoft.com/office/drawing/2010/main" xmlns="" val="0"/>
+                <a14:useLocalDpi xmlns:a14="http://schemas.microsoft.com/office/drawing/2010/main" val="0"/>
               </a:ext>
             </a:extLst>
           </a:blip>
@@ -22754,7 +25208,7 @@
           <a:noFill/>
           <a:extLst>
             <a:ext uri="{909E8E84-426E-40DD-AFC4-6F175D3DCCD1}">
-              <a14:hiddenFill xmlns:a14="http://schemas.microsoft.com/office/drawing/2010/main" xmlns="">
+              <a14:hiddenFill xmlns:a14="http://schemas.microsoft.com/office/drawing/2010/main">
                 <a:solidFill>
                   <a:srgbClr val="FFFFFF"/>
                 </a:solidFill>
@@ -22766,7 +25220,7 @@
     </p:spTree>
     <p:extLst>
       <p:ext uri="{BB962C8B-B14F-4D97-AF65-F5344CB8AC3E}">
-        <p14:creationId xmlns:p14="http://schemas.microsoft.com/office/powerpoint/2010/main" xmlns="" val="2273561369"/>
+        <p14:creationId xmlns:p14="http://schemas.microsoft.com/office/powerpoint/2010/main" val="2273561369"/>
       </p:ext>
     </p:extLst>
   </p:cSld>
@@ -22839,7 +25293,7 @@
           <a:blip r:embed="rId2" cstate="print">
             <a:extLst>
               <a:ext uri="{28A0092B-C50C-407E-A947-70E740481C1C}">
-                <a14:useLocalDpi xmlns:a14="http://schemas.microsoft.com/office/drawing/2010/main" xmlns="" val="0"/>
+                <a14:useLocalDpi xmlns:a14="http://schemas.microsoft.com/office/drawing/2010/main" val="0"/>
               </a:ext>
             </a:extLst>
           </a:blip>
@@ -22863,14 +25317,14 @@
           <a:effectLst/>
           <a:extLst>
             <a:ext uri="{909E8E84-426E-40DD-AFC4-6F175D3DCCD1}">
-              <a14:hiddenFill xmlns:a14="http://schemas.microsoft.com/office/drawing/2010/main" xmlns="">
+              <a14:hiddenFill xmlns:a14="http://schemas.microsoft.com/office/drawing/2010/main">
                 <a:solidFill>
                   <a:schemeClr val="accent1"/>
                 </a:solidFill>
               </a14:hiddenFill>
             </a:ext>
             <a:ext uri="{91240B29-F687-4F45-9708-019B960494DF}">
-              <a14:hiddenLine xmlns:a14="http://schemas.microsoft.com/office/drawing/2010/main" xmlns="" w="9525">
+              <a14:hiddenLine xmlns:a14="http://schemas.microsoft.com/office/drawing/2010/main" w="9525">
                 <a:solidFill>
                   <a:schemeClr val="tx1"/>
                 </a:solidFill>
@@ -22880,7 +25334,7 @@
               </a14:hiddenLine>
             </a:ext>
             <a:ext uri="{AF507438-7753-43E0-B8FC-AC1667EBCBE1}">
-              <a14:hiddenEffects xmlns:a14="http://schemas.microsoft.com/office/drawing/2010/main" xmlns="">
+              <a14:hiddenEffects xmlns:a14="http://schemas.microsoft.com/office/drawing/2010/main">
                 <a:effectLst>
                   <a:outerShdw dist="35921" dir="2700000" algn="ctr" rotWithShape="0">
                     <a:schemeClr val="bg2"/>
@@ -22903,7 +25357,7 @@
           <a:blip r:embed="rId3" cstate="print">
             <a:extLst>
               <a:ext uri="{28A0092B-C50C-407E-A947-70E740481C1C}">
-                <a14:useLocalDpi xmlns:a14="http://schemas.microsoft.com/office/drawing/2010/main" xmlns="" val="0"/>
+                <a14:useLocalDpi xmlns:a14="http://schemas.microsoft.com/office/drawing/2010/main" val="0"/>
               </a:ext>
             </a:extLst>
           </a:blip>
@@ -22923,7 +25377,7 @@
           <a:noFill/>
           <a:extLst>
             <a:ext uri="{909E8E84-426E-40DD-AFC4-6F175D3DCCD1}">
-              <a14:hiddenFill xmlns:a14="http://schemas.microsoft.com/office/drawing/2010/main" xmlns="">
+              <a14:hiddenFill xmlns:a14="http://schemas.microsoft.com/office/drawing/2010/main">
                 <a:solidFill>
                   <a:srgbClr val="FFFFFF"/>
                 </a:solidFill>
@@ -22944,7 +25398,7 @@
           <a:blip r:embed="rId4" cstate="print">
             <a:extLst>
               <a:ext uri="{28A0092B-C50C-407E-A947-70E740481C1C}">
-                <a14:useLocalDpi xmlns:a14="http://schemas.microsoft.com/office/drawing/2010/main" xmlns="" val="0"/>
+                <a14:useLocalDpi xmlns:a14="http://schemas.microsoft.com/office/drawing/2010/main" val="0"/>
               </a:ext>
             </a:extLst>
           </a:blip>
@@ -22964,7 +25418,7 @@
           <a:noFill/>
           <a:extLst>
             <a:ext uri="{909E8E84-426E-40DD-AFC4-6F175D3DCCD1}">
-              <a14:hiddenFill xmlns:a14="http://schemas.microsoft.com/office/drawing/2010/main" xmlns="">
+              <a14:hiddenFill xmlns:a14="http://schemas.microsoft.com/office/drawing/2010/main">
                 <a:solidFill>
                   <a:srgbClr val="FFFFFF"/>
                 </a:solidFill>
@@ -22976,7 +25430,7 @@
     </p:spTree>
     <p:extLst>
       <p:ext uri="{BB962C8B-B14F-4D97-AF65-F5344CB8AC3E}">
-        <p14:creationId xmlns:p14="http://schemas.microsoft.com/office/powerpoint/2010/main" xmlns="" val="1450032067"/>
+        <p14:creationId xmlns:p14="http://schemas.microsoft.com/office/powerpoint/2010/main" val="1450032067"/>
       </p:ext>
     </p:extLst>
   </p:cSld>
@@ -23158,7 +25612,7 @@
                   <a:schemeClr val="tx1"/>
                 </a:solidFill>
               </a:rPr>
-              <a:t>Demian</a:t>
+              <a:t>Demián</a:t>
             </a:r>
             <a:r>
               <a:rPr lang="es-AR" b="1" dirty="0" smtClean="0">
@@ -23263,12 +25717,12 @@
               <a:t>: Agente de asistencia </a:t>
             </a:r>
             <a:r>
-              <a:rPr lang="es-AR" dirty="0" err="1" smtClean="0">
+              <a:rPr lang="es-AR" dirty="0" smtClean="0">
                 <a:solidFill>
                   <a:schemeClr val="tx1"/>
                 </a:solidFill>
               </a:rPr>
-              <a:t>tecnica</a:t>
+              <a:t>técnica </a:t>
             </a:r>
             <a:r>
               <a:rPr lang="es-AR" dirty="0" smtClean="0">
@@ -23276,7 +25730,7 @@
                   <a:schemeClr val="tx1"/>
                 </a:solidFill>
               </a:rPr>
-              <a:t> para Pymes en Jazztel (empresa española de telecomunicaciones).</a:t>
+              <a:t>para Pymes en Jazztel (empresa española de telecomunicaciones).</a:t>
             </a:r>
           </a:p>
           <a:p>
@@ -23429,7 +25883,7 @@
           <a:blip r:embed="rId2" cstate="print">
             <a:extLst>
               <a:ext uri="{28A0092B-C50C-407E-A947-70E740481C1C}">
-                <a14:useLocalDpi xmlns:a14="http://schemas.microsoft.com/office/drawing/2010/main" xmlns="" val="0"/>
+                <a14:useLocalDpi xmlns:a14="http://schemas.microsoft.com/office/drawing/2010/main" val="0"/>
               </a:ext>
             </a:extLst>
           </a:blip>
@@ -23449,7 +25903,7 @@
           <a:noFill/>
           <a:extLst>
             <a:ext uri="{909E8E84-426E-40DD-AFC4-6F175D3DCCD1}">
-              <a14:hiddenFill xmlns:a14="http://schemas.microsoft.com/office/drawing/2010/main" xmlns="">
+              <a14:hiddenFill xmlns:a14="http://schemas.microsoft.com/office/drawing/2010/main">
                 <a:solidFill>
                   <a:srgbClr val="FFFFFF"/>
                 </a:solidFill>
@@ -23470,7 +25924,7 @@
           <a:blip r:embed="rId3" cstate="print">
             <a:extLst>
               <a:ext uri="{28A0092B-C50C-407E-A947-70E740481C1C}">
-                <a14:useLocalDpi xmlns:a14="http://schemas.microsoft.com/office/drawing/2010/main" xmlns="" val="0"/>
+                <a14:useLocalDpi xmlns:a14="http://schemas.microsoft.com/office/drawing/2010/main" val="0"/>
               </a:ext>
             </a:extLst>
           </a:blip>
@@ -23490,7 +25944,7 @@
           <a:noFill/>
           <a:extLst>
             <a:ext uri="{909E8E84-426E-40DD-AFC4-6F175D3DCCD1}">
-              <a14:hiddenFill xmlns:a14="http://schemas.microsoft.com/office/drawing/2010/main" xmlns="">
+              <a14:hiddenFill xmlns:a14="http://schemas.microsoft.com/office/drawing/2010/main">
                 <a:solidFill>
                   <a:srgbClr val="FFFFFF"/>
                 </a:solidFill>
@@ -23502,7 +25956,7 @@
     </p:spTree>
     <p:extLst>
       <p:ext uri="{BB962C8B-B14F-4D97-AF65-F5344CB8AC3E}">
-        <p14:creationId xmlns:p14="http://schemas.microsoft.com/office/powerpoint/2010/main" xmlns="" val="119432886"/>
+        <p14:creationId xmlns:p14="http://schemas.microsoft.com/office/powerpoint/2010/main" val="119432886"/>
       </p:ext>
     </p:extLst>
   </p:cSld>
@@ -23675,7 +26129,7 @@
           <a:blip r:embed="rId2" cstate="print">
             <a:extLst>
               <a:ext uri="{28A0092B-C50C-407E-A947-70E740481C1C}">
-                <a14:useLocalDpi xmlns:a14="http://schemas.microsoft.com/office/drawing/2010/main" xmlns="" val="0"/>
+                <a14:useLocalDpi xmlns:a14="http://schemas.microsoft.com/office/drawing/2010/main" val="0"/>
               </a:ext>
             </a:extLst>
           </a:blip>
@@ -23695,7 +26149,7 @@
           <a:noFill/>
           <a:extLst>
             <a:ext uri="{909E8E84-426E-40DD-AFC4-6F175D3DCCD1}">
-              <a14:hiddenFill xmlns:a14="http://schemas.microsoft.com/office/drawing/2010/main" xmlns="">
+              <a14:hiddenFill xmlns:a14="http://schemas.microsoft.com/office/drawing/2010/main">
                 <a:solidFill>
                   <a:srgbClr val="FFFFFF"/>
                 </a:solidFill>
@@ -23716,7 +26170,7 @@
           <a:blip r:embed="rId3" cstate="print">
             <a:extLst>
               <a:ext uri="{28A0092B-C50C-407E-A947-70E740481C1C}">
-                <a14:useLocalDpi xmlns:a14="http://schemas.microsoft.com/office/drawing/2010/main" xmlns="" val="0"/>
+                <a14:useLocalDpi xmlns:a14="http://schemas.microsoft.com/office/drawing/2010/main" val="0"/>
               </a:ext>
             </a:extLst>
           </a:blip>
@@ -23736,7 +26190,7 @@
           <a:noFill/>
           <a:extLst>
             <a:ext uri="{909E8E84-426E-40DD-AFC4-6F175D3DCCD1}">
-              <a14:hiddenFill xmlns:a14="http://schemas.microsoft.com/office/drawing/2010/main" xmlns="">
+              <a14:hiddenFill xmlns:a14="http://schemas.microsoft.com/office/drawing/2010/main">
                 <a:solidFill>
                   <a:srgbClr val="FFFFFF"/>
                 </a:solidFill>
@@ -23748,7 +26202,7 @@
     </p:spTree>
     <p:extLst>
       <p:ext uri="{BB962C8B-B14F-4D97-AF65-F5344CB8AC3E}">
-        <p14:creationId xmlns:p14="http://schemas.microsoft.com/office/powerpoint/2010/main" xmlns="" val="3537553483"/>
+        <p14:creationId xmlns:p14="http://schemas.microsoft.com/office/powerpoint/2010/main" val="3537553483"/>
       </p:ext>
     </p:extLst>
   </p:cSld>
@@ -23868,7 +26322,7 @@
           <a:blip r:embed="rId2" cstate="print">
             <a:extLst>
               <a:ext uri="{28A0092B-C50C-407E-A947-70E740481C1C}">
-                <a14:useLocalDpi xmlns:a14="http://schemas.microsoft.com/office/drawing/2010/main" xmlns="" val="0"/>
+                <a14:useLocalDpi xmlns:a14="http://schemas.microsoft.com/office/drawing/2010/main" val="0"/>
               </a:ext>
             </a:extLst>
           </a:blip>
@@ -23888,7 +26342,7 @@
           <a:noFill/>
           <a:extLst>
             <a:ext uri="{909E8E84-426E-40DD-AFC4-6F175D3DCCD1}">
-              <a14:hiddenFill xmlns:a14="http://schemas.microsoft.com/office/drawing/2010/main" xmlns="">
+              <a14:hiddenFill xmlns:a14="http://schemas.microsoft.com/office/drawing/2010/main">
                 <a:solidFill>
                   <a:srgbClr val="FFFFFF"/>
                 </a:solidFill>
@@ -23909,7 +26363,7 @@
           <a:blip r:embed="rId3" cstate="print">
             <a:extLst>
               <a:ext uri="{28A0092B-C50C-407E-A947-70E740481C1C}">
-                <a14:useLocalDpi xmlns:a14="http://schemas.microsoft.com/office/drawing/2010/main" xmlns="" val="0"/>
+                <a14:useLocalDpi xmlns:a14="http://schemas.microsoft.com/office/drawing/2010/main" val="0"/>
               </a:ext>
             </a:extLst>
           </a:blip>
@@ -23929,7 +26383,7 @@
           <a:noFill/>
           <a:extLst>
             <a:ext uri="{909E8E84-426E-40DD-AFC4-6F175D3DCCD1}">
-              <a14:hiddenFill xmlns:a14="http://schemas.microsoft.com/office/drawing/2010/main" xmlns="">
+              <a14:hiddenFill xmlns:a14="http://schemas.microsoft.com/office/drawing/2010/main">
                 <a:solidFill>
                   <a:srgbClr val="FFFFFF"/>
                 </a:solidFill>
@@ -24052,7 +26506,7 @@
     </p:spTree>
     <p:extLst>
       <p:ext uri="{BB962C8B-B14F-4D97-AF65-F5344CB8AC3E}">
-        <p14:creationId xmlns:p14="http://schemas.microsoft.com/office/powerpoint/2010/main" xmlns="" val="2857880001"/>
+        <p14:creationId xmlns:p14="http://schemas.microsoft.com/office/powerpoint/2010/main" val="2857880001"/>
       </p:ext>
     </p:extLst>
   </p:cSld>
@@ -24101,7 +26555,7 @@
           <a:blip r:embed="rId2" cstate="print">
             <a:extLst>
               <a:ext uri="{28A0092B-C50C-407E-A947-70E740481C1C}">
-                <a14:useLocalDpi xmlns:a14="http://schemas.microsoft.com/office/drawing/2010/main" xmlns="" val="0"/>
+                <a14:useLocalDpi xmlns:a14="http://schemas.microsoft.com/office/drawing/2010/main" val="0"/>
               </a:ext>
             </a:extLst>
           </a:blip>
@@ -24121,7 +26575,7 @@
           <a:noFill/>
           <a:extLst>
             <a:ext uri="{909E8E84-426E-40DD-AFC4-6F175D3DCCD1}">
-              <a14:hiddenFill xmlns:a14="http://schemas.microsoft.com/office/drawing/2010/main" xmlns="">
+              <a14:hiddenFill xmlns:a14="http://schemas.microsoft.com/office/drawing/2010/main">
                 <a:solidFill>
                   <a:srgbClr val="FFFFFF"/>
                 </a:solidFill>
@@ -24355,8 +26809,16 @@
           </a:p>
           <a:p>
             <a:r>
+              <a:rPr lang="es-AR" sz="1800" dirty="0"/>
+              <a:t>e</a:t>
+            </a:r>
+            <a:r>
               <a:rPr lang="es-AR" sz="1800" dirty="0" smtClean="0"/>
-              <a:t>especializado en telecomunicaciones para celulares.</a:t>
+              <a:t>specializado </a:t>
+            </a:r>
+            <a:r>
+              <a:rPr lang="es-AR" sz="1800" dirty="0" smtClean="0"/>
+              <a:t>en telecomunicaciones para celulares.</a:t>
             </a:r>
           </a:p>
           <a:p>
@@ -24377,8 +26839,16 @@
           </a:p>
           <a:p>
             <a:r>
+              <a:rPr lang="es-AR" sz="1800" dirty="0"/>
+              <a:t>E</a:t>
+            </a:r>
+            <a:r>
               <a:rPr lang="es-AR" sz="1800" dirty="0" smtClean="0"/>
-              <a:t>en 1995 ya incursionaron en telefonía.</a:t>
+              <a:t>n </a:t>
+            </a:r>
+            <a:r>
+              <a:rPr lang="es-AR" sz="1800" dirty="0" smtClean="0"/>
+              <a:t>1995 ya incursionaron en telefonía.</a:t>
             </a:r>
             <a:endParaRPr lang="en-US" dirty="0"/>
           </a:p>
@@ -24396,7 +26866,7 @@
           <a:blip r:embed="rId3" cstate="print">
             <a:extLst>
               <a:ext uri="{28A0092B-C50C-407E-A947-70E740481C1C}">
-                <a14:useLocalDpi xmlns:a14="http://schemas.microsoft.com/office/drawing/2010/main" xmlns="" val="0"/>
+                <a14:useLocalDpi xmlns:a14="http://schemas.microsoft.com/office/drawing/2010/main" val="0"/>
               </a:ext>
             </a:extLst>
           </a:blip>
@@ -24416,7 +26886,7 @@
           <a:noFill/>
           <a:extLst>
             <a:ext uri="{909E8E84-426E-40DD-AFC4-6F175D3DCCD1}">
-              <a14:hiddenFill xmlns:a14="http://schemas.microsoft.com/office/drawing/2010/main" xmlns="">
+              <a14:hiddenFill xmlns:a14="http://schemas.microsoft.com/office/drawing/2010/main">
                 <a:solidFill>
                   <a:srgbClr val="FFFFFF"/>
                 </a:solidFill>
@@ -24539,7 +27009,7 @@
     </p:spTree>
     <p:extLst>
       <p:ext uri="{BB962C8B-B14F-4D97-AF65-F5344CB8AC3E}">
-        <p14:creationId xmlns:p14="http://schemas.microsoft.com/office/powerpoint/2010/main" xmlns="" val="2421466572"/>
+        <p14:creationId xmlns:p14="http://schemas.microsoft.com/office/powerpoint/2010/main" val="2421466572"/>
       </p:ext>
     </p:extLst>
   </p:cSld>
@@ -24588,7 +27058,7 @@
           <a:blip r:embed="rId2" cstate="print">
             <a:extLst>
               <a:ext uri="{28A0092B-C50C-407E-A947-70E740481C1C}">
-                <a14:useLocalDpi xmlns:a14="http://schemas.microsoft.com/office/drawing/2010/main" xmlns="" val="0"/>
+                <a14:useLocalDpi xmlns:a14="http://schemas.microsoft.com/office/drawing/2010/main" val="0"/>
               </a:ext>
             </a:extLst>
           </a:blip>
@@ -24608,7 +27078,7 @@
           <a:noFill/>
           <a:extLst>
             <a:ext uri="{909E8E84-426E-40DD-AFC4-6F175D3DCCD1}">
-              <a14:hiddenFill xmlns:a14="http://schemas.microsoft.com/office/drawing/2010/main" xmlns="">
+              <a14:hiddenFill xmlns:a14="http://schemas.microsoft.com/office/drawing/2010/main">
                 <a:solidFill>
                   <a:srgbClr val="FFFFFF"/>
                 </a:solidFill>
@@ -24875,7 +27345,7 @@
           <a:blip r:embed="rId4" cstate="print">
             <a:extLst>
               <a:ext uri="{28A0092B-C50C-407E-A947-70E740481C1C}">
-                <a14:useLocalDpi xmlns:a14="http://schemas.microsoft.com/office/drawing/2010/main" xmlns="" val="0"/>
+                <a14:useLocalDpi xmlns:a14="http://schemas.microsoft.com/office/drawing/2010/main" val="0"/>
               </a:ext>
             </a:extLst>
           </a:blip>
@@ -24895,7 +27365,7 @@
           <a:noFill/>
           <a:extLst>
             <a:ext uri="{909E8E84-426E-40DD-AFC4-6F175D3DCCD1}">
-              <a14:hiddenFill xmlns:a14="http://schemas.microsoft.com/office/drawing/2010/main" xmlns="">
+              <a14:hiddenFill xmlns:a14="http://schemas.microsoft.com/office/drawing/2010/main">
                 <a:solidFill>
                   <a:srgbClr val="FFFFFF"/>
                 </a:solidFill>
@@ -25056,7 +27526,7 @@
     </p:spTree>
     <p:extLst>
       <p:ext uri="{BB962C8B-B14F-4D97-AF65-F5344CB8AC3E}">
-        <p14:creationId xmlns:p14="http://schemas.microsoft.com/office/powerpoint/2010/main" xmlns="" val="419306505"/>
+        <p14:creationId xmlns:p14="http://schemas.microsoft.com/office/powerpoint/2010/main" val="419306505"/>
       </p:ext>
     </p:extLst>
   </p:cSld>
@@ -25170,7 +27640,7 @@
           <p:nvPr>
             <p:extLst>
               <p:ext uri="{D42A27DB-BD31-4B8C-83A1-F6EECF244321}">
-                <p14:modId xmlns:p14="http://schemas.microsoft.com/office/powerpoint/2010/main" xmlns="" val="899372415"/>
+                <p14:modId xmlns:p14="http://schemas.microsoft.com/office/powerpoint/2010/main" val="899372415"/>
               </p:ext>
             </p:extLst>
           </p:nvPr>
@@ -25197,7 +27667,7 @@
           <a:blip r:embed="rId7" cstate="print">
             <a:extLst>
               <a:ext uri="{28A0092B-C50C-407E-A947-70E740481C1C}">
-                <a14:useLocalDpi xmlns:a14="http://schemas.microsoft.com/office/drawing/2010/main" xmlns="" val="0"/>
+                <a14:useLocalDpi xmlns:a14="http://schemas.microsoft.com/office/drawing/2010/main" val="0"/>
               </a:ext>
             </a:extLst>
           </a:blip>
@@ -25217,7 +27687,7 @@
           <a:noFill/>
           <a:extLst>
             <a:ext uri="{909E8E84-426E-40DD-AFC4-6F175D3DCCD1}">
-              <a14:hiddenFill xmlns:a14="http://schemas.microsoft.com/office/drawing/2010/main" xmlns="">
+              <a14:hiddenFill xmlns:a14="http://schemas.microsoft.com/office/drawing/2010/main">
                 <a:solidFill>
                   <a:srgbClr val="FFFFFF"/>
                 </a:solidFill>
@@ -25238,7 +27708,7 @@
           <a:blip r:embed="rId8" cstate="print">
             <a:extLst>
               <a:ext uri="{28A0092B-C50C-407E-A947-70E740481C1C}">
-                <a14:useLocalDpi xmlns:a14="http://schemas.microsoft.com/office/drawing/2010/main" xmlns="" val="0"/>
+                <a14:useLocalDpi xmlns:a14="http://schemas.microsoft.com/office/drawing/2010/main" val="0"/>
               </a:ext>
             </a:extLst>
           </a:blip>
@@ -25258,7 +27728,7 @@
           <a:noFill/>
           <a:extLst>
             <a:ext uri="{909E8E84-426E-40DD-AFC4-6F175D3DCCD1}">
-              <a14:hiddenFill xmlns:a14="http://schemas.microsoft.com/office/drawing/2010/main" xmlns="">
+              <a14:hiddenFill xmlns:a14="http://schemas.microsoft.com/office/drawing/2010/main">
                 <a:solidFill>
                   <a:srgbClr val="FFFFFF"/>
                 </a:solidFill>
@@ -25270,7 +27740,7 @@
     </p:spTree>
     <p:extLst>
       <p:ext uri="{BB962C8B-B14F-4D97-AF65-F5344CB8AC3E}">
-        <p14:creationId xmlns:p14="http://schemas.microsoft.com/office/powerpoint/2010/main" xmlns="" val="1218708985"/>
+        <p14:creationId xmlns:p14="http://schemas.microsoft.com/office/powerpoint/2010/main" val="1218708985"/>
       </p:ext>
     </p:extLst>
   </p:cSld>
@@ -25366,7 +27836,7 @@
           <a:blip r:embed="rId3" cstate="print">
             <a:extLst>
               <a:ext uri="{28A0092B-C50C-407E-A947-70E740481C1C}">
-                <a14:useLocalDpi xmlns:a14="http://schemas.microsoft.com/office/drawing/2010/main" xmlns="" val="0"/>
+                <a14:useLocalDpi xmlns:a14="http://schemas.microsoft.com/office/drawing/2010/main" val="0"/>
               </a:ext>
             </a:extLst>
           </a:blip>
@@ -25386,7 +27856,7 @@
           <a:noFill/>
           <a:extLst>
             <a:ext uri="{909E8E84-426E-40DD-AFC4-6F175D3DCCD1}">
-              <a14:hiddenFill xmlns:a14="http://schemas.microsoft.com/office/drawing/2010/main" xmlns="">
+              <a14:hiddenFill xmlns:a14="http://schemas.microsoft.com/office/drawing/2010/main">
                 <a:solidFill>
                   <a:srgbClr val="FFFFFF"/>
                 </a:solidFill>
@@ -25407,7 +27877,7 @@
           <a:blip r:embed="rId4" cstate="print">
             <a:extLst>
               <a:ext uri="{28A0092B-C50C-407E-A947-70E740481C1C}">
-                <a14:useLocalDpi xmlns:a14="http://schemas.microsoft.com/office/drawing/2010/main" xmlns="" val="0"/>
+                <a14:useLocalDpi xmlns:a14="http://schemas.microsoft.com/office/drawing/2010/main" val="0"/>
               </a:ext>
             </a:extLst>
           </a:blip>
@@ -25427,7 +27897,7 @@
           <a:noFill/>
           <a:extLst>
             <a:ext uri="{909E8E84-426E-40DD-AFC4-6F175D3DCCD1}">
-              <a14:hiddenFill xmlns:a14="http://schemas.microsoft.com/office/drawing/2010/main" xmlns="">
+              <a14:hiddenFill xmlns:a14="http://schemas.microsoft.com/office/drawing/2010/main">
                 <a:solidFill>
                   <a:srgbClr val="FFFFFF"/>
                 </a:solidFill>
@@ -25825,7 +28295,7 @@
     </p:spTree>
     <p:extLst>
       <p:ext uri="{BB962C8B-B14F-4D97-AF65-F5344CB8AC3E}">
-        <p14:creationId xmlns:p14="http://schemas.microsoft.com/office/powerpoint/2010/main" xmlns="" val="1218708985"/>
+        <p14:creationId xmlns:p14="http://schemas.microsoft.com/office/powerpoint/2010/main" val="1218708985"/>
       </p:ext>
     </p:extLst>
   </p:cSld>
@@ -25874,7 +28344,7 @@
           <a:blip r:embed="rId2" cstate="print">
             <a:extLst>
               <a:ext uri="{28A0092B-C50C-407E-A947-70E740481C1C}">
-                <a14:useLocalDpi xmlns:a14="http://schemas.microsoft.com/office/drawing/2010/main" xmlns="" val="0"/>
+                <a14:useLocalDpi xmlns:a14="http://schemas.microsoft.com/office/drawing/2010/main" val="0"/>
               </a:ext>
             </a:extLst>
           </a:blip>
@@ -25894,7 +28364,7 @@
           <a:noFill/>
           <a:extLst>
             <a:ext uri="{909E8E84-426E-40DD-AFC4-6F175D3DCCD1}">
-              <a14:hiddenFill xmlns:a14="http://schemas.microsoft.com/office/drawing/2010/main" xmlns="">
+              <a14:hiddenFill xmlns:a14="http://schemas.microsoft.com/office/drawing/2010/main">
                 <a:solidFill>
                   <a:srgbClr val="FFFFFF"/>
                 </a:solidFill>
@@ -25915,7 +28385,7 @@
           <a:blip r:embed="rId3" cstate="print">
             <a:extLst>
               <a:ext uri="{28A0092B-C50C-407E-A947-70E740481C1C}">
-                <a14:useLocalDpi xmlns:a14="http://schemas.microsoft.com/office/drawing/2010/main" xmlns="" val="0"/>
+                <a14:useLocalDpi xmlns:a14="http://schemas.microsoft.com/office/drawing/2010/main" val="0"/>
               </a:ext>
             </a:extLst>
           </a:blip>
@@ -25935,7 +28405,7 @@
           <a:noFill/>
           <a:extLst>
             <a:ext uri="{909E8E84-426E-40DD-AFC4-6F175D3DCCD1}">
-              <a14:hiddenFill xmlns:a14="http://schemas.microsoft.com/office/drawing/2010/main" xmlns="">
+              <a14:hiddenFill xmlns:a14="http://schemas.microsoft.com/office/drawing/2010/main">
                 <a:solidFill>
                   <a:srgbClr val="FFFFFF"/>
                 </a:solidFill>
@@ -26282,7 +28752,7 @@
           <p:nvPr>
             <p:extLst>
               <p:ext uri="{D42A27DB-BD31-4B8C-83A1-F6EECF244321}">
-                <p14:modId xmlns:p14="http://schemas.microsoft.com/office/powerpoint/2010/main" xmlns="" val="1398164617"/>
+                <p14:modId xmlns:p14="http://schemas.microsoft.com/office/powerpoint/2010/main" val="1398164617"/>
               </p:ext>
             </p:extLst>
           </p:nvPr>
@@ -26300,7 +28770,7 @@
     </p:spTree>
     <p:extLst>
       <p:ext uri="{BB962C8B-B14F-4D97-AF65-F5344CB8AC3E}">
-        <p14:creationId xmlns:p14="http://schemas.microsoft.com/office/powerpoint/2010/main" xmlns="" val="1218708985"/>
+        <p14:creationId xmlns:p14="http://schemas.microsoft.com/office/powerpoint/2010/main" val="1218708985"/>
       </p:ext>
     </p:extLst>
   </p:cSld>

</xml_diff>

<commit_message>
actualice el diagnostico y la fuente de COMING SA
</commit_message>
<xml_diff>
--- a/Documentacion/Informe Preliminar/Presentacion Informe Preliminar.pptx
+++ b/Documentacion/Informe Preliminar/Presentacion Informe Preliminar.pptx
@@ -3202,37 +3202,37 @@
     </dgm:pt>
   </dgm:ptLst>
   <dgm:cxnLst>
+    <dgm:cxn modelId="{A502A20D-F1EB-431E-AD40-CA36DEF08E0E}" type="presOf" srcId="{C5363DF5-6055-4341-AD2B-9AA1A5B2F2B6}" destId="{5057AD14-38F6-458F-BAE1-3D333085630D}" srcOrd="0" destOrd="0" presId="urn:microsoft.com/office/officeart/2005/8/layout/process5"/>
+    <dgm:cxn modelId="{28429E7C-EF63-4BFD-8E07-1C3518A04993}" type="presOf" srcId="{E9E5433C-AB76-4158-AD3E-4E6FF0739C9A}" destId="{E55E39E1-8F7F-45DE-9CA6-BD910E1D29B1}" srcOrd="0" destOrd="0" presId="urn:microsoft.com/office/officeart/2005/8/layout/process5"/>
+    <dgm:cxn modelId="{C60D99F0-0E80-4B18-B2D3-8E105EFFAA44}" type="presOf" srcId="{151151C1-35B6-4928-93D9-A9E226FC3783}" destId="{C4945E92-62A5-4028-985B-044CB1801FC6}" srcOrd="0" destOrd="0" presId="urn:microsoft.com/office/officeart/2005/8/layout/process5"/>
+    <dgm:cxn modelId="{05937470-3CB7-49A5-89CE-21B727B572F8}" type="presOf" srcId="{290EE53D-C453-435B-9D9E-35269E34EC5B}" destId="{BF7D1F94-0055-474F-9755-6BA87ECBBB1A}" srcOrd="1" destOrd="0" presId="urn:microsoft.com/office/officeart/2005/8/layout/process5"/>
+    <dgm:cxn modelId="{2746D4AF-FD7E-47DD-A1BD-3A6025B02755}" srcId="{C5363DF5-6055-4341-AD2B-9AA1A5B2F2B6}" destId="{2F902911-805E-4BB2-A59F-8B478EFD9F21}" srcOrd="6" destOrd="0" parTransId="{CF8EB303-0390-429E-899E-7CA14E20420B}" sibTransId="{7D3F80E0-CDF6-49F5-BA06-F236A20E0C28}"/>
+    <dgm:cxn modelId="{5754C11A-289D-4ED2-9331-1EC80F2164FB}" type="presOf" srcId="{2F902911-805E-4BB2-A59F-8B478EFD9F21}" destId="{269AD2C7-2C78-48F1-9B02-4BA8B897BB5C}" srcOrd="0" destOrd="0" presId="urn:microsoft.com/office/officeart/2005/8/layout/process5"/>
+    <dgm:cxn modelId="{3B391A99-36E1-4702-B58D-6F2001C5C2F3}" type="presOf" srcId="{42C6E17D-9679-4665-A315-91DE7DAD26B5}" destId="{E18B533A-C6D3-4CCA-A75B-075F2FE99905}" srcOrd="0" destOrd="0" presId="urn:microsoft.com/office/officeart/2005/8/layout/process5"/>
+    <dgm:cxn modelId="{F9008E11-01C9-4D85-AB85-B00A481F666F}" type="presOf" srcId="{7D3F80E0-CDF6-49F5-BA06-F236A20E0C28}" destId="{EEB151B0-951F-4102-A9AB-025AADD2ACCB}" srcOrd="0" destOrd="0" presId="urn:microsoft.com/office/officeart/2005/8/layout/process5"/>
+    <dgm:cxn modelId="{84B1D75C-15D9-424D-B9B9-44660DD4CF54}" type="presOf" srcId="{350A8695-B415-4BA8-ABA1-3CE0F3D29D85}" destId="{1D053020-6255-4EC1-B48E-D263909F37E0}" srcOrd="0" destOrd="0" presId="urn:microsoft.com/office/officeart/2005/8/layout/process5"/>
+    <dgm:cxn modelId="{E64572BC-E3D8-4EE9-A36C-9FEE388C46C8}" srcId="{C5363DF5-6055-4341-AD2B-9AA1A5B2F2B6}" destId="{08643A8E-A99F-4328-86CB-72387C37FCCD}" srcOrd="7" destOrd="0" parTransId="{22AE4520-5BB0-4AD7-81CB-AAAAE42F67EB}" sibTransId="{E0D53043-E2DC-4A8A-8F1B-39B3ED9DB1F4}"/>
+    <dgm:cxn modelId="{6F53D212-720E-4CD5-A491-25276D53F53B}" type="presOf" srcId="{6B43E6E7-D469-4928-92E6-C29E8570A94F}" destId="{AFD192A2-D8A4-47D8-8F28-39CABE712FB2}" srcOrd="1" destOrd="0" presId="urn:microsoft.com/office/officeart/2005/8/layout/process5"/>
+    <dgm:cxn modelId="{77EC8013-A972-4A3A-A5E4-D83A577E19D3}" srcId="{C5363DF5-6055-4341-AD2B-9AA1A5B2F2B6}" destId="{BC4C3A05-55FB-4488-9F3E-C2C37915CBBF}" srcOrd="3" destOrd="0" parTransId="{399F6AEA-505D-46BE-B019-ED11F891940F}" sibTransId="{6B43E6E7-D469-4928-92E6-C29E8570A94F}"/>
+    <dgm:cxn modelId="{7D6C0E35-4489-4170-BC51-04C4AB4E892A}" type="presOf" srcId="{FD28C269-B148-4BDF-8AA4-4265F453A4E5}" destId="{96EA98A3-ED5C-4801-BB75-774A6066E9D1}" srcOrd="0" destOrd="0" presId="urn:microsoft.com/office/officeart/2005/8/layout/process5"/>
+    <dgm:cxn modelId="{55CEACDA-C87D-4B6A-8F5B-07FFF927FF72}" srcId="{C5363DF5-6055-4341-AD2B-9AA1A5B2F2B6}" destId="{E79D1DFF-E910-4421-825E-128D8A492C5B}" srcOrd="0" destOrd="0" parTransId="{0D3A1E75-1205-4EE5-BDDE-1B56F0B76A54}" sibTransId="{E9E5433C-AB76-4158-AD3E-4E6FF0739C9A}"/>
+    <dgm:cxn modelId="{CF93599B-A2E3-4CE5-89C9-ABB88A38816F}" type="presOf" srcId="{E79D1DFF-E910-4421-825E-128D8A492C5B}" destId="{88D90226-35C4-409B-95DB-A53D0DBCA776}" srcOrd="0" destOrd="0" presId="urn:microsoft.com/office/officeart/2005/8/layout/process5"/>
+    <dgm:cxn modelId="{9E74D380-3B35-4267-936B-D81FEB2C6B66}" srcId="{C5363DF5-6055-4341-AD2B-9AA1A5B2F2B6}" destId="{350A8695-B415-4BA8-ABA1-3CE0F3D29D85}" srcOrd="4" destOrd="0" parTransId="{AD6B1243-BC53-411C-B0B0-45FBE92DE253}" sibTransId="{FC563921-9404-4619-A143-ED8300475E42}"/>
+    <dgm:cxn modelId="{ED919DF5-B530-4B9D-B669-63482591B9D0}" srcId="{C5363DF5-6055-4341-AD2B-9AA1A5B2F2B6}" destId="{FD28C269-B148-4BDF-8AA4-4265F453A4E5}" srcOrd="2" destOrd="0" parTransId="{A521F114-8F47-4106-AB42-7DFF4864FF6D}" sibTransId="{290EE53D-C453-435B-9D9E-35269E34EC5B}"/>
     <dgm:cxn modelId="{7D7F0BCF-ABA1-4DBF-B3C5-15A7E0D923F4}" type="presOf" srcId="{290EE53D-C453-435B-9D9E-35269E34EC5B}" destId="{0111F070-09B0-44AB-B420-56677F7966B9}" srcOrd="0" destOrd="0" presId="urn:microsoft.com/office/officeart/2005/8/layout/process5"/>
+    <dgm:cxn modelId="{9E529A8B-1CF4-4D31-B8EE-9BC10CD21B6B}" type="presOf" srcId="{6B43E6E7-D469-4928-92E6-C29E8570A94F}" destId="{DC791235-75B4-4861-821D-75CBE75BCAF7}" srcOrd="0" destOrd="0" presId="urn:microsoft.com/office/officeart/2005/8/layout/process5"/>
+    <dgm:cxn modelId="{860BFC70-5F8C-441B-9691-200F29BD8ED8}" type="presOf" srcId="{7D3F80E0-CDF6-49F5-BA06-F236A20E0C28}" destId="{7E657264-A28E-4EF5-897C-D8923C3F1A88}" srcOrd="1" destOrd="0" presId="urn:microsoft.com/office/officeart/2005/8/layout/process5"/>
     <dgm:cxn modelId="{88A368DC-5564-421A-BCB5-0AB6A2938590}" srcId="{C5363DF5-6055-4341-AD2B-9AA1A5B2F2B6}" destId="{42C6E17D-9679-4665-A315-91DE7DAD26B5}" srcOrd="5" destOrd="0" parTransId="{63E5E51D-9A58-46C8-9961-B064B21B680D}" sibTransId="{151151C1-35B6-4928-93D9-A9E226FC3783}"/>
     <dgm:cxn modelId="{E59F82B5-DB2C-41E5-BB6E-D12FBAC3F51F}" type="presOf" srcId="{5AD11288-4E84-44AA-B404-EB28CA0256B4}" destId="{285D4231-58A7-4A8D-B065-3B5550752B5D}" srcOrd="0" destOrd="0" presId="urn:microsoft.com/office/officeart/2005/8/layout/process5"/>
-    <dgm:cxn modelId="{05937470-3CB7-49A5-89CE-21B727B572F8}" type="presOf" srcId="{290EE53D-C453-435B-9D9E-35269E34EC5B}" destId="{BF7D1F94-0055-474F-9755-6BA87ECBBB1A}" srcOrd="1" destOrd="0" presId="urn:microsoft.com/office/officeart/2005/8/layout/process5"/>
-    <dgm:cxn modelId="{860BFC70-5F8C-441B-9691-200F29BD8ED8}" type="presOf" srcId="{7D3F80E0-CDF6-49F5-BA06-F236A20E0C28}" destId="{7E657264-A28E-4EF5-897C-D8923C3F1A88}" srcOrd="1" destOrd="0" presId="urn:microsoft.com/office/officeart/2005/8/layout/process5"/>
-    <dgm:cxn modelId="{A502A20D-F1EB-431E-AD40-CA36DEF08E0E}" type="presOf" srcId="{C5363DF5-6055-4341-AD2B-9AA1A5B2F2B6}" destId="{5057AD14-38F6-458F-BAE1-3D333085630D}" srcOrd="0" destOrd="0" presId="urn:microsoft.com/office/officeart/2005/8/layout/process5"/>
-    <dgm:cxn modelId="{ED919DF5-B530-4B9D-B669-63482591B9D0}" srcId="{C5363DF5-6055-4341-AD2B-9AA1A5B2F2B6}" destId="{FD28C269-B148-4BDF-8AA4-4265F453A4E5}" srcOrd="2" destOrd="0" parTransId="{A521F114-8F47-4106-AB42-7DFF4864FF6D}" sibTransId="{290EE53D-C453-435B-9D9E-35269E34EC5B}"/>
+    <dgm:cxn modelId="{66BB6AD7-505B-4C7D-AACD-F7033737FDDA}" type="presOf" srcId="{08643A8E-A99F-4328-86CB-72387C37FCCD}" destId="{950A0EE2-E9AF-413D-B3AB-B2BE9BF30743}" srcOrd="0" destOrd="0" presId="urn:microsoft.com/office/officeart/2005/8/layout/process5"/>
+    <dgm:cxn modelId="{EBCDC872-9CB2-4AD8-8AC3-B565509254F8}" type="presOf" srcId="{DC494F16-C076-4743-9478-0048494E6317}" destId="{58B57261-0747-48FE-A1A6-719C2514B016}" srcOrd="0" destOrd="0" presId="urn:microsoft.com/office/officeart/2005/8/layout/process5"/>
+    <dgm:cxn modelId="{8D89F04E-21C6-4A52-AFF6-F12F5A84113D}" type="presOf" srcId="{FC563921-9404-4619-A143-ED8300475E42}" destId="{2641E811-5A6F-428C-B1C8-8F281D6685B6}" srcOrd="0" destOrd="0" presId="urn:microsoft.com/office/officeart/2005/8/layout/process5"/>
+    <dgm:cxn modelId="{3D9E3008-6276-4D30-9707-617B42A8B17B}" type="presOf" srcId="{FC563921-9404-4619-A143-ED8300475E42}" destId="{950832D6-0485-482B-BCCD-CB57C5D37C96}" srcOrd="1" destOrd="0" presId="urn:microsoft.com/office/officeart/2005/8/layout/process5"/>
+    <dgm:cxn modelId="{2A3CA525-208B-4A1A-B7ED-D5A49E347EF6}" type="presOf" srcId="{DC494F16-C076-4743-9478-0048494E6317}" destId="{D4CA0173-9572-4B1A-8AFB-17DFCEBDF9FA}" srcOrd="1" destOrd="0" presId="urn:microsoft.com/office/officeart/2005/8/layout/process5"/>
     <dgm:cxn modelId="{E4FF3CD0-E13E-4C8D-9C42-223CB655ED80}" srcId="{C5363DF5-6055-4341-AD2B-9AA1A5B2F2B6}" destId="{5AD11288-4E84-44AA-B404-EB28CA0256B4}" srcOrd="1" destOrd="0" parTransId="{1C010112-D662-45AF-A61C-C16AB2207D26}" sibTransId="{DC494F16-C076-4743-9478-0048494E6317}"/>
-    <dgm:cxn modelId="{2A3CA525-208B-4A1A-B7ED-D5A49E347EF6}" type="presOf" srcId="{DC494F16-C076-4743-9478-0048494E6317}" destId="{D4CA0173-9572-4B1A-8AFB-17DFCEBDF9FA}" srcOrd="1" destOrd="0" presId="urn:microsoft.com/office/officeart/2005/8/layout/process5"/>
     <dgm:cxn modelId="{28064953-9125-49C8-B804-E1E4F79D28A7}" type="presOf" srcId="{E9E5433C-AB76-4158-AD3E-4E6FF0739C9A}" destId="{A503A6AB-5932-4271-9DC4-2F91AC48216E}" srcOrd="1" destOrd="0" presId="urn:microsoft.com/office/officeart/2005/8/layout/process5"/>
-    <dgm:cxn modelId="{C60D99F0-0E80-4B18-B2D3-8E105EFFAA44}" type="presOf" srcId="{151151C1-35B6-4928-93D9-A9E226FC3783}" destId="{C4945E92-62A5-4028-985B-044CB1801FC6}" srcOrd="0" destOrd="0" presId="urn:microsoft.com/office/officeart/2005/8/layout/process5"/>
-    <dgm:cxn modelId="{EBCDC872-9CB2-4AD8-8AC3-B565509254F8}" type="presOf" srcId="{DC494F16-C076-4743-9478-0048494E6317}" destId="{58B57261-0747-48FE-A1A6-719C2514B016}" srcOrd="0" destOrd="0" presId="urn:microsoft.com/office/officeart/2005/8/layout/process5"/>
-    <dgm:cxn modelId="{55CEACDA-C87D-4B6A-8F5B-07FFF927FF72}" srcId="{C5363DF5-6055-4341-AD2B-9AA1A5B2F2B6}" destId="{E79D1DFF-E910-4421-825E-128D8A492C5B}" srcOrd="0" destOrd="0" parTransId="{0D3A1E75-1205-4EE5-BDDE-1B56F0B76A54}" sibTransId="{E9E5433C-AB76-4158-AD3E-4E6FF0739C9A}"/>
-    <dgm:cxn modelId="{CF93599B-A2E3-4CE5-89C9-ABB88A38816F}" type="presOf" srcId="{E79D1DFF-E910-4421-825E-128D8A492C5B}" destId="{88D90226-35C4-409B-95DB-A53D0DBCA776}" srcOrd="0" destOrd="0" presId="urn:microsoft.com/office/officeart/2005/8/layout/process5"/>
-    <dgm:cxn modelId="{8D89F04E-21C6-4A52-AFF6-F12F5A84113D}" type="presOf" srcId="{FC563921-9404-4619-A143-ED8300475E42}" destId="{2641E811-5A6F-428C-B1C8-8F281D6685B6}" srcOrd="0" destOrd="0" presId="urn:microsoft.com/office/officeart/2005/8/layout/process5"/>
-    <dgm:cxn modelId="{66BB6AD7-505B-4C7D-AACD-F7033737FDDA}" type="presOf" srcId="{08643A8E-A99F-4328-86CB-72387C37FCCD}" destId="{950A0EE2-E9AF-413D-B3AB-B2BE9BF30743}" srcOrd="0" destOrd="0" presId="urn:microsoft.com/office/officeart/2005/8/layout/process5"/>
-    <dgm:cxn modelId="{E64572BC-E3D8-4EE9-A36C-9FEE388C46C8}" srcId="{C5363DF5-6055-4341-AD2B-9AA1A5B2F2B6}" destId="{08643A8E-A99F-4328-86CB-72387C37FCCD}" srcOrd="7" destOrd="0" parTransId="{22AE4520-5BB0-4AD7-81CB-AAAAE42F67EB}" sibTransId="{E0D53043-E2DC-4A8A-8F1B-39B3ED9DB1F4}"/>
+    <dgm:cxn modelId="{2AAD030A-A5C9-4868-889B-7CA6545C0AEF}" type="presOf" srcId="{BC4C3A05-55FB-4488-9F3E-C2C37915CBBF}" destId="{69574F30-2D61-4E9B-9957-68812FAD3007}" srcOrd="0" destOrd="0" presId="urn:microsoft.com/office/officeart/2005/8/layout/process5"/>
     <dgm:cxn modelId="{54463964-CFD9-457B-B656-90D905AAD59A}" type="presOf" srcId="{151151C1-35B6-4928-93D9-A9E226FC3783}" destId="{C373AA40-5458-4D11-9658-166058BF29C1}" srcOrd="1" destOrd="0" presId="urn:microsoft.com/office/officeart/2005/8/layout/process5"/>
-    <dgm:cxn modelId="{3B391A99-36E1-4702-B58D-6F2001C5C2F3}" type="presOf" srcId="{42C6E17D-9679-4665-A315-91DE7DAD26B5}" destId="{E18B533A-C6D3-4CCA-A75B-075F2FE99905}" srcOrd="0" destOrd="0" presId="urn:microsoft.com/office/officeart/2005/8/layout/process5"/>
-    <dgm:cxn modelId="{9E74D380-3B35-4267-936B-D81FEB2C6B66}" srcId="{C5363DF5-6055-4341-AD2B-9AA1A5B2F2B6}" destId="{350A8695-B415-4BA8-ABA1-3CE0F3D29D85}" srcOrd="4" destOrd="0" parTransId="{AD6B1243-BC53-411C-B0B0-45FBE92DE253}" sibTransId="{FC563921-9404-4619-A143-ED8300475E42}"/>
-    <dgm:cxn modelId="{2AAD030A-A5C9-4868-889B-7CA6545C0AEF}" type="presOf" srcId="{BC4C3A05-55FB-4488-9F3E-C2C37915CBBF}" destId="{69574F30-2D61-4E9B-9957-68812FAD3007}" srcOrd="0" destOrd="0" presId="urn:microsoft.com/office/officeart/2005/8/layout/process5"/>
-    <dgm:cxn modelId="{6F53D212-720E-4CD5-A491-25276D53F53B}" type="presOf" srcId="{6B43E6E7-D469-4928-92E6-C29E8570A94F}" destId="{AFD192A2-D8A4-47D8-8F28-39CABE712FB2}" srcOrd="1" destOrd="0" presId="urn:microsoft.com/office/officeart/2005/8/layout/process5"/>
-    <dgm:cxn modelId="{F9008E11-01C9-4D85-AB85-B00A481F666F}" type="presOf" srcId="{7D3F80E0-CDF6-49F5-BA06-F236A20E0C28}" destId="{EEB151B0-951F-4102-A9AB-025AADD2ACCB}" srcOrd="0" destOrd="0" presId="urn:microsoft.com/office/officeart/2005/8/layout/process5"/>
-    <dgm:cxn modelId="{2746D4AF-FD7E-47DD-A1BD-3A6025B02755}" srcId="{C5363DF5-6055-4341-AD2B-9AA1A5B2F2B6}" destId="{2F902911-805E-4BB2-A59F-8B478EFD9F21}" srcOrd="6" destOrd="0" parTransId="{CF8EB303-0390-429E-899E-7CA14E20420B}" sibTransId="{7D3F80E0-CDF6-49F5-BA06-F236A20E0C28}"/>
-    <dgm:cxn modelId="{3D9E3008-6276-4D30-9707-617B42A8B17B}" type="presOf" srcId="{FC563921-9404-4619-A143-ED8300475E42}" destId="{950832D6-0485-482B-BCCD-CB57C5D37C96}" srcOrd="1" destOrd="0" presId="urn:microsoft.com/office/officeart/2005/8/layout/process5"/>
-    <dgm:cxn modelId="{9E529A8B-1CF4-4D31-B8EE-9BC10CD21B6B}" type="presOf" srcId="{6B43E6E7-D469-4928-92E6-C29E8570A94F}" destId="{DC791235-75B4-4861-821D-75CBE75BCAF7}" srcOrd="0" destOrd="0" presId="urn:microsoft.com/office/officeart/2005/8/layout/process5"/>
-    <dgm:cxn modelId="{84B1D75C-15D9-424D-B9B9-44660DD4CF54}" type="presOf" srcId="{350A8695-B415-4BA8-ABA1-3CE0F3D29D85}" destId="{1D053020-6255-4EC1-B48E-D263909F37E0}" srcOrd="0" destOrd="0" presId="urn:microsoft.com/office/officeart/2005/8/layout/process5"/>
-    <dgm:cxn modelId="{5754C11A-289D-4ED2-9331-1EC80F2164FB}" type="presOf" srcId="{2F902911-805E-4BB2-A59F-8B478EFD9F21}" destId="{269AD2C7-2C78-48F1-9B02-4BA8B897BB5C}" srcOrd="0" destOrd="0" presId="urn:microsoft.com/office/officeart/2005/8/layout/process5"/>
-    <dgm:cxn modelId="{28429E7C-EF63-4BFD-8E07-1C3518A04993}" type="presOf" srcId="{E9E5433C-AB76-4158-AD3E-4E6FF0739C9A}" destId="{E55E39E1-8F7F-45DE-9CA6-BD910E1D29B1}" srcOrd="0" destOrd="0" presId="urn:microsoft.com/office/officeart/2005/8/layout/process5"/>
-    <dgm:cxn modelId="{7D6C0E35-4489-4170-BC51-04C4AB4E892A}" type="presOf" srcId="{FD28C269-B148-4BDF-8AA4-4265F453A4E5}" destId="{96EA98A3-ED5C-4801-BB75-774A6066E9D1}" srcOrd="0" destOrd="0" presId="urn:microsoft.com/office/officeart/2005/8/layout/process5"/>
-    <dgm:cxn modelId="{77EC8013-A972-4A3A-A5E4-D83A577E19D3}" srcId="{C5363DF5-6055-4341-AD2B-9AA1A5B2F2B6}" destId="{BC4C3A05-55FB-4488-9F3E-C2C37915CBBF}" srcOrd="3" destOrd="0" parTransId="{399F6AEA-505D-46BE-B019-ED11F891940F}" sibTransId="{6B43E6E7-D469-4928-92E6-C29E8570A94F}"/>
     <dgm:cxn modelId="{87364431-F6E5-41A3-8F1F-9C1AF65D9337}" type="presParOf" srcId="{5057AD14-38F6-458F-BAE1-3D333085630D}" destId="{88D90226-35C4-409B-95DB-A53D0DBCA776}" srcOrd="0" destOrd="0" presId="urn:microsoft.com/office/officeart/2005/8/layout/process5"/>
     <dgm:cxn modelId="{6B9A194B-6820-4674-9176-7B1EB2BE619F}" type="presParOf" srcId="{5057AD14-38F6-458F-BAE1-3D333085630D}" destId="{E55E39E1-8F7F-45DE-9CA6-BD910E1D29B1}" srcOrd="1" destOrd="0" presId="urn:microsoft.com/office/officeart/2005/8/layout/process5"/>
     <dgm:cxn modelId="{24FB8438-D275-4182-8923-E44CFBB6DA53}" type="presParOf" srcId="{E55E39E1-8F7F-45DE-9CA6-BD910E1D29B1}" destId="{A503A6AB-5932-4271-9DC4-2F91AC48216E}" srcOrd="0" destOrd="0" presId="urn:microsoft.com/office/officeart/2005/8/layout/process5"/>
@@ -23815,8 +23815,9 @@
           <a:p>
             <a:r>
               <a:rPr lang="es-AR" dirty="0" smtClean="0"/>
-              <a:t>Gestión de pagos manual</a:t>
+              <a:t>Complejidad con la gestión de pagos</a:t>
             </a:r>
+            <a:endParaRPr lang="es-AR" dirty="0" smtClean="0"/>
           </a:p>
           <a:p>
             <a:pPr marL="68580" indent="0">
@@ -25714,23 +25715,7 @@
                   <a:schemeClr val="tx1"/>
                 </a:solidFill>
               </a:rPr>
-              <a:t>: Agente de asistencia </a:t>
-            </a:r>
-            <a:r>
-              <a:rPr lang="es-AR" dirty="0" smtClean="0">
-                <a:solidFill>
-                  <a:schemeClr val="tx1"/>
-                </a:solidFill>
-              </a:rPr>
-              <a:t>técnica </a:t>
-            </a:r>
-            <a:r>
-              <a:rPr lang="es-AR" dirty="0" smtClean="0">
-                <a:solidFill>
-                  <a:schemeClr val="tx1"/>
-                </a:solidFill>
-              </a:rPr>
-              <a:t>para Pymes en Jazztel (empresa española de telecomunicaciones).</a:t>
+              <a:t>: Agente de asistencia técnica para Pymes en Jazztel (empresa española de telecomunicaciones).</a:t>
             </a:r>
           </a:p>
           <a:p>
@@ -26794,7 +26779,29 @@
               <a:buNone/>
             </a:pPr>
             <a:r>
-              <a:rPr lang="es-ES" sz="4000" b="1" dirty="0" smtClean="0"/>
+              <a:rPr lang="es-ES" sz="4000" b="1" dirty="0" smtClean="0">
+                <a:ln w="12700">
+                  <a:solidFill>
+                    <a:schemeClr val="tx2">
+                      <a:satMod val="155000"/>
+                    </a:schemeClr>
+                  </a:solidFill>
+                  <a:prstDash val="solid"/>
+                </a:ln>
+                <a:solidFill>
+                  <a:schemeClr val="bg2">
+                    <a:tint val="85000"/>
+                    <a:satMod val="155000"/>
+                  </a:schemeClr>
+                </a:solidFill>
+                <a:effectLst>
+                  <a:outerShdw blurRad="41275" dist="20320" dir="1800000" algn="tl" rotWithShape="0">
+                    <a:srgbClr val="000000">
+                      <a:alpha val="40000"/>
+                    </a:srgbClr>
+                  </a:outerShdw>
+                </a:effectLst>
+              </a:rPr>
               <a:t>COMING S.A.</a:t>
             </a:r>
           </a:p>
@@ -26814,11 +26821,7 @@
             </a:r>
             <a:r>
               <a:rPr lang="es-AR" sz="1800" dirty="0" smtClean="0"/>
-              <a:t>specializado </a:t>
-            </a:r>
-            <a:r>
-              <a:rPr lang="es-AR" sz="1800" dirty="0" smtClean="0"/>
-              <a:t>en telecomunicaciones para celulares.</a:t>
+              <a:t>specializado en telecomunicaciones para celulares.</a:t>
             </a:r>
           </a:p>
           <a:p>
@@ -26844,11 +26847,7 @@
             </a:r>
             <a:r>
               <a:rPr lang="es-AR" sz="1800" dirty="0" smtClean="0"/>
-              <a:t>n </a:t>
-            </a:r>
-            <a:r>
-              <a:rPr lang="es-AR" sz="1800" dirty="0" smtClean="0"/>
-              <a:t>1995 ya incursionaron en telefonía.</a:t>
+              <a:t>n 1995 ya incursionaron en telefonía.</a:t>
             </a:r>
             <a:endParaRPr lang="en-US" dirty="0"/>
           </a:p>
@@ -27288,7 +27287,29 @@
               <a:buNone/>
             </a:pPr>
             <a:r>
-              <a:rPr lang="es-ES" sz="3200" b="1" dirty="0" smtClean="0"/>
+              <a:rPr lang="es-ES" sz="3200" b="1" dirty="0" smtClean="0">
+                <a:ln w="12700">
+                  <a:solidFill>
+                    <a:schemeClr val="tx2">
+                      <a:satMod val="155000"/>
+                    </a:schemeClr>
+                  </a:solidFill>
+                  <a:prstDash val="solid"/>
+                </a:ln>
+                <a:solidFill>
+                  <a:schemeClr val="bg2">
+                    <a:tint val="85000"/>
+                    <a:satMod val="155000"/>
+                  </a:schemeClr>
+                </a:solidFill>
+                <a:effectLst>
+                  <a:outerShdw blurRad="41275" dist="20320" dir="1800000" algn="tl" rotWithShape="0">
+                    <a:srgbClr val="000000">
+                      <a:alpha val="40000"/>
+                    </a:srgbClr>
+                  </a:outerShdw>
+                </a:effectLst>
+              </a:rPr>
               <a:t>COMING S.A.</a:t>
             </a:r>
           </a:p>

</xml_diff>

<commit_message>
agrege los cambios de Carlos sobre soft y la experiencia laboral de Sergio
</commit_message>
<xml_diff>
--- a/Documentacion/Informe Preliminar/Presentacion Informe Preliminar.pptx
+++ b/Documentacion/Informe Preliminar/Presentacion Informe Preliminar.pptx
@@ -4423,6 +4423,13 @@
         </dgm:presLayoutVars>
       </dgm:prSet>
       <dgm:spPr/>
+      <dgm:t>
+        <a:bodyPr/>
+        <a:lstStyle/>
+        <a:p>
+          <a:endParaRPr lang="en-US"/>
+        </a:p>
+      </dgm:t>
     </dgm:pt>
     <dgm:pt modelId="{3EECDA9C-80A6-4FD0-93CD-CC698886C13F}" type="pres">
       <dgm:prSet presAssocID="{08E1CF32-7D7D-4CF2-BAA9-C037C0EC0945}" presName="linNode" presStyleCnt="0"/>
@@ -4553,6 +4560,13 @@
         </dgm:presLayoutVars>
       </dgm:prSet>
       <dgm:spPr/>
+      <dgm:t>
+        <a:bodyPr/>
+        <a:lstStyle/>
+        <a:p>
+          <a:endParaRPr lang="en-US"/>
+        </a:p>
+      </dgm:t>
     </dgm:pt>
     <dgm:pt modelId="{1DF7ADA8-0EAC-48DE-AFD6-FDBB67CD9962}" type="pres">
       <dgm:prSet presAssocID="{813616D9-BE8E-4A10-BF86-762692BB6A0F}" presName="descendantText" presStyleLbl="alignAccFollowNode1" presStyleIdx="3" presStyleCnt="4">
@@ -4571,27 +4585,27 @@
     </dgm:pt>
   </dgm:ptLst>
   <dgm:cxnLst>
+    <dgm:cxn modelId="{4F6497EC-0E13-4491-AA8A-9146CAA5363A}" type="presOf" srcId="{813616D9-BE8E-4A10-BF86-762692BB6A0F}" destId="{BBB6B52B-E046-4419-AB1D-58DD3C86F0D8}" srcOrd="0" destOrd="0" presId="urn:microsoft.com/office/officeart/2005/8/layout/vList5"/>
+    <dgm:cxn modelId="{B3A6CE16-803A-489F-AD0E-2100646AF1AE}" srcId="{454E7899-FD60-471D-A87C-7F22BA1EC279}" destId="{34496EE1-B95B-44E8-BB0A-0CAC482AB970}" srcOrd="0" destOrd="0" parTransId="{D29517DA-32A9-439E-B16D-511E21F194AD}" sibTransId="{C038C20B-2977-4BC8-BE69-AB6BD2E32905}"/>
+    <dgm:cxn modelId="{1C42CEE4-70ED-4EF2-8A8C-40DD12C2F2FD}" type="presOf" srcId="{454E7899-FD60-471D-A87C-7F22BA1EC279}" destId="{B7CE4811-3286-4DF5-8DD8-3FB6DEAC28E9}" srcOrd="0" destOrd="0" presId="urn:microsoft.com/office/officeart/2005/8/layout/vList5"/>
+    <dgm:cxn modelId="{69A0E095-17E7-42E7-94DF-6521557440D8}" srcId="{08E1CF32-7D7D-4CF2-BAA9-C037C0EC0945}" destId="{5913FBD2-A8EA-4DD9-B679-25A7E714503E}" srcOrd="1" destOrd="0" parTransId="{50B59DB0-D698-4E18-9C75-DED440676B7C}" sibTransId="{C845D9E3-1694-466B-A08B-2FF052C9DA60}"/>
+    <dgm:cxn modelId="{BA4EB1E3-BF27-43E0-9B6B-011D52333FF5}" srcId="{0069092C-E876-4322-B292-7F8C73C3584F}" destId="{454E7899-FD60-471D-A87C-7F22BA1EC279}" srcOrd="2" destOrd="0" parTransId="{450023FD-E05D-46DD-97F6-01EC1F446AF8}" sibTransId="{CAAB7403-FC4F-4CE9-B67F-90C081C8A81C}"/>
+    <dgm:cxn modelId="{F3ADDCB6-3E47-47F9-91B2-17A368B362A1}" type="presOf" srcId="{852AA831-7837-42DD-942D-617B2AD798FD}" destId="{F32870B6-D861-425B-A22A-69583A7DE8E8}" srcOrd="0" destOrd="0" presId="urn:microsoft.com/office/officeart/2005/8/layout/vList5"/>
+    <dgm:cxn modelId="{17A4585D-7AE7-4DF7-BD4F-28F26443DC4A}" srcId="{9D53F5CF-E73A-49B8-82D5-67B6E1B4D3B0}" destId="{852AA831-7837-42DD-942D-617B2AD798FD}" srcOrd="0" destOrd="0" parTransId="{8CBF793F-D39E-496A-A905-BCC78B32A0A3}" sibTransId="{F2E800E2-1A52-4F90-9030-3DD289CD9ED0}"/>
+    <dgm:cxn modelId="{BE28C560-7A14-49BD-8CB1-20BE8BD2BE7C}" type="presOf" srcId="{0069092C-E876-4322-B292-7F8C73C3584F}" destId="{A269C954-6C69-4EFD-BC78-8B18276D4525}" srcOrd="0" destOrd="0" presId="urn:microsoft.com/office/officeart/2005/8/layout/vList5"/>
+    <dgm:cxn modelId="{FAA15890-4F2A-44A5-B421-87163F49C83F}" srcId="{0069092C-E876-4322-B292-7F8C73C3584F}" destId="{9D53F5CF-E73A-49B8-82D5-67B6E1B4D3B0}" srcOrd="1" destOrd="0" parTransId="{EFD8FFF1-CB0D-440F-8A6B-873EF7FB1F08}" sibTransId="{6E01CB81-79F9-4927-A467-F09033DCA897}"/>
+    <dgm:cxn modelId="{F941BD99-709F-4A42-8543-30C3571183C5}" type="presOf" srcId="{E9E98E57-AA12-4079-AB9F-42765B204AFD}" destId="{1DF7ADA8-0EAC-48DE-AFD6-FDBB67CD9962}" srcOrd="0" destOrd="0" presId="urn:microsoft.com/office/officeart/2005/8/layout/vList5"/>
     <dgm:cxn modelId="{AB09CD83-31B4-4E29-BE3B-CE8AC19DE7C6}" srcId="{0069092C-E876-4322-B292-7F8C73C3584F}" destId="{08E1CF32-7D7D-4CF2-BAA9-C037C0EC0945}" srcOrd="0" destOrd="0" parTransId="{B6516F18-BDC8-4A97-9C5C-6CEE01C69A90}" sibTransId="{C9217CDE-DFED-466C-80F2-DAA6B5AA755A}"/>
+    <dgm:cxn modelId="{315800CF-B7E6-4A19-87E7-FE5151B4F3B2}" type="presOf" srcId="{2760651A-C8D9-4824-8874-1737C10BF8BC}" destId="{08E185FC-CEAB-4B95-8C69-65CB50B7EE28}" srcOrd="0" destOrd="0" presId="urn:microsoft.com/office/officeart/2005/8/layout/vList5"/>
+    <dgm:cxn modelId="{87054BB9-2D7A-494C-B97D-418B47EB2FF3}" type="presOf" srcId="{9D53F5CF-E73A-49B8-82D5-67B6E1B4D3B0}" destId="{22944780-7EA4-41AB-96B8-5A60D8CD2618}" srcOrd="0" destOrd="0" presId="urn:microsoft.com/office/officeart/2005/8/layout/vList5"/>
+    <dgm:cxn modelId="{209AFB32-84E2-41E5-A2D0-AC0687D3F341}" srcId="{813616D9-BE8E-4A10-BF86-762692BB6A0F}" destId="{E9E98E57-AA12-4079-AB9F-42765B204AFD}" srcOrd="0" destOrd="0" parTransId="{C4577ADC-16D1-4D49-8707-154E0725CC4F}" sibTransId="{22148C02-D536-448C-A88E-FA359F360214}"/>
+    <dgm:cxn modelId="{93D22985-73D2-4F07-A135-84B31A761B98}" type="presOf" srcId="{08E1CF32-7D7D-4CF2-BAA9-C037C0EC0945}" destId="{D34768DB-64FD-4294-BFEE-0BC3987FFB41}" srcOrd="0" destOrd="0" presId="urn:microsoft.com/office/officeart/2005/8/layout/vList5"/>
+    <dgm:cxn modelId="{BEB7F87E-90CA-4A5C-B4EE-E34DC6E8D4B9}" type="presOf" srcId="{82EDBB78-BDE0-49D3-BA2A-620A1AA99448}" destId="{1DF7ADA8-0EAC-48DE-AFD6-FDBB67CD9962}" srcOrd="0" destOrd="1" presId="urn:microsoft.com/office/officeart/2005/8/layout/vList5"/>
+    <dgm:cxn modelId="{71B934D1-A1BE-4D03-83AF-914726330904}" srcId="{08E1CF32-7D7D-4CF2-BAA9-C037C0EC0945}" destId="{2760651A-C8D9-4824-8874-1737C10BF8BC}" srcOrd="0" destOrd="0" parTransId="{76463492-48F4-4890-A095-1D24A7F0F984}" sibTransId="{FFEB90C6-A7C7-4B0A-89F2-919DD9364739}"/>
     <dgm:cxn modelId="{53AD09B3-2897-4A02-B7BC-238D5B5CCE92}" type="presOf" srcId="{5913FBD2-A8EA-4DD9-B679-25A7E714503E}" destId="{08E185FC-CEAB-4B95-8C69-65CB50B7EE28}" srcOrd="0" destOrd="1" presId="urn:microsoft.com/office/officeart/2005/8/layout/vList5"/>
+    <dgm:cxn modelId="{3C69F642-B970-4116-8188-D040E030F41C}" srcId="{0069092C-E876-4322-B292-7F8C73C3584F}" destId="{813616D9-BE8E-4A10-BF86-762692BB6A0F}" srcOrd="3" destOrd="0" parTransId="{D5B80464-B801-4E50-B9EE-A4120F3DB6BA}" sibTransId="{EB607165-0503-4330-BE7C-FB630D47E442}"/>
     <dgm:cxn modelId="{FE78F3AE-2FA6-42E9-B720-08B83FEB33CD}" srcId="{813616D9-BE8E-4A10-BF86-762692BB6A0F}" destId="{82EDBB78-BDE0-49D3-BA2A-620A1AA99448}" srcOrd="1" destOrd="0" parTransId="{D7E6FD12-68CA-46EE-A997-236107332458}" sibTransId="{A43D6ED7-12FD-41CF-A98E-BB344017184C}"/>
     <dgm:cxn modelId="{7499C6DD-8ADC-47C7-8691-7CB64F691A26}" type="presOf" srcId="{34496EE1-B95B-44E8-BB0A-0CAC482AB970}" destId="{5BA1A675-5232-4C7A-A9C3-FFF93194D31F}" srcOrd="0" destOrd="0" presId="urn:microsoft.com/office/officeart/2005/8/layout/vList5"/>
-    <dgm:cxn modelId="{69A0E095-17E7-42E7-94DF-6521557440D8}" srcId="{08E1CF32-7D7D-4CF2-BAA9-C037C0EC0945}" destId="{5913FBD2-A8EA-4DD9-B679-25A7E714503E}" srcOrd="1" destOrd="0" parTransId="{50B59DB0-D698-4E18-9C75-DED440676B7C}" sibTransId="{C845D9E3-1694-466B-A08B-2FF052C9DA60}"/>
-    <dgm:cxn modelId="{B3A6CE16-803A-489F-AD0E-2100646AF1AE}" srcId="{454E7899-FD60-471D-A87C-7F22BA1EC279}" destId="{34496EE1-B95B-44E8-BB0A-0CAC482AB970}" srcOrd="0" destOrd="0" parTransId="{D29517DA-32A9-439E-B16D-511E21F194AD}" sibTransId="{C038C20B-2977-4BC8-BE69-AB6BD2E32905}"/>
-    <dgm:cxn modelId="{17A4585D-7AE7-4DF7-BD4F-28F26443DC4A}" srcId="{9D53F5CF-E73A-49B8-82D5-67B6E1B4D3B0}" destId="{852AA831-7837-42DD-942D-617B2AD798FD}" srcOrd="0" destOrd="0" parTransId="{8CBF793F-D39E-496A-A905-BCC78B32A0A3}" sibTransId="{F2E800E2-1A52-4F90-9030-3DD289CD9ED0}"/>
-    <dgm:cxn modelId="{FAA15890-4F2A-44A5-B421-87163F49C83F}" srcId="{0069092C-E876-4322-B292-7F8C73C3584F}" destId="{9D53F5CF-E73A-49B8-82D5-67B6E1B4D3B0}" srcOrd="1" destOrd="0" parTransId="{EFD8FFF1-CB0D-440F-8A6B-873EF7FB1F08}" sibTransId="{6E01CB81-79F9-4927-A467-F09033DCA897}"/>
-    <dgm:cxn modelId="{3C69F642-B970-4116-8188-D040E030F41C}" srcId="{0069092C-E876-4322-B292-7F8C73C3584F}" destId="{813616D9-BE8E-4A10-BF86-762692BB6A0F}" srcOrd="3" destOrd="0" parTransId="{D5B80464-B801-4E50-B9EE-A4120F3DB6BA}" sibTransId="{EB607165-0503-4330-BE7C-FB630D47E442}"/>
-    <dgm:cxn modelId="{209AFB32-84E2-41E5-A2D0-AC0687D3F341}" srcId="{813616D9-BE8E-4A10-BF86-762692BB6A0F}" destId="{E9E98E57-AA12-4079-AB9F-42765B204AFD}" srcOrd="0" destOrd="0" parTransId="{C4577ADC-16D1-4D49-8707-154E0725CC4F}" sibTransId="{22148C02-D536-448C-A88E-FA359F360214}"/>
-    <dgm:cxn modelId="{87054BB9-2D7A-494C-B97D-418B47EB2FF3}" type="presOf" srcId="{9D53F5CF-E73A-49B8-82D5-67B6E1B4D3B0}" destId="{22944780-7EA4-41AB-96B8-5A60D8CD2618}" srcOrd="0" destOrd="0" presId="urn:microsoft.com/office/officeart/2005/8/layout/vList5"/>
-    <dgm:cxn modelId="{4F6497EC-0E13-4491-AA8A-9146CAA5363A}" type="presOf" srcId="{813616D9-BE8E-4A10-BF86-762692BB6A0F}" destId="{BBB6B52B-E046-4419-AB1D-58DD3C86F0D8}" srcOrd="0" destOrd="0" presId="urn:microsoft.com/office/officeart/2005/8/layout/vList5"/>
-    <dgm:cxn modelId="{BE28C560-7A14-49BD-8CB1-20BE8BD2BE7C}" type="presOf" srcId="{0069092C-E876-4322-B292-7F8C73C3584F}" destId="{A269C954-6C69-4EFD-BC78-8B18276D4525}" srcOrd="0" destOrd="0" presId="urn:microsoft.com/office/officeart/2005/8/layout/vList5"/>
-    <dgm:cxn modelId="{71B934D1-A1BE-4D03-83AF-914726330904}" srcId="{08E1CF32-7D7D-4CF2-BAA9-C037C0EC0945}" destId="{2760651A-C8D9-4824-8874-1737C10BF8BC}" srcOrd="0" destOrd="0" parTransId="{76463492-48F4-4890-A095-1D24A7F0F984}" sibTransId="{FFEB90C6-A7C7-4B0A-89F2-919DD9364739}"/>
-    <dgm:cxn modelId="{F3ADDCB6-3E47-47F9-91B2-17A368B362A1}" type="presOf" srcId="{852AA831-7837-42DD-942D-617B2AD798FD}" destId="{F32870B6-D861-425B-A22A-69583A7DE8E8}" srcOrd="0" destOrd="0" presId="urn:microsoft.com/office/officeart/2005/8/layout/vList5"/>
-    <dgm:cxn modelId="{1C42CEE4-70ED-4EF2-8A8C-40DD12C2F2FD}" type="presOf" srcId="{454E7899-FD60-471D-A87C-7F22BA1EC279}" destId="{B7CE4811-3286-4DF5-8DD8-3FB6DEAC28E9}" srcOrd="0" destOrd="0" presId="urn:microsoft.com/office/officeart/2005/8/layout/vList5"/>
-    <dgm:cxn modelId="{BA4EB1E3-BF27-43E0-9B6B-011D52333FF5}" srcId="{0069092C-E876-4322-B292-7F8C73C3584F}" destId="{454E7899-FD60-471D-A87C-7F22BA1EC279}" srcOrd="2" destOrd="0" parTransId="{450023FD-E05D-46DD-97F6-01EC1F446AF8}" sibTransId="{CAAB7403-FC4F-4CE9-B67F-90C081C8A81C}"/>
-    <dgm:cxn modelId="{93D22985-73D2-4F07-A135-84B31A761B98}" type="presOf" srcId="{08E1CF32-7D7D-4CF2-BAA9-C037C0EC0945}" destId="{D34768DB-64FD-4294-BFEE-0BC3987FFB41}" srcOrd="0" destOrd="0" presId="urn:microsoft.com/office/officeart/2005/8/layout/vList5"/>
-    <dgm:cxn modelId="{315800CF-B7E6-4A19-87E7-FE5151B4F3B2}" type="presOf" srcId="{2760651A-C8D9-4824-8874-1737C10BF8BC}" destId="{08E185FC-CEAB-4B95-8C69-65CB50B7EE28}" srcOrd="0" destOrd="0" presId="urn:microsoft.com/office/officeart/2005/8/layout/vList5"/>
-    <dgm:cxn modelId="{F941BD99-709F-4A42-8543-30C3571183C5}" type="presOf" srcId="{E9E98E57-AA12-4079-AB9F-42765B204AFD}" destId="{1DF7ADA8-0EAC-48DE-AFD6-FDBB67CD9962}" srcOrd="0" destOrd="0" presId="urn:microsoft.com/office/officeart/2005/8/layout/vList5"/>
-    <dgm:cxn modelId="{BEB7F87E-90CA-4A5C-B4EE-E34DC6E8D4B9}" type="presOf" srcId="{82EDBB78-BDE0-49D3-BA2A-620A1AA99448}" destId="{1DF7ADA8-0EAC-48DE-AFD6-FDBB67CD9962}" srcOrd="0" destOrd="1" presId="urn:microsoft.com/office/officeart/2005/8/layout/vList5"/>
     <dgm:cxn modelId="{028BC434-580F-44D7-ACE4-E3378A031684}" type="presParOf" srcId="{A269C954-6C69-4EFD-BC78-8B18276D4525}" destId="{3EECDA9C-80A6-4FD0-93CD-CC698886C13F}" srcOrd="0" destOrd="0" presId="urn:microsoft.com/office/officeart/2005/8/layout/vList5"/>
     <dgm:cxn modelId="{F6B3372A-C8F8-45E8-97AB-424F6D5139EA}" type="presParOf" srcId="{3EECDA9C-80A6-4FD0-93CD-CC698886C13F}" destId="{D34768DB-64FD-4294-BFEE-0BC3987FFB41}" srcOrd="0" destOrd="0" presId="urn:microsoft.com/office/officeart/2005/8/layout/vList5"/>
     <dgm:cxn modelId="{9A52CDBD-D2F1-4184-939D-887DAACA044B}" type="presParOf" srcId="{3EECDA9C-80A6-4FD0-93CD-CC698886C13F}" destId="{08E185FC-CEAB-4B95-8C69-65CB50B7EE28}" srcOrd="1" destOrd="0" presId="urn:microsoft.com/office/officeart/2005/8/layout/vList5"/>
@@ -7104,688 +7118,6 @@
       <dsp:cNvGrpSpPr/>
     </dsp:nvGrpSpPr>
     <dsp:grpSpPr/>
-    <dsp:sp modelId="{08E185FC-CEAB-4B95-8C69-65CB50B7EE28}">
-      <dsp:nvSpPr>
-        <dsp:cNvPr id="0" name=""/>
-        <dsp:cNvSpPr/>
-      </dsp:nvSpPr>
-      <dsp:spPr>
-        <a:xfrm rot="5400000">
-          <a:off x="4959781" y="-2037862"/>
-          <a:ext cx="754903" cy="5023278"/>
-        </a:xfrm>
-        <a:prstGeom prst="round2SameRect">
-          <a:avLst/>
-        </a:prstGeom>
-        <a:solidFill>
-          <a:schemeClr val="accent1">
-            <a:alpha val="90000"/>
-            <a:tint val="40000"/>
-            <a:hueOff val="0"/>
-            <a:satOff val="0"/>
-            <a:lumOff val="0"/>
-            <a:alphaOff val="0"/>
-          </a:schemeClr>
-        </a:solidFill>
-        <a:ln w="15875" cap="flat" cmpd="sng" algn="ctr">
-          <a:solidFill>
-            <a:schemeClr val="accent1">
-              <a:alpha val="90000"/>
-              <a:tint val="40000"/>
-              <a:hueOff val="0"/>
-              <a:satOff val="0"/>
-              <a:lumOff val="0"/>
-              <a:alphaOff val="0"/>
-            </a:schemeClr>
-          </a:solidFill>
-          <a:prstDash val="solid"/>
-        </a:ln>
-        <a:effectLst/>
-      </dsp:spPr>
-      <dsp:style>
-        <a:lnRef idx="2">
-          <a:scrgbClr r="0" g="0" b="0"/>
-        </a:lnRef>
-        <a:fillRef idx="1">
-          <a:scrgbClr r="0" g="0" b="0"/>
-        </a:fillRef>
-        <a:effectRef idx="0">
-          <a:scrgbClr r="0" g="0" b="0"/>
-        </a:effectRef>
-        <a:fontRef idx="minor"/>
-      </dsp:style>
-      <dsp:txBody>
-        <a:bodyPr spcFirstLastPara="0" vert="horz" wrap="square" lIns="72390" tIns="36195" rIns="72390" bIns="36195" numCol="1" spcCol="1270" anchor="ctr" anchorCtr="0">
-          <a:noAutofit/>
-        </a:bodyPr>
-        <a:lstStyle/>
-        <a:p>
-          <a:pPr marL="171450" lvl="1" indent="-171450" algn="l" defTabSz="844550">
-            <a:lnSpc>
-              <a:spcPct val="90000"/>
-            </a:lnSpc>
-            <a:spcBef>
-              <a:spcPct val="0"/>
-            </a:spcBef>
-            <a:spcAft>
-              <a:spcPct val="15000"/>
-            </a:spcAft>
-            <a:buChar char="••"/>
-          </a:pPr>
-          <a:r>
-            <a:rPr lang="es-ES" sz="1900" kern="1200" dirty="0" smtClean="0"/>
-            <a:t>Informe preliminar lista de requerimientos</a:t>
-          </a:r>
-          <a:endParaRPr lang="en-US" sz="1900" kern="1200" dirty="0"/>
-        </a:p>
-        <a:p>
-          <a:pPr marL="171450" lvl="1" indent="-171450" algn="l" defTabSz="844550">
-            <a:lnSpc>
-              <a:spcPct val="90000"/>
-            </a:lnSpc>
-            <a:spcBef>
-              <a:spcPct val="0"/>
-            </a:spcBef>
-            <a:spcAft>
-              <a:spcPct val="15000"/>
-            </a:spcAft>
-            <a:buChar char="••"/>
-          </a:pPr>
-          <a:r>
-            <a:rPr lang="es-ES" sz="1900" kern="1200" dirty="0" smtClean="0"/>
-            <a:t>Diagrama de proceso de negocio</a:t>
-          </a:r>
-          <a:endParaRPr lang="en-US" sz="1900" kern="1200" dirty="0"/>
-        </a:p>
-      </dsp:txBody>
-      <dsp:txXfrm rot="-5400000">
-        <a:off x="2825594" y="133176"/>
-        <a:ext cx="4986427" cy="681201"/>
-      </dsp:txXfrm>
-    </dsp:sp>
-    <dsp:sp modelId="{D34768DB-64FD-4294-BFEE-0BC3987FFB41}">
-      <dsp:nvSpPr>
-        <dsp:cNvPr id="0" name=""/>
-        <dsp:cNvSpPr/>
-      </dsp:nvSpPr>
-      <dsp:spPr>
-        <a:xfrm>
-          <a:off x="0" y="1961"/>
-          <a:ext cx="2825593" cy="943628"/>
-        </a:xfrm>
-        <a:prstGeom prst="roundRect">
-          <a:avLst/>
-        </a:prstGeom>
-        <a:solidFill>
-          <a:schemeClr val="accent1">
-            <a:hueOff val="0"/>
-            <a:satOff val="0"/>
-            <a:lumOff val="0"/>
-            <a:alphaOff val="0"/>
-          </a:schemeClr>
-        </a:solidFill>
-        <a:ln w="15875" cap="flat" cmpd="sng" algn="ctr">
-          <a:solidFill>
-            <a:schemeClr val="lt1">
-              <a:hueOff val="0"/>
-              <a:satOff val="0"/>
-              <a:lumOff val="0"/>
-              <a:alphaOff val="0"/>
-            </a:schemeClr>
-          </a:solidFill>
-          <a:prstDash val="solid"/>
-        </a:ln>
-        <a:effectLst/>
-      </dsp:spPr>
-      <dsp:style>
-        <a:lnRef idx="2">
-          <a:scrgbClr r="0" g="0" b="0"/>
-        </a:lnRef>
-        <a:fillRef idx="1">
-          <a:scrgbClr r="0" g="0" b="0"/>
-        </a:fillRef>
-        <a:effectRef idx="0">
-          <a:scrgbClr r="0" g="0" b="0"/>
-        </a:effectRef>
-        <a:fontRef idx="minor">
-          <a:schemeClr val="lt1"/>
-        </a:fontRef>
-      </dsp:style>
-      <dsp:txBody>
-        <a:bodyPr spcFirstLastPara="0" vert="horz" wrap="square" lIns="152400" tIns="76200" rIns="152400" bIns="76200" numCol="1" spcCol="1270" anchor="ctr" anchorCtr="0">
-          <a:noAutofit/>
-        </a:bodyPr>
-        <a:lstStyle/>
-        <a:p>
-          <a:pPr lvl="0" algn="ctr" defTabSz="1778000">
-            <a:lnSpc>
-              <a:spcPct val="90000"/>
-            </a:lnSpc>
-            <a:spcBef>
-              <a:spcPct val="0"/>
-            </a:spcBef>
-            <a:spcAft>
-              <a:spcPct val="35000"/>
-            </a:spcAft>
-          </a:pPr>
-          <a:r>
-            <a:rPr lang="es-AR" sz="4000" kern="1200" dirty="0" smtClean="0"/>
-            <a:t>Iteración 1</a:t>
-          </a:r>
-          <a:endParaRPr lang="en-US" sz="4000" kern="1200" dirty="0"/>
-        </a:p>
-      </dsp:txBody>
-      <dsp:txXfrm>
-        <a:off x="46064" y="48025"/>
-        <a:ext cx="2733465" cy="851500"/>
-      </dsp:txXfrm>
-    </dsp:sp>
-    <dsp:sp modelId="{F32870B6-D861-425B-A22A-69583A7DE8E8}">
-      <dsp:nvSpPr>
-        <dsp:cNvPr id="0" name=""/>
-        <dsp:cNvSpPr/>
-      </dsp:nvSpPr>
-      <dsp:spPr>
-        <a:xfrm rot="5400000">
-          <a:off x="4959781" y="-1047052"/>
-          <a:ext cx="754903" cy="5023278"/>
-        </a:xfrm>
-        <a:prstGeom prst="round2SameRect">
-          <a:avLst/>
-        </a:prstGeom>
-        <a:solidFill>
-          <a:schemeClr val="accent1">
-            <a:alpha val="90000"/>
-            <a:tint val="40000"/>
-            <a:hueOff val="0"/>
-            <a:satOff val="0"/>
-            <a:lumOff val="0"/>
-            <a:alphaOff val="0"/>
-          </a:schemeClr>
-        </a:solidFill>
-        <a:ln w="15875" cap="flat" cmpd="sng" algn="ctr">
-          <a:solidFill>
-            <a:schemeClr val="accent1">
-              <a:alpha val="90000"/>
-              <a:tint val="40000"/>
-              <a:hueOff val="0"/>
-              <a:satOff val="0"/>
-              <a:lumOff val="0"/>
-              <a:alphaOff val="0"/>
-            </a:schemeClr>
-          </a:solidFill>
-          <a:prstDash val="solid"/>
-        </a:ln>
-        <a:effectLst/>
-      </dsp:spPr>
-      <dsp:style>
-        <a:lnRef idx="2">
-          <a:scrgbClr r="0" g="0" b="0"/>
-        </a:lnRef>
-        <a:fillRef idx="1">
-          <a:scrgbClr r="0" g="0" b="0"/>
-        </a:fillRef>
-        <a:effectRef idx="0">
-          <a:scrgbClr r="0" g="0" b="0"/>
-        </a:effectRef>
-        <a:fontRef idx="minor"/>
-      </dsp:style>
-      <dsp:txBody>
-        <a:bodyPr spcFirstLastPara="0" vert="horz" wrap="square" lIns="72390" tIns="36195" rIns="72390" bIns="36195" numCol="1" spcCol="1270" anchor="ctr" anchorCtr="0">
-          <a:noAutofit/>
-        </a:bodyPr>
-        <a:lstStyle/>
-        <a:p>
-          <a:pPr marL="171450" lvl="1" indent="-171450" algn="l" defTabSz="844550">
-            <a:lnSpc>
-              <a:spcPct val="90000"/>
-            </a:lnSpc>
-            <a:spcBef>
-              <a:spcPct val="0"/>
-            </a:spcBef>
-            <a:spcAft>
-              <a:spcPct val="15000"/>
-            </a:spcAft>
-            <a:buChar char="••"/>
-          </a:pPr>
-          <a:r>
-            <a:rPr lang="es-ES" sz="1900" kern="1200" dirty="0" smtClean="0"/>
-            <a:t>ERS</a:t>
-          </a:r>
-          <a:endParaRPr lang="en-US" sz="1900" kern="1200" dirty="0"/>
-        </a:p>
-      </dsp:txBody>
-      <dsp:txXfrm rot="-5400000">
-        <a:off x="2825594" y="1123986"/>
-        <a:ext cx="4986427" cy="681201"/>
-      </dsp:txXfrm>
-    </dsp:sp>
-    <dsp:sp modelId="{22944780-7EA4-41AB-96B8-5A60D8CD2618}">
-      <dsp:nvSpPr>
-        <dsp:cNvPr id="0" name=""/>
-        <dsp:cNvSpPr/>
-      </dsp:nvSpPr>
-      <dsp:spPr>
-        <a:xfrm>
-          <a:off x="0" y="992772"/>
-          <a:ext cx="2825593" cy="943628"/>
-        </a:xfrm>
-        <a:prstGeom prst="roundRect">
-          <a:avLst/>
-        </a:prstGeom>
-        <a:solidFill>
-          <a:schemeClr val="accent1">
-            <a:hueOff val="0"/>
-            <a:satOff val="0"/>
-            <a:lumOff val="0"/>
-            <a:alphaOff val="0"/>
-          </a:schemeClr>
-        </a:solidFill>
-        <a:ln w="15875" cap="flat" cmpd="sng" algn="ctr">
-          <a:solidFill>
-            <a:schemeClr val="lt1">
-              <a:hueOff val="0"/>
-              <a:satOff val="0"/>
-              <a:lumOff val="0"/>
-              <a:alphaOff val="0"/>
-            </a:schemeClr>
-          </a:solidFill>
-          <a:prstDash val="solid"/>
-        </a:ln>
-        <a:effectLst/>
-      </dsp:spPr>
-      <dsp:style>
-        <a:lnRef idx="2">
-          <a:scrgbClr r="0" g="0" b="0"/>
-        </a:lnRef>
-        <a:fillRef idx="1">
-          <a:scrgbClr r="0" g="0" b="0"/>
-        </a:fillRef>
-        <a:effectRef idx="0">
-          <a:scrgbClr r="0" g="0" b="0"/>
-        </a:effectRef>
-        <a:fontRef idx="minor">
-          <a:schemeClr val="lt1"/>
-        </a:fontRef>
-      </dsp:style>
-      <dsp:txBody>
-        <a:bodyPr spcFirstLastPara="0" vert="horz" wrap="square" lIns="152400" tIns="76200" rIns="152400" bIns="76200" numCol="1" spcCol="1270" anchor="ctr" anchorCtr="0">
-          <a:noAutofit/>
-        </a:bodyPr>
-        <a:lstStyle/>
-        <a:p>
-          <a:pPr lvl="0" algn="ctr" defTabSz="1778000">
-            <a:lnSpc>
-              <a:spcPct val="90000"/>
-            </a:lnSpc>
-            <a:spcBef>
-              <a:spcPct val="0"/>
-            </a:spcBef>
-            <a:spcAft>
-              <a:spcPct val="35000"/>
-            </a:spcAft>
-          </a:pPr>
-          <a:r>
-            <a:rPr lang="es-AR" sz="4000" kern="1200" dirty="0" smtClean="0"/>
-            <a:t>Iteración 2</a:t>
-          </a:r>
-          <a:endParaRPr lang="en-US" sz="4000" kern="1200" dirty="0"/>
-        </a:p>
-      </dsp:txBody>
-      <dsp:txXfrm>
-        <a:off x="46064" y="1038836"/>
-        <a:ext cx="2733465" cy="851500"/>
-      </dsp:txXfrm>
-    </dsp:sp>
-    <dsp:sp modelId="{5BA1A675-5232-4C7A-A9C3-FFF93194D31F}">
-      <dsp:nvSpPr>
-        <dsp:cNvPr id="0" name=""/>
-        <dsp:cNvSpPr/>
-      </dsp:nvSpPr>
-      <dsp:spPr>
-        <a:xfrm rot="5400000">
-          <a:off x="4959781" y="-56241"/>
-          <a:ext cx="754903" cy="5023278"/>
-        </a:xfrm>
-        <a:prstGeom prst="round2SameRect">
-          <a:avLst/>
-        </a:prstGeom>
-        <a:solidFill>
-          <a:schemeClr val="accent1">
-            <a:alpha val="90000"/>
-            <a:tint val="40000"/>
-            <a:hueOff val="0"/>
-            <a:satOff val="0"/>
-            <a:lumOff val="0"/>
-            <a:alphaOff val="0"/>
-          </a:schemeClr>
-        </a:solidFill>
-        <a:ln w="15875" cap="flat" cmpd="sng" algn="ctr">
-          <a:solidFill>
-            <a:schemeClr val="accent1">
-              <a:alpha val="90000"/>
-              <a:tint val="40000"/>
-              <a:hueOff val="0"/>
-              <a:satOff val="0"/>
-              <a:lumOff val="0"/>
-              <a:alphaOff val="0"/>
-            </a:schemeClr>
-          </a:solidFill>
-          <a:prstDash val="solid"/>
-        </a:ln>
-        <a:effectLst/>
-      </dsp:spPr>
-      <dsp:style>
-        <a:lnRef idx="2">
-          <a:scrgbClr r="0" g="0" b="0"/>
-        </a:lnRef>
-        <a:fillRef idx="1">
-          <a:scrgbClr r="0" g="0" b="0"/>
-        </a:fillRef>
-        <a:effectRef idx="0">
-          <a:scrgbClr r="0" g="0" b="0"/>
-        </a:effectRef>
-        <a:fontRef idx="minor"/>
-      </dsp:style>
-      <dsp:txBody>
-        <a:bodyPr spcFirstLastPara="0" vert="horz" wrap="square" lIns="72390" tIns="36195" rIns="72390" bIns="36195" numCol="1" spcCol="1270" anchor="ctr" anchorCtr="0">
-          <a:noAutofit/>
-        </a:bodyPr>
-        <a:lstStyle/>
-        <a:p>
-          <a:pPr marL="171450" lvl="1" indent="-171450" algn="l" defTabSz="844550">
-            <a:lnSpc>
-              <a:spcPct val="90000"/>
-            </a:lnSpc>
-            <a:spcBef>
-              <a:spcPct val="0"/>
-            </a:spcBef>
-            <a:spcAft>
-              <a:spcPct val="15000"/>
-            </a:spcAft>
-            <a:buChar char="••"/>
-          </a:pPr>
-          <a:r>
-            <a:rPr lang="en-US" sz="1900" kern="1200" dirty="0" err="1" smtClean="0"/>
-            <a:t>Codificación</a:t>
-          </a:r>
-          <a:endParaRPr lang="en-US" sz="1900" kern="1200" dirty="0"/>
-        </a:p>
-      </dsp:txBody>
-      <dsp:txXfrm rot="-5400000">
-        <a:off x="2825594" y="2114797"/>
-        <a:ext cx="4986427" cy="681201"/>
-      </dsp:txXfrm>
-    </dsp:sp>
-    <dsp:sp modelId="{B7CE4811-3286-4DF5-8DD8-3FB6DEAC28E9}">
-      <dsp:nvSpPr>
-        <dsp:cNvPr id="0" name=""/>
-        <dsp:cNvSpPr/>
-      </dsp:nvSpPr>
-      <dsp:spPr>
-        <a:xfrm>
-          <a:off x="0" y="1983582"/>
-          <a:ext cx="2825593" cy="943628"/>
-        </a:xfrm>
-        <a:prstGeom prst="roundRect">
-          <a:avLst/>
-        </a:prstGeom>
-        <a:solidFill>
-          <a:schemeClr val="accent1">
-            <a:hueOff val="0"/>
-            <a:satOff val="0"/>
-            <a:lumOff val="0"/>
-            <a:alphaOff val="0"/>
-          </a:schemeClr>
-        </a:solidFill>
-        <a:ln w="15875" cap="flat" cmpd="sng" algn="ctr">
-          <a:solidFill>
-            <a:schemeClr val="lt1">
-              <a:hueOff val="0"/>
-              <a:satOff val="0"/>
-              <a:lumOff val="0"/>
-              <a:alphaOff val="0"/>
-            </a:schemeClr>
-          </a:solidFill>
-          <a:prstDash val="solid"/>
-        </a:ln>
-        <a:effectLst/>
-      </dsp:spPr>
-      <dsp:style>
-        <a:lnRef idx="2">
-          <a:scrgbClr r="0" g="0" b="0"/>
-        </a:lnRef>
-        <a:fillRef idx="1">
-          <a:scrgbClr r="0" g="0" b="0"/>
-        </a:fillRef>
-        <a:effectRef idx="0">
-          <a:scrgbClr r="0" g="0" b="0"/>
-        </a:effectRef>
-        <a:fontRef idx="minor">
-          <a:schemeClr val="lt1"/>
-        </a:fontRef>
-      </dsp:style>
-      <dsp:txBody>
-        <a:bodyPr spcFirstLastPara="0" vert="horz" wrap="square" lIns="152400" tIns="76200" rIns="152400" bIns="76200" numCol="1" spcCol="1270" anchor="ctr" anchorCtr="0">
-          <a:noAutofit/>
-        </a:bodyPr>
-        <a:lstStyle/>
-        <a:p>
-          <a:pPr lvl="0" algn="ctr" defTabSz="1778000">
-            <a:lnSpc>
-              <a:spcPct val="90000"/>
-            </a:lnSpc>
-            <a:spcBef>
-              <a:spcPct val="0"/>
-            </a:spcBef>
-            <a:spcAft>
-              <a:spcPct val="35000"/>
-            </a:spcAft>
-          </a:pPr>
-          <a:r>
-            <a:rPr lang="es-AR" sz="4000" kern="1200" dirty="0" smtClean="0"/>
-            <a:t>Iteración 3</a:t>
-          </a:r>
-          <a:endParaRPr lang="en-US" sz="4000" kern="1200" dirty="0"/>
-        </a:p>
-      </dsp:txBody>
-      <dsp:txXfrm>
-        <a:off x="46064" y="2029646"/>
-        <a:ext cx="2733465" cy="851500"/>
-      </dsp:txXfrm>
-    </dsp:sp>
-    <dsp:sp modelId="{1DF7ADA8-0EAC-48DE-AFD6-FDBB67CD9962}">
-      <dsp:nvSpPr>
-        <dsp:cNvPr id="0" name=""/>
-        <dsp:cNvSpPr/>
-      </dsp:nvSpPr>
-      <dsp:spPr>
-        <a:xfrm rot="5400000">
-          <a:off x="4959781" y="934568"/>
-          <a:ext cx="754903" cy="5023278"/>
-        </a:xfrm>
-        <a:prstGeom prst="round2SameRect">
-          <a:avLst/>
-        </a:prstGeom>
-        <a:solidFill>
-          <a:schemeClr val="accent1">
-            <a:alpha val="90000"/>
-            <a:tint val="40000"/>
-            <a:hueOff val="0"/>
-            <a:satOff val="0"/>
-            <a:lumOff val="0"/>
-            <a:alphaOff val="0"/>
-          </a:schemeClr>
-        </a:solidFill>
-        <a:ln w="15875" cap="flat" cmpd="sng" algn="ctr">
-          <a:solidFill>
-            <a:schemeClr val="accent1">
-              <a:alpha val="90000"/>
-              <a:tint val="40000"/>
-              <a:hueOff val="0"/>
-              <a:satOff val="0"/>
-              <a:lumOff val="0"/>
-              <a:alphaOff val="0"/>
-            </a:schemeClr>
-          </a:solidFill>
-          <a:prstDash val="solid"/>
-        </a:ln>
-        <a:effectLst/>
-      </dsp:spPr>
-      <dsp:style>
-        <a:lnRef idx="2">
-          <a:scrgbClr r="0" g="0" b="0"/>
-        </a:lnRef>
-        <a:fillRef idx="1">
-          <a:scrgbClr r="0" g="0" b="0"/>
-        </a:fillRef>
-        <a:effectRef idx="0">
-          <a:scrgbClr r="0" g="0" b="0"/>
-        </a:effectRef>
-        <a:fontRef idx="minor"/>
-      </dsp:style>
-      <dsp:txBody>
-        <a:bodyPr spcFirstLastPara="0" vert="horz" wrap="square" lIns="72390" tIns="36195" rIns="72390" bIns="36195" numCol="1" spcCol="1270" anchor="ctr" anchorCtr="0">
-          <a:noAutofit/>
-        </a:bodyPr>
-        <a:lstStyle/>
-        <a:p>
-          <a:pPr marL="171450" lvl="1" indent="-171450" algn="l" defTabSz="844550">
-            <a:lnSpc>
-              <a:spcPct val="90000"/>
-            </a:lnSpc>
-            <a:spcBef>
-              <a:spcPct val="0"/>
-            </a:spcBef>
-            <a:spcAft>
-              <a:spcPct val="15000"/>
-            </a:spcAft>
-            <a:buChar char="••"/>
-          </a:pPr>
-          <a:r>
-            <a:rPr lang="en-US" sz="1900" kern="1200" dirty="0" err="1" smtClean="0"/>
-            <a:t>Sistema</a:t>
-          </a:r>
-          <a:r>
-            <a:rPr lang="en-US" sz="1900" kern="1200" dirty="0" smtClean="0"/>
-            <a:t> </a:t>
-          </a:r>
-          <a:r>
-            <a:rPr lang="en-US" sz="1900" kern="1200" dirty="0" err="1" smtClean="0"/>
-            <a:t>implementado</a:t>
-          </a:r>
-          <a:r>
-            <a:rPr lang="en-US" sz="1900" kern="1200" dirty="0" smtClean="0"/>
-            <a:t> en forma </a:t>
-          </a:r>
-          <a:r>
-            <a:rPr lang="es-ES" sz="1900" kern="1200" dirty="0" smtClean="0"/>
-            <a:t>completa</a:t>
-          </a:r>
-          <a:endParaRPr lang="en-US" sz="1900" kern="1200" dirty="0"/>
-        </a:p>
-        <a:p>
-          <a:pPr marL="171450" lvl="1" indent="-171450" algn="l" defTabSz="844550">
-            <a:lnSpc>
-              <a:spcPct val="90000"/>
-            </a:lnSpc>
-            <a:spcBef>
-              <a:spcPct val="0"/>
-            </a:spcBef>
-            <a:spcAft>
-              <a:spcPct val="15000"/>
-            </a:spcAft>
-            <a:buChar char="••"/>
-          </a:pPr>
-          <a:r>
-            <a:rPr lang="es-ES" sz="1900" kern="1200" dirty="0" smtClean="0"/>
-            <a:t>Manuel de usuario y de instalación</a:t>
-          </a:r>
-          <a:endParaRPr lang="en-US" sz="1900" kern="1200" dirty="0"/>
-        </a:p>
-      </dsp:txBody>
-      <dsp:txXfrm rot="-5400000">
-        <a:off x="2825594" y="3105607"/>
-        <a:ext cx="4986427" cy="681201"/>
-      </dsp:txXfrm>
-    </dsp:sp>
-    <dsp:sp modelId="{BBB6B52B-E046-4419-AB1D-58DD3C86F0D8}">
-      <dsp:nvSpPr>
-        <dsp:cNvPr id="0" name=""/>
-        <dsp:cNvSpPr/>
-      </dsp:nvSpPr>
-      <dsp:spPr>
-        <a:xfrm>
-          <a:off x="0" y="2974393"/>
-          <a:ext cx="2825593" cy="943628"/>
-        </a:xfrm>
-        <a:prstGeom prst="roundRect">
-          <a:avLst/>
-        </a:prstGeom>
-        <a:solidFill>
-          <a:schemeClr val="accent1">
-            <a:hueOff val="0"/>
-            <a:satOff val="0"/>
-            <a:lumOff val="0"/>
-            <a:alphaOff val="0"/>
-          </a:schemeClr>
-        </a:solidFill>
-        <a:ln w="15875" cap="flat" cmpd="sng" algn="ctr">
-          <a:solidFill>
-            <a:schemeClr val="lt1">
-              <a:hueOff val="0"/>
-              <a:satOff val="0"/>
-              <a:lumOff val="0"/>
-              <a:alphaOff val="0"/>
-            </a:schemeClr>
-          </a:solidFill>
-          <a:prstDash val="solid"/>
-        </a:ln>
-        <a:effectLst/>
-      </dsp:spPr>
-      <dsp:style>
-        <a:lnRef idx="2">
-          <a:scrgbClr r="0" g="0" b="0"/>
-        </a:lnRef>
-        <a:fillRef idx="1">
-          <a:scrgbClr r="0" g="0" b="0"/>
-        </a:fillRef>
-        <a:effectRef idx="0">
-          <a:scrgbClr r="0" g="0" b="0"/>
-        </a:effectRef>
-        <a:fontRef idx="minor">
-          <a:schemeClr val="lt1"/>
-        </a:fontRef>
-      </dsp:style>
-      <dsp:txBody>
-        <a:bodyPr spcFirstLastPara="0" vert="horz" wrap="square" lIns="152400" tIns="76200" rIns="152400" bIns="76200" numCol="1" spcCol="1270" anchor="ctr" anchorCtr="0">
-          <a:noAutofit/>
-        </a:bodyPr>
-        <a:lstStyle/>
-        <a:p>
-          <a:pPr lvl="0" algn="ctr" defTabSz="1778000">
-            <a:lnSpc>
-              <a:spcPct val="90000"/>
-            </a:lnSpc>
-            <a:spcBef>
-              <a:spcPct val="0"/>
-            </a:spcBef>
-            <a:spcAft>
-              <a:spcPct val="35000"/>
-            </a:spcAft>
-          </a:pPr>
-          <a:r>
-            <a:rPr lang="es-AR" sz="4000" kern="1200" dirty="0" smtClean="0"/>
-            <a:t>Iteración 4</a:t>
-          </a:r>
-          <a:endParaRPr lang="en-US" sz="4000" kern="1200" dirty="0"/>
-        </a:p>
-      </dsp:txBody>
-      <dsp:txXfrm>
-        <a:off x="46064" y="3020457"/>
-        <a:ext cx="2733465" cy="851500"/>
-      </dsp:txXfrm>
-    </dsp:sp>
   </dsp:spTree>
 </dsp:drawing>
 </file>
@@ -29158,11 +28490,7 @@
           <a:p>
             <a:r>
               <a:rPr lang="es-AR" dirty="0" smtClean="0"/>
-              <a:t>Control centralizado de los </a:t>
-            </a:r>
-            <a:r>
-              <a:rPr lang="es-AR" dirty="0" smtClean="0"/>
-              <a:t>proyectos</a:t>
+              <a:t>Control centralizado de los proyectos</a:t>
             </a:r>
             <a:endParaRPr lang="en-US" dirty="0"/>
           </a:p>
@@ -36478,11 +35806,7 @@
           <a:p>
             <a:r>
               <a:rPr lang="es-AR" dirty="0" smtClean="0"/>
-              <a:t>Problemas </a:t>
-            </a:r>
-            <a:r>
-              <a:rPr lang="es-AR" dirty="0" smtClean="0"/>
-              <a:t>principales detectados</a:t>
+              <a:t>Problemas principales detectados</a:t>
             </a:r>
             <a:br>
               <a:rPr lang="es-AR" dirty="0" smtClean="0"/>
@@ -36502,11 +35826,7 @@
           <a:p>
             <a:r>
               <a:rPr lang="es-AR" dirty="0" smtClean="0"/>
-              <a:t>Factibilidades</a:t>
-            </a:r>
-            <a:r>
-              <a:rPr lang="es-AR" dirty="0" smtClean="0"/>
-              <a:t>.</a:t>
+              <a:t>Factibilidades.</a:t>
             </a:r>
             <a:endParaRPr lang="en-US" dirty="0"/>
           </a:p>
@@ -37796,18 +37116,10 @@
                   <a:schemeClr val="tx1"/>
                 </a:solidFill>
               </a:rPr>
-              <a:t> </a:t>
+              <a:t> : </a:t>
             </a:r>
             <a:r>
-              <a:rPr lang="es-AR" b="1" dirty="0" smtClean="0">
-                <a:solidFill>
-                  <a:schemeClr val="tx1"/>
-                </a:solidFill>
-              </a:rPr>
-              <a:t>: </a:t>
-            </a:r>
-            <a:r>
-              <a:rPr lang="es-AR" dirty="0" smtClean="0">
+              <a:rPr lang="es-AR" dirty="0">
                 <a:solidFill>
                   <a:schemeClr val="tx1"/>
                 </a:solidFill>
@@ -37815,7 +37127,23 @@
               <a:t>Analista </a:t>
             </a:r>
             <a:r>
-              <a:rPr lang="es-AR" dirty="0" err="1" smtClean="0">
+              <a:rPr lang="es-AR" dirty="0" err="1">
+                <a:solidFill>
+                  <a:schemeClr val="tx1"/>
+                </a:solidFill>
+              </a:rPr>
+              <a:t>Semi</a:t>
+            </a:r>
+            <a:r>
+              <a:rPr lang="es-AR" dirty="0">
+                <a:solidFill>
+                  <a:schemeClr val="tx1"/>
+                </a:solidFill>
+              </a:rPr>
+              <a:t> </a:t>
+            </a:r>
+            <a:r>
+              <a:rPr lang="es-AR" dirty="0" err="1">
                 <a:solidFill>
                   <a:schemeClr val="tx1"/>
                 </a:solidFill>
@@ -37823,7 +37151,7 @@
               <a:t>senior</a:t>
             </a:r>
             <a:r>
-              <a:rPr lang="es-AR" dirty="0" smtClean="0">
+              <a:rPr lang="es-AR" dirty="0">
                 <a:solidFill>
                   <a:schemeClr val="tx1"/>
                 </a:solidFill>
@@ -37831,7 +37159,7 @@
               <a:t> Sistemas IT en </a:t>
             </a:r>
             <a:r>
-              <a:rPr lang="es-AR" dirty="0" err="1" smtClean="0">
+              <a:rPr lang="es-AR" dirty="0" err="1">
                 <a:solidFill>
                   <a:schemeClr val="tx1"/>
                 </a:solidFill>
@@ -37839,21 +37167,21 @@
               <a:t>Cablevision</a:t>
             </a:r>
             <a:r>
-              <a:rPr lang="es-AR" dirty="0" smtClean="0">
+              <a:rPr lang="es-AR" dirty="0">
                 <a:solidFill>
                   <a:schemeClr val="tx1"/>
                 </a:solidFill>
               </a:rPr>
               <a:t> S.A.</a:t>
             </a:r>
-            <a:endParaRPr lang="es-AR" b="1" dirty="0" smtClean="0">
+            <a:endParaRPr lang="es-AR" b="1" dirty="0">
               <a:solidFill>
                 <a:schemeClr val="tx1"/>
               </a:solidFill>
             </a:endParaRPr>
           </a:p>
           <a:p>
-            <a:endParaRPr lang="es-AR" dirty="0" smtClean="0">
+            <a:endParaRPr lang="es-AR" dirty="0">
               <a:solidFill>
                 <a:schemeClr val="tx1"/>
               </a:solidFill>
@@ -37861,7 +37189,7 @@
           </a:p>
           <a:p>
             <a:r>
-              <a:rPr lang="es-AR" b="1" dirty="0" err="1" smtClean="0">
+              <a:rPr lang="es-AR" b="1" dirty="0" err="1">
                 <a:solidFill>
                   <a:schemeClr val="tx1"/>
                 </a:solidFill>
@@ -37869,7 +37197,7 @@
               <a:t>Demián</a:t>
             </a:r>
             <a:r>
-              <a:rPr lang="es-AR" b="1" dirty="0" smtClean="0">
+              <a:rPr lang="es-AR" b="1" dirty="0">
                 <a:solidFill>
                   <a:schemeClr val="tx1"/>
                 </a:solidFill>
@@ -37877,7 +37205,7 @@
               <a:t> </a:t>
             </a:r>
             <a:r>
-              <a:rPr lang="es-AR" b="1" dirty="0" err="1" smtClean="0">
+              <a:rPr lang="es-AR" b="1" dirty="0" err="1">
                 <a:solidFill>
                   <a:schemeClr val="tx1"/>
                 </a:solidFill>
@@ -37885,7 +37213,7 @@
               <a:t>Odasso</a:t>
             </a:r>
             <a:r>
-              <a:rPr lang="es-AR" dirty="0" smtClean="0">
+              <a:rPr lang="es-AR" dirty="0">
                 <a:solidFill>
                   <a:schemeClr val="tx1"/>
                 </a:solidFill>
@@ -37893,7 +37221,7 @@
               <a:t>: Desarrollador </a:t>
             </a:r>
             <a:r>
-              <a:rPr lang="es-AR" dirty="0" err="1" smtClean="0">
+              <a:rPr lang="es-AR" dirty="0" err="1">
                 <a:solidFill>
                   <a:schemeClr val="tx1"/>
                 </a:solidFill>
@@ -37901,7 +37229,7 @@
               <a:t>senior</a:t>
             </a:r>
             <a:r>
-              <a:rPr lang="es-AR" dirty="0" smtClean="0">
+              <a:rPr lang="es-AR" dirty="0">
                 <a:solidFill>
                   <a:schemeClr val="tx1"/>
                 </a:solidFill>
@@ -37909,7 +37237,7 @@
               <a:t> para aplicaciones móviles y analista funcional en </a:t>
             </a:r>
             <a:r>
-              <a:rPr lang="es-AR" dirty="0" err="1" smtClean="0">
+              <a:rPr lang="es-AR" dirty="0" err="1">
                 <a:solidFill>
                   <a:schemeClr val="tx1"/>
                 </a:solidFill>
@@ -37917,7 +37245,7 @@
               <a:t>Blacktobacco</a:t>
             </a:r>
             <a:r>
-              <a:rPr lang="es-AR" dirty="0" smtClean="0">
+              <a:rPr lang="es-AR" dirty="0">
                 <a:solidFill>
                   <a:schemeClr val="tx1"/>
                 </a:solidFill>
@@ -37925,21 +37253,21 @@
               <a:t> </a:t>
             </a:r>
             <a:r>
-              <a:rPr lang="es-AR" dirty="0" err="1" smtClean="0">
+              <a:rPr lang="es-AR" dirty="0" err="1">
                 <a:solidFill>
                   <a:schemeClr val="tx1"/>
                 </a:solidFill>
               </a:rPr>
               <a:t>Lab</a:t>
             </a:r>
-            <a:endParaRPr lang="es-AR" dirty="0" smtClean="0">
+            <a:endParaRPr lang="es-AR" dirty="0">
               <a:solidFill>
                 <a:schemeClr val="tx1"/>
               </a:solidFill>
             </a:endParaRPr>
           </a:p>
           <a:p>
-            <a:endParaRPr lang="es-AR" dirty="0" smtClean="0">
+            <a:endParaRPr lang="es-AR" dirty="0">
               <a:solidFill>
                 <a:schemeClr val="tx1"/>
               </a:solidFill>
@@ -37955,7 +37283,7 @@
               <a:t>Mariano </a:t>
             </a:r>
             <a:r>
-              <a:rPr lang="es-AR" b="1" dirty="0" err="1" smtClean="0">
+              <a:rPr lang="es-AR" b="1" dirty="0" err="1">
                 <a:solidFill>
                   <a:schemeClr val="tx1"/>
                 </a:solidFill>
@@ -37963,7 +37291,7 @@
               <a:t>Gava</a:t>
             </a:r>
             <a:r>
-              <a:rPr lang="es-AR" dirty="0" smtClean="0">
+              <a:rPr lang="es-AR" dirty="0">
                 <a:solidFill>
                   <a:schemeClr val="tx1"/>
                 </a:solidFill>
@@ -37972,88 +37300,7 @@
             </a:r>
           </a:p>
           <a:p>
-            <a:endParaRPr lang="es-AR" dirty="0" smtClean="0">
-              <a:solidFill>
-                <a:schemeClr val="tx1"/>
-              </a:solidFill>
-            </a:endParaRPr>
-          </a:p>
-          <a:p>
-            <a:r>
-              <a:rPr lang="es-AR" b="1" dirty="0" smtClean="0">
-                <a:solidFill>
-                  <a:schemeClr val="tx1"/>
-                </a:solidFill>
-              </a:rPr>
-              <a:t>Pablo </a:t>
-            </a:r>
-            <a:r>
-              <a:rPr lang="es-AR" b="1" dirty="0" err="1" smtClean="0">
-                <a:solidFill>
-                  <a:schemeClr val="tx1"/>
-                </a:solidFill>
-              </a:rPr>
-              <a:t>Tissera</a:t>
-            </a:r>
-            <a:r>
-              <a:rPr lang="es-AR" dirty="0" smtClean="0">
-                <a:solidFill>
-                  <a:schemeClr val="tx1"/>
-                </a:solidFill>
-              </a:rPr>
-              <a:t>: Desarrollador java </a:t>
-            </a:r>
-            <a:r>
-              <a:rPr lang="es-AR" dirty="0" err="1" smtClean="0">
-                <a:solidFill>
-                  <a:schemeClr val="tx1"/>
-                </a:solidFill>
-              </a:rPr>
-              <a:t>senior</a:t>
-            </a:r>
-            <a:r>
-              <a:rPr lang="es-AR" dirty="0" smtClean="0">
-                <a:solidFill>
-                  <a:schemeClr val="tx1"/>
-                </a:solidFill>
-              </a:rPr>
-              <a:t> con mas de 7 años de experiencia en distintas empresas: H+A, </a:t>
-            </a:r>
-            <a:r>
-              <a:rPr lang="es-AR" dirty="0" err="1" smtClean="0">
-                <a:solidFill>
-                  <a:schemeClr val="tx1"/>
-                </a:solidFill>
-              </a:rPr>
-              <a:t>Accenture</a:t>
-            </a:r>
-            <a:r>
-              <a:rPr lang="es-AR" dirty="0" smtClean="0">
-                <a:solidFill>
-                  <a:schemeClr val="tx1"/>
-                </a:solidFill>
-              </a:rPr>
-              <a:t>, Coca-Cola, EDS y </a:t>
-            </a:r>
-            <a:r>
-              <a:rPr lang="es-AR" dirty="0" err="1" smtClean="0">
-                <a:solidFill>
-                  <a:schemeClr val="tx1"/>
-                </a:solidFill>
-              </a:rPr>
-              <a:t>Hewllet</a:t>
-            </a:r>
-            <a:r>
-              <a:rPr lang="es-AR" dirty="0" smtClean="0">
-                <a:solidFill>
-                  <a:schemeClr val="tx1"/>
-                </a:solidFill>
-              </a:rPr>
-              <a:t> Packard</a:t>
-            </a:r>
-          </a:p>
-          <a:p>
-            <a:endParaRPr lang="es-AR" dirty="0" smtClean="0">
+            <a:endParaRPr lang="es-AR" dirty="0">
               <a:solidFill>
                 <a:schemeClr val="tx1"/>
               </a:solidFill>
@@ -38066,10 +37313,89 @@
                   <a:schemeClr val="tx1"/>
                 </a:solidFill>
               </a:rPr>
-              <a:t>Sergio Brizuela</a:t>
+              <a:t>Pablo Tissera</a:t>
+            </a:r>
+            <a:r>
+              <a:rPr lang="es-AR" dirty="0">
+                <a:solidFill>
+                  <a:schemeClr val="tx1"/>
+                </a:solidFill>
+              </a:rPr>
+              <a:t>: Desarrollador java </a:t>
+            </a:r>
+            <a:r>
+              <a:rPr lang="es-AR" dirty="0" err="1">
+                <a:solidFill>
+                  <a:schemeClr val="tx1"/>
+                </a:solidFill>
+              </a:rPr>
+              <a:t>senior</a:t>
+            </a:r>
+            <a:r>
+              <a:rPr lang="es-AR" dirty="0">
+                <a:solidFill>
+                  <a:schemeClr val="tx1"/>
+                </a:solidFill>
+              </a:rPr>
+              <a:t> con mas de 7 años de experiencia en distintas empresas: H+A, </a:t>
+            </a:r>
+            <a:r>
+              <a:rPr lang="es-AR" dirty="0" err="1">
+                <a:solidFill>
+                  <a:schemeClr val="tx1"/>
+                </a:solidFill>
+              </a:rPr>
+              <a:t>Accenture</a:t>
+            </a:r>
+            <a:r>
+              <a:rPr lang="es-AR" dirty="0">
+                <a:solidFill>
+                  <a:schemeClr val="tx1"/>
+                </a:solidFill>
+              </a:rPr>
+              <a:t>, Coca-Cola, EDS y </a:t>
+            </a:r>
+            <a:r>
+              <a:rPr lang="es-AR" dirty="0" err="1">
+                <a:solidFill>
+                  <a:schemeClr val="tx1"/>
+                </a:solidFill>
+              </a:rPr>
+              <a:t>Hewllet</a:t>
+            </a:r>
+            <a:r>
+              <a:rPr lang="es-AR" dirty="0">
+                <a:solidFill>
+                  <a:schemeClr val="tx1"/>
+                </a:solidFill>
+              </a:rPr>
+              <a:t> Packard</a:t>
             </a:r>
           </a:p>
           <a:p>
+            <a:endParaRPr lang="es-AR" dirty="0">
+              <a:solidFill>
+                <a:schemeClr val="tx1"/>
+              </a:solidFill>
+            </a:endParaRPr>
+          </a:p>
+          <a:p>
+            <a:r>
+              <a:rPr lang="es-AR" b="1" dirty="0">
+                <a:solidFill>
+                  <a:schemeClr val="tx1"/>
+                </a:solidFill>
+              </a:rPr>
+              <a:t>Sergio Brizuela: </a:t>
+            </a:r>
+            <a:r>
+              <a:rPr lang="es-AR" dirty="0">
+                <a:solidFill>
+                  <a:schemeClr val="tx1"/>
+                </a:solidFill>
+              </a:rPr>
+              <a:t>Trabajador independiente</a:t>
+            </a:r>
             <a:endParaRPr lang="en-US" dirty="0"/>
           </a:p>
         </p:txBody>
@@ -39834,11 +39160,7 @@
           <a:p>
             <a:r>
               <a:rPr lang="es-AR" sz="1800" dirty="0" smtClean="0"/>
-              <a:t>Especializado </a:t>
-            </a:r>
-            <a:r>
-              <a:rPr lang="es-AR" sz="1800" dirty="0" smtClean="0"/>
-              <a:t>en telecomunicaciones para celulares.</a:t>
+              <a:t>Especializado en telecomunicaciones para celulares.</a:t>
             </a:r>
           </a:p>
           <a:p>
@@ -41428,8 +40750,8 @@
         </p:nvSpPr>
         <p:spPr>
           <a:xfrm>
-            <a:off x="1043492" y="2323652"/>
-            <a:ext cx="6777317" cy="3508977"/>
+            <a:off x="1043492" y="2060848"/>
+            <a:ext cx="6777317" cy="4392488"/>
           </a:xfrm>
           <a:prstGeom prst="rect">
             <a:avLst/>
@@ -41437,7 +40759,7 @@
         </p:spPr>
         <p:txBody>
           <a:bodyPr vert="horz" lIns="91440" tIns="45720" rIns="91440" bIns="45720" rtlCol="0">
-            <a:normAutofit fontScale="92500" lnSpcReduction="20000"/>
+            <a:normAutofit fontScale="85000" lnSpcReduction="20000"/>
           </a:bodyPr>
           <a:lstStyle>
             <a:lvl1pPr marL="342900" indent="-274320" algn="l" defTabSz="914400" rtl="0" eaLnBrk="1" latinLnBrk="0" hangingPunct="1">
@@ -41687,7 +41009,38 @@
           <a:p>
             <a:r>
               <a:rPr lang="es-AR" dirty="0" smtClean="0"/>
-              <a:t>Cableado de red con cable UTP cat. 5e</a:t>
+              <a:t>Cableado de red con cable UTP cat. </a:t>
+            </a:r>
+            <a:r>
+              <a:rPr lang="es-AR" dirty="0" smtClean="0"/>
+              <a:t>5e</a:t>
+            </a:r>
+          </a:p>
+          <a:p>
+            <a:endParaRPr lang="es-AR" dirty="0"/>
+          </a:p>
+          <a:p>
+            <a:r>
+              <a:rPr lang="es-AR" dirty="0"/>
+              <a:t>Sistema Operativo Linux Ubuntu.</a:t>
+            </a:r>
+            <a:br>
+              <a:rPr lang="es-AR" dirty="0"/>
+            </a:br>
+            <a:endParaRPr lang="es-AR" dirty="0"/>
+          </a:p>
+          <a:p>
+            <a:r>
+              <a:rPr lang="es-AR" dirty="0"/>
+              <a:t>Suite </a:t>
+            </a:r>
+            <a:r>
+              <a:rPr lang="es-AR" dirty="0" err="1"/>
+              <a:t>Ofimatica</a:t>
+            </a:r>
+            <a:r>
+              <a:rPr lang="es-AR" dirty="0"/>
+              <a:t> Open Office</a:t>
             </a:r>
             <a:endParaRPr lang="en-US" dirty="0"/>
           </a:p>
@@ -43479,6 +42832,718 @@
                                           <p:spTgt spid="8">
                                             <p:txEl>
                                               <p:pRg st="9" end="9"/>
+                                            </p:txEl>
+                                          </p:spTgt>
+                                        </p:tgtEl>
+                                      </p:cBhvr>
+                                      <p:to x="100000" y="100000"/>
+                                    </p:animScale>
+                                  </p:childTnLst>
+                                </p:cTn>
+                              </p:par>
+                            </p:childTnLst>
+                          </p:cTn>
+                        </p:par>
+                      </p:childTnLst>
+                    </p:cTn>
+                  </p:par>
+                  <p:par>
+                    <p:cTn id="93" fill="hold">
+                      <p:stCondLst>
+                        <p:cond delay="indefinite"/>
+                      </p:stCondLst>
+                      <p:childTnLst>
+                        <p:par>
+                          <p:cTn id="94" fill="hold">
+                            <p:stCondLst>
+                              <p:cond delay="0"/>
+                            </p:stCondLst>
+                            <p:childTnLst>
+                              <p:par>
+                                <p:cTn id="95" presetID="26" presetClass="entr" presetSubtype="0" fill="hold" nodeType="clickEffect">
+                                  <p:stCondLst>
+                                    <p:cond delay="0"/>
+                                  </p:stCondLst>
+                                  <p:childTnLst>
+                                    <p:set>
+                                      <p:cBhvr>
+                                        <p:cTn id="96" dur="1" fill="hold">
+                                          <p:stCondLst>
+                                            <p:cond delay="0"/>
+                                          </p:stCondLst>
+                                        </p:cTn>
+                                        <p:tgtEl>
+                                          <p:spTgt spid="8">
+                                            <p:txEl>
+                                              <p:pRg st="12" end="12"/>
+                                            </p:txEl>
+                                          </p:spTgt>
+                                        </p:tgtEl>
+                                        <p:attrNameLst>
+                                          <p:attrName>style.visibility</p:attrName>
+                                        </p:attrNameLst>
+                                      </p:cBhvr>
+                                      <p:to>
+                                        <p:strVal val="visible"/>
+                                      </p:to>
+                                    </p:set>
+                                    <p:animEffect transition="in" filter="wipe(down)">
+                                      <p:cBhvr>
+                                        <p:cTn id="97" dur="580">
+                                          <p:stCondLst>
+                                            <p:cond delay="0"/>
+                                          </p:stCondLst>
+                                        </p:cTn>
+                                        <p:tgtEl>
+                                          <p:spTgt spid="8">
+                                            <p:txEl>
+                                              <p:pRg st="12" end="12"/>
+                                            </p:txEl>
+                                          </p:spTgt>
+                                        </p:tgtEl>
+                                      </p:cBhvr>
+                                    </p:animEffect>
+                                    <p:anim calcmode="lin" valueType="num">
+                                      <p:cBhvr>
+                                        <p:cTn id="98" dur="1822" tmFilter="0,0; 0.14,0.36; 0.43,0.73; 0.71,0.91; 1.0,1.0">
+                                          <p:stCondLst>
+                                            <p:cond delay="0"/>
+                                          </p:stCondLst>
+                                        </p:cTn>
+                                        <p:tgtEl>
+                                          <p:spTgt spid="8">
+                                            <p:txEl>
+                                              <p:pRg st="12" end="12"/>
+                                            </p:txEl>
+                                          </p:spTgt>
+                                        </p:tgtEl>
+                                        <p:attrNameLst>
+                                          <p:attrName>ppt_x</p:attrName>
+                                        </p:attrNameLst>
+                                      </p:cBhvr>
+                                      <p:tavLst>
+                                        <p:tav tm="0">
+                                          <p:val>
+                                            <p:strVal val="#ppt_x-0.25"/>
+                                          </p:val>
+                                        </p:tav>
+                                        <p:tav tm="100000">
+                                          <p:val>
+                                            <p:strVal val="#ppt_x"/>
+                                          </p:val>
+                                        </p:tav>
+                                      </p:tavLst>
+                                    </p:anim>
+                                    <p:anim calcmode="lin" valueType="num">
+                                      <p:cBhvr>
+                                        <p:cTn id="99" dur="664" tmFilter="0.0,0.0; 0.25,0.07; 0.50,0.2; 0.75,0.467; 1.0,1.0">
+                                          <p:stCondLst>
+                                            <p:cond delay="0"/>
+                                          </p:stCondLst>
+                                        </p:cTn>
+                                        <p:tgtEl>
+                                          <p:spTgt spid="8">
+                                            <p:txEl>
+                                              <p:pRg st="12" end="12"/>
+                                            </p:txEl>
+                                          </p:spTgt>
+                                        </p:tgtEl>
+                                        <p:attrNameLst>
+                                          <p:attrName>ppt_y</p:attrName>
+                                        </p:attrNameLst>
+                                      </p:cBhvr>
+                                      <p:tavLst>
+                                        <p:tav tm="0" fmla="#ppt_y-sin(pi*$)/3">
+                                          <p:val>
+                                            <p:fltVal val="0.5"/>
+                                          </p:val>
+                                        </p:tav>
+                                        <p:tav tm="100000">
+                                          <p:val>
+                                            <p:fltVal val="1"/>
+                                          </p:val>
+                                        </p:tav>
+                                      </p:tavLst>
+                                    </p:anim>
+                                    <p:anim calcmode="lin" valueType="num">
+                                      <p:cBhvr>
+                                        <p:cTn id="100" dur="664" tmFilter="0, 0; 0.125,0.2665; 0.25,0.4; 0.375,0.465; 0.5,0.5;  0.625,0.535; 0.75,0.6; 0.875,0.7335; 1,1">
+                                          <p:stCondLst>
+                                            <p:cond delay="664"/>
+                                          </p:stCondLst>
+                                        </p:cTn>
+                                        <p:tgtEl>
+                                          <p:spTgt spid="8">
+                                            <p:txEl>
+                                              <p:pRg st="12" end="12"/>
+                                            </p:txEl>
+                                          </p:spTgt>
+                                        </p:tgtEl>
+                                        <p:attrNameLst>
+                                          <p:attrName>ppt_y</p:attrName>
+                                        </p:attrNameLst>
+                                      </p:cBhvr>
+                                      <p:tavLst>
+                                        <p:tav tm="0" fmla="#ppt_y-sin(pi*$)/9">
+                                          <p:val>
+                                            <p:fltVal val="0"/>
+                                          </p:val>
+                                        </p:tav>
+                                        <p:tav tm="100000">
+                                          <p:val>
+                                            <p:fltVal val="1"/>
+                                          </p:val>
+                                        </p:tav>
+                                      </p:tavLst>
+                                    </p:anim>
+                                    <p:anim calcmode="lin" valueType="num">
+                                      <p:cBhvr>
+                                        <p:cTn id="101" dur="332" tmFilter="0, 0; 0.125,0.2665; 0.25,0.4; 0.375,0.465; 0.5,0.5;  0.625,0.535; 0.75,0.6; 0.875,0.7335; 1,1">
+                                          <p:stCondLst>
+                                            <p:cond delay="1324"/>
+                                          </p:stCondLst>
+                                        </p:cTn>
+                                        <p:tgtEl>
+                                          <p:spTgt spid="8">
+                                            <p:txEl>
+                                              <p:pRg st="12" end="12"/>
+                                            </p:txEl>
+                                          </p:spTgt>
+                                        </p:tgtEl>
+                                        <p:attrNameLst>
+                                          <p:attrName>ppt_y</p:attrName>
+                                        </p:attrNameLst>
+                                      </p:cBhvr>
+                                      <p:tavLst>
+                                        <p:tav tm="0" fmla="#ppt_y-sin(pi*$)/27">
+                                          <p:val>
+                                            <p:fltVal val="0"/>
+                                          </p:val>
+                                        </p:tav>
+                                        <p:tav tm="100000">
+                                          <p:val>
+                                            <p:fltVal val="1"/>
+                                          </p:val>
+                                        </p:tav>
+                                      </p:tavLst>
+                                    </p:anim>
+                                    <p:anim calcmode="lin" valueType="num">
+                                      <p:cBhvr>
+                                        <p:cTn id="102" dur="164" tmFilter="0, 0; 0.125,0.2665; 0.25,0.4; 0.375,0.465; 0.5,0.5;  0.625,0.535; 0.75,0.6; 0.875,0.7335; 1,1">
+                                          <p:stCondLst>
+                                            <p:cond delay="1656"/>
+                                          </p:stCondLst>
+                                        </p:cTn>
+                                        <p:tgtEl>
+                                          <p:spTgt spid="8">
+                                            <p:txEl>
+                                              <p:pRg st="12" end="12"/>
+                                            </p:txEl>
+                                          </p:spTgt>
+                                        </p:tgtEl>
+                                        <p:attrNameLst>
+                                          <p:attrName>ppt_y</p:attrName>
+                                        </p:attrNameLst>
+                                      </p:cBhvr>
+                                      <p:tavLst>
+                                        <p:tav tm="0" fmla="#ppt_y-sin(pi*$)/81">
+                                          <p:val>
+                                            <p:fltVal val="0"/>
+                                          </p:val>
+                                        </p:tav>
+                                        <p:tav tm="100000">
+                                          <p:val>
+                                            <p:fltVal val="1"/>
+                                          </p:val>
+                                        </p:tav>
+                                      </p:tavLst>
+                                    </p:anim>
+                                    <p:animScale>
+                                      <p:cBhvr>
+                                        <p:cTn id="103" dur="26">
+                                          <p:stCondLst>
+                                            <p:cond delay="650"/>
+                                          </p:stCondLst>
+                                        </p:cTn>
+                                        <p:tgtEl>
+                                          <p:spTgt spid="8">
+                                            <p:txEl>
+                                              <p:pRg st="12" end="12"/>
+                                            </p:txEl>
+                                          </p:spTgt>
+                                        </p:tgtEl>
+                                      </p:cBhvr>
+                                      <p:to x="100000" y="60000"/>
+                                    </p:animScale>
+                                    <p:animScale>
+                                      <p:cBhvr>
+                                        <p:cTn id="104" dur="166" decel="50000">
+                                          <p:stCondLst>
+                                            <p:cond delay="676"/>
+                                          </p:stCondLst>
+                                        </p:cTn>
+                                        <p:tgtEl>
+                                          <p:spTgt spid="8">
+                                            <p:txEl>
+                                              <p:pRg st="12" end="12"/>
+                                            </p:txEl>
+                                          </p:spTgt>
+                                        </p:tgtEl>
+                                      </p:cBhvr>
+                                      <p:to x="100000" y="100000"/>
+                                    </p:animScale>
+                                    <p:animScale>
+                                      <p:cBhvr>
+                                        <p:cTn id="105" dur="26">
+                                          <p:stCondLst>
+                                            <p:cond delay="1312"/>
+                                          </p:stCondLst>
+                                        </p:cTn>
+                                        <p:tgtEl>
+                                          <p:spTgt spid="8">
+                                            <p:txEl>
+                                              <p:pRg st="12" end="12"/>
+                                            </p:txEl>
+                                          </p:spTgt>
+                                        </p:tgtEl>
+                                      </p:cBhvr>
+                                      <p:to x="100000" y="80000"/>
+                                    </p:animScale>
+                                    <p:animScale>
+                                      <p:cBhvr>
+                                        <p:cTn id="106" dur="166" decel="50000">
+                                          <p:stCondLst>
+                                            <p:cond delay="1338"/>
+                                          </p:stCondLst>
+                                        </p:cTn>
+                                        <p:tgtEl>
+                                          <p:spTgt spid="8">
+                                            <p:txEl>
+                                              <p:pRg st="12" end="12"/>
+                                            </p:txEl>
+                                          </p:spTgt>
+                                        </p:tgtEl>
+                                      </p:cBhvr>
+                                      <p:to x="100000" y="100000"/>
+                                    </p:animScale>
+                                    <p:animScale>
+                                      <p:cBhvr>
+                                        <p:cTn id="107" dur="26">
+                                          <p:stCondLst>
+                                            <p:cond delay="1642"/>
+                                          </p:stCondLst>
+                                        </p:cTn>
+                                        <p:tgtEl>
+                                          <p:spTgt spid="8">
+                                            <p:txEl>
+                                              <p:pRg st="12" end="12"/>
+                                            </p:txEl>
+                                          </p:spTgt>
+                                        </p:tgtEl>
+                                      </p:cBhvr>
+                                      <p:to x="100000" y="90000"/>
+                                    </p:animScale>
+                                    <p:animScale>
+                                      <p:cBhvr>
+                                        <p:cTn id="108" dur="166" decel="50000">
+                                          <p:stCondLst>
+                                            <p:cond delay="1668"/>
+                                          </p:stCondLst>
+                                        </p:cTn>
+                                        <p:tgtEl>
+                                          <p:spTgt spid="8">
+                                            <p:txEl>
+                                              <p:pRg st="12" end="12"/>
+                                            </p:txEl>
+                                          </p:spTgt>
+                                        </p:tgtEl>
+                                      </p:cBhvr>
+                                      <p:to x="100000" y="100000"/>
+                                    </p:animScale>
+                                    <p:animScale>
+                                      <p:cBhvr>
+                                        <p:cTn id="109" dur="26">
+                                          <p:stCondLst>
+                                            <p:cond delay="1808"/>
+                                          </p:stCondLst>
+                                        </p:cTn>
+                                        <p:tgtEl>
+                                          <p:spTgt spid="8">
+                                            <p:txEl>
+                                              <p:pRg st="12" end="12"/>
+                                            </p:txEl>
+                                          </p:spTgt>
+                                        </p:tgtEl>
+                                      </p:cBhvr>
+                                      <p:to x="100000" y="95000"/>
+                                    </p:animScale>
+                                    <p:animScale>
+                                      <p:cBhvr>
+                                        <p:cTn id="110" dur="166" decel="50000">
+                                          <p:stCondLst>
+                                            <p:cond delay="1834"/>
+                                          </p:stCondLst>
+                                        </p:cTn>
+                                        <p:tgtEl>
+                                          <p:spTgt spid="8">
+                                            <p:txEl>
+                                              <p:pRg st="12" end="12"/>
+                                            </p:txEl>
+                                          </p:spTgt>
+                                        </p:tgtEl>
+                                      </p:cBhvr>
+                                      <p:to x="100000" y="100000"/>
+                                    </p:animScale>
+                                  </p:childTnLst>
+                                </p:cTn>
+                              </p:par>
+                            </p:childTnLst>
+                          </p:cTn>
+                        </p:par>
+                      </p:childTnLst>
+                    </p:cTn>
+                  </p:par>
+                  <p:par>
+                    <p:cTn id="111" fill="hold">
+                      <p:stCondLst>
+                        <p:cond delay="indefinite"/>
+                      </p:stCondLst>
+                      <p:childTnLst>
+                        <p:par>
+                          <p:cTn id="112" fill="hold">
+                            <p:stCondLst>
+                              <p:cond delay="0"/>
+                            </p:stCondLst>
+                            <p:childTnLst>
+                              <p:par>
+                                <p:cTn id="113" presetID="26" presetClass="entr" presetSubtype="0" fill="hold" nodeType="clickEffect">
+                                  <p:stCondLst>
+                                    <p:cond delay="0"/>
+                                  </p:stCondLst>
+                                  <p:childTnLst>
+                                    <p:set>
+                                      <p:cBhvr>
+                                        <p:cTn id="114" dur="1" fill="hold">
+                                          <p:stCondLst>
+                                            <p:cond delay="0"/>
+                                          </p:stCondLst>
+                                        </p:cTn>
+                                        <p:tgtEl>
+                                          <p:spTgt spid="8">
+                                            <p:txEl>
+                                              <p:pRg st="11" end="11"/>
+                                            </p:txEl>
+                                          </p:spTgt>
+                                        </p:tgtEl>
+                                        <p:attrNameLst>
+                                          <p:attrName>style.visibility</p:attrName>
+                                        </p:attrNameLst>
+                                      </p:cBhvr>
+                                      <p:to>
+                                        <p:strVal val="visible"/>
+                                      </p:to>
+                                    </p:set>
+                                    <p:animEffect transition="in" filter="wipe(down)">
+                                      <p:cBhvr>
+                                        <p:cTn id="115" dur="580">
+                                          <p:stCondLst>
+                                            <p:cond delay="0"/>
+                                          </p:stCondLst>
+                                        </p:cTn>
+                                        <p:tgtEl>
+                                          <p:spTgt spid="8">
+                                            <p:txEl>
+                                              <p:pRg st="11" end="11"/>
+                                            </p:txEl>
+                                          </p:spTgt>
+                                        </p:tgtEl>
+                                      </p:cBhvr>
+                                    </p:animEffect>
+                                    <p:anim calcmode="lin" valueType="num">
+                                      <p:cBhvr>
+                                        <p:cTn id="116" dur="1822" tmFilter="0,0; 0.14,0.36; 0.43,0.73; 0.71,0.91; 1.0,1.0">
+                                          <p:stCondLst>
+                                            <p:cond delay="0"/>
+                                          </p:stCondLst>
+                                        </p:cTn>
+                                        <p:tgtEl>
+                                          <p:spTgt spid="8">
+                                            <p:txEl>
+                                              <p:pRg st="11" end="11"/>
+                                            </p:txEl>
+                                          </p:spTgt>
+                                        </p:tgtEl>
+                                        <p:attrNameLst>
+                                          <p:attrName>ppt_x</p:attrName>
+                                        </p:attrNameLst>
+                                      </p:cBhvr>
+                                      <p:tavLst>
+                                        <p:tav tm="0">
+                                          <p:val>
+                                            <p:strVal val="#ppt_x-0.25"/>
+                                          </p:val>
+                                        </p:tav>
+                                        <p:tav tm="100000">
+                                          <p:val>
+                                            <p:strVal val="#ppt_x"/>
+                                          </p:val>
+                                        </p:tav>
+                                      </p:tavLst>
+                                    </p:anim>
+                                    <p:anim calcmode="lin" valueType="num">
+                                      <p:cBhvr>
+                                        <p:cTn id="117" dur="664" tmFilter="0.0,0.0; 0.25,0.07; 0.50,0.2; 0.75,0.467; 1.0,1.0">
+                                          <p:stCondLst>
+                                            <p:cond delay="0"/>
+                                          </p:stCondLst>
+                                        </p:cTn>
+                                        <p:tgtEl>
+                                          <p:spTgt spid="8">
+                                            <p:txEl>
+                                              <p:pRg st="11" end="11"/>
+                                            </p:txEl>
+                                          </p:spTgt>
+                                        </p:tgtEl>
+                                        <p:attrNameLst>
+                                          <p:attrName>ppt_y</p:attrName>
+                                        </p:attrNameLst>
+                                      </p:cBhvr>
+                                      <p:tavLst>
+                                        <p:tav tm="0" fmla="#ppt_y-sin(pi*$)/3">
+                                          <p:val>
+                                            <p:fltVal val="0.5"/>
+                                          </p:val>
+                                        </p:tav>
+                                        <p:tav tm="100000">
+                                          <p:val>
+                                            <p:fltVal val="1"/>
+                                          </p:val>
+                                        </p:tav>
+                                      </p:tavLst>
+                                    </p:anim>
+                                    <p:anim calcmode="lin" valueType="num">
+                                      <p:cBhvr>
+                                        <p:cTn id="118" dur="664" tmFilter="0, 0; 0.125,0.2665; 0.25,0.4; 0.375,0.465; 0.5,0.5;  0.625,0.535; 0.75,0.6; 0.875,0.7335; 1,1">
+                                          <p:stCondLst>
+                                            <p:cond delay="664"/>
+                                          </p:stCondLst>
+                                        </p:cTn>
+                                        <p:tgtEl>
+                                          <p:spTgt spid="8">
+                                            <p:txEl>
+                                              <p:pRg st="11" end="11"/>
+                                            </p:txEl>
+                                          </p:spTgt>
+                                        </p:tgtEl>
+                                        <p:attrNameLst>
+                                          <p:attrName>ppt_y</p:attrName>
+                                        </p:attrNameLst>
+                                      </p:cBhvr>
+                                      <p:tavLst>
+                                        <p:tav tm="0" fmla="#ppt_y-sin(pi*$)/9">
+                                          <p:val>
+                                            <p:fltVal val="0"/>
+                                          </p:val>
+                                        </p:tav>
+                                        <p:tav tm="100000">
+                                          <p:val>
+                                            <p:fltVal val="1"/>
+                                          </p:val>
+                                        </p:tav>
+                                      </p:tavLst>
+                                    </p:anim>
+                                    <p:anim calcmode="lin" valueType="num">
+                                      <p:cBhvr>
+                                        <p:cTn id="119" dur="332" tmFilter="0, 0; 0.125,0.2665; 0.25,0.4; 0.375,0.465; 0.5,0.5;  0.625,0.535; 0.75,0.6; 0.875,0.7335; 1,1">
+                                          <p:stCondLst>
+                                            <p:cond delay="1324"/>
+                                          </p:stCondLst>
+                                        </p:cTn>
+                                        <p:tgtEl>
+                                          <p:spTgt spid="8">
+                                            <p:txEl>
+                                              <p:pRg st="11" end="11"/>
+                                            </p:txEl>
+                                          </p:spTgt>
+                                        </p:tgtEl>
+                                        <p:attrNameLst>
+                                          <p:attrName>ppt_y</p:attrName>
+                                        </p:attrNameLst>
+                                      </p:cBhvr>
+                                      <p:tavLst>
+                                        <p:tav tm="0" fmla="#ppt_y-sin(pi*$)/27">
+                                          <p:val>
+                                            <p:fltVal val="0"/>
+                                          </p:val>
+                                        </p:tav>
+                                        <p:tav tm="100000">
+                                          <p:val>
+                                            <p:fltVal val="1"/>
+                                          </p:val>
+                                        </p:tav>
+                                      </p:tavLst>
+                                    </p:anim>
+                                    <p:anim calcmode="lin" valueType="num">
+                                      <p:cBhvr>
+                                        <p:cTn id="120" dur="164" tmFilter="0, 0; 0.125,0.2665; 0.25,0.4; 0.375,0.465; 0.5,0.5;  0.625,0.535; 0.75,0.6; 0.875,0.7335; 1,1">
+                                          <p:stCondLst>
+                                            <p:cond delay="1656"/>
+                                          </p:stCondLst>
+                                        </p:cTn>
+                                        <p:tgtEl>
+                                          <p:spTgt spid="8">
+                                            <p:txEl>
+                                              <p:pRg st="11" end="11"/>
+                                            </p:txEl>
+                                          </p:spTgt>
+                                        </p:tgtEl>
+                                        <p:attrNameLst>
+                                          <p:attrName>ppt_y</p:attrName>
+                                        </p:attrNameLst>
+                                      </p:cBhvr>
+                                      <p:tavLst>
+                                        <p:tav tm="0" fmla="#ppt_y-sin(pi*$)/81">
+                                          <p:val>
+                                            <p:fltVal val="0"/>
+                                          </p:val>
+                                        </p:tav>
+                                        <p:tav tm="100000">
+                                          <p:val>
+                                            <p:fltVal val="1"/>
+                                          </p:val>
+                                        </p:tav>
+                                      </p:tavLst>
+                                    </p:anim>
+                                    <p:animScale>
+                                      <p:cBhvr>
+                                        <p:cTn id="121" dur="26">
+                                          <p:stCondLst>
+                                            <p:cond delay="650"/>
+                                          </p:stCondLst>
+                                        </p:cTn>
+                                        <p:tgtEl>
+                                          <p:spTgt spid="8">
+                                            <p:txEl>
+                                              <p:pRg st="11" end="11"/>
+                                            </p:txEl>
+                                          </p:spTgt>
+                                        </p:tgtEl>
+                                      </p:cBhvr>
+                                      <p:to x="100000" y="60000"/>
+                                    </p:animScale>
+                                    <p:animScale>
+                                      <p:cBhvr>
+                                        <p:cTn id="122" dur="166" decel="50000">
+                                          <p:stCondLst>
+                                            <p:cond delay="676"/>
+                                          </p:stCondLst>
+                                        </p:cTn>
+                                        <p:tgtEl>
+                                          <p:spTgt spid="8">
+                                            <p:txEl>
+                                              <p:pRg st="11" end="11"/>
+                                            </p:txEl>
+                                          </p:spTgt>
+                                        </p:tgtEl>
+                                      </p:cBhvr>
+                                      <p:to x="100000" y="100000"/>
+                                    </p:animScale>
+                                    <p:animScale>
+                                      <p:cBhvr>
+                                        <p:cTn id="123" dur="26">
+                                          <p:stCondLst>
+                                            <p:cond delay="1312"/>
+                                          </p:stCondLst>
+                                        </p:cTn>
+                                        <p:tgtEl>
+                                          <p:spTgt spid="8">
+                                            <p:txEl>
+                                              <p:pRg st="11" end="11"/>
+                                            </p:txEl>
+                                          </p:spTgt>
+                                        </p:tgtEl>
+                                      </p:cBhvr>
+                                      <p:to x="100000" y="80000"/>
+                                    </p:animScale>
+                                    <p:animScale>
+                                      <p:cBhvr>
+                                        <p:cTn id="124" dur="166" decel="50000">
+                                          <p:stCondLst>
+                                            <p:cond delay="1338"/>
+                                          </p:stCondLst>
+                                        </p:cTn>
+                                        <p:tgtEl>
+                                          <p:spTgt spid="8">
+                                            <p:txEl>
+                                              <p:pRg st="11" end="11"/>
+                                            </p:txEl>
+                                          </p:spTgt>
+                                        </p:tgtEl>
+                                      </p:cBhvr>
+                                      <p:to x="100000" y="100000"/>
+                                    </p:animScale>
+                                    <p:animScale>
+                                      <p:cBhvr>
+                                        <p:cTn id="125" dur="26">
+                                          <p:stCondLst>
+                                            <p:cond delay="1642"/>
+                                          </p:stCondLst>
+                                        </p:cTn>
+                                        <p:tgtEl>
+                                          <p:spTgt spid="8">
+                                            <p:txEl>
+                                              <p:pRg st="11" end="11"/>
+                                            </p:txEl>
+                                          </p:spTgt>
+                                        </p:tgtEl>
+                                      </p:cBhvr>
+                                      <p:to x="100000" y="90000"/>
+                                    </p:animScale>
+                                    <p:animScale>
+                                      <p:cBhvr>
+                                        <p:cTn id="126" dur="166" decel="50000">
+                                          <p:stCondLst>
+                                            <p:cond delay="1668"/>
+                                          </p:stCondLst>
+                                        </p:cTn>
+                                        <p:tgtEl>
+                                          <p:spTgt spid="8">
+                                            <p:txEl>
+                                              <p:pRg st="11" end="11"/>
+                                            </p:txEl>
+                                          </p:spTgt>
+                                        </p:tgtEl>
+                                      </p:cBhvr>
+                                      <p:to x="100000" y="100000"/>
+                                    </p:animScale>
+                                    <p:animScale>
+                                      <p:cBhvr>
+                                        <p:cTn id="127" dur="26">
+                                          <p:stCondLst>
+                                            <p:cond delay="1808"/>
+                                          </p:stCondLst>
+                                        </p:cTn>
+                                        <p:tgtEl>
+                                          <p:spTgt spid="8">
+                                            <p:txEl>
+                                              <p:pRg st="11" end="11"/>
+                                            </p:txEl>
+                                          </p:spTgt>
+                                        </p:tgtEl>
+                                      </p:cBhvr>
+                                      <p:to x="100000" y="95000"/>
+                                    </p:animScale>
+                                    <p:animScale>
+                                      <p:cBhvr>
+                                        <p:cTn id="128" dur="166" decel="50000">
+                                          <p:stCondLst>
+                                            <p:cond delay="1834"/>
+                                          </p:stCondLst>
+                                        </p:cTn>
+                                        <p:tgtEl>
+                                          <p:spTgt spid="8">
+                                            <p:txEl>
+                                              <p:pRg st="11" end="11"/>
                                             </p:txEl>
                                           </p:spTgt>
                                         </p:tgtEl>

</xml_diff>

<commit_message>
ultima version subida por mariano, cambios menores en el orden de los items que digo yo
</commit_message>
<xml_diff>
--- a/Documentacion/Informe Preliminar/Presentacion Informe Preliminar.pptx
+++ b/Documentacion/Informe Preliminar/Presentacion Informe Preliminar.pptx
@@ -2599,7 +2599,11 @@
     </dgm:pt>
     <dgm:pt modelId="{36C0A925-CF92-4A8D-8547-F5135586AA1D}" type="parTrans" cxnId="{956F72A0-5E7A-4BBE-918C-DF48B42F7F88}">
       <dgm:prSet/>
-      <dgm:spPr/>
+      <dgm:spPr>
+        <a:ln>
+          <a:prstDash val="dash"/>
+        </a:ln>
+      </dgm:spPr>
       <dgm:t>
         <a:bodyPr/>
         <a:lstStyle/>
@@ -3342,7 +3346,7 @@
   </dgm:whole>
   <dgm:extLst>
     <a:ext uri="http://schemas.microsoft.com/office/drawing/2008/diagram">
-      <dsp:dataModelExt xmlns:dsp="http://schemas.microsoft.com/office/drawing/2008/diagram" xmlns="" relId="rId6" minVer="http://schemas.openxmlformats.org/drawingml/2006/diagram"/>
+      <dsp:dataModelExt xmlns="" xmlns:dsp="http://schemas.microsoft.com/office/drawing/2008/diagram" relId="rId6" minVer="http://schemas.openxmlformats.org/drawingml/2006/diagram"/>
     </a:ext>
   </dgm:extLst>
 </dgm:dataModel>
@@ -4008,7 +4012,7 @@
   <dgm:whole/>
   <dgm:extLst>
     <a:ext uri="http://schemas.microsoft.com/office/drawing/2008/diagram">
-      <dsp:dataModelExt xmlns:dsp="http://schemas.microsoft.com/office/drawing/2008/diagram" xmlns="" relId="rId8" minVer="http://schemas.openxmlformats.org/drawingml/2006/diagram"/>
+      <dsp:dataModelExt xmlns="" xmlns:dsp="http://schemas.microsoft.com/office/drawing/2008/diagram" relId="rId8" minVer="http://schemas.openxmlformats.org/drawingml/2006/diagram"/>
     </a:ext>
   </dgm:extLst>
 </dgm:dataModel>
@@ -4622,10 +4626,10 @@
     <dgm:cxn modelId="{FE78F3AE-2FA6-42E9-B720-08B83FEB33CD}" srcId="{813616D9-BE8E-4A10-BF86-762692BB6A0F}" destId="{82EDBB78-BDE0-49D3-BA2A-620A1AA99448}" srcOrd="1" destOrd="0" parTransId="{D7E6FD12-68CA-46EE-A997-236107332458}" sibTransId="{A43D6ED7-12FD-41CF-A98E-BB344017184C}"/>
     <dgm:cxn modelId="{2A5C0658-2FCF-4FDA-96CA-F6EB0940FF80}" type="presOf" srcId="{08E1CF32-7D7D-4CF2-BAA9-C037C0EC0945}" destId="{D34768DB-64FD-4294-BFEE-0BC3987FFB41}" srcOrd="0" destOrd="0" presId="urn:microsoft.com/office/officeart/2005/8/layout/vList5"/>
     <dgm:cxn modelId="{69A0E095-17E7-42E7-94DF-6521557440D8}" srcId="{08E1CF32-7D7D-4CF2-BAA9-C037C0EC0945}" destId="{5913FBD2-A8EA-4DD9-B679-25A7E714503E}" srcOrd="1" destOrd="0" parTransId="{50B59DB0-D698-4E18-9C75-DED440676B7C}" sibTransId="{C845D9E3-1694-466B-A08B-2FF052C9DA60}"/>
+    <dgm:cxn modelId="{1C0B9630-566D-4914-AA2E-C6CAE21EF7E8}" type="presOf" srcId="{E9E98E57-AA12-4079-AB9F-42765B204AFD}" destId="{1DF7ADA8-0EAC-48DE-AFD6-FDBB67CD9962}" srcOrd="0" destOrd="0" presId="urn:microsoft.com/office/officeart/2005/8/layout/vList5"/>
     <dgm:cxn modelId="{B3A6CE16-803A-489F-AD0E-2100646AF1AE}" srcId="{454E7899-FD60-471D-A87C-7F22BA1EC279}" destId="{34496EE1-B95B-44E8-BB0A-0CAC482AB970}" srcOrd="0" destOrd="0" parTransId="{D29517DA-32A9-439E-B16D-511E21F194AD}" sibTransId="{C038C20B-2977-4BC8-BE69-AB6BD2E32905}"/>
-    <dgm:cxn modelId="{1C0B9630-566D-4914-AA2E-C6CAE21EF7E8}" type="presOf" srcId="{E9E98E57-AA12-4079-AB9F-42765B204AFD}" destId="{1DF7ADA8-0EAC-48DE-AFD6-FDBB67CD9962}" srcOrd="0" destOrd="0" presId="urn:microsoft.com/office/officeart/2005/8/layout/vList5"/>
+    <dgm:cxn modelId="{209AFB32-84E2-41E5-A2D0-AC0687D3F341}" srcId="{813616D9-BE8E-4A10-BF86-762692BB6A0F}" destId="{E9E98E57-AA12-4079-AB9F-42765B204AFD}" srcOrd="0" destOrd="0" parTransId="{C4577ADC-16D1-4D49-8707-154E0725CC4F}" sibTransId="{22148C02-D536-448C-A88E-FA359F360214}"/>
     <dgm:cxn modelId="{BA4EB1E3-BF27-43E0-9B6B-011D52333FF5}" srcId="{0069092C-E876-4322-B292-7F8C73C3584F}" destId="{454E7899-FD60-471D-A87C-7F22BA1EC279}" srcOrd="2" destOrd="0" parTransId="{450023FD-E05D-46DD-97F6-01EC1F446AF8}" sibTransId="{CAAB7403-FC4F-4CE9-B67F-90C081C8A81C}"/>
-    <dgm:cxn modelId="{209AFB32-84E2-41E5-A2D0-AC0687D3F341}" srcId="{813616D9-BE8E-4A10-BF86-762692BB6A0F}" destId="{E9E98E57-AA12-4079-AB9F-42765B204AFD}" srcOrd="0" destOrd="0" parTransId="{C4577ADC-16D1-4D49-8707-154E0725CC4F}" sibTransId="{22148C02-D536-448C-A88E-FA359F360214}"/>
     <dgm:cxn modelId="{95B9AAEC-8029-428B-87D4-B69CB7FCB1C0}" type="presOf" srcId="{813616D9-BE8E-4A10-BF86-762692BB6A0F}" destId="{BBB6B52B-E046-4419-AB1D-58DD3C86F0D8}" srcOrd="0" destOrd="0" presId="urn:microsoft.com/office/officeart/2005/8/layout/vList5"/>
     <dgm:cxn modelId="{643588FD-AC6B-4FDD-9DD4-10C5DE563F7D}" type="presOf" srcId="{852AA831-7837-42DD-942D-617B2AD798FD}" destId="{F32870B6-D861-425B-A22A-69583A7DE8E8}" srcOrd="0" destOrd="0" presId="urn:microsoft.com/office/officeart/2005/8/layout/vList5"/>
     <dgm:cxn modelId="{17A4585D-7AE7-4DF7-BD4F-28F26443DC4A}" srcId="{9D53F5CF-E73A-49B8-82D5-67B6E1B4D3B0}" destId="{852AA831-7837-42DD-942D-617B2AD798FD}" srcOrd="0" destOrd="0" parTransId="{8CBF793F-D39E-496A-A905-BCC78B32A0A3}" sibTransId="{F2E800E2-1A52-4F90-9030-3DD289CD9ED0}"/>
@@ -11894,7 +11898,7 @@
             <a:fld id="{FEFD30D0-0048-42BF-B88B-21F996E0C231}" type="datetimeFigureOut">
               <a:rPr lang="en-US" smtClean="0"/>
               <a:pPr/>
-              <a:t>5/16/2012</a:t>
+              <a:t>5/17/2012</a:t>
             </a:fld>
             <a:endParaRPr lang="en-US"/>
           </a:p>
@@ -12063,7 +12067,7 @@
     </p:spTree>
     <p:extLst>
       <p:ext uri="{BB962C8B-B14F-4D97-AF65-F5344CB8AC3E}">
-        <p14:creationId xmlns:p14="http://schemas.microsoft.com/office/powerpoint/2010/main" xmlns="" val="1341522809"/>
+        <p14:creationId xmlns="" xmlns:p14="http://schemas.microsoft.com/office/powerpoint/2010/main" val="1341522809"/>
       </p:ext>
     </p:extLst>
   </p:cSld>
@@ -12416,7 +12420,7 @@
     </p:spTree>
     <p:extLst>
       <p:ext uri="{BB962C8B-B14F-4D97-AF65-F5344CB8AC3E}">
-        <p14:creationId xmlns:p14="http://schemas.microsoft.com/office/powerpoint/2010/main" xmlns="" val="1344049021"/>
+        <p14:creationId xmlns="" xmlns:p14="http://schemas.microsoft.com/office/powerpoint/2010/main" val="1344049021"/>
       </p:ext>
     </p:extLst>
   </p:cSld>
@@ -15266,7 +15270,7 @@
             <a:fld id="{46F4E5E0-CC8A-4447-8D98-8F21A5814697}" type="datetimeFigureOut">
               <a:rPr lang="en-US" smtClean="0"/>
               <a:pPr/>
-              <a:t>5/16/2012</a:t>
+              <a:t>5/17/2012</a:t>
             </a:fld>
             <a:endParaRPr lang="en-US"/>
           </a:p>
@@ -15553,7 +15557,7 @@
             <a:fld id="{46F4E5E0-CC8A-4447-8D98-8F21A5814697}" type="datetimeFigureOut">
               <a:rPr lang="en-US" smtClean="0"/>
               <a:pPr/>
-              <a:t>5/16/2012</a:t>
+              <a:t>5/17/2012</a:t>
             </a:fld>
             <a:endParaRPr lang="en-US"/>
           </a:p>
@@ -15730,7 +15734,7 @@
             <a:fld id="{46F4E5E0-CC8A-4447-8D98-8F21A5814697}" type="datetimeFigureOut">
               <a:rPr lang="en-US" smtClean="0"/>
               <a:pPr/>
-              <a:t>5/16/2012</a:t>
+              <a:t>5/17/2012</a:t>
             </a:fld>
             <a:endParaRPr lang="en-US"/>
           </a:p>
@@ -15897,7 +15901,7 @@
             <a:fld id="{46F4E5E0-CC8A-4447-8D98-8F21A5814697}" type="datetimeFigureOut">
               <a:rPr lang="en-US" smtClean="0"/>
               <a:pPr/>
-              <a:t>5/16/2012</a:t>
+              <a:t>5/17/2012</a:t>
             </a:fld>
             <a:endParaRPr lang="en-US"/>
           </a:p>
@@ -16140,7 +16144,7 @@
             <a:fld id="{46F4E5E0-CC8A-4447-8D98-8F21A5814697}" type="datetimeFigureOut">
               <a:rPr lang="en-US" smtClean="0"/>
               <a:pPr/>
-              <a:t>5/16/2012</a:t>
+              <a:t>5/17/2012</a:t>
             </a:fld>
             <a:endParaRPr lang="en-US"/>
           </a:p>
@@ -16255,7 +16259,7 @@
             <a:fld id="{46F4E5E0-CC8A-4447-8D98-8F21A5814697}" type="datetimeFigureOut">
               <a:rPr lang="en-US" smtClean="0"/>
               <a:pPr/>
-              <a:t>5/16/2012</a:t>
+              <a:t>5/17/2012</a:t>
             </a:fld>
             <a:endParaRPr lang="en-US"/>
           </a:p>
@@ -16796,7 +16800,7 @@
             <a:fld id="{46F4E5E0-CC8A-4447-8D98-8F21A5814697}" type="datetimeFigureOut">
               <a:rPr lang="en-US" smtClean="0"/>
               <a:pPr/>
-              <a:t>5/16/2012</a:t>
+              <a:t>5/17/2012</a:t>
             </a:fld>
             <a:endParaRPr lang="en-US"/>
           </a:p>
@@ -16911,7 +16915,7 @@
             <a:fld id="{46F4E5E0-CC8A-4447-8D98-8F21A5814697}" type="datetimeFigureOut">
               <a:rPr lang="en-US" smtClean="0"/>
               <a:pPr/>
-              <a:t>5/16/2012</a:t>
+              <a:t>5/17/2012</a:t>
             </a:fld>
             <a:endParaRPr lang="en-US"/>
           </a:p>
@@ -17003,7 +17007,7 @@
             <a:fld id="{46F4E5E0-CC8A-4447-8D98-8F21A5814697}" type="datetimeFigureOut">
               <a:rPr lang="en-US" smtClean="0"/>
               <a:pPr/>
-              <a:t>5/16/2012</a:t>
+              <a:t>5/17/2012</a:t>
             </a:fld>
             <a:endParaRPr lang="en-US"/>
           </a:p>
@@ -19656,7 +19660,7 @@
             <a:fld id="{46F4E5E0-CC8A-4447-8D98-8F21A5814697}" type="datetimeFigureOut">
               <a:rPr lang="en-US" smtClean="0"/>
               <a:pPr/>
-              <a:t>5/16/2012</a:t>
+              <a:t>5/17/2012</a:t>
             </a:fld>
             <a:endParaRPr lang="en-US"/>
           </a:p>
@@ -22870,7 +22874,7 @@
             <a:fld id="{46F4E5E0-CC8A-4447-8D98-8F21A5814697}" type="datetimeFigureOut">
               <a:rPr lang="en-US" smtClean="0"/>
               <a:pPr/>
-              <a:t>5/16/2012</a:t>
+              <a:t>5/17/2012</a:t>
             </a:fld>
             <a:endParaRPr lang="en-US"/>
           </a:p>
@@ -25694,7 +25698,7 @@
             <a:fld id="{46F4E5E0-CC8A-4447-8D98-8F21A5814697}" type="datetimeFigureOut">
               <a:rPr lang="en-US" smtClean="0"/>
               <a:pPr/>
-              <a:t>5/16/2012</a:t>
+              <a:t>5/17/2012</a:t>
             </a:fld>
             <a:endParaRPr lang="en-US"/>
           </a:p>
@@ -26329,7 +26333,7 @@
           <a:noFill/>
           <a:extLst>
             <a:ext uri="{909E8E84-426E-40DD-AFC4-6F175D3DCCD1}">
-              <a14:hiddenFill xmlns:a14="http://schemas.microsoft.com/office/drawing/2010/main" xmlns="">
+              <a14:hiddenFill xmlns="" xmlns:a14="http://schemas.microsoft.com/office/drawing/2010/main">
                 <a:solidFill>
                   <a:srgbClr val="FFFFFF"/>
                 </a:solidFill>
@@ -26361,7 +26365,7 @@
           <a:blip r:embed="rId2" cstate="print">
             <a:extLst>
               <a:ext uri="{28A0092B-C50C-407E-A947-70E740481C1C}">
-                <a14:useLocalDpi xmlns:a14="http://schemas.microsoft.com/office/drawing/2010/main" xmlns="" val="0"/>
+                <a14:useLocalDpi xmlns="" xmlns:a14="http://schemas.microsoft.com/office/drawing/2010/main" val="0"/>
               </a:ext>
             </a:extLst>
           </a:blip>
@@ -26381,7 +26385,7 @@
           <a:noFill/>
           <a:extLst>
             <a:ext uri="{909E8E84-426E-40DD-AFC4-6F175D3DCCD1}">
-              <a14:hiddenFill xmlns:a14="http://schemas.microsoft.com/office/drawing/2010/main" xmlns="">
+              <a14:hiddenFill xmlns="" xmlns:a14="http://schemas.microsoft.com/office/drawing/2010/main">
                 <a:solidFill>
                   <a:srgbClr val="FFFFFF"/>
                 </a:solidFill>
@@ -26402,7 +26406,7 @@
           <a:blip r:embed="rId3" cstate="print">
             <a:extLst>
               <a:ext uri="{28A0092B-C50C-407E-A947-70E740481C1C}">
-                <a14:useLocalDpi xmlns:a14="http://schemas.microsoft.com/office/drawing/2010/main" xmlns="" val="0"/>
+                <a14:useLocalDpi xmlns="" xmlns:a14="http://schemas.microsoft.com/office/drawing/2010/main" val="0"/>
               </a:ext>
             </a:extLst>
           </a:blip>
@@ -26422,7 +26426,7 @@
           <a:noFill/>
           <a:extLst>
             <a:ext uri="{909E8E84-426E-40DD-AFC4-6F175D3DCCD1}">
-              <a14:hiddenFill xmlns:a14="http://schemas.microsoft.com/office/drawing/2010/main" xmlns="">
+              <a14:hiddenFill xmlns="" xmlns:a14="http://schemas.microsoft.com/office/drawing/2010/main">
                 <a:solidFill>
                   <a:srgbClr val="FFFFFF"/>
                 </a:solidFill>
@@ -26434,7 +26438,7 @@
     </p:spTree>
     <p:extLst>
       <p:ext uri="{BB962C8B-B14F-4D97-AF65-F5344CB8AC3E}">
-        <p14:creationId xmlns:p14="http://schemas.microsoft.com/office/powerpoint/2010/main" xmlns="" val="140638401"/>
+        <p14:creationId xmlns="" xmlns:p14="http://schemas.microsoft.com/office/powerpoint/2010/main" val="140638401"/>
       </p:ext>
     </p:extLst>
   </p:cSld>
@@ -26583,7 +26587,7 @@
           <a:blip r:embed="rId2" cstate="print">
             <a:extLst>
               <a:ext uri="{28A0092B-C50C-407E-A947-70E740481C1C}">
-                <a14:useLocalDpi xmlns:a14="http://schemas.microsoft.com/office/drawing/2010/main" xmlns="" val="0"/>
+                <a14:useLocalDpi xmlns="" xmlns:a14="http://schemas.microsoft.com/office/drawing/2010/main" val="0"/>
               </a:ext>
             </a:extLst>
           </a:blip>
@@ -26603,7 +26607,7 @@
           <a:noFill/>
           <a:extLst>
             <a:ext uri="{909E8E84-426E-40DD-AFC4-6F175D3DCCD1}">
-              <a14:hiddenFill xmlns:a14="http://schemas.microsoft.com/office/drawing/2010/main" xmlns="">
+              <a14:hiddenFill xmlns="" xmlns:a14="http://schemas.microsoft.com/office/drawing/2010/main">
                 <a:solidFill>
                   <a:srgbClr val="FFFFFF"/>
                 </a:solidFill>
@@ -26624,7 +26628,7 @@
           <a:blip r:embed="rId3" cstate="print">
             <a:extLst>
               <a:ext uri="{28A0092B-C50C-407E-A947-70E740481C1C}">
-                <a14:useLocalDpi xmlns:a14="http://schemas.microsoft.com/office/drawing/2010/main" xmlns="" val="0"/>
+                <a14:useLocalDpi xmlns="" xmlns:a14="http://schemas.microsoft.com/office/drawing/2010/main" val="0"/>
               </a:ext>
             </a:extLst>
           </a:blip>
@@ -26644,7 +26648,7 @@
           <a:noFill/>
           <a:extLst>
             <a:ext uri="{909E8E84-426E-40DD-AFC4-6F175D3DCCD1}">
-              <a14:hiddenFill xmlns:a14="http://schemas.microsoft.com/office/drawing/2010/main" xmlns="">
+              <a14:hiddenFill xmlns="" xmlns:a14="http://schemas.microsoft.com/office/drawing/2010/main">
                 <a:solidFill>
                   <a:srgbClr val="FFFFFF"/>
                 </a:solidFill>
@@ -26656,7 +26660,7 @@
     </p:spTree>
     <p:extLst>
       <p:ext uri="{BB962C8B-B14F-4D97-AF65-F5344CB8AC3E}">
-        <p14:creationId xmlns:p14="http://schemas.microsoft.com/office/powerpoint/2010/main" xmlns="" val="2262476767"/>
+        <p14:creationId xmlns="" xmlns:p14="http://schemas.microsoft.com/office/powerpoint/2010/main" val="2262476767"/>
       </p:ext>
     </p:extLst>
   </p:cSld>
@@ -28601,7 +28605,7 @@
           <a:blip r:embed="rId2" cstate="print">
             <a:extLst>
               <a:ext uri="{28A0092B-C50C-407E-A947-70E740481C1C}">
-                <a14:useLocalDpi xmlns:a14="http://schemas.microsoft.com/office/drawing/2010/main" xmlns="" val="0"/>
+                <a14:useLocalDpi xmlns="" xmlns:a14="http://schemas.microsoft.com/office/drawing/2010/main" val="0"/>
               </a:ext>
             </a:extLst>
           </a:blip>
@@ -28621,7 +28625,7 @@
           <a:noFill/>
           <a:extLst>
             <a:ext uri="{909E8E84-426E-40DD-AFC4-6F175D3DCCD1}">
-              <a14:hiddenFill xmlns:a14="http://schemas.microsoft.com/office/drawing/2010/main" xmlns="">
+              <a14:hiddenFill xmlns="" xmlns:a14="http://schemas.microsoft.com/office/drawing/2010/main">
                 <a:solidFill>
                   <a:srgbClr val="FFFFFF"/>
                 </a:solidFill>
@@ -28642,7 +28646,7 @@
           <a:blip r:embed="rId3" cstate="print">
             <a:extLst>
               <a:ext uri="{28A0092B-C50C-407E-A947-70E740481C1C}">
-                <a14:useLocalDpi xmlns:a14="http://schemas.microsoft.com/office/drawing/2010/main" xmlns="" val="0"/>
+                <a14:useLocalDpi xmlns="" xmlns:a14="http://schemas.microsoft.com/office/drawing/2010/main" val="0"/>
               </a:ext>
             </a:extLst>
           </a:blip>
@@ -28662,7 +28666,7 @@
           <a:noFill/>
           <a:extLst>
             <a:ext uri="{909E8E84-426E-40DD-AFC4-6F175D3DCCD1}">
-              <a14:hiddenFill xmlns:a14="http://schemas.microsoft.com/office/drawing/2010/main" xmlns="">
+              <a14:hiddenFill xmlns="" xmlns:a14="http://schemas.microsoft.com/office/drawing/2010/main">
                 <a:solidFill>
                   <a:srgbClr val="FFFFFF"/>
                 </a:solidFill>
@@ -28683,7 +28687,7 @@
           <a:blip r:embed="rId4">
             <a:extLst>
               <a:ext uri="{28A0092B-C50C-407E-A947-70E740481C1C}">
-                <a14:useLocalDpi xmlns:a14="http://schemas.microsoft.com/office/drawing/2010/main" xmlns="" val="0"/>
+                <a14:useLocalDpi xmlns="" xmlns:a14="http://schemas.microsoft.com/office/drawing/2010/main" val="0"/>
               </a:ext>
             </a:extLst>
           </a:blip>
@@ -28703,7 +28707,7 @@
           <a:noFill/>
           <a:extLst>
             <a:ext uri="{909E8E84-426E-40DD-AFC4-6F175D3DCCD1}">
-              <a14:hiddenFill xmlns:a14="http://schemas.microsoft.com/office/drawing/2010/main" xmlns="">
+              <a14:hiddenFill xmlns="" xmlns:a14="http://schemas.microsoft.com/office/drawing/2010/main">
                 <a:solidFill>
                   <a:srgbClr val="FFFFFF"/>
                 </a:solidFill>
@@ -28715,7 +28719,7 @@
     </p:spTree>
     <p:extLst>
       <p:ext uri="{BB962C8B-B14F-4D97-AF65-F5344CB8AC3E}">
-        <p14:creationId xmlns:p14="http://schemas.microsoft.com/office/powerpoint/2010/main" xmlns="" val="2023804496"/>
+        <p14:creationId xmlns="" xmlns:p14="http://schemas.microsoft.com/office/powerpoint/2010/main" val="2023804496"/>
       </p:ext>
     </p:extLst>
   </p:cSld>
@@ -30418,7 +30422,7 @@
           <a:blip r:embed="rId2" cstate="print">
             <a:extLst>
               <a:ext uri="{28A0092B-C50C-407E-A947-70E740481C1C}">
-                <a14:useLocalDpi xmlns:a14="http://schemas.microsoft.com/office/drawing/2010/main" xmlns="" val="0"/>
+                <a14:useLocalDpi xmlns="" xmlns:a14="http://schemas.microsoft.com/office/drawing/2010/main" val="0"/>
               </a:ext>
             </a:extLst>
           </a:blip>
@@ -30438,7 +30442,7 @@
           <a:noFill/>
           <a:extLst>
             <a:ext uri="{909E8E84-426E-40DD-AFC4-6F175D3DCCD1}">
-              <a14:hiddenFill xmlns:a14="http://schemas.microsoft.com/office/drawing/2010/main" xmlns="">
+              <a14:hiddenFill xmlns="" xmlns:a14="http://schemas.microsoft.com/office/drawing/2010/main">
                 <a:solidFill>
                   <a:srgbClr val="FFFFFF"/>
                 </a:solidFill>
@@ -30459,7 +30463,7 @@
           <a:blip r:embed="rId3" cstate="print">
             <a:extLst>
               <a:ext uri="{28A0092B-C50C-407E-A947-70E740481C1C}">
-                <a14:useLocalDpi xmlns:a14="http://schemas.microsoft.com/office/drawing/2010/main" xmlns="" val="0"/>
+                <a14:useLocalDpi xmlns="" xmlns:a14="http://schemas.microsoft.com/office/drawing/2010/main" val="0"/>
               </a:ext>
             </a:extLst>
           </a:blip>
@@ -30479,7 +30483,7 @@
           <a:noFill/>
           <a:extLst>
             <a:ext uri="{909E8E84-426E-40DD-AFC4-6F175D3DCCD1}">
-              <a14:hiddenFill xmlns:a14="http://schemas.microsoft.com/office/drawing/2010/main" xmlns="">
+              <a14:hiddenFill xmlns="" xmlns:a14="http://schemas.microsoft.com/office/drawing/2010/main">
                 <a:solidFill>
                   <a:srgbClr val="FFFFFF"/>
                 </a:solidFill>
@@ -30491,7 +30495,7 @@
     </p:spTree>
     <p:extLst>
       <p:ext uri="{BB962C8B-B14F-4D97-AF65-F5344CB8AC3E}">
-        <p14:creationId xmlns:p14="http://schemas.microsoft.com/office/powerpoint/2010/main" xmlns="" val="2666013015"/>
+        <p14:creationId xmlns="" xmlns:p14="http://schemas.microsoft.com/office/powerpoint/2010/main" val="2666013015"/>
       </p:ext>
     </p:extLst>
   </p:cSld>
@@ -30600,7 +30604,7 @@
           <a:blip r:embed="rId2" cstate="print">
             <a:extLst>
               <a:ext uri="{28A0092B-C50C-407E-A947-70E740481C1C}">
-                <a14:useLocalDpi xmlns:a14="http://schemas.microsoft.com/office/drawing/2010/main" xmlns="" val="0"/>
+                <a14:useLocalDpi xmlns="" xmlns:a14="http://schemas.microsoft.com/office/drawing/2010/main" val="0"/>
               </a:ext>
             </a:extLst>
           </a:blip>
@@ -30620,7 +30624,7 @@
           <a:noFill/>
           <a:extLst>
             <a:ext uri="{909E8E84-426E-40DD-AFC4-6F175D3DCCD1}">
-              <a14:hiddenFill xmlns:a14="http://schemas.microsoft.com/office/drawing/2010/main" xmlns="">
+              <a14:hiddenFill xmlns="" xmlns:a14="http://schemas.microsoft.com/office/drawing/2010/main">
                 <a:solidFill>
                   <a:srgbClr val="FFFFFF"/>
                 </a:solidFill>
@@ -30641,7 +30645,7 @@
           <a:blip r:embed="rId3" cstate="print">
             <a:extLst>
               <a:ext uri="{28A0092B-C50C-407E-A947-70E740481C1C}">
-                <a14:useLocalDpi xmlns:a14="http://schemas.microsoft.com/office/drawing/2010/main" xmlns="" val="0"/>
+                <a14:useLocalDpi xmlns="" xmlns:a14="http://schemas.microsoft.com/office/drawing/2010/main" val="0"/>
               </a:ext>
             </a:extLst>
           </a:blip>
@@ -30661,7 +30665,7 @@
           <a:noFill/>
           <a:extLst>
             <a:ext uri="{909E8E84-426E-40DD-AFC4-6F175D3DCCD1}">
-              <a14:hiddenFill xmlns:a14="http://schemas.microsoft.com/office/drawing/2010/main" xmlns="">
+              <a14:hiddenFill xmlns="" xmlns:a14="http://schemas.microsoft.com/office/drawing/2010/main">
                 <a:solidFill>
                   <a:srgbClr val="FFFFFF"/>
                 </a:solidFill>
@@ -30934,7 +30938,7 @@
     </p:spTree>
     <p:extLst>
       <p:ext uri="{BB962C8B-B14F-4D97-AF65-F5344CB8AC3E}">
-        <p14:creationId xmlns:p14="http://schemas.microsoft.com/office/powerpoint/2010/main" xmlns="" val="3693362975"/>
+        <p14:creationId xmlns="" xmlns:p14="http://schemas.microsoft.com/office/powerpoint/2010/main" val="3693362975"/>
       </p:ext>
     </p:extLst>
   </p:cSld>
@@ -32490,7 +32494,7 @@
           <a:blip r:embed="rId2" cstate="print">
             <a:extLst>
               <a:ext uri="{28A0092B-C50C-407E-A947-70E740481C1C}">
-                <a14:useLocalDpi xmlns:a14="http://schemas.microsoft.com/office/drawing/2010/main" xmlns="" val="0"/>
+                <a14:useLocalDpi xmlns="" xmlns:a14="http://schemas.microsoft.com/office/drawing/2010/main" val="0"/>
               </a:ext>
             </a:extLst>
           </a:blip>
@@ -32510,7 +32514,7 @@
           <a:noFill/>
           <a:extLst>
             <a:ext uri="{909E8E84-426E-40DD-AFC4-6F175D3DCCD1}">
-              <a14:hiddenFill xmlns:a14="http://schemas.microsoft.com/office/drawing/2010/main" xmlns="">
+              <a14:hiddenFill xmlns="" xmlns:a14="http://schemas.microsoft.com/office/drawing/2010/main">
                 <a:solidFill>
                   <a:srgbClr val="FFFFFF"/>
                 </a:solidFill>
@@ -32531,7 +32535,7 @@
           <a:blip r:embed="rId3" cstate="print">
             <a:extLst>
               <a:ext uri="{28A0092B-C50C-407E-A947-70E740481C1C}">
-                <a14:useLocalDpi xmlns:a14="http://schemas.microsoft.com/office/drawing/2010/main" xmlns="" val="0"/>
+                <a14:useLocalDpi xmlns="" xmlns:a14="http://schemas.microsoft.com/office/drawing/2010/main" val="0"/>
               </a:ext>
             </a:extLst>
           </a:blip>
@@ -32551,7 +32555,7 @@
           <a:noFill/>
           <a:extLst>
             <a:ext uri="{909E8E84-426E-40DD-AFC4-6F175D3DCCD1}">
-              <a14:hiddenFill xmlns:a14="http://schemas.microsoft.com/office/drawing/2010/main" xmlns="">
+              <a14:hiddenFill xmlns="" xmlns:a14="http://schemas.microsoft.com/office/drawing/2010/main">
                 <a:solidFill>
                   <a:srgbClr val="FFFFFF"/>
                 </a:solidFill>
@@ -32850,7 +32854,7 @@
     </p:spTree>
     <p:extLst>
       <p:ext uri="{BB962C8B-B14F-4D97-AF65-F5344CB8AC3E}">
-        <p14:creationId xmlns:p14="http://schemas.microsoft.com/office/powerpoint/2010/main" xmlns="" val="3693362975"/>
+        <p14:creationId xmlns="" xmlns:p14="http://schemas.microsoft.com/office/powerpoint/2010/main" val="3693362975"/>
       </p:ext>
     </p:extLst>
   </p:cSld>
@@ -35089,7 +35093,7 @@
           <a:blip r:embed="rId3" cstate="print">
             <a:extLst>
               <a:ext uri="{28A0092B-C50C-407E-A947-70E740481C1C}">
-                <a14:useLocalDpi xmlns="" xmlns:a14="http://schemas.microsoft.com/office/drawing/2010/main" val="0"/>
+                <a14:useLocalDpi xmlns:a14="http://schemas.microsoft.com/office/drawing/2010/main" xmlns="" val="0"/>
               </a:ext>
             </a:extLst>
           </a:blip>
@@ -35109,7 +35113,7 @@
           <a:noFill/>
           <a:extLst>
             <a:ext uri="{909E8E84-426E-40DD-AFC4-6F175D3DCCD1}">
-              <a14:hiddenFill xmlns="" xmlns:a14="http://schemas.microsoft.com/office/drawing/2010/main">
+              <a14:hiddenFill xmlns:a14="http://schemas.microsoft.com/office/drawing/2010/main" xmlns="">
                 <a:solidFill>
                   <a:srgbClr val="FFFFFF"/>
                 </a:solidFill>
@@ -35130,7 +35134,7 @@
           <a:blip r:embed="rId4" cstate="print">
             <a:extLst>
               <a:ext uri="{28A0092B-C50C-407E-A947-70E740481C1C}">
-                <a14:useLocalDpi xmlns="" xmlns:a14="http://schemas.microsoft.com/office/drawing/2010/main" val="0"/>
+                <a14:useLocalDpi xmlns:a14="http://schemas.microsoft.com/office/drawing/2010/main" xmlns="" val="0"/>
               </a:ext>
             </a:extLst>
           </a:blip>
@@ -35150,7 +35154,7 @@
           <a:noFill/>
           <a:extLst>
             <a:ext uri="{909E8E84-426E-40DD-AFC4-6F175D3DCCD1}">
-              <a14:hiddenFill xmlns="" xmlns:a14="http://schemas.microsoft.com/office/drawing/2010/main">
+              <a14:hiddenFill xmlns:a14="http://schemas.microsoft.com/office/drawing/2010/main" xmlns="">
                 <a:solidFill>
                   <a:srgbClr val="FFFFFF"/>
                 </a:solidFill>
@@ -35195,7 +35199,7 @@
           <p:nvPr>
             <p:extLst>
               <p:ext uri="{D42A27DB-BD31-4B8C-83A1-F6EECF244321}">
-                <p14:modId xmlns="" xmlns:p14="http://schemas.microsoft.com/office/powerpoint/2010/main" val="3925065347"/>
+                <p14:modId xmlns:p14="http://schemas.microsoft.com/office/powerpoint/2010/main" xmlns="" val="3925065347"/>
               </p:ext>
             </p:extLst>
           </p:nvPr>
@@ -35213,7 +35217,7 @@
     </p:spTree>
     <p:extLst>
       <p:ext uri="{BB962C8B-B14F-4D97-AF65-F5344CB8AC3E}">
-        <p14:creationId xmlns="" xmlns:p14="http://schemas.microsoft.com/office/powerpoint/2010/main" val="3693362975"/>
+        <p14:creationId xmlns:p14="http://schemas.microsoft.com/office/powerpoint/2010/main" xmlns="" val="3693362975"/>
       </p:ext>
     </p:extLst>
   </p:cSld>
@@ -35377,7 +35381,7 @@
           <a:blip r:embed="rId2" cstate="print">
             <a:extLst>
               <a:ext uri="{28A0092B-C50C-407E-A947-70E740481C1C}">
-                <a14:useLocalDpi xmlns:a14="http://schemas.microsoft.com/office/drawing/2010/main" xmlns="" val="0"/>
+                <a14:useLocalDpi xmlns="" xmlns:a14="http://schemas.microsoft.com/office/drawing/2010/main" val="0"/>
               </a:ext>
             </a:extLst>
           </a:blip>
@@ -35397,7 +35401,7 @@
           <a:noFill/>
           <a:extLst>
             <a:ext uri="{909E8E84-426E-40DD-AFC4-6F175D3DCCD1}">
-              <a14:hiddenFill xmlns:a14="http://schemas.microsoft.com/office/drawing/2010/main" xmlns="">
+              <a14:hiddenFill xmlns="" xmlns:a14="http://schemas.microsoft.com/office/drawing/2010/main">
                 <a:solidFill>
                   <a:srgbClr val="FFFFFF"/>
                 </a:solidFill>
@@ -35418,7 +35422,7 @@
           <a:blip r:embed="rId3" cstate="print">
             <a:extLst>
               <a:ext uri="{28A0092B-C50C-407E-A947-70E740481C1C}">
-                <a14:useLocalDpi xmlns:a14="http://schemas.microsoft.com/office/drawing/2010/main" xmlns="" val="0"/>
+                <a14:useLocalDpi xmlns="" xmlns:a14="http://schemas.microsoft.com/office/drawing/2010/main" val="0"/>
               </a:ext>
             </a:extLst>
           </a:blip>
@@ -35438,7 +35442,7 @@
           <a:noFill/>
           <a:extLst>
             <a:ext uri="{909E8E84-426E-40DD-AFC4-6F175D3DCCD1}">
-              <a14:hiddenFill xmlns:a14="http://schemas.microsoft.com/office/drawing/2010/main" xmlns="">
+              <a14:hiddenFill xmlns="" xmlns:a14="http://schemas.microsoft.com/office/drawing/2010/main">
                 <a:solidFill>
                   <a:srgbClr val="FFFFFF"/>
                 </a:solidFill>
@@ -35450,7 +35454,7 @@
     </p:spTree>
     <p:extLst>
       <p:ext uri="{BB962C8B-B14F-4D97-AF65-F5344CB8AC3E}">
-        <p14:creationId xmlns:p14="http://schemas.microsoft.com/office/powerpoint/2010/main" xmlns="" val="1251326373"/>
+        <p14:creationId xmlns="" xmlns:p14="http://schemas.microsoft.com/office/powerpoint/2010/main" val="1251326373"/>
       </p:ext>
     </p:extLst>
   </p:cSld>
@@ -35937,7 +35941,7 @@
           <a:blip r:embed="rId2" cstate="print">
             <a:extLst>
               <a:ext uri="{28A0092B-C50C-407E-A947-70E740481C1C}">
-                <a14:useLocalDpi xmlns:a14="http://schemas.microsoft.com/office/drawing/2010/main" xmlns="" val="0"/>
+                <a14:useLocalDpi xmlns="" xmlns:a14="http://schemas.microsoft.com/office/drawing/2010/main" val="0"/>
               </a:ext>
             </a:extLst>
           </a:blip>
@@ -35957,7 +35961,7 @@
           <a:noFill/>
           <a:extLst>
             <a:ext uri="{909E8E84-426E-40DD-AFC4-6F175D3DCCD1}">
-              <a14:hiddenFill xmlns:a14="http://schemas.microsoft.com/office/drawing/2010/main" xmlns="">
+              <a14:hiddenFill xmlns="" xmlns:a14="http://schemas.microsoft.com/office/drawing/2010/main">
                 <a:solidFill>
                   <a:srgbClr val="FFFFFF"/>
                 </a:solidFill>
@@ -35978,7 +35982,7 @@
           <a:blip r:embed="rId3" cstate="print">
             <a:extLst>
               <a:ext uri="{28A0092B-C50C-407E-A947-70E740481C1C}">
-                <a14:useLocalDpi xmlns:a14="http://schemas.microsoft.com/office/drawing/2010/main" xmlns="" val="0"/>
+                <a14:useLocalDpi xmlns="" xmlns:a14="http://schemas.microsoft.com/office/drawing/2010/main" val="0"/>
               </a:ext>
             </a:extLst>
           </a:blip>
@@ -35998,7 +36002,7 @@
           <a:noFill/>
           <a:extLst>
             <a:ext uri="{909E8E84-426E-40DD-AFC4-6F175D3DCCD1}">
-              <a14:hiddenFill xmlns:a14="http://schemas.microsoft.com/office/drawing/2010/main" xmlns="">
+              <a14:hiddenFill xmlns="" xmlns:a14="http://schemas.microsoft.com/office/drawing/2010/main">
                 <a:solidFill>
                   <a:srgbClr val="FFFFFF"/>
                 </a:solidFill>
@@ -36026,7 +36030,7 @@
           <a:noFill/>
           <a:extLst>
             <a:ext uri="{909E8E84-426E-40DD-AFC4-6F175D3DCCD1}">
-              <a14:hiddenFill xmlns:a14="http://schemas.microsoft.com/office/drawing/2010/main" xmlns="">
+              <a14:hiddenFill xmlns="" xmlns:a14="http://schemas.microsoft.com/office/drawing/2010/main">
                 <a:solidFill>
                   <a:srgbClr val="FFFFFF"/>
                 </a:solidFill>
@@ -36065,7 +36069,7 @@
           <a:noFill/>
           <a:extLst>
             <a:ext uri="{909E8E84-426E-40DD-AFC4-6F175D3DCCD1}">
-              <a14:hiddenFill xmlns:a14="http://schemas.microsoft.com/office/drawing/2010/main" xmlns="">
+              <a14:hiddenFill xmlns="" xmlns:a14="http://schemas.microsoft.com/office/drawing/2010/main">
                 <a:solidFill>
                   <a:srgbClr val="FFFFFF"/>
                 </a:solidFill>
@@ -36104,7 +36108,7 @@
           <a:noFill/>
           <a:extLst>
             <a:ext uri="{909E8E84-426E-40DD-AFC4-6F175D3DCCD1}">
-              <a14:hiddenFill xmlns:a14="http://schemas.microsoft.com/office/drawing/2010/main" xmlns="">
+              <a14:hiddenFill xmlns="" xmlns:a14="http://schemas.microsoft.com/office/drawing/2010/main">
                 <a:solidFill>
                   <a:srgbClr val="FFFFFF"/>
                 </a:solidFill>
@@ -36143,7 +36147,7 @@
           <a:noFill/>
           <a:extLst>
             <a:ext uri="{909E8E84-426E-40DD-AFC4-6F175D3DCCD1}">
-              <a14:hiddenFill xmlns:a14="http://schemas.microsoft.com/office/drawing/2010/main" xmlns="">
+              <a14:hiddenFill xmlns="" xmlns:a14="http://schemas.microsoft.com/office/drawing/2010/main">
                 <a:solidFill>
                   <a:srgbClr val="FFFFFF"/>
                 </a:solidFill>
@@ -36182,7 +36186,7 @@
           <a:noFill/>
           <a:extLst>
             <a:ext uri="{909E8E84-426E-40DD-AFC4-6F175D3DCCD1}">
-              <a14:hiddenFill xmlns:a14="http://schemas.microsoft.com/office/drawing/2010/main" xmlns="">
+              <a14:hiddenFill xmlns="" xmlns:a14="http://schemas.microsoft.com/office/drawing/2010/main">
                 <a:solidFill>
                   <a:srgbClr val="FFFFFF"/>
                 </a:solidFill>
@@ -36214,7 +36218,7 @@
           <a:blip r:embed="rId4">
             <a:extLst>
               <a:ext uri="{28A0092B-C50C-407E-A947-70E740481C1C}">
-                <a14:useLocalDpi xmlns:a14="http://schemas.microsoft.com/office/drawing/2010/main" xmlns="" val="0"/>
+                <a14:useLocalDpi xmlns="" xmlns:a14="http://schemas.microsoft.com/office/drawing/2010/main" val="0"/>
               </a:ext>
             </a:extLst>
           </a:blip>
@@ -36238,14 +36242,14 @@
           <a:effectLst/>
           <a:extLst>
             <a:ext uri="{909E8E84-426E-40DD-AFC4-6F175D3DCCD1}">
-              <a14:hiddenFill xmlns:a14="http://schemas.microsoft.com/office/drawing/2010/main" xmlns="">
+              <a14:hiddenFill xmlns="" xmlns:a14="http://schemas.microsoft.com/office/drawing/2010/main">
                 <a:solidFill>
                   <a:schemeClr val="accent1"/>
                 </a:solidFill>
               </a14:hiddenFill>
             </a:ext>
             <a:ext uri="{91240B29-F687-4F45-9708-019B960494DF}">
-              <a14:hiddenLine xmlns:a14="http://schemas.microsoft.com/office/drawing/2010/main" xmlns="" w="9525">
+              <a14:hiddenLine xmlns="" xmlns:a14="http://schemas.microsoft.com/office/drawing/2010/main" w="9525">
                 <a:solidFill>
                   <a:schemeClr val="tx1"/>
                 </a:solidFill>
@@ -36255,7 +36259,7 @@
               </a14:hiddenLine>
             </a:ext>
             <a:ext uri="{AF507438-7753-43E0-B8FC-AC1667EBCBE1}">
-              <a14:hiddenEffects xmlns:a14="http://schemas.microsoft.com/office/drawing/2010/main" xmlns="">
+              <a14:hiddenEffects xmlns="" xmlns:a14="http://schemas.microsoft.com/office/drawing/2010/main">
                 <a:effectLst>
                   <a:outerShdw dist="35921" dir="2700000" algn="ctr" rotWithShape="0">
                     <a:schemeClr val="bg2"/>
@@ -36269,7 +36273,7 @@
     </p:spTree>
     <p:extLst>
       <p:ext uri="{BB962C8B-B14F-4D97-AF65-F5344CB8AC3E}">
-        <p14:creationId xmlns:p14="http://schemas.microsoft.com/office/powerpoint/2010/main" xmlns="" val="2273561369"/>
+        <p14:creationId xmlns="" xmlns:p14="http://schemas.microsoft.com/office/powerpoint/2010/main" val="2273561369"/>
       </p:ext>
     </p:extLst>
   </p:cSld>
@@ -36773,7 +36777,7 @@
           <a:blip r:embed="rId2" cstate="print">
             <a:extLst>
               <a:ext uri="{28A0092B-C50C-407E-A947-70E740481C1C}">
-                <a14:useLocalDpi xmlns:a14="http://schemas.microsoft.com/office/drawing/2010/main" xmlns="" val="0"/>
+                <a14:useLocalDpi xmlns="" xmlns:a14="http://schemas.microsoft.com/office/drawing/2010/main" val="0"/>
               </a:ext>
             </a:extLst>
           </a:blip>
@@ -36797,14 +36801,14 @@
           <a:effectLst/>
           <a:extLst>
             <a:ext uri="{909E8E84-426E-40DD-AFC4-6F175D3DCCD1}">
-              <a14:hiddenFill xmlns:a14="http://schemas.microsoft.com/office/drawing/2010/main" xmlns="">
+              <a14:hiddenFill xmlns="" xmlns:a14="http://schemas.microsoft.com/office/drawing/2010/main">
                 <a:solidFill>
                   <a:schemeClr val="accent1"/>
                 </a:solidFill>
               </a14:hiddenFill>
             </a:ext>
             <a:ext uri="{91240B29-F687-4F45-9708-019B960494DF}">
-              <a14:hiddenLine xmlns:a14="http://schemas.microsoft.com/office/drawing/2010/main" xmlns="" w="9525">
+              <a14:hiddenLine xmlns="" xmlns:a14="http://schemas.microsoft.com/office/drawing/2010/main" w="9525">
                 <a:solidFill>
                   <a:schemeClr val="tx1"/>
                 </a:solidFill>
@@ -36814,7 +36818,7 @@
               </a14:hiddenLine>
             </a:ext>
             <a:ext uri="{AF507438-7753-43E0-B8FC-AC1667EBCBE1}">
-              <a14:hiddenEffects xmlns:a14="http://schemas.microsoft.com/office/drawing/2010/main" xmlns="">
+              <a14:hiddenEffects xmlns="" xmlns:a14="http://schemas.microsoft.com/office/drawing/2010/main">
                 <a:effectLst>
                   <a:outerShdw dist="35921" dir="2700000" algn="ctr" rotWithShape="0">
                     <a:schemeClr val="bg2"/>
@@ -36837,7 +36841,7 @@
           <a:blip r:embed="rId3" cstate="print">
             <a:extLst>
               <a:ext uri="{28A0092B-C50C-407E-A947-70E740481C1C}">
-                <a14:useLocalDpi xmlns:a14="http://schemas.microsoft.com/office/drawing/2010/main" xmlns="" val="0"/>
+                <a14:useLocalDpi xmlns="" xmlns:a14="http://schemas.microsoft.com/office/drawing/2010/main" val="0"/>
               </a:ext>
             </a:extLst>
           </a:blip>
@@ -36857,7 +36861,7 @@
           <a:noFill/>
           <a:extLst>
             <a:ext uri="{909E8E84-426E-40DD-AFC4-6F175D3DCCD1}">
-              <a14:hiddenFill xmlns:a14="http://schemas.microsoft.com/office/drawing/2010/main" xmlns="">
+              <a14:hiddenFill xmlns="" xmlns:a14="http://schemas.microsoft.com/office/drawing/2010/main">
                 <a:solidFill>
                   <a:srgbClr val="FFFFFF"/>
                 </a:solidFill>
@@ -36878,7 +36882,7 @@
           <a:blip r:embed="rId4" cstate="print">
             <a:extLst>
               <a:ext uri="{28A0092B-C50C-407E-A947-70E740481C1C}">
-                <a14:useLocalDpi xmlns:a14="http://schemas.microsoft.com/office/drawing/2010/main" xmlns="" val="0"/>
+                <a14:useLocalDpi xmlns="" xmlns:a14="http://schemas.microsoft.com/office/drawing/2010/main" val="0"/>
               </a:ext>
             </a:extLst>
           </a:blip>
@@ -36898,7 +36902,7 @@
           <a:noFill/>
           <a:extLst>
             <a:ext uri="{909E8E84-426E-40DD-AFC4-6F175D3DCCD1}">
-              <a14:hiddenFill xmlns:a14="http://schemas.microsoft.com/office/drawing/2010/main" xmlns="">
+              <a14:hiddenFill xmlns="" xmlns:a14="http://schemas.microsoft.com/office/drawing/2010/main">
                 <a:solidFill>
                   <a:srgbClr val="FFFFFF"/>
                 </a:solidFill>
@@ -36910,7 +36914,7 @@
     </p:spTree>
     <p:extLst>
       <p:ext uri="{BB962C8B-B14F-4D97-AF65-F5344CB8AC3E}">
-        <p14:creationId xmlns:p14="http://schemas.microsoft.com/office/powerpoint/2010/main" xmlns="" val="1450032067"/>
+        <p14:creationId xmlns="" xmlns:p14="http://schemas.microsoft.com/office/powerpoint/2010/main" val="1450032067"/>
       </p:ext>
     </p:extLst>
   </p:cSld>
@@ -36983,7 +36987,7 @@
           <a:blip r:embed="rId2" cstate="print">
             <a:extLst>
               <a:ext uri="{28A0092B-C50C-407E-A947-70E740481C1C}">
-                <a14:useLocalDpi xmlns:a14="http://schemas.microsoft.com/office/drawing/2010/main" xmlns="" val="0"/>
+                <a14:useLocalDpi xmlns="" xmlns:a14="http://schemas.microsoft.com/office/drawing/2010/main" val="0"/>
               </a:ext>
             </a:extLst>
           </a:blip>
@@ -37003,7 +37007,7 @@
           <a:noFill/>
           <a:extLst>
             <a:ext uri="{909E8E84-426E-40DD-AFC4-6F175D3DCCD1}">
-              <a14:hiddenFill xmlns:a14="http://schemas.microsoft.com/office/drawing/2010/main" xmlns="">
+              <a14:hiddenFill xmlns="" xmlns:a14="http://schemas.microsoft.com/office/drawing/2010/main">
                 <a:solidFill>
                   <a:srgbClr val="FFFFFF"/>
                 </a:solidFill>
@@ -37024,7 +37028,7 @@
           <a:blip r:embed="rId3" cstate="print">
             <a:extLst>
               <a:ext uri="{28A0092B-C50C-407E-A947-70E740481C1C}">
-                <a14:useLocalDpi xmlns:a14="http://schemas.microsoft.com/office/drawing/2010/main" xmlns="" val="0"/>
+                <a14:useLocalDpi xmlns="" xmlns:a14="http://schemas.microsoft.com/office/drawing/2010/main" val="0"/>
               </a:ext>
             </a:extLst>
           </a:blip>
@@ -37044,7 +37048,7 @@
           <a:noFill/>
           <a:extLst>
             <a:ext uri="{909E8E84-426E-40DD-AFC4-6F175D3DCCD1}">
-              <a14:hiddenFill xmlns:a14="http://schemas.microsoft.com/office/drawing/2010/main" xmlns="">
+              <a14:hiddenFill xmlns="" xmlns:a14="http://schemas.microsoft.com/office/drawing/2010/main">
                 <a:solidFill>
                   <a:srgbClr val="FFFFFF"/>
                 </a:solidFill>
@@ -37065,7 +37069,7 @@
           <a:blip r:embed="rId4">
             <a:extLst>
               <a:ext uri="{28A0092B-C50C-407E-A947-70E740481C1C}">
-                <a14:useLocalDpi xmlns:a14="http://schemas.microsoft.com/office/drawing/2010/main" xmlns="" val="0"/>
+                <a14:useLocalDpi xmlns="" xmlns:a14="http://schemas.microsoft.com/office/drawing/2010/main" val="0"/>
               </a:ext>
             </a:extLst>
           </a:blip>
@@ -37085,7 +37089,7 @@
           <a:noFill/>
           <a:extLst>
             <a:ext uri="{909E8E84-426E-40DD-AFC4-6F175D3DCCD1}">
-              <a14:hiddenFill xmlns:a14="http://schemas.microsoft.com/office/drawing/2010/main" xmlns="">
+              <a14:hiddenFill xmlns="" xmlns:a14="http://schemas.microsoft.com/office/drawing/2010/main">
                 <a:solidFill>
                   <a:srgbClr val="FFFFFF"/>
                 </a:solidFill>
@@ -37097,7 +37101,7 @@
     </p:spTree>
     <p:extLst>
       <p:ext uri="{BB962C8B-B14F-4D97-AF65-F5344CB8AC3E}">
-        <p14:creationId xmlns:p14="http://schemas.microsoft.com/office/powerpoint/2010/main" xmlns="" val="1688055498"/>
+        <p14:creationId xmlns="" xmlns:p14="http://schemas.microsoft.com/office/powerpoint/2010/main" val="1688055498"/>
       </p:ext>
     </p:extLst>
   </p:cSld>
@@ -37368,29 +37372,22 @@
           </a:p>
           <a:p>
             <a:r>
-              <a:rPr lang="es-AR" b="1" dirty="0">
+              <a:rPr lang="es-AR" b="1" dirty="0" smtClean="0">
                 <a:solidFill>
                   <a:schemeClr val="tx1"/>
                 </a:solidFill>
               </a:rPr>
-              <a:t>Mariano </a:t>
+              <a:t>Sergio Brizuela: </a:t>
             </a:r>
             <a:r>
-              <a:rPr lang="es-AR" b="1" dirty="0" err="1">
+              <a:rPr lang="es-AR" dirty="0" smtClean="0">
                 <a:solidFill>
                   <a:schemeClr val="tx1"/>
                 </a:solidFill>
               </a:rPr>
-              <a:t>Gava</a:t>
+              <a:t>Trabajador independiente</a:t>
             </a:r>
-            <a:r>
-              <a:rPr lang="es-AR" dirty="0">
-                <a:solidFill>
-                  <a:schemeClr val="tx1"/>
-                </a:solidFill>
-              </a:rPr>
-              <a:t>: Agente de asistencia técnica para Pymes en Jazztel (empresa española de telecomunicaciones).</a:t>
-            </a:r>
+            <a:endParaRPr lang="en-US" dirty="0" smtClean="0"/>
           </a:p>
           <a:p>
             <a:endParaRPr lang="es-AR" dirty="0">
@@ -37474,22 +37471,34 @@
           </a:p>
           <a:p>
             <a:r>
-              <a:rPr lang="es-AR" b="1" dirty="0">
+              <a:rPr lang="es-AR" b="1" dirty="0" smtClean="0">
                 <a:solidFill>
                   <a:schemeClr val="tx1"/>
                 </a:solidFill>
               </a:rPr>
-              <a:t>Sergio Brizuela: </a:t>
+              <a:t>Mariano </a:t>
             </a:r>
             <a:r>
-              <a:rPr lang="es-AR" dirty="0">
+              <a:rPr lang="es-AR" b="1" dirty="0" err="1" smtClean="0">
                 <a:solidFill>
                   <a:schemeClr val="tx1"/>
                 </a:solidFill>
               </a:rPr>
-              <a:t>Trabajador independiente</a:t>
+              <a:t>Gava</a:t>
             </a:r>
-            <a:endParaRPr lang="en-US" dirty="0"/>
+            <a:r>
+              <a:rPr lang="es-AR" dirty="0" smtClean="0">
+                <a:solidFill>
+                  <a:schemeClr val="tx1"/>
+                </a:solidFill>
+              </a:rPr>
+              <a:t>: Agente de asistencia técnica para Pymes en Jazztel (empresa española de telecomunicaciones).</a:t>
+            </a:r>
+            <a:endParaRPr lang="es-AR" dirty="0">
+              <a:solidFill>
+                <a:schemeClr val="tx1"/>
+              </a:solidFill>
+            </a:endParaRPr>
           </a:p>
         </p:txBody>
       </p:sp>
@@ -37540,7 +37549,7 @@
           <a:blip r:embed="rId2" cstate="print">
             <a:extLst>
               <a:ext uri="{28A0092B-C50C-407E-A947-70E740481C1C}">
-                <a14:useLocalDpi xmlns:a14="http://schemas.microsoft.com/office/drawing/2010/main" xmlns="" val="0"/>
+                <a14:useLocalDpi xmlns="" xmlns:a14="http://schemas.microsoft.com/office/drawing/2010/main" val="0"/>
               </a:ext>
             </a:extLst>
           </a:blip>
@@ -37560,7 +37569,7 @@
           <a:noFill/>
           <a:extLst>
             <a:ext uri="{909E8E84-426E-40DD-AFC4-6F175D3DCCD1}">
-              <a14:hiddenFill xmlns:a14="http://schemas.microsoft.com/office/drawing/2010/main" xmlns="">
+              <a14:hiddenFill xmlns="" xmlns:a14="http://schemas.microsoft.com/office/drawing/2010/main">
                 <a:solidFill>
                   <a:srgbClr val="FFFFFF"/>
                 </a:solidFill>
@@ -37581,7 +37590,7 @@
           <a:blip r:embed="rId3" cstate="print">
             <a:extLst>
               <a:ext uri="{28A0092B-C50C-407E-A947-70E740481C1C}">
-                <a14:useLocalDpi xmlns:a14="http://schemas.microsoft.com/office/drawing/2010/main" xmlns="" val="0"/>
+                <a14:useLocalDpi xmlns="" xmlns:a14="http://schemas.microsoft.com/office/drawing/2010/main" val="0"/>
               </a:ext>
             </a:extLst>
           </a:blip>
@@ -37601,7 +37610,7 @@
           <a:noFill/>
           <a:extLst>
             <a:ext uri="{909E8E84-426E-40DD-AFC4-6F175D3DCCD1}">
-              <a14:hiddenFill xmlns:a14="http://schemas.microsoft.com/office/drawing/2010/main" xmlns="">
+              <a14:hiddenFill xmlns="" xmlns:a14="http://schemas.microsoft.com/office/drawing/2010/main">
                 <a:solidFill>
                   <a:srgbClr val="FFFFFF"/>
                 </a:solidFill>
@@ -37613,7 +37622,7 @@
     </p:spTree>
     <p:extLst>
       <p:ext uri="{BB962C8B-B14F-4D97-AF65-F5344CB8AC3E}">
-        <p14:creationId xmlns:p14="http://schemas.microsoft.com/office/powerpoint/2010/main" xmlns="" val="119432886"/>
+        <p14:creationId xmlns="" xmlns:p14="http://schemas.microsoft.com/office/powerpoint/2010/main" val="119432886"/>
       </p:ext>
     </p:extLst>
   </p:cSld>
@@ -37786,7 +37795,7 @@
           <a:blip r:embed="rId2" cstate="print">
             <a:extLst>
               <a:ext uri="{28A0092B-C50C-407E-A947-70E740481C1C}">
-                <a14:useLocalDpi xmlns:a14="http://schemas.microsoft.com/office/drawing/2010/main" xmlns="" val="0"/>
+                <a14:useLocalDpi xmlns="" xmlns:a14="http://schemas.microsoft.com/office/drawing/2010/main" val="0"/>
               </a:ext>
             </a:extLst>
           </a:blip>
@@ -37806,7 +37815,7 @@
           <a:noFill/>
           <a:extLst>
             <a:ext uri="{909E8E84-426E-40DD-AFC4-6F175D3DCCD1}">
-              <a14:hiddenFill xmlns:a14="http://schemas.microsoft.com/office/drawing/2010/main" xmlns="">
+              <a14:hiddenFill xmlns="" xmlns:a14="http://schemas.microsoft.com/office/drawing/2010/main">
                 <a:solidFill>
                   <a:srgbClr val="FFFFFF"/>
                 </a:solidFill>
@@ -37827,7 +37836,7 @@
           <a:blip r:embed="rId3" cstate="print">
             <a:extLst>
               <a:ext uri="{28A0092B-C50C-407E-A947-70E740481C1C}">
-                <a14:useLocalDpi xmlns:a14="http://schemas.microsoft.com/office/drawing/2010/main" xmlns="" val="0"/>
+                <a14:useLocalDpi xmlns="" xmlns:a14="http://schemas.microsoft.com/office/drawing/2010/main" val="0"/>
               </a:ext>
             </a:extLst>
           </a:blip>
@@ -37847,7 +37856,7 @@
           <a:noFill/>
           <a:extLst>
             <a:ext uri="{909E8E84-426E-40DD-AFC4-6F175D3DCCD1}">
-              <a14:hiddenFill xmlns:a14="http://schemas.microsoft.com/office/drawing/2010/main" xmlns="">
+              <a14:hiddenFill xmlns="" xmlns:a14="http://schemas.microsoft.com/office/drawing/2010/main">
                 <a:solidFill>
                   <a:srgbClr val="FFFFFF"/>
                 </a:solidFill>
@@ -37859,7 +37868,7 @@
     </p:spTree>
     <p:extLst>
       <p:ext uri="{BB962C8B-B14F-4D97-AF65-F5344CB8AC3E}">
-        <p14:creationId xmlns:p14="http://schemas.microsoft.com/office/powerpoint/2010/main" xmlns="" val="3537553483"/>
+        <p14:creationId xmlns="" xmlns:p14="http://schemas.microsoft.com/office/powerpoint/2010/main" val="3537553483"/>
       </p:ext>
     </p:extLst>
   </p:cSld>
@@ -38368,7 +38377,7 @@
           <a:blip r:embed="rId2" cstate="print">
             <a:extLst>
               <a:ext uri="{28A0092B-C50C-407E-A947-70E740481C1C}">
-                <a14:useLocalDpi xmlns:a14="http://schemas.microsoft.com/office/drawing/2010/main" xmlns="" val="0"/>
+                <a14:useLocalDpi xmlns="" xmlns:a14="http://schemas.microsoft.com/office/drawing/2010/main" val="0"/>
               </a:ext>
             </a:extLst>
           </a:blip>
@@ -38388,7 +38397,7 @@
           <a:noFill/>
           <a:extLst>
             <a:ext uri="{909E8E84-426E-40DD-AFC4-6F175D3DCCD1}">
-              <a14:hiddenFill xmlns:a14="http://schemas.microsoft.com/office/drawing/2010/main" xmlns="">
+              <a14:hiddenFill xmlns="" xmlns:a14="http://schemas.microsoft.com/office/drawing/2010/main">
                 <a:solidFill>
                   <a:srgbClr val="FFFFFF"/>
                 </a:solidFill>
@@ -38409,7 +38418,7 @@
           <a:blip r:embed="rId3" cstate="print">
             <a:extLst>
               <a:ext uri="{28A0092B-C50C-407E-A947-70E740481C1C}">
-                <a14:useLocalDpi xmlns:a14="http://schemas.microsoft.com/office/drawing/2010/main" xmlns="" val="0"/>
+                <a14:useLocalDpi xmlns="" xmlns:a14="http://schemas.microsoft.com/office/drawing/2010/main" val="0"/>
               </a:ext>
             </a:extLst>
           </a:blip>
@@ -38429,7 +38438,7 @@
           <a:noFill/>
           <a:extLst>
             <a:ext uri="{909E8E84-426E-40DD-AFC4-6F175D3DCCD1}">
-              <a14:hiddenFill xmlns:a14="http://schemas.microsoft.com/office/drawing/2010/main" xmlns="">
+              <a14:hiddenFill xmlns="" xmlns:a14="http://schemas.microsoft.com/office/drawing/2010/main">
                 <a:solidFill>
                   <a:srgbClr val="FFFFFF"/>
                 </a:solidFill>
@@ -38552,7 +38561,7 @@
     </p:spTree>
     <p:extLst>
       <p:ext uri="{BB962C8B-B14F-4D97-AF65-F5344CB8AC3E}">
-        <p14:creationId xmlns:p14="http://schemas.microsoft.com/office/powerpoint/2010/main" xmlns="" val="2857880001"/>
+        <p14:creationId xmlns="" xmlns:p14="http://schemas.microsoft.com/office/powerpoint/2010/main" val="2857880001"/>
       </p:ext>
     </p:extLst>
   </p:cSld>
@@ -38976,7 +38985,7 @@
           <a:blip r:embed="rId2" cstate="print">
             <a:extLst>
               <a:ext uri="{28A0092B-C50C-407E-A947-70E740481C1C}">
-                <a14:useLocalDpi xmlns:a14="http://schemas.microsoft.com/office/drawing/2010/main" xmlns="" val="0"/>
+                <a14:useLocalDpi xmlns="" xmlns:a14="http://schemas.microsoft.com/office/drawing/2010/main" val="0"/>
               </a:ext>
             </a:extLst>
           </a:blip>
@@ -38996,7 +39005,7 @@
           <a:noFill/>
           <a:extLst>
             <a:ext uri="{909E8E84-426E-40DD-AFC4-6F175D3DCCD1}">
-              <a14:hiddenFill xmlns:a14="http://schemas.microsoft.com/office/drawing/2010/main" xmlns="">
+              <a14:hiddenFill xmlns="" xmlns:a14="http://schemas.microsoft.com/office/drawing/2010/main">
                 <a:solidFill>
                   <a:srgbClr val="FFFFFF"/>
                 </a:solidFill>
@@ -39244,20 +39253,15 @@
           <a:p>
             <a:r>
               <a:rPr lang="es-AR" sz="1800" dirty="0" smtClean="0"/>
-              <a:t>Es una empresa de soluciones en ingeniería y telecomunicaciones.</a:t>
+              <a:t>Es una empresa de soluciones en ingeniería y telecomunicaciones</a:t>
+            </a:r>
+            <a:r>
+              <a:rPr lang="es-AR" sz="1800" dirty="0" smtClean="0"/>
+              <a:t>.</a:t>
             </a:r>
           </a:p>
           <a:p>
-            <a:endParaRPr lang="es-ES" sz="1800" dirty="0" smtClean="0"/>
-          </a:p>
-          <a:p>
-            <a:r>
-              <a:rPr lang="es-AR" sz="1800" dirty="0" smtClean="0"/>
-              <a:t>Especializado en telecomunicaciones para celulares.</a:t>
-            </a:r>
-          </a:p>
-          <a:p>
-            <a:endParaRPr lang="es-ES" sz="1800" dirty="0" smtClean="0"/>
+            <a:endParaRPr lang="es-AR" sz="1800" dirty="0" smtClean="0"/>
           </a:p>
           <a:p>
             <a:r>
@@ -39274,13 +39278,28 @@
           </a:p>
           <a:p>
             <a:r>
-              <a:rPr lang="es-AR" sz="1800" dirty="0"/>
-              <a:t>E</a:t>
+              <a:rPr lang="es-AR" sz="1800" dirty="0" smtClean="0"/>
+              <a:t>En 1995 ya incursionaron en telefonía</a:t>
             </a:r>
             <a:r>
               <a:rPr lang="es-AR" sz="1800" dirty="0" smtClean="0"/>
-              <a:t>n 1995 ya incursionaron en telefonía.</a:t>
+              <a:t>.</a:t>
             </a:r>
+          </a:p>
+          <a:p>
+            <a:endParaRPr lang="es-ES" sz="1800" dirty="0" smtClean="0"/>
+          </a:p>
+          <a:p>
+            <a:r>
+              <a:rPr lang="es-AR" sz="1800" dirty="0" smtClean="0"/>
+              <a:t>Especializado </a:t>
+            </a:r>
+            <a:r>
+              <a:rPr lang="es-AR" sz="1800" dirty="0" smtClean="0"/>
+              <a:t>en telecomunicaciones para celulares.</a:t>
+            </a:r>
+          </a:p>
+          <a:p>
             <a:endParaRPr lang="en-US" dirty="0"/>
           </a:p>
         </p:txBody>
@@ -39297,7 +39316,7 @@
           <a:blip r:embed="rId3" cstate="print">
             <a:extLst>
               <a:ext uri="{28A0092B-C50C-407E-A947-70E740481C1C}">
-                <a14:useLocalDpi xmlns:a14="http://schemas.microsoft.com/office/drawing/2010/main" xmlns="" val="0"/>
+                <a14:useLocalDpi xmlns="" xmlns:a14="http://schemas.microsoft.com/office/drawing/2010/main" val="0"/>
               </a:ext>
             </a:extLst>
           </a:blip>
@@ -39317,7 +39336,7 @@
           <a:noFill/>
           <a:extLst>
             <a:ext uri="{909E8E84-426E-40DD-AFC4-6F175D3DCCD1}">
-              <a14:hiddenFill xmlns:a14="http://schemas.microsoft.com/office/drawing/2010/main" xmlns="">
+              <a14:hiddenFill xmlns="" xmlns:a14="http://schemas.microsoft.com/office/drawing/2010/main">
                 <a:solidFill>
                   <a:srgbClr val="FFFFFF"/>
                 </a:solidFill>
@@ -39440,7 +39459,7 @@
     </p:spTree>
     <p:extLst>
       <p:ext uri="{BB962C8B-B14F-4D97-AF65-F5344CB8AC3E}">
-        <p14:creationId xmlns:p14="http://schemas.microsoft.com/office/powerpoint/2010/main" xmlns="" val="2421466572"/>
+        <p14:creationId xmlns="" xmlns:p14="http://schemas.microsoft.com/office/powerpoint/2010/main" val="2421466572"/>
       </p:ext>
     </p:extLst>
   </p:cSld>
@@ -39574,7 +39593,7 @@
                             </p:stCondLst>
                             <p:childTnLst>
                               <p:par>
-                                <p:cTn id="11" presetID="42" presetClass="entr" presetSubtype="0" fill="hold" nodeType="clickEffect">
+                                <p:cTn id="11" presetID="2" presetClass="entr" presetSubtype="4" fill="hold" nodeType="clickEffect">
                                   <p:stCondLst>
                                     <p:cond delay="0"/>
                                   </p:stCondLst>
@@ -39601,21 +39620,9 @@
                                         <p:strVal val="visible"/>
                                       </p:to>
                                     </p:set>
-                                    <p:animEffect transition="in" filter="fade">
-                                      <p:cBhvr>
-                                        <p:cTn id="13" dur="1000"/>
-                                        <p:tgtEl>
-                                          <p:spTgt spid="7">
-                                            <p:txEl>
-                                              <p:pRg st="4" end="4"/>
-                                            </p:txEl>
-                                          </p:spTgt>
-                                        </p:tgtEl>
-                                      </p:cBhvr>
-                                    </p:animEffect>
                                     <p:anim calcmode="lin" valueType="num">
-                                      <p:cBhvr>
-                                        <p:cTn id="14" dur="1000" fill="hold"/>
+                                      <p:cBhvr additive="base">
+                                        <p:cTn id="13" dur="500" fill="hold"/>
                                         <p:tgtEl>
                                           <p:spTgt spid="7">
                                             <p:txEl>
@@ -39641,8 +39648,8 @@
                                       </p:tavLst>
                                     </p:anim>
                                     <p:anim calcmode="lin" valueType="num">
-                                      <p:cBhvr>
-                                        <p:cTn id="15" dur="1000" fill="hold"/>
+                                      <p:cBhvr additive="base">
+                                        <p:cTn id="14" dur="500" fill="hold"/>
                                         <p:tgtEl>
                                           <p:spTgt spid="7">
                                             <p:txEl>
@@ -39657,7 +39664,7 @@
                                       <p:tavLst>
                                         <p:tav tm="0">
                                           <p:val>
-                                            <p:strVal val="#ppt_y+.1"/>
+                                            <p:strVal val="1+#ppt_h/2"/>
                                           </p:val>
                                         </p:tav>
                                         <p:tav tm="100000">
@@ -39677,87 +39684,26 @@
                     </p:cTn>
                   </p:par>
                   <p:par>
-                    <p:cTn id="16" fill="hold">
+                    <p:cTn id="15" fill="hold">
                       <p:stCondLst>
                         <p:cond delay="indefinite"/>
                       </p:stCondLst>
                       <p:childTnLst>
                         <p:par>
-                          <p:cTn id="17" fill="hold">
+                          <p:cTn id="16" fill="hold">
                             <p:stCondLst>
                               <p:cond delay="0"/>
                             </p:stCondLst>
                             <p:childTnLst>
                               <p:par>
-                                <p:cTn id="18" presetID="22" presetClass="entr" presetSubtype="4" fill="hold" nodeType="clickEffect">
+                                <p:cTn id="17" presetID="21" presetClass="entr" presetSubtype="1" fill="hold" nodeType="clickEffect">
                                   <p:stCondLst>
                                     <p:cond delay="0"/>
                                   </p:stCondLst>
                                   <p:childTnLst>
                                     <p:set>
                                       <p:cBhvr>
-                                        <p:cTn id="19" dur="1" fill="hold">
-                                          <p:stCondLst>
-                                            <p:cond delay="0"/>
-                                          </p:stCondLst>
-                                        </p:cTn>
-                                        <p:tgtEl>
-                                          <p:spTgt spid="7">
-                                            <p:txEl>
-                                              <p:pRg st="6" end="6"/>
-                                            </p:txEl>
-                                          </p:spTgt>
-                                        </p:tgtEl>
-                                        <p:attrNameLst>
-                                          <p:attrName>style.visibility</p:attrName>
-                                        </p:attrNameLst>
-                                      </p:cBhvr>
-                                      <p:to>
-                                        <p:strVal val="visible"/>
-                                      </p:to>
-                                    </p:set>
-                                    <p:animEffect transition="in" filter="wipe(down)">
-                                      <p:cBhvr>
-                                        <p:cTn id="20" dur="500"/>
-                                        <p:tgtEl>
-                                          <p:spTgt spid="7">
-                                            <p:txEl>
-                                              <p:pRg st="6" end="6"/>
-                                            </p:txEl>
-                                          </p:spTgt>
-                                        </p:tgtEl>
-                                      </p:cBhvr>
-                                    </p:animEffect>
-                                  </p:childTnLst>
-                                </p:cTn>
-                              </p:par>
-                            </p:childTnLst>
-                          </p:cTn>
-                        </p:par>
-                      </p:childTnLst>
-                    </p:cTn>
-                  </p:par>
-                  <p:par>
-                    <p:cTn id="21" fill="hold">
-                      <p:stCondLst>
-                        <p:cond delay="indefinite"/>
-                      </p:stCondLst>
-                      <p:childTnLst>
-                        <p:par>
-                          <p:cTn id="22" fill="hold">
-                            <p:stCondLst>
-                              <p:cond delay="0"/>
-                            </p:stCondLst>
-                            <p:childTnLst>
-                              <p:par>
-                                <p:cTn id="23" presetID="21" presetClass="entr" presetSubtype="1" fill="hold" nodeType="clickEffect">
-                                  <p:stCondLst>
-                                    <p:cond delay="0"/>
-                                  </p:stCondLst>
-                                  <p:childTnLst>
-                                    <p:set>
-                                      <p:cBhvr>
-                                        <p:cTn id="24" dur="1" fill="hold">
+                                        <p:cTn id="18" dur="1" fill="hold">
                                           <p:stCondLst>
                                             <p:cond delay="0"/>
                                           </p:stCondLst>
@@ -39779,7 +39725,7 @@
                                     </p:set>
                                     <p:animEffect transition="in" filter="wheel(1)">
                                       <p:cBhvr>
-                                        <p:cTn id="25" dur="2000"/>
+                                        <p:cTn id="19" dur="2000"/>
                                         <p:tgtEl>
                                           <p:spTgt spid="7">
                                             <p:txEl>
@@ -39852,7 +39798,7 @@
           <a:blip r:embed="rId2" cstate="print">
             <a:extLst>
               <a:ext uri="{28A0092B-C50C-407E-A947-70E740481C1C}">
-                <a14:useLocalDpi xmlns:a14="http://schemas.microsoft.com/office/drawing/2010/main" xmlns="" val="0"/>
+                <a14:useLocalDpi xmlns="" xmlns:a14="http://schemas.microsoft.com/office/drawing/2010/main" val="0"/>
               </a:ext>
             </a:extLst>
           </a:blip>
@@ -39872,7 +39818,7 @@
           <a:noFill/>
           <a:extLst>
             <a:ext uri="{909E8E84-426E-40DD-AFC4-6F175D3DCCD1}">
-              <a14:hiddenFill xmlns:a14="http://schemas.microsoft.com/office/drawing/2010/main" xmlns="">
+              <a14:hiddenFill xmlns="" xmlns:a14="http://schemas.microsoft.com/office/drawing/2010/main">
                 <a:solidFill>
                   <a:srgbClr val="FFFFFF"/>
                 </a:solidFill>
@@ -40161,7 +40107,7 @@
           <a:blip r:embed="rId4" cstate="print">
             <a:extLst>
               <a:ext uri="{28A0092B-C50C-407E-A947-70E740481C1C}">
-                <a14:useLocalDpi xmlns:a14="http://schemas.microsoft.com/office/drawing/2010/main" xmlns="" val="0"/>
+                <a14:useLocalDpi xmlns="" xmlns:a14="http://schemas.microsoft.com/office/drawing/2010/main" val="0"/>
               </a:ext>
             </a:extLst>
           </a:blip>
@@ -40181,7 +40127,7 @@
           <a:noFill/>
           <a:extLst>
             <a:ext uri="{909E8E84-426E-40DD-AFC4-6F175D3DCCD1}">
-              <a14:hiddenFill xmlns:a14="http://schemas.microsoft.com/office/drawing/2010/main" xmlns="">
+              <a14:hiddenFill xmlns="" xmlns:a14="http://schemas.microsoft.com/office/drawing/2010/main">
                 <a:solidFill>
                   <a:srgbClr val="FFFFFF"/>
                 </a:solidFill>
@@ -40342,7 +40288,7 @@
     </p:spTree>
     <p:extLst>
       <p:ext uri="{BB962C8B-B14F-4D97-AF65-F5344CB8AC3E}">
-        <p14:creationId xmlns:p14="http://schemas.microsoft.com/office/powerpoint/2010/main" xmlns="" val="419306505"/>
+        <p14:creationId xmlns="" xmlns:p14="http://schemas.microsoft.com/office/powerpoint/2010/main" val="419306505"/>
       </p:ext>
     </p:extLst>
   </p:cSld>
@@ -40456,13 +40402,13 @@
           <p:nvPr>
             <p:extLst>
               <p:ext uri="{D42A27DB-BD31-4B8C-83A1-F6EECF244321}">
-                <p14:modId xmlns:p14="http://schemas.microsoft.com/office/powerpoint/2010/main" xmlns="" val="899372415"/>
+                <p14:modId xmlns="" xmlns:p14="http://schemas.microsoft.com/office/powerpoint/2010/main" val="899372415"/>
               </p:ext>
             </p:extLst>
           </p:nvPr>
         </p:nvGraphicFramePr>
         <p:xfrm>
-          <a:off x="1357290" y="2071678"/>
+          <a:off x="1428728" y="2071678"/>
           <a:ext cx="6286544" cy="4071966"/>
         </p:xfrm>
         <a:graphic>
@@ -40483,7 +40429,7 @@
           <a:blip r:embed="rId6" cstate="print">
             <a:extLst>
               <a:ext uri="{28A0092B-C50C-407E-A947-70E740481C1C}">
-                <a14:useLocalDpi xmlns:a14="http://schemas.microsoft.com/office/drawing/2010/main" xmlns="" val="0"/>
+                <a14:useLocalDpi xmlns="" xmlns:a14="http://schemas.microsoft.com/office/drawing/2010/main" val="0"/>
               </a:ext>
             </a:extLst>
           </a:blip>
@@ -40503,7 +40449,7 @@
           <a:noFill/>
           <a:extLst>
             <a:ext uri="{909E8E84-426E-40DD-AFC4-6F175D3DCCD1}">
-              <a14:hiddenFill xmlns:a14="http://schemas.microsoft.com/office/drawing/2010/main" xmlns="">
+              <a14:hiddenFill xmlns="" xmlns:a14="http://schemas.microsoft.com/office/drawing/2010/main">
                 <a:solidFill>
                   <a:srgbClr val="FFFFFF"/>
                 </a:solidFill>
@@ -40524,7 +40470,7 @@
           <a:blip r:embed="rId7" cstate="print">
             <a:extLst>
               <a:ext uri="{28A0092B-C50C-407E-A947-70E740481C1C}">
-                <a14:useLocalDpi xmlns:a14="http://schemas.microsoft.com/office/drawing/2010/main" xmlns="" val="0"/>
+                <a14:useLocalDpi xmlns="" xmlns:a14="http://schemas.microsoft.com/office/drawing/2010/main" val="0"/>
               </a:ext>
             </a:extLst>
           </a:blip>
@@ -40544,7 +40490,7 @@
           <a:noFill/>
           <a:extLst>
             <a:ext uri="{909E8E84-426E-40DD-AFC4-6F175D3DCCD1}">
-              <a14:hiddenFill xmlns:a14="http://schemas.microsoft.com/office/drawing/2010/main" xmlns="">
+              <a14:hiddenFill xmlns="" xmlns:a14="http://schemas.microsoft.com/office/drawing/2010/main">
                 <a:solidFill>
                   <a:srgbClr val="FFFFFF"/>
                 </a:solidFill>
@@ -40556,7 +40502,7 @@
     </p:spTree>
     <p:extLst>
       <p:ext uri="{BB962C8B-B14F-4D97-AF65-F5344CB8AC3E}">
-        <p14:creationId xmlns:p14="http://schemas.microsoft.com/office/powerpoint/2010/main" xmlns="" val="1218708985"/>
+        <p14:creationId xmlns="" xmlns:p14="http://schemas.microsoft.com/office/powerpoint/2010/main" val="1218708985"/>
       </p:ext>
     </p:extLst>
   </p:cSld>
@@ -40652,7 +40598,7 @@
           <a:blip r:embed="rId3" cstate="print">
             <a:extLst>
               <a:ext uri="{28A0092B-C50C-407E-A947-70E740481C1C}">
-                <a14:useLocalDpi xmlns:a14="http://schemas.microsoft.com/office/drawing/2010/main" xmlns="" val="0"/>
+                <a14:useLocalDpi xmlns="" xmlns:a14="http://schemas.microsoft.com/office/drawing/2010/main" val="0"/>
               </a:ext>
             </a:extLst>
           </a:blip>
@@ -40672,7 +40618,7 @@
           <a:noFill/>
           <a:extLst>
             <a:ext uri="{909E8E84-426E-40DD-AFC4-6F175D3DCCD1}">
-              <a14:hiddenFill xmlns:a14="http://schemas.microsoft.com/office/drawing/2010/main" xmlns="">
+              <a14:hiddenFill xmlns="" xmlns:a14="http://schemas.microsoft.com/office/drawing/2010/main">
                 <a:solidFill>
                   <a:srgbClr val="FFFFFF"/>
                 </a:solidFill>
@@ -40693,7 +40639,7 @@
           <a:blip r:embed="rId4" cstate="print">
             <a:extLst>
               <a:ext uri="{28A0092B-C50C-407E-A947-70E740481C1C}">
-                <a14:useLocalDpi xmlns:a14="http://schemas.microsoft.com/office/drawing/2010/main" xmlns="" val="0"/>
+                <a14:useLocalDpi xmlns="" xmlns:a14="http://schemas.microsoft.com/office/drawing/2010/main" val="0"/>
               </a:ext>
             </a:extLst>
           </a:blip>
@@ -40713,7 +40659,7 @@
           <a:noFill/>
           <a:extLst>
             <a:ext uri="{909E8E84-426E-40DD-AFC4-6F175D3DCCD1}">
-              <a14:hiddenFill xmlns:a14="http://schemas.microsoft.com/office/drawing/2010/main" xmlns="">
+              <a14:hiddenFill xmlns="" xmlns:a14="http://schemas.microsoft.com/office/drawing/2010/main">
                 <a:solidFill>
                   <a:srgbClr val="FFFFFF"/>
                 </a:solidFill>
@@ -41138,7 +41084,7 @@
     </p:spTree>
     <p:extLst>
       <p:ext uri="{BB962C8B-B14F-4D97-AF65-F5344CB8AC3E}">
-        <p14:creationId xmlns:p14="http://schemas.microsoft.com/office/powerpoint/2010/main" xmlns="" val="1218708985"/>
+        <p14:creationId xmlns="" xmlns:p14="http://schemas.microsoft.com/office/powerpoint/2010/main" val="1218708985"/>
       </p:ext>
     </p:extLst>
   </p:cSld>
@@ -43702,7 +43648,7 @@
           <a:blip r:embed="rId2" cstate="print">
             <a:extLst>
               <a:ext uri="{28A0092B-C50C-407E-A947-70E740481C1C}">
-                <a14:useLocalDpi xmlns:a14="http://schemas.microsoft.com/office/drawing/2010/main" xmlns="" val="0"/>
+                <a14:useLocalDpi xmlns="" xmlns:a14="http://schemas.microsoft.com/office/drawing/2010/main" val="0"/>
               </a:ext>
             </a:extLst>
           </a:blip>
@@ -43722,7 +43668,7 @@
           <a:noFill/>
           <a:extLst>
             <a:ext uri="{909E8E84-426E-40DD-AFC4-6F175D3DCCD1}">
-              <a14:hiddenFill xmlns:a14="http://schemas.microsoft.com/office/drawing/2010/main" xmlns="">
+              <a14:hiddenFill xmlns="" xmlns:a14="http://schemas.microsoft.com/office/drawing/2010/main">
                 <a:solidFill>
                   <a:srgbClr val="FFFFFF"/>
                 </a:solidFill>
@@ -43743,7 +43689,7 @@
           <a:blip r:embed="rId3" cstate="print">
             <a:extLst>
               <a:ext uri="{28A0092B-C50C-407E-A947-70E740481C1C}">
-                <a14:useLocalDpi xmlns:a14="http://schemas.microsoft.com/office/drawing/2010/main" xmlns="" val="0"/>
+                <a14:useLocalDpi xmlns="" xmlns:a14="http://schemas.microsoft.com/office/drawing/2010/main" val="0"/>
               </a:ext>
             </a:extLst>
           </a:blip>
@@ -43763,7 +43709,7 @@
           <a:noFill/>
           <a:extLst>
             <a:ext uri="{909E8E84-426E-40DD-AFC4-6F175D3DCCD1}">
-              <a14:hiddenFill xmlns:a14="http://schemas.microsoft.com/office/drawing/2010/main" xmlns="">
+              <a14:hiddenFill xmlns="" xmlns:a14="http://schemas.microsoft.com/office/drawing/2010/main">
                 <a:solidFill>
                   <a:srgbClr val="FFFFFF"/>
                 </a:solidFill>
@@ -44110,7 +44056,7 @@
           <p:nvPr>
             <p:extLst>
               <p:ext uri="{D42A27DB-BD31-4B8C-83A1-F6EECF244321}">
-                <p14:modId xmlns:p14="http://schemas.microsoft.com/office/powerpoint/2010/main" xmlns="" val="1398164617"/>
+                <p14:modId xmlns="" xmlns:p14="http://schemas.microsoft.com/office/powerpoint/2010/main" val="1398164617"/>
               </p:ext>
             </p:extLst>
           </p:nvPr>
@@ -44128,7 +44074,7 @@
     </p:spTree>
     <p:extLst>
       <p:ext uri="{BB962C8B-B14F-4D97-AF65-F5344CB8AC3E}">
-        <p14:creationId xmlns:p14="http://schemas.microsoft.com/office/powerpoint/2010/main" xmlns="" val="1218708985"/>
+        <p14:creationId xmlns="" xmlns:p14="http://schemas.microsoft.com/office/powerpoint/2010/main" val="1218708985"/>
       </p:ext>
     </p:extLst>
   </p:cSld>

</xml_diff>

<commit_message>
Cambios menores en diapositivas que me toca exponer a mi.
</commit_message>
<xml_diff>
--- a/Documentacion/Informe Preliminar/Presentacion Informe Preliminar.pptx
+++ b/Documentacion/Informe Preliminar/Presentacion Informe Preliminar.pptx
@@ -3346,7 +3346,7 @@
   </dgm:whole>
   <dgm:extLst>
     <a:ext uri="http://schemas.microsoft.com/office/drawing/2008/diagram">
-      <dsp:dataModelExt xmlns="" xmlns:dsp="http://schemas.microsoft.com/office/drawing/2008/diagram" relId="rId6" minVer="http://schemas.openxmlformats.org/drawingml/2006/diagram"/>
+      <dsp:dataModelExt xmlns:dsp="http://schemas.microsoft.com/office/drawing/2008/diagram" xmlns="" relId="rId6" minVer="http://schemas.openxmlformats.org/drawingml/2006/diagram"/>
     </a:ext>
   </dgm:extLst>
 </dgm:dataModel>
@@ -3679,7 +3679,7 @@
       </dgm:t>
     </dgm:pt>
     <dgm:pt modelId="{88D90226-35C4-409B-95DB-A53D0DBCA776}" type="pres">
-      <dgm:prSet presAssocID="{E79D1DFF-E910-4421-825E-128D8A492C5B}" presName="node" presStyleLbl="node1" presStyleIdx="0" presStyleCnt="8">
+      <dgm:prSet presAssocID="{E79D1DFF-E910-4421-825E-128D8A492C5B}" presName="node" presStyleLbl="node1" presStyleIdx="0" presStyleCnt="8" custLinFactNeighborX="2116" custLinFactNeighborY="-5136">
         <dgm:presLayoutVars>
           <dgm:bulletEnabled val="1"/>
         </dgm:presLayoutVars>
@@ -4012,7 +4012,7 @@
   <dgm:whole/>
   <dgm:extLst>
     <a:ext uri="http://schemas.microsoft.com/office/drawing/2008/diagram">
-      <dsp:dataModelExt xmlns="" xmlns:dsp="http://schemas.microsoft.com/office/drawing/2008/diagram" relId="rId8" minVer="http://schemas.openxmlformats.org/drawingml/2006/diagram"/>
+      <dsp:dataModelExt xmlns:dsp="http://schemas.microsoft.com/office/drawing/2008/diagram" xmlns="" relId="rId8" minVer="http://schemas.openxmlformats.org/drawingml/2006/diagram"/>
     </a:ext>
   </dgm:extLst>
 </dgm:dataModel>
@@ -4656,11 +4656,16 @@
   </dgm:cxnLst>
   <dgm:bg/>
   <dgm:whole/>
+  <dgm:extLst>
+    <a:ext uri="http://schemas.microsoft.com/office/drawing/2008/diagram">
+      <dsp:dataModelExt xmlns:dsp="http://schemas.microsoft.com/office/drawing/2008/diagram" xmlns="" relId="rId9" minVer="http://schemas.openxmlformats.org/drawingml/2006/diagram"/>
+    </a:ext>
+  </dgm:extLst>
 </dgm:dataModel>
 </file>
 
 <file path=ppt/diagrams/drawing1.xml><?xml version="1.0" encoding="utf-8"?>
-<dsp:drawing xmlns:dgm="http://schemas.openxmlformats.org/drawingml/2006/diagram" xmlns:dsp="http://schemas.microsoft.com/office/drawing/2008/diagram" xmlns:a="http://schemas.openxmlformats.org/drawingml/2006/main">
+<dsp:drawing xmlns:dgm="http://schemas.openxmlformats.org/drawingml/2006/diagram" xmlns:a="http://schemas.openxmlformats.org/drawingml/2006/main" xmlns:dsp="http://schemas.microsoft.com/office/drawing/2008/diagram">
   <dsp:spTree>
     <dsp:nvGrpSpPr>
       <dsp:cNvPr id="0" name=""/>
@@ -4703,15 +4708,9 @@
         <a:noFill/>
         <a:ln w="9525" cap="flat" cmpd="sng" algn="ctr">
           <a:solidFill>
-            <a:schemeClr val="accent1">
-              <a:shade val="60000"/>
-              <a:hueOff val="0"/>
-              <a:satOff val="0"/>
-              <a:lumOff val="0"/>
-              <a:alphaOff val="0"/>
-            </a:schemeClr>
+            <a:scrgbClr r="0" g="0" b="0"/>
           </a:solidFill>
-          <a:prstDash val="solid"/>
+          <a:prstDash val="dash"/>
         </a:ln>
         <a:effectLst/>
       </dsp:spPr>
@@ -5555,7 +5554,7 @@
 </file>
 
 <file path=ppt/diagrams/drawing2.xml><?xml version="1.0" encoding="utf-8"?>
-<dsp:drawing xmlns:dgm="http://schemas.openxmlformats.org/drawingml/2006/diagram" xmlns:dsp="http://schemas.microsoft.com/office/drawing/2008/diagram" xmlns:a="http://schemas.openxmlformats.org/drawingml/2006/main">
+<dsp:drawing xmlns:dgm="http://schemas.openxmlformats.org/drawingml/2006/diagram" xmlns:a="http://schemas.openxmlformats.org/drawingml/2006/main" xmlns:dsp="http://schemas.microsoft.com/office/drawing/2008/diagram">
   <dsp:spTree>
     <dsp:nvGrpSpPr>
       <dsp:cNvPr id="0" name=""/>
@@ -5569,7 +5568,7 @@
       </dsp:nvSpPr>
       <dsp:spPr>
         <a:xfrm>
-          <a:off x="3512" y="263345"/>
+          <a:off x="36008" y="216020"/>
           <a:ext cx="1535742" cy="921445"/>
         </a:xfrm>
         <a:prstGeom prst="roundRect">
@@ -5666,8 +5665,8 @@
         </a:p>
       </dsp:txBody>
       <dsp:txXfrm>
-        <a:off x="30500" y="290333"/>
-        <a:ext cx="1481766" cy="867469"/>
+        <a:off x="36008" y="216020"/>
+        <a:ext cx="1535742" cy="921445"/>
       </dsp:txXfrm>
     </dsp:sp>
     <dsp:sp modelId="{E55E39E1-8F7F-45DE-9CA6-BD910E1D29B1}">
@@ -5676,9 +5675,9 @@
         <dsp:cNvSpPr/>
       </dsp:nvSpPr>
       <dsp:spPr>
-        <a:xfrm>
-          <a:off x="1674400" y="533636"/>
-          <a:ext cx="325577" cy="380864"/>
+        <a:xfrm rot="76818">
+          <a:off x="1699709" y="509778"/>
+          <a:ext cx="308431" cy="380864"/>
         </a:xfrm>
         <a:prstGeom prst="rightArrow">
           <a:avLst>
@@ -5766,9 +5765,9 @@
           <a:endParaRPr lang="es-AR" sz="1200" kern="1200"/>
         </a:p>
       </dsp:txBody>
-      <dsp:txXfrm>
-        <a:off x="1674400" y="609809"/>
-        <a:ext cx="227904" cy="228518"/>
+      <dsp:txXfrm rot="76818">
+        <a:off x="1699709" y="509778"/>
+        <a:ext cx="308431" cy="380864"/>
       </dsp:txXfrm>
     </dsp:sp>
     <dsp:sp modelId="{285D4231-58A7-4A8D-B065-3B5550752B5D}">
@@ -5875,8 +5874,8 @@
         </a:p>
       </dsp:txBody>
       <dsp:txXfrm>
-        <a:off x="2180540" y="290333"/>
-        <a:ext cx="1481766" cy="867469"/>
+        <a:off x="2153552" y="263345"/>
+        <a:ext cx="1535742" cy="921445"/>
       </dsp:txXfrm>
     </dsp:sp>
     <dsp:sp modelId="{58B57261-0747-48FE-A1A6-719C2514B016}">
@@ -5976,8 +5975,8 @@
         </a:p>
       </dsp:txBody>
       <dsp:txXfrm>
-        <a:off x="3824440" y="609809"/>
-        <a:ext cx="227904" cy="228518"/>
+        <a:off x="3824440" y="533636"/>
+        <a:ext cx="325577" cy="380864"/>
       </dsp:txXfrm>
     </dsp:sp>
     <dsp:sp modelId="{96EA98A3-ED5C-4801-BB75-774A6066E9D1}">
@@ -6084,8 +6083,8 @@
         </a:p>
       </dsp:txBody>
       <dsp:txXfrm>
-        <a:off x="4330580" y="290333"/>
-        <a:ext cx="1481766" cy="867469"/>
+        <a:off x="4303592" y="263345"/>
+        <a:ext cx="1535742" cy="921445"/>
       </dsp:txXfrm>
     </dsp:sp>
     <dsp:sp modelId="{0111F070-09B0-44AB-B420-56677F7966B9}">
@@ -6185,8 +6184,8 @@
         </a:p>
       </dsp:txBody>
       <dsp:txXfrm>
-        <a:off x="5974480" y="609809"/>
-        <a:ext cx="227904" cy="228518"/>
+        <a:off x="5974480" y="533636"/>
+        <a:ext cx="325577" cy="380864"/>
       </dsp:txXfrm>
     </dsp:sp>
     <dsp:sp modelId="{69574F30-2D61-4E9B-9957-68812FAD3007}">
@@ -6293,8 +6292,8 @@
         </a:p>
       </dsp:txBody>
       <dsp:txXfrm>
-        <a:off x="6480620" y="290333"/>
-        <a:ext cx="1481766" cy="867469"/>
+        <a:off x="6453632" y="263345"/>
+        <a:ext cx="1535742" cy="921445"/>
       </dsp:txXfrm>
     </dsp:sp>
     <dsp:sp modelId="{DC791235-75B4-4861-821D-75CBE75BCAF7}">
@@ -6393,9 +6392,9 @@
           <a:endParaRPr lang="es-AR" sz="1200" kern="1200"/>
         </a:p>
       </dsp:txBody>
-      <dsp:txXfrm rot="-5400000">
-        <a:off x="7107245" y="1319937"/>
-        <a:ext cx="228518" cy="227904"/>
+      <dsp:txXfrm rot="5400000">
+        <a:off x="7058715" y="1292293"/>
+        <a:ext cx="325577" cy="380864"/>
       </dsp:txXfrm>
     </dsp:sp>
     <dsp:sp modelId="{1D053020-6255-4EC1-B48E-D263909F37E0}">
@@ -6502,8 +6501,8 @@
         </a:p>
       </dsp:txBody>
       <dsp:txXfrm>
-        <a:off x="6480620" y="1826076"/>
-        <a:ext cx="1481766" cy="867469"/>
+        <a:off x="6453632" y="1799088"/>
+        <a:ext cx="1535742" cy="921445"/>
       </dsp:txXfrm>
     </dsp:sp>
     <dsp:sp modelId="{2641E811-5A6F-428C-B1C8-8F281D6685B6}">
@@ -6603,8 +6602,8 @@
         </a:p>
       </dsp:txBody>
       <dsp:txXfrm rot="10800000">
-        <a:off x="6090582" y="2145552"/>
-        <a:ext cx="227904" cy="228518"/>
+        <a:off x="5992909" y="2069379"/>
+        <a:ext cx="325577" cy="380864"/>
       </dsp:txXfrm>
     </dsp:sp>
     <dsp:sp modelId="{E18B533A-C6D3-4CCA-A75B-075F2FE99905}">
@@ -6711,8 +6710,8 @@
         </a:p>
       </dsp:txBody>
       <dsp:txXfrm>
-        <a:off x="4330580" y="1826076"/>
-        <a:ext cx="1481766" cy="867469"/>
+        <a:off x="4303592" y="1799088"/>
+        <a:ext cx="1535742" cy="921445"/>
       </dsp:txXfrm>
     </dsp:sp>
     <dsp:sp modelId="{C4945E92-62A5-4028-985B-044CB1801FC6}">
@@ -6812,8 +6811,8 @@
         </a:p>
       </dsp:txBody>
       <dsp:txXfrm rot="10800000">
-        <a:off x="3940542" y="2145552"/>
-        <a:ext cx="227904" cy="228518"/>
+        <a:off x="3842869" y="2069379"/>
+        <a:ext cx="325577" cy="380864"/>
       </dsp:txXfrm>
     </dsp:sp>
     <dsp:sp modelId="{269AD2C7-2C78-48F1-9B02-4BA8B897BB5C}">
@@ -6920,8 +6919,8 @@
         </a:p>
       </dsp:txBody>
       <dsp:txXfrm>
-        <a:off x="2180540" y="1826076"/>
-        <a:ext cx="1481766" cy="867469"/>
+        <a:off x="2153552" y="1799088"/>
+        <a:ext cx="1535742" cy="921445"/>
       </dsp:txXfrm>
     </dsp:sp>
     <dsp:sp modelId="{EEB151B0-951F-4102-A9AB-025AADD2ACCB}">
@@ -7021,8 +7020,8 @@
         </a:p>
       </dsp:txBody>
       <dsp:txXfrm rot="10800000">
-        <a:off x="1790502" y="2145552"/>
-        <a:ext cx="227904" cy="228518"/>
+        <a:off x="1692829" y="2069379"/>
+        <a:ext cx="325577" cy="380864"/>
       </dsp:txXfrm>
     </dsp:sp>
     <dsp:sp modelId="{950A0EE2-E9AF-413D-B3AB-B2BE9BF30743}">
@@ -7129,8 +7128,774 @@
         </a:p>
       </dsp:txBody>
       <dsp:txXfrm>
-        <a:off x="30500" y="1826076"/>
-        <a:ext cx="1481766" cy="867469"/>
+        <a:off x="3512" y="1799088"/>
+        <a:ext cx="1535742" cy="921445"/>
+      </dsp:txXfrm>
+    </dsp:sp>
+  </dsp:spTree>
+</dsp:drawing>
+</file>
+
+<file path=ppt/diagrams/drawing3.xml><?xml version="1.0" encoding="utf-8"?>
+<dsp:drawing xmlns:dgm="http://schemas.openxmlformats.org/drawingml/2006/diagram" xmlns:a="http://schemas.openxmlformats.org/drawingml/2006/main" xmlns:dsp="http://schemas.microsoft.com/office/drawing/2008/diagram">
+  <dsp:spTree>
+    <dsp:nvGrpSpPr>
+      <dsp:cNvPr id="0" name=""/>
+      <dsp:cNvGrpSpPr/>
+    </dsp:nvGrpSpPr>
+    <dsp:grpSpPr/>
+    <dsp:sp modelId="{08E185FC-CEAB-4B95-8C69-65CB50B7EE28}">
+      <dsp:nvSpPr>
+        <dsp:cNvPr id="0" name=""/>
+        <dsp:cNvSpPr/>
+      </dsp:nvSpPr>
+      <dsp:spPr>
+        <a:xfrm rot="5400000">
+          <a:off x="4959781" y="-2037862"/>
+          <a:ext cx="754903" cy="5023278"/>
+        </a:xfrm>
+        <a:prstGeom prst="round2SameRect">
+          <a:avLst/>
+        </a:prstGeom>
+        <a:solidFill>
+          <a:schemeClr val="accent1">
+            <a:alpha val="90000"/>
+            <a:tint val="40000"/>
+            <a:hueOff val="0"/>
+            <a:satOff val="0"/>
+            <a:lumOff val="0"/>
+            <a:alphaOff val="0"/>
+          </a:schemeClr>
+        </a:solidFill>
+        <a:ln w="15875" cap="flat" cmpd="sng" algn="ctr">
+          <a:solidFill>
+            <a:schemeClr val="accent1">
+              <a:alpha val="90000"/>
+              <a:tint val="40000"/>
+              <a:hueOff val="0"/>
+              <a:satOff val="0"/>
+              <a:lumOff val="0"/>
+              <a:alphaOff val="0"/>
+            </a:schemeClr>
+          </a:solidFill>
+          <a:prstDash val="solid"/>
+        </a:ln>
+        <a:effectLst/>
+      </dsp:spPr>
+      <dsp:style>
+        <a:lnRef idx="2">
+          <a:scrgbClr r="0" g="0" b="0"/>
+        </a:lnRef>
+        <a:fillRef idx="1">
+          <a:scrgbClr r="0" g="0" b="0"/>
+        </a:fillRef>
+        <a:effectRef idx="0">
+          <a:scrgbClr r="0" g="0" b="0"/>
+        </a:effectRef>
+        <a:fontRef idx="minor"/>
+      </dsp:style>
+      <dsp:txBody>
+        <a:bodyPr spcFirstLastPara="0" vert="horz" wrap="square" lIns="72390" tIns="36195" rIns="72390" bIns="36195" numCol="1" spcCol="1270" anchor="ctr" anchorCtr="0">
+          <a:noAutofit/>
+        </a:bodyPr>
+        <a:lstStyle/>
+        <a:p>
+          <a:pPr marL="171450" lvl="1" indent="-171450" algn="l" defTabSz="844550">
+            <a:lnSpc>
+              <a:spcPct val="90000"/>
+            </a:lnSpc>
+            <a:spcBef>
+              <a:spcPct val="0"/>
+            </a:spcBef>
+            <a:spcAft>
+              <a:spcPct val="15000"/>
+            </a:spcAft>
+            <a:buChar char="••"/>
+          </a:pPr>
+          <a:r>
+            <a:rPr lang="es-ES" sz="1900" kern="1200" dirty="0" smtClean="0"/>
+            <a:t>Informe preliminar lista de requerimientos</a:t>
+          </a:r>
+          <a:endParaRPr lang="en-US" sz="1900" kern="1200" dirty="0"/>
+        </a:p>
+        <a:p>
+          <a:pPr marL="171450" lvl="1" indent="-171450" algn="l" defTabSz="844550">
+            <a:lnSpc>
+              <a:spcPct val="90000"/>
+            </a:lnSpc>
+            <a:spcBef>
+              <a:spcPct val="0"/>
+            </a:spcBef>
+            <a:spcAft>
+              <a:spcPct val="15000"/>
+            </a:spcAft>
+            <a:buChar char="••"/>
+          </a:pPr>
+          <a:r>
+            <a:rPr lang="es-ES" sz="1900" kern="1200" dirty="0" smtClean="0"/>
+            <a:t>Diagrama de proceso de negocio</a:t>
+          </a:r>
+          <a:endParaRPr lang="en-US" sz="1900" kern="1200" dirty="0"/>
+        </a:p>
+      </dsp:txBody>
+      <dsp:txXfrm rot="5400000">
+        <a:off x="4959781" y="-2037862"/>
+        <a:ext cx="754903" cy="5023278"/>
+      </dsp:txXfrm>
+    </dsp:sp>
+    <dsp:sp modelId="{D34768DB-64FD-4294-BFEE-0BC3987FFB41}">
+      <dsp:nvSpPr>
+        <dsp:cNvPr id="0" name=""/>
+        <dsp:cNvSpPr/>
+      </dsp:nvSpPr>
+      <dsp:spPr>
+        <a:xfrm>
+          <a:off x="0" y="1961"/>
+          <a:ext cx="2825593" cy="943628"/>
+        </a:xfrm>
+        <a:prstGeom prst="roundRect">
+          <a:avLst/>
+        </a:prstGeom>
+        <a:solidFill>
+          <a:schemeClr val="accent1">
+            <a:hueOff val="0"/>
+            <a:satOff val="0"/>
+            <a:lumOff val="0"/>
+            <a:alphaOff val="0"/>
+          </a:schemeClr>
+        </a:solidFill>
+        <a:ln w="15875" cap="flat" cmpd="sng" algn="ctr">
+          <a:solidFill>
+            <a:schemeClr val="lt1">
+              <a:hueOff val="0"/>
+              <a:satOff val="0"/>
+              <a:lumOff val="0"/>
+              <a:alphaOff val="0"/>
+            </a:schemeClr>
+          </a:solidFill>
+          <a:prstDash val="solid"/>
+        </a:ln>
+        <a:effectLst/>
+      </dsp:spPr>
+      <dsp:style>
+        <a:lnRef idx="2">
+          <a:scrgbClr r="0" g="0" b="0"/>
+        </a:lnRef>
+        <a:fillRef idx="1">
+          <a:scrgbClr r="0" g="0" b="0"/>
+        </a:fillRef>
+        <a:effectRef idx="0">
+          <a:scrgbClr r="0" g="0" b="0"/>
+        </a:effectRef>
+        <a:fontRef idx="minor">
+          <a:schemeClr val="lt1"/>
+        </a:fontRef>
+      </dsp:style>
+      <dsp:txBody>
+        <a:bodyPr spcFirstLastPara="0" vert="horz" wrap="square" lIns="91440" tIns="45720" rIns="91440" bIns="45720" numCol="1" spcCol="1270" anchor="ctr" anchorCtr="0">
+          <a:noAutofit/>
+        </a:bodyPr>
+        <a:lstStyle/>
+        <a:p>
+          <a:pPr lvl="0" algn="ctr" defTabSz="1066800">
+            <a:lnSpc>
+              <a:spcPct val="90000"/>
+            </a:lnSpc>
+            <a:spcBef>
+              <a:spcPct val="0"/>
+            </a:spcBef>
+            <a:spcAft>
+              <a:spcPct val="35000"/>
+            </a:spcAft>
+          </a:pPr>
+          <a:r>
+            <a:rPr lang="es-AR" sz="2400" kern="1200" dirty="0" smtClean="0"/>
+            <a:t>Iteración 1</a:t>
+          </a:r>
+        </a:p>
+        <a:p>
+          <a:pPr lvl="0" algn="ctr" defTabSz="1066800">
+            <a:lnSpc>
+              <a:spcPct val="90000"/>
+            </a:lnSpc>
+            <a:spcBef>
+              <a:spcPct val="0"/>
+            </a:spcBef>
+            <a:spcAft>
+              <a:spcPct val="35000"/>
+            </a:spcAft>
+          </a:pPr>
+          <a:r>
+            <a:rPr lang="es-AR" sz="2400" kern="1200" dirty="0" smtClean="0"/>
+            <a:t>17/5/2012</a:t>
+          </a:r>
+          <a:endParaRPr lang="en-US" sz="2400" kern="1200" dirty="0"/>
+        </a:p>
+      </dsp:txBody>
+      <dsp:txXfrm>
+        <a:off x="0" y="1961"/>
+        <a:ext cx="2825593" cy="943628"/>
+      </dsp:txXfrm>
+    </dsp:sp>
+    <dsp:sp modelId="{F32870B6-D861-425B-A22A-69583A7DE8E8}">
+      <dsp:nvSpPr>
+        <dsp:cNvPr id="0" name=""/>
+        <dsp:cNvSpPr/>
+      </dsp:nvSpPr>
+      <dsp:spPr>
+        <a:xfrm rot="5400000">
+          <a:off x="4959781" y="-1047052"/>
+          <a:ext cx="754903" cy="5023278"/>
+        </a:xfrm>
+        <a:prstGeom prst="round2SameRect">
+          <a:avLst/>
+        </a:prstGeom>
+        <a:solidFill>
+          <a:schemeClr val="accent1">
+            <a:alpha val="90000"/>
+            <a:tint val="40000"/>
+            <a:hueOff val="0"/>
+            <a:satOff val="0"/>
+            <a:lumOff val="0"/>
+            <a:alphaOff val="0"/>
+          </a:schemeClr>
+        </a:solidFill>
+        <a:ln w="15875" cap="flat" cmpd="sng" algn="ctr">
+          <a:solidFill>
+            <a:schemeClr val="accent1">
+              <a:alpha val="90000"/>
+              <a:tint val="40000"/>
+              <a:hueOff val="0"/>
+              <a:satOff val="0"/>
+              <a:lumOff val="0"/>
+              <a:alphaOff val="0"/>
+            </a:schemeClr>
+          </a:solidFill>
+          <a:prstDash val="solid"/>
+        </a:ln>
+        <a:effectLst/>
+      </dsp:spPr>
+      <dsp:style>
+        <a:lnRef idx="2">
+          <a:scrgbClr r="0" g="0" b="0"/>
+        </a:lnRef>
+        <a:fillRef idx="1">
+          <a:scrgbClr r="0" g="0" b="0"/>
+        </a:fillRef>
+        <a:effectRef idx="0">
+          <a:scrgbClr r="0" g="0" b="0"/>
+        </a:effectRef>
+        <a:fontRef idx="minor"/>
+      </dsp:style>
+      <dsp:txBody>
+        <a:bodyPr spcFirstLastPara="0" vert="horz" wrap="square" lIns="72390" tIns="36195" rIns="72390" bIns="36195" numCol="1" spcCol="1270" anchor="ctr" anchorCtr="0">
+          <a:noAutofit/>
+        </a:bodyPr>
+        <a:lstStyle/>
+        <a:p>
+          <a:pPr marL="171450" lvl="1" indent="-171450" algn="l" defTabSz="844550">
+            <a:lnSpc>
+              <a:spcPct val="90000"/>
+            </a:lnSpc>
+            <a:spcBef>
+              <a:spcPct val="0"/>
+            </a:spcBef>
+            <a:spcAft>
+              <a:spcPct val="15000"/>
+            </a:spcAft>
+            <a:buChar char="••"/>
+          </a:pPr>
+          <a:r>
+            <a:rPr lang="es-AR" sz="1900" kern="1200" dirty="0" err="1" smtClean="0"/>
+            <a:t>Implementacion</a:t>
+          </a:r>
+          <a:r>
+            <a:rPr lang="es-AR" sz="1900" kern="1200" dirty="0" smtClean="0"/>
+            <a:t> de los CU importantes para la arquitectura.</a:t>
+          </a:r>
+          <a:endParaRPr lang="en-US" sz="1900" kern="1200" dirty="0"/>
+        </a:p>
+      </dsp:txBody>
+      <dsp:txXfrm rot="5400000">
+        <a:off x="4959781" y="-1047052"/>
+        <a:ext cx="754903" cy="5023278"/>
+      </dsp:txXfrm>
+    </dsp:sp>
+    <dsp:sp modelId="{22944780-7EA4-41AB-96B8-5A60D8CD2618}">
+      <dsp:nvSpPr>
+        <dsp:cNvPr id="0" name=""/>
+        <dsp:cNvSpPr/>
+      </dsp:nvSpPr>
+      <dsp:spPr>
+        <a:xfrm>
+          <a:off x="0" y="992772"/>
+          <a:ext cx="2825593" cy="943628"/>
+        </a:xfrm>
+        <a:prstGeom prst="roundRect">
+          <a:avLst/>
+        </a:prstGeom>
+        <a:solidFill>
+          <a:schemeClr val="accent1">
+            <a:hueOff val="0"/>
+            <a:satOff val="0"/>
+            <a:lumOff val="0"/>
+            <a:alphaOff val="0"/>
+          </a:schemeClr>
+        </a:solidFill>
+        <a:ln w="15875" cap="flat" cmpd="sng" algn="ctr">
+          <a:solidFill>
+            <a:schemeClr val="lt1">
+              <a:hueOff val="0"/>
+              <a:satOff val="0"/>
+              <a:lumOff val="0"/>
+              <a:alphaOff val="0"/>
+            </a:schemeClr>
+          </a:solidFill>
+          <a:prstDash val="solid"/>
+        </a:ln>
+        <a:effectLst/>
+      </dsp:spPr>
+      <dsp:style>
+        <a:lnRef idx="2">
+          <a:scrgbClr r="0" g="0" b="0"/>
+        </a:lnRef>
+        <a:fillRef idx="1">
+          <a:scrgbClr r="0" g="0" b="0"/>
+        </a:fillRef>
+        <a:effectRef idx="0">
+          <a:scrgbClr r="0" g="0" b="0"/>
+        </a:effectRef>
+        <a:fontRef idx="minor">
+          <a:schemeClr val="lt1"/>
+        </a:fontRef>
+      </dsp:style>
+      <dsp:txBody>
+        <a:bodyPr spcFirstLastPara="0" vert="horz" wrap="square" lIns="91440" tIns="45720" rIns="91440" bIns="45720" numCol="1" spcCol="1270" anchor="ctr" anchorCtr="0">
+          <a:noAutofit/>
+        </a:bodyPr>
+        <a:lstStyle/>
+        <a:p>
+          <a:pPr lvl="0" algn="ctr" defTabSz="1066800">
+            <a:lnSpc>
+              <a:spcPct val="90000"/>
+            </a:lnSpc>
+            <a:spcBef>
+              <a:spcPct val="0"/>
+            </a:spcBef>
+            <a:spcAft>
+              <a:spcPct val="35000"/>
+            </a:spcAft>
+          </a:pPr>
+          <a:r>
+            <a:rPr lang="es-AR" sz="2400" kern="1200" dirty="0" smtClean="0"/>
+            <a:t>Iteración 2</a:t>
+          </a:r>
+        </a:p>
+        <a:p>
+          <a:pPr lvl="0" algn="ctr" defTabSz="1066800">
+            <a:lnSpc>
+              <a:spcPct val="90000"/>
+            </a:lnSpc>
+            <a:spcBef>
+              <a:spcPct val="0"/>
+            </a:spcBef>
+            <a:spcAft>
+              <a:spcPct val="35000"/>
+            </a:spcAft>
+          </a:pPr>
+          <a:r>
+            <a:rPr lang="es-AR" sz="2400" kern="1200" dirty="0" smtClean="0"/>
+            <a:t>28/6/2012</a:t>
+          </a:r>
+          <a:endParaRPr lang="en-US" sz="2400" kern="1200" dirty="0"/>
+        </a:p>
+      </dsp:txBody>
+      <dsp:txXfrm>
+        <a:off x="0" y="992772"/>
+        <a:ext cx="2825593" cy="943628"/>
+      </dsp:txXfrm>
+    </dsp:sp>
+    <dsp:sp modelId="{5BA1A675-5232-4C7A-A9C3-FFF93194D31F}">
+      <dsp:nvSpPr>
+        <dsp:cNvPr id="0" name=""/>
+        <dsp:cNvSpPr/>
+      </dsp:nvSpPr>
+      <dsp:spPr>
+        <a:xfrm rot="5400000">
+          <a:off x="4959781" y="-56241"/>
+          <a:ext cx="754903" cy="5023278"/>
+        </a:xfrm>
+        <a:prstGeom prst="round2SameRect">
+          <a:avLst/>
+        </a:prstGeom>
+        <a:solidFill>
+          <a:schemeClr val="accent1">
+            <a:alpha val="90000"/>
+            <a:tint val="40000"/>
+            <a:hueOff val="0"/>
+            <a:satOff val="0"/>
+            <a:lumOff val="0"/>
+            <a:alphaOff val="0"/>
+          </a:schemeClr>
+        </a:solidFill>
+        <a:ln w="15875" cap="flat" cmpd="sng" algn="ctr">
+          <a:solidFill>
+            <a:schemeClr val="accent1">
+              <a:alpha val="90000"/>
+              <a:tint val="40000"/>
+              <a:hueOff val="0"/>
+              <a:satOff val="0"/>
+              <a:lumOff val="0"/>
+              <a:alphaOff val="0"/>
+            </a:schemeClr>
+          </a:solidFill>
+          <a:prstDash val="solid"/>
+        </a:ln>
+        <a:effectLst/>
+      </dsp:spPr>
+      <dsp:style>
+        <a:lnRef idx="2">
+          <a:scrgbClr r="0" g="0" b="0"/>
+        </a:lnRef>
+        <a:fillRef idx="1">
+          <a:scrgbClr r="0" g="0" b="0"/>
+        </a:fillRef>
+        <a:effectRef idx="0">
+          <a:scrgbClr r="0" g="0" b="0"/>
+        </a:effectRef>
+        <a:fontRef idx="minor"/>
+      </dsp:style>
+      <dsp:txBody>
+        <a:bodyPr spcFirstLastPara="0" vert="horz" wrap="square" lIns="72390" tIns="36195" rIns="72390" bIns="36195" numCol="1" spcCol="1270" anchor="ctr" anchorCtr="0">
+          <a:noAutofit/>
+        </a:bodyPr>
+        <a:lstStyle/>
+        <a:p>
+          <a:pPr marL="171450" lvl="1" indent="-171450" algn="l" defTabSz="844550">
+            <a:lnSpc>
+              <a:spcPct val="90000"/>
+            </a:lnSpc>
+            <a:spcBef>
+              <a:spcPct val="0"/>
+            </a:spcBef>
+            <a:spcAft>
+              <a:spcPct val="15000"/>
+            </a:spcAft>
+            <a:buChar char="••"/>
+          </a:pPr>
+          <a:r>
+            <a:rPr lang="es-AR" sz="1900" kern="1200" dirty="0" smtClean="0"/>
+            <a:t>Requerimientos prioritarios para el cliente y correcciones.</a:t>
+          </a:r>
+          <a:endParaRPr lang="en-US" sz="1900" kern="1200" dirty="0"/>
+        </a:p>
+      </dsp:txBody>
+      <dsp:txXfrm rot="5400000">
+        <a:off x="4959781" y="-56241"/>
+        <a:ext cx="754903" cy="5023278"/>
+      </dsp:txXfrm>
+    </dsp:sp>
+    <dsp:sp modelId="{B7CE4811-3286-4DF5-8DD8-3FB6DEAC28E9}">
+      <dsp:nvSpPr>
+        <dsp:cNvPr id="0" name=""/>
+        <dsp:cNvSpPr/>
+      </dsp:nvSpPr>
+      <dsp:spPr>
+        <a:xfrm>
+          <a:off x="0" y="1983582"/>
+          <a:ext cx="2825593" cy="943628"/>
+        </a:xfrm>
+        <a:prstGeom prst="roundRect">
+          <a:avLst/>
+        </a:prstGeom>
+        <a:solidFill>
+          <a:schemeClr val="accent1">
+            <a:hueOff val="0"/>
+            <a:satOff val="0"/>
+            <a:lumOff val="0"/>
+            <a:alphaOff val="0"/>
+          </a:schemeClr>
+        </a:solidFill>
+        <a:ln w="15875" cap="flat" cmpd="sng" algn="ctr">
+          <a:solidFill>
+            <a:schemeClr val="lt1">
+              <a:hueOff val="0"/>
+              <a:satOff val="0"/>
+              <a:lumOff val="0"/>
+              <a:alphaOff val="0"/>
+            </a:schemeClr>
+          </a:solidFill>
+          <a:prstDash val="solid"/>
+        </a:ln>
+        <a:effectLst/>
+      </dsp:spPr>
+      <dsp:style>
+        <a:lnRef idx="2">
+          <a:scrgbClr r="0" g="0" b="0"/>
+        </a:lnRef>
+        <a:fillRef idx="1">
+          <a:scrgbClr r="0" g="0" b="0"/>
+        </a:fillRef>
+        <a:effectRef idx="0">
+          <a:scrgbClr r="0" g="0" b="0"/>
+        </a:effectRef>
+        <a:fontRef idx="minor">
+          <a:schemeClr val="lt1"/>
+        </a:fontRef>
+      </dsp:style>
+      <dsp:txBody>
+        <a:bodyPr spcFirstLastPara="0" vert="horz" wrap="square" lIns="91440" tIns="45720" rIns="91440" bIns="45720" numCol="1" spcCol="1270" anchor="ctr" anchorCtr="0">
+          <a:noAutofit/>
+        </a:bodyPr>
+        <a:lstStyle/>
+        <a:p>
+          <a:pPr lvl="0" algn="ctr" defTabSz="1066800">
+            <a:lnSpc>
+              <a:spcPct val="90000"/>
+            </a:lnSpc>
+            <a:spcBef>
+              <a:spcPct val="0"/>
+            </a:spcBef>
+            <a:spcAft>
+              <a:spcPct val="35000"/>
+            </a:spcAft>
+          </a:pPr>
+          <a:r>
+            <a:rPr lang="es-AR" sz="2400" kern="1200" dirty="0" smtClean="0"/>
+            <a:t>Iteración 3</a:t>
+          </a:r>
+        </a:p>
+        <a:p>
+          <a:pPr lvl="0" algn="ctr" defTabSz="1066800">
+            <a:lnSpc>
+              <a:spcPct val="90000"/>
+            </a:lnSpc>
+            <a:spcBef>
+              <a:spcPct val="0"/>
+            </a:spcBef>
+            <a:spcAft>
+              <a:spcPct val="35000"/>
+            </a:spcAft>
+          </a:pPr>
+          <a:r>
+            <a:rPr lang="es-AR" sz="2400" kern="1200" dirty="0" smtClean="0"/>
+            <a:t>11/10/2012</a:t>
+          </a:r>
+          <a:endParaRPr lang="en-US" sz="2400" kern="1200" dirty="0"/>
+        </a:p>
+      </dsp:txBody>
+      <dsp:txXfrm>
+        <a:off x="0" y="1983582"/>
+        <a:ext cx="2825593" cy="943628"/>
+      </dsp:txXfrm>
+    </dsp:sp>
+    <dsp:sp modelId="{1DF7ADA8-0EAC-48DE-AFD6-FDBB67CD9962}">
+      <dsp:nvSpPr>
+        <dsp:cNvPr id="0" name=""/>
+        <dsp:cNvSpPr/>
+      </dsp:nvSpPr>
+      <dsp:spPr>
+        <a:xfrm rot="5400000">
+          <a:off x="4959781" y="934568"/>
+          <a:ext cx="754903" cy="5023278"/>
+        </a:xfrm>
+        <a:prstGeom prst="round2SameRect">
+          <a:avLst/>
+        </a:prstGeom>
+        <a:solidFill>
+          <a:schemeClr val="accent1">
+            <a:alpha val="90000"/>
+            <a:tint val="40000"/>
+            <a:hueOff val="0"/>
+            <a:satOff val="0"/>
+            <a:lumOff val="0"/>
+            <a:alphaOff val="0"/>
+          </a:schemeClr>
+        </a:solidFill>
+        <a:ln w="15875" cap="flat" cmpd="sng" algn="ctr">
+          <a:solidFill>
+            <a:schemeClr val="accent1">
+              <a:alpha val="90000"/>
+              <a:tint val="40000"/>
+              <a:hueOff val="0"/>
+              <a:satOff val="0"/>
+              <a:lumOff val="0"/>
+              <a:alphaOff val="0"/>
+            </a:schemeClr>
+          </a:solidFill>
+          <a:prstDash val="solid"/>
+        </a:ln>
+        <a:effectLst/>
+      </dsp:spPr>
+      <dsp:style>
+        <a:lnRef idx="2">
+          <a:scrgbClr r="0" g="0" b="0"/>
+        </a:lnRef>
+        <a:fillRef idx="1">
+          <a:scrgbClr r="0" g="0" b="0"/>
+        </a:fillRef>
+        <a:effectRef idx="0">
+          <a:scrgbClr r="0" g="0" b="0"/>
+        </a:effectRef>
+        <a:fontRef idx="minor"/>
+      </dsp:style>
+      <dsp:txBody>
+        <a:bodyPr spcFirstLastPara="0" vert="horz" wrap="square" lIns="72390" tIns="36195" rIns="72390" bIns="36195" numCol="1" spcCol="1270" anchor="ctr" anchorCtr="0">
+          <a:noAutofit/>
+        </a:bodyPr>
+        <a:lstStyle/>
+        <a:p>
+          <a:pPr marL="171450" lvl="1" indent="-171450" algn="l" defTabSz="844550">
+            <a:lnSpc>
+              <a:spcPct val="90000"/>
+            </a:lnSpc>
+            <a:spcBef>
+              <a:spcPct val="0"/>
+            </a:spcBef>
+            <a:spcAft>
+              <a:spcPct val="15000"/>
+            </a:spcAft>
+            <a:buChar char="••"/>
+          </a:pPr>
+          <a:r>
+            <a:rPr lang="en-US" sz="1900" kern="1200" dirty="0" err="1" smtClean="0"/>
+            <a:t>Sistema</a:t>
+          </a:r>
+          <a:r>
+            <a:rPr lang="en-US" sz="1900" kern="1200" dirty="0" smtClean="0"/>
+            <a:t> </a:t>
+          </a:r>
+          <a:r>
+            <a:rPr lang="en-US" sz="1900" kern="1200" dirty="0" err="1" smtClean="0"/>
+            <a:t>implementado</a:t>
+          </a:r>
+          <a:r>
+            <a:rPr lang="en-US" sz="1900" kern="1200" dirty="0" smtClean="0"/>
+            <a:t> en forma </a:t>
+          </a:r>
+          <a:r>
+            <a:rPr lang="es-ES" sz="1900" kern="1200" dirty="0" smtClean="0"/>
+            <a:t>completa</a:t>
+          </a:r>
+          <a:endParaRPr lang="en-US" sz="1900" kern="1200" dirty="0"/>
+        </a:p>
+        <a:p>
+          <a:pPr marL="171450" lvl="1" indent="-171450" algn="l" defTabSz="844550">
+            <a:lnSpc>
+              <a:spcPct val="90000"/>
+            </a:lnSpc>
+            <a:spcBef>
+              <a:spcPct val="0"/>
+            </a:spcBef>
+            <a:spcAft>
+              <a:spcPct val="15000"/>
+            </a:spcAft>
+            <a:buChar char="••"/>
+          </a:pPr>
+          <a:r>
+            <a:rPr lang="es-ES" sz="1900" kern="1200" dirty="0" smtClean="0"/>
+            <a:t>Manuel de usuario y de instalación</a:t>
+          </a:r>
+          <a:endParaRPr lang="en-US" sz="1900" kern="1200" dirty="0"/>
+        </a:p>
+      </dsp:txBody>
+      <dsp:txXfrm rot="5400000">
+        <a:off x="4959781" y="934568"/>
+        <a:ext cx="754903" cy="5023278"/>
+      </dsp:txXfrm>
+    </dsp:sp>
+    <dsp:sp modelId="{BBB6B52B-E046-4419-AB1D-58DD3C86F0D8}">
+      <dsp:nvSpPr>
+        <dsp:cNvPr id="0" name=""/>
+        <dsp:cNvSpPr/>
+      </dsp:nvSpPr>
+      <dsp:spPr>
+        <a:xfrm>
+          <a:off x="0" y="2974393"/>
+          <a:ext cx="2825593" cy="943628"/>
+        </a:xfrm>
+        <a:prstGeom prst="roundRect">
+          <a:avLst/>
+        </a:prstGeom>
+        <a:solidFill>
+          <a:schemeClr val="accent1">
+            <a:hueOff val="0"/>
+            <a:satOff val="0"/>
+            <a:lumOff val="0"/>
+            <a:alphaOff val="0"/>
+          </a:schemeClr>
+        </a:solidFill>
+        <a:ln w="15875" cap="flat" cmpd="sng" algn="ctr">
+          <a:solidFill>
+            <a:schemeClr val="lt1">
+              <a:hueOff val="0"/>
+              <a:satOff val="0"/>
+              <a:lumOff val="0"/>
+              <a:alphaOff val="0"/>
+            </a:schemeClr>
+          </a:solidFill>
+          <a:prstDash val="solid"/>
+        </a:ln>
+        <a:effectLst/>
+      </dsp:spPr>
+      <dsp:style>
+        <a:lnRef idx="2">
+          <a:scrgbClr r="0" g="0" b="0"/>
+        </a:lnRef>
+        <a:fillRef idx="1">
+          <a:scrgbClr r="0" g="0" b="0"/>
+        </a:fillRef>
+        <a:effectRef idx="0">
+          <a:scrgbClr r="0" g="0" b="0"/>
+        </a:effectRef>
+        <a:fontRef idx="minor">
+          <a:schemeClr val="lt1"/>
+        </a:fontRef>
+      </dsp:style>
+      <dsp:txBody>
+        <a:bodyPr spcFirstLastPara="0" vert="horz" wrap="square" lIns="91440" tIns="45720" rIns="91440" bIns="45720" numCol="1" spcCol="1270" anchor="ctr" anchorCtr="0">
+          <a:noAutofit/>
+        </a:bodyPr>
+        <a:lstStyle/>
+        <a:p>
+          <a:pPr lvl="0" algn="ctr" defTabSz="1066800">
+            <a:lnSpc>
+              <a:spcPct val="90000"/>
+            </a:lnSpc>
+            <a:spcBef>
+              <a:spcPct val="0"/>
+            </a:spcBef>
+            <a:spcAft>
+              <a:spcPct val="35000"/>
+            </a:spcAft>
+          </a:pPr>
+          <a:r>
+            <a:rPr lang="es-AR" sz="2400" kern="1200" dirty="0" smtClean="0"/>
+            <a:t>Iteración 4</a:t>
+          </a:r>
+        </a:p>
+        <a:p>
+          <a:pPr lvl="0" algn="ctr" defTabSz="1066800">
+            <a:lnSpc>
+              <a:spcPct val="90000"/>
+            </a:lnSpc>
+            <a:spcBef>
+              <a:spcPct val="0"/>
+            </a:spcBef>
+            <a:spcAft>
+              <a:spcPct val="35000"/>
+            </a:spcAft>
+          </a:pPr>
+          <a:r>
+            <a:rPr lang="es-AR" sz="2400" kern="1200" dirty="0" smtClean="0"/>
+            <a:t>15/11/2012</a:t>
+          </a:r>
+          <a:endParaRPr lang="en-US" sz="2400" kern="1200" dirty="0"/>
+        </a:p>
+      </dsp:txBody>
+      <dsp:txXfrm>
+        <a:off x="0" y="2974393"/>
+        <a:ext cx="2825593" cy="943628"/>
       </dsp:txXfrm>
     </dsp:sp>
   </dsp:spTree>
@@ -12067,7 +12832,7 @@
     </p:spTree>
     <p:extLst>
       <p:ext uri="{BB962C8B-B14F-4D97-AF65-F5344CB8AC3E}">
-        <p14:creationId xmlns="" xmlns:p14="http://schemas.microsoft.com/office/powerpoint/2010/main" val="1341522809"/>
+        <p14:creationId xmlns:p14="http://schemas.microsoft.com/office/powerpoint/2010/main" xmlns="" val="1341522809"/>
       </p:ext>
     </p:extLst>
   </p:cSld>
@@ -12420,7 +13185,7 @@
     </p:spTree>
     <p:extLst>
       <p:ext uri="{BB962C8B-B14F-4D97-AF65-F5344CB8AC3E}">
-        <p14:creationId xmlns="" xmlns:p14="http://schemas.microsoft.com/office/powerpoint/2010/main" val="1344049021"/>
+        <p14:creationId xmlns:p14="http://schemas.microsoft.com/office/powerpoint/2010/main" xmlns="" val="1344049021"/>
       </p:ext>
     </p:extLst>
   </p:cSld>
@@ -26333,7 +27098,7 @@
           <a:noFill/>
           <a:extLst>
             <a:ext uri="{909E8E84-426E-40DD-AFC4-6F175D3DCCD1}">
-              <a14:hiddenFill xmlns="" xmlns:a14="http://schemas.microsoft.com/office/drawing/2010/main">
+              <a14:hiddenFill xmlns:a14="http://schemas.microsoft.com/office/drawing/2010/main" xmlns="">
                 <a:solidFill>
                   <a:srgbClr val="FFFFFF"/>
                 </a:solidFill>
@@ -26365,7 +27130,7 @@
           <a:blip r:embed="rId2" cstate="print">
             <a:extLst>
               <a:ext uri="{28A0092B-C50C-407E-A947-70E740481C1C}">
-                <a14:useLocalDpi xmlns="" xmlns:a14="http://schemas.microsoft.com/office/drawing/2010/main" val="0"/>
+                <a14:useLocalDpi xmlns:a14="http://schemas.microsoft.com/office/drawing/2010/main" xmlns="" val="0"/>
               </a:ext>
             </a:extLst>
           </a:blip>
@@ -26385,7 +27150,7 @@
           <a:noFill/>
           <a:extLst>
             <a:ext uri="{909E8E84-426E-40DD-AFC4-6F175D3DCCD1}">
-              <a14:hiddenFill xmlns="" xmlns:a14="http://schemas.microsoft.com/office/drawing/2010/main">
+              <a14:hiddenFill xmlns:a14="http://schemas.microsoft.com/office/drawing/2010/main" xmlns="">
                 <a:solidFill>
                   <a:srgbClr val="FFFFFF"/>
                 </a:solidFill>
@@ -26406,7 +27171,7 @@
           <a:blip r:embed="rId3" cstate="print">
             <a:extLst>
               <a:ext uri="{28A0092B-C50C-407E-A947-70E740481C1C}">
-                <a14:useLocalDpi xmlns="" xmlns:a14="http://schemas.microsoft.com/office/drawing/2010/main" val="0"/>
+                <a14:useLocalDpi xmlns:a14="http://schemas.microsoft.com/office/drawing/2010/main" xmlns="" val="0"/>
               </a:ext>
             </a:extLst>
           </a:blip>
@@ -26426,7 +27191,7 @@
           <a:noFill/>
           <a:extLst>
             <a:ext uri="{909E8E84-426E-40DD-AFC4-6F175D3DCCD1}">
-              <a14:hiddenFill xmlns="" xmlns:a14="http://schemas.microsoft.com/office/drawing/2010/main">
+              <a14:hiddenFill xmlns:a14="http://schemas.microsoft.com/office/drawing/2010/main" xmlns="">
                 <a:solidFill>
                   <a:srgbClr val="FFFFFF"/>
                 </a:solidFill>
@@ -26438,7 +27203,7 @@
     </p:spTree>
     <p:extLst>
       <p:ext uri="{BB962C8B-B14F-4D97-AF65-F5344CB8AC3E}">
-        <p14:creationId xmlns="" xmlns:p14="http://schemas.microsoft.com/office/powerpoint/2010/main" val="140638401"/>
+        <p14:creationId xmlns:p14="http://schemas.microsoft.com/office/powerpoint/2010/main" xmlns="" val="140638401"/>
       </p:ext>
     </p:extLst>
   </p:cSld>
@@ -26587,7 +27352,7 @@
           <a:blip r:embed="rId2" cstate="print">
             <a:extLst>
               <a:ext uri="{28A0092B-C50C-407E-A947-70E740481C1C}">
-                <a14:useLocalDpi xmlns="" xmlns:a14="http://schemas.microsoft.com/office/drawing/2010/main" val="0"/>
+                <a14:useLocalDpi xmlns:a14="http://schemas.microsoft.com/office/drawing/2010/main" xmlns="" val="0"/>
               </a:ext>
             </a:extLst>
           </a:blip>
@@ -26607,7 +27372,7 @@
           <a:noFill/>
           <a:extLst>
             <a:ext uri="{909E8E84-426E-40DD-AFC4-6F175D3DCCD1}">
-              <a14:hiddenFill xmlns="" xmlns:a14="http://schemas.microsoft.com/office/drawing/2010/main">
+              <a14:hiddenFill xmlns:a14="http://schemas.microsoft.com/office/drawing/2010/main" xmlns="">
                 <a:solidFill>
                   <a:srgbClr val="FFFFFF"/>
                 </a:solidFill>
@@ -26628,7 +27393,7 @@
           <a:blip r:embed="rId3" cstate="print">
             <a:extLst>
               <a:ext uri="{28A0092B-C50C-407E-A947-70E740481C1C}">
-                <a14:useLocalDpi xmlns="" xmlns:a14="http://schemas.microsoft.com/office/drawing/2010/main" val="0"/>
+                <a14:useLocalDpi xmlns:a14="http://schemas.microsoft.com/office/drawing/2010/main" xmlns="" val="0"/>
               </a:ext>
             </a:extLst>
           </a:blip>
@@ -26648,7 +27413,7 @@
           <a:noFill/>
           <a:extLst>
             <a:ext uri="{909E8E84-426E-40DD-AFC4-6F175D3DCCD1}">
-              <a14:hiddenFill xmlns="" xmlns:a14="http://schemas.microsoft.com/office/drawing/2010/main">
+              <a14:hiddenFill xmlns:a14="http://schemas.microsoft.com/office/drawing/2010/main" xmlns="">
                 <a:solidFill>
                   <a:srgbClr val="FFFFFF"/>
                 </a:solidFill>
@@ -26660,7 +27425,7 @@
     </p:spTree>
     <p:extLst>
       <p:ext uri="{BB962C8B-B14F-4D97-AF65-F5344CB8AC3E}">
-        <p14:creationId xmlns="" xmlns:p14="http://schemas.microsoft.com/office/powerpoint/2010/main" val="2262476767"/>
+        <p14:creationId xmlns:p14="http://schemas.microsoft.com/office/powerpoint/2010/main" xmlns="" val="2262476767"/>
       </p:ext>
     </p:extLst>
   </p:cSld>
@@ -28605,7 +29370,7 @@
           <a:blip r:embed="rId2" cstate="print">
             <a:extLst>
               <a:ext uri="{28A0092B-C50C-407E-A947-70E740481C1C}">
-                <a14:useLocalDpi xmlns="" xmlns:a14="http://schemas.microsoft.com/office/drawing/2010/main" val="0"/>
+                <a14:useLocalDpi xmlns:a14="http://schemas.microsoft.com/office/drawing/2010/main" xmlns="" val="0"/>
               </a:ext>
             </a:extLst>
           </a:blip>
@@ -28625,7 +29390,7 @@
           <a:noFill/>
           <a:extLst>
             <a:ext uri="{909E8E84-426E-40DD-AFC4-6F175D3DCCD1}">
-              <a14:hiddenFill xmlns="" xmlns:a14="http://schemas.microsoft.com/office/drawing/2010/main">
+              <a14:hiddenFill xmlns:a14="http://schemas.microsoft.com/office/drawing/2010/main" xmlns="">
                 <a:solidFill>
                   <a:srgbClr val="FFFFFF"/>
                 </a:solidFill>
@@ -28646,7 +29411,7 @@
           <a:blip r:embed="rId3" cstate="print">
             <a:extLst>
               <a:ext uri="{28A0092B-C50C-407E-A947-70E740481C1C}">
-                <a14:useLocalDpi xmlns="" xmlns:a14="http://schemas.microsoft.com/office/drawing/2010/main" val="0"/>
+                <a14:useLocalDpi xmlns:a14="http://schemas.microsoft.com/office/drawing/2010/main" xmlns="" val="0"/>
               </a:ext>
             </a:extLst>
           </a:blip>
@@ -28666,7 +29431,7 @@
           <a:noFill/>
           <a:extLst>
             <a:ext uri="{909E8E84-426E-40DD-AFC4-6F175D3DCCD1}">
-              <a14:hiddenFill xmlns="" xmlns:a14="http://schemas.microsoft.com/office/drawing/2010/main">
+              <a14:hiddenFill xmlns:a14="http://schemas.microsoft.com/office/drawing/2010/main" xmlns="">
                 <a:solidFill>
                   <a:srgbClr val="FFFFFF"/>
                 </a:solidFill>
@@ -28684,10 +29449,10 @@
           <p:nvPr/>
         </p:nvPicPr>
         <p:blipFill>
-          <a:blip r:embed="rId4">
+          <a:blip r:embed="rId4" cstate="print">
             <a:extLst>
               <a:ext uri="{28A0092B-C50C-407E-A947-70E740481C1C}">
-                <a14:useLocalDpi xmlns="" xmlns:a14="http://schemas.microsoft.com/office/drawing/2010/main" val="0"/>
+                <a14:useLocalDpi xmlns:a14="http://schemas.microsoft.com/office/drawing/2010/main" xmlns="" val="0"/>
               </a:ext>
             </a:extLst>
           </a:blip>
@@ -28707,7 +29472,7 @@
           <a:noFill/>
           <a:extLst>
             <a:ext uri="{909E8E84-426E-40DD-AFC4-6F175D3DCCD1}">
-              <a14:hiddenFill xmlns="" xmlns:a14="http://schemas.microsoft.com/office/drawing/2010/main">
+              <a14:hiddenFill xmlns:a14="http://schemas.microsoft.com/office/drawing/2010/main" xmlns="">
                 <a:solidFill>
                   <a:srgbClr val="FFFFFF"/>
                 </a:solidFill>
@@ -28719,7 +29484,7 @@
     </p:spTree>
     <p:extLst>
       <p:ext uri="{BB962C8B-B14F-4D97-AF65-F5344CB8AC3E}">
-        <p14:creationId xmlns="" xmlns:p14="http://schemas.microsoft.com/office/powerpoint/2010/main" val="2023804496"/>
+        <p14:creationId xmlns:p14="http://schemas.microsoft.com/office/powerpoint/2010/main" xmlns="" val="2023804496"/>
       </p:ext>
     </p:extLst>
   </p:cSld>
@@ -30422,7 +31187,7 @@
           <a:blip r:embed="rId2" cstate="print">
             <a:extLst>
               <a:ext uri="{28A0092B-C50C-407E-A947-70E740481C1C}">
-                <a14:useLocalDpi xmlns="" xmlns:a14="http://schemas.microsoft.com/office/drawing/2010/main" val="0"/>
+                <a14:useLocalDpi xmlns:a14="http://schemas.microsoft.com/office/drawing/2010/main" xmlns="" val="0"/>
               </a:ext>
             </a:extLst>
           </a:blip>
@@ -30442,7 +31207,7 @@
           <a:noFill/>
           <a:extLst>
             <a:ext uri="{909E8E84-426E-40DD-AFC4-6F175D3DCCD1}">
-              <a14:hiddenFill xmlns="" xmlns:a14="http://schemas.microsoft.com/office/drawing/2010/main">
+              <a14:hiddenFill xmlns:a14="http://schemas.microsoft.com/office/drawing/2010/main" xmlns="">
                 <a:solidFill>
                   <a:srgbClr val="FFFFFF"/>
                 </a:solidFill>
@@ -30463,7 +31228,7 @@
           <a:blip r:embed="rId3" cstate="print">
             <a:extLst>
               <a:ext uri="{28A0092B-C50C-407E-A947-70E740481C1C}">
-                <a14:useLocalDpi xmlns="" xmlns:a14="http://schemas.microsoft.com/office/drawing/2010/main" val="0"/>
+                <a14:useLocalDpi xmlns:a14="http://schemas.microsoft.com/office/drawing/2010/main" xmlns="" val="0"/>
               </a:ext>
             </a:extLst>
           </a:blip>
@@ -30483,7 +31248,7 @@
           <a:noFill/>
           <a:extLst>
             <a:ext uri="{909E8E84-426E-40DD-AFC4-6F175D3DCCD1}">
-              <a14:hiddenFill xmlns="" xmlns:a14="http://schemas.microsoft.com/office/drawing/2010/main">
+              <a14:hiddenFill xmlns:a14="http://schemas.microsoft.com/office/drawing/2010/main" xmlns="">
                 <a:solidFill>
                   <a:srgbClr val="FFFFFF"/>
                 </a:solidFill>
@@ -30495,7 +31260,7 @@
     </p:spTree>
     <p:extLst>
       <p:ext uri="{BB962C8B-B14F-4D97-AF65-F5344CB8AC3E}">
-        <p14:creationId xmlns="" xmlns:p14="http://schemas.microsoft.com/office/powerpoint/2010/main" val="2666013015"/>
+        <p14:creationId xmlns:p14="http://schemas.microsoft.com/office/powerpoint/2010/main" xmlns="" val="2666013015"/>
       </p:ext>
     </p:extLst>
   </p:cSld>
@@ -30604,7 +31369,7 @@
           <a:blip r:embed="rId2" cstate="print">
             <a:extLst>
               <a:ext uri="{28A0092B-C50C-407E-A947-70E740481C1C}">
-                <a14:useLocalDpi xmlns="" xmlns:a14="http://schemas.microsoft.com/office/drawing/2010/main" val="0"/>
+                <a14:useLocalDpi xmlns:a14="http://schemas.microsoft.com/office/drawing/2010/main" xmlns="" val="0"/>
               </a:ext>
             </a:extLst>
           </a:blip>
@@ -30624,7 +31389,7 @@
           <a:noFill/>
           <a:extLst>
             <a:ext uri="{909E8E84-426E-40DD-AFC4-6F175D3DCCD1}">
-              <a14:hiddenFill xmlns="" xmlns:a14="http://schemas.microsoft.com/office/drawing/2010/main">
+              <a14:hiddenFill xmlns:a14="http://schemas.microsoft.com/office/drawing/2010/main" xmlns="">
                 <a:solidFill>
                   <a:srgbClr val="FFFFFF"/>
                 </a:solidFill>
@@ -30645,7 +31410,7 @@
           <a:blip r:embed="rId3" cstate="print">
             <a:extLst>
               <a:ext uri="{28A0092B-C50C-407E-A947-70E740481C1C}">
-                <a14:useLocalDpi xmlns="" xmlns:a14="http://schemas.microsoft.com/office/drawing/2010/main" val="0"/>
+                <a14:useLocalDpi xmlns:a14="http://schemas.microsoft.com/office/drawing/2010/main" xmlns="" val="0"/>
               </a:ext>
             </a:extLst>
           </a:blip>
@@ -30665,7 +31430,7 @@
           <a:noFill/>
           <a:extLst>
             <a:ext uri="{909E8E84-426E-40DD-AFC4-6F175D3DCCD1}">
-              <a14:hiddenFill xmlns="" xmlns:a14="http://schemas.microsoft.com/office/drawing/2010/main">
+              <a14:hiddenFill xmlns:a14="http://schemas.microsoft.com/office/drawing/2010/main" xmlns="">
                 <a:solidFill>
                   <a:srgbClr val="FFFFFF"/>
                 </a:solidFill>
@@ -30938,7 +31703,7 @@
     </p:spTree>
     <p:extLst>
       <p:ext uri="{BB962C8B-B14F-4D97-AF65-F5344CB8AC3E}">
-        <p14:creationId xmlns="" xmlns:p14="http://schemas.microsoft.com/office/powerpoint/2010/main" val="3693362975"/>
+        <p14:creationId xmlns:p14="http://schemas.microsoft.com/office/powerpoint/2010/main" xmlns="" val="3693362975"/>
       </p:ext>
     </p:extLst>
   </p:cSld>
@@ -32494,7 +33259,7 @@
           <a:blip r:embed="rId2" cstate="print">
             <a:extLst>
               <a:ext uri="{28A0092B-C50C-407E-A947-70E740481C1C}">
-                <a14:useLocalDpi xmlns="" xmlns:a14="http://schemas.microsoft.com/office/drawing/2010/main" val="0"/>
+                <a14:useLocalDpi xmlns:a14="http://schemas.microsoft.com/office/drawing/2010/main" xmlns="" val="0"/>
               </a:ext>
             </a:extLst>
           </a:blip>
@@ -32514,7 +33279,7 @@
           <a:noFill/>
           <a:extLst>
             <a:ext uri="{909E8E84-426E-40DD-AFC4-6F175D3DCCD1}">
-              <a14:hiddenFill xmlns="" xmlns:a14="http://schemas.microsoft.com/office/drawing/2010/main">
+              <a14:hiddenFill xmlns:a14="http://schemas.microsoft.com/office/drawing/2010/main" xmlns="">
                 <a:solidFill>
                   <a:srgbClr val="FFFFFF"/>
                 </a:solidFill>
@@ -32535,7 +33300,7 @@
           <a:blip r:embed="rId3" cstate="print">
             <a:extLst>
               <a:ext uri="{28A0092B-C50C-407E-A947-70E740481C1C}">
-                <a14:useLocalDpi xmlns="" xmlns:a14="http://schemas.microsoft.com/office/drawing/2010/main" val="0"/>
+                <a14:useLocalDpi xmlns:a14="http://schemas.microsoft.com/office/drawing/2010/main" xmlns="" val="0"/>
               </a:ext>
             </a:extLst>
           </a:blip>
@@ -32555,7 +33320,7 @@
           <a:noFill/>
           <a:extLst>
             <a:ext uri="{909E8E84-426E-40DD-AFC4-6F175D3DCCD1}">
-              <a14:hiddenFill xmlns="" xmlns:a14="http://schemas.microsoft.com/office/drawing/2010/main">
+              <a14:hiddenFill xmlns:a14="http://schemas.microsoft.com/office/drawing/2010/main" xmlns="">
                 <a:solidFill>
                   <a:srgbClr val="FFFFFF"/>
                 </a:solidFill>
@@ -32854,7 +33619,7 @@
     </p:spTree>
     <p:extLst>
       <p:ext uri="{BB962C8B-B14F-4D97-AF65-F5344CB8AC3E}">
-        <p14:creationId xmlns="" xmlns:p14="http://schemas.microsoft.com/office/powerpoint/2010/main" val="3693362975"/>
+        <p14:creationId xmlns:p14="http://schemas.microsoft.com/office/powerpoint/2010/main" xmlns="" val="3693362975"/>
       </p:ext>
     </p:extLst>
   </p:cSld>
@@ -35093,7 +35858,7 @@
           <a:blip r:embed="rId3" cstate="print">
             <a:extLst>
               <a:ext uri="{28A0092B-C50C-407E-A947-70E740481C1C}">
-                <a14:useLocalDpi xmlns:a14="http://schemas.microsoft.com/office/drawing/2010/main" xmlns="" val="0"/>
+                <a14:useLocalDpi xmlns="" xmlns:a14="http://schemas.microsoft.com/office/drawing/2010/main" val="0"/>
               </a:ext>
             </a:extLst>
           </a:blip>
@@ -35113,7 +35878,7 @@
           <a:noFill/>
           <a:extLst>
             <a:ext uri="{909E8E84-426E-40DD-AFC4-6F175D3DCCD1}">
-              <a14:hiddenFill xmlns:a14="http://schemas.microsoft.com/office/drawing/2010/main" xmlns="">
+              <a14:hiddenFill xmlns="" xmlns:a14="http://schemas.microsoft.com/office/drawing/2010/main">
                 <a:solidFill>
                   <a:srgbClr val="FFFFFF"/>
                 </a:solidFill>
@@ -35134,7 +35899,7 @@
           <a:blip r:embed="rId4" cstate="print">
             <a:extLst>
               <a:ext uri="{28A0092B-C50C-407E-A947-70E740481C1C}">
-                <a14:useLocalDpi xmlns:a14="http://schemas.microsoft.com/office/drawing/2010/main" xmlns="" val="0"/>
+                <a14:useLocalDpi xmlns="" xmlns:a14="http://schemas.microsoft.com/office/drawing/2010/main" val="0"/>
               </a:ext>
             </a:extLst>
           </a:blip>
@@ -35154,7 +35919,7 @@
           <a:noFill/>
           <a:extLst>
             <a:ext uri="{909E8E84-426E-40DD-AFC4-6F175D3DCCD1}">
-              <a14:hiddenFill xmlns:a14="http://schemas.microsoft.com/office/drawing/2010/main" xmlns="">
+              <a14:hiddenFill xmlns="" xmlns:a14="http://schemas.microsoft.com/office/drawing/2010/main">
                 <a:solidFill>
                   <a:srgbClr val="FFFFFF"/>
                 </a:solidFill>
@@ -35199,7 +35964,7 @@
           <p:nvPr>
             <p:extLst>
               <p:ext uri="{D42A27DB-BD31-4B8C-83A1-F6EECF244321}">
-                <p14:modId xmlns:p14="http://schemas.microsoft.com/office/powerpoint/2010/main" xmlns="" val="3925065347"/>
+                <p14:modId xmlns="" xmlns:p14="http://schemas.microsoft.com/office/powerpoint/2010/main" val="3925065347"/>
               </p:ext>
             </p:extLst>
           </p:nvPr>
@@ -35217,7 +35982,7 @@
     </p:spTree>
     <p:extLst>
       <p:ext uri="{BB962C8B-B14F-4D97-AF65-F5344CB8AC3E}">
-        <p14:creationId xmlns:p14="http://schemas.microsoft.com/office/powerpoint/2010/main" xmlns="" val="3693362975"/>
+        <p14:creationId xmlns="" xmlns:p14="http://schemas.microsoft.com/office/powerpoint/2010/main" val="3693362975"/>
       </p:ext>
     </p:extLst>
   </p:cSld>
@@ -35381,7 +36146,7 @@
           <a:blip r:embed="rId2" cstate="print">
             <a:extLst>
               <a:ext uri="{28A0092B-C50C-407E-A947-70E740481C1C}">
-                <a14:useLocalDpi xmlns="" xmlns:a14="http://schemas.microsoft.com/office/drawing/2010/main" val="0"/>
+                <a14:useLocalDpi xmlns:a14="http://schemas.microsoft.com/office/drawing/2010/main" xmlns="" val="0"/>
               </a:ext>
             </a:extLst>
           </a:blip>
@@ -35401,7 +36166,7 @@
           <a:noFill/>
           <a:extLst>
             <a:ext uri="{909E8E84-426E-40DD-AFC4-6F175D3DCCD1}">
-              <a14:hiddenFill xmlns="" xmlns:a14="http://schemas.microsoft.com/office/drawing/2010/main">
+              <a14:hiddenFill xmlns:a14="http://schemas.microsoft.com/office/drawing/2010/main" xmlns="">
                 <a:solidFill>
                   <a:srgbClr val="FFFFFF"/>
                 </a:solidFill>
@@ -35422,7 +36187,7 @@
           <a:blip r:embed="rId3" cstate="print">
             <a:extLst>
               <a:ext uri="{28A0092B-C50C-407E-A947-70E740481C1C}">
-                <a14:useLocalDpi xmlns="" xmlns:a14="http://schemas.microsoft.com/office/drawing/2010/main" val="0"/>
+                <a14:useLocalDpi xmlns:a14="http://schemas.microsoft.com/office/drawing/2010/main" xmlns="" val="0"/>
               </a:ext>
             </a:extLst>
           </a:blip>
@@ -35442,7 +36207,7 @@
           <a:noFill/>
           <a:extLst>
             <a:ext uri="{909E8E84-426E-40DD-AFC4-6F175D3DCCD1}">
-              <a14:hiddenFill xmlns="" xmlns:a14="http://schemas.microsoft.com/office/drawing/2010/main">
+              <a14:hiddenFill xmlns:a14="http://schemas.microsoft.com/office/drawing/2010/main" xmlns="">
                 <a:solidFill>
                   <a:srgbClr val="FFFFFF"/>
                 </a:solidFill>
@@ -35454,7 +36219,7 @@
     </p:spTree>
     <p:extLst>
       <p:ext uri="{BB962C8B-B14F-4D97-AF65-F5344CB8AC3E}">
-        <p14:creationId xmlns="" xmlns:p14="http://schemas.microsoft.com/office/powerpoint/2010/main" val="1251326373"/>
+        <p14:creationId xmlns:p14="http://schemas.microsoft.com/office/powerpoint/2010/main" xmlns="" val="1251326373"/>
       </p:ext>
     </p:extLst>
   </p:cSld>
@@ -35941,7 +36706,7 @@
           <a:blip r:embed="rId2" cstate="print">
             <a:extLst>
               <a:ext uri="{28A0092B-C50C-407E-A947-70E740481C1C}">
-                <a14:useLocalDpi xmlns="" xmlns:a14="http://schemas.microsoft.com/office/drawing/2010/main" val="0"/>
+                <a14:useLocalDpi xmlns:a14="http://schemas.microsoft.com/office/drawing/2010/main" xmlns="" val="0"/>
               </a:ext>
             </a:extLst>
           </a:blip>
@@ -35961,7 +36726,7 @@
           <a:noFill/>
           <a:extLst>
             <a:ext uri="{909E8E84-426E-40DD-AFC4-6F175D3DCCD1}">
-              <a14:hiddenFill xmlns="" xmlns:a14="http://schemas.microsoft.com/office/drawing/2010/main">
+              <a14:hiddenFill xmlns:a14="http://schemas.microsoft.com/office/drawing/2010/main" xmlns="">
                 <a:solidFill>
                   <a:srgbClr val="FFFFFF"/>
                 </a:solidFill>
@@ -35982,7 +36747,7 @@
           <a:blip r:embed="rId3" cstate="print">
             <a:extLst>
               <a:ext uri="{28A0092B-C50C-407E-A947-70E740481C1C}">
-                <a14:useLocalDpi xmlns="" xmlns:a14="http://schemas.microsoft.com/office/drawing/2010/main" val="0"/>
+                <a14:useLocalDpi xmlns:a14="http://schemas.microsoft.com/office/drawing/2010/main" xmlns="" val="0"/>
               </a:ext>
             </a:extLst>
           </a:blip>
@@ -36002,7 +36767,7 @@
           <a:noFill/>
           <a:extLst>
             <a:ext uri="{909E8E84-426E-40DD-AFC4-6F175D3DCCD1}">
-              <a14:hiddenFill xmlns="" xmlns:a14="http://schemas.microsoft.com/office/drawing/2010/main">
+              <a14:hiddenFill xmlns:a14="http://schemas.microsoft.com/office/drawing/2010/main" xmlns="">
                 <a:solidFill>
                   <a:srgbClr val="FFFFFF"/>
                 </a:solidFill>
@@ -36030,7 +36795,7 @@
           <a:noFill/>
           <a:extLst>
             <a:ext uri="{909E8E84-426E-40DD-AFC4-6F175D3DCCD1}">
-              <a14:hiddenFill xmlns="" xmlns:a14="http://schemas.microsoft.com/office/drawing/2010/main">
+              <a14:hiddenFill xmlns:a14="http://schemas.microsoft.com/office/drawing/2010/main" xmlns="">
                 <a:solidFill>
                   <a:srgbClr val="FFFFFF"/>
                 </a:solidFill>
@@ -36069,7 +36834,7 @@
           <a:noFill/>
           <a:extLst>
             <a:ext uri="{909E8E84-426E-40DD-AFC4-6F175D3DCCD1}">
-              <a14:hiddenFill xmlns="" xmlns:a14="http://schemas.microsoft.com/office/drawing/2010/main">
+              <a14:hiddenFill xmlns:a14="http://schemas.microsoft.com/office/drawing/2010/main" xmlns="">
                 <a:solidFill>
                   <a:srgbClr val="FFFFFF"/>
                 </a:solidFill>
@@ -36108,7 +36873,7 @@
           <a:noFill/>
           <a:extLst>
             <a:ext uri="{909E8E84-426E-40DD-AFC4-6F175D3DCCD1}">
-              <a14:hiddenFill xmlns="" xmlns:a14="http://schemas.microsoft.com/office/drawing/2010/main">
+              <a14:hiddenFill xmlns:a14="http://schemas.microsoft.com/office/drawing/2010/main" xmlns="">
                 <a:solidFill>
                   <a:srgbClr val="FFFFFF"/>
                 </a:solidFill>
@@ -36147,7 +36912,7 @@
           <a:noFill/>
           <a:extLst>
             <a:ext uri="{909E8E84-426E-40DD-AFC4-6F175D3DCCD1}">
-              <a14:hiddenFill xmlns="" xmlns:a14="http://schemas.microsoft.com/office/drawing/2010/main">
+              <a14:hiddenFill xmlns:a14="http://schemas.microsoft.com/office/drawing/2010/main" xmlns="">
                 <a:solidFill>
                   <a:srgbClr val="FFFFFF"/>
                 </a:solidFill>
@@ -36186,7 +36951,7 @@
           <a:noFill/>
           <a:extLst>
             <a:ext uri="{909E8E84-426E-40DD-AFC4-6F175D3DCCD1}">
-              <a14:hiddenFill xmlns="" xmlns:a14="http://schemas.microsoft.com/office/drawing/2010/main">
+              <a14:hiddenFill xmlns:a14="http://schemas.microsoft.com/office/drawing/2010/main" xmlns="">
                 <a:solidFill>
                   <a:srgbClr val="FFFFFF"/>
                 </a:solidFill>
@@ -36215,10 +36980,10 @@
           <p:nvPr/>
         </p:nvPicPr>
         <p:blipFill>
-          <a:blip r:embed="rId4">
+          <a:blip r:embed="rId4" cstate="print">
             <a:extLst>
               <a:ext uri="{28A0092B-C50C-407E-A947-70E740481C1C}">
-                <a14:useLocalDpi xmlns="" xmlns:a14="http://schemas.microsoft.com/office/drawing/2010/main" val="0"/>
+                <a14:useLocalDpi xmlns:a14="http://schemas.microsoft.com/office/drawing/2010/main" xmlns="" val="0"/>
               </a:ext>
             </a:extLst>
           </a:blip>
@@ -36242,14 +37007,14 @@
           <a:effectLst/>
           <a:extLst>
             <a:ext uri="{909E8E84-426E-40DD-AFC4-6F175D3DCCD1}">
-              <a14:hiddenFill xmlns="" xmlns:a14="http://schemas.microsoft.com/office/drawing/2010/main">
+              <a14:hiddenFill xmlns:a14="http://schemas.microsoft.com/office/drawing/2010/main" xmlns="">
                 <a:solidFill>
                   <a:schemeClr val="accent1"/>
                 </a:solidFill>
               </a14:hiddenFill>
             </a:ext>
             <a:ext uri="{91240B29-F687-4F45-9708-019B960494DF}">
-              <a14:hiddenLine xmlns="" xmlns:a14="http://schemas.microsoft.com/office/drawing/2010/main" w="9525">
+              <a14:hiddenLine xmlns:a14="http://schemas.microsoft.com/office/drawing/2010/main" xmlns="" w="9525">
                 <a:solidFill>
                   <a:schemeClr val="tx1"/>
                 </a:solidFill>
@@ -36259,7 +37024,7 @@
               </a14:hiddenLine>
             </a:ext>
             <a:ext uri="{AF507438-7753-43E0-B8FC-AC1667EBCBE1}">
-              <a14:hiddenEffects xmlns="" xmlns:a14="http://schemas.microsoft.com/office/drawing/2010/main">
+              <a14:hiddenEffects xmlns:a14="http://schemas.microsoft.com/office/drawing/2010/main" xmlns="">
                 <a:effectLst>
                   <a:outerShdw dist="35921" dir="2700000" algn="ctr" rotWithShape="0">
                     <a:schemeClr val="bg2"/>
@@ -36273,7 +37038,7 @@
     </p:spTree>
     <p:extLst>
       <p:ext uri="{BB962C8B-B14F-4D97-AF65-F5344CB8AC3E}">
-        <p14:creationId xmlns="" xmlns:p14="http://schemas.microsoft.com/office/powerpoint/2010/main" val="2273561369"/>
+        <p14:creationId xmlns:p14="http://schemas.microsoft.com/office/powerpoint/2010/main" xmlns="" val="2273561369"/>
       </p:ext>
     </p:extLst>
   </p:cSld>
@@ -36777,7 +37542,7 @@
           <a:blip r:embed="rId2" cstate="print">
             <a:extLst>
               <a:ext uri="{28A0092B-C50C-407E-A947-70E740481C1C}">
-                <a14:useLocalDpi xmlns="" xmlns:a14="http://schemas.microsoft.com/office/drawing/2010/main" val="0"/>
+                <a14:useLocalDpi xmlns:a14="http://schemas.microsoft.com/office/drawing/2010/main" xmlns="" val="0"/>
               </a:ext>
             </a:extLst>
           </a:blip>
@@ -36801,14 +37566,14 @@
           <a:effectLst/>
           <a:extLst>
             <a:ext uri="{909E8E84-426E-40DD-AFC4-6F175D3DCCD1}">
-              <a14:hiddenFill xmlns="" xmlns:a14="http://schemas.microsoft.com/office/drawing/2010/main">
+              <a14:hiddenFill xmlns:a14="http://schemas.microsoft.com/office/drawing/2010/main" xmlns="">
                 <a:solidFill>
                   <a:schemeClr val="accent1"/>
                 </a:solidFill>
               </a14:hiddenFill>
             </a:ext>
             <a:ext uri="{91240B29-F687-4F45-9708-019B960494DF}">
-              <a14:hiddenLine xmlns="" xmlns:a14="http://schemas.microsoft.com/office/drawing/2010/main" w="9525">
+              <a14:hiddenLine xmlns:a14="http://schemas.microsoft.com/office/drawing/2010/main" xmlns="" w="9525">
                 <a:solidFill>
                   <a:schemeClr val="tx1"/>
                 </a:solidFill>
@@ -36818,7 +37583,7 @@
               </a14:hiddenLine>
             </a:ext>
             <a:ext uri="{AF507438-7753-43E0-B8FC-AC1667EBCBE1}">
-              <a14:hiddenEffects xmlns="" xmlns:a14="http://schemas.microsoft.com/office/drawing/2010/main">
+              <a14:hiddenEffects xmlns:a14="http://schemas.microsoft.com/office/drawing/2010/main" xmlns="">
                 <a:effectLst>
                   <a:outerShdw dist="35921" dir="2700000" algn="ctr" rotWithShape="0">
                     <a:schemeClr val="bg2"/>
@@ -36841,7 +37606,7 @@
           <a:blip r:embed="rId3" cstate="print">
             <a:extLst>
               <a:ext uri="{28A0092B-C50C-407E-A947-70E740481C1C}">
-                <a14:useLocalDpi xmlns="" xmlns:a14="http://schemas.microsoft.com/office/drawing/2010/main" val="0"/>
+                <a14:useLocalDpi xmlns:a14="http://schemas.microsoft.com/office/drawing/2010/main" xmlns="" val="0"/>
               </a:ext>
             </a:extLst>
           </a:blip>
@@ -36861,7 +37626,7 @@
           <a:noFill/>
           <a:extLst>
             <a:ext uri="{909E8E84-426E-40DD-AFC4-6F175D3DCCD1}">
-              <a14:hiddenFill xmlns="" xmlns:a14="http://schemas.microsoft.com/office/drawing/2010/main">
+              <a14:hiddenFill xmlns:a14="http://schemas.microsoft.com/office/drawing/2010/main" xmlns="">
                 <a:solidFill>
                   <a:srgbClr val="FFFFFF"/>
                 </a:solidFill>
@@ -36882,7 +37647,7 @@
           <a:blip r:embed="rId4" cstate="print">
             <a:extLst>
               <a:ext uri="{28A0092B-C50C-407E-A947-70E740481C1C}">
-                <a14:useLocalDpi xmlns="" xmlns:a14="http://schemas.microsoft.com/office/drawing/2010/main" val="0"/>
+                <a14:useLocalDpi xmlns:a14="http://schemas.microsoft.com/office/drawing/2010/main" xmlns="" val="0"/>
               </a:ext>
             </a:extLst>
           </a:blip>
@@ -36902,7 +37667,7 @@
           <a:noFill/>
           <a:extLst>
             <a:ext uri="{909E8E84-426E-40DD-AFC4-6F175D3DCCD1}">
-              <a14:hiddenFill xmlns="" xmlns:a14="http://schemas.microsoft.com/office/drawing/2010/main">
+              <a14:hiddenFill xmlns:a14="http://schemas.microsoft.com/office/drawing/2010/main" xmlns="">
                 <a:solidFill>
                   <a:srgbClr val="FFFFFF"/>
                 </a:solidFill>
@@ -36914,7 +37679,7 @@
     </p:spTree>
     <p:extLst>
       <p:ext uri="{BB962C8B-B14F-4D97-AF65-F5344CB8AC3E}">
-        <p14:creationId xmlns="" xmlns:p14="http://schemas.microsoft.com/office/powerpoint/2010/main" val="1450032067"/>
+        <p14:creationId xmlns:p14="http://schemas.microsoft.com/office/powerpoint/2010/main" xmlns="" val="1450032067"/>
       </p:ext>
     </p:extLst>
   </p:cSld>
@@ -36987,7 +37752,7 @@
           <a:blip r:embed="rId2" cstate="print">
             <a:extLst>
               <a:ext uri="{28A0092B-C50C-407E-A947-70E740481C1C}">
-                <a14:useLocalDpi xmlns="" xmlns:a14="http://schemas.microsoft.com/office/drawing/2010/main" val="0"/>
+                <a14:useLocalDpi xmlns:a14="http://schemas.microsoft.com/office/drawing/2010/main" xmlns="" val="0"/>
               </a:ext>
             </a:extLst>
           </a:blip>
@@ -37007,7 +37772,7 @@
           <a:noFill/>
           <a:extLst>
             <a:ext uri="{909E8E84-426E-40DD-AFC4-6F175D3DCCD1}">
-              <a14:hiddenFill xmlns="" xmlns:a14="http://schemas.microsoft.com/office/drawing/2010/main">
+              <a14:hiddenFill xmlns:a14="http://schemas.microsoft.com/office/drawing/2010/main" xmlns="">
                 <a:solidFill>
                   <a:srgbClr val="FFFFFF"/>
                 </a:solidFill>
@@ -37028,7 +37793,7 @@
           <a:blip r:embed="rId3" cstate="print">
             <a:extLst>
               <a:ext uri="{28A0092B-C50C-407E-A947-70E740481C1C}">
-                <a14:useLocalDpi xmlns="" xmlns:a14="http://schemas.microsoft.com/office/drawing/2010/main" val="0"/>
+                <a14:useLocalDpi xmlns:a14="http://schemas.microsoft.com/office/drawing/2010/main" xmlns="" val="0"/>
               </a:ext>
             </a:extLst>
           </a:blip>
@@ -37048,7 +37813,7 @@
           <a:noFill/>
           <a:extLst>
             <a:ext uri="{909E8E84-426E-40DD-AFC4-6F175D3DCCD1}">
-              <a14:hiddenFill xmlns="" xmlns:a14="http://schemas.microsoft.com/office/drawing/2010/main">
+              <a14:hiddenFill xmlns:a14="http://schemas.microsoft.com/office/drawing/2010/main" xmlns="">
                 <a:solidFill>
                   <a:srgbClr val="FFFFFF"/>
                 </a:solidFill>
@@ -37066,10 +37831,10 @@
           <p:nvPr/>
         </p:nvPicPr>
         <p:blipFill>
-          <a:blip r:embed="rId4">
+          <a:blip r:embed="rId4" cstate="print">
             <a:extLst>
               <a:ext uri="{28A0092B-C50C-407E-A947-70E740481C1C}">
-                <a14:useLocalDpi xmlns="" xmlns:a14="http://schemas.microsoft.com/office/drawing/2010/main" val="0"/>
+                <a14:useLocalDpi xmlns:a14="http://schemas.microsoft.com/office/drawing/2010/main" xmlns="" val="0"/>
               </a:ext>
             </a:extLst>
           </a:blip>
@@ -37089,7 +37854,7 @@
           <a:noFill/>
           <a:extLst>
             <a:ext uri="{909E8E84-426E-40DD-AFC4-6F175D3DCCD1}">
-              <a14:hiddenFill xmlns="" xmlns:a14="http://schemas.microsoft.com/office/drawing/2010/main">
+              <a14:hiddenFill xmlns:a14="http://schemas.microsoft.com/office/drawing/2010/main" xmlns="">
                 <a:solidFill>
                   <a:srgbClr val="FFFFFF"/>
                 </a:solidFill>
@@ -37101,7 +37866,7 @@
     </p:spTree>
     <p:extLst>
       <p:ext uri="{BB962C8B-B14F-4D97-AF65-F5344CB8AC3E}">
-        <p14:creationId xmlns="" xmlns:p14="http://schemas.microsoft.com/office/powerpoint/2010/main" val="1688055498"/>
+        <p14:creationId xmlns:p14="http://schemas.microsoft.com/office/powerpoint/2010/main" xmlns="" val="1688055498"/>
       </p:ext>
     </p:extLst>
   </p:cSld>
@@ -37549,7 +38314,7 @@
           <a:blip r:embed="rId2" cstate="print">
             <a:extLst>
               <a:ext uri="{28A0092B-C50C-407E-A947-70E740481C1C}">
-                <a14:useLocalDpi xmlns="" xmlns:a14="http://schemas.microsoft.com/office/drawing/2010/main" val="0"/>
+                <a14:useLocalDpi xmlns:a14="http://schemas.microsoft.com/office/drawing/2010/main" xmlns="" val="0"/>
               </a:ext>
             </a:extLst>
           </a:blip>
@@ -37569,7 +38334,7 @@
           <a:noFill/>
           <a:extLst>
             <a:ext uri="{909E8E84-426E-40DD-AFC4-6F175D3DCCD1}">
-              <a14:hiddenFill xmlns="" xmlns:a14="http://schemas.microsoft.com/office/drawing/2010/main">
+              <a14:hiddenFill xmlns:a14="http://schemas.microsoft.com/office/drawing/2010/main" xmlns="">
                 <a:solidFill>
                   <a:srgbClr val="FFFFFF"/>
                 </a:solidFill>
@@ -37590,7 +38355,7 @@
           <a:blip r:embed="rId3" cstate="print">
             <a:extLst>
               <a:ext uri="{28A0092B-C50C-407E-A947-70E740481C1C}">
-                <a14:useLocalDpi xmlns="" xmlns:a14="http://schemas.microsoft.com/office/drawing/2010/main" val="0"/>
+                <a14:useLocalDpi xmlns:a14="http://schemas.microsoft.com/office/drawing/2010/main" xmlns="" val="0"/>
               </a:ext>
             </a:extLst>
           </a:blip>
@@ -37610,7 +38375,7 @@
           <a:noFill/>
           <a:extLst>
             <a:ext uri="{909E8E84-426E-40DD-AFC4-6F175D3DCCD1}">
-              <a14:hiddenFill xmlns="" xmlns:a14="http://schemas.microsoft.com/office/drawing/2010/main">
+              <a14:hiddenFill xmlns:a14="http://schemas.microsoft.com/office/drawing/2010/main" xmlns="">
                 <a:solidFill>
                   <a:srgbClr val="FFFFFF"/>
                 </a:solidFill>
@@ -37622,7 +38387,7 @@
     </p:spTree>
     <p:extLst>
       <p:ext uri="{BB962C8B-B14F-4D97-AF65-F5344CB8AC3E}">
-        <p14:creationId xmlns="" xmlns:p14="http://schemas.microsoft.com/office/powerpoint/2010/main" val="119432886"/>
+        <p14:creationId xmlns:p14="http://schemas.microsoft.com/office/powerpoint/2010/main" xmlns="" val="119432886"/>
       </p:ext>
     </p:extLst>
   </p:cSld>
@@ -37795,7 +38560,7 @@
           <a:blip r:embed="rId2" cstate="print">
             <a:extLst>
               <a:ext uri="{28A0092B-C50C-407E-A947-70E740481C1C}">
-                <a14:useLocalDpi xmlns="" xmlns:a14="http://schemas.microsoft.com/office/drawing/2010/main" val="0"/>
+                <a14:useLocalDpi xmlns:a14="http://schemas.microsoft.com/office/drawing/2010/main" xmlns="" val="0"/>
               </a:ext>
             </a:extLst>
           </a:blip>
@@ -37815,7 +38580,7 @@
           <a:noFill/>
           <a:extLst>
             <a:ext uri="{909E8E84-426E-40DD-AFC4-6F175D3DCCD1}">
-              <a14:hiddenFill xmlns="" xmlns:a14="http://schemas.microsoft.com/office/drawing/2010/main">
+              <a14:hiddenFill xmlns:a14="http://schemas.microsoft.com/office/drawing/2010/main" xmlns="">
                 <a:solidFill>
                   <a:srgbClr val="FFFFFF"/>
                 </a:solidFill>
@@ -37836,7 +38601,7 @@
           <a:blip r:embed="rId3" cstate="print">
             <a:extLst>
               <a:ext uri="{28A0092B-C50C-407E-A947-70E740481C1C}">
-                <a14:useLocalDpi xmlns="" xmlns:a14="http://schemas.microsoft.com/office/drawing/2010/main" val="0"/>
+                <a14:useLocalDpi xmlns:a14="http://schemas.microsoft.com/office/drawing/2010/main" xmlns="" val="0"/>
               </a:ext>
             </a:extLst>
           </a:blip>
@@ -37856,7 +38621,7 @@
           <a:noFill/>
           <a:extLst>
             <a:ext uri="{909E8E84-426E-40DD-AFC4-6F175D3DCCD1}">
-              <a14:hiddenFill xmlns="" xmlns:a14="http://schemas.microsoft.com/office/drawing/2010/main">
+              <a14:hiddenFill xmlns:a14="http://schemas.microsoft.com/office/drawing/2010/main" xmlns="">
                 <a:solidFill>
                   <a:srgbClr val="FFFFFF"/>
                 </a:solidFill>
@@ -37868,7 +38633,7 @@
     </p:spTree>
     <p:extLst>
       <p:ext uri="{BB962C8B-B14F-4D97-AF65-F5344CB8AC3E}">
-        <p14:creationId xmlns="" xmlns:p14="http://schemas.microsoft.com/office/powerpoint/2010/main" val="3537553483"/>
+        <p14:creationId xmlns:p14="http://schemas.microsoft.com/office/powerpoint/2010/main" xmlns="" val="3537553483"/>
       </p:ext>
     </p:extLst>
   </p:cSld>
@@ -38377,7 +39142,7 @@
           <a:blip r:embed="rId2" cstate="print">
             <a:extLst>
               <a:ext uri="{28A0092B-C50C-407E-A947-70E740481C1C}">
-                <a14:useLocalDpi xmlns="" xmlns:a14="http://schemas.microsoft.com/office/drawing/2010/main" val="0"/>
+                <a14:useLocalDpi xmlns:a14="http://schemas.microsoft.com/office/drawing/2010/main" xmlns="" val="0"/>
               </a:ext>
             </a:extLst>
           </a:blip>
@@ -38397,7 +39162,7 @@
           <a:noFill/>
           <a:extLst>
             <a:ext uri="{909E8E84-426E-40DD-AFC4-6F175D3DCCD1}">
-              <a14:hiddenFill xmlns="" xmlns:a14="http://schemas.microsoft.com/office/drawing/2010/main">
+              <a14:hiddenFill xmlns:a14="http://schemas.microsoft.com/office/drawing/2010/main" xmlns="">
                 <a:solidFill>
                   <a:srgbClr val="FFFFFF"/>
                 </a:solidFill>
@@ -38418,7 +39183,7 @@
           <a:blip r:embed="rId3" cstate="print">
             <a:extLst>
               <a:ext uri="{28A0092B-C50C-407E-A947-70E740481C1C}">
-                <a14:useLocalDpi xmlns="" xmlns:a14="http://schemas.microsoft.com/office/drawing/2010/main" val="0"/>
+                <a14:useLocalDpi xmlns:a14="http://schemas.microsoft.com/office/drawing/2010/main" xmlns="" val="0"/>
               </a:ext>
             </a:extLst>
           </a:blip>
@@ -38438,7 +39203,7 @@
           <a:noFill/>
           <a:extLst>
             <a:ext uri="{909E8E84-426E-40DD-AFC4-6F175D3DCCD1}">
-              <a14:hiddenFill xmlns="" xmlns:a14="http://schemas.microsoft.com/office/drawing/2010/main">
+              <a14:hiddenFill xmlns:a14="http://schemas.microsoft.com/office/drawing/2010/main" xmlns="">
                 <a:solidFill>
                   <a:srgbClr val="FFFFFF"/>
                 </a:solidFill>
@@ -38561,7 +39326,7 @@
     </p:spTree>
     <p:extLst>
       <p:ext uri="{BB962C8B-B14F-4D97-AF65-F5344CB8AC3E}">
-        <p14:creationId xmlns="" xmlns:p14="http://schemas.microsoft.com/office/powerpoint/2010/main" val="2857880001"/>
+        <p14:creationId xmlns:p14="http://schemas.microsoft.com/office/powerpoint/2010/main" xmlns="" val="2857880001"/>
       </p:ext>
     </p:extLst>
   </p:cSld>
@@ -38985,7 +39750,7 @@
           <a:blip r:embed="rId2" cstate="print">
             <a:extLst>
               <a:ext uri="{28A0092B-C50C-407E-A947-70E740481C1C}">
-                <a14:useLocalDpi xmlns="" xmlns:a14="http://schemas.microsoft.com/office/drawing/2010/main" val="0"/>
+                <a14:useLocalDpi xmlns:a14="http://schemas.microsoft.com/office/drawing/2010/main" xmlns="" val="0"/>
               </a:ext>
             </a:extLst>
           </a:blip>
@@ -39005,7 +39770,7 @@
           <a:noFill/>
           <a:extLst>
             <a:ext uri="{909E8E84-426E-40DD-AFC4-6F175D3DCCD1}">
-              <a14:hiddenFill xmlns="" xmlns:a14="http://schemas.microsoft.com/office/drawing/2010/main">
+              <a14:hiddenFill xmlns:a14="http://schemas.microsoft.com/office/drawing/2010/main" xmlns="">
                 <a:solidFill>
                   <a:srgbClr val="FFFFFF"/>
                 </a:solidFill>
@@ -39035,7 +39800,7 @@
         </p:spPr>
         <p:txBody>
           <a:bodyPr vert="horz" lIns="91440" tIns="45720" rIns="91440" bIns="45720" rtlCol="0">
-            <a:normAutofit/>
+            <a:normAutofit lnSpcReduction="10000"/>
           </a:bodyPr>
           <a:lstStyle>
             <a:lvl1pPr marL="342900" indent="-274320" algn="l" defTabSz="914400" rtl="0" eaLnBrk="1" latinLnBrk="0" hangingPunct="1">
@@ -39247,17 +40012,87 @@
                   </a:outerShdw>
                 </a:effectLst>
               </a:rPr>
-              <a:t>COMING S.A.</a:t>
+              <a:t>COMING S.A</a:t>
             </a:r>
+            <a:r>
+              <a:rPr lang="es-ES" sz="4000" b="1" dirty="0" smtClean="0">
+                <a:ln w="12700">
+                  <a:solidFill>
+                    <a:schemeClr val="tx2">
+                      <a:satMod val="155000"/>
+                    </a:schemeClr>
+                  </a:solidFill>
+                  <a:prstDash val="solid"/>
+                </a:ln>
+                <a:solidFill>
+                  <a:schemeClr val="bg2">
+                    <a:tint val="85000"/>
+                    <a:satMod val="155000"/>
+                  </a:schemeClr>
+                </a:solidFill>
+                <a:effectLst>
+                  <a:outerShdw blurRad="41275" dist="20320" dir="1800000" algn="tl" rotWithShape="0">
+                    <a:srgbClr val="000000">
+                      <a:alpha val="40000"/>
+                    </a:srgbClr>
+                  </a:outerShdw>
+                </a:effectLst>
+              </a:rPr>
+              <a:t>.</a:t>
+            </a:r>
+            <a:br>
+              <a:rPr lang="es-ES" sz="4000" b="1" dirty="0" smtClean="0">
+                <a:ln w="12700">
+                  <a:solidFill>
+                    <a:schemeClr val="tx2">
+                      <a:satMod val="155000"/>
+                    </a:schemeClr>
+                  </a:solidFill>
+                  <a:prstDash val="solid"/>
+                </a:ln>
+                <a:solidFill>
+                  <a:schemeClr val="bg2">
+                    <a:tint val="85000"/>
+                    <a:satMod val="155000"/>
+                  </a:schemeClr>
+                </a:solidFill>
+                <a:effectLst>
+                  <a:outerShdw blurRad="41275" dist="20320" dir="1800000" algn="tl" rotWithShape="0">
+                    <a:srgbClr val="000000">
+                      <a:alpha val="40000"/>
+                    </a:srgbClr>
+                  </a:outerShdw>
+                </a:effectLst>
+              </a:rPr>
+            </a:br>
+            <a:endParaRPr lang="es-ES" sz="4000" b="1" dirty="0" smtClean="0">
+              <a:ln w="12700">
+                <a:solidFill>
+                  <a:schemeClr val="tx2">
+                    <a:satMod val="155000"/>
+                  </a:schemeClr>
+                </a:solidFill>
+                <a:prstDash val="solid"/>
+              </a:ln>
+              <a:solidFill>
+                <a:schemeClr val="bg2">
+                  <a:tint val="85000"/>
+                  <a:satMod val="155000"/>
+                </a:schemeClr>
+              </a:solidFill>
+              <a:effectLst>
+                <a:outerShdw blurRad="41275" dist="20320" dir="1800000" algn="tl" rotWithShape="0">
+                  <a:srgbClr val="000000">
+                    <a:alpha val="40000"/>
+                  </a:srgbClr>
+                </a:outerShdw>
+              </a:effectLst>
+            </a:endParaRPr>
           </a:p>
           <a:p>
             <a:r>
               <a:rPr lang="es-AR" sz="1800" dirty="0" smtClean="0"/>
-              <a:t>Es una empresa de soluciones en ingeniería y telecomunicaciones</a:t>
-            </a:r>
-            <a:r>
-              <a:rPr lang="es-AR" sz="1800" dirty="0" smtClean="0"/>
-              <a:t>.</a:t>
+              <a:t>Es una empresa de soluciones en ingeniería y telecomunicaciones.</a:t>
             </a:r>
           </a:p>
           <a:p>
@@ -39279,11 +40114,7 @@
           <a:p>
             <a:r>
               <a:rPr lang="es-AR" sz="1800" dirty="0" smtClean="0"/>
-              <a:t>En 1995 ya incursionaron en telefonía</a:t>
-            </a:r>
-            <a:r>
-              <a:rPr lang="es-AR" sz="1800" dirty="0" smtClean="0"/>
-              <a:t>.</a:t>
+              <a:t>En 1995 ya incursionaron en telefonía.</a:t>
             </a:r>
           </a:p>
           <a:p>
@@ -39292,11 +40123,7 @@
           <a:p>
             <a:r>
               <a:rPr lang="es-AR" sz="1800" dirty="0" smtClean="0"/>
-              <a:t>Especializado </a:t>
-            </a:r>
-            <a:r>
-              <a:rPr lang="es-AR" sz="1800" dirty="0" smtClean="0"/>
-              <a:t>en telecomunicaciones para celulares.</a:t>
+              <a:t>Especializado en telecomunicaciones para celulares.</a:t>
             </a:r>
           </a:p>
           <a:p>
@@ -39316,7 +40143,7 @@
           <a:blip r:embed="rId3" cstate="print">
             <a:extLst>
               <a:ext uri="{28A0092B-C50C-407E-A947-70E740481C1C}">
-                <a14:useLocalDpi xmlns="" xmlns:a14="http://schemas.microsoft.com/office/drawing/2010/main" val="0"/>
+                <a14:useLocalDpi xmlns:a14="http://schemas.microsoft.com/office/drawing/2010/main" xmlns="" val="0"/>
               </a:ext>
             </a:extLst>
           </a:blip>
@@ -39336,7 +40163,7 @@
           <a:noFill/>
           <a:extLst>
             <a:ext uri="{909E8E84-426E-40DD-AFC4-6F175D3DCCD1}">
-              <a14:hiddenFill xmlns="" xmlns:a14="http://schemas.microsoft.com/office/drawing/2010/main">
+              <a14:hiddenFill xmlns:a14="http://schemas.microsoft.com/office/drawing/2010/main" xmlns="">
                 <a:solidFill>
                   <a:srgbClr val="FFFFFF"/>
                 </a:solidFill>
@@ -39459,7 +40286,7 @@
     </p:spTree>
     <p:extLst>
       <p:ext uri="{BB962C8B-B14F-4D97-AF65-F5344CB8AC3E}">
-        <p14:creationId xmlns="" xmlns:p14="http://schemas.microsoft.com/office/powerpoint/2010/main" val="2421466572"/>
+        <p14:creationId xmlns:p14="http://schemas.microsoft.com/office/powerpoint/2010/main" xmlns="" val="2421466572"/>
       </p:ext>
     </p:extLst>
   </p:cSld>
@@ -39696,7 +40523,7 @@
                             </p:stCondLst>
                             <p:childTnLst>
                               <p:par>
-                                <p:cTn id="17" presetID="21" presetClass="entr" presetSubtype="1" fill="hold" nodeType="clickEffect">
+                                <p:cTn id="17" presetID="2" presetClass="entr" presetSubtype="4" fill="hold" nodeType="clickEffect">
                                   <p:stCondLst>
                                     <p:cond delay="0"/>
                                   </p:stCondLst>
@@ -39704,6 +40531,109 @@
                                     <p:set>
                                       <p:cBhvr>
                                         <p:cTn id="18" dur="1" fill="hold">
+                                          <p:stCondLst>
+                                            <p:cond delay="0"/>
+                                          </p:stCondLst>
+                                        </p:cTn>
+                                        <p:tgtEl>
+                                          <p:spTgt spid="7">
+                                            <p:txEl>
+                                              <p:pRg st="6" end="6"/>
+                                            </p:txEl>
+                                          </p:spTgt>
+                                        </p:tgtEl>
+                                        <p:attrNameLst>
+                                          <p:attrName>style.visibility</p:attrName>
+                                        </p:attrNameLst>
+                                      </p:cBhvr>
+                                      <p:to>
+                                        <p:strVal val="visible"/>
+                                      </p:to>
+                                    </p:set>
+                                    <p:anim calcmode="lin" valueType="num">
+                                      <p:cBhvr additive="base">
+                                        <p:cTn id="19" dur="500" fill="hold"/>
+                                        <p:tgtEl>
+                                          <p:spTgt spid="7">
+                                            <p:txEl>
+                                              <p:pRg st="6" end="6"/>
+                                            </p:txEl>
+                                          </p:spTgt>
+                                        </p:tgtEl>
+                                        <p:attrNameLst>
+                                          <p:attrName>ppt_x</p:attrName>
+                                        </p:attrNameLst>
+                                      </p:cBhvr>
+                                      <p:tavLst>
+                                        <p:tav tm="0">
+                                          <p:val>
+                                            <p:strVal val="#ppt_x"/>
+                                          </p:val>
+                                        </p:tav>
+                                        <p:tav tm="100000">
+                                          <p:val>
+                                            <p:strVal val="#ppt_x"/>
+                                          </p:val>
+                                        </p:tav>
+                                      </p:tavLst>
+                                    </p:anim>
+                                    <p:anim calcmode="lin" valueType="num">
+                                      <p:cBhvr additive="base">
+                                        <p:cTn id="20" dur="500" fill="hold"/>
+                                        <p:tgtEl>
+                                          <p:spTgt spid="7">
+                                            <p:txEl>
+                                              <p:pRg st="6" end="6"/>
+                                            </p:txEl>
+                                          </p:spTgt>
+                                        </p:tgtEl>
+                                        <p:attrNameLst>
+                                          <p:attrName>ppt_y</p:attrName>
+                                        </p:attrNameLst>
+                                      </p:cBhvr>
+                                      <p:tavLst>
+                                        <p:tav tm="0">
+                                          <p:val>
+                                            <p:strVal val="1+#ppt_h/2"/>
+                                          </p:val>
+                                        </p:tav>
+                                        <p:tav tm="100000">
+                                          <p:val>
+                                            <p:strVal val="#ppt_y"/>
+                                          </p:val>
+                                        </p:tav>
+                                      </p:tavLst>
+                                    </p:anim>
+                                  </p:childTnLst>
+                                </p:cTn>
+                              </p:par>
+                            </p:childTnLst>
+                          </p:cTn>
+                        </p:par>
+                      </p:childTnLst>
+                    </p:cTn>
+                  </p:par>
+                  <p:par>
+                    <p:cTn id="21" fill="hold">
+                      <p:stCondLst>
+                        <p:cond delay="indefinite"/>
+                      </p:stCondLst>
+                      <p:childTnLst>
+                        <p:par>
+                          <p:cTn id="22" fill="hold">
+                            <p:stCondLst>
+                              <p:cond delay="0"/>
+                            </p:stCondLst>
+                            <p:childTnLst>
+                              <p:par>
+                                <p:cTn id="23" presetID="2" presetClass="entr" presetSubtype="4" fill="hold" nodeType="clickEffect">
+                                  <p:stCondLst>
+                                    <p:cond delay="0"/>
+                                  </p:stCondLst>
+                                  <p:childTnLst>
+                                    <p:set>
+                                      <p:cBhvr>
+                                        <p:cTn id="24" dur="1" fill="hold">
                                           <p:stCondLst>
                                             <p:cond delay="0"/>
                                           </p:stCondLst>
@@ -39723,9 +40653,9 @@
                                         <p:strVal val="visible"/>
                                       </p:to>
                                     </p:set>
-                                    <p:animEffect transition="in" filter="wheel(1)">
-                                      <p:cBhvr>
-                                        <p:cTn id="19" dur="2000"/>
+                                    <p:anim calcmode="lin" valueType="num">
+                                      <p:cBhvr additive="base">
+                                        <p:cTn id="25" dur="500" fill="hold"/>
                                         <p:tgtEl>
                                           <p:spTgt spid="7">
                                             <p:txEl>
@@ -39733,8 +40663,50 @@
                                             </p:txEl>
                                           </p:spTgt>
                                         </p:tgtEl>
+                                        <p:attrNameLst>
+                                          <p:attrName>ppt_x</p:attrName>
+                                        </p:attrNameLst>
                                       </p:cBhvr>
-                                    </p:animEffect>
+                                      <p:tavLst>
+                                        <p:tav tm="0">
+                                          <p:val>
+                                            <p:strVal val="#ppt_x"/>
+                                          </p:val>
+                                        </p:tav>
+                                        <p:tav tm="100000">
+                                          <p:val>
+                                            <p:strVal val="#ppt_x"/>
+                                          </p:val>
+                                        </p:tav>
+                                      </p:tavLst>
+                                    </p:anim>
+                                    <p:anim calcmode="lin" valueType="num">
+                                      <p:cBhvr additive="base">
+                                        <p:cTn id="26" dur="500" fill="hold"/>
+                                        <p:tgtEl>
+                                          <p:spTgt spid="7">
+                                            <p:txEl>
+                                              <p:pRg st="8" end="8"/>
+                                            </p:txEl>
+                                          </p:spTgt>
+                                        </p:tgtEl>
+                                        <p:attrNameLst>
+                                          <p:attrName>ppt_y</p:attrName>
+                                        </p:attrNameLst>
+                                      </p:cBhvr>
+                                      <p:tavLst>
+                                        <p:tav tm="0">
+                                          <p:val>
+                                            <p:strVal val="1+#ppt_h/2"/>
+                                          </p:val>
+                                        </p:tav>
+                                        <p:tav tm="100000">
+                                          <p:val>
+                                            <p:strVal val="#ppt_y"/>
+                                          </p:val>
+                                        </p:tav>
+                                      </p:tavLst>
+                                    </p:anim>
                                   </p:childTnLst>
                                 </p:cTn>
                               </p:par>
@@ -39798,7 +40770,7 @@
           <a:blip r:embed="rId2" cstate="print">
             <a:extLst>
               <a:ext uri="{28A0092B-C50C-407E-A947-70E740481C1C}">
-                <a14:useLocalDpi xmlns="" xmlns:a14="http://schemas.microsoft.com/office/drawing/2010/main" val="0"/>
+                <a14:useLocalDpi xmlns:a14="http://schemas.microsoft.com/office/drawing/2010/main" xmlns="" val="0"/>
               </a:ext>
             </a:extLst>
           </a:blip>
@@ -39818,7 +40790,7 @@
           <a:noFill/>
           <a:extLst>
             <a:ext uri="{909E8E84-426E-40DD-AFC4-6F175D3DCCD1}">
-              <a14:hiddenFill xmlns="" xmlns:a14="http://schemas.microsoft.com/office/drawing/2010/main">
+              <a14:hiddenFill xmlns:a14="http://schemas.microsoft.com/office/drawing/2010/main" xmlns="">
                 <a:solidFill>
                   <a:srgbClr val="FFFFFF"/>
                 </a:solidFill>
@@ -40107,7 +41079,7 @@
           <a:blip r:embed="rId4" cstate="print">
             <a:extLst>
               <a:ext uri="{28A0092B-C50C-407E-A947-70E740481C1C}">
-                <a14:useLocalDpi xmlns="" xmlns:a14="http://schemas.microsoft.com/office/drawing/2010/main" val="0"/>
+                <a14:useLocalDpi xmlns:a14="http://schemas.microsoft.com/office/drawing/2010/main" xmlns="" val="0"/>
               </a:ext>
             </a:extLst>
           </a:blip>
@@ -40127,7 +41099,7 @@
           <a:noFill/>
           <a:extLst>
             <a:ext uri="{909E8E84-426E-40DD-AFC4-6F175D3DCCD1}">
-              <a14:hiddenFill xmlns="" xmlns:a14="http://schemas.microsoft.com/office/drawing/2010/main">
+              <a14:hiddenFill xmlns:a14="http://schemas.microsoft.com/office/drawing/2010/main" xmlns="">
                 <a:solidFill>
                   <a:srgbClr val="FFFFFF"/>
                 </a:solidFill>
@@ -40288,7 +41260,7 @@
     </p:spTree>
     <p:extLst>
       <p:ext uri="{BB962C8B-B14F-4D97-AF65-F5344CB8AC3E}">
-        <p14:creationId xmlns="" xmlns:p14="http://schemas.microsoft.com/office/powerpoint/2010/main" val="419306505"/>
+        <p14:creationId xmlns:p14="http://schemas.microsoft.com/office/powerpoint/2010/main" xmlns="" val="419306505"/>
       </p:ext>
     </p:extLst>
   </p:cSld>
@@ -40402,7 +41374,7 @@
           <p:nvPr>
             <p:extLst>
               <p:ext uri="{D42A27DB-BD31-4B8C-83A1-F6EECF244321}">
-                <p14:modId xmlns="" xmlns:p14="http://schemas.microsoft.com/office/powerpoint/2010/main" val="899372415"/>
+                <p14:modId xmlns:p14="http://schemas.microsoft.com/office/powerpoint/2010/main" xmlns="" val="899372415"/>
               </p:ext>
             </p:extLst>
           </p:nvPr>
@@ -40426,10 +41398,10 @@
           <p:nvPr/>
         </p:nvPicPr>
         <p:blipFill>
-          <a:blip r:embed="rId6" cstate="print">
+          <a:blip r:embed="rId7" cstate="print">
             <a:extLst>
               <a:ext uri="{28A0092B-C50C-407E-A947-70E740481C1C}">
-                <a14:useLocalDpi xmlns="" xmlns:a14="http://schemas.microsoft.com/office/drawing/2010/main" val="0"/>
+                <a14:useLocalDpi xmlns:a14="http://schemas.microsoft.com/office/drawing/2010/main" xmlns="" val="0"/>
               </a:ext>
             </a:extLst>
           </a:blip>
@@ -40449,7 +41421,7 @@
           <a:noFill/>
           <a:extLst>
             <a:ext uri="{909E8E84-426E-40DD-AFC4-6F175D3DCCD1}">
-              <a14:hiddenFill xmlns="" xmlns:a14="http://schemas.microsoft.com/office/drawing/2010/main">
+              <a14:hiddenFill xmlns:a14="http://schemas.microsoft.com/office/drawing/2010/main" xmlns="">
                 <a:solidFill>
                   <a:srgbClr val="FFFFFF"/>
                 </a:solidFill>
@@ -40467,10 +41439,10 @@
           <p:nvPr/>
         </p:nvPicPr>
         <p:blipFill>
-          <a:blip r:embed="rId7" cstate="print">
+          <a:blip r:embed="rId8" cstate="print">
             <a:extLst>
               <a:ext uri="{28A0092B-C50C-407E-A947-70E740481C1C}">
-                <a14:useLocalDpi xmlns="" xmlns:a14="http://schemas.microsoft.com/office/drawing/2010/main" val="0"/>
+                <a14:useLocalDpi xmlns:a14="http://schemas.microsoft.com/office/drawing/2010/main" xmlns="" val="0"/>
               </a:ext>
             </a:extLst>
           </a:blip>
@@ -40490,7 +41462,7 @@
           <a:noFill/>
           <a:extLst>
             <a:ext uri="{909E8E84-426E-40DD-AFC4-6F175D3DCCD1}">
-              <a14:hiddenFill xmlns="" xmlns:a14="http://schemas.microsoft.com/office/drawing/2010/main">
+              <a14:hiddenFill xmlns:a14="http://schemas.microsoft.com/office/drawing/2010/main" xmlns="">
                 <a:solidFill>
                   <a:srgbClr val="FFFFFF"/>
                 </a:solidFill>
@@ -40502,7 +41474,7 @@
     </p:spTree>
     <p:extLst>
       <p:ext uri="{BB962C8B-B14F-4D97-AF65-F5344CB8AC3E}">
-        <p14:creationId xmlns="" xmlns:p14="http://schemas.microsoft.com/office/powerpoint/2010/main" val="1218708985"/>
+        <p14:creationId xmlns:p14="http://schemas.microsoft.com/office/powerpoint/2010/main" xmlns="" val="1218708985"/>
       </p:ext>
     </p:extLst>
   </p:cSld>
@@ -40598,7 +41570,7 @@
           <a:blip r:embed="rId3" cstate="print">
             <a:extLst>
               <a:ext uri="{28A0092B-C50C-407E-A947-70E740481C1C}">
-                <a14:useLocalDpi xmlns="" xmlns:a14="http://schemas.microsoft.com/office/drawing/2010/main" val="0"/>
+                <a14:useLocalDpi xmlns:a14="http://schemas.microsoft.com/office/drawing/2010/main" xmlns="" val="0"/>
               </a:ext>
             </a:extLst>
           </a:blip>
@@ -40618,7 +41590,7 @@
           <a:noFill/>
           <a:extLst>
             <a:ext uri="{909E8E84-426E-40DD-AFC4-6F175D3DCCD1}">
-              <a14:hiddenFill xmlns="" xmlns:a14="http://schemas.microsoft.com/office/drawing/2010/main">
+              <a14:hiddenFill xmlns:a14="http://schemas.microsoft.com/office/drawing/2010/main" xmlns="">
                 <a:solidFill>
                   <a:srgbClr val="FFFFFF"/>
                 </a:solidFill>
@@ -40639,7 +41611,7 @@
           <a:blip r:embed="rId4" cstate="print">
             <a:extLst>
               <a:ext uri="{28A0092B-C50C-407E-A947-70E740481C1C}">
-                <a14:useLocalDpi xmlns="" xmlns:a14="http://schemas.microsoft.com/office/drawing/2010/main" val="0"/>
+                <a14:useLocalDpi xmlns:a14="http://schemas.microsoft.com/office/drawing/2010/main" xmlns="" val="0"/>
               </a:ext>
             </a:extLst>
           </a:blip>
@@ -40659,7 +41631,7 @@
           <a:noFill/>
           <a:extLst>
             <a:ext uri="{909E8E84-426E-40DD-AFC4-6F175D3DCCD1}">
-              <a14:hiddenFill xmlns="" xmlns:a14="http://schemas.microsoft.com/office/drawing/2010/main">
+              <a14:hiddenFill xmlns:a14="http://schemas.microsoft.com/office/drawing/2010/main" xmlns="">
                 <a:solidFill>
                   <a:srgbClr val="FFFFFF"/>
                 </a:solidFill>
@@ -41084,7 +42056,7 @@
     </p:spTree>
     <p:extLst>
       <p:ext uri="{BB962C8B-B14F-4D97-AF65-F5344CB8AC3E}">
-        <p14:creationId xmlns="" xmlns:p14="http://schemas.microsoft.com/office/powerpoint/2010/main" val="1218708985"/>
+        <p14:creationId xmlns:p14="http://schemas.microsoft.com/office/powerpoint/2010/main" xmlns="" val="1218708985"/>
       </p:ext>
     </p:extLst>
   </p:cSld>
@@ -41115,7 +42087,7 @@
                             </p:stCondLst>
                             <p:childTnLst>
                               <p:par>
-                                <p:cTn id="5" presetID="26" presetClass="entr" presetSubtype="0" fill="hold" nodeType="clickEffect">
+                                <p:cTn id="5" presetID="26" presetClass="entr" presetSubtype="0" fill="hold" grpId="0" nodeType="clickEffect">
                                   <p:stCondLst>
                                     <p:cond delay="0"/>
                                   </p:stCondLst>
@@ -41128,11 +42100,7 @@
                                           </p:stCondLst>
                                         </p:cTn>
                                         <p:tgtEl>
-                                          <p:spTgt spid="8">
-                                            <p:txEl>
-                                              <p:pRg st="1" end="1"/>
-                                            </p:txEl>
-                                          </p:spTgt>
+                                          <p:spTgt spid="8"/>
                                         </p:tgtEl>
                                         <p:attrNameLst>
                                           <p:attrName>style.visibility</p:attrName>
@@ -41150,11 +42118,7 @@
                                           </p:stCondLst>
                                         </p:cTn>
                                         <p:tgtEl>
-                                          <p:spTgt spid="8">
-                                            <p:txEl>
-                                              <p:pRg st="1" end="1"/>
-                                            </p:txEl>
-                                          </p:spTgt>
+                                          <p:spTgt spid="8"/>
                                         </p:tgtEl>
                                       </p:cBhvr>
                                     </p:animEffect>
@@ -41166,11 +42130,7 @@
                                           </p:stCondLst>
                                         </p:cTn>
                                         <p:tgtEl>
-                                          <p:spTgt spid="8">
-                                            <p:txEl>
-                                              <p:pRg st="1" end="1"/>
-                                            </p:txEl>
-                                          </p:spTgt>
+                                          <p:spTgt spid="8"/>
                                         </p:tgtEl>
                                         <p:attrNameLst>
                                           <p:attrName>ppt_x</p:attrName>
@@ -41197,11 +42157,7 @@
                                           </p:stCondLst>
                                         </p:cTn>
                                         <p:tgtEl>
-                                          <p:spTgt spid="8">
-                                            <p:txEl>
-                                              <p:pRg st="1" end="1"/>
-                                            </p:txEl>
-                                          </p:spTgt>
+                                          <p:spTgt spid="8"/>
                                         </p:tgtEl>
                                         <p:attrNameLst>
                                           <p:attrName>ppt_y</p:attrName>
@@ -41228,11 +42184,7 @@
                                           </p:stCondLst>
                                         </p:cTn>
                                         <p:tgtEl>
-                                          <p:spTgt spid="8">
-                                            <p:txEl>
-                                              <p:pRg st="1" end="1"/>
-                                            </p:txEl>
-                                          </p:spTgt>
+                                          <p:spTgt spid="8"/>
                                         </p:tgtEl>
                                         <p:attrNameLst>
                                           <p:attrName>ppt_y</p:attrName>
@@ -41259,11 +42211,7 @@
                                           </p:stCondLst>
                                         </p:cTn>
                                         <p:tgtEl>
-                                          <p:spTgt spid="8">
-                                            <p:txEl>
-                                              <p:pRg st="1" end="1"/>
-                                            </p:txEl>
-                                          </p:spTgt>
+                                          <p:spTgt spid="8"/>
                                         </p:tgtEl>
                                         <p:attrNameLst>
                                           <p:attrName>ppt_y</p:attrName>
@@ -41290,11 +42238,7 @@
                                           </p:stCondLst>
                                         </p:cTn>
                                         <p:tgtEl>
-                                          <p:spTgt spid="8">
-                                            <p:txEl>
-                                              <p:pRg st="1" end="1"/>
-                                            </p:txEl>
-                                          </p:spTgt>
+                                          <p:spTgt spid="8"/>
                                         </p:tgtEl>
                                         <p:attrNameLst>
                                           <p:attrName>ppt_y</p:attrName>
@@ -41321,11 +42265,7 @@
                                           </p:stCondLst>
                                         </p:cTn>
                                         <p:tgtEl>
-                                          <p:spTgt spid="8">
-                                            <p:txEl>
-                                              <p:pRg st="1" end="1"/>
-                                            </p:txEl>
-                                          </p:spTgt>
+                                          <p:spTgt spid="8"/>
                                         </p:tgtEl>
                                       </p:cBhvr>
                                       <p:to x="100000" y="60000"/>
@@ -41338,11 +42278,7 @@
                                           </p:stCondLst>
                                         </p:cTn>
                                         <p:tgtEl>
-                                          <p:spTgt spid="8">
-                                            <p:txEl>
-                                              <p:pRg st="1" end="1"/>
-                                            </p:txEl>
-                                          </p:spTgt>
+                                          <p:spTgt spid="8"/>
                                         </p:tgtEl>
                                       </p:cBhvr>
                                       <p:to x="100000" y="100000"/>
@@ -41355,11 +42291,7 @@
                                           </p:stCondLst>
                                         </p:cTn>
                                         <p:tgtEl>
-                                          <p:spTgt spid="8">
-                                            <p:txEl>
-                                              <p:pRg st="1" end="1"/>
-                                            </p:txEl>
-                                          </p:spTgt>
+                                          <p:spTgt spid="8"/>
                                         </p:tgtEl>
                                       </p:cBhvr>
                                       <p:to x="100000" y="80000"/>
@@ -41372,11 +42304,7 @@
                                           </p:stCondLst>
                                         </p:cTn>
                                         <p:tgtEl>
-                                          <p:spTgt spid="8">
-                                            <p:txEl>
-                                              <p:pRg st="1" end="1"/>
-                                            </p:txEl>
-                                          </p:spTgt>
+                                          <p:spTgt spid="8"/>
                                         </p:tgtEl>
                                       </p:cBhvr>
                                       <p:to x="100000" y="100000"/>
@@ -41389,11 +42317,7 @@
                                           </p:stCondLst>
                                         </p:cTn>
                                         <p:tgtEl>
-                                          <p:spTgt spid="8">
-                                            <p:txEl>
-                                              <p:pRg st="1" end="1"/>
-                                            </p:txEl>
-                                          </p:spTgt>
+                                          <p:spTgt spid="8"/>
                                         </p:tgtEl>
                                       </p:cBhvr>
                                       <p:to x="100000" y="90000"/>
@@ -41406,11 +42330,7 @@
                                           </p:stCondLst>
                                         </p:cTn>
                                         <p:tgtEl>
-                                          <p:spTgt spid="8">
-                                            <p:txEl>
-                                              <p:pRg st="1" end="1"/>
-                                            </p:txEl>
-                                          </p:spTgt>
+                                          <p:spTgt spid="8"/>
                                         </p:tgtEl>
                                       </p:cBhvr>
                                       <p:to x="100000" y="100000"/>
@@ -41423,11 +42343,7 @@
                                           </p:stCondLst>
                                         </p:cTn>
                                         <p:tgtEl>
-                                          <p:spTgt spid="8">
-                                            <p:txEl>
-                                              <p:pRg st="1" end="1"/>
-                                            </p:txEl>
-                                          </p:spTgt>
+                                          <p:spTgt spid="8"/>
                                         </p:tgtEl>
                                       </p:cBhvr>
                                       <p:to x="100000" y="95000"/>
@@ -41440,2147 +42356,7 @@
                                           </p:stCondLst>
                                         </p:cTn>
                                         <p:tgtEl>
-                                          <p:spTgt spid="8">
-                                            <p:txEl>
-                                              <p:pRg st="1" end="1"/>
-                                            </p:txEl>
-                                          </p:spTgt>
-                                        </p:tgtEl>
-                                      </p:cBhvr>
-                                      <p:to x="100000" y="100000"/>
-                                    </p:animScale>
-                                  </p:childTnLst>
-                                </p:cTn>
-                              </p:par>
-                            </p:childTnLst>
-                          </p:cTn>
-                        </p:par>
-                      </p:childTnLst>
-                    </p:cTn>
-                  </p:par>
-                  <p:par>
-                    <p:cTn id="21" fill="hold">
-                      <p:stCondLst>
-                        <p:cond delay="indefinite"/>
-                      </p:stCondLst>
-                      <p:childTnLst>
-                        <p:par>
-                          <p:cTn id="22" fill="hold">
-                            <p:stCondLst>
-                              <p:cond delay="0"/>
-                            </p:stCondLst>
-                            <p:childTnLst>
-                              <p:par>
-                                <p:cTn id="23" presetID="26" presetClass="entr" presetSubtype="0" fill="hold" nodeType="clickEffect">
-                                  <p:stCondLst>
-                                    <p:cond delay="0"/>
-                                  </p:stCondLst>
-                                  <p:childTnLst>
-                                    <p:set>
-                                      <p:cBhvr>
-                                        <p:cTn id="24" dur="1" fill="hold">
-                                          <p:stCondLst>
-                                            <p:cond delay="0"/>
-                                          </p:stCondLst>
-                                        </p:cTn>
-                                        <p:tgtEl>
-                                          <p:spTgt spid="8">
-                                            <p:txEl>
-                                              <p:pRg st="3" end="3"/>
-                                            </p:txEl>
-                                          </p:spTgt>
-                                        </p:tgtEl>
-                                        <p:attrNameLst>
-                                          <p:attrName>style.visibility</p:attrName>
-                                        </p:attrNameLst>
-                                      </p:cBhvr>
-                                      <p:to>
-                                        <p:strVal val="visible"/>
-                                      </p:to>
-                                    </p:set>
-                                    <p:animEffect transition="in" filter="wipe(down)">
-                                      <p:cBhvr>
-                                        <p:cTn id="25" dur="580">
-                                          <p:stCondLst>
-                                            <p:cond delay="0"/>
-                                          </p:stCondLst>
-                                        </p:cTn>
-                                        <p:tgtEl>
-                                          <p:spTgt spid="8">
-                                            <p:txEl>
-                                              <p:pRg st="3" end="3"/>
-                                            </p:txEl>
-                                          </p:spTgt>
-                                        </p:tgtEl>
-                                      </p:cBhvr>
-                                    </p:animEffect>
-                                    <p:anim calcmode="lin" valueType="num">
-                                      <p:cBhvr>
-                                        <p:cTn id="26" dur="1822" tmFilter="0,0; 0.14,0.36; 0.43,0.73; 0.71,0.91; 1.0,1.0">
-                                          <p:stCondLst>
-                                            <p:cond delay="0"/>
-                                          </p:stCondLst>
-                                        </p:cTn>
-                                        <p:tgtEl>
-                                          <p:spTgt spid="8">
-                                            <p:txEl>
-                                              <p:pRg st="3" end="3"/>
-                                            </p:txEl>
-                                          </p:spTgt>
-                                        </p:tgtEl>
-                                        <p:attrNameLst>
-                                          <p:attrName>ppt_x</p:attrName>
-                                        </p:attrNameLst>
-                                      </p:cBhvr>
-                                      <p:tavLst>
-                                        <p:tav tm="0">
-                                          <p:val>
-                                            <p:strVal val="#ppt_x-0.25"/>
-                                          </p:val>
-                                        </p:tav>
-                                        <p:tav tm="100000">
-                                          <p:val>
-                                            <p:strVal val="#ppt_x"/>
-                                          </p:val>
-                                        </p:tav>
-                                      </p:tavLst>
-                                    </p:anim>
-                                    <p:anim calcmode="lin" valueType="num">
-                                      <p:cBhvr>
-                                        <p:cTn id="27" dur="664" tmFilter="0.0,0.0; 0.25,0.07; 0.50,0.2; 0.75,0.467; 1.0,1.0">
-                                          <p:stCondLst>
-                                            <p:cond delay="0"/>
-                                          </p:stCondLst>
-                                        </p:cTn>
-                                        <p:tgtEl>
-                                          <p:spTgt spid="8">
-                                            <p:txEl>
-                                              <p:pRg st="3" end="3"/>
-                                            </p:txEl>
-                                          </p:spTgt>
-                                        </p:tgtEl>
-                                        <p:attrNameLst>
-                                          <p:attrName>ppt_y</p:attrName>
-                                        </p:attrNameLst>
-                                      </p:cBhvr>
-                                      <p:tavLst>
-                                        <p:tav tm="0" fmla="#ppt_y-sin(pi*$)/3">
-                                          <p:val>
-                                            <p:fltVal val="0.5"/>
-                                          </p:val>
-                                        </p:tav>
-                                        <p:tav tm="100000">
-                                          <p:val>
-                                            <p:fltVal val="1"/>
-                                          </p:val>
-                                        </p:tav>
-                                      </p:tavLst>
-                                    </p:anim>
-                                    <p:anim calcmode="lin" valueType="num">
-                                      <p:cBhvr>
-                                        <p:cTn id="28" dur="664" tmFilter="0, 0; 0.125,0.2665; 0.25,0.4; 0.375,0.465; 0.5,0.5;  0.625,0.535; 0.75,0.6; 0.875,0.7335; 1,1">
-                                          <p:stCondLst>
-                                            <p:cond delay="664"/>
-                                          </p:stCondLst>
-                                        </p:cTn>
-                                        <p:tgtEl>
-                                          <p:spTgt spid="8">
-                                            <p:txEl>
-                                              <p:pRg st="3" end="3"/>
-                                            </p:txEl>
-                                          </p:spTgt>
-                                        </p:tgtEl>
-                                        <p:attrNameLst>
-                                          <p:attrName>ppt_y</p:attrName>
-                                        </p:attrNameLst>
-                                      </p:cBhvr>
-                                      <p:tavLst>
-                                        <p:tav tm="0" fmla="#ppt_y-sin(pi*$)/9">
-                                          <p:val>
-                                            <p:fltVal val="0"/>
-                                          </p:val>
-                                        </p:tav>
-                                        <p:tav tm="100000">
-                                          <p:val>
-                                            <p:fltVal val="1"/>
-                                          </p:val>
-                                        </p:tav>
-                                      </p:tavLst>
-                                    </p:anim>
-                                    <p:anim calcmode="lin" valueType="num">
-                                      <p:cBhvr>
-                                        <p:cTn id="29" dur="332" tmFilter="0, 0; 0.125,0.2665; 0.25,0.4; 0.375,0.465; 0.5,0.5;  0.625,0.535; 0.75,0.6; 0.875,0.7335; 1,1">
-                                          <p:stCondLst>
-                                            <p:cond delay="1324"/>
-                                          </p:stCondLst>
-                                        </p:cTn>
-                                        <p:tgtEl>
-                                          <p:spTgt spid="8">
-                                            <p:txEl>
-                                              <p:pRg st="3" end="3"/>
-                                            </p:txEl>
-                                          </p:spTgt>
-                                        </p:tgtEl>
-                                        <p:attrNameLst>
-                                          <p:attrName>ppt_y</p:attrName>
-                                        </p:attrNameLst>
-                                      </p:cBhvr>
-                                      <p:tavLst>
-                                        <p:tav tm="0" fmla="#ppt_y-sin(pi*$)/27">
-                                          <p:val>
-                                            <p:fltVal val="0"/>
-                                          </p:val>
-                                        </p:tav>
-                                        <p:tav tm="100000">
-                                          <p:val>
-                                            <p:fltVal val="1"/>
-                                          </p:val>
-                                        </p:tav>
-                                      </p:tavLst>
-                                    </p:anim>
-                                    <p:anim calcmode="lin" valueType="num">
-                                      <p:cBhvr>
-                                        <p:cTn id="30" dur="164" tmFilter="0, 0; 0.125,0.2665; 0.25,0.4; 0.375,0.465; 0.5,0.5;  0.625,0.535; 0.75,0.6; 0.875,0.7335; 1,1">
-                                          <p:stCondLst>
-                                            <p:cond delay="1656"/>
-                                          </p:stCondLst>
-                                        </p:cTn>
-                                        <p:tgtEl>
-                                          <p:spTgt spid="8">
-                                            <p:txEl>
-                                              <p:pRg st="3" end="3"/>
-                                            </p:txEl>
-                                          </p:spTgt>
-                                        </p:tgtEl>
-                                        <p:attrNameLst>
-                                          <p:attrName>ppt_y</p:attrName>
-                                        </p:attrNameLst>
-                                      </p:cBhvr>
-                                      <p:tavLst>
-                                        <p:tav tm="0" fmla="#ppt_y-sin(pi*$)/81">
-                                          <p:val>
-                                            <p:fltVal val="0"/>
-                                          </p:val>
-                                        </p:tav>
-                                        <p:tav tm="100000">
-                                          <p:val>
-                                            <p:fltVal val="1"/>
-                                          </p:val>
-                                        </p:tav>
-                                      </p:tavLst>
-                                    </p:anim>
-                                    <p:animScale>
-                                      <p:cBhvr>
-                                        <p:cTn id="31" dur="26">
-                                          <p:stCondLst>
-                                            <p:cond delay="650"/>
-                                          </p:stCondLst>
-                                        </p:cTn>
-                                        <p:tgtEl>
-                                          <p:spTgt spid="8">
-                                            <p:txEl>
-                                              <p:pRg st="3" end="3"/>
-                                            </p:txEl>
-                                          </p:spTgt>
-                                        </p:tgtEl>
-                                      </p:cBhvr>
-                                      <p:to x="100000" y="60000"/>
-                                    </p:animScale>
-                                    <p:animScale>
-                                      <p:cBhvr>
-                                        <p:cTn id="32" dur="166" decel="50000">
-                                          <p:stCondLst>
-                                            <p:cond delay="676"/>
-                                          </p:stCondLst>
-                                        </p:cTn>
-                                        <p:tgtEl>
-                                          <p:spTgt spid="8">
-                                            <p:txEl>
-                                              <p:pRg st="3" end="3"/>
-                                            </p:txEl>
-                                          </p:spTgt>
-                                        </p:tgtEl>
-                                      </p:cBhvr>
-                                      <p:to x="100000" y="100000"/>
-                                    </p:animScale>
-                                    <p:animScale>
-                                      <p:cBhvr>
-                                        <p:cTn id="33" dur="26">
-                                          <p:stCondLst>
-                                            <p:cond delay="1312"/>
-                                          </p:stCondLst>
-                                        </p:cTn>
-                                        <p:tgtEl>
-                                          <p:spTgt spid="8">
-                                            <p:txEl>
-                                              <p:pRg st="3" end="3"/>
-                                            </p:txEl>
-                                          </p:spTgt>
-                                        </p:tgtEl>
-                                      </p:cBhvr>
-                                      <p:to x="100000" y="80000"/>
-                                    </p:animScale>
-                                    <p:animScale>
-                                      <p:cBhvr>
-                                        <p:cTn id="34" dur="166" decel="50000">
-                                          <p:stCondLst>
-                                            <p:cond delay="1338"/>
-                                          </p:stCondLst>
-                                        </p:cTn>
-                                        <p:tgtEl>
-                                          <p:spTgt spid="8">
-                                            <p:txEl>
-                                              <p:pRg st="3" end="3"/>
-                                            </p:txEl>
-                                          </p:spTgt>
-                                        </p:tgtEl>
-                                      </p:cBhvr>
-                                      <p:to x="100000" y="100000"/>
-                                    </p:animScale>
-                                    <p:animScale>
-                                      <p:cBhvr>
-                                        <p:cTn id="35" dur="26">
-                                          <p:stCondLst>
-                                            <p:cond delay="1642"/>
-                                          </p:stCondLst>
-                                        </p:cTn>
-                                        <p:tgtEl>
-                                          <p:spTgt spid="8">
-                                            <p:txEl>
-                                              <p:pRg st="3" end="3"/>
-                                            </p:txEl>
-                                          </p:spTgt>
-                                        </p:tgtEl>
-                                      </p:cBhvr>
-                                      <p:to x="100000" y="90000"/>
-                                    </p:animScale>
-                                    <p:animScale>
-                                      <p:cBhvr>
-                                        <p:cTn id="36" dur="166" decel="50000">
-                                          <p:stCondLst>
-                                            <p:cond delay="1668"/>
-                                          </p:stCondLst>
-                                        </p:cTn>
-                                        <p:tgtEl>
-                                          <p:spTgt spid="8">
-                                            <p:txEl>
-                                              <p:pRg st="3" end="3"/>
-                                            </p:txEl>
-                                          </p:spTgt>
-                                        </p:tgtEl>
-                                      </p:cBhvr>
-                                      <p:to x="100000" y="100000"/>
-                                    </p:animScale>
-                                    <p:animScale>
-                                      <p:cBhvr>
-                                        <p:cTn id="37" dur="26">
-                                          <p:stCondLst>
-                                            <p:cond delay="1808"/>
-                                          </p:stCondLst>
-                                        </p:cTn>
-                                        <p:tgtEl>
-                                          <p:spTgt spid="8">
-                                            <p:txEl>
-                                              <p:pRg st="3" end="3"/>
-                                            </p:txEl>
-                                          </p:spTgt>
-                                        </p:tgtEl>
-                                      </p:cBhvr>
-                                      <p:to x="100000" y="95000"/>
-                                    </p:animScale>
-                                    <p:animScale>
-                                      <p:cBhvr>
-                                        <p:cTn id="38" dur="166" decel="50000">
-                                          <p:stCondLst>
-                                            <p:cond delay="1834"/>
-                                          </p:stCondLst>
-                                        </p:cTn>
-                                        <p:tgtEl>
-                                          <p:spTgt spid="8">
-                                            <p:txEl>
-                                              <p:pRg st="3" end="3"/>
-                                            </p:txEl>
-                                          </p:spTgt>
-                                        </p:tgtEl>
-                                      </p:cBhvr>
-                                      <p:to x="100000" y="100000"/>
-                                    </p:animScale>
-                                  </p:childTnLst>
-                                </p:cTn>
-                              </p:par>
-                            </p:childTnLst>
-                          </p:cTn>
-                        </p:par>
-                      </p:childTnLst>
-                    </p:cTn>
-                  </p:par>
-                  <p:par>
-                    <p:cTn id="39" fill="hold">
-                      <p:stCondLst>
-                        <p:cond delay="indefinite"/>
-                      </p:stCondLst>
-                      <p:childTnLst>
-                        <p:par>
-                          <p:cTn id="40" fill="hold">
-                            <p:stCondLst>
-                              <p:cond delay="0"/>
-                            </p:stCondLst>
-                            <p:childTnLst>
-                              <p:par>
-                                <p:cTn id="41" presetID="26" presetClass="entr" presetSubtype="0" fill="hold" nodeType="clickEffect">
-                                  <p:stCondLst>
-                                    <p:cond delay="0"/>
-                                  </p:stCondLst>
-                                  <p:childTnLst>
-                                    <p:set>
-                                      <p:cBhvr>
-                                        <p:cTn id="42" dur="1" fill="hold">
-                                          <p:stCondLst>
-                                            <p:cond delay="0"/>
-                                          </p:stCondLst>
-                                        </p:cTn>
-                                        <p:tgtEl>
-                                          <p:spTgt spid="8">
-                                            <p:txEl>
-                                              <p:pRg st="5" end="5"/>
-                                            </p:txEl>
-                                          </p:spTgt>
-                                        </p:tgtEl>
-                                        <p:attrNameLst>
-                                          <p:attrName>style.visibility</p:attrName>
-                                        </p:attrNameLst>
-                                      </p:cBhvr>
-                                      <p:to>
-                                        <p:strVal val="visible"/>
-                                      </p:to>
-                                    </p:set>
-                                    <p:animEffect transition="in" filter="wipe(down)">
-                                      <p:cBhvr>
-                                        <p:cTn id="43" dur="580">
-                                          <p:stCondLst>
-                                            <p:cond delay="0"/>
-                                          </p:stCondLst>
-                                        </p:cTn>
-                                        <p:tgtEl>
-                                          <p:spTgt spid="8">
-                                            <p:txEl>
-                                              <p:pRg st="5" end="5"/>
-                                            </p:txEl>
-                                          </p:spTgt>
-                                        </p:tgtEl>
-                                      </p:cBhvr>
-                                    </p:animEffect>
-                                    <p:anim calcmode="lin" valueType="num">
-                                      <p:cBhvr>
-                                        <p:cTn id="44" dur="1822" tmFilter="0,0; 0.14,0.36; 0.43,0.73; 0.71,0.91; 1.0,1.0">
-                                          <p:stCondLst>
-                                            <p:cond delay="0"/>
-                                          </p:stCondLst>
-                                        </p:cTn>
-                                        <p:tgtEl>
-                                          <p:spTgt spid="8">
-                                            <p:txEl>
-                                              <p:pRg st="5" end="5"/>
-                                            </p:txEl>
-                                          </p:spTgt>
-                                        </p:tgtEl>
-                                        <p:attrNameLst>
-                                          <p:attrName>ppt_x</p:attrName>
-                                        </p:attrNameLst>
-                                      </p:cBhvr>
-                                      <p:tavLst>
-                                        <p:tav tm="0">
-                                          <p:val>
-                                            <p:strVal val="#ppt_x-0.25"/>
-                                          </p:val>
-                                        </p:tav>
-                                        <p:tav tm="100000">
-                                          <p:val>
-                                            <p:strVal val="#ppt_x"/>
-                                          </p:val>
-                                        </p:tav>
-                                      </p:tavLst>
-                                    </p:anim>
-                                    <p:anim calcmode="lin" valueType="num">
-                                      <p:cBhvr>
-                                        <p:cTn id="45" dur="664" tmFilter="0.0,0.0; 0.25,0.07; 0.50,0.2; 0.75,0.467; 1.0,1.0">
-                                          <p:stCondLst>
-                                            <p:cond delay="0"/>
-                                          </p:stCondLst>
-                                        </p:cTn>
-                                        <p:tgtEl>
-                                          <p:spTgt spid="8">
-                                            <p:txEl>
-                                              <p:pRg st="5" end="5"/>
-                                            </p:txEl>
-                                          </p:spTgt>
-                                        </p:tgtEl>
-                                        <p:attrNameLst>
-                                          <p:attrName>ppt_y</p:attrName>
-                                        </p:attrNameLst>
-                                      </p:cBhvr>
-                                      <p:tavLst>
-                                        <p:tav tm="0" fmla="#ppt_y-sin(pi*$)/3">
-                                          <p:val>
-                                            <p:fltVal val="0.5"/>
-                                          </p:val>
-                                        </p:tav>
-                                        <p:tav tm="100000">
-                                          <p:val>
-                                            <p:fltVal val="1"/>
-                                          </p:val>
-                                        </p:tav>
-                                      </p:tavLst>
-                                    </p:anim>
-                                    <p:anim calcmode="lin" valueType="num">
-                                      <p:cBhvr>
-                                        <p:cTn id="46" dur="664" tmFilter="0, 0; 0.125,0.2665; 0.25,0.4; 0.375,0.465; 0.5,0.5;  0.625,0.535; 0.75,0.6; 0.875,0.7335; 1,1">
-                                          <p:stCondLst>
-                                            <p:cond delay="664"/>
-                                          </p:stCondLst>
-                                        </p:cTn>
-                                        <p:tgtEl>
-                                          <p:spTgt spid="8">
-                                            <p:txEl>
-                                              <p:pRg st="5" end="5"/>
-                                            </p:txEl>
-                                          </p:spTgt>
-                                        </p:tgtEl>
-                                        <p:attrNameLst>
-                                          <p:attrName>ppt_y</p:attrName>
-                                        </p:attrNameLst>
-                                      </p:cBhvr>
-                                      <p:tavLst>
-                                        <p:tav tm="0" fmla="#ppt_y-sin(pi*$)/9">
-                                          <p:val>
-                                            <p:fltVal val="0"/>
-                                          </p:val>
-                                        </p:tav>
-                                        <p:tav tm="100000">
-                                          <p:val>
-                                            <p:fltVal val="1"/>
-                                          </p:val>
-                                        </p:tav>
-                                      </p:tavLst>
-                                    </p:anim>
-                                    <p:anim calcmode="lin" valueType="num">
-                                      <p:cBhvr>
-                                        <p:cTn id="47" dur="332" tmFilter="0, 0; 0.125,0.2665; 0.25,0.4; 0.375,0.465; 0.5,0.5;  0.625,0.535; 0.75,0.6; 0.875,0.7335; 1,1">
-                                          <p:stCondLst>
-                                            <p:cond delay="1324"/>
-                                          </p:stCondLst>
-                                        </p:cTn>
-                                        <p:tgtEl>
-                                          <p:spTgt spid="8">
-                                            <p:txEl>
-                                              <p:pRg st="5" end="5"/>
-                                            </p:txEl>
-                                          </p:spTgt>
-                                        </p:tgtEl>
-                                        <p:attrNameLst>
-                                          <p:attrName>ppt_y</p:attrName>
-                                        </p:attrNameLst>
-                                      </p:cBhvr>
-                                      <p:tavLst>
-                                        <p:tav tm="0" fmla="#ppt_y-sin(pi*$)/27">
-                                          <p:val>
-                                            <p:fltVal val="0"/>
-                                          </p:val>
-                                        </p:tav>
-                                        <p:tav tm="100000">
-                                          <p:val>
-                                            <p:fltVal val="1"/>
-                                          </p:val>
-                                        </p:tav>
-                                      </p:tavLst>
-                                    </p:anim>
-                                    <p:anim calcmode="lin" valueType="num">
-                                      <p:cBhvr>
-                                        <p:cTn id="48" dur="164" tmFilter="0, 0; 0.125,0.2665; 0.25,0.4; 0.375,0.465; 0.5,0.5;  0.625,0.535; 0.75,0.6; 0.875,0.7335; 1,1">
-                                          <p:stCondLst>
-                                            <p:cond delay="1656"/>
-                                          </p:stCondLst>
-                                        </p:cTn>
-                                        <p:tgtEl>
-                                          <p:spTgt spid="8">
-                                            <p:txEl>
-                                              <p:pRg st="5" end="5"/>
-                                            </p:txEl>
-                                          </p:spTgt>
-                                        </p:tgtEl>
-                                        <p:attrNameLst>
-                                          <p:attrName>ppt_y</p:attrName>
-                                        </p:attrNameLst>
-                                      </p:cBhvr>
-                                      <p:tavLst>
-                                        <p:tav tm="0" fmla="#ppt_y-sin(pi*$)/81">
-                                          <p:val>
-                                            <p:fltVal val="0"/>
-                                          </p:val>
-                                        </p:tav>
-                                        <p:tav tm="100000">
-                                          <p:val>
-                                            <p:fltVal val="1"/>
-                                          </p:val>
-                                        </p:tav>
-                                      </p:tavLst>
-                                    </p:anim>
-                                    <p:animScale>
-                                      <p:cBhvr>
-                                        <p:cTn id="49" dur="26">
-                                          <p:stCondLst>
-                                            <p:cond delay="650"/>
-                                          </p:stCondLst>
-                                        </p:cTn>
-                                        <p:tgtEl>
-                                          <p:spTgt spid="8">
-                                            <p:txEl>
-                                              <p:pRg st="5" end="5"/>
-                                            </p:txEl>
-                                          </p:spTgt>
-                                        </p:tgtEl>
-                                      </p:cBhvr>
-                                      <p:to x="100000" y="60000"/>
-                                    </p:animScale>
-                                    <p:animScale>
-                                      <p:cBhvr>
-                                        <p:cTn id="50" dur="166" decel="50000">
-                                          <p:stCondLst>
-                                            <p:cond delay="676"/>
-                                          </p:stCondLst>
-                                        </p:cTn>
-                                        <p:tgtEl>
-                                          <p:spTgt spid="8">
-                                            <p:txEl>
-                                              <p:pRg st="5" end="5"/>
-                                            </p:txEl>
-                                          </p:spTgt>
-                                        </p:tgtEl>
-                                      </p:cBhvr>
-                                      <p:to x="100000" y="100000"/>
-                                    </p:animScale>
-                                    <p:animScale>
-                                      <p:cBhvr>
-                                        <p:cTn id="51" dur="26">
-                                          <p:stCondLst>
-                                            <p:cond delay="1312"/>
-                                          </p:stCondLst>
-                                        </p:cTn>
-                                        <p:tgtEl>
-                                          <p:spTgt spid="8">
-                                            <p:txEl>
-                                              <p:pRg st="5" end="5"/>
-                                            </p:txEl>
-                                          </p:spTgt>
-                                        </p:tgtEl>
-                                      </p:cBhvr>
-                                      <p:to x="100000" y="80000"/>
-                                    </p:animScale>
-                                    <p:animScale>
-                                      <p:cBhvr>
-                                        <p:cTn id="52" dur="166" decel="50000">
-                                          <p:stCondLst>
-                                            <p:cond delay="1338"/>
-                                          </p:stCondLst>
-                                        </p:cTn>
-                                        <p:tgtEl>
-                                          <p:spTgt spid="8">
-                                            <p:txEl>
-                                              <p:pRg st="5" end="5"/>
-                                            </p:txEl>
-                                          </p:spTgt>
-                                        </p:tgtEl>
-                                      </p:cBhvr>
-                                      <p:to x="100000" y="100000"/>
-                                    </p:animScale>
-                                    <p:animScale>
-                                      <p:cBhvr>
-                                        <p:cTn id="53" dur="26">
-                                          <p:stCondLst>
-                                            <p:cond delay="1642"/>
-                                          </p:stCondLst>
-                                        </p:cTn>
-                                        <p:tgtEl>
-                                          <p:spTgt spid="8">
-                                            <p:txEl>
-                                              <p:pRg st="5" end="5"/>
-                                            </p:txEl>
-                                          </p:spTgt>
-                                        </p:tgtEl>
-                                      </p:cBhvr>
-                                      <p:to x="100000" y="90000"/>
-                                    </p:animScale>
-                                    <p:animScale>
-                                      <p:cBhvr>
-                                        <p:cTn id="54" dur="166" decel="50000">
-                                          <p:stCondLst>
-                                            <p:cond delay="1668"/>
-                                          </p:stCondLst>
-                                        </p:cTn>
-                                        <p:tgtEl>
-                                          <p:spTgt spid="8">
-                                            <p:txEl>
-                                              <p:pRg st="5" end="5"/>
-                                            </p:txEl>
-                                          </p:spTgt>
-                                        </p:tgtEl>
-                                      </p:cBhvr>
-                                      <p:to x="100000" y="100000"/>
-                                    </p:animScale>
-                                    <p:animScale>
-                                      <p:cBhvr>
-                                        <p:cTn id="55" dur="26">
-                                          <p:stCondLst>
-                                            <p:cond delay="1808"/>
-                                          </p:stCondLst>
-                                        </p:cTn>
-                                        <p:tgtEl>
-                                          <p:spTgt spid="8">
-                                            <p:txEl>
-                                              <p:pRg st="5" end="5"/>
-                                            </p:txEl>
-                                          </p:spTgt>
-                                        </p:tgtEl>
-                                      </p:cBhvr>
-                                      <p:to x="100000" y="95000"/>
-                                    </p:animScale>
-                                    <p:animScale>
-                                      <p:cBhvr>
-                                        <p:cTn id="56" dur="166" decel="50000">
-                                          <p:stCondLst>
-                                            <p:cond delay="1834"/>
-                                          </p:stCondLst>
-                                        </p:cTn>
-                                        <p:tgtEl>
-                                          <p:spTgt spid="8">
-                                            <p:txEl>
-                                              <p:pRg st="5" end="5"/>
-                                            </p:txEl>
-                                          </p:spTgt>
-                                        </p:tgtEl>
-                                      </p:cBhvr>
-                                      <p:to x="100000" y="100000"/>
-                                    </p:animScale>
-                                  </p:childTnLst>
-                                </p:cTn>
-                              </p:par>
-                            </p:childTnLst>
-                          </p:cTn>
-                        </p:par>
-                      </p:childTnLst>
-                    </p:cTn>
-                  </p:par>
-                  <p:par>
-                    <p:cTn id="57" fill="hold">
-                      <p:stCondLst>
-                        <p:cond delay="indefinite"/>
-                      </p:stCondLst>
-                      <p:childTnLst>
-                        <p:par>
-                          <p:cTn id="58" fill="hold">
-                            <p:stCondLst>
-                              <p:cond delay="0"/>
-                            </p:stCondLst>
-                            <p:childTnLst>
-                              <p:par>
-                                <p:cTn id="59" presetID="26" presetClass="entr" presetSubtype="0" fill="hold" nodeType="clickEffect">
-                                  <p:stCondLst>
-                                    <p:cond delay="0"/>
-                                  </p:stCondLst>
-                                  <p:childTnLst>
-                                    <p:set>
-                                      <p:cBhvr>
-                                        <p:cTn id="60" dur="1" fill="hold">
-                                          <p:stCondLst>
-                                            <p:cond delay="0"/>
-                                          </p:stCondLst>
-                                        </p:cTn>
-                                        <p:tgtEl>
-                                          <p:spTgt spid="8">
-                                            <p:txEl>
-                                              <p:pRg st="7" end="7"/>
-                                            </p:txEl>
-                                          </p:spTgt>
-                                        </p:tgtEl>
-                                        <p:attrNameLst>
-                                          <p:attrName>style.visibility</p:attrName>
-                                        </p:attrNameLst>
-                                      </p:cBhvr>
-                                      <p:to>
-                                        <p:strVal val="visible"/>
-                                      </p:to>
-                                    </p:set>
-                                    <p:animEffect transition="in" filter="wipe(down)">
-                                      <p:cBhvr>
-                                        <p:cTn id="61" dur="580">
-                                          <p:stCondLst>
-                                            <p:cond delay="0"/>
-                                          </p:stCondLst>
-                                        </p:cTn>
-                                        <p:tgtEl>
-                                          <p:spTgt spid="8">
-                                            <p:txEl>
-                                              <p:pRg st="7" end="7"/>
-                                            </p:txEl>
-                                          </p:spTgt>
-                                        </p:tgtEl>
-                                      </p:cBhvr>
-                                    </p:animEffect>
-                                    <p:anim calcmode="lin" valueType="num">
-                                      <p:cBhvr>
-                                        <p:cTn id="62" dur="1822" tmFilter="0,0; 0.14,0.36; 0.43,0.73; 0.71,0.91; 1.0,1.0">
-                                          <p:stCondLst>
-                                            <p:cond delay="0"/>
-                                          </p:stCondLst>
-                                        </p:cTn>
-                                        <p:tgtEl>
-                                          <p:spTgt spid="8">
-                                            <p:txEl>
-                                              <p:pRg st="7" end="7"/>
-                                            </p:txEl>
-                                          </p:spTgt>
-                                        </p:tgtEl>
-                                        <p:attrNameLst>
-                                          <p:attrName>ppt_x</p:attrName>
-                                        </p:attrNameLst>
-                                      </p:cBhvr>
-                                      <p:tavLst>
-                                        <p:tav tm="0">
-                                          <p:val>
-                                            <p:strVal val="#ppt_x-0.25"/>
-                                          </p:val>
-                                        </p:tav>
-                                        <p:tav tm="100000">
-                                          <p:val>
-                                            <p:strVal val="#ppt_x"/>
-                                          </p:val>
-                                        </p:tav>
-                                      </p:tavLst>
-                                    </p:anim>
-                                    <p:anim calcmode="lin" valueType="num">
-                                      <p:cBhvr>
-                                        <p:cTn id="63" dur="664" tmFilter="0.0,0.0; 0.25,0.07; 0.50,0.2; 0.75,0.467; 1.0,1.0">
-                                          <p:stCondLst>
-                                            <p:cond delay="0"/>
-                                          </p:stCondLst>
-                                        </p:cTn>
-                                        <p:tgtEl>
-                                          <p:spTgt spid="8">
-                                            <p:txEl>
-                                              <p:pRg st="7" end="7"/>
-                                            </p:txEl>
-                                          </p:spTgt>
-                                        </p:tgtEl>
-                                        <p:attrNameLst>
-                                          <p:attrName>ppt_y</p:attrName>
-                                        </p:attrNameLst>
-                                      </p:cBhvr>
-                                      <p:tavLst>
-                                        <p:tav tm="0" fmla="#ppt_y-sin(pi*$)/3">
-                                          <p:val>
-                                            <p:fltVal val="0.5"/>
-                                          </p:val>
-                                        </p:tav>
-                                        <p:tav tm="100000">
-                                          <p:val>
-                                            <p:fltVal val="1"/>
-                                          </p:val>
-                                        </p:tav>
-                                      </p:tavLst>
-                                    </p:anim>
-                                    <p:anim calcmode="lin" valueType="num">
-                                      <p:cBhvr>
-                                        <p:cTn id="64" dur="664" tmFilter="0, 0; 0.125,0.2665; 0.25,0.4; 0.375,0.465; 0.5,0.5;  0.625,0.535; 0.75,0.6; 0.875,0.7335; 1,1">
-                                          <p:stCondLst>
-                                            <p:cond delay="664"/>
-                                          </p:stCondLst>
-                                        </p:cTn>
-                                        <p:tgtEl>
-                                          <p:spTgt spid="8">
-                                            <p:txEl>
-                                              <p:pRg st="7" end="7"/>
-                                            </p:txEl>
-                                          </p:spTgt>
-                                        </p:tgtEl>
-                                        <p:attrNameLst>
-                                          <p:attrName>ppt_y</p:attrName>
-                                        </p:attrNameLst>
-                                      </p:cBhvr>
-                                      <p:tavLst>
-                                        <p:tav tm="0" fmla="#ppt_y-sin(pi*$)/9">
-                                          <p:val>
-                                            <p:fltVal val="0"/>
-                                          </p:val>
-                                        </p:tav>
-                                        <p:tav tm="100000">
-                                          <p:val>
-                                            <p:fltVal val="1"/>
-                                          </p:val>
-                                        </p:tav>
-                                      </p:tavLst>
-                                    </p:anim>
-                                    <p:anim calcmode="lin" valueType="num">
-                                      <p:cBhvr>
-                                        <p:cTn id="65" dur="332" tmFilter="0, 0; 0.125,0.2665; 0.25,0.4; 0.375,0.465; 0.5,0.5;  0.625,0.535; 0.75,0.6; 0.875,0.7335; 1,1">
-                                          <p:stCondLst>
-                                            <p:cond delay="1324"/>
-                                          </p:stCondLst>
-                                        </p:cTn>
-                                        <p:tgtEl>
-                                          <p:spTgt spid="8">
-                                            <p:txEl>
-                                              <p:pRg st="7" end="7"/>
-                                            </p:txEl>
-                                          </p:spTgt>
-                                        </p:tgtEl>
-                                        <p:attrNameLst>
-                                          <p:attrName>ppt_y</p:attrName>
-                                        </p:attrNameLst>
-                                      </p:cBhvr>
-                                      <p:tavLst>
-                                        <p:tav tm="0" fmla="#ppt_y-sin(pi*$)/27">
-                                          <p:val>
-                                            <p:fltVal val="0"/>
-                                          </p:val>
-                                        </p:tav>
-                                        <p:tav tm="100000">
-                                          <p:val>
-                                            <p:fltVal val="1"/>
-                                          </p:val>
-                                        </p:tav>
-                                      </p:tavLst>
-                                    </p:anim>
-                                    <p:anim calcmode="lin" valueType="num">
-                                      <p:cBhvr>
-                                        <p:cTn id="66" dur="164" tmFilter="0, 0; 0.125,0.2665; 0.25,0.4; 0.375,0.465; 0.5,0.5;  0.625,0.535; 0.75,0.6; 0.875,0.7335; 1,1">
-                                          <p:stCondLst>
-                                            <p:cond delay="1656"/>
-                                          </p:stCondLst>
-                                        </p:cTn>
-                                        <p:tgtEl>
-                                          <p:spTgt spid="8">
-                                            <p:txEl>
-                                              <p:pRg st="7" end="7"/>
-                                            </p:txEl>
-                                          </p:spTgt>
-                                        </p:tgtEl>
-                                        <p:attrNameLst>
-                                          <p:attrName>ppt_y</p:attrName>
-                                        </p:attrNameLst>
-                                      </p:cBhvr>
-                                      <p:tavLst>
-                                        <p:tav tm="0" fmla="#ppt_y-sin(pi*$)/81">
-                                          <p:val>
-                                            <p:fltVal val="0"/>
-                                          </p:val>
-                                        </p:tav>
-                                        <p:tav tm="100000">
-                                          <p:val>
-                                            <p:fltVal val="1"/>
-                                          </p:val>
-                                        </p:tav>
-                                      </p:tavLst>
-                                    </p:anim>
-                                    <p:animScale>
-                                      <p:cBhvr>
-                                        <p:cTn id="67" dur="26">
-                                          <p:stCondLst>
-                                            <p:cond delay="650"/>
-                                          </p:stCondLst>
-                                        </p:cTn>
-                                        <p:tgtEl>
-                                          <p:spTgt spid="8">
-                                            <p:txEl>
-                                              <p:pRg st="7" end="7"/>
-                                            </p:txEl>
-                                          </p:spTgt>
-                                        </p:tgtEl>
-                                      </p:cBhvr>
-                                      <p:to x="100000" y="60000"/>
-                                    </p:animScale>
-                                    <p:animScale>
-                                      <p:cBhvr>
-                                        <p:cTn id="68" dur="166" decel="50000">
-                                          <p:stCondLst>
-                                            <p:cond delay="676"/>
-                                          </p:stCondLst>
-                                        </p:cTn>
-                                        <p:tgtEl>
-                                          <p:spTgt spid="8">
-                                            <p:txEl>
-                                              <p:pRg st="7" end="7"/>
-                                            </p:txEl>
-                                          </p:spTgt>
-                                        </p:tgtEl>
-                                      </p:cBhvr>
-                                      <p:to x="100000" y="100000"/>
-                                    </p:animScale>
-                                    <p:animScale>
-                                      <p:cBhvr>
-                                        <p:cTn id="69" dur="26">
-                                          <p:stCondLst>
-                                            <p:cond delay="1312"/>
-                                          </p:stCondLst>
-                                        </p:cTn>
-                                        <p:tgtEl>
-                                          <p:spTgt spid="8">
-                                            <p:txEl>
-                                              <p:pRg st="7" end="7"/>
-                                            </p:txEl>
-                                          </p:spTgt>
-                                        </p:tgtEl>
-                                      </p:cBhvr>
-                                      <p:to x="100000" y="80000"/>
-                                    </p:animScale>
-                                    <p:animScale>
-                                      <p:cBhvr>
-                                        <p:cTn id="70" dur="166" decel="50000">
-                                          <p:stCondLst>
-                                            <p:cond delay="1338"/>
-                                          </p:stCondLst>
-                                        </p:cTn>
-                                        <p:tgtEl>
-                                          <p:spTgt spid="8">
-                                            <p:txEl>
-                                              <p:pRg st="7" end="7"/>
-                                            </p:txEl>
-                                          </p:spTgt>
-                                        </p:tgtEl>
-                                      </p:cBhvr>
-                                      <p:to x="100000" y="100000"/>
-                                    </p:animScale>
-                                    <p:animScale>
-                                      <p:cBhvr>
-                                        <p:cTn id="71" dur="26">
-                                          <p:stCondLst>
-                                            <p:cond delay="1642"/>
-                                          </p:stCondLst>
-                                        </p:cTn>
-                                        <p:tgtEl>
-                                          <p:spTgt spid="8">
-                                            <p:txEl>
-                                              <p:pRg st="7" end="7"/>
-                                            </p:txEl>
-                                          </p:spTgt>
-                                        </p:tgtEl>
-                                      </p:cBhvr>
-                                      <p:to x="100000" y="90000"/>
-                                    </p:animScale>
-                                    <p:animScale>
-                                      <p:cBhvr>
-                                        <p:cTn id="72" dur="166" decel="50000">
-                                          <p:stCondLst>
-                                            <p:cond delay="1668"/>
-                                          </p:stCondLst>
-                                        </p:cTn>
-                                        <p:tgtEl>
-                                          <p:spTgt spid="8">
-                                            <p:txEl>
-                                              <p:pRg st="7" end="7"/>
-                                            </p:txEl>
-                                          </p:spTgt>
-                                        </p:tgtEl>
-                                      </p:cBhvr>
-                                      <p:to x="100000" y="100000"/>
-                                    </p:animScale>
-                                    <p:animScale>
-                                      <p:cBhvr>
-                                        <p:cTn id="73" dur="26">
-                                          <p:stCondLst>
-                                            <p:cond delay="1808"/>
-                                          </p:stCondLst>
-                                        </p:cTn>
-                                        <p:tgtEl>
-                                          <p:spTgt spid="8">
-                                            <p:txEl>
-                                              <p:pRg st="7" end="7"/>
-                                            </p:txEl>
-                                          </p:spTgt>
-                                        </p:tgtEl>
-                                      </p:cBhvr>
-                                      <p:to x="100000" y="95000"/>
-                                    </p:animScale>
-                                    <p:animScale>
-                                      <p:cBhvr>
-                                        <p:cTn id="74" dur="166" decel="50000">
-                                          <p:stCondLst>
-                                            <p:cond delay="1834"/>
-                                          </p:stCondLst>
-                                        </p:cTn>
-                                        <p:tgtEl>
-                                          <p:spTgt spid="8">
-                                            <p:txEl>
-                                              <p:pRg st="7" end="7"/>
-                                            </p:txEl>
-                                          </p:spTgt>
-                                        </p:tgtEl>
-                                      </p:cBhvr>
-                                      <p:to x="100000" y="100000"/>
-                                    </p:animScale>
-                                  </p:childTnLst>
-                                </p:cTn>
-                              </p:par>
-                            </p:childTnLst>
-                          </p:cTn>
-                        </p:par>
-                      </p:childTnLst>
-                    </p:cTn>
-                  </p:par>
-                  <p:par>
-                    <p:cTn id="75" fill="hold">
-                      <p:stCondLst>
-                        <p:cond delay="indefinite"/>
-                      </p:stCondLst>
-                      <p:childTnLst>
-                        <p:par>
-                          <p:cTn id="76" fill="hold">
-                            <p:stCondLst>
-                              <p:cond delay="0"/>
-                            </p:stCondLst>
-                            <p:childTnLst>
-                              <p:par>
-                                <p:cTn id="77" presetID="26" presetClass="entr" presetSubtype="0" fill="hold" nodeType="clickEffect">
-                                  <p:stCondLst>
-                                    <p:cond delay="0"/>
-                                  </p:stCondLst>
-                                  <p:childTnLst>
-                                    <p:set>
-                                      <p:cBhvr>
-                                        <p:cTn id="78" dur="1" fill="hold">
-                                          <p:stCondLst>
-                                            <p:cond delay="0"/>
-                                          </p:stCondLst>
-                                        </p:cTn>
-                                        <p:tgtEl>
-                                          <p:spTgt spid="8">
-                                            <p:txEl>
-                                              <p:pRg st="9" end="9"/>
-                                            </p:txEl>
-                                          </p:spTgt>
-                                        </p:tgtEl>
-                                        <p:attrNameLst>
-                                          <p:attrName>style.visibility</p:attrName>
-                                        </p:attrNameLst>
-                                      </p:cBhvr>
-                                      <p:to>
-                                        <p:strVal val="visible"/>
-                                      </p:to>
-                                    </p:set>
-                                    <p:animEffect transition="in" filter="wipe(down)">
-                                      <p:cBhvr>
-                                        <p:cTn id="79" dur="580">
-                                          <p:stCondLst>
-                                            <p:cond delay="0"/>
-                                          </p:stCondLst>
-                                        </p:cTn>
-                                        <p:tgtEl>
-                                          <p:spTgt spid="8">
-                                            <p:txEl>
-                                              <p:pRg st="9" end="9"/>
-                                            </p:txEl>
-                                          </p:spTgt>
-                                        </p:tgtEl>
-                                      </p:cBhvr>
-                                    </p:animEffect>
-                                    <p:anim calcmode="lin" valueType="num">
-                                      <p:cBhvr>
-                                        <p:cTn id="80" dur="1822" tmFilter="0,0; 0.14,0.36; 0.43,0.73; 0.71,0.91; 1.0,1.0">
-                                          <p:stCondLst>
-                                            <p:cond delay="0"/>
-                                          </p:stCondLst>
-                                        </p:cTn>
-                                        <p:tgtEl>
-                                          <p:spTgt spid="8">
-                                            <p:txEl>
-                                              <p:pRg st="9" end="9"/>
-                                            </p:txEl>
-                                          </p:spTgt>
-                                        </p:tgtEl>
-                                        <p:attrNameLst>
-                                          <p:attrName>ppt_x</p:attrName>
-                                        </p:attrNameLst>
-                                      </p:cBhvr>
-                                      <p:tavLst>
-                                        <p:tav tm="0">
-                                          <p:val>
-                                            <p:strVal val="#ppt_x-0.25"/>
-                                          </p:val>
-                                        </p:tav>
-                                        <p:tav tm="100000">
-                                          <p:val>
-                                            <p:strVal val="#ppt_x"/>
-                                          </p:val>
-                                        </p:tav>
-                                      </p:tavLst>
-                                    </p:anim>
-                                    <p:anim calcmode="lin" valueType="num">
-                                      <p:cBhvr>
-                                        <p:cTn id="81" dur="664" tmFilter="0.0,0.0; 0.25,0.07; 0.50,0.2; 0.75,0.467; 1.0,1.0">
-                                          <p:stCondLst>
-                                            <p:cond delay="0"/>
-                                          </p:stCondLst>
-                                        </p:cTn>
-                                        <p:tgtEl>
-                                          <p:spTgt spid="8">
-                                            <p:txEl>
-                                              <p:pRg st="9" end="9"/>
-                                            </p:txEl>
-                                          </p:spTgt>
-                                        </p:tgtEl>
-                                        <p:attrNameLst>
-                                          <p:attrName>ppt_y</p:attrName>
-                                        </p:attrNameLst>
-                                      </p:cBhvr>
-                                      <p:tavLst>
-                                        <p:tav tm="0" fmla="#ppt_y-sin(pi*$)/3">
-                                          <p:val>
-                                            <p:fltVal val="0.5"/>
-                                          </p:val>
-                                        </p:tav>
-                                        <p:tav tm="100000">
-                                          <p:val>
-                                            <p:fltVal val="1"/>
-                                          </p:val>
-                                        </p:tav>
-                                      </p:tavLst>
-                                    </p:anim>
-                                    <p:anim calcmode="lin" valueType="num">
-                                      <p:cBhvr>
-                                        <p:cTn id="82" dur="664" tmFilter="0, 0; 0.125,0.2665; 0.25,0.4; 0.375,0.465; 0.5,0.5;  0.625,0.535; 0.75,0.6; 0.875,0.7335; 1,1">
-                                          <p:stCondLst>
-                                            <p:cond delay="664"/>
-                                          </p:stCondLst>
-                                        </p:cTn>
-                                        <p:tgtEl>
-                                          <p:spTgt spid="8">
-                                            <p:txEl>
-                                              <p:pRg st="9" end="9"/>
-                                            </p:txEl>
-                                          </p:spTgt>
-                                        </p:tgtEl>
-                                        <p:attrNameLst>
-                                          <p:attrName>ppt_y</p:attrName>
-                                        </p:attrNameLst>
-                                      </p:cBhvr>
-                                      <p:tavLst>
-                                        <p:tav tm="0" fmla="#ppt_y-sin(pi*$)/9">
-                                          <p:val>
-                                            <p:fltVal val="0"/>
-                                          </p:val>
-                                        </p:tav>
-                                        <p:tav tm="100000">
-                                          <p:val>
-                                            <p:fltVal val="1"/>
-                                          </p:val>
-                                        </p:tav>
-                                      </p:tavLst>
-                                    </p:anim>
-                                    <p:anim calcmode="lin" valueType="num">
-                                      <p:cBhvr>
-                                        <p:cTn id="83" dur="332" tmFilter="0, 0; 0.125,0.2665; 0.25,0.4; 0.375,0.465; 0.5,0.5;  0.625,0.535; 0.75,0.6; 0.875,0.7335; 1,1">
-                                          <p:stCondLst>
-                                            <p:cond delay="1324"/>
-                                          </p:stCondLst>
-                                        </p:cTn>
-                                        <p:tgtEl>
-                                          <p:spTgt spid="8">
-                                            <p:txEl>
-                                              <p:pRg st="9" end="9"/>
-                                            </p:txEl>
-                                          </p:spTgt>
-                                        </p:tgtEl>
-                                        <p:attrNameLst>
-                                          <p:attrName>ppt_y</p:attrName>
-                                        </p:attrNameLst>
-                                      </p:cBhvr>
-                                      <p:tavLst>
-                                        <p:tav tm="0" fmla="#ppt_y-sin(pi*$)/27">
-                                          <p:val>
-                                            <p:fltVal val="0"/>
-                                          </p:val>
-                                        </p:tav>
-                                        <p:tav tm="100000">
-                                          <p:val>
-                                            <p:fltVal val="1"/>
-                                          </p:val>
-                                        </p:tav>
-                                      </p:tavLst>
-                                    </p:anim>
-                                    <p:anim calcmode="lin" valueType="num">
-                                      <p:cBhvr>
-                                        <p:cTn id="84" dur="164" tmFilter="0, 0; 0.125,0.2665; 0.25,0.4; 0.375,0.465; 0.5,0.5;  0.625,0.535; 0.75,0.6; 0.875,0.7335; 1,1">
-                                          <p:stCondLst>
-                                            <p:cond delay="1656"/>
-                                          </p:stCondLst>
-                                        </p:cTn>
-                                        <p:tgtEl>
-                                          <p:spTgt spid="8">
-                                            <p:txEl>
-                                              <p:pRg st="9" end="9"/>
-                                            </p:txEl>
-                                          </p:spTgt>
-                                        </p:tgtEl>
-                                        <p:attrNameLst>
-                                          <p:attrName>ppt_y</p:attrName>
-                                        </p:attrNameLst>
-                                      </p:cBhvr>
-                                      <p:tavLst>
-                                        <p:tav tm="0" fmla="#ppt_y-sin(pi*$)/81">
-                                          <p:val>
-                                            <p:fltVal val="0"/>
-                                          </p:val>
-                                        </p:tav>
-                                        <p:tav tm="100000">
-                                          <p:val>
-                                            <p:fltVal val="1"/>
-                                          </p:val>
-                                        </p:tav>
-                                      </p:tavLst>
-                                    </p:anim>
-                                    <p:animScale>
-                                      <p:cBhvr>
-                                        <p:cTn id="85" dur="26">
-                                          <p:stCondLst>
-                                            <p:cond delay="650"/>
-                                          </p:stCondLst>
-                                        </p:cTn>
-                                        <p:tgtEl>
-                                          <p:spTgt spid="8">
-                                            <p:txEl>
-                                              <p:pRg st="9" end="9"/>
-                                            </p:txEl>
-                                          </p:spTgt>
-                                        </p:tgtEl>
-                                      </p:cBhvr>
-                                      <p:to x="100000" y="60000"/>
-                                    </p:animScale>
-                                    <p:animScale>
-                                      <p:cBhvr>
-                                        <p:cTn id="86" dur="166" decel="50000">
-                                          <p:stCondLst>
-                                            <p:cond delay="676"/>
-                                          </p:stCondLst>
-                                        </p:cTn>
-                                        <p:tgtEl>
-                                          <p:spTgt spid="8">
-                                            <p:txEl>
-                                              <p:pRg st="9" end="9"/>
-                                            </p:txEl>
-                                          </p:spTgt>
-                                        </p:tgtEl>
-                                      </p:cBhvr>
-                                      <p:to x="100000" y="100000"/>
-                                    </p:animScale>
-                                    <p:animScale>
-                                      <p:cBhvr>
-                                        <p:cTn id="87" dur="26">
-                                          <p:stCondLst>
-                                            <p:cond delay="1312"/>
-                                          </p:stCondLst>
-                                        </p:cTn>
-                                        <p:tgtEl>
-                                          <p:spTgt spid="8">
-                                            <p:txEl>
-                                              <p:pRg st="9" end="9"/>
-                                            </p:txEl>
-                                          </p:spTgt>
-                                        </p:tgtEl>
-                                      </p:cBhvr>
-                                      <p:to x="100000" y="80000"/>
-                                    </p:animScale>
-                                    <p:animScale>
-                                      <p:cBhvr>
-                                        <p:cTn id="88" dur="166" decel="50000">
-                                          <p:stCondLst>
-                                            <p:cond delay="1338"/>
-                                          </p:stCondLst>
-                                        </p:cTn>
-                                        <p:tgtEl>
-                                          <p:spTgt spid="8">
-                                            <p:txEl>
-                                              <p:pRg st="9" end="9"/>
-                                            </p:txEl>
-                                          </p:spTgt>
-                                        </p:tgtEl>
-                                      </p:cBhvr>
-                                      <p:to x="100000" y="100000"/>
-                                    </p:animScale>
-                                    <p:animScale>
-                                      <p:cBhvr>
-                                        <p:cTn id="89" dur="26">
-                                          <p:stCondLst>
-                                            <p:cond delay="1642"/>
-                                          </p:stCondLst>
-                                        </p:cTn>
-                                        <p:tgtEl>
-                                          <p:spTgt spid="8">
-                                            <p:txEl>
-                                              <p:pRg st="9" end="9"/>
-                                            </p:txEl>
-                                          </p:spTgt>
-                                        </p:tgtEl>
-                                      </p:cBhvr>
-                                      <p:to x="100000" y="90000"/>
-                                    </p:animScale>
-                                    <p:animScale>
-                                      <p:cBhvr>
-                                        <p:cTn id="90" dur="166" decel="50000">
-                                          <p:stCondLst>
-                                            <p:cond delay="1668"/>
-                                          </p:stCondLst>
-                                        </p:cTn>
-                                        <p:tgtEl>
-                                          <p:spTgt spid="8">
-                                            <p:txEl>
-                                              <p:pRg st="9" end="9"/>
-                                            </p:txEl>
-                                          </p:spTgt>
-                                        </p:tgtEl>
-                                      </p:cBhvr>
-                                      <p:to x="100000" y="100000"/>
-                                    </p:animScale>
-                                    <p:animScale>
-                                      <p:cBhvr>
-                                        <p:cTn id="91" dur="26">
-                                          <p:stCondLst>
-                                            <p:cond delay="1808"/>
-                                          </p:stCondLst>
-                                        </p:cTn>
-                                        <p:tgtEl>
-                                          <p:spTgt spid="8">
-                                            <p:txEl>
-                                              <p:pRg st="9" end="9"/>
-                                            </p:txEl>
-                                          </p:spTgt>
-                                        </p:tgtEl>
-                                      </p:cBhvr>
-                                      <p:to x="100000" y="95000"/>
-                                    </p:animScale>
-                                    <p:animScale>
-                                      <p:cBhvr>
-                                        <p:cTn id="92" dur="166" decel="50000">
-                                          <p:stCondLst>
-                                            <p:cond delay="1834"/>
-                                          </p:stCondLst>
-                                        </p:cTn>
-                                        <p:tgtEl>
-                                          <p:spTgt spid="8">
-                                            <p:txEl>
-                                              <p:pRg st="9" end="9"/>
-                                            </p:txEl>
-                                          </p:spTgt>
-                                        </p:tgtEl>
-                                      </p:cBhvr>
-                                      <p:to x="100000" y="100000"/>
-                                    </p:animScale>
-                                  </p:childTnLst>
-                                </p:cTn>
-                              </p:par>
-                            </p:childTnLst>
-                          </p:cTn>
-                        </p:par>
-                      </p:childTnLst>
-                    </p:cTn>
-                  </p:par>
-                  <p:par>
-                    <p:cTn id="93" fill="hold">
-                      <p:stCondLst>
-                        <p:cond delay="indefinite"/>
-                      </p:stCondLst>
-                      <p:childTnLst>
-                        <p:par>
-                          <p:cTn id="94" fill="hold">
-                            <p:stCondLst>
-                              <p:cond delay="0"/>
-                            </p:stCondLst>
-                            <p:childTnLst>
-                              <p:par>
-                                <p:cTn id="95" presetID="26" presetClass="entr" presetSubtype="0" fill="hold" nodeType="clickEffect">
-                                  <p:stCondLst>
-                                    <p:cond delay="0"/>
-                                  </p:stCondLst>
-                                  <p:childTnLst>
-                                    <p:set>
-                                      <p:cBhvr>
-                                        <p:cTn id="96" dur="1" fill="hold">
-                                          <p:stCondLst>
-                                            <p:cond delay="0"/>
-                                          </p:stCondLst>
-                                        </p:cTn>
-                                        <p:tgtEl>
-                                          <p:spTgt spid="8">
-                                            <p:txEl>
-                                              <p:pRg st="12" end="12"/>
-                                            </p:txEl>
-                                          </p:spTgt>
-                                        </p:tgtEl>
-                                        <p:attrNameLst>
-                                          <p:attrName>style.visibility</p:attrName>
-                                        </p:attrNameLst>
-                                      </p:cBhvr>
-                                      <p:to>
-                                        <p:strVal val="visible"/>
-                                      </p:to>
-                                    </p:set>
-                                    <p:animEffect transition="in" filter="wipe(down)">
-                                      <p:cBhvr>
-                                        <p:cTn id="97" dur="580">
-                                          <p:stCondLst>
-                                            <p:cond delay="0"/>
-                                          </p:stCondLst>
-                                        </p:cTn>
-                                        <p:tgtEl>
-                                          <p:spTgt spid="8">
-                                            <p:txEl>
-                                              <p:pRg st="12" end="12"/>
-                                            </p:txEl>
-                                          </p:spTgt>
-                                        </p:tgtEl>
-                                      </p:cBhvr>
-                                    </p:animEffect>
-                                    <p:anim calcmode="lin" valueType="num">
-                                      <p:cBhvr>
-                                        <p:cTn id="98" dur="1822" tmFilter="0,0; 0.14,0.36; 0.43,0.73; 0.71,0.91; 1.0,1.0">
-                                          <p:stCondLst>
-                                            <p:cond delay="0"/>
-                                          </p:stCondLst>
-                                        </p:cTn>
-                                        <p:tgtEl>
-                                          <p:spTgt spid="8">
-                                            <p:txEl>
-                                              <p:pRg st="12" end="12"/>
-                                            </p:txEl>
-                                          </p:spTgt>
-                                        </p:tgtEl>
-                                        <p:attrNameLst>
-                                          <p:attrName>ppt_x</p:attrName>
-                                        </p:attrNameLst>
-                                      </p:cBhvr>
-                                      <p:tavLst>
-                                        <p:tav tm="0">
-                                          <p:val>
-                                            <p:strVal val="#ppt_x-0.25"/>
-                                          </p:val>
-                                        </p:tav>
-                                        <p:tav tm="100000">
-                                          <p:val>
-                                            <p:strVal val="#ppt_x"/>
-                                          </p:val>
-                                        </p:tav>
-                                      </p:tavLst>
-                                    </p:anim>
-                                    <p:anim calcmode="lin" valueType="num">
-                                      <p:cBhvr>
-                                        <p:cTn id="99" dur="664" tmFilter="0.0,0.0; 0.25,0.07; 0.50,0.2; 0.75,0.467; 1.0,1.0">
-                                          <p:stCondLst>
-                                            <p:cond delay="0"/>
-                                          </p:stCondLst>
-                                        </p:cTn>
-                                        <p:tgtEl>
-                                          <p:spTgt spid="8">
-                                            <p:txEl>
-                                              <p:pRg st="12" end="12"/>
-                                            </p:txEl>
-                                          </p:spTgt>
-                                        </p:tgtEl>
-                                        <p:attrNameLst>
-                                          <p:attrName>ppt_y</p:attrName>
-                                        </p:attrNameLst>
-                                      </p:cBhvr>
-                                      <p:tavLst>
-                                        <p:tav tm="0" fmla="#ppt_y-sin(pi*$)/3">
-                                          <p:val>
-                                            <p:fltVal val="0.5"/>
-                                          </p:val>
-                                        </p:tav>
-                                        <p:tav tm="100000">
-                                          <p:val>
-                                            <p:fltVal val="1"/>
-                                          </p:val>
-                                        </p:tav>
-                                      </p:tavLst>
-                                    </p:anim>
-                                    <p:anim calcmode="lin" valueType="num">
-                                      <p:cBhvr>
-                                        <p:cTn id="100" dur="664" tmFilter="0, 0; 0.125,0.2665; 0.25,0.4; 0.375,0.465; 0.5,0.5;  0.625,0.535; 0.75,0.6; 0.875,0.7335; 1,1">
-                                          <p:stCondLst>
-                                            <p:cond delay="664"/>
-                                          </p:stCondLst>
-                                        </p:cTn>
-                                        <p:tgtEl>
-                                          <p:spTgt spid="8">
-                                            <p:txEl>
-                                              <p:pRg st="12" end="12"/>
-                                            </p:txEl>
-                                          </p:spTgt>
-                                        </p:tgtEl>
-                                        <p:attrNameLst>
-                                          <p:attrName>ppt_y</p:attrName>
-                                        </p:attrNameLst>
-                                      </p:cBhvr>
-                                      <p:tavLst>
-                                        <p:tav tm="0" fmla="#ppt_y-sin(pi*$)/9">
-                                          <p:val>
-                                            <p:fltVal val="0"/>
-                                          </p:val>
-                                        </p:tav>
-                                        <p:tav tm="100000">
-                                          <p:val>
-                                            <p:fltVal val="1"/>
-                                          </p:val>
-                                        </p:tav>
-                                      </p:tavLst>
-                                    </p:anim>
-                                    <p:anim calcmode="lin" valueType="num">
-                                      <p:cBhvr>
-                                        <p:cTn id="101" dur="332" tmFilter="0, 0; 0.125,0.2665; 0.25,0.4; 0.375,0.465; 0.5,0.5;  0.625,0.535; 0.75,0.6; 0.875,0.7335; 1,1">
-                                          <p:stCondLst>
-                                            <p:cond delay="1324"/>
-                                          </p:stCondLst>
-                                        </p:cTn>
-                                        <p:tgtEl>
-                                          <p:spTgt spid="8">
-                                            <p:txEl>
-                                              <p:pRg st="12" end="12"/>
-                                            </p:txEl>
-                                          </p:spTgt>
-                                        </p:tgtEl>
-                                        <p:attrNameLst>
-                                          <p:attrName>ppt_y</p:attrName>
-                                        </p:attrNameLst>
-                                      </p:cBhvr>
-                                      <p:tavLst>
-                                        <p:tav tm="0" fmla="#ppt_y-sin(pi*$)/27">
-                                          <p:val>
-                                            <p:fltVal val="0"/>
-                                          </p:val>
-                                        </p:tav>
-                                        <p:tav tm="100000">
-                                          <p:val>
-                                            <p:fltVal val="1"/>
-                                          </p:val>
-                                        </p:tav>
-                                      </p:tavLst>
-                                    </p:anim>
-                                    <p:anim calcmode="lin" valueType="num">
-                                      <p:cBhvr>
-                                        <p:cTn id="102" dur="164" tmFilter="0, 0; 0.125,0.2665; 0.25,0.4; 0.375,0.465; 0.5,0.5;  0.625,0.535; 0.75,0.6; 0.875,0.7335; 1,1">
-                                          <p:stCondLst>
-                                            <p:cond delay="1656"/>
-                                          </p:stCondLst>
-                                        </p:cTn>
-                                        <p:tgtEl>
-                                          <p:spTgt spid="8">
-                                            <p:txEl>
-                                              <p:pRg st="12" end="12"/>
-                                            </p:txEl>
-                                          </p:spTgt>
-                                        </p:tgtEl>
-                                        <p:attrNameLst>
-                                          <p:attrName>ppt_y</p:attrName>
-                                        </p:attrNameLst>
-                                      </p:cBhvr>
-                                      <p:tavLst>
-                                        <p:tav tm="0" fmla="#ppt_y-sin(pi*$)/81">
-                                          <p:val>
-                                            <p:fltVal val="0"/>
-                                          </p:val>
-                                        </p:tav>
-                                        <p:tav tm="100000">
-                                          <p:val>
-                                            <p:fltVal val="1"/>
-                                          </p:val>
-                                        </p:tav>
-                                      </p:tavLst>
-                                    </p:anim>
-                                    <p:animScale>
-                                      <p:cBhvr>
-                                        <p:cTn id="103" dur="26">
-                                          <p:stCondLst>
-                                            <p:cond delay="650"/>
-                                          </p:stCondLst>
-                                        </p:cTn>
-                                        <p:tgtEl>
-                                          <p:spTgt spid="8">
-                                            <p:txEl>
-                                              <p:pRg st="12" end="12"/>
-                                            </p:txEl>
-                                          </p:spTgt>
-                                        </p:tgtEl>
-                                      </p:cBhvr>
-                                      <p:to x="100000" y="60000"/>
-                                    </p:animScale>
-                                    <p:animScale>
-                                      <p:cBhvr>
-                                        <p:cTn id="104" dur="166" decel="50000">
-                                          <p:stCondLst>
-                                            <p:cond delay="676"/>
-                                          </p:stCondLst>
-                                        </p:cTn>
-                                        <p:tgtEl>
-                                          <p:spTgt spid="8">
-                                            <p:txEl>
-                                              <p:pRg st="12" end="12"/>
-                                            </p:txEl>
-                                          </p:spTgt>
-                                        </p:tgtEl>
-                                      </p:cBhvr>
-                                      <p:to x="100000" y="100000"/>
-                                    </p:animScale>
-                                    <p:animScale>
-                                      <p:cBhvr>
-                                        <p:cTn id="105" dur="26">
-                                          <p:stCondLst>
-                                            <p:cond delay="1312"/>
-                                          </p:stCondLst>
-                                        </p:cTn>
-                                        <p:tgtEl>
-                                          <p:spTgt spid="8">
-                                            <p:txEl>
-                                              <p:pRg st="12" end="12"/>
-                                            </p:txEl>
-                                          </p:spTgt>
-                                        </p:tgtEl>
-                                      </p:cBhvr>
-                                      <p:to x="100000" y="80000"/>
-                                    </p:animScale>
-                                    <p:animScale>
-                                      <p:cBhvr>
-                                        <p:cTn id="106" dur="166" decel="50000">
-                                          <p:stCondLst>
-                                            <p:cond delay="1338"/>
-                                          </p:stCondLst>
-                                        </p:cTn>
-                                        <p:tgtEl>
-                                          <p:spTgt spid="8">
-                                            <p:txEl>
-                                              <p:pRg st="12" end="12"/>
-                                            </p:txEl>
-                                          </p:spTgt>
-                                        </p:tgtEl>
-                                      </p:cBhvr>
-                                      <p:to x="100000" y="100000"/>
-                                    </p:animScale>
-                                    <p:animScale>
-                                      <p:cBhvr>
-                                        <p:cTn id="107" dur="26">
-                                          <p:stCondLst>
-                                            <p:cond delay="1642"/>
-                                          </p:stCondLst>
-                                        </p:cTn>
-                                        <p:tgtEl>
-                                          <p:spTgt spid="8">
-                                            <p:txEl>
-                                              <p:pRg st="12" end="12"/>
-                                            </p:txEl>
-                                          </p:spTgt>
-                                        </p:tgtEl>
-                                      </p:cBhvr>
-                                      <p:to x="100000" y="90000"/>
-                                    </p:animScale>
-                                    <p:animScale>
-                                      <p:cBhvr>
-                                        <p:cTn id="108" dur="166" decel="50000">
-                                          <p:stCondLst>
-                                            <p:cond delay="1668"/>
-                                          </p:stCondLst>
-                                        </p:cTn>
-                                        <p:tgtEl>
-                                          <p:spTgt spid="8">
-                                            <p:txEl>
-                                              <p:pRg st="12" end="12"/>
-                                            </p:txEl>
-                                          </p:spTgt>
-                                        </p:tgtEl>
-                                      </p:cBhvr>
-                                      <p:to x="100000" y="100000"/>
-                                    </p:animScale>
-                                    <p:animScale>
-                                      <p:cBhvr>
-                                        <p:cTn id="109" dur="26">
-                                          <p:stCondLst>
-                                            <p:cond delay="1808"/>
-                                          </p:stCondLst>
-                                        </p:cTn>
-                                        <p:tgtEl>
-                                          <p:spTgt spid="8">
-                                            <p:txEl>
-                                              <p:pRg st="12" end="12"/>
-                                            </p:txEl>
-                                          </p:spTgt>
-                                        </p:tgtEl>
-                                      </p:cBhvr>
-                                      <p:to x="100000" y="95000"/>
-                                    </p:animScale>
-                                    <p:animScale>
-                                      <p:cBhvr>
-                                        <p:cTn id="110" dur="166" decel="50000">
-                                          <p:stCondLst>
-                                            <p:cond delay="1834"/>
-                                          </p:stCondLst>
-                                        </p:cTn>
-                                        <p:tgtEl>
-                                          <p:spTgt spid="8">
-                                            <p:txEl>
-                                              <p:pRg st="12" end="12"/>
-                                            </p:txEl>
-                                          </p:spTgt>
-                                        </p:tgtEl>
-                                      </p:cBhvr>
-                                      <p:to x="100000" y="100000"/>
-                                    </p:animScale>
-                                  </p:childTnLst>
-                                </p:cTn>
-                              </p:par>
-                            </p:childTnLst>
-                          </p:cTn>
-                        </p:par>
-                      </p:childTnLst>
-                    </p:cTn>
-                  </p:par>
-                  <p:par>
-                    <p:cTn id="111" fill="hold">
-                      <p:stCondLst>
-                        <p:cond delay="indefinite"/>
-                      </p:stCondLst>
-                      <p:childTnLst>
-                        <p:par>
-                          <p:cTn id="112" fill="hold">
-                            <p:stCondLst>
-                              <p:cond delay="0"/>
-                            </p:stCondLst>
-                            <p:childTnLst>
-                              <p:par>
-                                <p:cTn id="113" presetID="26" presetClass="entr" presetSubtype="0" fill="hold" nodeType="clickEffect">
-                                  <p:stCondLst>
-                                    <p:cond delay="0"/>
-                                  </p:stCondLst>
-                                  <p:childTnLst>
-                                    <p:set>
-                                      <p:cBhvr>
-                                        <p:cTn id="114" dur="1" fill="hold">
-                                          <p:stCondLst>
-                                            <p:cond delay="0"/>
-                                          </p:stCondLst>
-                                        </p:cTn>
-                                        <p:tgtEl>
-                                          <p:spTgt spid="8">
-                                            <p:txEl>
-                                              <p:pRg st="11" end="11"/>
-                                            </p:txEl>
-                                          </p:spTgt>
-                                        </p:tgtEl>
-                                        <p:attrNameLst>
-                                          <p:attrName>style.visibility</p:attrName>
-                                        </p:attrNameLst>
-                                      </p:cBhvr>
-                                      <p:to>
-                                        <p:strVal val="visible"/>
-                                      </p:to>
-                                    </p:set>
-                                    <p:animEffect transition="in" filter="wipe(down)">
-                                      <p:cBhvr>
-                                        <p:cTn id="115" dur="580">
-                                          <p:stCondLst>
-                                            <p:cond delay="0"/>
-                                          </p:stCondLst>
-                                        </p:cTn>
-                                        <p:tgtEl>
-                                          <p:spTgt spid="8">
-                                            <p:txEl>
-                                              <p:pRg st="11" end="11"/>
-                                            </p:txEl>
-                                          </p:spTgt>
-                                        </p:tgtEl>
-                                      </p:cBhvr>
-                                    </p:animEffect>
-                                    <p:anim calcmode="lin" valueType="num">
-                                      <p:cBhvr>
-                                        <p:cTn id="116" dur="1822" tmFilter="0,0; 0.14,0.36; 0.43,0.73; 0.71,0.91; 1.0,1.0">
-                                          <p:stCondLst>
-                                            <p:cond delay="0"/>
-                                          </p:stCondLst>
-                                        </p:cTn>
-                                        <p:tgtEl>
-                                          <p:spTgt spid="8">
-                                            <p:txEl>
-                                              <p:pRg st="11" end="11"/>
-                                            </p:txEl>
-                                          </p:spTgt>
-                                        </p:tgtEl>
-                                        <p:attrNameLst>
-                                          <p:attrName>ppt_x</p:attrName>
-                                        </p:attrNameLst>
-                                      </p:cBhvr>
-                                      <p:tavLst>
-                                        <p:tav tm="0">
-                                          <p:val>
-                                            <p:strVal val="#ppt_x-0.25"/>
-                                          </p:val>
-                                        </p:tav>
-                                        <p:tav tm="100000">
-                                          <p:val>
-                                            <p:strVal val="#ppt_x"/>
-                                          </p:val>
-                                        </p:tav>
-                                      </p:tavLst>
-                                    </p:anim>
-                                    <p:anim calcmode="lin" valueType="num">
-                                      <p:cBhvr>
-                                        <p:cTn id="117" dur="664" tmFilter="0.0,0.0; 0.25,0.07; 0.50,0.2; 0.75,0.467; 1.0,1.0">
-                                          <p:stCondLst>
-                                            <p:cond delay="0"/>
-                                          </p:stCondLst>
-                                        </p:cTn>
-                                        <p:tgtEl>
-                                          <p:spTgt spid="8">
-                                            <p:txEl>
-                                              <p:pRg st="11" end="11"/>
-                                            </p:txEl>
-                                          </p:spTgt>
-                                        </p:tgtEl>
-                                        <p:attrNameLst>
-                                          <p:attrName>ppt_y</p:attrName>
-                                        </p:attrNameLst>
-                                      </p:cBhvr>
-                                      <p:tavLst>
-                                        <p:tav tm="0" fmla="#ppt_y-sin(pi*$)/3">
-                                          <p:val>
-                                            <p:fltVal val="0.5"/>
-                                          </p:val>
-                                        </p:tav>
-                                        <p:tav tm="100000">
-                                          <p:val>
-                                            <p:fltVal val="1"/>
-                                          </p:val>
-                                        </p:tav>
-                                      </p:tavLst>
-                                    </p:anim>
-                                    <p:anim calcmode="lin" valueType="num">
-                                      <p:cBhvr>
-                                        <p:cTn id="118" dur="664" tmFilter="0, 0; 0.125,0.2665; 0.25,0.4; 0.375,0.465; 0.5,0.5;  0.625,0.535; 0.75,0.6; 0.875,0.7335; 1,1">
-                                          <p:stCondLst>
-                                            <p:cond delay="664"/>
-                                          </p:stCondLst>
-                                        </p:cTn>
-                                        <p:tgtEl>
-                                          <p:spTgt spid="8">
-                                            <p:txEl>
-                                              <p:pRg st="11" end="11"/>
-                                            </p:txEl>
-                                          </p:spTgt>
-                                        </p:tgtEl>
-                                        <p:attrNameLst>
-                                          <p:attrName>ppt_y</p:attrName>
-                                        </p:attrNameLst>
-                                      </p:cBhvr>
-                                      <p:tavLst>
-                                        <p:tav tm="0" fmla="#ppt_y-sin(pi*$)/9">
-                                          <p:val>
-                                            <p:fltVal val="0"/>
-                                          </p:val>
-                                        </p:tav>
-                                        <p:tav tm="100000">
-                                          <p:val>
-                                            <p:fltVal val="1"/>
-                                          </p:val>
-                                        </p:tav>
-                                      </p:tavLst>
-                                    </p:anim>
-                                    <p:anim calcmode="lin" valueType="num">
-                                      <p:cBhvr>
-                                        <p:cTn id="119" dur="332" tmFilter="0, 0; 0.125,0.2665; 0.25,0.4; 0.375,0.465; 0.5,0.5;  0.625,0.535; 0.75,0.6; 0.875,0.7335; 1,1">
-                                          <p:stCondLst>
-                                            <p:cond delay="1324"/>
-                                          </p:stCondLst>
-                                        </p:cTn>
-                                        <p:tgtEl>
-                                          <p:spTgt spid="8">
-                                            <p:txEl>
-                                              <p:pRg st="11" end="11"/>
-                                            </p:txEl>
-                                          </p:spTgt>
-                                        </p:tgtEl>
-                                        <p:attrNameLst>
-                                          <p:attrName>ppt_y</p:attrName>
-                                        </p:attrNameLst>
-                                      </p:cBhvr>
-                                      <p:tavLst>
-                                        <p:tav tm="0" fmla="#ppt_y-sin(pi*$)/27">
-                                          <p:val>
-                                            <p:fltVal val="0"/>
-                                          </p:val>
-                                        </p:tav>
-                                        <p:tav tm="100000">
-                                          <p:val>
-                                            <p:fltVal val="1"/>
-                                          </p:val>
-                                        </p:tav>
-                                      </p:tavLst>
-                                    </p:anim>
-                                    <p:anim calcmode="lin" valueType="num">
-                                      <p:cBhvr>
-                                        <p:cTn id="120" dur="164" tmFilter="0, 0; 0.125,0.2665; 0.25,0.4; 0.375,0.465; 0.5,0.5;  0.625,0.535; 0.75,0.6; 0.875,0.7335; 1,1">
-                                          <p:stCondLst>
-                                            <p:cond delay="1656"/>
-                                          </p:stCondLst>
-                                        </p:cTn>
-                                        <p:tgtEl>
-                                          <p:spTgt spid="8">
-                                            <p:txEl>
-                                              <p:pRg st="11" end="11"/>
-                                            </p:txEl>
-                                          </p:spTgt>
-                                        </p:tgtEl>
-                                        <p:attrNameLst>
-                                          <p:attrName>ppt_y</p:attrName>
-                                        </p:attrNameLst>
-                                      </p:cBhvr>
-                                      <p:tavLst>
-                                        <p:tav tm="0" fmla="#ppt_y-sin(pi*$)/81">
-                                          <p:val>
-                                            <p:fltVal val="0"/>
-                                          </p:val>
-                                        </p:tav>
-                                        <p:tav tm="100000">
-                                          <p:val>
-                                            <p:fltVal val="1"/>
-                                          </p:val>
-                                        </p:tav>
-                                      </p:tavLst>
-                                    </p:anim>
-                                    <p:animScale>
-                                      <p:cBhvr>
-                                        <p:cTn id="121" dur="26">
-                                          <p:stCondLst>
-                                            <p:cond delay="650"/>
-                                          </p:stCondLst>
-                                        </p:cTn>
-                                        <p:tgtEl>
-                                          <p:spTgt spid="8">
-                                            <p:txEl>
-                                              <p:pRg st="11" end="11"/>
-                                            </p:txEl>
-                                          </p:spTgt>
-                                        </p:tgtEl>
-                                      </p:cBhvr>
-                                      <p:to x="100000" y="60000"/>
-                                    </p:animScale>
-                                    <p:animScale>
-                                      <p:cBhvr>
-                                        <p:cTn id="122" dur="166" decel="50000">
-                                          <p:stCondLst>
-                                            <p:cond delay="676"/>
-                                          </p:stCondLst>
-                                        </p:cTn>
-                                        <p:tgtEl>
-                                          <p:spTgt spid="8">
-                                            <p:txEl>
-                                              <p:pRg st="11" end="11"/>
-                                            </p:txEl>
-                                          </p:spTgt>
-                                        </p:tgtEl>
-                                      </p:cBhvr>
-                                      <p:to x="100000" y="100000"/>
-                                    </p:animScale>
-                                    <p:animScale>
-                                      <p:cBhvr>
-                                        <p:cTn id="123" dur="26">
-                                          <p:stCondLst>
-                                            <p:cond delay="1312"/>
-                                          </p:stCondLst>
-                                        </p:cTn>
-                                        <p:tgtEl>
-                                          <p:spTgt spid="8">
-                                            <p:txEl>
-                                              <p:pRg st="11" end="11"/>
-                                            </p:txEl>
-                                          </p:spTgt>
-                                        </p:tgtEl>
-                                      </p:cBhvr>
-                                      <p:to x="100000" y="80000"/>
-                                    </p:animScale>
-                                    <p:animScale>
-                                      <p:cBhvr>
-                                        <p:cTn id="124" dur="166" decel="50000">
-                                          <p:stCondLst>
-                                            <p:cond delay="1338"/>
-                                          </p:stCondLst>
-                                        </p:cTn>
-                                        <p:tgtEl>
-                                          <p:spTgt spid="8">
-                                            <p:txEl>
-                                              <p:pRg st="11" end="11"/>
-                                            </p:txEl>
-                                          </p:spTgt>
-                                        </p:tgtEl>
-                                      </p:cBhvr>
-                                      <p:to x="100000" y="100000"/>
-                                    </p:animScale>
-                                    <p:animScale>
-                                      <p:cBhvr>
-                                        <p:cTn id="125" dur="26">
-                                          <p:stCondLst>
-                                            <p:cond delay="1642"/>
-                                          </p:stCondLst>
-                                        </p:cTn>
-                                        <p:tgtEl>
-                                          <p:spTgt spid="8">
-                                            <p:txEl>
-                                              <p:pRg st="11" end="11"/>
-                                            </p:txEl>
-                                          </p:spTgt>
-                                        </p:tgtEl>
-                                      </p:cBhvr>
-                                      <p:to x="100000" y="90000"/>
-                                    </p:animScale>
-                                    <p:animScale>
-                                      <p:cBhvr>
-                                        <p:cTn id="126" dur="166" decel="50000">
-                                          <p:stCondLst>
-                                            <p:cond delay="1668"/>
-                                          </p:stCondLst>
-                                        </p:cTn>
-                                        <p:tgtEl>
-                                          <p:spTgt spid="8">
-                                            <p:txEl>
-                                              <p:pRg st="11" end="11"/>
-                                            </p:txEl>
-                                          </p:spTgt>
-                                        </p:tgtEl>
-                                      </p:cBhvr>
-                                      <p:to x="100000" y="100000"/>
-                                    </p:animScale>
-                                    <p:animScale>
-                                      <p:cBhvr>
-                                        <p:cTn id="127" dur="26">
-                                          <p:stCondLst>
-                                            <p:cond delay="1808"/>
-                                          </p:stCondLst>
-                                        </p:cTn>
-                                        <p:tgtEl>
-                                          <p:spTgt spid="8">
-                                            <p:txEl>
-                                              <p:pRg st="11" end="11"/>
-                                            </p:txEl>
-                                          </p:spTgt>
-                                        </p:tgtEl>
-                                      </p:cBhvr>
-                                      <p:to x="100000" y="95000"/>
-                                    </p:animScale>
-                                    <p:animScale>
-                                      <p:cBhvr>
-                                        <p:cTn id="128" dur="166" decel="50000">
-                                          <p:stCondLst>
-                                            <p:cond delay="1834"/>
-                                          </p:stCondLst>
-                                        </p:cTn>
-                                        <p:tgtEl>
-                                          <p:spTgt spid="8">
-                                            <p:txEl>
-                                              <p:pRg st="11" end="11"/>
-                                            </p:txEl>
-                                          </p:spTgt>
+                                          <p:spTgt spid="8"/>
                                         </p:tgtEl>
                                       </p:cBhvr>
                                       <p:to x="100000" y="100000"/>
@@ -43615,6 +42391,9 @@
         </p:cTn>
       </p:par>
     </p:tnLst>
+    <p:bldLst>
+      <p:bldP spid="8" grpId="0"/>
+    </p:bldLst>
   </p:timing>
 </p:sld>
 </file>
@@ -43648,7 +42427,7 @@
           <a:blip r:embed="rId2" cstate="print">
             <a:extLst>
               <a:ext uri="{28A0092B-C50C-407E-A947-70E740481C1C}">
-                <a14:useLocalDpi xmlns="" xmlns:a14="http://schemas.microsoft.com/office/drawing/2010/main" val="0"/>
+                <a14:useLocalDpi xmlns:a14="http://schemas.microsoft.com/office/drawing/2010/main" xmlns="" val="0"/>
               </a:ext>
             </a:extLst>
           </a:blip>
@@ -43668,7 +42447,7 @@
           <a:noFill/>
           <a:extLst>
             <a:ext uri="{909E8E84-426E-40DD-AFC4-6F175D3DCCD1}">
-              <a14:hiddenFill xmlns="" xmlns:a14="http://schemas.microsoft.com/office/drawing/2010/main">
+              <a14:hiddenFill xmlns:a14="http://schemas.microsoft.com/office/drawing/2010/main" xmlns="">
                 <a:solidFill>
                   <a:srgbClr val="FFFFFF"/>
                 </a:solidFill>
@@ -43689,7 +42468,7 @@
           <a:blip r:embed="rId3" cstate="print">
             <a:extLst>
               <a:ext uri="{28A0092B-C50C-407E-A947-70E740481C1C}">
-                <a14:useLocalDpi xmlns="" xmlns:a14="http://schemas.microsoft.com/office/drawing/2010/main" val="0"/>
+                <a14:useLocalDpi xmlns:a14="http://schemas.microsoft.com/office/drawing/2010/main" xmlns="" val="0"/>
               </a:ext>
             </a:extLst>
           </a:blip>
@@ -43709,7 +42488,7 @@
           <a:noFill/>
           <a:extLst>
             <a:ext uri="{909E8E84-426E-40DD-AFC4-6F175D3DCCD1}">
-              <a14:hiddenFill xmlns="" xmlns:a14="http://schemas.microsoft.com/office/drawing/2010/main">
+              <a14:hiddenFill xmlns:a14="http://schemas.microsoft.com/office/drawing/2010/main" xmlns="">
                 <a:solidFill>
                   <a:srgbClr val="FFFFFF"/>
                 </a:solidFill>
@@ -44056,7 +42835,7 @@
           <p:nvPr>
             <p:extLst>
               <p:ext uri="{D42A27DB-BD31-4B8C-83A1-F6EECF244321}">
-                <p14:modId xmlns="" xmlns:p14="http://schemas.microsoft.com/office/powerpoint/2010/main" val="1398164617"/>
+                <p14:modId xmlns:p14="http://schemas.microsoft.com/office/powerpoint/2010/main" xmlns="" val="1398164617"/>
               </p:ext>
             </p:extLst>
           </p:nvPr>
@@ -44074,7 +42853,7 @@
     </p:spTree>
     <p:extLst>
       <p:ext uri="{BB962C8B-B14F-4D97-AF65-F5344CB8AC3E}">
-        <p14:creationId xmlns="" xmlns:p14="http://schemas.microsoft.com/office/powerpoint/2010/main" val="1218708985"/>
+        <p14:creationId xmlns:p14="http://schemas.microsoft.com/office/powerpoint/2010/main" xmlns="" val="1218708985"/>
       </p:ext>
     </p:extLst>
   </p:cSld>
@@ -44087,9 +42866,128 @@
   <p:timing>
     <p:tnLst>
       <p:par>
-        <p:cTn id="1" dur="indefinite" restart="never" nodeType="tmRoot"/>
+        <p:cTn id="1" dur="indefinite" restart="never" nodeType="tmRoot">
+          <p:childTnLst>
+            <p:seq concurrent="1" nextAc="seek">
+              <p:cTn id="2" dur="indefinite" nodeType="mainSeq">
+                <p:childTnLst>
+                  <p:par>
+                    <p:cTn id="3" fill="hold">
+                      <p:stCondLst>
+                        <p:cond delay="indefinite"/>
+                      </p:stCondLst>
+                      <p:childTnLst>
+                        <p:par>
+                          <p:cTn id="4" fill="hold">
+                            <p:stCondLst>
+                              <p:cond delay="0"/>
+                            </p:stCondLst>
+                            <p:childTnLst>
+                              <p:par>
+                                <p:cTn id="5" presetID="2" presetClass="entr" presetSubtype="4" fill="hold" grpId="0" nodeType="clickEffect">
+                                  <p:stCondLst>
+                                    <p:cond delay="0"/>
+                                  </p:stCondLst>
+                                  <p:childTnLst>
+                                    <p:set>
+                                      <p:cBhvr>
+                                        <p:cTn id="6" dur="1" fill="hold">
+                                          <p:stCondLst>
+                                            <p:cond delay="0"/>
+                                          </p:stCondLst>
+                                        </p:cTn>
+                                        <p:tgtEl>
+                                          <p:spTgt spid="9"/>
+                                        </p:tgtEl>
+                                        <p:attrNameLst>
+                                          <p:attrName>style.visibility</p:attrName>
+                                        </p:attrNameLst>
+                                      </p:cBhvr>
+                                      <p:to>
+                                        <p:strVal val="visible"/>
+                                      </p:to>
+                                    </p:set>
+                                    <p:anim calcmode="lin" valueType="num">
+                                      <p:cBhvr additive="base">
+                                        <p:cTn id="7" dur="1000" fill="hold"/>
+                                        <p:tgtEl>
+                                          <p:spTgt spid="9"/>
+                                        </p:tgtEl>
+                                        <p:attrNameLst>
+                                          <p:attrName>ppt_x</p:attrName>
+                                        </p:attrNameLst>
+                                      </p:cBhvr>
+                                      <p:tavLst>
+                                        <p:tav tm="0">
+                                          <p:val>
+                                            <p:strVal val="#ppt_x"/>
+                                          </p:val>
+                                        </p:tav>
+                                        <p:tav tm="100000">
+                                          <p:val>
+                                            <p:strVal val="#ppt_x"/>
+                                          </p:val>
+                                        </p:tav>
+                                      </p:tavLst>
+                                    </p:anim>
+                                    <p:anim calcmode="lin" valueType="num">
+                                      <p:cBhvr additive="base">
+                                        <p:cTn id="8" dur="1000" fill="hold"/>
+                                        <p:tgtEl>
+                                          <p:spTgt spid="9"/>
+                                        </p:tgtEl>
+                                        <p:attrNameLst>
+                                          <p:attrName>ppt_y</p:attrName>
+                                        </p:attrNameLst>
+                                      </p:cBhvr>
+                                      <p:tavLst>
+                                        <p:tav tm="0">
+                                          <p:val>
+                                            <p:strVal val="1+#ppt_h/2"/>
+                                          </p:val>
+                                        </p:tav>
+                                        <p:tav tm="100000">
+                                          <p:val>
+                                            <p:strVal val="#ppt_y"/>
+                                          </p:val>
+                                        </p:tav>
+                                      </p:tavLst>
+                                    </p:anim>
+                                  </p:childTnLst>
+                                </p:cTn>
+                              </p:par>
+                            </p:childTnLst>
+                          </p:cTn>
+                        </p:par>
+                      </p:childTnLst>
+                    </p:cTn>
+                  </p:par>
+                </p:childTnLst>
+              </p:cTn>
+              <p:prevCondLst>
+                <p:cond evt="onPrev" delay="0">
+                  <p:tgtEl>
+                    <p:sldTgt/>
+                  </p:tgtEl>
+                </p:cond>
+              </p:prevCondLst>
+              <p:nextCondLst>
+                <p:cond evt="onNext" delay="0">
+                  <p:tgtEl>
+                    <p:sldTgt/>
+                  </p:tgtEl>
+                </p:cond>
+              </p:nextCondLst>
+            </p:seq>
+          </p:childTnLst>
+        </p:cTn>
       </p:par>
     </p:tnLst>
+    <p:bldLst>
+      <p:bldGraphic spid="9" grpId="0">
+        <p:bldAsOne/>
+      </p:bldGraphic>
+    </p:bldLst>
   </p:timing>
 </p:sld>
 </file>

</xml_diff>